<commit_message>
Added separate pages for each command. Reworked until run
</commit_message>
<xml_diff>
--- a/_sources/GettingStarted.pptx
+++ b/_sources/GettingStarted.pptx
@@ -14,6 +14,10 @@
     <p:sldId id="262" r:id="rId8"/>
     <p:sldId id="263" r:id="rId9"/>
     <p:sldId id="264" r:id="rId10"/>
+    <p:sldId id="265" r:id="rId11"/>
+    <p:sldId id="266" r:id="rId12"/>
+    <p:sldId id="267" r:id="rId13"/>
+    <p:sldId id="268" r:id="rId14"/>
   </p:sldIdLst>
   <p:sldSz cx="14400213" cy="7559675"/>
   <p:notesSz cx="6858000" cy="9144000"/>
@@ -251,7 +255,7 @@
           <a:p>
             <a:fld id="{9AA7D095-A676-4F6B-9416-D65D798F5244}" type="datetimeFigureOut">
               <a:rPr lang="de-DE" smtClean="0"/>
-              <a:t>24.02.2015</a:t>
+              <a:t>03.03.2015</a:t>
             </a:fld>
             <a:endParaRPr lang="de-DE"/>
           </a:p>
@@ -421,7 +425,7 @@
           <a:p>
             <a:fld id="{9AA7D095-A676-4F6B-9416-D65D798F5244}" type="datetimeFigureOut">
               <a:rPr lang="de-DE" smtClean="0"/>
-              <a:t>24.02.2015</a:t>
+              <a:t>03.03.2015</a:t>
             </a:fld>
             <a:endParaRPr lang="de-DE"/>
           </a:p>
@@ -601,7 +605,7 @@
           <a:p>
             <a:fld id="{9AA7D095-A676-4F6B-9416-D65D798F5244}" type="datetimeFigureOut">
               <a:rPr lang="de-DE" smtClean="0"/>
-              <a:t>24.02.2015</a:t>
+              <a:t>03.03.2015</a:t>
             </a:fld>
             <a:endParaRPr lang="de-DE"/>
           </a:p>
@@ -771,7 +775,7 @@
           <a:p>
             <a:fld id="{9AA7D095-A676-4F6B-9416-D65D798F5244}" type="datetimeFigureOut">
               <a:rPr lang="de-DE" smtClean="0"/>
-              <a:t>24.02.2015</a:t>
+              <a:t>03.03.2015</a:t>
             </a:fld>
             <a:endParaRPr lang="de-DE"/>
           </a:p>
@@ -1017,7 +1021,7 @@
           <a:p>
             <a:fld id="{9AA7D095-A676-4F6B-9416-D65D798F5244}" type="datetimeFigureOut">
               <a:rPr lang="de-DE" smtClean="0"/>
-              <a:t>24.02.2015</a:t>
+              <a:t>03.03.2015</a:t>
             </a:fld>
             <a:endParaRPr lang="de-DE"/>
           </a:p>
@@ -1249,7 +1253,7 @@
           <a:p>
             <a:fld id="{9AA7D095-A676-4F6B-9416-D65D798F5244}" type="datetimeFigureOut">
               <a:rPr lang="de-DE" smtClean="0"/>
-              <a:t>24.02.2015</a:t>
+              <a:t>03.03.2015</a:t>
             </a:fld>
             <a:endParaRPr lang="de-DE"/>
           </a:p>
@@ -1616,7 +1620,7 @@
           <a:p>
             <a:fld id="{9AA7D095-A676-4F6B-9416-D65D798F5244}" type="datetimeFigureOut">
               <a:rPr lang="de-DE" smtClean="0"/>
-              <a:t>24.02.2015</a:t>
+              <a:t>03.03.2015</a:t>
             </a:fld>
             <a:endParaRPr lang="de-DE"/>
           </a:p>
@@ -1734,7 +1738,7 @@
           <a:p>
             <a:fld id="{9AA7D095-A676-4F6B-9416-D65D798F5244}" type="datetimeFigureOut">
               <a:rPr lang="de-DE" smtClean="0"/>
-              <a:t>24.02.2015</a:t>
+              <a:t>03.03.2015</a:t>
             </a:fld>
             <a:endParaRPr lang="de-DE"/>
           </a:p>
@@ -1829,7 +1833,7 @@
           <a:p>
             <a:fld id="{9AA7D095-A676-4F6B-9416-D65D798F5244}" type="datetimeFigureOut">
               <a:rPr lang="de-DE" smtClean="0"/>
-              <a:t>24.02.2015</a:t>
+              <a:t>03.03.2015</a:t>
             </a:fld>
             <a:endParaRPr lang="de-DE"/>
           </a:p>
@@ -2106,7 +2110,7 @@
           <a:p>
             <a:fld id="{9AA7D095-A676-4F6B-9416-D65D798F5244}" type="datetimeFigureOut">
               <a:rPr lang="de-DE" smtClean="0"/>
-              <a:t>24.02.2015</a:t>
+              <a:t>03.03.2015</a:t>
             </a:fld>
             <a:endParaRPr lang="de-DE"/>
           </a:p>
@@ -2363,7 +2367,7 @@
           <a:p>
             <a:fld id="{9AA7D095-A676-4F6B-9416-D65D798F5244}" type="datetimeFigureOut">
               <a:rPr lang="de-DE" smtClean="0"/>
-              <a:t>24.02.2015</a:t>
+              <a:t>03.03.2015</a:t>
             </a:fld>
             <a:endParaRPr lang="de-DE"/>
           </a:p>
@@ -2576,7 +2580,7 @@
           <a:p>
             <a:fld id="{9AA7D095-A676-4F6B-9416-D65D798F5244}" type="datetimeFigureOut">
               <a:rPr lang="de-DE" smtClean="0"/>
-              <a:t>24.02.2015</a:t>
+              <a:t>03.03.2015</a:t>
             </a:fld>
             <a:endParaRPr lang="de-DE"/>
           </a:p>
@@ -3164,6 +3168,2788 @@
     <p:extLst>
       <p:ext uri="{BB962C8B-B14F-4D97-AF65-F5344CB8AC3E}">
         <p14:creationId xmlns:p14="http://schemas.microsoft.com/office/powerpoint/2010/main" val="3688448767"/>
+      </p:ext>
+    </p:extLst>
+  </p:cSld>
+  <p:clrMapOvr>
+    <a:masterClrMapping/>
+  </p:clrMapOvr>
+  <p:timing>
+    <p:tnLst>
+      <p:par>
+        <p:cTn id="1" dur="indefinite" restart="never" nodeType="tmRoot"/>
+      </p:par>
+    </p:tnLst>
+  </p:timing>
+</p:sld>
+</file>
+
+<file path=ppt/slides/slide10.xml><?xml version="1.0" encoding="utf-8"?>
+<p:sld xmlns:a="http://schemas.openxmlformats.org/drawingml/2006/main" xmlns:r="http://schemas.openxmlformats.org/officeDocument/2006/relationships" xmlns:p="http://schemas.openxmlformats.org/presentationml/2006/main">
+  <p:cSld>
+    <p:spTree>
+      <p:nvGrpSpPr>
+        <p:cNvPr id="1" name=""/>
+        <p:cNvGrpSpPr/>
+        <p:nvPr/>
+      </p:nvGrpSpPr>
+      <p:grpSpPr>
+        <a:xfrm>
+          <a:off x="0" y="0"/>
+          <a:ext cx="0" cy="0"/>
+          <a:chOff x="0" y="0"/>
+          <a:chExt cx="0" cy="0"/>
+        </a:xfrm>
+      </p:grpSpPr>
+      <p:grpSp>
+        <p:nvGrpSpPr>
+          <p:cNvPr id="15" name="Group 14"/>
+          <p:cNvGrpSpPr/>
+          <p:nvPr/>
+        </p:nvGrpSpPr>
+        <p:grpSpPr>
+          <a:xfrm>
+            <a:off x="1601888" y="2868521"/>
+            <a:ext cx="1496257" cy="679282"/>
+            <a:chOff x="6448425" y="3933827"/>
+            <a:chExt cx="2628900" cy="1409700"/>
+          </a:xfrm>
+        </p:grpSpPr>
+        <p:sp>
+          <p:nvSpPr>
+            <p:cNvPr id="14" name="Rounded Rectangle 13"/>
+            <p:cNvSpPr/>
+            <p:nvPr/>
+          </p:nvSpPr>
+          <p:spPr>
+            <a:xfrm>
+              <a:off x="6448425" y="3933827"/>
+              <a:ext cx="2628900" cy="1409700"/>
+            </a:xfrm>
+            <a:prstGeom prst="roundRect">
+              <a:avLst/>
+            </a:prstGeom>
+            <a:solidFill>
+              <a:schemeClr val="accent6">
+                <a:lumMod val="75000"/>
+              </a:schemeClr>
+            </a:solidFill>
+            <a:ln w="76200">
+              <a:solidFill>
+                <a:schemeClr val="accent6">
+                  <a:lumMod val="50000"/>
+                </a:schemeClr>
+              </a:solidFill>
+            </a:ln>
+          </p:spPr>
+          <p:style>
+            <a:lnRef idx="2">
+              <a:schemeClr val="accent1">
+                <a:shade val="50000"/>
+              </a:schemeClr>
+            </a:lnRef>
+            <a:fillRef idx="1">
+              <a:schemeClr val="accent1"/>
+            </a:fillRef>
+            <a:effectRef idx="0">
+              <a:schemeClr val="accent1"/>
+            </a:effectRef>
+            <a:fontRef idx="minor">
+              <a:schemeClr val="lt1"/>
+            </a:fontRef>
+          </p:style>
+          <p:txBody>
+            <a:bodyPr rtlCol="0" anchor="ctr"/>
+            <a:lstStyle/>
+            <a:p>
+              <a:pPr algn="ctr"/>
+              <a:endParaRPr lang="de-DE"/>
+            </a:p>
+          </p:txBody>
+        </p:sp>
+        <p:sp>
+          <p:nvSpPr>
+            <p:cNvPr id="13" name="TextBox 12"/>
+            <p:cNvSpPr txBox="1"/>
+            <p:nvPr/>
+          </p:nvSpPr>
+          <p:spPr>
+            <a:xfrm>
+              <a:off x="6513804" y="4239101"/>
+              <a:ext cx="2501164" cy="830340"/>
+            </a:xfrm>
+            <a:prstGeom prst="rect">
+              <a:avLst/>
+            </a:prstGeom>
+            <a:noFill/>
+            <a:ln w="76200">
+              <a:noFill/>
+            </a:ln>
+          </p:spPr>
+          <p:txBody>
+            <a:bodyPr wrap="square" rtlCol="0">
+              <a:spAutoFit/>
+            </a:bodyPr>
+            <a:lstStyle/>
+            <a:p>
+              <a:pPr algn="ctr"/>
+              <a:r>
+                <a:rPr lang="en-US" sz="2000" b="1" dirty="0">
+                  <a:solidFill>
+                    <a:schemeClr val="bg1"/>
+                  </a:solidFill>
+                </a:rPr>
+                <a:t>Payload</a:t>
+              </a:r>
+              <a:endParaRPr lang="de-DE" sz="2400" b="1" dirty="0">
+                <a:solidFill>
+                  <a:schemeClr val="bg1"/>
+                </a:solidFill>
+              </a:endParaRPr>
+            </a:p>
+          </p:txBody>
+        </p:sp>
+      </p:grpSp>
+      <p:grpSp>
+        <p:nvGrpSpPr>
+          <p:cNvPr id="2" name="Group 1"/>
+          <p:cNvGrpSpPr/>
+          <p:nvPr/>
+        </p:nvGrpSpPr>
+        <p:grpSpPr>
+          <a:xfrm>
+            <a:off x="679928" y="36204"/>
+            <a:ext cx="3320724" cy="2215991"/>
+            <a:chOff x="-9574" y="-399819"/>
+            <a:chExt cx="3320724" cy="2215991"/>
+          </a:xfrm>
+        </p:grpSpPr>
+        <p:sp>
+          <p:nvSpPr>
+            <p:cNvPr id="5" name="Rectangle 4"/>
+            <p:cNvSpPr/>
+            <p:nvPr/>
+          </p:nvSpPr>
+          <p:spPr>
+            <a:xfrm>
+              <a:off x="-9574" y="-399819"/>
+              <a:ext cx="3320724" cy="2215991"/>
+            </a:xfrm>
+            <a:prstGeom prst="rect">
+              <a:avLst/>
+            </a:prstGeom>
+            <a:ln>
+              <a:noFill/>
+            </a:ln>
+          </p:spPr>
+          <p:txBody>
+            <a:bodyPr wrap="square">
+              <a:spAutoFit/>
+            </a:bodyPr>
+            <a:lstStyle/>
+            <a:p>
+              <a:pPr algn="ctr"/>
+              <a:r>
+                <a:rPr lang="de-DE" sz="13800" dirty="0">
+                  <a:solidFill>
+                    <a:schemeClr val="tx2">
+                      <a:lumMod val="60000"/>
+                      <a:lumOff val="40000"/>
+                    </a:schemeClr>
+                  </a:solidFill>
+                  <a:latin typeface="FontAwesome" pitchFamily="2" charset="0"/>
+                </a:rPr>
+                <a:t></a:t>
+              </a:r>
+              <a:endParaRPr lang="de-DE" sz="13800" dirty="0">
+                <a:solidFill>
+                  <a:schemeClr val="tx2">
+                    <a:lumMod val="60000"/>
+                    <a:lumOff val="40000"/>
+                  </a:schemeClr>
+                </a:solidFill>
+              </a:endParaRPr>
+            </a:p>
+          </p:txBody>
+        </p:sp>
+        <p:sp>
+          <p:nvSpPr>
+            <p:cNvPr id="28" name="TextBox 27"/>
+            <p:cNvSpPr txBox="1"/>
+            <p:nvPr/>
+          </p:nvSpPr>
+          <p:spPr>
+            <a:xfrm>
+              <a:off x="150461" y="418618"/>
+              <a:ext cx="2953724" cy="707886"/>
+            </a:xfrm>
+            <a:prstGeom prst="rect">
+              <a:avLst/>
+            </a:prstGeom>
+            <a:noFill/>
+          </p:spPr>
+          <p:txBody>
+            <a:bodyPr wrap="square" rtlCol="0">
+              <a:spAutoFit/>
+            </a:bodyPr>
+            <a:lstStyle/>
+            <a:p>
+              <a:pPr algn="ctr"/>
+              <a:r>
+                <a:rPr lang="en-US" sz="2000" b="1" dirty="0" err="1">
+                  <a:solidFill>
+                    <a:schemeClr val="bg1"/>
+                  </a:solidFill>
+                </a:rPr>
+                <a:t>Boxfuse</a:t>
+              </a:r>
+              <a:r>
+                <a:rPr lang="en-US" sz="2000" b="1" dirty="0">
+                  <a:solidFill>
+                    <a:schemeClr val="bg1"/>
+                  </a:solidFill>
+                </a:rPr>
+                <a:t/>
+              </a:r>
+              <a:br>
+                <a:rPr lang="en-US" sz="2000" b="1" dirty="0">
+                  <a:solidFill>
+                    <a:schemeClr val="bg1"/>
+                  </a:solidFill>
+                </a:rPr>
+              </a:br>
+              <a:r>
+                <a:rPr lang="en-US" sz="2000" b="1" dirty="0">
+                  <a:solidFill>
+                    <a:schemeClr val="bg1"/>
+                  </a:solidFill>
+                </a:rPr>
+                <a:t>Inventory</a:t>
+              </a:r>
+              <a:endParaRPr lang="de-DE" sz="2000" b="1" dirty="0">
+                <a:solidFill>
+                  <a:schemeClr val="bg1"/>
+                </a:solidFill>
+              </a:endParaRPr>
+            </a:p>
+          </p:txBody>
+        </p:sp>
+      </p:grpSp>
+      <p:grpSp>
+        <p:nvGrpSpPr>
+          <p:cNvPr id="35" name="Group 34"/>
+          <p:cNvGrpSpPr/>
+          <p:nvPr/>
+        </p:nvGrpSpPr>
+        <p:grpSpPr>
+          <a:xfrm>
+            <a:off x="3325896" y="2504190"/>
+            <a:ext cx="1457473" cy="673166"/>
+            <a:chOff x="2334271" y="318043"/>
+            <a:chExt cx="1457473" cy="673166"/>
+          </a:xfrm>
+        </p:grpSpPr>
+        <p:cxnSp>
+          <p:nvCxnSpPr>
+            <p:cNvPr id="36" name="Straight Arrow Connector 35"/>
+            <p:cNvCxnSpPr/>
+            <p:nvPr/>
+          </p:nvCxnSpPr>
+          <p:spPr>
+            <a:xfrm flipV="1">
+              <a:off x="2346123" y="980728"/>
+              <a:ext cx="1445621" cy="10481"/>
+            </a:xfrm>
+            <a:prstGeom prst="straightConnector1">
+              <a:avLst/>
+            </a:prstGeom>
+            <a:ln w="142875">
+              <a:solidFill>
+                <a:schemeClr val="tx1">
+                  <a:lumMod val="50000"/>
+                  <a:lumOff val="50000"/>
+                </a:schemeClr>
+              </a:solidFill>
+              <a:tailEnd type="triangle"/>
+            </a:ln>
+          </p:spPr>
+          <p:style>
+            <a:lnRef idx="1">
+              <a:schemeClr val="accent1"/>
+            </a:lnRef>
+            <a:fillRef idx="0">
+              <a:schemeClr val="accent1"/>
+            </a:fillRef>
+            <a:effectRef idx="0">
+              <a:schemeClr val="accent1"/>
+            </a:effectRef>
+            <a:fontRef idx="minor">
+              <a:schemeClr val="tx1"/>
+            </a:fontRef>
+          </p:style>
+        </p:cxnSp>
+        <p:sp>
+          <p:nvSpPr>
+            <p:cNvPr id="37" name="TextBox 36"/>
+            <p:cNvSpPr txBox="1"/>
+            <p:nvPr/>
+          </p:nvSpPr>
+          <p:spPr>
+            <a:xfrm>
+              <a:off x="2334271" y="318043"/>
+              <a:ext cx="1408522" cy="523220"/>
+            </a:xfrm>
+            <a:prstGeom prst="rect">
+              <a:avLst/>
+            </a:prstGeom>
+            <a:noFill/>
+          </p:spPr>
+          <p:txBody>
+            <a:bodyPr wrap="square" rtlCol="0">
+              <a:spAutoFit/>
+            </a:bodyPr>
+            <a:lstStyle/>
+            <a:p>
+              <a:pPr algn="ctr"/>
+              <a:r>
+                <a:rPr lang="en-US" sz="2800" b="1" dirty="0"/>
+                <a:t>fuse</a:t>
+              </a:r>
+              <a:endParaRPr lang="de-DE" sz="2800" b="1" dirty="0"/>
+            </a:p>
+          </p:txBody>
+        </p:sp>
+      </p:grpSp>
+      <p:sp>
+        <p:nvSpPr>
+          <p:cNvPr id="38" name="Rounded Rectangle 25"/>
+          <p:cNvSpPr/>
+          <p:nvPr/>
+        </p:nvSpPr>
+        <p:spPr>
+          <a:xfrm>
+            <a:off x="4959372" y="2128983"/>
+            <a:ext cx="1610387" cy="1610382"/>
+          </a:xfrm>
+          <a:prstGeom prst="ellipse">
+            <a:avLst/>
+          </a:prstGeom>
+          <a:solidFill>
+            <a:schemeClr val="accent1">
+              <a:lumMod val="75000"/>
+            </a:schemeClr>
+          </a:solidFill>
+          <a:ln w="76200">
+            <a:solidFill>
+              <a:schemeClr val="accent1">
+                <a:lumMod val="50000"/>
+              </a:schemeClr>
+            </a:solidFill>
+          </a:ln>
+        </p:spPr>
+        <p:style>
+          <a:lnRef idx="2">
+            <a:schemeClr val="accent1">
+              <a:shade val="50000"/>
+            </a:schemeClr>
+          </a:lnRef>
+          <a:fillRef idx="1">
+            <a:schemeClr val="accent1"/>
+          </a:fillRef>
+          <a:effectRef idx="0">
+            <a:schemeClr val="accent1"/>
+          </a:effectRef>
+          <a:fontRef idx="minor">
+            <a:schemeClr val="lt1"/>
+          </a:fontRef>
+        </p:style>
+        <p:txBody>
+          <a:bodyPr rtlCol="0" anchor="ctr"/>
+          <a:lstStyle/>
+          <a:p>
+            <a:pPr algn="ctr"/>
+            <a:r>
+              <a:rPr lang="en-US" sz="2000" b="1" dirty="0"/>
+              <a:t>Image</a:t>
+            </a:r>
+            <a:endParaRPr lang="de-DE" sz="2000" b="1" dirty="0"/>
+          </a:p>
+        </p:txBody>
+      </p:sp>
+      <p:grpSp>
+        <p:nvGrpSpPr>
+          <p:cNvPr id="58" name="Group 57"/>
+          <p:cNvGrpSpPr/>
+          <p:nvPr/>
+        </p:nvGrpSpPr>
+        <p:grpSpPr>
+          <a:xfrm rot="1430114">
+            <a:off x="3392156" y="1329327"/>
+            <a:ext cx="1683509" cy="673166"/>
+            <a:chOff x="2334271" y="318043"/>
+            <a:chExt cx="1457473" cy="673166"/>
+          </a:xfrm>
+        </p:grpSpPr>
+        <p:cxnSp>
+          <p:nvCxnSpPr>
+            <p:cNvPr id="59" name="Straight Arrow Connector 58"/>
+            <p:cNvCxnSpPr/>
+            <p:nvPr/>
+          </p:nvCxnSpPr>
+          <p:spPr>
+            <a:xfrm flipV="1">
+              <a:off x="2346123" y="980728"/>
+              <a:ext cx="1445621" cy="10481"/>
+            </a:xfrm>
+            <a:prstGeom prst="straightConnector1">
+              <a:avLst/>
+            </a:prstGeom>
+            <a:ln w="142875">
+              <a:solidFill>
+                <a:schemeClr val="tx1">
+                  <a:lumMod val="50000"/>
+                  <a:lumOff val="50000"/>
+                </a:schemeClr>
+              </a:solidFill>
+              <a:tailEnd type="triangle"/>
+            </a:ln>
+          </p:spPr>
+          <p:style>
+            <a:lnRef idx="1">
+              <a:schemeClr val="accent1"/>
+            </a:lnRef>
+            <a:fillRef idx="0">
+              <a:schemeClr val="accent1"/>
+            </a:fillRef>
+            <a:effectRef idx="0">
+              <a:schemeClr val="accent1"/>
+            </a:effectRef>
+            <a:fontRef idx="minor">
+              <a:schemeClr val="tx1"/>
+            </a:fontRef>
+          </p:style>
+        </p:cxnSp>
+        <p:sp>
+          <p:nvSpPr>
+            <p:cNvPr id="60" name="TextBox 59"/>
+            <p:cNvSpPr txBox="1"/>
+            <p:nvPr/>
+          </p:nvSpPr>
+          <p:spPr>
+            <a:xfrm>
+              <a:off x="2334271" y="318043"/>
+              <a:ext cx="1408522" cy="523220"/>
+            </a:xfrm>
+            <a:prstGeom prst="rect">
+              <a:avLst/>
+            </a:prstGeom>
+            <a:noFill/>
+          </p:spPr>
+          <p:txBody>
+            <a:bodyPr wrap="square" rtlCol="0">
+              <a:spAutoFit/>
+            </a:bodyPr>
+            <a:lstStyle/>
+            <a:p>
+              <a:pPr algn="ctr"/>
+              <a:endParaRPr lang="de-DE" sz="2800" b="1" dirty="0"/>
+            </a:p>
+          </p:txBody>
+        </p:sp>
+      </p:grpSp>
+      <p:sp>
+        <p:nvSpPr>
+          <p:cNvPr id="62" name="Rounded Rectangle 25"/>
+          <p:cNvSpPr/>
+          <p:nvPr/>
+        </p:nvSpPr>
+        <p:spPr>
+          <a:xfrm>
+            <a:off x="9111242" y="992161"/>
+            <a:ext cx="1610387" cy="1610382"/>
+          </a:xfrm>
+          <a:prstGeom prst="ellipse">
+            <a:avLst/>
+          </a:prstGeom>
+          <a:solidFill>
+            <a:schemeClr val="accent1">
+              <a:lumMod val="75000"/>
+            </a:schemeClr>
+          </a:solidFill>
+          <a:ln w="76200">
+            <a:solidFill>
+              <a:schemeClr val="accent1">
+                <a:lumMod val="50000"/>
+              </a:schemeClr>
+            </a:solidFill>
+          </a:ln>
+        </p:spPr>
+        <p:style>
+          <a:lnRef idx="2">
+            <a:schemeClr val="accent1">
+              <a:shade val="50000"/>
+            </a:schemeClr>
+          </a:lnRef>
+          <a:fillRef idx="1">
+            <a:schemeClr val="accent1"/>
+          </a:fillRef>
+          <a:effectRef idx="0">
+            <a:schemeClr val="accent1"/>
+          </a:effectRef>
+          <a:fontRef idx="minor">
+            <a:schemeClr val="lt1"/>
+          </a:fontRef>
+        </p:style>
+        <p:txBody>
+          <a:bodyPr rtlCol="0" anchor="ctr"/>
+          <a:lstStyle/>
+          <a:p>
+            <a:pPr algn="ctr"/>
+            <a:r>
+              <a:rPr lang="en-US" sz="2000" b="1" dirty="0"/>
+              <a:t>Image</a:t>
+            </a:r>
+            <a:endParaRPr lang="de-DE" sz="2000" b="1" dirty="0"/>
+          </a:p>
+        </p:txBody>
+      </p:sp>
+      <p:sp>
+        <p:nvSpPr>
+          <p:cNvPr id="68" name="Rounded Rectangle 67"/>
+          <p:cNvSpPr/>
+          <p:nvPr/>
+        </p:nvSpPr>
+        <p:spPr>
+          <a:xfrm>
+            <a:off x="8798011" y="801976"/>
+            <a:ext cx="3991231" cy="2015366"/>
+          </a:xfrm>
+          <a:prstGeom prst="roundRect">
+            <a:avLst/>
+          </a:prstGeom>
+          <a:noFill/>
+          <a:ln w="57150">
+            <a:solidFill>
+              <a:schemeClr val="bg1">
+                <a:lumMod val="50000"/>
+              </a:schemeClr>
+            </a:solidFill>
+            <a:prstDash val="dash"/>
+          </a:ln>
+        </p:spPr>
+        <p:style>
+          <a:lnRef idx="2">
+            <a:schemeClr val="accent1">
+              <a:shade val="50000"/>
+            </a:schemeClr>
+          </a:lnRef>
+          <a:fillRef idx="1">
+            <a:schemeClr val="accent1"/>
+          </a:fillRef>
+          <a:effectRef idx="0">
+            <a:schemeClr val="accent1"/>
+          </a:effectRef>
+          <a:fontRef idx="minor">
+            <a:schemeClr val="lt1"/>
+          </a:fontRef>
+        </p:style>
+        <p:txBody>
+          <a:bodyPr rtlCol="0" anchor="ctr"/>
+          <a:lstStyle/>
+          <a:p>
+            <a:pPr algn="ctr"/>
+            <a:endParaRPr lang="de-DE"/>
+          </a:p>
+        </p:txBody>
+      </p:sp>
+      <p:sp>
+        <p:nvSpPr>
+          <p:cNvPr id="80" name="TextBox 79"/>
+          <p:cNvSpPr txBox="1"/>
+          <p:nvPr/>
+        </p:nvSpPr>
+        <p:spPr>
+          <a:xfrm>
+            <a:off x="10065756" y="232140"/>
+            <a:ext cx="1408522" cy="523220"/>
+          </a:xfrm>
+          <a:prstGeom prst="rect">
+            <a:avLst/>
+          </a:prstGeom>
+          <a:noFill/>
+        </p:spPr>
+        <p:txBody>
+          <a:bodyPr wrap="square" rtlCol="0">
+            <a:spAutoFit/>
+          </a:bodyPr>
+          <a:lstStyle/>
+          <a:p>
+            <a:pPr algn="ctr"/>
+            <a:r>
+              <a:rPr lang="en-US" sz="2800" b="1" dirty="0" err="1"/>
+              <a:t>ls</a:t>
+            </a:r>
+            <a:endParaRPr lang="de-DE" sz="2800" b="1" dirty="0"/>
+          </a:p>
+        </p:txBody>
+      </p:sp>
+      <p:sp>
+        <p:nvSpPr>
+          <p:cNvPr id="93" name="Rounded Rectangle 25"/>
+          <p:cNvSpPr/>
+          <p:nvPr/>
+        </p:nvSpPr>
+        <p:spPr>
+          <a:xfrm>
+            <a:off x="10944162" y="983924"/>
+            <a:ext cx="1610387" cy="1610382"/>
+          </a:xfrm>
+          <a:prstGeom prst="ellipse">
+            <a:avLst/>
+          </a:prstGeom>
+          <a:solidFill>
+            <a:schemeClr val="accent1">
+              <a:lumMod val="75000"/>
+            </a:schemeClr>
+          </a:solidFill>
+          <a:ln w="76200">
+            <a:solidFill>
+              <a:schemeClr val="accent1">
+                <a:lumMod val="50000"/>
+              </a:schemeClr>
+            </a:solidFill>
+          </a:ln>
+        </p:spPr>
+        <p:style>
+          <a:lnRef idx="2">
+            <a:schemeClr val="accent1">
+              <a:shade val="50000"/>
+            </a:schemeClr>
+          </a:lnRef>
+          <a:fillRef idx="1">
+            <a:schemeClr val="accent1"/>
+          </a:fillRef>
+          <a:effectRef idx="0">
+            <a:schemeClr val="accent1"/>
+          </a:effectRef>
+          <a:fontRef idx="minor">
+            <a:schemeClr val="lt1"/>
+          </a:fontRef>
+        </p:style>
+        <p:txBody>
+          <a:bodyPr rtlCol="0" anchor="ctr"/>
+          <a:lstStyle/>
+          <a:p>
+            <a:pPr algn="ctr"/>
+            <a:r>
+              <a:rPr lang="en-US" sz="2000" b="1" dirty="0"/>
+              <a:t>Image</a:t>
+            </a:r>
+            <a:endParaRPr lang="de-DE" sz="2000" b="1" dirty="0"/>
+          </a:p>
+        </p:txBody>
+      </p:sp>
+      <p:sp>
+        <p:nvSpPr>
+          <p:cNvPr id="95" name="Rounded Rectangle 25"/>
+          <p:cNvSpPr/>
+          <p:nvPr/>
+        </p:nvSpPr>
+        <p:spPr>
+          <a:xfrm>
+            <a:off x="4366248" y="4999077"/>
+            <a:ext cx="1610387" cy="1610382"/>
+          </a:xfrm>
+          <a:prstGeom prst="ellipse">
+            <a:avLst/>
+          </a:prstGeom>
+          <a:solidFill>
+            <a:schemeClr val="accent1">
+              <a:lumMod val="20000"/>
+              <a:lumOff val="80000"/>
+            </a:schemeClr>
+          </a:solidFill>
+          <a:ln w="76200">
+            <a:solidFill>
+              <a:schemeClr val="accent1">
+                <a:lumMod val="40000"/>
+                <a:lumOff val="60000"/>
+              </a:schemeClr>
+            </a:solidFill>
+          </a:ln>
+        </p:spPr>
+        <p:style>
+          <a:lnRef idx="2">
+            <a:schemeClr val="accent1">
+              <a:shade val="50000"/>
+            </a:schemeClr>
+          </a:lnRef>
+          <a:fillRef idx="1">
+            <a:schemeClr val="accent1"/>
+          </a:fillRef>
+          <a:effectRef idx="0">
+            <a:schemeClr val="accent1"/>
+          </a:effectRef>
+          <a:fontRef idx="minor">
+            <a:schemeClr val="lt1"/>
+          </a:fontRef>
+        </p:style>
+        <p:txBody>
+          <a:bodyPr rtlCol="0" anchor="ctr"/>
+          <a:lstStyle/>
+          <a:p>
+            <a:pPr algn="ctr"/>
+            <a:r>
+              <a:rPr lang="en-US" sz="2000" b="1" dirty="0" smtClean="0"/>
+              <a:t>Image</a:t>
+            </a:r>
+            <a:endParaRPr lang="de-DE" sz="2000" b="1" dirty="0"/>
+          </a:p>
+        </p:txBody>
+      </p:sp>
+      <p:sp>
+        <p:nvSpPr>
+          <p:cNvPr id="96" name="Cross 95"/>
+          <p:cNvSpPr/>
+          <p:nvPr/>
+        </p:nvSpPr>
+        <p:spPr>
+          <a:xfrm rot="2669759">
+            <a:off x="4059360" y="4723055"/>
+            <a:ext cx="2229507" cy="2238141"/>
+          </a:xfrm>
+          <a:prstGeom prst="plus">
+            <a:avLst>
+              <a:gd name="adj" fmla="val 47174"/>
+            </a:avLst>
+          </a:prstGeom>
+          <a:solidFill>
+            <a:srgbClr val="FF0000"/>
+          </a:solidFill>
+          <a:ln>
+            <a:solidFill>
+              <a:srgbClr val="C00000"/>
+            </a:solidFill>
+          </a:ln>
+        </p:spPr>
+        <p:style>
+          <a:lnRef idx="2">
+            <a:schemeClr val="accent1">
+              <a:shade val="50000"/>
+            </a:schemeClr>
+          </a:lnRef>
+          <a:fillRef idx="1">
+            <a:schemeClr val="accent1"/>
+          </a:fillRef>
+          <a:effectRef idx="0">
+            <a:schemeClr val="accent1"/>
+          </a:effectRef>
+          <a:fontRef idx="minor">
+            <a:schemeClr val="lt1"/>
+          </a:fontRef>
+        </p:style>
+        <p:txBody>
+          <a:bodyPr rtlCol="0" anchor="ctr"/>
+          <a:lstStyle/>
+          <a:p>
+            <a:pPr algn="ctr"/>
+            <a:endParaRPr lang="de-DE"/>
+          </a:p>
+        </p:txBody>
+      </p:sp>
+      <p:sp>
+        <p:nvSpPr>
+          <p:cNvPr id="97" name="TextBox 96"/>
+          <p:cNvSpPr txBox="1"/>
+          <p:nvPr/>
+        </p:nvSpPr>
+        <p:spPr>
+          <a:xfrm>
+            <a:off x="4465408" y="4955977"/>
+            <a:ext cx="1408522" cy="523220"/>
+          </a:xfrm>
+          <a:prstGeom prst="rect">
+            <a:avLst/>
+          </a:prstGeom>
+          <a:noFill/>
+        </p:spPr>
+        <p:txBody>
+          <a:bodyPr wrap="square" rtlCol="0">
+            <a:spAutoFit/>
+          </a:bodyPr>
+          <a:lstStyle/>
+          <a:p>
+            <a:pPr algn="ctr"/>
+            <a:r>
+              <a:rPr lang="en-US" sz="2800" b="1" dirty="0" err="1"/>
+              <a:t>rm</a:t>
+            </a:r>
+            <a:endParaRPr lang="de-DE" sz="2800" b="1" dirty="0"/>
+          </a:p>
+        </p:txBody>
+      </p:sp>
+    </p:spTree>
+    <p:extLst>
+      <p:ext uri="{BB962C8B-B14F-4D97-AF65-F5344CB8AC3E}">
+        <p14:creationId xmlns:p14="http://schemas.microsoft.com/office/powerpoint/2010/main" val="428921464"/>
+      </p:ext>
+    </p:extLst>
+  </p:cSld>
+  <p:clrMapOvr>
+    <a:masterClrMapping/>
+  </p:clrMapOvr>
+  <p:timing>
+    <p:tnLst>
+      <p:par>
+        <p:cTn id="1" dur="indefinite" restart="never" nodeType="tmRoot"/>
+      </p:par>
+    </p:tnLst>
+  </p:timing>
+</p:sld>
+</file>
+
+<file path=ppt/slides/slide11.xml><?xml version="1.0" encoding="utf-8"?>
+<p:sld xmlns:a="http://schemas.openxmlformats.org/drawingml/2006/main" xmlns:r="http://schemas.openxmlformats.org/officeDocument/2006/relationships" xmlns:p="http://schemas.openxmlformats.org/presentationml/2006/main">
+  <p:cSld>
+    <p:spTree>
+      <p:nvGrpSpPr>
+        <p:cNvPr id="1" name=""/>
+        <p:cNvGrpSpPr/>
+        <p:nvPr/>
+      </p:nvGrpSpPr>
+      <p:grpSpPr>
+        <a:xfrm>
+          <a:off x="0" y="0"/>
+          <a:ext cx="0" cy="0"/>
+          <a:chOff x="0" y="0"/>
+          <a:chExt cx="0" cy="0"/>
+        </a:xfrm>
+      </p:grpSpPr>
+      <p:pic>
+        <p:nvPicPr>
+          <p:cNvPr id="80" name="Picture 79"/>
+          <p:cNvPicPr>
+            <a:picLocks noChangeAspect="1"/>
+          </p:cNvPicPr>
+          <p:nvPr/>
+        </p:nvPicPr>
+        <p:blipFill>
+          <a:blip r:embed="rId2"/>
+          <a:stretch>
+            <a:fillRect/>
+          </a:stretch>
+        </p:blipFill>
+        <p:spPr>
+          <a:xfrm>
+            <a:off x="7906395" y="4047093"/>
+            <a:ext cx="1655807" cy="705924"/>
+          </a:xfrm>
+          <a:prstGeom prst="rect">
+            <a:avLst/>
+          </a:prstGeom>
+        </p:spPr>
+      </p:pic>
+      <p:pic>
+        <p:nvPicPr>
+          <p:cNvPr id="6" name="Picture 5"/>
+          <p:cNvPicPr>
+            <a:picLocks noChangeAspect="1"/>
+          </p:cNvPicPr>
+          <p:nvPr/>
+        </p:nvPicPr>
+        <p:blipFill>
+          <a:blip r:embed="rId2"/>
+          <a:stretch>
+            <a:fillRect/>
+          </a:stretch>
+        </p:blipFill>
+        <p:spPr>
+          <a:xfrm>
+            <a:off x="3985184" y="1991752"/>
+            <a:ext cx="1655807" cy="705924"/>
+          </a:xfrm>
+          <a:prstGeom prst="rect">
+            <a:avLst/>
+          </a:prstGeom>
+        </p:spPr>
+      </p:pic>
+      <p:sp>
+        <p:nvSpPr>
+          <p:cNvPr id="79" name="Rounded Rectangle 75"/>
+          <p:cNvSpPr/>
+          <p:nvPr/>
+        </p:nvSpPr>
+        <p:spPr>
+          <a:xfrm>
+            <a:off x="8059356" y="2517568"/>
+            <a:ext cx="1441656" cy="1514439"/>
+          </a:xfrm>
+          <a:prstGeom prst="rect">
+            <a:avLst/>
+          </a:prstGeom>
+          <a:solidFill>
+            <a:schemeClr val="accent2">
+              <a:lumMod val="20000"/>
+              <a:lumOff val="80000"/>
+            </a:schemeClr>
+          </a:solidFill>
+          <a:ln w="76200">
+            <a:solidFill>
+              <a:schemeClr val="accent2">
+                <a:lumMod val="40000"/>
+                <a:lumOff val="60000"/>
+              </a:schemeClr>
+            </a:solidFill>
+          </a:ln>
+        </p:spPr>
+        <p:style>
+          <a:lnRef idx="2">
+            <a:schemeClr val="accent1">
+              <a:shade val="50000"/>
+            </a:schemeClr>
+          </a:lnRef>
+          <a:fillRef idx="1">
+            <a:schemeClr val="accent1"/>
+          </a:fillRef>
+          <a:effectRef idx="0">
+            <a:schemeClr val="accent1"/>
+          </a:effectRef>
+          <a:fontRef idx="minor">
+            <a:schemeClr val="lt1"/>
+          </a:fontRef>
+        </p:style>
+        <p:txBody>
+          <a:bodyPr rtlCol="0" anchor="ctr"/>
+          <a:lstStyle/>
+          <a:p>
+            <a:pPr algn="ctr"/>
+            <a:r>
+              <a:rPr lang="en-US" sz="2000" b="1" dirty="0"/>
+              <a:t>Instance</a:t>
+            </a:r>
+            <a:endParaRPr lang="de-DE" sz="2000" b="1" dirty="0"/>
+          </a:p>
+        </p:txBody>
+      </p:sp>
+      <p:sp>
+        <p:nvSpPr>
+          <p:cNvPr id="38" name="Rounded Rectangle 25"/>
+          <p:cNvSpPr/>
+          <p:nvPr/>
+        </p:nvSpPr>
+        <p:spPr>
+          <a:xfrm>
+            <a:off x="276162" y="361967"/>
+            <a:ext cx="1610387" cy="1610382"/>
+          </a:xfrm>
+          <a:prstGeom prst="ellipse">
+            <a:avLst/>
+          </a:prstGeom>
+          <a:solidFill>
+            <a:schemeClr val="accent1">
+              <a:lumMod val="75000"/>
+            </a:schemeClr>
+          </a:solidFill>
+          <a:ln w="76200">
+            <a:solidFill>
+              <a:schemeClr val="accent1">
+                <a:lumMod val="50000"/>
+              </a:schemeClr>
+            </a:solidFill>
+          </a:ln>
+        </p:spPr>
+        <p:style>
+          <a:lnRef idx="2">
+            <a:schemeClr val="accent1">
+              <a:shade val="50000"/>
+            </a:schemeClr>
+          </a:lnRef>
+          <a:fillRef idx="1">
+            <a:schemeClr val="accent1"/>
+          </a:fillRef>
+          <a:effectRef idx="0">
+            <a:schemeClr val="accent1"/>
+          </a:effectRef>
+          <a:fontRef idx="minor">
+            <a:schemeClr val="lt1"/>
+          </a:fontRef>
+        </p:style>
+        <p:txBody>
+          <a:bodyPr rtlCol="0" anchor="ctr"/>
+          <a:lstStyle/>
+          <a:p>
+            <a:pPr algn="ctr"/>
+            <a:r>
+              <a:rPr lang="en-US" sz="2000" b="1" dirty="0"/>
+              <a:t>Image</a:t>
+            </a:r>
+            <a:endParaRPr lang="de-DE" sz="2000" b="1" dirty="0"/>
+          </a:p>
+        </p:txBody>
+      </p:sp>
+      <p:sp>
+        <p:nvSpPr>
+          <p:cNvPr id="72" name="TextBox 71"/>
+          <p:cNvSpPr txBox="1"/>
+          <p:nvPr/>
+        </p:nvSpPr>
+        <p:spPr>
+          <a:xfrm>
+            <a:off x="8017713" y="2503194"/>
+            <a:ext cx="1506963" cy="523220"/>
+          </a:xfrm>
+          <a:prstGeom prst="rect">
+            <a:avLst/>
+          </a:prstGeom>
+          <a:noFill/>
+        </p:spPr>
+        <p:txBody>
+          <a:bodyPr wrap="square" rtlCol="0">
+            <a:spAutoFit/>
+          </a:bodyPr>
+          <a:lstStyle/>
+          <a:p>
+            <a:pPr algn="ctr"/>
+            <a:r>
+              <a:rPr lang="en-US" sz="2800" b="1" dirty="0"/>
+              <a:t>kill</a:t>
+            </a:r>
+            <a:endParaRPr lang="de-DE" sz="2800" b="1" dirty="0"/>
+          </a:p>
+        </p:txBody>
+      </p:sp>
+      <p:sp>
+        <p:nvSpPr>
+          <p:cNvPr id="73" name="Rounded Rectangle 72"/>
+          <p:cNvSpPr/>
+          <p:nvPr/>
+        </p:nvSpPr>
+        <p:spPr>
+          <a:xfrm>
+            <a:off x="827903" y="3553413"/>
+            <a:ext cx="3707027" cy="2031842"/>
+          </a:xfrm>
+          <a:prstGeom prst="roundRect">
+            <a:avLst/>
+          </a:prstGeom>
+          <a:noFill/>
+          <a:ln w="57150">
+            <a:solidFill>
+              <a:schemeClr val="bg1">
+                <a:lumMod val="50000"/>
+              </a:schemeClr>
+            </a:solidFill>
+            <a:prstDash val="dash"/>
+          </a:ln>
+        </p:spPr>
+        <p:style>
+          <a:lnRef idx="2">
+            <a:schemeClr val="accent1">
+              <a:shade val="50000"/>
+            </a:schemeClr>
+          </a:lnRef>
+          <a:fillRef idx="1">
+            <a:schemeClr val="accent1"/>
+          </a:fillRef>
+          <a:effectRef idx="0">
+            <a:schemeClr val="accent1"/>
+          </a:effectRef>
+          <a:fontRef idx="minor">
+            <a:schemeClr val="lt1"/>
+          </a:fontRef>
+        </p:style>
+        <p:txBody>
+          <a:bodyPr rtlCol="0" anchor="ctr"/>
+          <a:lstStyle/>
+          <a:p>
+            <a:pPr algn="ctr"/>
+            <a:endParaRPr lang="de-DE"/>
+          </a:p>
+        </p:txBody>
+      </p:sp>
+      <p:sp>
+        <p:nvSpPr>
+          <p:cNvPr id="74" name="TextBox 73"/>
+          <p:cNvSpPr txBox="1"/>
+          <p:nvPr/>
+        </p:nvSpPr>
+        <p:spPr>
+          <a:xfrm>
+            <a:off x="2052136" y="2993982"/>
+            <a:ext cx="1408522" cy="523220"/>
+          </a:xfrm>
+          <a:prstGeom prst="rect">
+            <a:avLst/>
+          </a:prstGeom>
+          <a:noFill/>
+        </p:spPr>
+        <p:txBody>
+          <a:bodyPr wrap="square" rtlCol="0">
+            <a:spAutoFit/>
+          </a:bodyPr>
+          <a:lstStyle/>
+          <a:p>
+            <a:pPr algn="ctr"/>
+            <a:r>
+              <a:rPr lang="en-US" sz="2800" b="1" dirty="0" err="1"/>
+              <a:t>ps</a:t>
+            </a:r>
+            <a:endParaRPr lang="de-DE" sz="2800" b="1" dirty="0"/>
+          </a:p>
+        </p:txBody>
+      </p:sp>
+      <p:sp>
+        <p:nvSpPr>
+          <p:cNvPr id="76" name="Rounded Rectangle 75"/>
+          <p:cNvSpPr/>
+          <p:nvPr/>
+        </p:nvSpPr>
+        <p:spPr>
+          <a:xfrm>
+            <a:off x="4119494" y="431179"/>
+            <a:ext cx="1441656" cy="1514439"/>
+          </a:xfrm>
+          <a:prstGeom prst="rect">
+            <a:avLst/>
+          </a:prstGeom>
+          <a:solidFill>
+            <a:schemeClr val="accent2">
+              <a:lumMod val="75000"/>
+            </a:schemeClr>
+          </a:solidFill>
+          <a:ln w="76200">
+            <a:solidFill>
+              <a:schemeClr val="accent2">
+                <a:lumMod val="50000"/>
+              </a:schemeClr>
+            </a:solidFill>
+          </a:ln>
+        </p:spPr>
+        <p:style>
+          <a:lnRef idx="2">
+            <a:schemeClr val="accent1">
+              <a:shade val="50000"/>
+            </a:schemeClr>
+          </a:lnRef>
+          <a:fillRef idx="1">
+            <a:schemeClr val="accent1"/>
+          </a:fillRef>
+          <a:effectRef idx="0">
+            <a:schemeClr val="accent1"/>
+          </a:effectRef>
+          <a:fontRef idx="minor">
+            <a:schemeClr val="lt1"/>
+          </a:fontRef>
+        </p:style>
+        <p:txBody>
+          <a:bodyPr rtlCol="0" anchor="ctr"/>
+          <a:lstStyle/>
+          <a:p>
+            <a:pPr algn="ctr"/>
+            <a:r>
+              <a:rPr lang="en-US" sz="2000" b="1" dirty="0"/>
+              <a:t>Instance</a:t>
+            </a:r>
+            <a:endParaRPr lang="de-DE" sz="2000" b="1" dirty="0"/>
+          </a:p>
+        </p:txBody>
+      </p:sp>
+      <p:sp>
+        <p:nvSpPr>
+          <p:cNvPr id="78" name="Cross 77"/>
+          <p:cNvSpPr/>
+          <p:nvPr/>
+        </p:nvSpPr>
+        <p:spPr>
+          <a:xfrm rot="2669759">
+            <a:off x="7657099" y="2146402"/>
+            <a:ext cx="2229507" cy="2238141"/>
+          </a:xfrm>
+          <a:prstGeom prst="plus">
+            <a:avLst>
+              <a:gd name="adj" fmla="val 47174"/>
+            </a:avLst>
+          </a:prstGeom>
+          <a:solidFill>
+            <a:srgbClr val="FF0000"/>
+          </a:solidFill>
+          <a:ln>
+            <a:solidFill>
+              <a:srgbClr val="C00000"/>
+            </a:solidFill>
+          </a:ln>
+        </p:spPr>
+        <p:style>
+          <a:lnRef idx="2">
+            <a:schemeClr val="accent1">
+              <a:shade val="50000"/>
+            </a:schemeClr>
+          </a:lnRef>
+          <a:fillRef idx="1">
+            <a:schemeClr val="accent1"/>
+          </a:fillRef>
+          <a:effectRef idx="0">
+            <a:schemeClr val="accent1"/>
+          </a:effectRef>
+          <a:fontRef idx="minor">
+            <a:schemeClr val="lt1"/>
+          </a:fontRef>
+        </p:style>
+        <p:txBody>
+          <a:bodyPr rtlCol="0" anchor="ctr"/>
+          <a:lstStyle/>
+          <a:p>
+            <a:pPr algn="ctr"/>
+            <a:endParaRPr lang="de-DE"/>
+          </a:p>
+        </p:txBody>
+      </p:sp>
+      <p:grpSp>
+        <p:nvGrpSpPr>
+          <p:cNvPr id="69" name="Group 68"/>
+          <p:cNvGrpSpPr/>
+          <p:nvPr/>
+        </p:nvGrpSpPr>
+        <p:grpSpPr>
+          <a:xfrm>
+            <a:off x="2219806" y="547021"/>
+            <a:ext cx="1614441" cy="673166"/>
+            <a:chOff x="2334271" y="318043"/>
+            <a:chExt cx="1457473" cy="673166"/>
+          </a:xfrm>
+        </p:grpSpPr>
+        <p:cxnSp>
+          <p:nvCxnSpPr>
+            <p:cNvPr id="70" name="Straight Arrow Connector 69"/>
+            <p:cNvCxnSpPr/>
+            <p:nvPr/>
+          </p:nvCxnSpPr>
+          <p:spPr>
+            <a:xfrm flipV="1">
+              <a:off x="2346123" y="980728"/>
+              <a:ext cx="1445621" cy="10481"/>
+            </a:xfrm>
+            <a:prstGeom prst="straightConnector1">
+              <a:avLst/>
+            </a:prstGeom>
+            <a:ln w="142875">
+              <a:solidFill>
+                <a:schemeClr val="tx1">
+                  <a:lumMod val="50000"/>
+                  <a:lumOff val="50000"/>
+                </a:schemeClr>
+              </a:solidFill>
+              <a:tailEnd type="triangle"/>
+            </a:ln>
+          </p:spPr>
+          <p:style>
+            <a:lnRef idx="1">
+              <a:schemeClr val="accent1"/>
+            </a:lnRef>
+            <a:fillRef idx="0">
+              <a:schemeClr val="accent1"/>
+            </a:fillRef>
+            <a:effectRef idx="0">
+              <a:schemeClr val="accent1"/>
+            </a:effectRef>
+            <a:fontRef idx="minor">
+              <a:schemeClr val="tx1"/>
+            </a:fontRef>
+          </p:style>
+        </p:cxnSp>
+        <p:sp>
+          <p:nvSpPr>
+            <p:cNvPr id="71" name="TextBox 70"/>
+            <p:cNvSpPr txBox="1"/>
+            <p:nvPr/>
+          </p:nvSpPr>
+          <p:spPr>
+            <a:xfrm>
+              <a:off x="2334271" y="318043"/>
+              <a:ext cx="1408522" cy="523220"/>
+            </a:xfrm>
+            <a:prstGeom prst="rect">
+              <a:avLst/>
+            </a:prstGeom>
+            <a:noFill/>
+          </p:spPr>
+          <p:txBody>
+            <a:bodyPr wrap="square" rtlCol="0">
+              <a:spAutoFit/>
+            </a:bodyPr>
+            <a:lstStyle/>
+            <a:p>
+              <a:pPr algn="ctr"/>
+              <a:endParaRPr lang="de-DE" sz="2800" b="1" dirty="0"/>
+            </a:p>
+          </p:txBody>
+        </p:sp>
+      </p:grpSp>
+      <p:sp>
+        <p:nvSpPr>
+          <p:cNvPr id="81" name="TextBox 80"/>
+          <p:cNvSpPr txBox="1"/>
+          <p:nvPr/>
+        </p:nvSpPr>
+        <p:spPr>
+          <a:xfrm>
+            <a:off x="2267013" y="657342"/>
+            <a:ext cx="1335331" cy="523220"/>
+          </a:xfrm>
+          <a:prstGeom prst="rect">
+            <a:avLst/>
+          </a:prstGeom>
+          <a:noFill/>
+        </p:spPr>
+        <p:txBody>
+          <a:bodyPr wrap="square" rtlCol="0">
+            <a:spAutoFit/>
+          </a:bodyPr>
+          <a:lstStyle/>
+          <a:p>
+            <a:pPr algn="ctr"/>
+            <a:r>
+              <a:rPr lang="en-US" sz="2800" b="1" dirty="0"/>
+              <a:t>run</a:t>
+            </a:r>
+            <a:endParaRPr lang="de-DE" sz="2800" b="1" dirty="0"/>
+          </a:p>
+        </p:txBody>
+      </p:sp>
+      <p:sp>
+        <p:nvSpPr>
+          <p:cNvPr id="62" name="Rounded Rectangle 75"/>
+          <p:cNvSpPr/>
+          <p:nvPr/>
+        </p:nvSpPr>
+        <p:spPr>
+          <a:xfrm>
+            <a:off x="1170348" y="3821049"/>
+            <a:ext cx="1441656" cy="1514439"/>
+          </a:xfrm>
+          <a:prstGeom prst="rect">
+            <a:avLst/>
+          </a:prstGeom>
+          <a:solidFill>
+            <a:schemeClr val="accent2">
+              <a:lumMod val="75000"/>
+            </a:schemeClr>
+          </a:solidFill>
+          <a:ln w="76200">
+            <a:solidFill>
+              <a:schemeClr val="accent2">
+                <a:lumMod val="50000"/>
+              </a:schemeClr>
+            </a:solidFill>
+          </a:ln>
+        </p:spPr>
+        <p:style>
+          <a:lnRef idx="2">
+            <a:schemeClr val="accent1">
+              <a:shade val="50000"/>
+            </a:schemeClr>
+          </a:lnRef>
+          <a:fillRef idx="1">
+            <a:schemeClr val="accent1"/>
+          </a:fillRef>
+          <a:effectRef idx="0">
+            <a:schemeClr val="accent1"/>
+          </a:effectRef>
+          <a:fontRef idx="minor">
+            <a:schemeClr val="lt1"/>
+          </a:fontRef>
+        </p:style>
+        <p:txBody>
+          <a:bodyPr rtlCol="0" anchor="ctr"/>
+          <a:lstStyle/>
+          <a:p>
+            <a:pPr algn="ctr"/>
+            <a:r>
+              <a:rPr lang="en-US" sz="2000" b="1" dirty="0"/>
+              <a:t>Instance</a:t>
+            </a:r>
+            <a:endParaRPr lang="de-DE" sz="2000" b="1" dirty="0"/>
+          </a:p>
+        </p:txBody>
+      </p:sp>
+      <p:sp>
+        <p:nvSpPr>
+          <p:cNvPr id="66" name="Rounded Rectangle 75"/>
+          <p:cNvSpPr/>
+          <p:nvPr/>
+        </p:nvSpPr>
+        <p:spPr>
+          <a:xfrm>
+            <a:off x="2789084" y="3821049"/>
+            <a:ext cx="1441656" cy="1514439"/>
+          </a:xfrm>
+          <a:prstGeom prst="rect">
+            <a:avLst/>
+          </a:prstGeom>
+          <a:solidFill>
+            <a:schemeClr val="accent2">
+              <a:lumMod val="75000"/>
+            </a:schemeClr>
+          </a:solidFill>
+          <a:ln w="76200">
+            <a:solidFill>
+              <a:schemeClr val="accent2">
+                <a:lumMod val="50000"/>
+              </a:schemeClr>
+            </a:solidFill>
+          </a:ln>
+        </p:spPr>
+        <p:style>
+          <a:lnRef idx="2">
+            <a:schemeClr val="accent1">
+              <a:shade val="50000"/>
+            </a:schemeClr>
+          </a:lnRef>
+          <a:fillRef idx="1">
+            <a:schemeClr val="accent1"/>
+          </a:fillRef>
+          <a:effectRef idx="0">
+            <a:schemeClr val="accent1"/>
+          </a:effectRef>
+          <a:fontRef idx="minor">
+            <a:schemeClr val="lt1"/>
+          </a:fontRef>
+        </p:style>
+        <p:txBody>
+          <a:bodyPr rtlCol="0" anchor="ctr"/>
+          <a:lstStyle/>
+          <a:p>
+            <a:pPr algn="ctr"/>
+            <a:r>
+              <a:rPr lang="en-US" sz="2000" b="1" dirty="0"/>
+              <a:t>Instance</a:t>
+            </a:r>
+            <a:endParaRPr lang="de-DE" sz="2000" b="1" dirty="0"/>
+          </a:p>
+        </p:txBody>
+      </p:sp>
+      <p:pic>
+        <p:nvPicPr>
+          <p:cNvPr id="68" name="Picture 67"/>
+          <p:cNvPicPr>
+            <a:picLocks noChangeAspect="1"/>
+          </p:cNvPicPr>
+          <p:nvPr/>
+        </p:nvPicPr>
+        <p:blipFill>
+          <a:blip r:embed="rId2"/>
+          <a:stretch>
+            <a:fillRect/>
+          </a:stretch>
+        </p:blipFill>
+        <p:spPr>
+          <a:xfrm>
+            <a:off x="1913368" y="5616401"/>
+            <a:ext cx="1655807" cy="705924"/>
+          </a:xfrm>
+          <a:prstGeom prst="rect">
+            <a:avLst/>
+          </a:prstGeom>
+        </p:spPr>
+      </p:pic>
+    </p:spTree>
+    <p:extLst>
+      <p:ext uri="{BB962C8B-B14F-4D97-AF65-F5344CB8AC3E}">
+        <p14:creationId xmlns:p14="http://schemas.microsoft.com/office/powerpoint/2010/main" val="81494658"/>
+      </p:ext>
+    </p:extLst>
+  </p:cSld>
+  <p:clrMapOvr>
+    <a:masterClrMapping/>
+  </p:clrMapOvr>
+  <p:timing>
+    <p:tnLst>
+      <p:par>
+        <p:cTn id="1" dur="indefinite" restart="never" nodeType="tmRoot"/>
+      </p:par>
+    </p:tnLst>
+  </p:timing>
+</p:sld>
+</file>
+
+<file path=ppt/slides/slide12.xml><?xml version="1.0" encoding="utf-8"?>
+<p:sld xmlns:a="http://schemas.openxmlformats.org/drawingml/2006/main" xmlns:r="http://schemas.openxmlformats.org/officeDocument/2006/relationships" xmlns:p="http://schemas.openxmlformats.org/presentationml/2006/main">
+  <p:cSld>
+    <p:spTree>
+      <p:nvGrpSpPr>
+        <p:cNvPr id="1" name=""/>
+        <p:cNvGrpSpPr/>
+        <p:nvPr/>
+      </p:nvGrpSpPr>
+      <p:grpSpPr>
+        <a:xfrm>
+          <a:off x="0" y="0"/>
+          <a:ext cx="0" cy="0"/>
+          <a:chOff x="0" y="0"/>
+          <a:chExt cx="0" cy="0"/>
+        </a:xfrm>
+      </p:grpSpPr>
+      <p:pic>
+        <p:nvPicPr>
+          <p:cNvPr id="6" name="Picture 5"/>
+          <p:cNvPicPr>
+            <a:picLocks noChangeAspect="1"/>
+          </p:cNvPicPr>
+          <p:nvPr/>
+        </p:nvPicPr>
+        <p:blipFill>
+          <a:blip r:embed="rId2"/>
+          <a:stretch>
+            <a:fillRect/>
+          </a:stretch>
+        </p:blipFill>
+        <p:spPr>
+          <a:xfrm>
+            <a:off x="7951702" y="2387169"/>
+            <a:ext cx="1655807" cy="705924"/>
+          </a:xfrm>
+          <a:prstGeom prst="rect">
+            <a:avLst/>
+          </a:prstGeom>
+        </p:spPr>
+      </p:pic>
+      <p:sp>
+        <p:nvSpPr>
+          <p:cNvPr id="76" name="Rounded Rectangle 75"/>
+          <p:cNvSpPr/>
+          <p:nvPr/>
+        </p:nvSpPr>
+        <p:spPr>
+          <a:xfrm>
+            <a:off x="8048943" y="814243"/>
+            <a:ext cx="1441656" cy="1514439"/>
+          </a:xfrm>
+          <a:prstGeom prst="rect">
+            <a:avLst/>
+          </a:prstGeom>
+          <a:solidFill>
+            <a:schemeClr val="accent2">
+              <a:lumMod val="75000"/>
+            </a:schemeClr>
+          </a:solidFill>
+          <a:ln w="76200">
+            <a:solidFill>
+              <a:schemeClr val="accent2">
+                <a:lumMod val="50000"/>
+              </a:schemeClr>
+            </a:solidFill>
+          </a:ln>
+        </p:spPr>
+        <p:style>
+          <a:lnRef idx="2">
+            <a:schemeClr val="accent1">
+              <a:shade val="50000"/>
+            </a:schemeClr>
+          </a:lnRef>
+          <a:fillRef idx="1">
+            <a:schemeClr val="accent1"/>
+          </a:fillRef>
+          <a:effectRef idx="0">
+            <a:schemeClr val="accent1"/>
+          </a:effectRef>
+          <a:fontRef idx="minor">
+            <a:schemeClr val="lt1"/>
+          </a:fontRef>
+        </p:style>
+        <p:txBody>
+          <a:bodyPr rtlCol="0" anchor="ctr"/>
+          <a:lstStyle/>
+          <a:p>
+            <a:pPr algn="ctr"/>
+            <a:r>
+              <a:rPr lang="en-US" sz="2000" b="1" dirty="0"/>
+              <a:t>Instance</a:t>
+            </a:r>
+            <a:endParaRPr lang="de-DE" sz="2000" b="1" dirty="0"/>
+          </a:p>
+        </p:txBody>
+      </p:sp>
+      <p:grpSp>
+        <p:nvGrpSpPr>
+          <p:cNvPr id="52" name="Group 51"/>
+          <p:cNvGrpSpPr/>
+          <p:nvPr/>
+        </p:nvGrpSpPr>
+        <p:grpSpPr>
+          <a:xfrm>
+            <a:off x="9778364" y="1238207"/>
+            <a:ext cx="1381738" cy="673166"/>
+            <a:chOff x="2334271" y="318043"/>
+            <a:chExt cx="1457473" cy="673166"/>
+          </a:xfrm>
+        </p:grpSpPr>
+        <p:cxnSp>
+          <p:nvCxnSpPr>
+            <p:cNvPr id="63" name="Straight Arrow Connector 62"/>
+            <p:cNvCxnSpPr/>
+            <p:nvPr/>
+          </p:nvCxnSpPr>
+          <p:spPr>
+            <a:xfrm flipV="1">
+              <a:off x="2346123" y="980728"/>
+              <a:ext cx="1445621" cy="10481"/>
+            </a:xfrm>
+            <a:prstGeom prst="straightConnector1">
+              <a:avLst/>
+            </a:prstGeom>
+            <a:ln w="142875">
+              <a:solidFill>
+                <a:schemeClr val="tx1">
+                  <a:lumMod val="50000"/>
+                  <a:lumOff val="50000"/>
+                </a:schemeClr>
+              </a:solidFill>
+              <a:tailEnd type="triangle"/>
+            </a:ln>
+          </p:spPr>
+          <p:style>
+            <a:lnRef idx="1">
+              <a:schemeClr val="accent1"/>
+            </a:lnRef>
+            <a:fillRef idx="0">
+              <a:schemeClr val="accent1"/>
+            </a:fillRef>
+            <a:effectRef idx="0">
+              <a:schemeClr val="accent1"/>
+            </a:effectRef>
+            <a:fontRef idx="minor">
+              <a:schemeClr val="tx1"/>
+            </a:fontRef>
+          </p:style>
+        </p:cxnSp>
+        <p:sp>
+          <p:nvSpPr>
+            <p:cNvPr id="64" name="TextBox 63"/>
+            <p:cNvSpPr txBox="1"/>
+            <p:nvPr/>
+          </p:nvSpPr>
+          <p:spPr>
+            <a:xfrm>
+              <a:off x="2334271" y="318043"/>
+              <a:ext cx="1408522" cy="523220"/>
+            </a:xfrm>
+            <a:prstGeom prst="rect">
+              <a:avLst/>
+            </a:prstGeom>
+            <a:noFill/>
+          </p:spPr>
+          <p:txBody>
+            <a:bodyPr wrap="square" rtlCol="0">
+              <a:spAutoFit/>
+            </a:bodyPr>
+            <a:lstStyle/>
+            <a:p>
+              <a:pPr algn="ctr"/>
+              <a:r>
+                <a:rPr lang="en-US" sz="2800" b="1" dirty="0"/>
+                <a:t>open</a:t>
+              </a:r>
+              <a:endParaRPr lang="de-DE" sz="2800" b="1" dirty="0"/>
+            </a:p>
+          </p:txBody>
+        </p:sp>
+      </p:grpSp>
+      <p:pic>
+        <p:nvPicPr>
+          <p:cNvPr id="3" name="Picture 2"/>
+          <p:cNvPicPr>
+            <a:picLocks noChangeAspect="1"/>
+          </p:cNvPicPr>
+          <p:nvPr/>
+        </p:nvPicPr>
+        <p:blipFill>
+          <a:blip r:embed="rId3">
+            <a:extLst>
+              <a:ext uri="{28A0092B-C50C-407E-A947-70E740481C1C}">
+                <a14:useLocalDpi xmlns:a14="http://schemas.microsoft.com/office/drawing/2010/main" val="0"/>
+              </a:ext>
+            </a:extLst>
+          </a:blip>
+          <a:stretch>
+            <a:fillRect/>
+          </a:stretch>
+        </p:blipFill>
+        <p:spPr>
+          <a:xfrm>
+            <a:off x="11297689" y="1043141"/>
+            <a:ext cx="2294064" cy="1436808"/>
+          </a:xfrm>
+          <a:prstGeom prst="rect">
+            <a:avLst/>
+          </a:prstGeom>
+        </p:spPr>
+      </p:pic>
+      <p:pic>
+        <p:nvPicPr>
+          <p:cNvPr id="1026" name="Picture 2" descr="Console showing log4J logs"/>
+          <p:cNvPicPr>
+            <a:picLocks noChangeAspect="1" noChangeArrowheads="1"/>
+          </p:cNvPicPr>
+          <p:nvPr/>
+        </p:nvPicPr>
+        <p:blipFill>
+          <a:blip r:embed="rId4">
+            <a:extLst>
+              <a:ext uri="{28A0092B-C50C-407E-A947-70E740481C1C}">
+                <a14:useLocalDpi xmlns:a14="http://schemas.microsoft.com/office/drawing/2010/main" val="0"/>
+              </a:ext>
+            </a:extLst>
+          </a:blip>
+          <a:srcRect/>
+          <a:stretch>
+            <a:fillRect/>
+          </a:stretch>
+        </p:blipFill>
+        <p:spPr bwMode="auto">
+          <a:xfrm>
+            <a:off x="4004236" y="946672"/>
+            <a:ext cx="2241408" cy="1631745"/>
+          </a:xfrm>
+          <a:prstGeom prst="rect">
+            <a:avLst/>
+          </a:prstGeom>
+          <a:noFill/>
+          <a:extLst>
+            <a:ext uri="{909E8E84-426E-40DD-AFC4-6F175D3DCCD1}">
+              <a14:hiddenFill xmlns:a14="http://schemas.microsoft.com/office/drawing/2010/main">
+                <a:solidFill>
+                  <a:srgbClr val="FFFFFF"/>
+                </a:solidFill>
+              </a14:hiddenFill>
+            </a:ext>
+          </a:extLst>
+        </p:spPr>
+      </p:pic>
+      <p:pic>
+        <p:nvPicPr>
+          <p:cNvPr id="61" name="Picture 60"/>
+          <p:cNvPicPr>
+            <a:picLocks noChangeAspect="1"/>
+          </p:cNvPicPr>
+          <p:nvPr/>
+        </p:nvPicPr>
+        <p:blipFill>
+          <a:blip r:embed="rId2"/>
+          <a:stretch>
+            <a:fillRect/>
+          </a:stretch>
+        </p:blipFill>
+        <p:spPr>
+          <a:xfrm>
+            <a:off x="591194" y="2366574"/>
+            <a:ext cx="1655807" cy="705924"/>
+          </a:xfrm>
+          <a:prstGeom prst="rect">
+            <a:avLst/>
+          </a:prstGeom>
+        </p:spPr>
+      </p:pic>
+      <p:sp>
+        <p:nvSpPr>
+          <p:cNvPr id="62" name="Rounded Rectangle 75"/>
+          <p:cNvSpPr/>
+          <p:nvPr/>
+        </p:nvSpPr>
+        <p:spPr>
+          <a:xfrm>
+            <a:off x="688435" y="793648"/>
+            <a:ext cx="1441656" cy="1514439"/>
+          </a:xfrm>
+          <a:prstGeom prst="rect">
+            <a:avLst/>
+          </a:prstGeom>
+          <a:solidFill>
+            <a:schemeClr val="accent2">
+              <a:lumMod val="75000"/>
+            </a:schemeClr>
+          </a:solidFill>
+          <a:ln w="76200">
+            <a:solidFill>
+              <a:schemeClr val="accent2">
+                <a:lumMod val="50000"/>
+              </a:schemeClr>
+            </a:solidFill>
+          </a:ln>
+        </p:spPr>
+        <p:style>
+          <a:lnRef idx="2">
+            <a:schemeClr val="accent1">
+              <a:shade val="50000"/>
+            </a:schemeClr>
+          </a:lnRef>
+          <a:fillRef idx="1">
+            <a:schemeClr val="accent1"/>
+          </a:fillRef>
+          <a:effectRef idx="0">
+            <a:schemeClr val="accent1"/>
+          </a:effectRef>
+          <a:fontRef idx="minor">
+            <a:schemeClr val="lt1"/>
+          </a:fontRef>
+        </p:style>
+        <p:txBody>
+          <a:bodyPr rtlCol="0" anchor="ctr"/>
+          <a:lstStyle/>
+          <a:p>
+            <a:pPr algn="ctr"/>
+            <a:r>
+              <a:rPr lang="en-US" sz="2000" b="1" dirty="0"/>
+              <a:t>Instance</a:t>
+            </a:r>
+            <a:endParaRPr lang="de-DE" sz="2000" b="1" dirty="0"/>
+          </a:p>
+        </p:txBody>
+      </p:sp>
+      <p:grpSp>
+        <p:nvGrpSpPr>
+          <p:cNvPr id="66" name="Group 65"/>
+          <p:cNvGrpSpPr/>
+          <p:nvPr/>
+        </p:nvGrpSpPr>
+        <p:grpSpPr>
+          <a:xfrm>
+            <a:off x="2417856" y="1217612"/>
+            <a:ext cx="1381738" cy="673166"/>
+            <a:chOff x="2334271" y="318043"/>
+            <a:chExt cx="1457473" cy="673166"/>
+          </a:xfrm>
+        </p:grpSpPr>
+        <p:cxnSp>
+          <p:nvCxnSpPr>
+            <p:cNvPr id="68" name="Straight Arrow Connector 67"/>
+            <p:cNvCxnSpPr/>
+            <p:nvPr/>
+          </p:nvCxnSpPr>
+          <p:spPr>
+            <a:xfrm flipV="1">
+              <a:off x="2346123" y="980728"/>
+              <a:ext cx="1445621" cy="10481"/>
+            </a:xfrm>
+            <a:prstGeom prst="straightConnector1">
+              <a:avLst/>
+            </a:prstGeom>
+            <a:ln w="142875">
+              <a:solidFill>
+                <a:schemeClr val="tx1">
+                  <a:lumMod val="50000"/>
+                  <a:lumOff val="50000"/>
+                </a:schemeClr>
+              </a:solidFill>
+              <a:tailEnd type="triangle"/>
+            </a:ln>
+          </p:spPr>
+          <p:style>
+            <a:lnRef idx="1">
+              <a:schemeClr val="accent1"/>
+            </a:lnRef>
+            <a:fillRef idx="0">
+              <a:schemeClr val="accent1"/>
+            </a:fillRef>
+            <a:effectRef idx="0">
+              <a:schemeClr val="accent1"/>
+            </a:effectRef>
+            <a:fontRef idx="minor">
+              <a:schemeClr val="tx1"/>
+            </a:fontRef>
+          </p:style>
+        </p:cxnSp>
+        <p:sp>
+          <p:nvSpPr>
+            <p:cNvPr id="80" name="TextBox 79"/>
+            <p:cNvSpPr txBox="1"/>
+            <p:nvPr/>
+          </p:nvSpPr>
+          <p:spPr>
+            <a:xfrm>
+              <a:off x="2334271" y="318043"/>
+              <a:ext cx="1408522" cy="523220"/>
+            </a:xfrm>
+            <a:prstGeom prst="rect">
+              <a:avLst/>
+            </a:prstGeom>
+            <a:noFill/>
+          </p:spPr>
+          <p:txBody>
+            <a:bodyPr wrap="square" rtlCol="0">
+              <a:spAutoFit/>
+            </a:bodyPr>
+            <a:lstStyle/>
+            <a:p>
+              <a:pPr algn="ctr"/>
+              <a:r>
+                <a:rPr lang="en-US" sz="2800" b="1" dirty="0" smtClean="0"/>
+                <a:t>logs</a:t>
+              </a:r>
+              <a:endParaRPr lang="de-DE" sz="2800" b="1" dirty="0"/>
+            </a:p>
+          </p:txBody>
+        </p:sp>
+      </p:grpSp>
+    </p:spTree>
+    <p:extLst>
+      <p:ext uri="{BB962C8B-B14F-4D97-AF65-F5344CB8AC3E}">
+        <p14:creationId xmlns:p14="http://schemas.microsoft.com/office/powerpoint/2010/main" val="2448315037"/>
+      </p:ext>
+    </p:extLst>
+  </p:cSld>
+  <p:clrMapOvr>
+    <a:masterClrMapping/>
+  </p:clrMapOvr>
+  <p:timing>
+    <p:tnLst>
+      <p:par>
+        <p:cTn id="1" dur="indefinite" restart="never" nodeType="tmRoot"/>
+      </p:par>
+    </p:tnLst>
+  </p:timing>
+</p:sld>
+</file>
+
+<file path=ppt/slides/slide13.xml><?xml version="1.0" encoding="utf-8"?>
+<p:sld xmlns:a="http://schemas.openxmlformats.org/drawingml/2006/main" xmlns:r="http://schemas.openxmlformats.org/officeDocument/2006/relationships" xmlns:p="http://schemas.openxmlformats.org/presentationml/2006/main">
+  <p:cSld>
+    <p:spTree>
+      <p:nvGrpSpPr>
+        <p:cNvPr id="1" name=""/>
+        <p:cNvGrpSpPr/>
+        <p:nvPr/>
+      </p:nvGrpSpPr>
+      <p:grpSpPr>
+        <a:xfrm>
+          <a:off x="0" y="0"/>
+          <a:ext cx="0" cy="0"/>
+          <a:chOff x="0" y="0"/>
+          <a:chExt cx="0" cy="0"/>
+        </a:xfrm>
+      </p:grpSpPr>
+      <p:grpSp>
+        <p:nvGrpSpPr>
+          <p:cNvPr id="82" name="Group 81"/>
+          <p:cNvGrpSpPr/>
+          <p:nvPr/>
+        </p:nvGrpSpPr>
+        <p:grpSpPr>
+          <a:xfrm>
+            <a:off x="2051222" y="509089"/>
+            <a:ext cx="1878227" cy="673166"/>
+            <a:chOff x="2334271" y="318043"/>
+            <a:chExt cx="1457473" cy="673166"/>
+          </a:xfrm>
+        </p:grpSpPr>
+        <p:cxnSp>
+          <p:nvCxnSpPr>
+            <p:cNvPr id="83" name="Straight Arrow Connector 82"/>
+            <p:cNvCxnSpPr/>
+            <p:nvPr/>
+          </p:nvCxnSpPr>
+          <p:spPr>
+            <a:xfrm flipV="1">
+              <a:off x="2346123" y="980728"/>
+              <a:ext cx="1445621" cy="10481"/>
+            </a:xfrm>
+            <a:prstGeom prst="straightConnector1">
+              <a:avLst/>
+            </a:prstGeom>
+            <a:ln w="142875">
+              <a:solidFill>
+                <a:schemeClr val="tx1">
+                  <a:lumMod val="50000"/>
+                  <a:lumOff val="50000"/>
+                </a:schemeClr>
+              </a:solidFill>
+              <a:tailEnd type="triangle"/>
+            </a:ln>
+          </p:spPr>
+          <p:style>
+            <a:lnRef idx="1">
+              <a:schemeClr val="accent1"/>
+            </a:lnRef>
+            <a:fillRef idx="0">
+              <a:schemeClr val="accent1"/>
+            </a:fillRef>
+            <a:effectRef idx="0">
+              <a:schemeClr val="accent1"/>
+            </a:effectRef>
+            <a:fontRef idx="minor">
+              <a:schemeClr val="tx1"/>
+            </a:fontRef>
+          </p:style>
+        </p:cxnSp>
+        <p:sp>
+          <p:nvSpPr>
+            <p:cNvPr id="84" name="TextBox 83"/>
+            <p:cNvSpPr txBox="1"/>
+            <p:nvPr/>
+          </p:nvSpPr>
+          <p:spPr>
+            <a:xfrm>
+              <a:off x="2334271" y="318043"/>
+              <a:ext cx="1408522" cy="523220"/>
+            </a:xfrm>
+            <a:prstGeom prst="rect">
+              <a:avLst/>
+            </a:prstGeom>
+            <a:noFill/>
+          </p:spPr>
+          <p:txBody>
+            <a:bodyPr wrap="square" rtlCol="0">
+              <a:spAutoFit/>
+            </a:bodyPr>
+            <a:lstStyle/>
+            <a:p>
+              <a:pPr algn="ctr"/>
+              <a:endParaRPr lang="de-DE" sz="2800" b="1" dirty="0"/>
+            </a:p>
+          </p:txBody>
+        </p:sp>
+      </p:grpSp>
+      <p:pic>
+        <p:nvPicPr>
+          <p:cNvPr id="85" name="Picture 2" descr="https://a0.awsstatic.com/main/images/logos/aws_logo.png"/>
+          <p:cNvPicPr>
+            <a:picLocks noChangeAspect="1" noChangeArrowheads="1"/>
+          </p:cNvPicPr>
+          <p:nvPr/>
+        </p:nvPicPr>
+        <p:blipFill>
+          <a:blip r:embed="rId2">
+            <a:extLst>
+              <a:ext uri="{28A0092B-C50C-407E-A947-70E740481C1C}">
+                <a14:useLocalDpi xmlns:a14="http://schemas.microsoft.com/office/drawing/2010/main" val="0"/>
+              </a:ext>
+            </a:extLst>
+          </a:blip>
+          <a:srcRect/>
+          <a:stretch>
+            <a:fillRect/>
+          </a:stretch>
+        </p:blipFill>
+        <p:spPr bwMode="auto">
+          <a:xfrm>
+            <a:off x="11353758" y="6017712"/>
+            <a:ext cx="2220092" cy="838701"/>
+          </a:xfrm>
+          <a:prstGeom prst="rect">
+            <a:avLst/>
+          </a:prstGeom>
+          <a:noFill/>
+          <a:extLst>
+            <a:ext uri="{909E8E84-426E-40DD-AFC4-6F175D3DCCD1}">
+              <a14:hiddenFill xmlns:a14="http://schemas.microsoft.com/office/drawing/2010/main">
+                <a:solidFill>
+                  <a:srgbClr val="FFFFFF"/>
+                </a:solidFill>
+              </a14:hiddenFill>
+            </a:ext>
+          </a:extLst>
+        </p:spPr>
+      </p:pic>
+      <p:sp>
+        <p:nvSpPr>
+          <p:cNvPr id="16" name="Rectangle 15"/>
+          <p:cNvSpPr/>
+          <p:nvPr/>
+        </p:nvSpPr>
+        <p:spPr>
+          <a:xfrm>
+            <a:off x="7926012" y="5317103"/>
+            <a:ext cx="2791326" cy="2215991"/>
+          </a:xfrm>
+          <a:prstGeom prst="rect">
+            <a:avLst/>
+          </a:prstGeom>
+        </p:spPr>
+        <p:txBody>
+          <a:bodyPr wrap="square">
+            <a:spAutoFit/>
+          </a:bodyPr>
+          <a:lstStyle/>
+          <a:p>
+            <a:r>
+              <a:rPr lang="de-DE" sz="13800" dirty="0">
+                <a:solidFill>
+                  <a:schemeClr val="tx2">
+                    <a:lumMod val="60000"/>
+                    <a:lumOff val="40000"/>
+                  </a:schemeClr>
+                </a:solidFill>
+                <a:latin typeface="FontAwesome" pitchFamily="2" charset="0"/>
+              </a:rPr>
+              <a:t></a:t>
+            </a:r>
+            <a:endParaRPr lang="de-DE" sz="2400" dirty="0">
+              <a:latin typeface="FontAwesome" pitchFamily="2" charset="0"/>
+            </a:endParaRPr>
+          </a:p>
+        </p:txBody>
+      </p:sp>
+      <p:sp>
+        <p:nvSpPr>
+          <p:cNvPr id="17" name="Rectangle 16"/>
+          <p:cNvSpPr/>
+          <p:nvPr/>
+        </p:nvSpPr>
+        <p:spPr>
+          <a:xfrm>
+            <a:off x="8428894" y="5748821"/>
+            <a:ext cx="1050288" cy="1708160"/>
+          </a:xfrm>
+          <a:prstGeom prst="rect">
+            <a:avLst/>
+          </a:prstGeom>
+        </p:spPr>
+        <p:txBody>
+          <a:bodyPr wrap="none">
+            <a:spAutoFit/>
+          </a:bodyPr>
+          <a:lstStyle/>
+          <a:p>
+            <a:r>
+              <a:rPr lang="de-DE" sz="10500" dirty="0">
+                <a:solidFill>
+                  <a:schemeClr val="tx2"/>
+                </a:solidFill>
+                <a:latin typeface="FontAwesome" pitchFamily="2" charset="0"/>
+              </a:rPr>
+              <a:t></a:t>
+            </a:r>
+            <a:endParaRPr lang="de-DE" sz="10500" dirty="0">
+              <a:solidFill>
+                <a:schemeClr val="tx2"/>
+              </a:solidFill>
+            </a:endParaRPr>
+          </a:p>
+        </p:txBody>
+      </p:sp>
+      <p:sp>
+        <p:nvSpPr>
+          <p:cNvPr id="86" name="TextBox 85"/>
+          <p:cNvSpPr txBox="1"/>
+          <p:nvPr/>
+        </p:nvSpPr>
+        <p:spPr>
+          <a:xfrm>
+            <a:off x="7477384" y="6548681"/>
+            <a:ext cx="2953724" cy="400110"/>
+          </a:xfrm>
+          <a:prstGeom prst="rect">
+            <a:avLst/>
+          </a:prstGeom>
+          <a:noFill/>
+        </p:spPr>
+        <p:txBody>
+          <a:bodyPr wrap="square" rtlCol="0">
+            <a:spAutoFit/>
+          </a:bodyPr>
+          <a:lstStyle/>
+          <a:p>
+            <a:pPr algn="ctr"/>
+            <a:r>
+              <a:rPr lang="en-US" sz="2000" b="1" dirty="0" err="1">
+                <a:solidFill>
+                  <a:schemeClr val="bg1"/>
+                </a:solidFill>
+              </a:rPr>
+              <a:t>Boxfuse</a:t>
+            </a:r>
+            <a:r>
+              <a:rPr lang="en-US" sz="2000" b="1" dirty="0">
+                <a:solidFill>
+                  <a:schemeClr val="bg1"/>
+                </a:solidFill>
+              </a:rPr>
+              <a:t> Vault</a:t>
+            </a:r>
+            <a:endParaRPr lang="de-DE" sz="2000" b="1" dirty="0">
+              <a:solidFill>
+                <a:schemeClr val="bg1"/>
+              </a:solidFill>
+            </a:endParaRPr>
+          </a:p>
+        </p:txBody>
+      </p:sp>
+      <p:sp>
+        <p:nvSpPr>
+          <p:cNvPr id="90" name="TextBox 89"/>
+          <p:cNvSpPr txBox="1"/>
+          <p:nvPr/>
+        </p:nvSpPr>
+        <p:spPr>
+          <a:xfrm rot="33828">
+            <a:off x="2287825" y="599924"/>
+            <a:ext cx="1335331" cy="523220"/>
+          </a:xfrm>
+          <a:prstGeom prst="rect">
+            <a:avLst/>
+          </a:prstGeom>
+          <a:noFill/>
+        </p:spPr>
+        <p:txBody>
+          <a:bodyPr wrap="square" rtlCol="0">
+            <a:spAutoFit/>
+          </a:bodyPr>
+          <a:lstStyle/>
+          <a:p>
+            <a:pPr algn="ctr"/>
+            <a:r>
+              <a:rPr lang="en-US" sz="2800" b="1" dirty="0"/>
+              <a:t>push</a:t>
+            </a:r>
+            <a:endParaRPr lang="de-DE" sz="2800" b="1" dirty="0"/>
+          </a:p>
+        </p:txBody>
+      </p:sp>
+      <p:sp>
+        <p:nvSpPr>
+          <p:cNvPr id="92" name="TextBox 91"/>
+          <p:cNvSpPr txBox="1"/>
+          <p:nvPr/>
+        </p:nvSpPr>
+        <p:spPr>
+          <a:xfrm>
+            <a:off x="9875090" y="5841357"/>
+            <a:ext cx="1335331" cy="523220"/>
+          </a:xfrm>
+          <a:prstGeom prst="rect">
+            <a:avLst/>
+          </a:prstGeom>
+          <a:noFill/>
+        </p:spPr>
+        <p:txBody>
+          <a:bodyPr wrap="square" rtlCol="0">
+            <a:spAutoFit/>
+          </a:bodyPr>
+          <a:lstStyle/>
+          <a:p>
+            <a:pPr algn="ctr"/>
+            <a:r>
+              <a:rPr lang="en-US" sz="2800" b="1" dirty="0"/>
+              <a:t>deploy</a:t>
+            </a:r>
+            <a:endParaRPr lang="de-DE" sz="2800" b="1" dirty="0"/>
+          </a:p>
+        </p:txBody>
+      </p:sp>
+      <p:cxnSp>
+        <p:nvCxnSpPr>
+          <p:cNvPr id="94" name="Straight Arrow Connector 93"/>
+          <p:cNvCxnSpPr/>
+          <p:nvPr/>
+        </p:nvCxnSpPr>
+        <p:spPr>
+          <a:xfrm flipV="1">
+            <a:off x="9917937" y="6529041"/>
+            <a:ext cx="1370502" cy="10481"/>
+          </a:xfrm>
+          <a:prstGeom prst="straightConnector1">
+            <a:avLst/>
+          </a:prstGeom>
+          <a:ln w="142875">
+            <a:solidFill>
+              <a:schemeClr val="tx1">
+                <a:lumMod val="50000"/>
+                <a:lumOff val="50000"/>
+              </a:schemeClr>
+            </a:solidFill>
+            <a:tailEnd type="triangle"/>
+          </a:ln>
+        </p:spPr>
+        <p:style>
+          <a:lnRef idx="1">
+            <a:schemeClr val="accent1"/>
+          </a:lnRef>
+          <a:fillRef idx="0">
+            <a:schemeClr val="accent1"/>
+          </a:fillRef>
+          <a:effectRef idx="0">
+            <a:schemeClr val="accent1"/>
+          </a:effectRef>
+          <a:fontRef idx="minor">
+            <a:schemeClr val="tx1"/>
+          </a:fontRef>
+        </p:style>
+      </p:cxnSp>
+      <p:sp>
+        <p:nvSpPr>
+          <p:cNvPr id="61" name="Rounded Rectangle 25"/>
+          <p:cNvSpPr/>
+          <p:nvPr/>
+        </p:nvSpPr>
+        <p:spPr>
+          <a:xfrm>
+            <a:off x="292637" y="341372"/>
+            <a:ext cx="1610387" cy="1610382"/>
+          </a:xfrm>
+          <a:prstGeom prst="ellipse">
+            <a:avLst/>
+          </a:prstGeom>
+          <a:solidFill>
+            <a:schemeClr val="accent1">
+              <a:lumMod val="75000"/>
+            </a:schemeClr>
+          </a:solidFill>
+          <a:ln w="76200">
+            <a:solidFill>
+              <a:schemeClr val="accent1">
+                <a:lumMod val="50000"/>
+              </a:schemeClr>
+            </a:solidFill>
+          </a:ln>
+        </p:spPr>
+        <p:style>
+          <a:lnRef idx="2">
+            <a:schemeClr val="accent1">
+              <a:shade val="50000"/>
+            </a:schemeClr>
+          </a:lnRef>
+          <a:fillRef idx="1">
+            <a:schemeClr val="accent1"/>
+          </a:fillRef>
+          <a:effectRef idx="0">
+            <a:schemeClr val="accent1"/>
+          </a:effectRef>
+          <a:fontRef idx="minor">
+            <a:schemeClr val="lt1"/>
+          </a:fontRef>
+        </p:style>
+        <p:txBody>
+          <a:bodyPr rtlCol="0" anchor="ctr"/>
+          <a:lstStyle/>
+          <a:p>
+            <a:pPr algn="ctr"/>
+            <a:r>
+              <a:rPr lang="en-US" sz="2000" b="1" dirty="0"/>
+              <a:t>Image</a:t>
+            </a:r>
+            <a:endParaRPr lang="de-DE" sz="2000" b="1" dirty="0"/>
+          </a:p>
+        </p:txBody>
+      </p:sp>
+      <p:sp>
+        <p:nvSpPr>
+          <p:cNvPr id="62" name="Rectangle 61"/>
+          <p:cNvSpPr/>
+          <p:nvPr/>
+        </p:nvSpPr>
+        <p:spPr>
+          <a:xfrm>
+            <a:off x="3901828" y="-91038"/>
+            <a:ext cx="2791326" cy="2215991"/>
+          </a:xfrm>
+          <a:prstGeom prst="rect">
+            <a:avLst/>
+          </a:prstGeom>
+        </p:spPr>
+        <p:txBody>
+          <a:bodyPr wrap="square">
+            <a:spAutoFit/>
+          </a:bodyPr>
+          <a:lstStyle/>
+          <a:p>
+            <a:r>
+              <a:rPr lang="de-DE" sz="13800" dirty="0">
+                <a:solidFill>
+                  <a:schemeClr val="tx2">
+                    <a:lumMod val="60000"/>
+                    <a:lumOff val="40000"/>
+                  </a:schemeClr>
+                </a:solidFill>
+                <a:latin typeface="FontAwesome" pitchFamily="2" charset="0"/>
+              </a:rPr>
+              <a:t></a:t>
+            </a:r>
+            <a:endParaRPr lang="de-DE" sz="2400" dirty="0">
+              <a:latin typeface="FontAwesome" pitchFamily="2" charset="0"/>
+            </a:endParaRPr>
+          </a:p>
+        </p:txBody>
+      </p:sp>
+      <p:sp>
+        <p:nvSpPr>
+          <p:cNvPr id="66" name="Rectangle 65"/>
+          <p:cNvSpPr/>
+          <p:nvPr/>
+        </p:nvSpPr>
+        <p:spPr>
+          <a:xfrm>
+            <a:off x="4404710" y="340680"/>
+            <a:ext cx="1050288" cy="1708160"/>
+          </a:xfrm>
+          <a:prstGeom prst="rect">
+            <a:avLst/>
+          </a:prstGeom>
+        </p:spPr>
+        <p:txBody>
+          <a:bodyPr wrap="none">
+            <a:spAutoFit/>
+          </a:bodyPr>
+          <a:lstStyle/>
+          <a:p>
+            <a:r>
+              <a:rPr lang="de-DE" sz="10500" dirty="0">
+                <a:solidFill>
+                  <a:schemeClr val="tx2"/>
+                </a:solidFill>
+                <a:latin typeface="FontAwesome" pitchFamily="2" charset="0"/>
+              </a:rPr>
+              <a:t></a:t>
+            </a:r>
+            <a:endParaRPr lang="de-DE" sz="10500" dirty="0">
+              <a:solidFill>
+                <a:schemeClr val="tx2"/>
+              </a:solidFill>
+            </a:endParaRPr>
+          </a:p>
+        </p:txBody>
+      </p:sp>
+      <p:sp>
+        <p:nvSpPr>
+          <p:cNvPr id="68" name="TextBox 67"/>
+          <p:cNvSpPr txBox="1"/>
+          <p:nvPr/>
+        </p:nvSpPr>
+        <p:spPr>
+          <a:xfrm>
+            <a:off x="3453200" y="1140540"/>
+            <a:ext cx="2953724" cy="400110"/>
+          </a:xfrm>
+          <a:prstGeom prst="rect">
+            <a:avLst/>
+          </a:prstGeom>
+          <a:noFill/>
+        </p:spPr>
+        <p:txBody>
+          <a:bodyPr wrap="square" rtlCol="0">
+            <a:spAutoFit/>
+          </a:bodyPr>
+          <a:lstStyle/>
+          <a:p>
+            <a:pPr algn="ctr"/>
+            <a:r>
+              <a:rPr lang="en-US" sz="2000" b="1" dirty="0" err="1">
+                <a:solidFill>
+                  <a:schemeClr val="bg1"/>
+                </a:solidFill>
+              </a:rPr>
+              <a:t>Boxfuse</a:t>
+            </a:r>
+            <a:r>
+              <a:rPr lang="en-US" sz="2000" b="1" dirty="0">
+                <a:solidFill>
+                  <a:schemeClr val="bg1"/>
+                </a:solidFill>
+              </a:rPr>
+              <a:t> Vault</a:t>
+            </a:r>
+            <a:endParaRPr lang="de-DE" sz="2000" b="1" dirty="0">
+              <a:solidFill>
+                <a:schemeClr val="bg1"/>
+              </a:solidFill>
+            </a:endParaRPr>
+          </a:p>
+        </p:txBody>
+      </p:sp>
+      <p:grpSp>
+        <p:nvGrpSpPr>
+          <p:cNvPr id="101" name="Group 100"/>
+          <p:cNvGrpSpPr/>
+          <p:nvPr/>
+        </p:nvGrpSpPr>
+        <p:grpSpPr>
+          <a:xfrm rot="10800000">
+            <a:off x="9271710" y="1650036"/>
+            <a:ext cx="1878227" cy="673166"/>
+            <a:chOff x="2334271" y="318043"/>
+            <a:chExt cx="1457473" cy="673166"/>
+          </a:xfrm>
+        </p:grpSpPr>
+        <p:cxnSp>
+          <p:nvCxnSpPr>
+            <p:cNvPr id="102" name="Straight Arrow Connector 101"/>
+            <p:cNvCxnSpPr/>
+            <p:nvPr/>
+          </p:nvCxnSpPr>
+          <p:spPr>
+            <a:xfrm flipV="1">
+              <a:off x="2346123" y="980728"/>
+              <a:ext cx="1445621" cy="10481"/>
+            </a:xfrm>
+            <a:prstGeom prst="straightConnector1">
+              <a:avLst/>
+            </a:prstGeom>
+            <a:ln w="142875">
+              <a:solidFill>
+                <a:schemeClr val="tx1">
+                  <a:lumMod val="50000"/>
+                  <a:lumOff val="50000"/>
+                </a:schemeClr>
+              </a:solidFill>
+              <a:tailEnd type="triangle"/>
+            </a:ln>
+          </p:spPr>
+          <p:style>
+            <a:lnRef idx="1">
+              <a:schemeClr val="accent1"/>
+            </a:lnRef>
+            <a:fillRef idx="0">
+              <a:schemeClr val="accent1"/>
+            </a:fillRef>
+            <a:effectRef idx="0">
+              <a:schemeClr val="accent1"/>
+            </a:effectRef>
+            <a:fontRef idx="minor">
+              <a:schemeClr val="tx1"/>
+            </a:fontRef>
+          </p:style>
+        </p:cxnSp>
+        <p:sp>
+          <p:nvSpPr>
+            <p:cNvPr id="103" name="TextBox 102"/>
+            <p:cNvSpPr txBox="1"/>
+            <p:nvPr/>
+          </p:nvSpPr>
+          <p:spPr>
+            <a:xfrm>
+              <a:off x="2334271" y="318043"/>
+              <a:ext cx="1408522" cy="523220"/>
+            </a:xfrm>
+            <a:prstGeom prst="rect">
+              <a:avLst/>
+            </a:prstGeom>
+            <a:noFill/>
+          </p:spPr>
+          <p:txBody>
+            <a:bodyPr wrap="square" rtlCol="0">
+              <a:spAutoFit/>
+            </a:bodyPr>
+            <a:lstStyle/>
+            <a:p>
+              <a:pPr algn="ctr"/>
+              <a:endParaRPr lang="de-DE" sz="2800" b="1" dirty="0"/>
+            </a:p>
+          </p:txBody>
+        </p:sp>
+      </p:grpSp>
+      <p:sp>
+        <p:nvSpPr>
+          <p:cNvPr id="104" name="TextBox 103"/>
+          <p:cNvSpPr txBox="1"/>
+          <p:nvPr/>
+        </p:nvSpPr>
+        <p:spPr>
+          <a:xfrm rot="33828">
+            <a:off x="9508313" y="1085958"/>
+            <a:ext cx="1335331" cy="523220"/>
+          </a:xfrm>
+          <a:prstGeom prst="rect">
+            <a:avLst/>
+          </a:prstGeom>
+          <a:noFill/>
+        </p:spPr>
+        <p:txBody>
+          <a:bodyPr wrap="square" rtlCol="0">
+            <a:spAutoFit/>
+          </a:bodyPr>
+          <a:lstStyle/>
+          <a:p>
+            <a:pPr algn="ctr"/>
+            <a:r>
+              <a:rPr lang="en-US" sz="2800" b="1" dirty="0" smtClean="0"/>
+              <a:t>pull</a:t>
+            </a:r>
+            <a:endParaRPr lang="de-DE" sz="2800" b="1" dirty="0"/>
+          </a:p>
+        </p:txBody>
+      </p:sp>
+      <p:sp>
+        <p:nvSpPr>
+          <p:cNvPr id="105" name="Rounded Rectangle 25"/>
+          <p:cNvSpPr/>
+          <p:nvPr/>
+        </p:nvSpPr>
+        <p:spPr>
+          <a:xfrm>
+            <a:off x="7513125" y="827406"/>
+            <a:ext cx="1610387" cy="1610382"/>
+          </a:xfrm>
+          <a:prstGeom prst="ellipse">
+            <a:avLst/>
+          </a:prstGeom>
+          <a:solidFill>
+            <a:schemeClr val="accent1">
+              <a:lumMod val="75000"/>
+            </a:schemeClr>
+          </a:solidFill>
+          <a:ln w="76200">
+            <a:solidFill>
+              <a:schemeClr val="accent1">
+                <a:lumMod val="50000"/>
+              </a:schemeClr>
+            </a:solidFill>
+          </a:ln>
+        </p:spPr>
+        <p:style>
+          <a:lnRef idx="2">
+            <a:schemeClr val="accent1">
+              <a:shade val="50000"/>
+            </a:schemeClr>
+          </a:lnRef>
+          <a:fillRef idx="1">
+            <a:schemeClr val="accent1"/>
+          </a:fillRef>
+          <a:effectRef idx="0">
+            <a:schemeClr val="accent1"/>
+          </a:effectRef>
+          <a:fontRef idx="minor">
+            <a:schemeClr val="lt1"/>
+          </a:fontRef>
+        </p:style>
+        <p:txBody>
+          <a:bodyPr rtlCol="0" anchor="ctr"/>
+          <a:lstStyle/>
+          <a:p>
+            <a:pPr algn="ctr"/>
+            <a:r>
+              <a:rPr lang="en-US" sz="2000" b="1" dirty="0"/>
+              <a:t>Image</a:t>
+            </a:r>
+            <a:endParaRPr lang="de-DE" sz="2000" b="1" dirty="0"/>
+          </a:p>
+        </p:txBody>
+      </p:sp>
+      <p:sp>
+        <p:nvSpPr>
+          <p:cNvPr id="106" name="Rectangle 105"/>
+          <p:cNvSpPr/>
+          <p:nvPr/>
+        </p:nvSpPr>
+        <p:spPr>
+          <a:xfrm>
+            <a:off x="11122316" y="394996"/>
+            <a:ext cx="2791326" cy="2215991"/>
+          </a:xfrm>
+          <a:prstGeom prst="rect">
+            <a:avLst/>
+          </a:prstGeom>
+        </p:spPr>
+        <p:txBody>
+          <a:bodyPr wrap="square">
+            <a:spAutoFit/>
+          </a:bodyPr>
+          <a:lstStyle/>
+          <a:p>
+            <a:r>
+              <a:rPr lang="de-DE" sz="13800" dirty="0">
+                <a:solidFill>
+                  <a:schemeClr val="tx2">
+                    <a:lumMod val="60000"/>
+                    <a:lumOff val="40000"/>
+                  </a:schemeClr>
+                </a:solidFill>
+                <a:latin typeface="FontAwesome" pitchFamily="2" charset="0"/>
+              </a:rPr>
+              <a:t></a:t>
+            </a:r>
+            <a:endParaRPr lang="de-DE" sz="2400" dirty="0">
+              <a:latin typeface="FontAwesome" pitchFamily="2" charset="0"/>
+            </a:endParaRPr>
+          </a:p>
+        </p:txBody>
+      </p:sp>
+      <p:sp>
+        <p:nvSpPr>
+          <p:cNvPr id="107" name="Rectangle 106"/>
+          <p:cNvSpPr/>
+          <p:nvPr/>
+        </p:nvSpPr>
+        <p:spPr>
+          <a:xfrm>
+            <a:off x="11625198" y="826714"/>
+            <a:ext cx="1050288" cy="1708160"/>
+          </a:xfrm>
+          <a:prstGeom prst="rect">
+            <a:avLst/>
+          </a:prstGeom>
+        </p:spPr>
+        <p:txBody>
+          <a:bodyPr wrap="none">
+            <a:spAutoFit/>
+          </a:bodyPr>
+          <a:lstStyle/>
+          <a:p>
+            <a:r>
+              <a:rPr lang="de-DE" sz="10500" dirty="0">
+                <a:solidFill>
+                  <a:schemeClr val="tx2"/>
+                </a:solidFill>
+                <a:latin typeface="FontAwesome" pitchFamily="2" charset="0"/>
+              </a:rPr>
+              <a:t></a:t>
+            </a:r>
+            <a:endParaRPr lang="de-DE" sz="10500" dirty="0">
+              <a:solidFill>
+                <a:schemeClr val="tx2"/>
+              </a:solidFill>
+            </a:endParaRPr>
+          </a:p>
+        </p:txBody>
+      </p:sp>
+      <p:sp>
+        <p:nvSpPr>
+          <p:cNvPr id="108" name="TextBox 107"/>
+          <p:cNvSpPr txBox="1"/>
+          <p:nvPr/>
+        </p:nvSpPr>
+        <p:spPr>
+          <a:xfrm>
+            <a:off x="10673688" y="1626574"/>
+            <a:ext cx="2953724" cy="400110"/>
+          </a:xfrm>
+          <a:prstGeom prst="rect">
+            <a:avLst/>
+          </a:prstGeom>
+          <a:noFill/>
+        </p:spPr>
+        <p:txBody>
+          <a:bodyPr wrap="square" rtlCol="0">
+            <a:spAutoFit/>
+          </a:bodyPr>
+          <a:lstStyle/>
+          <a:p>
+            <a:pPr algn="ctr"/>
+            <a:r>
+              <a:rPr lang="en-US" sz="2000" b="1" dirty="0" err="1">
+                <a:solidFill>
+                  <a:schemeClr val="bg1"/>
+                </a:solidFill>
+              </a:rPr>
+              <a:t>Boxfuse</a:t>
+            </a:r>
+            <a:r>
+              <a:rPr lang="en-US" sz="2000" b="1" dirty="0">
+                <a:solidFill>
+                  <a:schemeClr val="bg1"/>
+                </a:solidFill>
+              </a:rPr>
+              <a:t> Vault</a:t>
+            </a:r>
+            <a:endParaRPr lang="de-DE" sz="2000" b="1" dirty="0">
+              <a:solidFill>
+                <a:schemeClr val="bg1"/>
+              </a:solidFill>
+            </a:endParaRPr>
+          </a:p>
+        </p:txBody>
+      </p:sp>
+    </p:spTree>
+    <p:extLst>
+      <p:ext uri="{BB962C8B-B14F-4D97-AF65-F5344CB8AC3E}">
+        <p14:creationId xmlns:p14="http://schemas.microsoft.com/office/powerpoint/2010/main" val="94253552"/>
       </p:ext>
     </p:extLst>
   </p:cSld>
@@ -9298,15 +12084,8 @@
           <a:p>
             <a:pPr algn="ctr"/>
             <a:r>
-              <a:rPr lang="en-US" sz="2000" b="1" dirty="0"/>
-              <a:t>Bootable</a:t>
-            </a:r>
-            <a:br>
-              <a:rPr lang="en-US" sz="2000" b="1" dirty="0"/>
-            </a:br>
-            <a:r>
-              <a:rPr lang="en-US" sz="2000" b="1" dirty="0"/>
-              <a:t>App</a:t>
+              <a:rPr lang="en-US" sz="2000" b="1" dirty="0" smtClean="0"/>
+              <a:t>Image</a:t>
             </a:r>
             <a:endParaRPr lang="de-DE" sz="2000" b="1" dirty="0"/>
           </a:p>

</xml_diff>

<commit_message>
Updated for client 1.2.0
</commit_message>
<xml_diff>
--- a/_sources/GettingStarted.pptx
+++ b/_sources/GettingStarted.pptx
@@ -255,7 +255,7 @@
           <a:p>
             <a:fld id="{9AA7D095-A676-4F6B-9416-D65D798F5244}" type="datetimeFigureOut">
               <a:rPr lang="de-DE" smtClean="0"/>
-              <a:t>03.03.2015</a:t>
+              <a:t>24.03.2015</a:t>
             </a:fld>
             <a:endParaRPr lang="de-DE"/>
           </a:p>
@@ -425,7 +425,7 @@
           <a:p>
             <a:fld id="{9AA7D095-A676-4F6B-9416-D65D798F5244}" type="datetimeFigureOut">
               <a:rPr lang="de-DE" smtClean="0"/>
-              <a:t>03.03.2015</a:t>
+              <a:t>24.03.2015</a:t>
             </a:fld>
             <a:endParaRPr lang="de-DE"/>
           </a:p>
@@ -605,7 +605,7 @@
           <a:p>
             <a:fld id="{9AA7D095-A676-4F6B-9416-D65D798F5244}" type="datetimeFigureOut">
               <a:rPr lang="de-DE" smtClean="0"/>
-              <a:t>03.03.2015</a:t>
+              <a:t>24.03.2015</a:t>
             </a:fld>
             <a:endParaRPr lang="de-DE"/>
           </a:p>
@@ -775,7 +775,7 @@
           <a:p>
             <a:fld id="{9AA7D095-A676-4F6B-9416-D65D798F5244}" type="datetimeFigureOut">
               <a:rPr lang="de-DE" smtClean="0"/>
-              <a:t>03.03.2015</a:t>
+              <a:t>24.03.2015</a:t>
             </a:fld>
             <a:endParaRPr lang="de-DE"/>
           </a:p>
@@ -1021,7 +1021,7 @@
           <a:p>
             <a:fld id="{9AA7D095-A676-4F6B-9416-D65D798F5244}" type="datetimeFigureOut">
               <a:rPr lang="de-DE" smtClean="0"/>
-              <a:t>03.03.2015</a:t>
+              <a:t>24.03.2015</a:t>
             </a:fld>
             <a:endParaRPr lang="de-DE"/>
           </a:p>
@@ -1253,7 +1253,7 @@
           <a:p>
             <a:fld id="{9AA7D095-A676-4F6B-9416-D65D798F5244}" type="datetimeFigureOut">
               <a:rPr lang="de-DE" smtClean="0"/>
-              <a:t>03.03.2015</a:t>
+              <a:t>24.03.2015</a:t>
             </a:fld>
             <a:endParaRPr lang="de-DE"/>
           </a:p>
@@ -1620,7 +1620,7 @@
           <a:p>
             <a:fld id="{9AA7D095-A676-4F6B-9416-D65D798F5244}" type="datetimeFigureOut">
               <a:rPr lang="de-DE" smtClean="0"/>
-              <a:t>03.03.2015</a:t>
+              <a:t>24.03.2015</a:t>
             </a:fld>
             <a:endParaRPr lang="de-DE"/>
           </a:p>
@@ -1738,7 +1738,7 @@
           <a:p>
             <a:fld id="{9AA7D095-A676-4F6B-9416-D65D798F5244}" type="datetimeFigureOut">
               <a:rPr lang="de-DE" smtClean="0"/>
-              <a:t>03.03.2015</a:t>
+              <a:t>24.03.2015</a:t>
             </a:fld>
             <a:endParaRPr lang="de-DE"/>
           </a:p>
@@ -1833,7 +1833,7 @@
           <a:p>
             <a:fld id="{9AA7D095-A676-4F6B-9416-D65D798F5244}" type="datetimeFigureOut">
               <a:rPr lang="de-DE" smtClean="0"/>
-              <a:t>03.03.2015</a:t>
+              <a:t>24.03.2015</a:t>
             </a:fld>
             <a:endParaRPr lang="de-DE"/>
           </a:p>
@@ -2110,7 +2110,7 @@
           <a:p>
             <a:fld id="{9AA7D095-A676-4F6B-9416-D65D798F5244}" type="datetimeFigureOut">
               <a:rPr lang="de-DE" smtClean="0"/>
-              <a:t>03.03.2015</a:t>
+              <a:t>24.03.2015</a:t>
             </a:fld>
             <a:endParaRPr lang="de-DE"/>
           </a:p>
@@ -2367,7 +2367,7 @@
           <a:p>
             <a:fld id="{9AA7D095-A676-4F6B-9416-D65D798F5244}" type="datetimeFigureOut">
               <a:rPr lang="de-DE" smtClean="0"/>
-              <a:t>03.03.2015</a:t>
+              <a:t>24.03.2015</a:t>
             </a:fld>
             <a:endParaRPr lang="de-DE"/>
           </a:p>
@@ -2580,7 +2580,7 @@
           <a:p>
             <a:fld id="{9AA7D095-A676-4F6B-9416-D65D798F5244}" type="datetimeFigureOut">
               <a:rPr lang="de-DE" smtClean="0"/>
-              <a:t>03.03.2015</a:t>
+              <a:t>24.03.2015</a:t>
             </a:fld>
             <a:endParaRPr lang="de-DE"/>
           </a:p>
@@ -11842,88 +11842,6 @@
           <a:chExt cx="0" cy="0"/>
         </a:xfrm>
       </p:grpSpPr>
-      <p:pic>
-        <p:nvPicPr>
-          <p:cNvPr id="6" name="Picture 5"/>
-          <p:cNvPicPr>
-            <a:picLocks noChangeAspect="1"/>
-          </p:cNvPicPr>
-          <p:nvPr/>
-        </p:nvPicPr>
-        <p:blipFill>
-          <a:blip r:embed="rId2"/>
-          <a:stretch>
-            <a:fillRect/>
-          </a:stretch>
-        </p:blipFill>
-        <p:spPr>
-          <a:xfrm>
-            <a:off x="7889919" y="4178898"/>
-            <a:ext cx="1655807" cy="705924"/>
-          </a:xfrm>
-          <a:prstGeom prst="rect">
-            <a:avLst/>
-          </a:prstGeom>
-        </p:spPr>
-      </p:pic>
-      <p:sp>
-        <p:nvSpPr>
-          <p:cNvPr id="79" name="Rounded Rectangle 75"/>
-          <p:cNvSpPr/>
-          <p:nvPr/>
-        </p:nvSpPr>
-        <p:spPr>
-          <a:xfrm>
-            <a:off x="8059356" y="2517568"/>
-            <a:ext cx="1441656" cy="1514439"/>
-          </a:xfrm>
-          <a:prstGeom prst="rect">
-            <a:avLst/>
-          </a:prstGeom>
-          <a:solidFill>
-            <a:schemeClr val="accent2">
-              <a:lumMod val="20000"/>
-              <a:lumOff val="80000"/>
-            </a:schemeClr>
-          </a:solidFill>
-          <a:ln w="76200">
-            <a:solidFill>
-              <a:schemeClr val="accent2">
-                <a:lumMod val="40000"/>
-                <a:lumOff val="60000"/>
-              </a:schemeClr>
-            </a:solidFill>
-          </a:ln>
-        </p:spPr>
-        <p:style>
-          <a:lnRef idx="2">
-            <a:schemeClr val="accent1">
-              <a:shade val="50000"/>
-            </a:schemeClr>
-          </a:lnRef>
-          <a:fillRef idx="1">
-            <a:schemeClr val="accent1"/>
-          </a:fillRef>
-          <a:effectRef idx="0">
-            <a:schemeClr val="accent1"/>
-          </a:effectRef>
-          <a:fontRef idx="minor">
-            <a:schemeClr val="lt1"/>
-          </a:fontRef>
-        </p:style>
-        <p:txBody>
-          <a:bodyPr rtlCol="0" anchor="ctr"/>
-          <a:lstStyle/>
-          <a:p>
-            <a:pPr algn="ctr"/>
-            <a:r>
-              <a:rPr lang="en-US" sz="2000" b="1" dirty="0"/>
-              <a:t>Instance</a:t>
-            </a:r>
-            <a:endParaRPr lang="de-DE" sz="2000" b="1" dirty="0"/>
-          </a:p>
-        </p:txBody>
-      </p:sp>
       <p:grpSp>
         <p:nvGrpSpPr>
           <p:cNvPr id="15" name="Group 14"/>
@@ -11932,7 +11850,7 @@
         </p:nvGrpSpPr>
         <p:grpSpPr>
           <a:xfrm>
-            <a:off x="1243542" y="4524327"/>
+            <a:off x="1169403" y="4820888"/>
             <a:ext cx="1496257" cy="679282"/>
             <a:chOff x="6448425" y="3933827"/>
             <a:chExt cx="2628900" cy="1409700"/>
@@ -12041,7 +11959,7 @@
         </p:nvSpPr>
         <p:spPr>
           <a:xfrm>
-            <a:off x="4366248" y="4999077"/>
+            <a:off x="4366248" y="4887865"/>
             <a:ext cx="1610387" cy="1610382"/>
           </a:xfrm>
           <a:prstGeom prst="ellipse">
@@ -12091,238 +12009,90 @@
           </a:p>
         </p:txBody>
       </p:sp>
-      <p:grpSp>
-        <p:nvGrpSpPr>
-          <p:cNvPr id="2" name="Group 1"/>
-          <p:cNvGrpSpPr/>
-          <p:nvPr/>
-        </p:nvGrpSpPr>
-        <p:grpSpPr>
-          <a:xfrm>
-            <a:off x="679928" y="36204"/>
-            <a:ext cx="3320724" cy="2215991"/>
-            <a:chOff x="-9574" y="-399819"/>
-            <a:chExt cx="3320724" cy="2215991"/>
-          </a:xfrm>
-        </p:grpSpPr>
-        <p:sp>
-          <p:nvSpPr>
-            <p:cNvPr id="5" name="Rectangle 4"/>
-            <p:cNvSpPr/>
-            <p:nvPr/>
-          </p:nvSpPr>
-          <p:spPr>
-            <a:xfrm>
-              <a:off x="-9574" y="-399819"/>
-              <a:ext cx="3320724" cy="2215991"/>
-            </a:xfrm>
-            <a:prstGeom prst="rect">
-              <a:avLst/>
-            </a:prstGeom>
-            <a:ln>
-              <a:noFill/>
-            </a:ln>
-          </p:spPr>
-          <p:txBody>
-            <a:bodyPr wrap="square">
-              <a:spAutoFit/>
-            </a:bodyPr>
-            <a:lstStyle/>
-            <a:p>
-              <a:pPr algn="ctr"/>
-              <a:r>
-                <a:rPr lang="de-DE" sz="13800" dirty="0">
-                  <a:solidFill>
-                    <a:schemeClr val="tx2">
-                      <a:lumMod val="60000"/>
-                      <a:lumOff val="40000"/>
-                    </a:schemeClr>
-                  </a:solidFill>
-                  <a:latin typeface="FontAwesome" pitchFamily="2" charset="0"/>
-                </a:rPr>
-                <a:t></a:t>
-              </a:r>
-              <a:endParaRPr lang="de-DE" sz="13800" dirty="0">
-                <a:solidFill>
-                  <a:schemeClr val="tx2">
-                    <a:lumMod val="60000"/>
-                    <a:lumOff val="40000"/>
-                  </a:schemeClr>
-                </a:solidFill>
-              </a:endParaRPr>
-            </a:p>
-          </p:txBody>
-        </p:sp>
-        <p:sp>
-          <p:nvSpPr>
-            <p:cNvPr id="28" name="TextBox 27"/>
-            <p:cNvSpPr txBox="1"/>
-            <p:nvPr/>
-          </p:nvSpPr>
-          <p:spPr>
-            <a:xfrm>
-              <a:off x="150461" y="418618"/>
-              <a:ext cx="2953724" cy="707886"/>
-            </a:xfrm>
-            <a:prstGeom prst="rect">
-              <a:avLst/>
-            </a:prstGeom>
-            <a:noFill/>
-          </p:spPr>
-          <p:txBody>
-            <a:bodyPr wrap="square" rtlCol="0">
-              <a:spAutoFit/>
-            </a:bodyPr>
-            <a:lstStyle/>
-            <a:p>
-              <a:pPr algn="ctr"/>
-              <a:r>
-                <a:rPr lang="en-US" sz="2000" b="1" dirty="0" err="1">
-                  <a:solidFill>
-                    <a:schemeClr val="bg1"/>
-                  </a:solidFill>
-                </a:rPr>
-                <a:t>Boxfuse</a:t>
-              </a:r>
-              <a:r>
-                <a:rPr lang="en-US" sz="2000" b="1" dirty="0">
-                  <a:solidFill>
-                    <a:schemeClr val="bg1"/>
-                  </a:solidFill>
-                </a:rPr>
-                <a:t/>
-              </a:r>
-              <a:br>
-                <a:rPr lang="en-US" sz="2000" b="1" dirty="0">
-                  <a:solidFill>
-                    <a:schemeClr val="bg1"/>
-                  </a:solidFill>
-                </a:rPr>
-              </a:br>
-              <a:r>
-                <a:rPr lang="en-US" sz="2000" b="1" dirty="0">
-                  <a:solidFill>
-                    <a:schemeClr val="bg1"/>
-                  </a:solidFill>
-                </a:rPr>
-                <a:t>Inventory</a:t>
-              </a:r>
-              <a:endParaRPr lang="de-DE" sz="2000" b="1" dirty="0">
-                <a:solidFill>
-                  <a:schemeClr val="bg1"/>
-                </a:solidFill>
-              </a:endParaRPr>
-            </a:p>
-          </p:txBody>
-        </p:sp>
-      </p:grpSp>
-      <p:grpSp>
-        <p:nvGrpSpPr>
-          <p:cNvPr id="9" name="Group 8"/>
-          <p:cNvGrpSpPr/>
-          <p:nvPr/>
-        </p:nvGrpSpPr>
-        <p:grpSpPr>
-          <a:xfrm>
-            <a:off x="3438379" y="464410"/>
-            <a:ext cx="1457473" cy="673166"/>
-            <a:chOff x="2334271" y="318043"/>
-            <a:chExt cx="1457473" cy="673166"/>
-          </a:xfrm>
-        </p:grpSpPr>
-        <p:cxnSp>
-          <p:nvCxnSpPr>
-            <p:cNvPr id="24" name="Straight Arrow Connector 23"/>
-            <p:cNvCxnSpPr/>
-            <p:nvPr/>
-          </p:nvCxnSpPr>
-          <p:spPr>
-            <a:xfrm flipV="1">
-              <a:off x="2346123" y="980728"/>
-              <a:ext cx="1445621" cy="10481"/>
-            </a:xfrm>
-            <a:prstGeom prst="straightConnector1">
-              <a:avLst/>
-            </a:prstGeom>
-            <a:ln w="142875">
-              <a:solidFill>
-                <a:schemeClr val="tx1">
-                  <a:lumMod val="50000"/>
-                  <a:lumOff val="50000"/>
-                </a:schemeClr>
-              </a:solidFill>
-              <a:tailEnd type="triangle"/>
-            </a:ln>
-          </p:spPr>
-          <p:style>
-            <a:lnRef idx="1">
-              <a:schemeClr val="accent1"/>
-            </a:lnRef>
-            <a:fillRef idx="0">
-              <a:schemeClr val="accent1"/>
-            </a:fillRef>
-            <a:effectRef idx="0">
-              <a:schemeClr val="accent1"/>
-            </a:effectRef>
-            <a:fontRef idx="minor">
-              <a:schemeClr val="tx1"/>
-            </a:fontRef>
-          </p:style>
-        </p:cxnSp>
-        <p:sp>
-          <p:nvSpPr>
-            <p:cNvPr id="7" name="TextBox 6"/>
-            <p:cNvSpPr txBox="1"/>
-            <p:nvPr/>
-          </p:nvSpPr>
-          <p:spPr>
-            <a:xfrm>
-              <a:off x="2334271" y="318043"/>
-              <a:ext cx="1408522" cy="523220"/>
-            </a:xfrm>
-            <a:prstGeom prst="rect">
-              <a:avLst/>
-            </a:prstGeom>
-            <a:noFill/>
-          </p:spPr>
-          <p:txBody>
-            <a:bodyPr wrap="square" rtlCol="0">
-              <a:spAutoFit/>
-            </a:bodyPr>
-            <a:lstStyle/>
-            <a:p>
-              <a:r>
-                <a:rPr lang="en-US" sz="2800" b="1" dirty="0"/>
-                <a:t>versions</a:t>
-              </a:r>
-              <a:endParaRPr lang="de-DE" sz="2800" b="1" dirty="0"/>
-            </a:p>
-          </p:txBody>
-        </p:sp>
-      </p:grpSp>
       <p:sp>
         <p:nvSpPr>
-          <p:cNvPr id="8" name="TextBox 7"/>
+          <p:cNvPr id="7" name="TextBox 6"/>
           <p:cNvSpPr txBox="1"/>
           <p:nvPr/>
         </p:nvSpPr>
         <p:spPr>
           <a:xfrm>
-            <a:off x="5162934" y="470097"/>
-            <a:ext cx="660840" cy="1338828"/>
+            <a:off x="1073759" y="0"/>
+            <a:ext cx="1624914" cy="523220"/>
           </a:xfrm>
           <a:prstGeom prst="rect">
             <a:avLst/>
           </a:prstGeom>
           <a:noFill/>
-          <a:ln>
+        </p:spPr>
+        <p:txBody>
+          <a:bodyPr wrap="square" rtlCol="0">
+            <a:spAutoFit/>
+          </a:bodyPr>
+          <a:lstStyle/>
+          <a:p>
+            <a:r>
+              <a:rPr lang="en-US" sz="2800" b="1" dirty="0" smtClean="0"/>
+              <a:t>inventory</a:t>
+            </a:r>
+            <a:endParaRPr lang="de-DE" sz="2800" b="1" dirty="0"/>
+          </a:p>
+        </p:txBody>
+      </p:sp>
+      <p:cxnSp>
+        <p:nvCxnSpPr>
+          <p:cNvPr id="36" name="Straight Arrow Connector 35"/>
+          <p:cNvCxnSpPr/>
+          <p:nvPr/>
+        </p:nvCxnSpPr>
+        <p:spPr>
+          <a:xfrm rot="19330395" flipV="1">
+            <a:off x="2661973" y="4548151"/>
+            <a:ext cx="1689754" cy="10481"/>
+          </a:xfrm>
+          <a:prstGeom prst="straightConnector1">
+            <a:avLst/>
+          </a:prstGeom>
+          <a:ln w="142875">
             <a:solidFill>
               <a:schemeClr val="tx1">
                 <a:lumMod val="50000"/>
                 <a:lumOff val="50000"/>
               </a:schemeClr>
             </a:solidFill>
+            <a:tailEnd type="triangle"/>
           </a:ln>
+        </p:spPr>
+        <p:style>
+          <a:lnRef idx="1">
+            <a:schemeClr val="accent1"/>
+          </a:lnRef>
+          <a:fillRef idx="0">
+            <a:schemeClr val="accent1"/>
+          </a:fillRef>
+          <a:effectRef idx="0">
+            <a:schemeClr val="accent1"/>
+          </a:effectRef>
+          <a:fontRef idx="minor">
+            <a:schemeClr val="tx1"/>
+          </a:fontRef>
+        </p:style>
+      </p:cxnSp>
+      <p:sp>
+        <p:nvSpPr>
+          <p:cNvPr id="37" name="TextBox 36"/>
+          <p:cNvSpPr txBox="1"/>
+          <p:nvPr/>
+        </p:nvSpPr>
+        <p:spPr>
+          <a:xfrm>
+            <a:off x="2725663" y="3587877"/>
+            <a:ext cx="1646390" cy="523220"/>
+          </a:xfrm>
+          <a:prstGeom prst="rect">
+            <a:avLst/>
+          </a:prstGeom>
+          <a:noFill/>
         </p:spPr>
         <p:txBody>
           <a:bodyPr wrap="square" rtlCol="0">
@@ -12330,148 +12100,15 @@
           </a:bodyPr>
           <a:lstStyle/>
           <a:p>
-            <a:pPr>
-              <a:lnSpc>
-                <a:spcPct val="90000"/>
-              </a:lnSpc>
-            </a:pPr>
+            <a:pPr algn="ctr"/>
             <a:r>
-              <a:rPr lang="en-US" dirty="0"/>
-              <a:t>4.3.5</a:t>
+              <a:rPr lang="en-US" sz="2800" b="1" dirty="0"/>
+              <a:t>fuse</a:t>
             </a:r>
-          </a:p>
-          <a:p>
-            <a:pPr>
-              <a:lnSpc>
-                <a:spcPct val="90000"/>
-              </a:lnSpc>
-            </a:pPr>
-            <a:r>
-              <a:rPr lang="en-US" dirty="0"/>
-              <a:t>4.4</a:t>
-            </a:r>
-          </a:p>
-          <a:p>
-            <a:pPr>
-              <a:lnSpc>
-                <a:spcPct val="90000"/>
-              </a:lnSpc>
-            </a:pPr>
-            <a:r>
-              <a:rPr lang="en-US" dirty="0"/>
-              <a:t>5.0</a:t>
-            </a:r>
-          </a:p>
-          <a:p>
-            <a:pPr>
-              <a:lnSpc>
-                <a:spcPct val="90000"/>
-              </a:lnSpc>
-            </a:pPr>
-            <a:r>
-              <a:rPr lang="en-US" dirty="0"/>
-              <a:t>5.0.1</a:t>
-            </a:r>
-          </a:p>
-          <a:p>
-            <a:pPr>
-              <a:lnSpc>
-                <a:spcPct val="90000"/>
-              </a:lnSpc>
-            </a:pPr>
-            <a:r>
-              <a:rPr lang="en-US" dirty="0"/>
-              <a:t>...</a:t>
-            </a:r>
-            <a:endParaRPr lang="de-DE" dirty="0"/>
+            <a:endParaRPr lang="de-DE" sz="2800" b="1" dirty="0"/>
           </a:p>
         </p:txBody>
       </p:sp>
-      <p:grpSp>
-        <p:nvGrpSpPr>
-          <p:cNvPr id="35" name="Group 34"/>
-          <p:cNvGrpSpPr/>
-          <p:nvPr/>
-        </p:nvGrpSpPr>
-        <p:grpSpPr>
-          <a:xfrm rot="19823684">
-            <a:off x="2596847" y="3678082"/>
-            <a:ext cx="1457473" cy="673166"/>
-            <a:chOff x="2334271" y="318043"/>
-            <a:chExt cx="1457473" cy="673166"/>
-          </a:xfrm>
-        </p:grpSpPr>
-        <p:cxnSp>
-          <p:nvCxnSpPr>
-            <p:cNvPr id="36" name="Straight Arrow Connector 35"/>
-            <p:cNvCxnSpPr/>
-            <p:nvPr/>
-          </p:nvCxnSpPr>
-          <p:spPr>
-            <a:xfrm flipV="1">
-              <a:off x="2346123" y="980728"/>
-              <a:ext cx="1445621" cy="10481"/>
-            </a:xfrm>
-            <a:prstGeom prst="straightConnector1">
-              <a:avLst/>
-            </a:prstGeom>
-            <a:ln w="142875">
-              <a:solidFill>
-                <a:schemeClr val="tx1">
-                  <a:lumMod val="50000"/>
-                  <a:lumOff val="50000"/>
-                </a:schemeClr>
-              </a:solidFill>
-              <a:tailEnd type="triangle"/>
-            </a:ln>
-          </p:spPr>
-          <p:style>
-            <a:lnRef idx="1">
-              <a:schemeClr val="accent1"/>
-            </a:lnRef>
-            <a:fillRef idx="0">
-              <a:schemeClr val="accent1"/>
-            </a:fillRef>
-            <a:effectRef idx="0">
-              <a:schemeClr val="accent1"/>
-            </a:effectRef>
-            <a:fontRef idx="minor">
-              <a:schemeClr val="tx1"/>
-            </a:fontRef>
-          </p:style>
-        </p:cxnSp>
-        <p:sp>
-          <p:nvSpPr>
-            <p:cNvPr id="37" name="TextBox 36"/>
-            <p:cNvSpPr txBox="1"/>
-            <p:nvPr/>
-          </p:nvSpPr>
-          <p:spPr>
-            <a:xfrm>
-              <a:off x="2334271" y="318043"/>
-              <a:ext cx="1408522" cy="523220"/>
-            </a:xfrm>
-            <a:prstGeom prst="rect">
-              <a:avLst/>
-            </a:prstGeom>
-            <a:noFill/>
-          </p:spPr>
-          <p:txBody>
-            <a:bodyPr wrap="square" rtlCol="0">
-              <a:spAutoFit/>
-            </a:bodyPr>
-            <a:lstStyle/>
-            <a:p>
-              <a:pPr algn="ctr"/>
-              <a:r>
-                <a:rPr lang="en-US" sz="2800" b="1" dirty="0"/>
-                <a:t>fuse</a:t>
-              </a:r>
-              <a:endParaRPr lang="de-DE" sz="2800" b="1" dirty="0"/>
-            </a:p>
-          </p:txBody>
-        </p:sp>
-      </p:grpSp>
       <p:sp>
         <p:nvSpPr>
           <p:cNvPr id="38" name="Rounded Rectangle 25"/>
@@ -12528,87 +12165,6 @@
           </a:p>
         </p:txBody>
       </p:sp>
-      <p:grpSp>
-        <p:nvGrpSpPr>
-          <p:cNvPr id="39" name="Group 38"/>
-          <p:cNvGrpSpPr/>
-          <p:nvPr/>
-        </p:nvGrpSpPr>
-        <p:grpSpPr>
-          <a:xfrm rot="1368666">
-            <a:off x="2913952" y="4807356"/>
-            <a:ext cx="1457473" cy="673166"/>
-            <a:chOff x="2334271" y="318043"/>
-            <a:chExt cx="1457473" cy="673166"/>
-          </a:xfrm>
-        </p:grpSpPr>
-        <p:cxnSp>
-          <p:nvCxnSpPr>
-            <p:cNvPr id="40" name="Straight Arrow Connector 39"/>
-            <p:cNvCxnSpPr/>
-            <p:nvPr/>
-          </p:nvCxnSpPr>
-          <p:spPr>
-            <a:xfrm flipV="1">
-              <a:off x="2346123" y="980728"/>
-              <a:ext cx="1445621" cy="10481"/>
-            </a:xfrm>
-            <a:prstGeom prst="straightConnector1">
-              <a:avLst/>
-            </a:prstGeom>
-            <a:ln w="142875">
-              <a:solidFill>
-                <a:schemeClr val="tx1">
-                  <a:lumMod val="50000"/>
-                  <a:lumOff val="50000"/>
-                </a:schemeClr>
-              </a:solidFill>
-              <a:tailEnd type="triangle"/>
-            </a:ln>
-          </p:spPr>
-          <p:style>
-            <a:lnRef idx="1">
-              <a:schemeClr val="accent1"/>
-            </a:lnRef>
-            <a:fillRef idx="0">
-              <a:schemeClr val="accent1"/>
-            </a:fillRef>
-            <a:effectRef idx="0">
-              <a:schemeClr val="accent1"/>
-            </a:effectRef>
-            <a:fontRef idx="minor">
-              <a:schemeClr val="tx1"/>
-            </a:fontRef>
-          </p:style>
-        </p:cxnSp>
-        <p:sp>
-          <p:nvSpPr>
-            <p:cNvPr id="41" name="TextBox 40"/>
-            <p:cNvSpPr txBox="1"/>
-            <p:nvPr/>
-          </p:nvSpPr>
-          <p:spPr>
-            <a:xfrm>
-              <a:off x="2334271" y="318043"/>
-              <a:ext cx="1408522" cy="523220"/>
-            </a:xfrm>
-            <a:prstGeom prst="rect">
-              <a:avLst/>
-            </a:prstGeom>
-            <a:noFill/>
-          </p:spPr>
-          <p:txBody>
-            <a:bodyPr wrap="square" rtlCol="0">
-              <a:spAutoFit/>
-            </a:bodyPr>
-            <a:lstStyle/>
-            <a:p>
-              <a:pPr algn="ctr"/>
-              <a:endParaRPr lang="de-DE" sz="2800" b="1" dirty="0"/>
-            </a:p>
-          </p:txBody>
-        </p:sp>
-      </p:grpSp>
       <p:sp>
         <p:nvSpPr>
           <p:cNvPr id="10" name="Cross 9"/>
@@ -12617,7 +12173,7 @@
         </p:nvSpPr>
         <p:spPr>
           <a:xfrm rot="2669759">
-            <a:off x="4059360" y="4723055"/>
+            <a:off x="4059360" y="4611843"/>
             <a:ext cx="2229507" cy="2238141"/>
           </a:xfrm>
           <a:prstGeom prst="plus">
@@ -12667,7 +12223,7 @@
         </p:nvSpPr>
         <p:spPr>
           <a:xfrm>
-            <a:off x="4465408" y="4955977"/>
+            <a:off x="4465408" y="4844765"/>
             <a:ext cx="1408522" cy="523220"/>
           </a:xfrm>
           <a:prstGeom prst="rect">
@@ -12699,7 +12255,7 @@
         <p:spPr>
           <a:xfrm>
             <a:off x="4256223" y="2952051"/>
-            <a:ext cx="1868556" cy="3839345"/>
+            <a:ext cx="1868556" cy="3739133"/>
           </a:xfrm>
           <a:prstGeom prst="roundRect">
             <a:avLst/>
@@ -12770,343 +12326,335 @@
           </a:p>
         </p:txBody>
       </p:sp>
-      <p:cxnSp>
-        <p:nvCxnSpPr>
-          <p:cNvPr id="67" name="Straight Arrow Connector 66"/>
-          <p:cNvCxnSpPr/>
-          <p:nvPr/>
-        </p:nvCxnSpPr>
-        <p:spPr>
-          <a:xfrm flipV="1">
-            <a:off x="6361072" y="3359792"/>
-            <a:ext cx="1370502" cy="10481"/>
-          </a:xfrm>
-          <a:prstGeom prst="straightConnector1">
-            <a:avLst/>
-          </a:prstGeom>
-          <a:ln w="142875">
-            <a:solidFill>
-              <a:schemeClr val="tx1">
-                <a:lumMod val="50000"/>
-                <a:lumOff val="50000"/>
-              </a:schemeClr>
-            </a:solidFill>
-            <a:tailEnd type="triangle"/>
-          </a:ln>
-        </p:spPr>
-        <p:style>
-          <a:lnRef idx="1">
-            <a:schemeClr val="accent1"/>
-          </a:lnRef>
-          <a:fillRef idx="0">
-            <a:schemeClr val="accent1"/>
-          </a:fillRef>
-          <a:effectRef idx="0">
-            <a:schemeClr val="accent1"/>
-          </a:effectRef>
-          <a:fontRef idx="minor">
-            <a:schemeClr val="tx1"/>
-          </a:fontRef>
-        </p:style>
-      </p:cxnSp>
       <p:grpSp>
         <p:nvGrpSpPr>
-          <p:cNvPr id="69" name="Group 68"/>
+          <p:cNvPr id="21" name="Group 20"/>
           <p:cNvGrpSpPr/>
           <p:nvPr/>
         </p:nvGrpSpPr>
         <p:grpSpPr>
-          <a:xfrm rot="19611581">
-            <a:off x="5999289" y="1881036"/>
-            <a:ext cx="1614441" cy="673166"/>
-            <a:chOff x="2334271" y="318043"/>
-            <a:chExt cx="1457473" cy="673166"/>
+          <a:xfrm>
+            <a:off x="7154693" y="2339074"/>
+            <a:ext cx="2806054" cy="5115953"/>
+            <a:chOff x="7080552" y="-132277"/>
+            <a:chExt cx="2806054" cy="5115953"/>
           </a:xfrm>
         </p:grpSpPr>
-        <p:cxnSp>
-          <p:nvCxnSpPr>
-            <p:cNvPr id="70" name="Straight Arrow Connector 69"/>
-            <p:cNvCxnSpPr/>
+        <p:sp>
+          <p:nvSpPr>
+            <p:cNvPr id="79" name="Rounded Rectangle 75"/>
+            <p:cNvSpPr/>
             <p:nvPr/>
-          </p:nvCxnSpPr>
+          </p:nvSpPr>
           <p:spPr>
-            <a:xfrm flipV="1">
-              <a:off x="2346123" y="980728"/>
-              <a:ext cx="1445621" cy="10481"/>
+            <a:xfrm>
+              <a:off x="8059356" y="2517568"/>
+              <a:ext cx="1441656" cy="1514439"/>
             </a:xfrm>
-            <a:prstGeom prst="straightConnector1">
+            <a:prstGeom prst="rect">
               <a:avLst/>
             </a:prstGeom>
-            <a:ln w="142875">
+            <a:solidFill>
+              <a:schemeClr val="accent2">
+                <a:lumMod val="20000"/>
+                <a:lumOff val="80000"/>
+              </a:schemeClr>
+            </a:solidFill>
+            <a:ln w="76200">
               <a:solidFill>
-                <a:schemeClr val="tx1">
-                  <a:lumMod val="50000"/>
-                  <a:lumOff val="50000"/>
+                <a:schemeClr val="accent2">
+                  <a:lumMod val="40000"/>
+                  <a:lumOff val="60000"/>
                 </a:schemeClr>
               </a:solidFill>
-              <a:tailEnd type="triangle"/>
             </a:ln>
           </p:spPr>
           <p:style>
-            <a:lnRef idx="1">
-              <a:schemeClr val="accent1"/>
+            <a:lnRef idx="2">
+              <a:schemeClr val="accent1">
+                <a:shade val="50000"/>
+              </a:schemeClr>
             </a:lnRef>
-            <a:fillRef idx="0">
+            <a:fillRef idx="1">
               <a:schemeClr val="accent1"/>
             </a:fillRef>
             <a:effectRef idx="0">
               <a:schemeClr val="accent1"/>
             </a:effectRef>
             <a:fontRef idx="minor">
-              <a:schemeClr val="tx1"/>
+              <a:schemeClr val="lt1"/>
             </a:fontRef>
           </p:style>
-        </p:cxnSp>
-        <p:sp>
-          <p:nvSpPr>
-            <p:cNvPr id="71" name="TextBox 70"/>
-            <p:cNvSpPr txBox="1"/>
-            <p:nvPr/>
-          </p:nvSpPr>
-          <p:spPr>
-            <a:xfrm>
-              <a:off x="2334271" y="318043"/>
-              <a:ext cx="1408522" cy="523220"/>
-            </a:xfrm>
-            <a:prstGeom prst="rect">
-              <a:avLst/>
-            </a:prstGeom>
-            <a:noFill/>
-          </p:spPr>
           <p:txBody>
-            <a:bodyPr wrap="square" rtlCol="0">
-              <a:spAutoFit/>
-            </a:bodyPr>
+            <a:bodyPr rtlCol="0" anchor="ctr"/>
             <a:lstStyle/>
             <a:p>
               <a:pPr algn="ctr"/>
-              <a:endParaRPr lang="de-DE" sz="2800" b="1" dirty="0"/>
+              <a:r>
+                <a:rPr lang="en-US" sz="2000" b="1" dirty="0"/>
+                <a:t>Instance</a:t>
+              </a:r>
+              <a:endParaRPr lang="de-DE" sz="2000" b="1" dirty="0"/>
             </a:p>
           </p:txBody>
         </p:sp>
+        <p:grpSp>
+          <p:nvGrpSpPr>
+            <p:cNvPr id="20" name="Group 19"/>
+            <p:cNvGrpSpPr/>
+            <p:nvPr/>
+          </p:nvGrpSpPr>
+          <p:grpSpPr>
+            <a:xfrm>
+              <a:off x="7080552" y="-132277"/>
+              <a:ext cx="2806054" cy="5115953"/>
+              <a:chOff x="7080552" y="-132277"/>
+              <a:chExt cx="2806054" cy="5115953"/>
+            </a:xfrm>
+          </p:grpSpPr>
+          <p:pic>
+            <p:nvPicPr>
+              <p:cNvPr id="6" name="Picture 5"/>
+              <p:cNvPicPr>
+                <a:picLocks noChangeAspect="1"/>
+              </p:cNvPicPr>
+              <p:nvPr/>
+            </p:nvPicPr>
+            <p:blipFill>
+              <a:blip r:embed="rId2"/>
+              <a:stretch>
+                <a:fillRect/>
+              </a:stretch>
+            </p:blipFill>
+            <p:spPr>
+              <a:xfrm>
+                <a:off x="7080552" y="4277752"/>
+                <a:ext cx="1655807" cy="705924"/>
+              </a:xfrm>
+              <a:prstGeom prst="rect">
+                <a:avLst/>
+              </a:prstGeom>
+            </p:spPr>
+          </p:pic>
+          <p:sp>
+            <p:nvSpPr>
+              <p:cNvPr id="72" name="TextBox 71"/>
+              <p:cNvSpPr txBox="1"/>
+              <p:nvPr/>
+            </p:nvSpPr>
+            <p:spPr>
+              <a:xfrm>
+                <a:off x="8017713" y="2503194"/>
+                <a:ext cx="1506963" cy="523220"/>
+              </a:xfrm>
+              <a:prstGeom prst="rect">
+                <a:avLst/>
+              </a:prstGeom>
+              <a:noFill/>
+            </p:spPr>
+            <p:txBody>
+              <a:bodyPr wrap="square" rtlCol="0">
+                <a:spAutoFit/>
+              </a:bodyPr>
+              <a:lstStyle/>
+              <a:p>
+                <a:pPr algn="ctr"/>
+                <a:r>
+                  <a:rPr lang="en-US" sz="2800" b="1" dirty="0"/>
+                  <a:t>kill</a:t>
+                </a:r>
+                <a:endParaRPr lang="de-DE" sz="2800" b="1" dirty="0"/>
+              </a:p>
+            </p:txBody>
+          </p:sp>
+          <p:sp>
+            <p:nvSpPr>
+              <p:cNvPr id="73" name="Rounded Rectangle 72"/>
+              <p:cNvSpPr/>
+              <p:nvPr/>
+            </p:nvSpPr>
+            <p:spPr>
+              <a:xfrm>
+                <a:off x="7809465" y="427153"/>
+                <a:ext cx="1896954" cy="3785823"/>
+              </a:xfrm>
+              <a:prstGeom prst="roundRect">
+                <a:avLst/>
+              </a:prstGeom>
+              <a:noFill/>
+              <a:ln w="57150">
+                <a:solidFill>
+                  <a:schemeClr val="bg1">
+                    <a:lumMod val="50000"/>
+                  </a:schemeClr>
+                </a:solidFill>
+                <a:prstDash val="dash"/>
+              </a:ln>
+            </p:spPr>
+            <p:style>
+              <a:lnRef idx="2">
+                <a:schemeClr val="accent1">
+                  <a:shade val="50000"/>
+                </a:schemeClr>
+              </a:lnRef>
+              <a:fillRef idx="1">
+                <a:schemeClr val="accent1"/>
+              </a:fillRef>
+              <a:effectRef idx="0">
+                <a:schemeClr val="accent1"/>
+              </a:effectRef>
+              <a:fontRef idx="minor">
+                <a:schemeClr val="lt1"/>
+              </a:fontRef>
+            </p:style>
+            <p:txBody>
+              <a:bodyPr rtlCol="0" anchor="ctr"/>
+              <a:lstStyle/>
+              <a:p>
+                <a:pPr algn="ctr"/>
+                <a:endParaRPr lang="de-DE"/>
+              </a:p>
+            </p:txBody>
+          </p:sp>
+          <p:sp>
+            <p:nvSpPr>
+              <p:cNvPr id="74" name="TextBox 73"/>
+              <p:cNvSpPr txBox="1"/>
+              <p:nvPr/>
+            </p:nvSpPr>
+            <p:spPr>
+              <a:xfrm>
+                <a:off x="8045163" y="-132277"/>
+                <a:ext cx="1408522" cy="523220"/>
+              </a:xfrm>
+              <a:prstGeom prst="rect">
+                <a:avLst/>
+              </a:prstGeom>
+              <a:noFill/>
+            </p:spPr>
+            <p:txBody>
+              <a:bodyPr wrap="square" rtlCol="0">
+                <a:spAutoFit/>
+              </a:bodyPr>
+              <a:lstStyle/>
+              <a:p>
+                <a:pPr algn="ctr"/>
+                <a:r>
+                  <a:rPr lang="en-US" sz="2800" b="1" dirty="0" err="1"/>
+                  <a:t>ps</a:t>
+                </a:r>
+                <a:endParaRPr lang="de-DE" sz="2800" b="1" dirty="0"/>
+              </a:p>
+            </p:txBody>
+          </p:sp>
+          <p:sp>
+            <p:nvSpPr>
+              <p:cNvPr id="76" name="Rounded Rectangle 75"/>
+              <p:cNvSpPr/>
+              <p:nvPr/>
+            </p:nvSpPr>
+            <p:spPr>
+              <a:xfrm>
+                <a:off x="8048943" y="604174"/>
+                <a:ext cx="1441656" cy="1514439"/>
+              </a:xfrm>
+              <a:prstGeom prst="rect">
+                <a:avLst/>
+              </a:prstGeom>
+              <a:solidFill>
+                <a:schemeClr val="accent2">
+                  <a:lumMod val="75000"/>
+                </a:schemeClr>
+              </a:solidFill>
+              <a:ln w="76200">
+                <a:solidFill>
+                  <a:schemeClr val="accent2">
+                    <a:lumMod val="50000"/>
+                  </a:schemeClr>
+                </a:solidFill>
+              </a:ln>
+            </p:spPr>
+            <p:style>
+              <a:lnRef idx="2">
+                <a:schemeClr val="accent1">
+                  <a:shade val="50000"/>
+                </a:schemeClr>
+              </a:lnRef>
+              <a:fillRef idx="1">
+                <a:schemeClr val="accent1"/>
+              </a:fillRef>
+              <a:effectRef idx="0">
+                <a:schemeClr val="accent1"/>
+              </a:effectRef>
+              <a:fontRef idx="minor">
+                <a:schemeClr val="lt1"/>
+              </a:fontRef>
+            </p:style>
+            <p:txBody>
+              <a:bodyPr rtlCol="0" anchor="ctr"/>
+              <a:lstStyle/>
+              <a:p>
+                <a:pPr algn="ctr"/>
+                <a:r>
+                  <a:rPr lang="en-US" sz="2000" b="1" dirty="0"/>
+                  <a:t>Instance</a:t>
+                </a:r>
+                <a:endParaRPr lang="de-DE" sz="2000" b="1" dirty="0"/>
+              </a:p>
+            </p:txBody>
+          </p:sp>
+          <p:sp>
+            <p:nvSpPr>
+              <p:cNvPr id="78" name="Cross 77"/>
+              <p:cNvSpPr/>
+              <p:nvPr/>
+            </p:nvSpPr>
+            <p:spPr>
+              <a:xfrm rot="2669759">
+                <a:off x="7657099" y="2146402"/>
+                <a:ext cx="2229507" cy="2238141"/>
+              </a:xfrm>
+              <a:prstGeom prst="plus">
+                <a:avLst>
+                  <a:gd name="adj" fmla="val 47174"/>
+                </a:avLst>
+              </a:prstGeom>
+              <a:solidFill>
+                <a:srgbClr val="FF0000"/>
+              </a:solidFill>
+              <a:ln>
+                <a:solidFill>
+                  <a:srgbClr val="C00000"/>
+                </a:solidFill>
+              </a:ln>
+            </p:spPr>
+            <p:style>
+              <a:lnRef idx="2">
+                <a:schemeClr val="accent1">
+                  <a:shade val="50000"/>
+                </a:schemeClr>
+              </a:lnRef>
+              <a:fillRef idx="1">
+                <a:schemeClr val="accent1"/>
+              </a:fillRef>
+              <a:effectRef idx="0">
+                <a:schemeClr val="accent1"/>
+              </a:effectRef>
+              <a:fontRef idx="minor">
+                <a:schemeClr val="lt1"/>
+              </a:fontRef>
+            </p:style>
+            <p:txBody>
+              <a:bodyPr rtlCol="0" anchor="ctr"/>
+              <a:lstStyle/>
+              <a:p>
+                <a:pPr algn="ctr"/>
+                <a:endParaRPr lang="de-DE"/>
+              </a:p>
+            </p:txBody>
+          </p:sp>
+        </p:grpSp>
       </p:grpSp>
-      <p:sp>
-        <p:nvSpPr>
-          <p:cNvPr id="72" name="TextBox 71"/>
-          <p:cNvSpPr txBox="1"/>
-          <p:nvPr/>
-        </p:nvSpPr>
-        <p:spPr>
-          <a:xfrm>
-            <a:off x="8017713" y="2503194"/>
-            <a:ext cx="1506963" cy="523220"/>
-          </a:xfrm>
-          <a:prstGeom prst="rect">
-            <a:avLst/>
-          </a:prstGeom>
-          <a:noFill/>
-        </p:spPr>
-        <p:txBody>
-          <a:bodyPr wrap="square" rtlCol="0">
-            <a:spAutoFit/>
-          </a:bodyPr>
-          <a:lstStyle/>
-          <a:p>
-            <a:pPr algn="ctr"/>
-            <a:r>
-              <a:rPr lang="en-US" sz="2800" b="1" dirty="0"/>
-              <a:t>kill</a:t>
-            </a:r>
-            <a:endParaRPr lang="de-DE" sz="2800" b="1" dirty="0"/>
-          </a:p>
-        </p:txBody>
-      </p:sp>
-      <p:sp>
-        <p:nvSpPr>
-          <p:cNvPr id="73" name="Rounded Rectangle 72"/>
-          <p:cNvSpPr/>
-          <p:nvPr/>
-        </p:nvSpPr>
-        <p:spPr>
-          <a:xfrm>
-            <a:off x="7809465" y="427153"/>
-            <a:ext cx="1896954" cy="3785823"/>
-          </a:xfrm>
-          <a:prstGeom prst="roundRect">
-            <a:avLst/>
-          </a:prstGeom>
-          <a:noFill/>
-          <a:ln w="57150">
-            <a:solidFill>
-              <a:schemeClr val="bg1">
-                <a:lumMod val="50000"/>
-              </a:schemeClr>
-            </a:solidFill>
-            <a:prstDash val="dash"/>
-          </a:ln>
-        </p:spPr>
-        <p:style>
-          <a:lnRef idx="2">
-            <a:schemeClr val="accent1">
-              <a:shade val="50000"/>
-            </a:schemeClr>
-          </a:lnRef>
-          <a:fillRef idx="1">
-            <a:schemeClr val="accent1"/>
-          </a:fillRef>
-          <a:effectRef idx="0">
-            <a:schemeClr val="accent1"/>
-          </a:effectRef>
-          <a:fontRef idx="minor">
-            <a:schemeClr val="lt1"/>
-          </a:fontRef>
-        </p:style>
-        <p:txBody>
-          <a:bodyPr rtlCol="0" anchor="ctr"/>
-          <a:lstStyle/>
-          <a:p>
-            <a:pPr algn="ctr"/>
-            <a:endParaRPr lang="de-DE"/>
-          </a:p>
-        </p:txBody>
-      </p:sp>
-      <p:sp>
-        <p:nvSpPr>
-          <p:cNvPr id="74" name="TextBox 73"/>
-          <p:cNvSpPr txBox="1"/>
-          <p:nvPr/>
-        </p:nvSpPr>
-        <p:spPr>
-          <a:xfrm>
-            <a:off x="8045163" y="-132277"/>
-            <a:ext cx="1408522" cy="523220"/>
-          </a:xfrm>
-          <a:prstGeom prst="rect">
-            <a:avLst/>
-          </a:prstGeom>
-          <a:noFill/>
-        </p:spPr>
-        <p:txBody>
-          <a:bodyPr wrap="square" rtlCol="0">
-            <a:spAutoFit/>
-          </a:bodyPr>
-          <a:lstStyle/>
-          <a:p>
-            <a:pPr algn="ctr"/>
-            <a:r>
-              <a:rPr lang="en-US" sz="2800" b="1" dirty="0" err="1"/>
-              <a:t>ps</a:t>
-            </a:r>
-            <a:endParaRPr lang="de-DE" sz="2800" b="1" dirty="0"/>
-          </a:p>
-        </p:txBody>
-      </p:sp>
-      <p:sp>
-        <p:nvSpPr>
-          <p:cNvPr id="76" name="Rounded Rectangle 75"/>
-          <p:cNvSpPr/>
-          <p:nvPr/>
-        </p:nvSpPr>
-        <p:spPr>
-          <a:xfrm>
-            <a:off x="8048943" y="604174"/>
-            <a:ext cx="1441656" cy="1514439"/>
-          </a:xfrm>
-          <a:prstGeom prst="rect">
-            <a:avLst/>
-          </a:prstGeom>
-          <a:solidFill>
-            <a:schemeClr val="accent2">
-              <a:lumMod val="75000"/>
-            </a:schemeClr>
-          </a:solidFill>
-          <a:ln w="76200">
-            <a:solidFill>
-              <a:schemeClr val="accent2">
-                <a:lumMod val="50000"/>
-              </a:schemeClr>
-            </a:solidFill>
-          </a:ln>
-        </p:spPr>
-        <p:style>
-          <a:lnRef idx="2">
-            <a:schemeClr val="accent1">
-              <a:shade val="50000"/>
-            </a:schemeClr>
-          </a:lnRef>
-          <a:fillRef idx="1">
-            <a:schemeClr val="accent1"/>
-          </a:fillRef>
-          <a:effectRef idx="0">
-            <a:schemeClr val="accent1"/>
-          </a:effectRef>
-          <a:fontRef idx="minor">
-            <a:schemeClr val="lt1"/>
-          </a:fontRef>
-        </p:style>
-        <p:txBody>
-          <a:bodyPr rtlCol="0" anchor="ctr"/>
-          <a:lstStyle/>
-          <a:p>
-            <a:pPr algn="ctr"/>
-            <a:r>
-              <a:rPr lang="en-US" sz="2000" b="1" dirty="0"/>
-              <a:t>Instance</a:t>
-            </a:r>
-            <a:endParaRPr lang="de-DE" sz="2000" b="1" dirty="0"/>
-          </a:p>
-        </p:txBody>
-      </p:sp>
-      <p:sp>
-        <p:nvSpPr>
-          <p:cNvPr id="78" name="Cross 77"/>
-          <p:cNvSpPr/>
-          <p:nvPr/>
-        </p:nvSpPr>
-        <p:spPr>
-          <a:xfrm rot="2669759">
-            <a:off x="7657099" y="2146402"/>
-            <a:ext cx="2229507" cy="2238141"/>
-          </a:xfrm>
-          <a:prstGeom prst="plus">
-            <a:avLst>
-              <a:gd name="adj" fmla="val 47174"/>
-            </a:avLst>
-          </a:prstGeom>
-          <a:solidFill>
-            <a:srgbClr val="FF0000"/>
-          </a:solidFill>
-          <a:ln>
-            <a:solidFill>
-              <a:srgbClr val="C00000"/>
-            </a:solidFill>
-          </a:ln>
-        </p:spPr>
-        <p:style>
-          <a:lnRef idx="2">
-            <a:schemeClr val="accent1">
-              <a:shade val="50000"/>
-            </a:schemeClr>
-          </a:lnRef>
-          <a:fillRef idx="1">
-            <a:schemeClr val="accent1"/>
-          </a:fillRef>
-          <a:effectRef idx="0">
-            <a:schemeClr val="accent1"/>
-          </a:effectRef>
-          <a:fontRef idx="minor">
-            <a:schemeClr val="lt1"/>
-          </a:fontRef>
-        </p:style>
-        <p:txBody>
-          <a:bodyPr rtlCol="0" anchor="ctr"/>
-          <a:lstStyle/>
-          <a:p>
-            <a:pPr algn="ctr"/>
-            <a:endParaRPr lang="de-DE"/>
-          </a:p>
-        </p:txBody>
-      </p:sp>
       <p:grpSp>
         <p:nvGrpSpPr>
           <p:cNvPr id="52" name="Group 51"/>
@@ -13115,10 +12663,10 @@
         </p:nvGrpSpPr>
         <p:grpSpPr>
           <a:xfrm>
-            <a:off x="9778364" y="1238207"/>
-            <a:ext cx="1381738" cy="673166"/>
-            <a:chOff x="2334271" y="318043"/>
-            <a:chExt cx="1457473" cy="673166"/>
+            <a:off x="9852504" y="3128790"/>
+            <a:ext cx="1554733" cy="592848"/>
+            <a:chOff x="2151794" y="398361"/>
+            <a:chExt cx="1639950" cy="592848"/>
           </a:xfrm>
         </p:grpSpPr>
         <p:cxnSp>
@@ -13168,7 +12716,7 @@
           </p:nvSpPr>
           <p:spPr>
             <a:xfrm>
-              <a:off x="2334271" y="318043"/>
+              <a:off x="2151794" y="398361"/>
               <a:ext cx="1408522" cy="523220"/>
             </a:xfrm>
             <a:prstGeom prst="rect">
@@ -13200,10 +12748,10 @@
         </p:nvGrpSpPr>
         <p:grpSpPr>
           <a:xfrm rot="2145737">
-            <a:off x="9865740" y="2637324"/>
-            <a:ext cx="1614441" cy="673166"/>
-            <a:chOff x="2334271" y="318043"/>
-            <a:chExt cx="1457473" cy="673166"/>
+            <a:off x="9959800" y="4509335"/>
+            <a:ext cx="1747595" cy="562033"/>
+            <a:chOff x="2214063" y="429176"/>
+            <a:chExt cx="1577681" cy="562033"/>
           </a:xfrm>
         </p:grpSpPr>
         <p:cxnSp>
@@ -13253,7 +12801,7 @@
           </p:nvSpPr>
           <p:spPr>
             <a:xfrm>
-              <a:off x="2334271" y="318043"/>
+              <a:off x="2214063" y="429176"/>
               <a:ext cx="1408522" cy="523220"/>
             </a:xfrm>
             <a:prstGeom prst="rect">
@@ -13299,7 +12847,7 @@
         </p:blipFill>
         <p:spPr>
           <a:xfrm>
-            <a:off x="11297689" y="1043141"/>
+            <a:off x="11544824" y="2853406"/>
             <a:ext cx="2294064" cy="1436808"/>
           </a:xfrm>
           <a:prstGeom prst="rect">
@@ -13330,7 +12878,7 @@
         </p:blipFill>
         <p:spPr bwMode="auto">
           <a:xfrm>
-            <a:off x="11356507" y="3170888"/>
+            <a:off x="11603642" y="4981153"/>
             <a:ext cx="2241408" cy="1631745"/>
           </a:xfrm>
           <a:prstGeom prst="rect">
@@ -13348,100 +12896,111 @@
           </a:extLst>
         </p:spPr>
       </p:pic>
-      <p:sp>
-        <p:nvSpPr>
-          <p:cNvPr id="81" name="TextBox 80"/>
-          <p:cNvSpPr txBox="1"/>
-          <p:nvPr/>
-        </p:nvSpPr>
-        <p:spPr>
-          <a:xfrm rot="19515035">
-            <a:off x="6045038" y="1975210"/>
-            <a:ext cx="1335331" cy="523220"/>
-          </a:xfrm>
-          <a:prstGeom prst="rect">
-            <a:avLst/>
-          </a:prstGeom>
-          <a:noFill/>
-        </p:spPr>
-        <p:txBody>
-          <a:bodyPr wrap="square" rtlCol="0">
-            <a:spAutoFit/>
-          </a:bodyPr>
-          <a:lstStyle/>
-          <a:p>
-            <a:pPr algn="ctr"/>
-            <a:r>
-              <a:rPr lang="en-US" sz="2800" b="1" dirty="0"/>
-              <a:t>run</a:t>
-            </a:r>
-            <a:endParaRPr lang="de-DE" sz="2800" b="1" dirty="0"/>
-          </a:p>
-        </p:txBody>
-      </p:sp>
       <p:grpSp>
         <p:nvGrpSpPr>
-          <p:cNvPr id="82" name="Group 81"/>
+          <p:cNvPr id="23" name="Group 22"/>
           <p:cNvGrpSpPr/>
           <p:nvPr/>
         </p:nvGrpSpPr>
         <p:grpSpPr>
-          <a:xfrm rot="2175025">
-            <a:off x="6432325" y="4611533"/>
-            <a:ext cx="2232998" cy="673166"/>
-            <a:chOff x="2334271" y="318043"/>
-            <a:chExt cx="1457473" cy="673166"/>
+          <a:xfrm rot="2019014">
+            <a:off x="6220420" y="3073224"/>
+            <a:ext cx="1560218" cy="962786"/>
+            <a:chOff x="6082866" y="1872306"/>
+            <a:chExt cx="1560218" cy="962786"/>
           </a:xfrm>
         </p:grpSpPr>
-        <p:cxnSp>
-          <p:nvCxnSpPr>
-            <p:cNvPr id="83" name="Straight Arrow Connector 82"/>
-            <p:cNvCxnSpPr/>
+        <p:grpSp>
+          <p:nvGrpSpPr>
+            <p:cNvPr id="69" name="Group 68"/>
+            <p:cNvGrpSpPr/>
             <p:nvPr/>
-          </p:nvCxnSpPr>
-          <p:spPr>
-            <a:xfrm flipV="1">
-              <a:off x="2346123" y="980728"/>
-              <a:ext cx="1445621" cy="10481"/>
+          </p:nvGrpSpPr>
+          <p:grpSpPr>
+            <a:xfrm rot="19611581">
+              <a:off x="6082866" y="1872306"/>
+              <a:ext cx="1560218" cy="962786"/>
+              <a:chOff x="2334271" y="318043"/>
+              <a:chExt cx="1408522" cy="962786"/>
             </a:xfrm>
-            <a:prstGeom prst="straightConnector1">
-              <a:avLst/>
-            </a:prstGeom>
-            <a:ln w="142875">
-              <a:solidFill>
-                <a:schemeClr val="tx1">
-                  <a:lumMod val="50000"/>
-                  <a:lumOff val="50000"/>
-                </a:schemeClr>
-              </a:solidFill>
-              <a:tailEnd type="triangle"/>
-            </a:ln>
-          </p:spPr>
-          <p:style>
-            <a:lnRef idx="1">
-              <a:schemeClr val="accent1"/>
-            </a:lnRef>
-            <a:fillRef idx="0">
-              <a:schemeClr val="accent1"/>
-            </a:fillRef>
-            <a:effectRef idx="0">
-              <a:schemeClr val="accent1"/>
-            </a:effectRef>
-            <a:fontRef idx="minor">
-              <a:schemeClr val="tx1"/>
-            </a:fontRef>
-          </p:style>
-        </p:cxnSp>
+          </p:grpSpPr>
+          <p:cxnSp>
+            <p:nvCxnSpPr>
+              <p:cNvPr id="70" name="Straight Arrow Connector 69"/>
+              <p:cNvCxnSpPr/>
+              <p:nvPr/>
+            </p:nvCxnSpPr>
+            <p:spPr>
+              <a:xfrm rot="21569405">
+                <a:off x="2417352" y="1280829"/>
+                <a:ext cx="1305142" cy="0"/>
+              </a:xfrm>
+              <a:prstGeom prst="straightConnector1">
+                <a:avLst/>
+              </a:prstGeom>
+              <a:ln w="142875">
+                <a:solidFill>
+                  <a:schemeClr val="tx1">
+                    <a:lumMod val="50000"/>
+                    <a:lumOff val="50000"/>
+                  </a:schemeClr>
+                </a:solidFill>
+                <a:tailEnd type="triangle"/>
+              </a:ln>
+            </p:spPr>
+            <p:style>
+              <a:lnRef idx="1">
+                <a:schemeClr val="accent1"/>
+              </a:lnRef>
+              <a:fillRef idx="0">
+                <a:schemeClr val="accent1"/>
+              </a:fillRef>
+              <a:effectRef idx="0">
+                <a:schemeClr val="accent1"/>
+              </a:effectRef>
+              <a:fontRef idx="minor">
+                <a:schemeClr val="tx1"/>
+              </a:fontRef>
+            </p:style>
+          </p:cxnSp>
+          <p:sp>
+            <p:nvSpPr>
+              <p:cNvPr id="71" name="TextBox 70"/>
+              <p:cNvSpPr txBox="1"/>
+              <p:nvPr/>
+            </p:nvSpPr>
+            <p:spPr>
+              <a:xfrm>
+                <a:off x="2334271" y="318043"/>
+                <a:ext cx="1408522" cy="523220"/>
+              </a:xfrm>
+              <a:prstGeom prst="rect">
+                <a:avLst/>
+              </a:prstGeom>
+              <a:noFill/>
+            </p:spPr>
+            <p:txBody>
+              <a:bodyPr wrap="square" rtlCol="0">
+                <a:spAutoFit/>
+              </a:bodyPr>
+              <a:lstStyle/>
+              <a:p>
+                <a:pPr algn="ctr"/>
+                <a:endParaRPr lang="de-DE" sz="2800" b="1" dirty="0"/>
+              </a:p>
+            </p:txBody>
+          </p:sp>
+        </p:grpSp>
         <p:sp>
           <p:nvSpPr>
-            <p:cNvPr id="84" name="TextBox 83"/>
+            <p:cNvPr id="81" name="TextBox 80"/>
             <p:cNvSpPr txBox="1"/>
             <p:nvPr/>
           </p:nvSpPr>
           <p:spPr>
-            <a:xfrm>
-              <a:off x="2334271" y="318043"/>
-              <a:ext cx="1408522" cy="523220"/>
+            <a:xfrm rot="19580986">
+              <a:off x="6232411" y="2229781"/>
+              <a:ext cx="1335331" cy="523220"/>
             </a:xfrm>
             <a:prstGeom prst="rect">
               <a:avLst/>
@@ -13455,6 +13014,10 @@
             <a:lstStyle/>
             <a:p>
               <a:pPr algn="ctr"/>
+              <a:r>
+                <a:rPr lang="en-US" sz="2800" b="1" dirty="0" smtClean="0"/>
+                <a:t>run</a:t>
+              </a:r>
               <a:endParaRPr lang="de-DE" sz="2800" b="1" dirty="0"/>
             </a:p>
           </p:txBody>
@@ -13483,8 +13046,8 @@
         </p:blipFill>
         <p:spPr bwMode="auto">
           <a:xfrm>
-            <a:off x="11353758" y="6017712"/>
-            <a:ext cx="2220092" cy="838701"/>
+            <a:off x="8944190" y="6833789"/>
+            <a:ext cx="1466377" cy="553964"/>
           </a:xfrm>
           <a:prstGeom prst="rect">
             <a:avLst/>
@@ -13501,193 +13064,107 @@
           </a:extLst>
         </p:spPr>
       </p:pic>
-      <p:sp>
-        <p:nvSpPr>
-          <p:cNvPr id="16" name="Rectangle 15"/>
-          <p:cNvSpPr/>
-          <p:nvPr/>
-        </p:nvSpPr>
-        <p:spPr>
-          <a:xfrm>
-            <a:off x="7926012" y="5317103"/>
-            <a:ext cx="2791326" cy="2215991"/>
-          </a:xfrm>
-          <a:prstGeom prst="rect">
-            <a:avLst/>
-          </a:prstGeom>
-        </p:spPr>
-        <p:txBody>
-          <a:bodyPr wrap="square">
-            <a:spAutoFit/>
-          </a:bodyPr>
-          <a:lstStyle/>
-          <a:p>
-            <a:r>
-              <a:rPr lang="de-DE" sz="13800" dirty="0">
-                <a:solidFill>
-                  <a:schemeClr val="tx2">
-                    <a:lumMod val="60000"/>
-                    <a:lumOff val="40000"/>
-                  </a:schemeClr>
-                </a:solidFill>
-                <a:latin typeface="FontAwesome" pitchFamily="2" charset="0"/>
-              </a:rPr>
-              <a:t></a:t>
-            </a:r>
-            <a:endParaRPr lang="de-DE" sz="2400" dirty="0">
-              <a:latin typeface="FontAwesome" pitchFamily="2" charset="0"/>
-            </a:endParaRPr>
-          </a:p>
-        </p:txBody>
-      </p:sp>
-      <p:sp>
-        <p:nvSpPr>
-          <p:cNvPr id="17" name="Rectangle 16"/>
-          <p:cNvSpPr/>
-          <p:nvPr/>
-        </p:nvSpPr>
-        <p:spPr>
-          <a:xfrm>
-            <a:off x="8428894" y="5748821"/>
-            <a:ext cx="1050288" cy="1708160"/>
-          </a:xfrm>
-          <a:prstGeom prst="rect">
-            <a:avLst/>
-          </a:prstGeom>
-        </p:spPr>
-        <p:txBody>
-          <a:bodyPr wrap="none">
-            <a:spAutoFit/>
-          </a:bodyPr>
-          <a:lstStyle/>
-          <a:p>
-            <a:r>
-              <a:rPr lang="de-DE" sz="10500" dirty="0">
-                <a:solidFill>
-                  <a:schemeClr val="tx2"/>
-                </a:solidFill>
-                <a:latin typeface="FontAwesome" pitchFamily="2" charset="0"/>
-              </a:rPr>
-              <a:t></a:t>
-            </a:r>
-            <a:endParaRPr lang="de-DE" sz="10500" dirty="0">
-              <a:solidFill>
-                <a:schemeClr val="tx2"/>
-              </a:solidFill>
-            </a:endParaRPr>
-          </a:p>
-        </p:txBody>
-      </p:sp>
-      <p:sp>
-        <p:nvSpPr>
-          <p:cNvPr id="86" name="TextBox 85"/>
-          <p:cNvSpPr txBox="1"/>
-          <p:nvPr/>
-        </p:nvSpPr>
-        <p:spPr>
-          <a:xfrm>
-            <a:off x="7477384" y="6548681"/>
-            <a:ext cx="2953724" cy="400110"/>
-          </a:xfrm>
-          <a:prstGeom prst="rect">
-            <a:avLst/>
-          </a:prstGeom>
-          <a:noFill/>
-        </p:spPr>
-        <p:txBody>
-          <a:bodyPr wrap="square" rtlCol="0">
-            <a:spAutoFit/>
-          </a:bodyPr>
-          <a:lstStyle/>
-          <a:p>
-            <a:pPr algn="ctr"/>
-            <a:r>
-              <a:rPr lang="en-US" sz="2000" b="1" dirty="0" err="1">
-                <a:solidFill>
-                  <a:schemeClr val="bg1"/>
-                </a:solidFill>
-              </a:rPr>
-              <a:t>Boxfuse</a:t>
-            </a:r>
-            <a:r>
-              <a:rPr lang="en-US" sz="2000" b="1" dirty="0">
-                <a:solidFill>
-                  <a:schemeClr val="bg1"/>
-                </a:solidFill>
-              </a:rPr>
-              <a:t> Vault</a:t>
-            </a:r>
-            <a:endParaRPr lang="de-DE" sz="2000" b="1" dirty="0">
-              <a:solidFill>
-                <a:schemeClr val="bg1"/>
-              </a:solidFill>
-            </a:endParaRPr>
-          </a:p>
-        </p:txBody>
-      </p:sp>
       <p:grpSp>
         <p:nvGrpSpPr>
-          <p:cNvPr id="87" name="Group 86"/>
+          <p:cNvPr id="18" name="Group 17"/>
           <p:cNvGrpSpPr/>
           <p:nvPr/>
         </p:nvGrpSpPr>
         <p:grpSpPr>
-          <a:xfrm rot="12978250">
-            <a:off x="5862829" y="5461764"/>
-            <a:ext cx="2232998" cy="673166"/>
-            <a:chOff x="2334271" y="318043"/>
-            <a:chExt cx="1457473" cy="673166"/>
+          <a:xfrm>
+            <a:off x="7123670" y="-126049"/>
+            <a:ext cx="3239954" cy="2215991"/>
+            <a:chOff x="7477384" y="5317103"/>
+            <a:chExt cx="3239954" cy="2215991"/>
           </a:xfrm>
         </p:grpSpPr>
-        <p:cxnSp>
-          <p:nvCxnSpPr>
-            <p:cNvPr id="88" name="Straight Arrow Connector 87"/>
-            <p:cNvCxnSpPr/>
+        <p:sp>
+          <p:nvSpPr>
+            <p:cNvPr id="16" name="Rectangle 15"/>
+            <p:cNvSpPr/>
             <p:nvPr/>
-          </p:nvCxnSpPr>
+          </p:nvSpPr>
           <p:spPr>
-            <a:xfrm flipV="1">
-              <a:off x="2346123" y="980728"/>
-              <a:ext cx="1445621" cy="10481"/>
+            <a:xfrm>
+              <a:off x="7926012" y="5317103"/>
+              <a:ext cx="2791326" cy="2215991"/>
             </a:xfrm>
-            <a:prstGeom prst="straightConnector1">
+            <a:prstGeom prst="rect">
               <a:avLst/>
             </a:prstGeom>
-            <a:ln w="142875">
-              <a:solidFill>
-                <a:schemeClr val="tx1">
-                  <a:lumMod val="50000"/>
-                  <a:lumOff val="50000"/>
-                </a:schemeClr>
-              </a:solidFill>
-              <a:tailEnd type="triangle"/>
-            </a:ln>
           </p:spPr>
-          <p:style>
-            <a:lnRef idx="1">
-              <a:schemeClr val="accent1"/>
-            </a:lnRef>
-            <a:fillRef idx="0">
-              <a:schemeClr val="accent1"/>
-            </a:fillRef>
-            <a:effectRef idx="0">
-              <a:schemeClr val="accent1"/>
-            </a:effectRef>
-            <a:fontRef idx="minor">
-              <a:schemeClr val="tx1"/>
-            </a:fontRef>
-          </p:style>
-        </p:cxnSp>
+          <p:txBody>
+            <a:bodyPr wrap="square">
+              <a:spAutoFit/>
+            </a:bodyPr>
+            <a:lstStyle/>
+            <a:p>
+              <a:r>
+                <a:rPr lang="de-DE" sz="13800" dirty="0">
+                  <a:solidFill>
+                    <a:schemeClr val="tx2">
+                      <a:lumMod val="60000"/>
+                      <a:lumOff val="40000"/>
+                    </a:schemeClr>
+                  </a:solidFill>
+                  <a:latin typeface="FontAwesome" pitchFamily="2" charset="0"/>
+                </a:rPr>
+                <a:t></a:t>
+              </a:r>
+              <a:endParaRPr lang="de-DE" sz="2400" dirty="0">
+                <a:latin typeface="FontAwesome" pitchFamily="2" charset="0"/>
+              </a:endParaRPr>
+            </a:p>
+          </p:txBody>
+        </p:sp>
         <p:sp>
           <p:nvSpPr>
-            <p:cNvPr id="89" name="TextBox 88"/>
+            <p:cNvPr id="17" name="Rectangle 16"/>
+            <p:cNvSpPr/>
+            <p:nvPr/>
+          </p:nvSpPr>
+          <p:spPr>
+            <a:xfrm>
+              <a:off x="8428894" y="5748821"/>
+              <a:ext cx="1050288" cy="1708160"/>
+            </a:xfrm>
+            <a:prstGeom prst="rect">
+              <a:avLst/>
+            </a:prstGeom>
+          </p:spPr>
+          <p:txBody>
+            <a:bodyPr wrap="none">
+              <a:spAutoFit/>
+            </a:bodyPr>
+            <a:lstStyle/>
+            <a:p>
+              <a:r>
+                <a:rPr lang="de-DE" sz="10500" dirty="0">
+                  <a:solidFill>
+                    <a:schemeClr val="tx2"/>
+                  </a:solidFill>
+                  <a:latin typeface="FontAwesome" pitchFamily="2" charset="0"/>
+                </a:rPr>
+                <a:t></a:t>
+              </a:r>
+              <a:endParaRPr lang="de-DE" sz="10500" dirty="0">
+                <a:solidFill>
+                  <a:schemeClr val="tx2"/>
+                </a:solidFill>
+              </a:endParaRPr>
+            </a:p>
+          </p:txBody>
+        </p:sp>
+        <p:sp>
+          <p:nvSpPr>
+            <p:cNvPr id="86" name="TextBox 85"/>
             <p:cNvSpPr txBox="1"/>
             <p:nvPr/>
           </p:nvSpPr>
           <p:spPr>
             <a:xfrm>
-              <a:off x="2334271" y="318043"/>
-              <a:ext cx="1408522" cy="523220"/>
+              <a:off x="7477384" y="6548681"/>
+              <a:ext cx="2953724" cy="400110"/>
             </a:xfrm>
             <a:prstGeom prst="rect">
               <a:avLst/>
@@ -13701,143 +13178,285 @@
             <a:lstStyle/>
             <a:p>
               <a:pPr algn="ctr"/>
+              <a:r>
+                <a:rPr lang="en-US" sz="2000" b="1" dirty="0" err="1">
+                  <a:solidFill>
+                    <a:schemeClr val="bg1"/>
+                  </a:solidFill>
+                </a:rPr>
+                <a:t>Boxfuse</a:t>
+              </a:r>
+              <a:r>
+                <a:rPr lang="en-US" sz="2000" b="1" dirty="0">
+                  <a:solidFill>
+                    <a:schemeClr val="bg1"/>
+                  </a:solidFill>
+                </a:rPr>
+                <a:t> Vault</a:t>
+              </a:r>
+              <a:endParaRPr lang="de-DE" sz="2000" b="1" dirty="0">
+                <a:solidFill>
+                  <a:schemeClr val="bg1"/>
+                </a:solidFill>
+              </a:endParaRPr>
+            </a:p>
+          </p:txBody>
+        </p:sp>
+      </p:grpSp>
+      <p:grpSp>
+        <p:nvGrpSpPr>
+          <p:cNvPr id="4" name="Group 3"/>
+          <p:cNvGrpSpPr/>
+          <p:nvPr/>
+        </p:nvGrpSpPr>
+        <p:grpSpPr>
+          <a:xfrm rot="16619105">
+            <a:off x="5632642" y="950897"/>
+            <a:ext cx="2158000" cy="1871099"/>
+            <a:chOff x="6193846" y="4323361"/>
+            <a:chExt cx="2158000" cy="1871099"/>
+          </a:xfrm>
+        </p:grpSpPr>
+        <p:grpSp>
+          <p:nvGrpSpPr>
+            <p:cNvPr id="82" name="Group 81"/>
+            <p:cNvGrpSpPr/>
+            <p:nvPr/>
+          </p:nvGrpSpPr>
+          <p:grpSpPr>
+            <a:xfrm rot="2175025">
+              <a:off x="6193846" y="4598766"/>
+              <a:ext cx="2158000" cy="1595694"/>
+              <a:chOff x="2386580" y="381655"/>
+              <a:chExt cx="1408522" cy="1595694"/>
+            </a:xfrm>
+          </p:grpSpPr>
+          <p:cxnSp>
+            <p:nvCxnSpPr>
+              <p:cNvPr id="83" name="Straight Arrow Connector 82"/>
+              <p:cNvCxnSpPr/>
+              <p:nvPr/>
+            </p:nvCxnSpPr>
+            <p:spPr>
+              <a:xfrm rot="2805870" flipV="1">
+                <a:off x="2177790" y="805057"/>
+                <a:ext cx="1595694" cy="748889"/>
+              </a:xfrm>
+              <a:prstGeom prst="straightConnector1">
+                <a:avLst/>
+              </a:prstGeom>
+              <a:ln w="142875">
+                <a:solidFill>
+                  <a:schemeClr val="tx1">
+                    <a:lumMod val="50000"/>
+                    <a:lumOff val="50000"/>
+                  </a:schemeClr>
+                </a:solidFill>
+                <a:tailEnd type="triangle"/>
+              </a:ln>
+            </p:spPr>
+            <p:style>
+              <a:lnRef idx="1">
+                <a:schemeClr val="accent1"/>
+              </a:lnRef>
+              <a:fillRef idx="0">
+                <a:schemeClr val="accent1"/>
+              </a:fillRef>
+              <a:effectRef idx="0">
+                <a:schemeClr val="accent1"/>
+              </a:effectRef>
+              <a:fontRef idx="minor">
+                <a:schemeClr val="tx1"/>
+              </a:fontRef>
+            </p:style>
+          </p:cxnSp>
+          <p:sp>
+            <p:nvSpPr>
+              <p:cNvPr id="84" name="TextBox 83"/>
+              <p:cNvSpPr txBox="1"/>
+              <p:nvPr/>
+            </p:nvSpPr>
+            <p:spPr>
+              <a:xfrm rot="587581">
+                <a:off x="2386580" y="412299"/>
+                <a:ext cx="1408522" cy="523220"/>
+              </a:xfrm>
+              <a:prstGeom prst="rect">
+                <a:avLst/>
+              </a:prstGeom>
+              <a:noFill/>
+            </p:spPr>
+            <p:txBody>
+              <a:bodyPr wrap="square" rtlCol="0">
+                <a:spAutoFit/>
+              </a:bodyPr>
+              <a:lstStyle/>
+              <a:p>
+                <a:pPr algn="ctr"/>
+                <a:endParaRPr lang="de-DE" sz="2800" b="1" dirty="0"/>
+              </a:p>
+            </p:txBody>
+          </p:sp>
+        </p:grpSp>
+        <p:sp>
+          <p:nvSpPr>
+            <p:cNvPr id="90" name="TextBox 89"/>
+            <p:cNvSpPr txBox="1"/>
+            <p:nvPr/>
+          </p:nvSpPr>
+          <p:spPr>
+            <a:xfrm rot="2888955">
+              <a:off x="6614341" y="4729417"/>
+              <a:ext cx="1335331" cy="523220"/>
+            </a:xfrm>
+            <a:prstGeom prst="rect">
+              <a:avLst/>
+            </a:prstGeom>
+            <a:noFill/>
+          </p:spPr>
+          <p:txBody>
+            <a:bodyPr wrap="square" rtlCol="0">
+              <a:spAutoFit/>
+            </a:bodyPr>
+            <a:lstStyle/>
+            <a:p>
+              <a:pPr algn="ctr"/>
+              <a:r>
+                <a:rPr lang="en-US" sz="2800" b="1" dirty="0"/>
+                <a:t>push</a:t>
+              </a:r>
               <a:endParaRPr lang="de-DE" sz="2800" b="1" dirty="0"/>
             </a:p>
           </p:txBody>
         </p:sp>
       </p:grpSp>
-      <p:sp>
-        <p:nvSpPr>
-          <p:cNvPr id="90" name="TextBox 89"/>
-          <p:cNvSpPr txBox="1"/>
+      <p:grpSp>
+        <p:nvGrpSpPr>
+          <p:cNvPr id="12" name="Group 11"/>
+          <p:cNvGrpSpPr/>
           <p:nvPr/>
-        </p:nvSpPr>
-        <p:spPr>
-          <a:xfrm rot="2208853">
-            <a:off x="6835111" y="4702368"/>
-            <a:ext cx="1335331" cy="523220"/>
-          </a:xfrm>
-          <a:prstGeom prst="rect">
-            <a:avLst/>
-          </a:prstGeom>
-          <a:noFill/>
-        </p:spPr>
-        <p:txBody>
-          <a:bodyPr wrap="square" rtlCol="0">
-            <a:spAutoFit/>
-          </a:bodyPr>
-          <a:lstStyle/>
-          <a:p>
-            <a:pPr algn="ctr"/>
-            <a:r>
-              <a:rPr lang="en-US" sz="2800" b="1" dirty="0"/>
-              <a:t>push</a:t>
-            </a:r>
-            <a:endParaRPr lang="de-DE" sz="2800" b="1" dirty="0"/>
-          </a:p>
-        </p:txBody>
-      </p:sp>
-      <p:sp>
-        <p:nvSpPr>
-          <p:cNvPr id="91" name="TextBox 90"/>
-          <p:cNvSpPr txBox="1"/>
-          <p:nvPr/>
-        </p:nvSpPr>
-        <p:spPr>
-          <a:xfrm rot="2208853">
-            <a:off x="6434058" y="5492442"/>
-            <a:ext cx="1335331" cy="523220"/>
-          </a:xfrm>
-          <a:prstGeom prst="rect">
-            <a:avLst/>
-          </a:prstGeom>
-          <a:noFill/>
-        </p:spPr>
-        <p:txBody>
-          <a:bodyPr wrap="square" rtlCol="0">
-            <a:spAutoFit/>
-          </a:bodyPr>
-          <a:lstStyle/>
-          <a:p>
-            <a:pPr algn="ctr"/>
-            <a:r>
-              <a:rPr lang="en-US" sz="2800" b="1" dirty="0"/>
-              <a:t>pull</a:t>
-            </a:r>
-            <a:endParaRPr lang="de-DE" sz="2800" b="1" dirty="0"/>
-          </a:p>
-        </p:txBody>
-      </p:sp>
-      <p:sp>
-        <p:nvSpPr>
-          <p:cNvPr id="92" name="TextBox 91"/>
-          <p:cNvSpPr txBox="1"/>
-          <p:nvPr/>
-        </p:nvSpPr>
-        <p:spPr>
-          <a:xfrm>
-            <a:off x="9875090" y="5841357"/>
-            <a:ext cx="1335331" cy="523220"/>
-          </a:xfrm>
-          <a:prstGeom prst="rect">
-            <a:avLst/>
-          </a:prstGeom>
-          <a:noFill/>
-        </p:spPr>
-        <p:txBody>
-          <a:bodyPr wrap="square" rtlCol="0">
-            <a:spAutoFit/>
-          </a:bodyPr>
-          <a:lstStyle/>
-          <a:p>
-            <a:pPr algn="ctr"/>
-            <a:r>
-              <a:rPr lang="en-US" sz="2800" b="1" dirty="0"/>
-              <a:t>deploy</a:t>
-            </a:r>
-            <a:endParaRPr lang="de-DE" sz="2800" b="1" dirty="0"/>
-          </a:p>
-        </p:txBody>
-      </p:sp>
-      <p:cxnSp>
-        <p:nvCxnSpPr>
-          <p:cNvPr id="94" name="Straight Arrow Connector 93"/>
-          <p:cNvCxnSpPr/>
-          <p:nvPr/>
-        </p:nvCxnSpPr>
-        <p:spPr>
-          <a:xfrm flipV="1">
-            <a:off x="9917937" y="6529041"/>
-            <a:ext cx="1370502" cy="10481"/>
-          </a:xfrm>
-          <a:prstGeom prst="straightConnector1">
-            <a:avLst/>
-          </a:prstGeom>
-          <a:ln w="142875">
-            <a:solidFill>
-              <a:schemeClr val="tx1">
-                <a:lumMod val="50000"/>
-                <a:lumOff val="50000"/>
-              </a:schemeClr>
-            </a:solidFill>
-            <a:tailEnd type="triangle"/>
-          </a:ln>
-        </p:spPr>
-        <p:style>
-          <a:lnRef idx="1">
-            <a:schemeClr val="accent1"/>
-          </a:lnRef>
-          <a:fillRef idx="0">
-            <a:schemeClr val="accent1"/>
-          </a:fillRef>
-          <a:effectRef idx="0">
-            <a:schemeClr val="accent1"/>
-          </a:effectRef>
-          <a:fontRef idx="minor">
-            <a:schemeClr val="tx1"/>
-          </a:fontRef>
-        </p:style>
-      </p:cxnSp>
+        </p:nvGrpSpPr>
+        <p:grpSpPr>
+          <a:xfrm rot="17651277">
+            <a:off x="5756927" y="1995803"/>
+            <a:ext cx="2158000" cy="1172414"/>
+            <a:chOff x="6053845" y="5107898"/>
+            <a:chExt cx="2158000" cy="1172414"/>
+          </a:xfrm>
+        </p:grpSpPr>
+        <p:grpSp>
+          <p:nvGrpSpPr>
+            <p:cNvPr id="87" name="Group 86"/>
+            <p:cNvGrpSpPr/>
+            <p:nvPr/>
+          </p:nvGrpSpPr>
+          <p:grpSpPr>
+            <a:xfrm rot="12978250">
+              <a:off x="6053845" y="5107898"/>
+              <a:ext cx="2158000" cy="1089658"/>
+              <a:chOff x="2334271" y="318043"/>
+              <a:chExt cx="1408522" cy="1089658"/>
+            </a:xfrm>
+          </p:grpSpPr>
+          <p:cxnSp>
+            <p:nvCxnSpPr>
+              <p:cNvPr id="88" name="Straight Arrow Connector 87"/>
+              <p:cNvCxnSpPr/>
+              <p:nvPr/>
+            </p:nvCxnSpPr>
+            <p:spPr>
+              <a:xfrm rot="12570473" flipH="1">
+                <a:off x="2440716" y="440897"/>
+                <a:ext cx="937653" cy="966804"/>
+              </a:xfrm>
+              <a:prstGeom prst="straightConnector1">
+                <a:avLst/>
+              </a:prstGeom>
+              <a:ln w="142875">
+                <a:solidFill>
+                  <a:schemeClr val="tx1">
+                    <a:lumMod val="50000"/>
+                    <a:lumOff val="50000"/>
+                  </a:schemeClr>
+                </a:solidFill>
+                <a:tailEnd type="triangle"/>
+              </a:ln>
+            </p:spPr>
+            <p:style>
+              <a:lnRef idx="1">
+                <a:schemeClr val="accent1"/>
+              </a:lnRef>
+              <a:fillRef idx="0">
+                <a:schemeClr val="accent1"/>
+              </a:fillRef>
+              <a:effectRef idx="0">
+                <a:schemeClr val="accent1"/>
+              </a:effectRef>
+              <a:fontRef idx="minor">
+                <a:schemeClr val="tx1"/>
+              </a:fontRef>
+            </p:style>
+          </p:cxnSp>
+          <p:sp>
+            <p:nvSpPr>
+              <p:cNvPr id="89" name="TextBox 88"/>
+              <p:cNvSpPr txBox="1"/>
+              <p:nvPr/>
+            </p:nvSpPr>
+            <p:spPr>
+              <a:xfrm>
+                <a:off x="2334271" y="318043"/>
+                <a:ext cx="1408522" cy="523220"/>
+              </a:xfrm>
+              <a:prstGeom prst="rect">
+                <a:avLst/>
+              </a:prstGeom>
+              <a:noFill/>
+            </p:spPr>
+            <p:txBody>
+              <a:bodyPr wrap="square" rtlCol="0">
+                <a:spAutoFit/>
+              </a:bodyPr>
+              <a:lstStyle/>
+              <a:p>
+                <a:pPr algn="ctr"/>
+                <a:endParaRPr lang="de-DE" sz="2800" b="1" dirty="0"/>
+              </a:p>
+            </p:txBody>
+          </p:sp>
+        </p:grpSp>
+        <p:sp>
+          <p:nvSpPr>
+            <p:cNvPr id="91" name="TextBox 90"/>
+            <p:cNvSpPr txBox="1"/>
+            <p:nvPr/>
+          </p:nvSpPr>
+          <p:spPr>
+            <a:xfrm rot="1861538">
+              <a:off x="6613888" y="5757092"/>
+              <a:ext cx="1335331" cy="523220"/>
+            </a:xfrm>
+            <a:prstGeom prst="rect">
+              <a:avLst/>
+            </a:prstGeom>
+            <a:noFill/>
+          </p:spPr>
+          <p:txBody>
+            <a:bodyPr wrap="square" rtlCol="0">
+              <a:spAutoFit/>
+            </a:bodyPr>
+            <a:lstStyle/>
+            <a:p>
+              <a:pPr algn="ctr"/>
+              <a:r>
+                <a:rPr lang="en-US" sz="2800" b="1" dirty="0"/>
+                <a:t>pull</a:t>
+              </a:r>
+              <a:endParaRPr lang="de-DE" sz="2800" b="1" dirty="0"/>
+            </a:p>
+          </p:txBody>
+        </p:sp>
+      </p:grpSp>
       <p:grpSp>
         <p:nvGrpSpPr>
           <p:cNvPr id="58" name="Group 57"/>
@@ -13845,9 +13464,9 @@
           <p:nvPr/>
         </p:nvGrpSpPr>
         <p:grpSpPr>
-          <a:xfrm rot="2301636">
-            <a:off x="2823745" y="1860669"/>
-            <a:ext cx="1683509" cy="673166"/>
+          <a:xfrm rot="2542460">
+            <a:off x="2685358" y="2530805"/>
+            <a:ext cx="1920481" cy="673166"/>
             <a:chOff x="2334271" y="318043"/>
             <a:chExt cx="1457473" cy="673166"/>
           </a:xfrm>
@@ -13915,6 +13534,407 @@
             <a:p>
               <a:pPr algn="ctr"/>
               <a:endParaRPr lang="de-DE" sz="2800" b="1" dirty="0"/>
+            </a:p>
+          </p:txBody>
+        </p:sp>
+      </p:grpSp>
+      <p:grpSp>
+        <p:nvGrpSpPr>
+          <p:cNvPr id="32" name="Group 31"/>
+          <p:cNvGrpSpPr/>
+          <p:nvPr/>
+        </p:nvGrpSpPr>
+        <p:grpSpPr>
+          <a:xfrm>
+            <a:off x="265977" y="2266599"/>
+            <a:ext cx="3320724" cy="1569660"/>
+            <a:chOff x="272155" y="308052"/>
+            <a:chExt cx="3320724" cy="1569661"/>
+          </a:xfrm>
+        </p:grpSpPr>
+        <p:sp>
+          <p:nvSpPr>
+            <p:cNvPr id="5" name="Rectangle 4"/>
+            <p:cNvSpPr/>
+            <p:nvPr/>
+          </p:nvSpPr>
+          <p:spPr>
+            <a:xfrm>
+              <a:off x="272155" y="308052"/>
+              <a:ext cx="3320724" cy="1569661"/>
+            </a:xfrm>
+            <a:prstGeom prst="rect">
+              <a:avLst/>
+            </a:prstGeom>
+            <a:ln>
+              <a:noFill/>
+            </a:ln>
+          </p:spPr>
+          <p:txBody>
+            <a:bodyPr wrap="square">
+              <a:spAutoFit/>
+            </a:bodyPr>
+            <a:lstStyle/>
+            <a:p>
+              <a:pPr algn="ctr"/>
+              <a:r>
+                <a:rPr lang="de-DE" sz="9600" dirty="0">
+                  <a:solidFill>
+                    <a:schemeClr val="tx2">
+                      <a:lumMod val="60000"/>
+                      <a:lumOff val="40000"/>
+                    </a:schemeClr>
+                  </a:solidFill>
+                  <a:latin typeface="FontAwesome" pitchFamily="2" charset="0"/>
+                </a:rPr>
+                <a:t></a:t>
+              </a:r>
+              <a:endParaRPr lang="de-DE" sz="9600" dirty="0">
+                <a:solidFill>
+                  <a:schemeClr val="tx2">
+                    <a:lumMod val="60000"/>
+                    <a:lumOff val="40000"/>
+                  </a:schemeClr>
+                </a:solidFill>
+              </a:endParaRPr>
+            </a:p>
+          </p:txBody>
+        </p:sp>
+        <p:sp>
+          <p:nvSpPr>
+            <p:cNvPr id="80" name="Rectangle 79"/>
+            <p:cNvSpPr/>
+            <p:nvPr/>
+          </p:nvSpPr>
+          <p:spPr>
+            <a:xfrm>
+              <a:off x="1505505" y="526031"/>
+              <a:ext cx="777777" cy="1200330"/>
+            </a:xfrm>
+            <a:prstGeom prst="rect">
+              <a:avLst/>
+            </a:prstGeom>
+          </p:spPr>
+          <p:txBody>
+            <a:bodyPr wrap="none">
+              <a:spAutoFit/>
+            </a:bodyPr>
+            <a:lstStyle/>
+            <a:p>
+              <a:r>
+                <a:rPr lang="de-DE" sz="7200" dirty="0">
+                  <a:solidFill>
+                    <a:schemeClr val="tx2"/>
+                  </a:solidFill>
+                  <a:latin typeface="FontAwesome" pitchFamily="2" charset="0"/>
+                </a:rPr>
+                <a:t></a:t>
+              </a:r>
+              <a:endParaRPr lang="de-DE" sz="7200" dirty="0">
+                <a:solidFill>
+                  <a:schemeClr val="tx2"/>
+                </a:solidFill>
+              </a:endParaRPr>
+            </a:p>
+          </p:txBody>
+        </p:sp>
+        <p:sp>
+          <p:nvSpPr>
+            <p:cNvPr id="28" name="TextBox 27"/>
+            <p:cNvSpPr txBox="1"/>
+            <p:nvPr/>
+          </p:nvSpPr>
+          <p:spPr>
+            <a:xfrm>
+              <a:off x="432189" y="953494"/>
+              <a:ext cx="2953723" cy="584775"/>
+            </a:xfrm>
+            <a:prstGeom prst="rect">
+              <a:avLst/>
+            </a:prstGeom>
+            <a:noFill/>
+          </p:spPr>
+          <p:txBody>
+            <a:bodyPr wrap="square" rtlCol="0">
+              <a:spAutoFit/>
+            </a:bodyPr>
+            <a:lstStyle/>
+            <a:p>
+              <a:pPr algn="ctr"/>
+              <a:r>
+                <a:rPr lang="en-US" sz="1600" b="1" dirty="0" err="1" smtClean="0">
+                  <a:solidFill>
+                    <a:schemeClr val="bg1"/>
+                  </a:solidFill>
+                </a:rPr>
+                <a:t>Boxfuse</a:t>
+              </a:r>
+              <a:endParaRPr lang="en-US" sz="1600" b="1" dirty="0">
+                <a:solidFill>
+                  <a:schemeClr val="bg1"/>
+                </a:solidFill>
+              </a:endParaRPr>
+            </a:p>
+            <a:p>
+              <a:pPr algn="ctr"/>
+              <a:r>
+                <a:rPr lang="en-US" sz="1600" b="1" dirty="0" smtClean="0">
+                  <a:solidFill>
+                    <a:schemeClr val="bg1"/>
+                  </a:solidFill>
+                </a:rPr>
+                <a:t>Inventory</a:t>
+              </a:r>
+              <a:endParaRPr lang="de-DE" sz="1600" b="1" dirty="0">
+                <a:solidFill>
+                  <a:schemeClr val="bg1"/>
+                </a:solidFill>
+              </a:endParaRPr>
+            </a:p>
+          </p:txBody>
+        </p:sp>
+      </p:grpSp>
+      <p:sp>
+        <p:nvSpPr>
+          <p:cNvPr id="93" name="Rounded Rectangle 92"/>
+          <p:cNvSpPr/>
+          <p:nvPr/>
+        </p:nvSpPr>
+        <p:spPr>
+          <a:xfrm>
+            <a:off x="1040524" y="520263"/>
+            <a:ext cx="1686910" cy="1901662"/>
+          </a:xfrm>
+          <a:prstGeom prst="roundRect">
+            <a:avLst/>
+          </a:prstGeom>
+          <a:noFill/>
+          <a:ln w="57150">
+            <a:solidFill>
+              <a:schemeClr val="bg1">
+                <a:lumMod val="50000"/>
+              </a:schemeClr>
+            </a:solidFill>
+            <a:prstDash val="dash"/>
+          </a:ln>
+        </p:spPr>
+        <p:style>
+          <a:lnRef idx="2">
+            <a:schemeClr val="accent1">
+              <a:shade val="50000"/>
+            </a:schemeClr>
+          </a:lnRef>
+          <a:fillRef idx="1">
+            <a:schemeClr val="accent1"/>
+          </a:fillRef>
+          <a:effectRef idx="0">
+            <a:schemeClr val="accent1"/>
+          </a:effectRef>
+          <a:fontRef idx="minor">
+            <a:schemeClr val="lt1"/>
+          </a:fontRef>
+        </p:style>
+        <p:txBody>
+          <a:bodyPr rtlCol="0" anchor="ctr"/>
+          <a:lstStyle/>
+          <a:p>
+            <a:pPr algn="ctr"/>
+            <a:endParaRPr lang="de-DE"/>
+          </a:p>
+        </p:txBody>
+      </p:sp>
+      <p:grpSp>
+        <p:nvGrpSpPr>
+          <p:cNvPr id="34" name="Group 33"/>
+          <p:cNvGrpSpPr/>
+          <p:nvPr/>
+        </p:nvGrpSpPr>
+        <p:grpSpPr>
+          <a:xfrm>
+            <a:off x="1155127" y="1575483"/>
+            <a:ext cx="1423555" cy="685800"/>
+            <a:chOff x="1155127" y="1365420"/>
+            <a:chExt cx="1423555" cy="685800"/>
+          </a:xfrm>
+        </p:grpSpPr>
+        <p:sp>
+          <p:nvSpPr>
+            <p:cNvPr id="33" name="Snip Diagonal Corner Rectangle 32"/>
+            <p:cNvSpPr/>
+            <p:nvPr/>
+          </p:nvSpPr>
+          <p:spPr>
+            <a:xfrm>
+              <a:off x="1167714" y="1365420"/>
+              <a:ext cx="1402491" cy="685800"/>
+            </a:xfrm>
+            <a:prstGeom prst="snip2DiagRect">
+              <a:avLst/>
+            </a:prstGeom>
+            <a:ln w="76200"/>
+          </p:spPr>
+          <p:style>
+            <a:lnRef idx="2">
+              <a:schemeClr val="accent4">
+                <a:shade val="50000"/>
+              </a:schemeClr>
+            </a:lnRef>
+            <a:fillRef idx="1">
+              <a:schemeClr val="accent4"/>
+            </a:fillRef>
+            <a:effectRef idx="0">
+              <a:schemeClr val="accent4"/>
+            </a:effectRef>
+            <a:fontRef idx="minor">
+              <a:schemeClr val="lt1"/>
+            </a:fontRef>
+          </p:style>
+          <p:txBody>
+            <a:bodyPr rtlCol="0" anchor="ctr"/>
+            <a:lstStyle/>
+            <a:p>
+              <a:pPr algn="ctr"/>
+              <a:endParaRPr lang="de-DE" dirty="0"/>
+            </a:p>
+          </p:txBody>
+        </p:sp>
+        <p:sp>
+          <p:nvSpPr>
+            <p:cNvPr id="95" name="TextBox 94"/>
+            <p:cNvSpPr txBox="1"/>
+            <p:nvPr/>
+          </p:nvSpPr>
+          <p:spPr>
+            <a:xfrm>
+              <a:off x="1155127" y="1506035"/>
+              <a:ext cx="1423555" cy="400110"/>
+            </a:xfrm>
+            <a:prstGeom prst="rect">
+              <a:avLst/>
+            </a:prstGeom>
+            <a:noFill/>
+            <a:ln w="76200">
+              <a:noFill/>
+            </a:ln>
+          </p:spPr>
+          <p:txBody>
+            <a:bodyPr wrap="square" rtlCol="0">
+              <a:spAutoFit/>
+            </a:bodyPr>
+            <a:lstStyle/>
+            <a:p>
+              <a:pPr algn="ctr"/>
+              <a:r>
+                <a:rPr lang="en-US" sz="2000" b="1" dirty="0" smtClean="0">
+                  <a:solidFill>
+                    <a:schemeClr val="bg1"/>
+                  </a:solidFill>
+                </a:rPr>
+                <a:t>Component</a:t>
+              </a:r>
+              <a:endParaRPr lang="de-DE" sz="2400" b="1" dirty="0">
+                <a:solidFill>
+                  <a:schemeClr val="bg1"/>
+                </a:solidFill>
+              </a:endParaRPr>
+            </a:p>
+          </p:txBody>
+        </p:sp>
+      </p:grpSp>
+      <p:grpSp>
+        <p:nvGrpSpPr>
+          <p:cNvPr id="42" name="Group 41"/>
+          <p:cNvGrpSpPr/>
+          <p:nvPr/>
+        </p:nvGrpSpPr>
+        <p:grpSpPr>
+          <a:xfrm>
+            <a:off x="1159246" y="720809"/>
+            <a:ext cx="1423555" cy="685800"/>
+            <a:chOff x="1159246" y="646669"/>
+            <a:chExt cx="1423555" cy="685800"/>
+          </a:xfrm>
+        </p:grpSpPr>
+        <p:sp>
+          <p:nvSpPr>
+            <p:cNvPr id="96" name="Snip Diagonal Corner Rectangle 95"/>
+            <p:cNvSpPr/>
+            <p:nvPr/>
+          </p:nvSpPr>
+          <p:spPr>
+            <a:xfrm>
+              <a:off x="1171833" y="646669"/>
+              <a:ext cx="1402491" cy="685800"/>
+            </a:xfrm>
+            <a:prstGeom prst="snip2DiagRect">
+              <a:avLst/>
+            </a:prstGeom>
+            <a:ln w="76200"/>
+          </p:spPr>
+          <p:style>
+            <a:lnRef idx="2">
+              <a:schemeClr val="accent4">
+                <a:shade val="50000"/>
+              </a:schemeClr>
+            </a:lnRef>
+            <a:fillRef idx="1">
+              <a:schemeClr val="accent4"/>
+            </a:fillRef>
+            <a:effectRef idx="0">
+              <a:schemeClr val="accent4"/>
+            </a:effectRef>
+            <a:fontRef idx="minor">
+              <a:schemeClr val="lt1"/>
+            </a:fontRef>
+          </p:style>
+          <p:txBody>
+            <a:bodyPr rtlCol="0" anchor="ctr"/>
+            <a:lstStyle/>
+            <a:p>
+              <a:pPr algn="ctr"/>
+              <a:endParaRPr lang="de-DE" dirty="0"/>
+            </a:p>
+          </p:txBody>
+        </p:sp>
+        <p:sp>
+          <p:nvSpPr>
+            <p:cNvPr id="97" name="TextBox 96"/>
+            <p:cNvSpPr txBox="1"/>
+            <p:nvPr/>
+          </p:nvSpPr>
+          <p:spPr>
+            <a:xfrm>
+              <a:off x="1159246" y="793462"/>
+              <a:ext cx="1423555" cy="400110"/>
+            </a:xfrm>
+            <a:prstGeom prst="rect">
+              <a:avLst/>
+            </a:prstGeom>
+            <a:noFill/>
+            <a:ln w="76200">
+              <a:noFill/>
+            </a:ln>
+          </p:spPr>
+          <p:txBody>
+            <a:bodyPr wrap="square" rtlCol="0">
+              <a:spAutoFit/>
+            </a:bodyPr>
+            <a:lstStyle/>
+            <a:p>
+              <a:pPr algn="ctr"/>
+              <a:r>
+                <a:rPr lang="en-US" sz="2000" b="1" dirty="0" smtClean="0">
+                  <a:solidFill>
+                    <a:schemeClr val="bg1"/>
+                  </a:solidFill>
+                </a:rPr>
+                <a:t>Component</a:t>
+              </a:r>
+              <a:endParaRPr lang="de-DE" sz="2400" b="1" dirty="0">
+                <a:solidFill>
+                  <a:schemeClr val="bg1"/>
+                </a:solidFill>
+              </a:endParaRPr>
             </a:p>
           </p:txBody>
         </p:sp>

</xml_diff>

<commit_message>
Added dropwizard aws post
</commit_message>
<xml_diff>
--- a/_sources/GettingStarted.pptx
+++ b/_sources/GettingStarted.pptx
@@ -19,6 +19,8 @@
     <p:sldId id="266" r:id="rId13"/>
     <p:sldId id="267" r:id="rId14"/>
     <p:sldId id="268" r:id="rId15"/>
+    <p:sldId id="270" r:id="rId16"/>
+    <p:sldId id="271" r:id="rId17"/>
   </p:sldIdLst>
   <p:sldSz cx="14400213" cy="7559675"/>
   <p:notesSz cx="6858000" cy="9144000"/>
@@ -256,7 +258,7 @@
           <a:p>
             <a:fld id="{9AA7D095-A676-4F6B-9416-D65D798F5244}" type="datetimeFigureOut">
               <a:rPr lang="de-DE" smtClean="0"/>
-              <a:t>15.04.2015</a:t>
+              <a:t>25.04.2015</a:t>
             </a:fld>
             <a:endParaRPr lang="de-DE"/>
           </a:p>
@@ -426,7 +428,7 @@
           <a:p>
             <a:fld id="{9AA7D095-A676-4F6B-9416-D65D798F5244}" type="datetimeFigureOut">
               <a:rPr lang="de-DE" smtClean="0"/>
-              <a:t>15.04.2015</a:t>
+              <a:t>25.04.2015</a:t>
             </a:fld>
             <a:endParaRPr lang="de-DE"/>
           </a:p>
@@ -606,7 +608,7 @@
           <a:p>
             <a:fld id="{9AA7D095-A676-4F6B-9416-D65D798F5244}" type="datetimeFigureOut">
               <a:rPr lang="de-DE" smtClean="0"/>
-              <a:t>15.04.2015</a:t>
+              <a:t>25.04.2015</a:t>
             </a:fld>
             <a:endParaRPr lang="de-DE"/>
           </a:p>
@@ -776,7 +778,7 @@
           <a:p>
             <a:fld id="{9AA7D095-A676-4F6B-9416-D65D798F5244}" type="datetimeFigureOut">
               <a:rPr lang="de-DE" smtClean="0"/>
-              <a:t>15.04.2015</a:t>
+              <a:t>25.04.2015</a:t>
             </a:fld>
             <a:endParaRPr lang="de-DE"/>
           </a:p>
@@ -1022,7 +1024,7 @@
           <a:p>
             <a:fld id="{9AA7D095-A676-4F6B-9416-D65D798F5244}" type="datetimeFigureOut">
               <a:rPr lang="de-DE" smtClean="0"/>
-              <a:t>15.04.2015</a:t>
+              <a:t>25.04.2015</a:t>
             </a:fld>
             <a:endParaRPr lang="de-DE"/>
           </a:p>
@@ -1254,7 +1256,7 @@
           <a:p>
             <a:fld id="{9AA7D095-A676-4F6B-9416-D65D798F5244}" type="datetimeFigureOut">
               <a:rPr lang="de-DE" smtClean="0"/>
-              <a:t>15.04.2015</a:t>
+              <a:t>25.04.2015</a:t>
             </a:fld>
             <a:endParaRPr lang="de-DE"/>
           </a:p>
@@ -1621,7 +1623,7 @@
           <a:p>
             <a:fld id="{9AA7D095-A676-4F6B-9416-D65D798F5244}" type="datetimeFigureOut">
               <a:rPr lang="de-DE" smtClean="0"/>
-              <a:t>15.04.2015</a:t>
+              <a:t>25.04.2015</a:t>
             </a:fld>
             <a:endParaRPr lang="de-DE"/>
           </a:p>
@@ -1739,7 +1741,7 @@
           <a:p>
             <a:fld id="{9AA7D095-A676-4F6B-9416-D65D798F5244}" type="datetimeFigureOut">
               <a:rPr lang="de-DE" smtClean="0"/>
-              <a:t>15.04.2015</a:t>
+              <a:t>25.04.2015</a:t>
             </a:fld>
             <a:endParaRPr lang="de-DE"/>
           </a:p>
@@ -1834,7 +1836,7 @@
           <a:p>
             <a:fld id="{9AA7D095-A676-4F6B-9416-D65D798F5244}" type="datetimeFigureOut">
               <a:rPr lang="de-DE" smtClean="0"/>
-              <a:t>15.04.2015</a:t>
+              <a:t>25.04.2015</a:t>
             </a:fld>
             <a:endParaRPr lang="de-DE"/>
           </a:p>
@@ -2111,7 +2113,7 @@
           <a:p>
             <a:fld id="{9AA7D095-A676-4F6B-9416-D65D798F5244}" type="datetimeFigureOut">
               <a:rPr lang="de-DE" smtClean="0"/>
-              <a:t>15.04.2015</a:t>
+              <a:t>25.04.2015</a:t>
             </a:fld>
             <a:endParaRPr lang="de-DE"/>
           </a:p>
@@ -2368,7 +2370,7 @@
           <a:p>
             <a:fld id="{9AA7D095-A676-4F6B-9416-D65D798F5244}" type="datetimeFigureOut">
               <a:rPr lang="de-DE" smtClean="0"/>
-              <a:t>15.04.2015</a:t>
+              <a:t>25.04.2015</a:t>
             </a:fld>
             <a:endParaRPr lang="de-DE"/>
           </a:p>
@@ -2581,7 +2583,7 @@
           <a:p>
             <a:fld id="{9AA7D095-A676-4F6B-9416-D65D798F5244}" type="datetimeFigureOut">
               <a:rPr lang="de-DE" smtClean="0"/>
-              <a:t>15.04.2015</a:t>
+              <a:t>25.04.2015</a:t>
             </a:fld>
             <a:endParaRPr lang="de-DE"/>
           </a:p>
@@ -8115,122 +8117,137 @@
           </a:p>
         </p:txBody>
       </p:sp>
-      <p:sp>
-        <p:nvSpPr>
-          <p:cNvPr id="62" name="Rectangle 61"/>
-          <p:cNvSpPr/>
+      <p:grpSp>
+        <p:nvGrpSpPr>
+          <p:cNvPr id="2" name="Group 1"/>
+          <p:cNvGrpSpPr/>
           <p:nvPr/>
-        </p:nvSpPr>
-        <p:spPr>
+        </p:nvGrpSpPr>
+        <p:grpSpPr>
           <a:xfrm>
-            <a:off x="3901828" y="-91038"/>
-            <a:ext cx="2791326" cy="2215991"/>
-          </a:xfrm>
-          <a:prstGeom prst="rect">
-            <a:avLst/>
-          </a:prstGeom>
-        </p:spPr>
-        <p:txBody>
-          <a:bodyPr wrap="square">
-            <a:spAutoFit/>
-          </a:bodyPr>
-          <a:lstStyle/>
-          <a:p>
-            <a:r>
-              <a:rPr lang="de-DE" sz="13800" dirty="0">
-                <a:solidFill>
-                  <a:schemeClr val="tx2">
-                    <a:lumMod val="60000"/>
-                    <a:lumOff val="40000"/>
-                  </a:schemeClr>
-                </a:solidFill>
+            <a:off x="3453200" y="-91038"/>
+            <a:ext cx="3239954" cy="2215991"/>
+            <a:chOff x="3453200" y="-91038"/>
+            <a:chExt cx="3239954" cy="2215991"/>
+          </a:xfrm>
+        </p:grpSpPr>
+        <p:sp>
+          <p:nvSpPr>
+            <p:cNvPr id="62" name="Rectangle 61"/>
+            <p:cNvSpPr/>
+            <p:nvPr/>
+          </p:nvSpPr>
+          <p:spPr>
+            <a:xfrm>
+              <a:off x="3901828" y="-91038"/>
+              <a:ext cx="2791326" cy="2215991"/>
+            </a:xfrm>
+            <a:prstGeom prst="rect">
+              <a:avLst/>
+            </a:prstGeom>
+          </p:spPr>
+          <p:txBody>
+            <a:bodyPr wrap="square">
+              <a:spAutoFit/>
+            </a:bodyPr>
+            <a:lstStyle/>
+            <a:p>
+              <a:r>
+                <a:rPr lang="de-DE" sz="13800" dirty="0">
+                  <a:solidFill>
+                    <a:schemeClr val="tx2">
+                      <a:lumMod val="60000"/>
+                      <a:lumOff val="40000"/>
+                    </a:schemeClr>
+                  </a:solidFill>
+                  <a:latin typeface="FontAwesome" pitchFamily="2" charset="0"/>
+                </a:rPr>
+                <a:t></a:t>
+              </a:r>
+              <a:endParaRPr lang="de-DE" sz="2400" dirty="0">
                 <a:latin typeface="FontAwesome" pitchFamily="2" charset="0"/>
-              </a:rPr>
-              <a:t></a:t>
-            </a:r>
-            <a:endParaRPr lang="de-DE" sz="2400" dirty="0">
-              <a:latin typeface="FontAwesome" pitchFamily="2" charset="0"/>
-            </a:endParaRPr>
-          </a:p>
-        </p:txBody>
-      </p:sp>
-      <p:sp>
-        <p:nvSpPr>
-          <p:cNvPr id="66" name="Rectangle 65"/>
-          <p:cNvSpPr/>
-          <p:nvPr/>
-        </p:nvSpPr>
-        <p:spPr>
-          <a:xfrm>
-            <a:off x="4404710" y="340680"/>
-            <a:ext cx="1050288" cy="1708160"/>
-          </a:xfrm>
-          <a:prstGeom prst="rect">
-            <a:avLst/>
-          </a:prstGeom>
-        </p:spPr>
-        <p:txBody>
-          <a:bodyPr wrap="none">
-            <a:spAutoFit/>
-          </a:bodyPr>
-          <a:lstStyle/>
-          <a:p>
-            <a:r>
-              <a:rPr lang="de-DE" sz="10500" dirty="0">
+              </a:endParaRPr>
+            </a:p>
+          </p:txBody>
+        </p:sp>
+        <p:sp>
+          <p:nvSpPr>
+            <p:cNvPr id="66" name="Rectangle 65"/>
+            <p:cNvSpPr/>
+            <p:nvPr/>
+          </p:nvSpPr>
+          <p:spPr>
+            <a:xfrm>
+              <a:off x="4404710" y="340680"/>
+              <a:ext cx="1050288" cy="1708160"/>
+            </a:xfrm>
+            <a:prstGeom prst="rect">
+              <a:avLst/>
+            </a:prstGeom>
+          </p:spPr>
+          <p:txBody>
+            <a:bodyPr wrap="none">
+              <a:spAutoFit/>
+            </a:bodyPr>
+            <a:lstStyle/>
+            <a:p>
+              <a:r>
+                <a:rPr lang="de-DE" sz="10500" dirty="0">
+                  <a:solidFill>
+                    <a:schemeClr val="tx2"/>
+                  </a:solidFill>
+                  <a:latin typeface="FontAwesome" pitchFamily="2" charset="0"/>
+                </a:rPr>
+                <a:t></a:t>
+              </a:r>
+              <a:endParaRPr lang="de-DE" sz="10500" dirty="0">
                 <a:solidFill>
                   <a:schemeClr val="tx2"/>
                 </a:solidFill>
-                <a:latin typeface="FontAwesome" pitchFamily="2" charset="0"/>
-              </a:rPr>
-              <a:t></a:t>
-            </a:r>
-            <a:endParaRPr lang="de-DE" sz="10500" dirty="0">
-              <a:solidFill>
-                <a:schemeClr val="tx2"/>
-              </a:solidFill>
-            </a:endParaRPr>
-          </a:p>
-        </p:txBody>
-      </p:sp>
-      <p:sp>
-        <p:nvSpPr>
-          <p:cNvPr id="68" name="TextBox 67"/>
-          <p:cNvSpPr txBox="1"/>
-          <p:nvPr/>
-        </p:nvSpPr>
-        <p:spPr>
-          <a:xfrm>
-            <a:off x="3453200" y="1140540"/>
-            <a:ext cx="2953724" cy="400110"/>
-          </a:xfrm>
-          <a:prstGeom prst="rect">
-            <a:avLst/>
-          </a:prstGeom>
-          <a:noFill/>
-        </p:spPr>
-        <p:txBody>
-          <a:bodyPr wrap="square" rtlCol="0">
-            <a:spAutoFit/>
-          </a:bodyPr>
-          <a:lstStyle/>
-          <a:p>
-            <a:pPr algn="ctr"/>
-            <a:r>
-              <a:rPr lang="en-US" sz="2000" b="1" dirty="0">
+              </a:endParaRPr>
+            </a:p>
+          </p:txBody>
+        </p:sp>
+        <p:sp>
+          <p:nvSpPr>
+            <p:cNvPr id="68" name="TextBox 67"/>
+            <p:cNvSpPr txBox="1"/>
+            <p:nvPr/>
+          </p:nvSpPr>
+          <p:spPr>
+            <a:xfrm>
+              <a:off x="3453200" y="1140540"/>
+              <a:ext cx="2953724" cy="400110"/>
+            </a:xfrm>
+            <a:prstGeom prst="rect">
+              <a:avLst/>
+            </a:prstGeom>
+            <a:noFill/>
+          </p:spPr>
+          <p:txBody>
+            <a:bodyPr wrap="square" rtlCol="0">
+              <a:spAutoFit/>
+            </a:bodyPr>
+            <a:lstStyle/>
+            <a:p>
+              <a:pPr algn="ctr"/>
+              <a:r>
+                <a:rPr lang="en-US" sz="2000" b="1" dirty="0">
+                  <a:solidFill>
+                    <a:schemeClr val="bg1"/>
+                  </a:solidFill>
+                </a:rPr>
+                <a:t>Boxfuse Vault</a:t>
+              </a:r>
+              <a:endParaRPr lang="de-DE" sz="2000" b="1" dirty="0">
                 <a:solidFill>
                   <a:schemeClr val="bg1"/>
                 </a:solidFill>
-              </a:rPr>
-              <a:t>Boxfuse Vault</a:t>
-            </a:r>
-            <a:endParaRPr lang="de-DE" sz="2000" b="1" dirty="0">
-              <a:solidFill>
-                <a:schemeClr val="bg1"/>
-              </a:solidFill>
-            </a:endParaRPr>
-          </a:p>
-        </p:txBody>
-      </p:sp>
+              </a:endParaRPr>
+            </a:p>
+          </p:txBody>
+        </p:sp>
+      </p:grpSp>
       <p:grpSp>
         <p:nvGrpSpPr>
           <p:cNvPr id="101" name="Group 100"/>
@@ -8519,6 +8536,1130 @@
     <p:extLst>
       <p:ext uri="{BB962C8B-B14F-4D97-AF65-F5344CB8AC3E}">
         <p14:creationId xmlns:p14="http://schemas.microsoft.com/office/powerpoint/2010/main" val="94253552"/>
+      </p:ext>
+    </p:extLst>
+  </p:cSld>
+  <p:clrMapOvr>
+    <a:masterClrMapping/>
+  </p:clrMapOvr>
+  <p:timing>
+    <p:tnLst>
+      <p:par>
+        <p:cTn id="1" dur="indefinite" restart="never" nodeType="tmRoot"/>
+      </p:par>
+    </p:tnLst>
+  </p:timing>
+</p:sld>
+</file>
+
+<file path=ppt/slides/slide15.xml><?xml version="1.0" encoding="utf-8"?>
+<p:sld xmlns:a="http://schemas.openxmlformats.org/drawingml/2006/main" xmlns:r="http://schemas.openxmlformats.org/officeDocument/2006/relationships" xmlns:p="http://schemas.openxmlformats.org/presentationml/2006/main">
+  <p:cSld>
+    <p:spTree>
+      <p:nvGrpSpPr>
+        <p:cNvPr id="1" name=""/>
+        <p:cNvGrpSpPr/>
+        <p:nvPr/>
+      </p:nvGrpSpPr>
+      <p:grpSpPr>
+        <a:xfrm>
+          <a:off x="0" y="0"/>
+          <a:ext cx="0" cy="0"/>
+          <a:chOff x="0" y="0"/>
+          <a:chExt cx="0" cy="0"/>
+        </a:xfrm>
+      </p:grpSpPr>
+      <p:pic>
+        <p:nvPicPr>
+          <p:cNvPr id="5" name="Picture 4"/>
+          <p:cNvPicPr>
+            <a:picLocks noChangeAspect="1"/>
+          </p:cNvPicPr>
+          <p:nvPr/>
+        </p:nvPicPr>
+        <p:blipFill>
+          <a:blip r:embed="rId2">
+            <a:extLst>
+              <a:ext uri="{28A0092B-C50C-407E-A947-70E740481C1C}">
+                <a14:useLocalDpi xmlns:a14="http://schemas.microsoft.com/office/drawing/2010/main" val="0"/>
+              </a:ext>
+            </a:extLst>
+          </a:blip>
+          <a:stretch>
+            <a:fillRect/>
+          </a:stretch>
+        </p:blipFill>
+        <p:spPr>
+          <a:xfrm>
+            <a:off x="636688" y="2546776"/>
+            <a:ext cx="514422" cy="952633"/>
+          </a:xfrm>
+          <a:prstGeom prst="rect">
+            <a:avLst/>
+          </a:prstGeom>
+        </p:spPr>
+      </p:pic>
+      <p:pic>
+        <p:nvPicPr>
+          <p:cNvPr id="6" name="Picture 5"/>
+          <p:cNvPicPr>
+            <a:picLocks noChangeAspect="1"/>
+          </p:cNvPicPr>
+          <p:nvPr/>
+        </p:nvPicPr>
+        <p:blipFill>
+          <a:blip r:embed="rId3">
+            <a:extLst>
+              <a:ext uri="{28A0092B-C50C-407E-A947-70E740481C1C}">
+                <a14:useLocalDpi xmlns:a14="http://schemas.microsoft.com/office/drawing/2010/main" val="0"/>
+              </a:ext>
+            </a:extLst>
+          </a:blip>
+          <a:stretch>
+            <a:fillRect/>
+          </a:stretch>
+        </p:blipFill>
+        <p:spPr>
+          <a:xfrm>
+            <a:off x="488731" y="1281764"/>
+            <a:ext cx="788468" cy="914623"/>
+          </a:xfrm>
+          <a:prstGeom prst="rect">
+            <a:avLst/>
+          </a:prstGeom>
+        </p:spPr>
+      </p:pic>
+      <p:pic>
+        <p:nvPicPr>
+          <p:cNvPr id="7" name="Picture 6"/>
+          <p:cNvPicPr>
+            <a:picLocks noChangeAspect="1"/>
+          </p:cNvPicPr>
+          <p:nvPr/>
+        </p:nvPicPr>
+        <p:blipFill>
+          <a:blip r:embed="rId4">
+            <a:extLst>
+              <a:ext uri="{28A0092B-C50C-407E-A947-70E740481C1C}">
+                <a14:useLocalDpi xmlns:a14="http://schemas.microsoft.com/office/drawing/2010/main" val="0"/>
+              </a:ext>
+            </a:extLst>
+          </a:blip>
+          <a:stretch>
+            <a:fillRect/>
+          </a:stretch>
+        </p:blipFill>
+        <p:spPr>
+          <a:xfrm>
+            <a:off x="561954" y="3901939"/>
+            <a:ext cx="695422" cy="1143160"/>
+          </a:xfrm>
+          <a:prstGeom prst="rect">
+            <a:avLst/>
+          </a:prstGeom>
+        </p:spPr>
+      </p:pic>
+      <p:pic>
+        <p:nvPicPr>
+          <p:cNvPr id="9" name="Picture 8"/>
+          <p:cNvPicPr>
+            <a:picLocks noChangeAspect="1"/>
+          </p:cNvPicPr>
+          <p:nvPr/>
+        </p:nvPicPr>
+        <p:blipFill>
+          <a:blip r:embed="rId5">
+            <a:extLst>
+              <a:ext uri="{28A0092B-C50C-407E-A947-70E740481C1C}">
+                <a14:useLocalDpi xmlns:a14="http://schemas.microsoft.com/office/drawing/2010/main" val="0"/>
+              </a:ext>
+            </a:extLst>
+          </a:blip>
+          <a:stretch>
+            <a:fillRect/>
+          </a:stretch>
+        </p:blipFill>
+        <p:spPr>
+          <a:xfrm>
+            <a:off x="9854185" y="3878844"/>
+            <a:ext cx="1538745" cy="615498"/>
+          </a:xfrm>
+          <a:prstGeom prst="rect">
+            <a:avLst/>
+          </a:prstGeom>
+        </p:spPr>
+      </p:pic>
+      <p:pic>
+        <p:nvPicPr>
+          <p:cNvPr id="10" name="Picture 9"/>
+          <p:cNvPicPr>
+            <a:picLocks noChangeAspect="1"/>
+          </p:cNvPicPr>
+          <p:nvPr/>
+        </p:nvPicPr>
+        <p:blipFill>
+          <a:blip r:embed="rId6">
+            <a:extLst>
+              <a:ext uri="{28A0092B-C50C-407E-A947-70E740481C1C}">
+                <a14:useLocalDpi xmlns:a14="http://schemas.microsoft.com/office/drawing/2010/main" val="0"/>
+              </a:ext>
+            </a:extLst>
+          </a:blip>
+          <a:stretch>
+            <a:fillRect/>
+          </a:stretch>
+        </p:blipFill>
+        <p:spPr>
+          <a:xfrm>
+            <a:off x="7351291" y="1428916"/>
+            <a:ext cx="809738" cy="952633"/>
+          </a:xfrm>
+          <a:prstGeom prst="rect">
+            <a:avLst/>
+          </a:prstGeom>
+        </p:spPr>
+      </p:pic>
+      <p:grpSp>
+        <p:nvGrpSpPr>
+          <p:cNvPr id="11" name="Group 10"/>
+          <p:cNvGrpSpPr/>
+          <p:nvPr/>
+        </p:nvGrpSpPr>
+        <p:grpSpPr>
+          <a:xfrm>
+            <a:off x="1395783" y="2499274"/>
+            <a:ext cx="1155887" cy="673166"/>
+            <a:chOff x="2334271" y="318043"/>
+            <a:chExt cx="1457473" cy="673166"/>
+          </a:xfrm>
+        </p:grpSpPr>
+        <p:cxnSp>
+          <p:nvCxnSpPr>
+            <p:cNvPr id="12" name="Straight Arrow Connector 11"/>
+            <p:cNvCxnSpPr/>
+            <p:nvPr/>
+          </p:nvCxnSpPr>
+          <p:spPr>
+            <a:xfrm flipV="1">
+              <a:off x="2346123" y="980728"/>
+              <a:ext cx="1445621" cy="10481"/>
+            </a:xfrm>
+            <a:prstGeom prst="straightConnector1">
+              <a:avLst/>
+            </a:prstGeom>
+            <a:ln w="142875">
+              <a:solidFill>
+                <a:schemeClr val="tx1">
+                  <a:lumMod val="50000"/>
+                  <a:lumOff val="50000"/>
+                </a:schemeClr>
+              </a:solidFill>
+              <a:tailEnd type="triangle"/>
+            </a:ln>
+          </p:spPr>
+          <p:style>
+            <a:lnRef idx="1">
+              <a:schemeClr val="accent1"/>
+            </a:lnRef>
+            <a:fillRef idx="0">
+              <a:schemeClr val="accent1"/>
+            </a:fillRef>
+            <a:effectRef idx="0">
+              <a:schemeClr val="accent1"/>
+            </a:effectRef>
+            <a:fontRef idx="minor">
+              <a:schemeClr val="tx1"/>
+            </a:fontRef>
+          </p:style>
+        </p:cxnSp>
+        <p:sp>
+          <p:nvSpPr>
+            <p:cNvPr id="13" name="TextBox 12"/>
+            <p:cNvSpPr txBox="1"/>
+            <p:nvPr/>
+          </p:nvSpPr>
+          <p:spPr>
+            <a:xfrm>
+              <a:off x="2334271" y="318043"/>
+              <a:ext cx="1408522" cy="523220"/>
+            </a:xfrm>
+            <a:prstGeom prst="rect">
+              <a:avLst/>
+            </a:prstGeom>
+            <a:noFill/>
+          </p:spPr>
+          <p:txBody>
+            <a:bodyPr wrap="square" rtlCol="0">
+              <a:spAutoFit/>
+            </a:bodyPr>
+            <a:lstStyle/>
+            <a:p>
+              <a:pPr algn="ctr"/>
+              <a:endParaRPr lang="de-DE" sz="2800" b="1" dirty="0"/>
+            </a:p>
+          </p:txBody>
+        </p:sp>
+      </p:grpSp>
+      <p:grpSp>
+        <p:nvGrpSpPr>
+          <p:cNvPr id="14" name="Group 13"/>
+          <p:cNvGrpSpPr/>
+          <p:nvPr/>
+        </p:nvGrpSpPr>
+        <p:grpSpPr>
+          <a:xfrm rot="1893237">
+            <a:off x="1484536" y="1840598"/>
+            <a:ext cx="1288610" cy="673166"/>
+            <a:chOff x="2334271" y="318043"/>
+            <a:chExt cx="1457473" cy="673166"/>
+          </a:xfrm>
+        </p:grpSpPr>
+        <p:cxnSp>
+          <p:nvCxnSpPr>
+            <p:cNvPr id="15" name="Straight Arrow Connector 14"/>
+            <p:cNvCxnSpPr/>
+            <p:nvPr/>
+          </p:nvCxnSpPr>
+          <p:spPr>
+            <a:xfrm flipV="1">
+              <a:off x="2346123" y="980728"/>
+              <a:ext cx="1445621" cy="10481"/>
+            </a:xfrm>
+            <a:prstGeom prst="straightConnector1">
+              <a:avLst/>
+            </a:prstGeom>
+            <a:ln w="142875">
+              <a:solidFill>
+                <a:schemeClr val="tx1">
+                  <a:lumMod val="50000"/>
+                  <a:lumOff val="50000"/>
+                </a:schemeClr>
+              </a:solidFill>
+              <a:tailEnd type="triangle"/>
+            </a:ln>
+          </p:spPr>
+          <p:style>
+            <a:lnRef idx="1">
+              <a:schemeClr val="accent1"/>
+            </a:lnRef>
+            <a:fillRef idx="0">
+              <a:schemeClr val="accent1"/>
+            </a:fillRef>
+            <a:effectRef idx="0">
+              <a:schemeClr val="accent1"/>
+            </a:effectRef>
+            <a:fontRef idx="minor">
+              <a:schemeClr val="tx1"/>
+            </a:fontRef>
+          </p:style>
+        </p:cxnSp>
+        <p:sp>
+          <p:nvSpPr>
+            <p:cNvPr id="16" name="TextBox 15"/>
+            <p:cNvSpPr txBox="1"/>
+            <p:nvPr/>
+          </p:nvSpPr>
+          <p:spPr>
+            <a:xfrm>
+              <a:off x="2334271" y="318043"/>
+              <a:ext cx="1408522" cy="523220"/>
+            </a:xfrm>
+            <a:prstGeom prst="rect">
+              <a:avLst/>
+            </a:prstGeom>
+            <a:noFill/>
+          </p:spPr>
+          <p:txBody>
+            <a:bodyPr wrap="square" rtlCol="0">
+              <a:spAutoFit/>
+            </a:bodyPr>
+            <a:lstStyle/>
+            <a:p>
+              <a:pPr algn="ctr"/>
+              <a:endParaRPr lang="de-DE" sz="2800" b="1" dirty="0"/>
+            </a:p>
+          </p:txBody>
+        </p:sp>
+      </p:grpSp>
+      <p:grpSp>
+        <p:nvGrpSpPr>
+          <p:cNvPr id="17" name="Group 16"/>
+          <p:cNvGrpSpPr/>
+          <p:nvPr/>
+        </p:nvGrpSpPr>
+        <p:grpSpPr>
+          <a:xfrm rot="19944874">
+            <a:off x="1230853" y="3238515"/>
+            <a:ext cx="1237567" cy="673166"/>
+            <a:chOff x="2334271" y="318043"/>
+            <a:chExt cx="1457473" cy="673166"/>
+          </a:xfrm>
+        </p:grpSpPr>
+        <p:cxnSp>
+          <p:nvCxnSpPr>
+            <p:cNvPr id="18" name="Straight Arrow Connector 17"/>
+            <p:cNvCxnSpPr/>
+            <p:nvPr/>
+          </p:nvCxnSpPr>
+          <p:spPr>
+            <a:xfrm flipV="1">
+              <a:off x="2346123" y="980728"/>
+              <a:ext cx="1445621" cy="10481"/>
+            </a:xfrm>
+            <a:prstGeom prst="straightConnector1">
+              <a:avLst/>
+            </a:prstGeom>
+            <a:ln w="142875">
+              <a:solidFill>
+                <a:schemeClr val="tx1">
+                  <a:lumMod val="50000"/>
+                  <a:lumOff val="50000"/>
+                </a:schemeClr>
+              </a:solidFill>
+              <a:tailEnd type="triangle"/>
+            </a:ln>
+          </p:spPr>
+          <p:style>
+            <a:lnRef idx="1">
+              <a:schemeClr val="accent1"/>
+            </a:lnRef>
+            <a:fillRef idx="0">
+              <a:schemeClr val="accent1"/>
+            </a:fillRef>
+            <a:effectRef idx="0">
+              <a:schemeClr val="accent1"/>
+            </a:effectRef>
+            <a:fontRef idx="minor">
+              <a:schemeClr val="tx1"/>
+            </a:fontRef>
+          </p:style>
+        </p:cxnSp>
+        <p:sp>
+          <p:nvSpPr>
+            <p:cNvPr id="19" name="TextBox 18"/>
+            <p:cNvSpPr txBox="1"/>
+            <p:nvPr/>
+          </p:nvSpPr>
+          <p:spPr>
+            <a:xfrm>
+              <a:off x="2334271" y="318043"/>
+              <a:ext cx="1408522" cy="523220"/>
+            </a:xfrm>
+            <a:prstGeom prst="rect">
+              <a:avLst/>
+            </a:prstGeom>
+            <a:noFill/>
+          </p:spPr>
+          <p:txBody>
+            <a:bodyPr wrap="square" rtlCol="0">
+              <a:spAutoFit/>
+            </a:bodyPr>
+            <a:lstStyle/>
+            <a:p>
+              <a:pPr algn="ctr"/>
+              <a:endParaRPr lang="de-DE" sz="2800" b="1" dirty="0"/>
+            </a:p>
+          </p:txBody>
+        </p:sp>
+      </p:grpSp>
+      <p:pic>
+        <p:nvPicPr>
+          <p:cNvPr id="1026" name="Picture 2" descr="Boxfuse"/>
+          <p:cNvPicPr>
+            <a:picLocks noChangeAspect="1" noChangeArrowheads="1"/>
+          </p:cNvPicPr>
+          <p:nvPr/>
+        </p:nvPicPr>
+        <p:blipFill rotWithShape="1">
+          <a:blip r:embed="rId7">
+            <a:extLst>
+              <a:ext uri="{28A0092B-C50C-407E-A947-70E740481C1C}">
+                <a14:useLocalDpi xmlns:a14="http://schemas.microsoft.com/office/drawing/2010/main" val="0"/>
+              </a:ext>
+            </a:extLst>
+          </a:blip>
+          <a:srcRect l="15312" r="15715" b="25189"/>
+          <a:stretch/>
+        </p:blipFill>
+        <p:spPr bwMode="auto">
+          <a:xfrm>
+            <a:off x="2617203" y="2576385"/>
+            <a:ext cx="1139251" cy="1235676"/>
+          </a:xfrm>
+          <a:prstGeom prst="rect">
+            <a:avLst/>
+          </a:prstGeom>
+          <a:noFill/>
+          <a:extLst>
+            <a:ext uri="{909E8E84-426E-40DD-AFC4-6F175D3DCCD1}">
+              <a14:hiddenFill xmlns:a14="http://schemas.microsoft.com/office/drawing/2010/main">
+                <a:solidFill>
+                  <a:srgbClr val="FFFFFF"/>
+                </a:solidFill>
+              </a14:hiddenFill>
+            </a:ext>
+          </a:extLst>
+        </p:spPr>
+      </p:pic>
+      <p:grpSp>
+        <p:nvGrpSpPr>
+          <p:cNvPr id="25" name="Group 24"/>
+          <p:cNvGrpSpPr/>
+          <p:nvPr/>
+        </p:nvGrpSpPr>
+        <p:grpSpPr>
+          <a:xfrm>
+            <a:off x="3815647" y="2478679"/>
+            <a:ext cx="1151769" cy="673166"/>
+            <a:chOff x="2334271" y="318043"/>
+            <a:chExt cx="1457473" cy="673166"/>
+          </a:xfrm>
+        </p:grpSpPr>
+        <p:cxnSp>
+          <p:nvCxnSpPr>
+            <p:cNvPr id="26" name="Straight Arrow Connector 25"/>
+            <p:cNvCxnSpPr/>
+            <p:nvPr/>
+          </p:nvCxnSpPr>
+          <p:spPr>
+            <a:xfrm flipV="1">
+              <a:off x="2346123" y="980728"/>
+              <a:ext cx="1445621" cy="10481"/>
+            </a:xfrm>
+            <a:prstGeom prst="straightConnector1">
+              <a:avLst/>
+            </a:prstGeom>
+            <a:ln w="142875">
+              <a:solidFill>
+                <a:schemeClr val="tx1">
+                  <a:lumMod val="50000"/>
+                  <a:lumOff val="50000"/>
+                </a:schemeClr>
+              </a:solidFill>
+              <a:tailEnd type="triangle"/>
+            </a:ln>
+          </p:spPr>
+          <p:style>
+            <a:lnRef idx="1">
+              <a:schemeClr val="accent1"/>
+            </a:lnRef>
+            <a:fillRef idx="0">
+              <a:schemeClr val="accent1"/>
+            </a:fillRef>
+            <a:effectRef idx="0">
+              <a:schemeClr val="accent1"/>
+            </a:effectRef>
+            <a:fontRef idx="minor">
+              <a:schemeClr val="tx1"/>
+            </a:fontRef>
+          </p:style>
+        </p:cxnSp>
+        <p:sp>
+          <p:nvSpPr>
+            <p:cNvPr id="27" name="TextBox 26"/>
+            <p:cNvSpPr txBox="1"/>
+            <p:nvPr/>
+          </p:nvSpPr>
+          <p:spPr>
+            <a:xfrm>
+              <a:off x="2334271" y="318043"/>
+              <a:ext cx="1408522" cy="523220"/>
+            </a:xfrm>
+            <a:prstGeom prst="rect">
+              <a:avLst/>
+            </a:prstGeom>
+            <a:noFill/>
+          </p:spPr>
+          <p:txBody>
+            <a:bodyPr wrap="square" rtlCol="0">
+              <a:spAutoFit/>
+            </a:bodyPr>
+            <a:lstStyle/>
+            <a:p>
+              <a:pPr algn="ctr"/>
+              <a:endParaRPr lang="de-DE" sz="2800" b="1" dirty="0"/>
+            </a:p>
+          </p:txBody>
+        </p:sp>
+      </p:grpSp>
+      <p:sp>
+        <p:nvSpPr>
+          <p:cNvPr id="28" name="Rounded Rectangle 25"/>
+          <p:cNvSpPr/>
+          <p:nvPr/>
+        </p:nvSpPr>
+        <p:spPr>
+          <a:xfrm>
+            <a:off x="5140411" y="2668364"/>
+            <a:ext cx="963911" cy="963908"/>
+          </a:xfrm>
+          <a:prstGeom prst="ellipse">
+            <a:avLst/>
+          </a:prstGeom>
+          <a:solidFill>
+            <a:schemeClr val="accent1">
+              <a:lumMod val="75000"/>
+            </a:schemeClr>
+          </a:solidFill>
+          <a:ln w="76200">
+            <a:solidFill>
+              <a:schemeClr val="accent1">
+                <a:lumMod val="50000"/>
+              </a:schemeClr>
+            </a:solidFill>
+          </a:ln>
+        </p:spPr>
+        <p:style>
+          <a:lnRef idx="2">
+            <a:schemeClr val="accent1">
+              <a:shade val="50000"/>
+            </a:schemeClr>
+          </a:lnRef>
+          <a:fillRef idx="1">
+            <a:schemeClr val="accent1"/>
+          </a:fillRef>
+          <a:effectRef idx="0">
+            <a:schemeClr val="accent1"/>
+          </a:effectRef>
+          <a:fontRef idx="minor">
+            <a:schemeClr val="lt1"/>
+          </a:fontRef>
+        </p:style>
+        <p:txBody>
+          <a:bodyPr rtlCol="0" anchor="ctr"/>
+          <a:lstStyle/>
+          <a:p>
+            <a:pPr algn="ctr"/>
+            <a:r>
+              <a:rPr lang="en-US" sz="1400" b="1" dirty="0" smtClean="0"/>
+              <a:t>Image</a:t>
+            </a:r>
+            <a:endParaRPr lang="de-DE" sz="1400" b="1" dirty="0"/>
+          </a:p>
+        </p:txBody>
+      </p:sp>
+      <p:sp>
+        <p:nvSpPr>
+          <p:cNvPr id="29" name="TextBox 28"/>
+          <p:cNvSpPr txBox="1"/>
+          <p:nvPr/>
+        </p:nvSpPr>
+        <p:spPr>
+          <a:xfrm>
+            <a:off x="4967416" y="3624649"/>
+            <a:ext cx="1346885" cy="1015663"/>
+          </a:xfrm>
+          <a:prstGeom prst="rect">
+            <a:avLst/>
+          </a:prstGeom>
+          <a:noFill/>
+        </p:spPr>
+        <p:txBody>
+          <a:bodyPr wrap="square" rtlCol="0">
+            <a:spAutoFit/>
+          </a:bodyPr>
+          <a:lstStyle/>
+          <a:p>
+            <a:pPr algn="ctr"/>
+            <a:r>
+              <a:rPr lang="en-US" sz="2000" dirty="0" smtClean="0">
+                <a:solidFill>
+                  <a:schemeClr val="tx1">
+                    <a:lumMod val="50000"/>
+                    <a:lumOff val="50000"/>
+                  </a:schemeClr>
+                </a:solidFill>
+              </a:rPr>
+              <a:t>Minimal</a:t>
+            </a:r>
+          </a:p>
+          <a:p>
+            <a:pPr algn="ctr"/>
+            <a:r>
+              <a:rPr lang="en-US" sz="2000" dirty="0" smtClean="0">
+                <a:solidFill>
+                  <a:schemeClr val="tx1">
+                    <a:lumMod val="50000"/>
+                    <a:lumOff val="50000"/>
+                  </a:schemeClr>
+                </a:solidFill>
+              </a:rPr>
+              <a:t>Secure</a:t>
+            </a:r>
+          </a:p>
+          <a:p>
+            <a:pPr algn="ctr"/>
+            <a:r>
+              <a:rPr lang="en-US" sz="2000" dirty="0" smtClean="0">
+                <a:solidFill>
+                  <a:schemeClr val="tx1">
+                    <a:lumMod val="50000"/>
+                    <a:lumOff val="50000"/>
+                  </a:schemeClr>
+                </a:solidFill>
+              </a:rPr>
+              <a:t>Portable</a:t>
+            </a:r>
+            <a:endParaRPr lang="de-DE" sz="2000" dirty="0">
+              <a:solidFill>
+                <a:schemeClr val="tx1">
+                  <a:lumMod val="50000"/>
+                  <a:lumOff val="50000"/>
+                </a:schemeClr>
+              </a:solidFill>
+            </a:endParaRPr>
+          </a:p>
+        </p:txBody>
+      </p:sp>
+      <p:grpSp>
+        <p:nvGrpSpPr>
+          <p:cNvPr id="33" name="Group 32"/>
+          <p:cNvGrpSpPr/>
+          <p:nvPr/>
+        </p:nvGrpSpPr>
+        <p:grpSpPr>
+          <a:xfrm rot="19944874">
+            <a:off x="5986145" y="1908104"/>
+            <a:ext cx="1237567" cy="673166"/>
+            <a:chOff x="2334271" y="318043"/>
+            <a:chExt cx="1457473" cy="673166"/>
+          </a:xfrm>
+        </p:grpSpPr>
+        <p:cxnSp>
+          <p:nvCxnSpPr>
+            <p:cNvPr id="34" name="Straight Arrow Connector 33"/>
+            <p:cNvCxnSpPr/>
+            <p:nvPr/>
+          </p:nvCxnSpPr>
+          <p:spPr>
+            <a:xfrm flipV="1">
+              <a:off x="2346123" y="980728"/>
+              <a:ext cx="1445621" cy="10481"/>
+            </a:xfrm>
+            <a:prstGeom prst="straightConnector1">
+              <a:avLst/>
+            </a:prstGeom>
+            <a:ln w="142875">
+              <a:solidFill>
+                <a:schemeClr val="tx1">
+                  <a:lumMod val="50000"/>
+                  <a:lumOff val="50000"/>
+                </a:schemeClr>
+              </a:solidFill>
+              <a:tailEnd type="triangle"/>
+            </a:ln>
+          </p:spPr>
+          <p:style>
+            <a:lnRef idx="1">
+              <a:schemeClr val="accent1"/>
+            </a:lnRef>
+            <a:fillRef idx="0">
+              <a:schemeClr val="accent1"/>
+            </a:fillRef>
+            <a:effectRef idx="0">
+              <a:schemeClr val="accent1"/>
+            </a:effectRef>
+            <a:fontRef idx="minor">
+              <a:schemeClr val="tx1"/>
+            </a:fontRef>
+          </p:style>
+        </p:cxnSp>
+        <p:sp>
+          <p:nvSpPr>
+            <p:cNvPr id="35" name="TextBox 34"/>
+            <p:cNvSpPr txBox="1"/>
+            <p:nvPr/>
+          </p:nvSpPr>
+          <p:spPr>
+            <a:xfrm>
+              <a:off x="2334271" y="318043"/>
+              <a:ext cx="1408522" cy="523220"/>
+            </a:xfrm>
+            <a:prstGeom prst="rect">
+              <a:avLst/>
+            </a:prstGeom>
+            <a:noFill/>
+          </p:spPr>
+          <p:txBody>
+            <a:bodyPr wrap="square" rtlCol="0">
+              <a:spAutoFit/>
+            </a:bodyPr>
+            <a:lstStyle/>
+            <a:p>
+              <a:pPr algn="ctr"/>
+              <a:endParaRPr lang="de-DE" sz="2800" b="1" dirty="0"/>
+            </a:p>
+          </p:txBody>
+        </p:sp>
+      </p:grpSp>
+      <p:grpSp>
+        <p:nvGrpSpPr>
+          <p:cNvPr id="36" name="Group 35"/>
+          <p:cNvGrpSpPr/>
+          <p:nvPr/>
+        </p:nvGrpSpPr>
+        <p:grpSpPr>
+          <a:xfrm rot="1893237">
+            <a:off x="6332504" y="3074215"/>
+            <a:ext cx="1288610" cy="673166"/>
+            <a:chOff x="2334271" y="318043"/>
+            <a:chExt cx="1457473" cy="673166"/>
+          </a:xfrm>
+        </p:grpSpPr>
+        <p:cxnSp>
+          <p:nvCxnSpPr>
+            <p:cNvPr id="37" name="Straight Arrow Connector 36"/>
+            <p:cNvCxnSpPr/>
+            <p:nvPr/>
+          </p:nvCxnSpPr>
+          <p:spPr>
+            <a:xfrm flipV="1">
+              <a:off x="2346123" y="980728"/>
+              <a:ext cx="1445621" cy="10481"/>
+            </a:xfrm>
+            <a:prstGeom prst="straightConnector1">
+              <a:avLst/>
+            </a:prstGeom>
+            <a:ln w="142875">
+              <a:solidFill>
+                <a:schemeClr val="tx1">
+                  <a:lumMod val="50000"/>
+                  <a:lumOff val="50000"/>
+                </a:schemeClr>
+              </a:solidFill>
+              <a:tailEnd type="triangle"/>
+            </a:ln>
+          </p:spPr>
+          <p:style>
+            <a:lnRef idx="1">
+              <a:schemeClr val="accent1"/>
+            </a:lnRef>
+            <a:fillRef idx="0">
+              <a:schemeClr val="accent1"/>
+            </a:fillRef>
+            <a:effectRef idx="0">
+              <a:schemeClr val="accent1"/>
+            </a:effectRef>
+            <a:fontRef idx="minor">
+              <a:schemeClr val="tx1"/>
+            </a:fontRef>
+          </p:style>
+        </p:cxnSp>
+        <p:sp>
+          <p:nvSpPr>
+            <p:cNvPr id="38" name="TextBox 37"/>
+            <p:cNvSpPr txBox="1"/>
+            <p:nvPr/>
+          </p:nvSpPr>
+          <p:spPr>
+            <a:xfrm>
+              <a:off x="2334271" y="318043"/>
+              <a:ext cx="1408522" cy="523220"/>
+            </a:xfrm>
+            <a:prstGeom prst="rect">
+              <a:avLst/>
+            </a:prstGeom>
+            <a:noFill/>
+          </p:spPr>
+          <p:txBody>
+            <a:bodyPr wrap="square" rtlCol="0">
+              <a:spAutoFit/>
+            </a:bodyPr>
+            <a:lstStyle/>
+            <a:p>
+              <a:pPr algn="ctr"/>
+              <a:endParaRPr lang="de-DE" sz="2800" b="1" dirty="0"/>
+            </a:p>
+          </p:txBody>
+        </p:sp>
+      </p:grpSp>
+      <p:pic>
+        <p:nvPicPr>
+          <p:cNvPr id="24" name="Picture 23"/>
+          <p:cNvPicPr>
+            <a:picLocks noChangeAspect="1"/>
+          </p:cNvPicPr>
+          <p:nvPr/>
+        </p:nvPicPr>
+        <p:blipFill>
+          <a:blip r:embed="rId8"/>
+          <a:stretch>
+            <a:fillRect/>
+          </a:stretch>
+        </p:blipFill>
+        <p:spPr>
+          <a:xfrm>
+            <a:off x="6615293" y="3237470"/>
+            <a:ext cx="2626907" cy="2426685"/>
+          </a:xfrm>
+          <a:prstGeom prst="rect">
+            <a:avLst/>
+          </a:prstGeom>
+        </p:spPr>
+      </p:pic>
+      <p:grpSp>
+        <p:nvGrpSpPr>
+          <p:cNvPr id="45" name="Group 44"/>
+          <p:cNvGrpSpPr/>
+          <p:nvPr/>
+        </p:nvGrpSpPr>
+        <p:grpSpPr>
+          <a:xfrm>
+            <a:off x="8589474" y="3496052"/>
+            <a:ext cx="1151769" cy="673166"/>
+            <a:chOff x="2334271" y="318043"/>
+            <a:chExt cx="1457473" cy="673166"/>
+          </a:xfrm>
+        </p:grpSpPr>
+        <p:cxnSp>
+          <p:nvCxnSpPr>
+            <p:cNvPr id="46" name="Straight Arrow Connector 45"/>
+            <p:cNvCxnSpPr/>
+            <p:nvPr/>
+          </p:nvCxnSpPr>
+          <p:spPr>
+            <a:xfrm flipV="1">
+              <a:off x="2346123" y="980728"/>
+              <a:ext cx="1445621" cy="10481"/>
+            </a:xfrm>
+            <a:prstGeom prst="straightConnector1">
+              <a:avLst/>
+            </a:prstGeom>
+            <a:ln w="142875">
+              <a:solidFill>
+                <a:schemeClr val="tx1">
+                  <a:lumMod val="50000"/>
+                  <a:lumOff val="50000"/>
+                </a:schemeClr>
+              </a:solidFill>
+              <a:tailEnd type="triangle"/>
+            </a:ln>
+          </p:spPr>
+          <p:style>
+            <a:lnRef idx="1">
+              <a:schemeClr val="accent1"/>
+            </a:lnRef>
+            <a:fillRef idx="0">
+              <a:schemeClr val="accent1"/>
+            </a:fillRef>
+            <a:effectRef idx="0">
+              <a:schemeClr val="accent1"/>
+            </a:effectRef>
+            <a:fontRef idx="minor">
+              <a:schemeClr val="tx1"/>
+            </a:fontRef>
+          </p:style>
+        </p:cxnSp>
+        <p:sp>
+          <p:nvSpPr>
+            <p:cNvPr id="47" name="TextBox 46"/>
+            <p:cNvSpPr txBox="1"/>
+            <p:nvPr/>
+          </p:nvSpPr>
+          <p:spPr>
+            <a:xfrm>
+              <a:off x="2334271" y="318043"/>
+              <a:ext cx="1408522" cy="523220"/>
+            </a:xfrm>
+            <a:prstGeom prst="rect">
+              <a:avLst/>
+            </a:prstGeom>
+            <a:noFill/>
+          </p:spPr>
+          <p:txBody>
+            <a:bodyPr wrap="square" rtlCol="0">
+              <a:spAutoFit/>
+            </a:bodyPr>
+            <a:lstStyle/>
+            <a:p>
+              <a:pPr algn="ctr"/>
+              <a:endParaRPr lang="de-DE" sz="2800" b="1" dirty="0"/>
+            </a:p>
+          </p:txBody>
+        </p:sp>
+      </p:grpSp>
+    </p:spTree>
+    <p:extLst>
+      <p:ext uri="{BB962C8B-B14F-4D97-AF65-F5344CB8AC3E}">
+        <p14:creationId xmlns:p14="http://schemas.microsoft.com/office/powerpoint/2010/main" val="4213274243"/>
+      </p:ext>
+    </p:extLst>
+  </p:cSld>
+  <p:clrMapOvr>
+    <a:masterClrMapping/>
+  </p:clrMapOvr>
+  <p:timing>
+    <p:tnLst>
+      <p:par>
+        <p:cTn id="1" dur="indefinite" restart="never" nodeType="tmRoot"/>
+      </p:par>
+    </p:tnLst>
+  </p:timing>
+</p:sld>
+</file>
+
+<file path=ppt/slides/slide16.xml><?xml version="1.0" encoding="utf-8"?>
+<p:sld xmlns:a="http://schemas.openxmlformats.org/drawingml/2006/main" xmlns:r="http://schemas.openxmlformats.org/officeDocument/2006/relationships" xmlns:p="http://schemas.openxmlformats.org/presentationml/2006/main">
+  <p:cSld>
+    <p:spTree>
+      <p:nvGrpSpPr>
+        <p:cNvPr id="1" name=""/>
+        <p:cNvGrpSpPr/>
+        <p:nvPr/>
+      </p:nvGrpSpPr>
+      <p:grpSpPr>
+        <a:xfrm>
+          <a:off x="0" y="0"/>
+          <a:ext cx="0" cy="0"/>
+          <a:chOff x="0" y="0"/>
+          <a:chExt cx="0" cy="0"/>
+        </a:xfrm>
+      </p:grpSpPr>
+      <p:pic>
+        <p:nvPicPr>
+          <p:cNvPr id="7" name="Picture 6"/>
+          <p:cNvPicPr>
+            <a:picLocks noChangeAspect="1"/>
+          </p:cNvPicPr>
+          <p:nvPr/>
+        </p:nvPicPr>
+        <p:blipFill>
+          <a:blip r:embed="rId2">
+            <a:extLst>
+              <a:ext uri="{28A0092B-C50C-407E-A947-70E740481C1C}">
+                <a14:useLocalDpi xmlns:a14="http://schemas.microsoft.com/office/drawing/2010/main" val="0"/>
+              </a:ext>
+            </a:extLst>
+          </a:blip>
+          <a:stretch>
+            <a:fillRect/>
+          </a:stretch>
+        </p:blipFill>
+        <p:spPr>
+          <a:xfrm>
+            <a:off x="7679446" y="3636268"/>
+            <a:ext cx="695422" cy="1143160"/>
+          </a:xfrm>
+          <a:prstGeom prst="rect">
+            <a:avLst/>
+          </a:prstGeom>
+        </p:spPr>
+      </p:pic>
+      <p:pic>
+        <p:nvPicPr>
+          <p:cNvPr id="9" name="Picture 8"/>
+          <p:cNvPicPr>
+            <a:picLocks noChangeAspect="1"/>
+          </p:cNvPicPr>
+          <p:nvPr/>
+        </p:nvPicPr>
+        <p:blipFill>
+          <a:blip r:embed="rId3">
+            <a:extLst>
+              <a:ext uri="{28A0092B-C50C-407E-A947-70E740481C1C}">
+                <a14:useLocalDpi xmlns:a14="http://schemas.microsoft.com/office/drawing/2010/main" val="0"/>
+              </a:ext>
+            </a:extLst>
+          </a:blip>
+          <a:stretch>
+            <a:fillRect/>
+          </a:stretch>
+        </p:blipFill>
+        <p:spPr>
+          <a:xfrm>
+            <a:off x="9854185" y="3878844"/>
+            <a:ext cx="1538745" cy="615498"/>
+          </a:xfrm>
+          <a:prstGeom prst="rect">
+            <a:avLst/>
+          </a:prstGeom>
+        </p:spPr>
+      </p:pic>
+      <p:grpSp>
+        <p:nvGrpSpPr>
+          <p:cNvPr id="45" name="Group 44"/>
+          <p:cNvGrpSpPr/>
+          <p:nvPr/>
+        </p:nvGrpSpPr>
+        <p:grpSpPr>
+          <a:xfrm>
+            <a:off x="8589474" y="3496052"/>
+            <a:ext cx="1151769" cy="673166"/>
+            <a:chOff x="2334271" y="318043"/>
+            <a:chExt cx="1457473" cy="673166"/>
+          </a:xfrm>
+        </p:grpSpPr>
+        <p:cxnSp>
+          <p:nvCxnSpPr>
+            <p:cNvPr id="46" name="Straight Arrow Connector 45"/>
+            <p:cNvCxnSpPr/>
+            <p:nvPr/>
+          </p:nvCxnSpPr>
+          <p:spPr>
+            <a:xfrm flipV="1">
+              <a:off x="2346123" y="980728"/>
+              <a:ext cx="1445621" cy="10481"/>
+            </a:xfrm>
+            <a:prstGeom prst="straightConnector1">
+              <a:avLst/>
+            </a:prstGeom>
+            <a:ln w="142875">
+              <a:solidFill>
+                <a:schemeClr val="tx1">
+                  <a:lumMod val="50000"/>
+                  <a:lumOff val="50000"/>
+                </a:schemeClr>
+              </a:solidFill>
+              <a:tailEnd type="triangle"/>
+            </a:ln>
+          </p:spPr>
+          <p:style>
+            <a:lnRef idx="1">
+              <a:schemeClr val="accent1"/>
+            </a:lnRef>
+            <a:fillRef idx="0">
+              <a:schemeClr val="accent1"/>
+            </a:fillRef>
+            <a:effectRef idx="0">
+              <a:schemeClr val="accent1"/>
+            </a:effectRef>
+            <a:fontRef idx="minor">
+              <a:schemeClr val="tx1"/>
+            </a:fontRef>
+          </p:style>
+        </p:cxnSp>
+        <p:sp>
+          <p:nvSpPr>
+            <p:cNvPr id="47" name="TextBox 46"/>
+            <p:cNvSpPr txBox="1"/>
+            <p:nvPr/>
+          </p:nvSpPr>
+          <p:spPr>
+            <a:xfrm>
+              <a:off x="2334271" y="318043"/>
+              <a:ext cx="1408522" cy="523220"/>
+            </a:xfrm>
+            <a:prstGeom prst="rect">
+              <a:avLst/>
+            </a:prstGeom>
+            <a:noFill/>
+          </p:spPr>
+          <p:txBody>
+            <a:bodyPr wrap="square" rtlCol="0">
+              <a:spAutoFit/>
+            </a:bodyPr>
+            <a:lstStyle/>
+            <a:p>
+              <a:pPr algn="ctr"/>
+              <a:endParaRPr lang="de-DE" sz="2800" b="1" dirty="0"/>
+            </a:p>
+          </p:txBody>
+        </p:sp>
+      </p:grpSp>
+    </p:spTree>
+    <p:extLst>
+      <p:ext uri="{BB962C8B-B14F-4D97-AF65-F5344CB8AC3E}">
+        <p14:creationId xmlns:p14="http://schemas.microsoft.com/office/powerpoint/2010/main" val="1635227564"/>
       </p:ext>
     </p:extLst>
   </p:cSld>

</xml_diff>

<commit_message>
Added Dropwizard AWS part 2
</commit_message>
<xml_diff>
--- a/_sources/GettingStarted.pptx
+++ b/_sources/GettingStarted.pptx
@@ -20,7 +20,8 @@
     <p:sldId id="267" r:id="rId14"/>
     <p:sldId id="268" r:id="rId15"/>
     <p:sldId id="270" r:id="rId16"/>
-    <p:sldId id="271" r:id="rId17"/>
+    <p:sldId id="272" r:id="rId17"/>
+    <p:sldId id="271" r:id="rId18"/>
   </p:sldIdLst>
   <p:sldSz cx="14400213" cy="7559675"/>
   <p:notesSz cx="6858000" cy="9144000"/>
@@ -125,6 +126,2795 @@
     </p:ext>
   </p:extLst>
 </p:presentation>
+</file>
+
+<file path=ppt/diagrams/colors1.xml><?xml version="1.0" encoding="utf-8"?>
+<dgm:colorsDef xmlns:dgm="http://schemas.openxmlformats.org/drawingml/2006/diagram" xmlns:a="http://schemas.openxmlformats.org/drawingml/2006/main" uniqueId="urn:microsoft.com/office/officeart/2005/8/colors/accent1_2">
+  <dgm:title val=""/>
+  <dgm:desc val=""/>
+  <dgm:catLst>
+    <dgm:cat type="accent1" pri="11200"/>
+  </dgm:catLst>
+  <dgm:styleLbl name="node0">
+    <dgm:fillClrLst meth="repeat">
+      <a:schemeClr val="accent1"/>
+    </dgm:fillClrLst>
+    <dgm:linClrLst meth="repeat">
+      <a:schemeClr val="lt1"/>
+    </dgm:linClrLst>
+    <dgm:effectClrLst/>
+    <dgm:txLinClrLst/>
+    <dgm:txFillClrLst/>
+    <dgm:txEffectClrLst/>
+  </dgm:styleLbl>
+  <dgm:styleLbl name="alignNode1">
+    <dgm:fillClrLst meth="repeat">
+      <a:schemeClr val="accent1"/>
+    </dgm:fillClrLst>
+    <dgm:linClrLst meth="repeat">
+      <a:schemeClr val="accent1"/>
+    </dgm:linClrLst>
+    <dgm:effectClrLst/>
+    <dgm:txLinClrLst/>
+    <dgm:txFillClrLst/>
+    <dgm:txEffectClrLst/>
+  </dgm:styleLbl>
+  <dgm:styleLbl name="node1">
+    <dgm:fillClrLst meth="repeat">
+      <a:schemeClr val="accent1"/>
+    </dgm:fillClrLst>
+    <dgm:linClrLst meth="repeat">
+      <a:schemeClr val="lt1"/>
+    </dgm:linClrLst>
+    <dgm:effectClrLst/>
+    <dgm:txLinClrLst/>
+    <dgm:txFillClrLst/>
+    <dgm:txEffectClrLst/>
+  </dgm:styleLbl>
+  <dgm:styleLbl name="lnNode1">
+    <dgm:fillClrLst meth="repeat">
+      <a:schemeClr val="accent1"/>
+    </dgm:fillClrLst>
+    <dgm:linClrLst meth="repeat">
+      <a:schemeClr val="lt1"/>
+    </dgm:linClrLst>
+    <dgm:effectClrLst/>
+    <dgm:txLinClrLst/>
+    <dgm:txFillClrLst/>
+    <dgm:txEffectClrLst/>
+  </dgm:styleLbl>
+  <dgm:styleLbl name="vennNode1">
+    <dgm:fillClrLst meth="repeat">
+      <a:schemeClr val="accent1">
+        <a:alpha val="50000"/>
+      </a:schemeClr>
+    </dgm:fillClrLst>
+    <dgm:linClrLst meth="repeat">
+      <a:schemeClr val="lt1"/>
+    </dgm:linClrLst>
+    <dgm:effectClrLst/>
+    <dgm:txLinClrLst/>
+    <dgm:txFillClrLst/>
+    <dgm:txEffectClrLst/>
+  </dgm:styleLbl>
+  <dgm:styleLbl name="node2">
+    <dgm:fillClrLst meth="repeat">
+      <a:schemeClr val="accent1"/>
+    </dgm:fillClrLst>
+    <dgm:linClrLst meth="repeat">
+      <a:schemeClr val="lt1"/>
+    </dgm:linClrLst>
+    <dgm:effectClrLst/>
+    <dgm:txLinClrLst/>
+    <dgm:txFillClrLst/>
+    <dgm:txEffectClrLst/>
+  </dgm:styleLbl>
+  <dgm:styleLbl name="node3">
+    <dgm:fillClrLst meth="repeat">
+      <a:schemeClr val="accent1"/>
+    </dgm:fillClrLst>
+    <dgm:linClrLst meth="repeat">
+      <a:schemeClr val="lt1"/>
+    </dgm:linClrLst>
+    <dgm:effectClrLst/>
+    <dgm:txLinClrLst/>
+    <dgm:txFillClrLst/>
+    <dgm:txEffectClrLst/>
+  </dgm:styleLbl>
+  <dgm:styleLbl name="node4">
+    <dgm:fillClrLst meth="repeat">
+      <a:schemeClr val="accent1"/>
+    </dgm:fillClrLst>
+    <dgm:linClrLst meth="repeat">
+      <a:schemeClr val="lt1"/>
+    </dgm:linClrLst>
+    <dgm:effectClrLst/>
+    <dgm:txLinClrLst/>
+    <dgm:txFillClrLst/>
+    <dgm:txEffectClrLst/>
+  </dgm:styleLbl>
+  <dgm:styleLbl name="fgImgPlace1">
+    <dgm:fillClrLst meth="repeat">
+      <a:schemeClr val="accent1">
+        <a:tint val="50000"/>
+      </a:schemeClr>
+    </dgm:fillClrLst>
+    <dgm:linClrLst meth="repeat">
+      <a:schemeClr val="lt1"/>
+    </dgm:linClrLst>
+    <dgm:effectClrLst/>
+    <dgm:txLinClrLst/>
+    <dgm:txFillClrLst meth="repeat">
+      <a:schemeClr val="lt1"/>
+    </dgm:txFillClrLst>
+    <dgm:txEffectClrLst/>
+  </dgm:styleLbl>
+  <dgm:styleLbl name="alignImgPlace1">
+    <dgm:fillClrLst meth="repeat">
+      <a:schemeClr val="accent1">
+        <a:tint val="50000"/>
+      </a:schemeClr>
+    </dgm:fillClrLst>
+    <dgm:linClrLst meth="repeat">
+      <a:schemeClr val="lt1"/>
+    </dgm:linClrLst>
+    <dgm:effectClrLst/>
+    <dgm:txLinClrLst/>
+    <dgm:txFillClrLst meth="repeat">
+      <a:schemeClr val="lt1"/>
+    </dgm:txFillClrLst>
+    <dgm:txEffectClrLst/>
+  </dgm:styleLbl>
+  <dgm:styleLbl name="bgImgPlace1">
+    <dgm:fillClrLst meth="repeat">
+      <a:schemeClr val="accent1">
+        <a:tint val="50000"/>
+      </a:schemeClr>
+    </dgm:fillClrLst>
+    <dgm:linClrLst meth="repeat">
+      <a:schemeClr val="lt1"/>
+    </dgm:linClrLst>
+    <dgm:effectClrLst/>
+    <dgm:txLinClrLst/>
+    <dgm:txFillClrLst meth="repeat">
+      <a:schemeClr val="lt1"/>
+    </dgm:txFillClrLst>
+    <dgm:txEffectClrLst/>
+  </dgm:styleLbl>
+  <dgm:styleLbl name="sibTrans2D1">
+    <dgm:fillClrLst meth="repeat">
+      <a:schemeClr val="accent1">
+        <a:tint val="60000"/>
+      </a:schemeClr>
+    </dgm:fillClrLst>
+    <dgm:linClrLst meth="repeat">
+      <a:schemeClr val="accent1">
+        <a:tint val="60000"/>
+      </a:schemeClr>
+    </dgm:linClrLst>
+    <dgm:effectClrLst/>
+    <dgm:txLinClrLst/>
+    <dgm:txFillClrLst/>
+    <dgm:txEffectClrLst/>
+  </dgm:styleLbl>
+  <dgm:styleLbl name="fgSibTrans2D1">
+    <dgm:fillClrLst meth="repeat">
+      <a:schemeClr val="accent1">
+        <a:tint val="60000"/>
+      </a:schemeClr>
+    </dgm:fillClrLst>
+    <dgm:linClrLst meth="repeat">
+      <a:schemeClr val="accent1">
+        <a:tint val="60000"/>
+      </a:schemeClr>
+    </dgm:linClrLst>
+    <dgm:effectClrLst/>
+    <dgm:txLinClrLst/>
+    <dgm:txFillClrLst/>
+    <dgm:txEffectClrLst/>
+  </dgm:styleLbl>
+  <dgm:styleLbl name="bgSibTrans2D1">
+    <dgm:fillClrLst meth="repeat">
+      <a:schemeClr val="accent1">
+        <a:tint val="60000"/>
+      </a:schemeClr>
+    </dgm:fillClrLst>
+    <dgm:linClrLst meth="repeat">
+      <a:schemeClr val="accent1">
+        <a:tint val="60000"/>
+      </a:schemeClr>
+    </dgm:linClrLst>
+    <dgm:effectClrLst/>
+    <dgm:txLinClrLst/>
+    <dgm:txFillClrLst/>
+    <dgm:txEffectClrLst/>
+  </dgm:styleLbl>
+  <dgm:styleLbl name="sibTrans1D1">
+    <dgm:fillClrLst meth="repeat">
+      <a:schemeClr val="accent1"/>
+    </dgm:fillClrLst>
+    <dgm:linClrLst meth="repeat">
+      <a:schemeClr val="accent1"/>
+    </dgm:linClrLst>
+    <dgm:effectClrLst/>
+    <dgm:txLinClrLst/>
+    <dgm:txFillClrLst meth="repeat">
+      <a:schemeClr val="tx1"/>
+    </dgm:txFillClrLst>
+    <dgm:txEffectClrLst/>
+  </dgm:styleLbl>
+  <dgm:styleLbl name="callout">
+    <dgm:fillClrLst meth="repeat">
+      <a:schemeClr val="accent1"/>
+    </dgm:fillClrLst>
+    <dgm:linClrLst meth="repeat">
+      <a:schemeClr val="accent1">
+        <a:tint val="50000"/>
+      </a:schemeClr>
+    </dgm:linClrLst>
+    <dgm:effectClrLst/>
+    <dgm:txLinClrLst/>
+    <dgm:txFillClrLst meth="repeat">
+      <a:schemeClr val="tx1"/>
+    </dgm:txFillClrLst>
+    <dgm:txEffectClrLst/>
+  </dgm:styleLbl>
+  <dgm:styleLbl name="asst0">
+    <dgm:fillClrLst meth="repeat">
+      <a:schemeClr val="accent1"/>
+    </dgm:fillClrLst>
+    <dgm:linClrLst meth="repeat">
+      <a:schemeClr val="lt1"/>
+    </dgm:linClrLst>
+    <dgm:effectClrLst/>
+    <dgm:txLinClrLst/>
+    <dgm:txFillClrLst/>
+    <dgm:txEffectClrLst/>
+  </dgm:styleLbl>
+  <dgm:styleLbl name="asst1">
+    <dgm:fillClrLst meth="repeat">
+      <a:schemeClr val="accent1"/>
+    </dgm:fillClrLst>
+    <dgm:linClrLst meth="repeat">
+      <a:schemeClr val="lt1"/>
+    </dgm:linClrLst>
+    <dgm:effectClrLst/>
+    <dgm:txLinClrLst/>
+    <dgm:txFillClrLst/>
+    <dgm:txEffectClrLst/>
+  </dgm:styleLbl>
+  <dgm:styleLbl name="asst2">
+    <dgm:fillClrLst meth="repeat">
+      <a:schemeClr val="accent1"/>
+    </dgm:fillClrLst>
+    <dgm:linClrLst meth="repeat">
+      <a:schemeClr val="lt1"/>
+    </dgm:linClrLst>
+    <dgm:effectClrLst/>
+    <dgm:txLinClrLst/>
+    <dgm:txFillClrLst/>
+    <dgm:txEffectClrLst/>
+  </dgm:styleLbl>
+  <dgm:styleLbl name="asst3">
+    <dgm:fillClrLst meth="repeat">
+      <a:schemeClr val="accent1"/>
+    </dgm:fillClrLst>
+    <dgm:linClrLst meth="repeat">
+      <a:schemeClr val="lt1"/>
+    </dgm:linClrLst>
+    <dgm:effectClrLst/>
+    <dgm:txLinClrLst/>
+    <dgm:txFillClrLst/>
+    <dgm:txEffectClrLst/>
+  </dgm:styleLbl>
+  <dgm:styleLbl name="asst4">
+    <dgm:fillClrLst meth="repeat">
+      <a:schemeClr val="accent1"/>
+    </dgm:fillClrLst>
+    <dgm:linClrLst meth="repeat">
+      <a:schemeClr val="lt1"/>
+    </dgm:linClrLst>
+    <dgm:effectClrLst/>
+    <dgm:txLinClrLst/>
+    <dgm:txFillClrLst/>
+    <dgm:txEffectClrLst/>
+  </dgm:styleLbl>
+  <dgm:styleLbl name="parChTrans2D1">
+    <dgm:fillClrLst meth="repeat">
+      <a:schemeClr val="accent1">
+        <a:tint val="60000"/>
+      </a:schemeClr>
+    </dgm:fillClrLst>
+    <dgm:linClrLst meth="repeat">
+      <a:schemeClr val="accent1">
+        <a:tint val="60000"/>
+      </a:schemeClr>
+    </dgm:linClrLst>
+    <dgm:effectClrLst/>
+    <dgm:txLinClrLst/>
+    <dgm:txFillClrLst meth="repeat">
+      <a:schemeClr val="lt1"/>
+    </dgm:txFillClrLst>
+    <dgm:txEffectClrLst/>
+  </dgm:styleLbl>
+  <dgm:styleLbl name="parChTrans2D2">
+    <dgm:fillClrLst meth="repeat">
+      <a:schemeClr val="accent1"/>
+    </dgm:fillClrLst>
+    <dgm:linClrLst meth="repeat">
+      <a:schemeClr val="accent1"/>
+    </dgm:linClrLst>
+    <dgm:effectClrLst/>
+    <dgm:txLinClrLst/>
+    <dgm:txFillClrLst meth="repeat">
+      <a:schemeClr val="lt1"/>
+    </dgm:txFillClrLst>
+    <dgm:txEffectClrLst/>
+  </dgm:styleLbl>
+  <dgm:styleLbl name="parChTrans2D3">
+    <dgm:fillClrLst meth="repeat">
+      <a:schemeClr val="accent1"/>
+    </dgm:fillClrLst>
+    <dgm:linClrLst meth="repeat">
+      <a:schemeClr val="accent1"/>
+    </dgm:linClrLst>
+    <dgm:effectClrLst/>
+    <dgm:txLinClrLst/>
+    <dgm:txFillClrLst meth="repeat">
+      <a:schemeClr val="lt1"/>
+    </dgm:txFillClrLst>
+    <dgm:txEffectClrLst/>
+  </dgm:styleLbl>
+  <dgm:styleLbl name="parChTrans2D4">
+    <dgm:fillClrLst meth="repeat">
+      <a:schemeClr val="accent1"/>
+    </dgm:fillClrLst>
+    <dgm:linClrLst meth="repeat">
+      <a:schemeClr val="accent1"/>
+    </dgm:linClrLst>
+    <dgm:effectClrLst/>
+    <dgm:txLinClrLst/>
+    <dgm:txFillClrLst meth="repeat">
+      <a:schemeClr val="lt1"/>
+    </dgm:txFillClrLst>
+    <dgm:txEffectClrLst/>
+  </dgm:styleLbl>
+  <dgm:styleLbl name="parChTrans1D1">
+    <dgm:fillClrLst meth="repeat">
+      <a:schemeClr val="accent1"/>
+    </dgm:fillClrLst>
+    <dgm:linClrLst meth="repeat">
+      <a:schemeClr val="accent1">
+        <a:shade val="60000"/>
+      </a:schemeClr>
+    </dgm:linClrLst>
+    <dgm:effectClrLst/>
+    <dgm:txLinClrLst/>
+    <dgm:txFillClrLst meth="repeat">
+      <a:schemeClr val="tx1"/>
+    </dgm:txFillClrLst>
+    <dgm:txEffectClrLst/>
+  </dgm:styleLbl>
+  <dgm:styleLbl name="parChTrans1D2">
+    <dgm:fillClrLst meth="repeat">
+      <a:schemeClr val="accent1"/>
+    </dgm:fillClrLst>
+    <dgm:linClrLst meth="repeat">
+      <a:schemeClr val="accent1">
+        <a:shade val="60000"/>
+      </a:schemeClr>
+    </dgm:linClrLst>
+    <dgm:effectClrLst/>
+    <dgm:txLinClrLst/>
+    <dgm:txFillClrLst meth="repeat">
+      <a:schemeClr val="tx1"/>
+    </dgm:txFillClrLst>
+    <dgm:txEffectClrLst/>
+  </dgm:styleLbl>
+  <dgm:styleLbl name="parChTrans1D3">
+    <dgm:fillClrLst meth="repeat">
+      <a:schemeClr val="accent1"/>
+    </dgm:fillClrLst>
+    <dgm:linClrLst meth="repeat">
+      <a:schemeClr val="accent1">
+        <a:shade val="80000"/>
+      </a:schemeClr>
+    </dgm:linClrLst>
+    <dgm:effectClrLst/>
+    <dgm:txLinClrLst/>
+    <dgm:txFillClrLst meth="repeat">
+      <a:schemeClr val="tx1"/>
+    </dgm:txFillClrLst>
+    <dgm:txEffectClrLst/>
+  </dgm:styleLbl>
+  <dgm:styleLbl name="parChTrans1D4">
+    <dgm:fillClrLst meth="repeat">
+      <a:schemeClr val="accent1"/>
+    </dgm:fillClrLst>
+    <dgm:linClrLst meth="repeat">
+      <a:schemeClr val="accent1">
+        <a:shade val="80000"/>
+      </a:schemeClr>
+    </dgm:linClrLst>
+    <dgm:effectClrLst/>
+    <dgm:txLinClrLst/>
+    <dgm:txFillClrLst meth="repeat">
+      <a:schemeClr val="tx1"/>
+    </dgm:txFillClrLst>
+    <dgm:txEffectClrLst/>
+  </dgm:styleLbl>
+  <dgm:styleLbl name="fgAcc1">
+    <dgm:fillClrLst meth="repeat">
+      <a:schemeClr val="lt1">
+        <a:alpha val="90000"/>
+      </a:schemeClr>
+    </dgm:fillClrLst>
+    <dgm:linClrLst meth="repeat">
+      <a:schemeClr val="accent1"/>
+    </dgm:linClrLst>
+    <dgm:effectClrLst/>
+    <dgm:txLinClrLst/>
+    <dgm:txFillClrLst meth="repeat">
+      <a:schemeClr val="dk1"/>
+    </dgm:txFillClrLst>
+    <dgm:txEffectClrLst/>
+  </dgm:styleLbl>
+  <dgm:styleLbl name="conFgAcc1">
+    <dgm:fillClrLst meth="repeat">
+      <a:schemeClr val="lt1">
+        <a:alpha val="90000"/>
+      </a:schemeClr>
+    </dgm:fillClrLst>
+    <dgm:linClrLst meth="repeat">
+      <a:schemeClr val="accent1"/>
+    </dgm:linClrLst>
+    <dgm:effectClrLst/>
+    <dgm:txLinClrLst/>
+    <dgm:txFillClrLst meth="repeat">
+      <a:schemeClr val="dk1"/>
+    </dgm:txFillClrLst>
+    <dgm:txEffectClrLst/>
+  </dgm:styleLbl>
+  <dgm:styleLbl name="alignAcc1">
+    <dgm:fillClrLst meth="repeat">
+      <a:schemeClr val="lt1">
+        <a:alpha val="90000"/>
+      </a:schemeClr>
+    </dgm:fillClrLst>
+    <dgm:linClrLst meth="repeat">
+      <a:schemeClr val="accent1"/>
+    </dgm:linClrLst>
+    <dgm:effectClrLst/>
+    <dgm:txLinClrLst/>
+    <dgm:txFillClrLst meth="repeat">
+      <a:schemeClr val="dk1"/>
+    </dgm:txFillClrLst>
+    <dgm:txEffectClrLst/>
+  </dgm:styleLbl>
+  <dgm:styleLbl name="trAlignAcc1">
+    <dgm:fillClrLst meth="repeat">
+      <a:schemeClr val="lt1">
+        <a:alpha val="40000"/>
+      </a:schemeClr>
+    </dgm:fillClrLst>
+    <dgm:linClrLst meth="repeat">
+      <a:schemeClr val="accent1"/>
+    </dgm:linClrLst>
+    <dgm:effectClrLst/>
+    <dgm:txLinClrLst/>
+    <dgm:txFillClrLst meth="repeat">
+      <a:schemeClr val="dk1"/>
+    </dgm:txFillClrLst>
+    <dgm:txEffectClrLst/>
+  </dgm:styleLbl>
+  <dgm:styleLbl name="bgAcc1">
+    <dgm:fillClrLst meth="repeat">
+      <a:schemeClr val="lt1">
+        <a:alpha val="90000"/>
+      </a:schemeClr>
+    </dgm:fillClrLst>
+    <dgm:linClrLst meth="repeat">
+      <a:schemeClr val="accent1"/>
+    </dgm:linClrLst>
+    <dgm:effectClrLst/>
+    <dgm:txLinClrLst/>
+    <dgm:txFillClrLst meth="repeat">
+      <a:schemeClr val="dk1"/>
+    </dgm:txFillClrLst>
+    <dgm:txEffectClrLst/>
+  </dgm:styleLbl>
+  <dgm:styleLbl name="solidFgAcc1">
+    <dgm:fillClrLst meth="repeat">
+      <a:schemeClr val="lt1"/>
+    </dgm:fillClrLst>
+    <dgm:linClrLst meth="repeat">
+      <a:schemeClr val="accent1"/>
+    </dgm:linClrLst>
+    <dgm:effectClrLst/>
+    <dgm:txLinClrLst/>
+    <dgm:txFillClrLst meth="repeat">
+      <a:schemeClr val="dk1"/>
+    </dgm:txFillClrLst>
+    <dgm:txEffectClrLst/>
+  </dgm:styleLbl>
+  <dgm:styleLbl name="solidAlignAcc1">
+    <dgm:fillClrLst meth="repeat">
+      <a:schemeClr val="lt1"/>
+    </dgm:fillClrLst>
+    <dgm:linClrLst meth="repeat">
+      <a:schemeClr val="accent1"/>
+    </dgm:linClrLst>
+    <dgm:effectClrLst/>
+    <dgm:txLinClrLst/>
+    <dgm:txFillClrLst meth="repeat">
+      <a:schemeClr val="dk1"/>
+    </dgm:txFillClrLst>
+    <dgm:txEffectClrLst/>
+  </dgm:styleLbl>
+  <dgm:styleLbl name="solidBgAcc1">
+    <dgm:fillClrLst meth="repeat">
+      <a:schemeClr val="lt1"/>
+    </dgm:fillClrLst>
+    <dgm:linClrLst meth="repeat">
+      <a:schemeClr val="accent1"/>
+    </dgm:linClrLst>
+    <dgm:effectClrLst/>
+    <dgm:txLinClrLst/>
+    <dgm:txFillClrLst meth="repeat">
+      <a:schemeClr val="dk1"/>
+    </dgm:txFillClrLst>
+    <dgm:txEffectClrLst/>
+  </dgm:styleLbl>
+  <dgm:styleLbl name="fgAccFollowNode1">
+    <dgm:fillClrLst meth="repeat">
+      <a:schemeClr val="accent1">
+        <a:alpha val="90000"/>
+        <a:tint val="40000"/>
+      </a:schemeClr>
+    </dgm:fillClrLst>
+    <dgm:linClrLst meth="repeat">
+      <a:schemeClr val="accent1">
+        <a:alpha val="90000"/>
+        <a:tint val="40000"/>
+      </a:schemeClr>
+    </dgm:linClrLst>
+    <dgm:effectClrLst/>
+    <dgm:txLinClrLst/>
+    <dgm:txFillClrLst meth="repeat">
+      <a:schemeClr val="dk1"/>
+    </dgm:txFillClrLst>
+    <dgm:txEffectClrLst/>
+  </dgm:styleLbl>
+  <dgm:styleLbl name="alignAccFollowNode1">
+    <dgm:fillClrLst meth="repeat">
+      <a:schemeClr val="accent1">
+        <a:alpha val="90000"/>
+        <a:tint val="40000"/>
+      </a:schemeClr>
+    </dgm:fillClrLst>
+    <dgm:linClrLst meth="repeat">
+      <a:schemeClr val="accent1">
+        <a:alpha val="90000"/>
+        <a:tint val="40000"/>
+      </a:schemeClr>
+    </dgm:linClrLst>
+    <dgm:effectClrLst/>
+    <dgm:txLinClrLst/>
+    <dgm:txFillClrLst meth="repeat">
+      <a:schemeClr val="dk1"/>
+    </dgm:txFillClrLst>
+    <dgm:txEffectClrLst/>
+  </dgm:styleLbl>
+  <dgm:styleLbl name="bgAccFollowNode1">
+    <dgm:fillClrLst meth="repeat">
+      <a:schemeClr val="accent1">
+        <a:alpha val="90000"/>
+        <a:tint val="40000"/>
+      </a:schemeClr>
+    </dgm:fillClrLst>
+    <dgm:linClrLst meth="repeat">
+      <a:schemeClr val="accent1">
+        <a:alpha val="90000"/>
+        <a:tint val="40000"/>
+      </a:schemeClr>
+    </dgm:linClrLst>
+    <dgm:effectClrLst/>
+    <dgm:txLinClrLst/>
+    <dgm:txFillClrLst meth="repeat">
+      <a:schemeClr val="dk1"/>
+    </dgm:txFillClrLst>
+    <dgm:txEffectClrLst/>
+  </dgm:styleLbl>
+  <dgm:styleLbl name="fgAcc0">
+    <dgm:fillClrLst meth="repeat">
+      <a:schemeClr val="lt1">
+        <a:alpha val="90000"/>
+      </a:schemeClr>
+    </dgm:fillClrLst>
+    <dgm:linClrLst meth="repeat">
+      <a:schemeClr val="accent1"/>
+    </dgm:linClrLst>
+    <dgm:effectClrLst/>
+    <dgm:txLinClrLst/>
+    <dgm:txFillClrLst meth="repeat">
+      <a:schemeClr val="dk1"/>
+    </dgm:txFillClrLst>
+    <dgm:txEffectClrLst/>
+  </dgm:styleLbl>
+  <dgm:styleLbl name="fgAcc2">
+    <dgm:fillClrLst meth="repeat">
+      <a:schemeClr val="lt1">
+        <a:alpha val="90000"/>
+      </a:schemeClr>
+    </dgm:fillClrLst>
+    <dgm:linClrLst meth="repeat">
+      <a:schemeClr val="accent1"/>
+    </dgm:linClrLst>
+    <dgm:effectClrLst/>
+    <dgm:txLinClrLst/>
+    <dgm:txFillClrLst meth="repeat">
+      <a:schemeClr val="dk1"/>
+    </dgm:txFillClrLst>
+    <dgm:txEffectClrLst/>
+  </dgm:styleLbl>
+  <dgm:styleLbl name="fgAcc3">
+    <dgm:fillClrLst meth="repeat">
+      <a:schemeClr val="lt1">
+        <a:alpha val="90000"/>
+      </a:schemeClr>
+    </dgm:fillClrLst>
+    <dgm:linClrLst meth="repeat">
+      <a:schemeClr val="accent1"/>
+    </dgm:linClrLst>
+    <dgm:effectClrLst/>
+    <dgm:txLinClrLst/>
+    <dgm:txFillClrLst meth="repeat">
+      <a:schemeClr val="dk1"/>
+    </dgm:txFillClrLst>
+    <dgm:txEffectClrLst/>
+  </dgm:styleLbl>
+  <dgm:styleLbl name="fgAcc4">
+    <dgm:fillClrLst meth="repeat">
+      <a:schemeClr val="lt1">
+        <a:alpha val="90000"/>
+      </a:schemeClr>
+    </dgm:fillClrLst>
+    <dgm:linClrLst meth="repeat">
+      <a:schemeClr val="accent1"/>
+    </dgm:linClrLst>
+    <dgm:effectClrLst/>
+    <dgm:txLinClrLst/>
+    <dgm:txFillClrLst meth="repeat">
+      <a:schemeClr val="dk1"/>
+    </dgm:txFillClrLst>
+    <dgm:txEffectClrLst/>
+  </dgm:styleLbl>
+  <dgm:styleLbl name="bgShp">
+    <dgm:fillClrLst meth="repeat">
+      <a:schemeClr val="accent1">
+        <a:tint val="40000"/>
+      </a:schemeClr>
+    </dgm:fillClrLst>
+    <dgm:linClrLst meth="repeat">
+      <a:schemeClr val="accent1"/>
+    </dgm:linClrLst>
+    <dgm:effectClrLst/>
+    <dgm:txLinClrLst/>
+    <dgm:txFillClrLst meth="repeat">
+      <a:schemeClr val="dk1"/>
+    </dgm:txFillClrLst>
+    <dgm:txEffectClrLst/>
+  </dgm:styleLbl>
+  <dgm:styleLbl name="dkBgShp">
+    <dgm:fillClrLst meth="repeat">
+      <a:schemeClr val="accent1">
+        <a:shade val="80000"/>
+      </a:schemeClr>
+    </dgm:fillClrLst>
+    <dgm:linClrLst meth="repeat">
+      <a:schemeClr val="accent1"/>
+    </dgm:linClrLst>
+    <dgm:effectClrLst/>
+    <dgm:txLinClrLst/>
+    <dgm:txFillClrLst meth="repeat">
+      <a:schemeClr val="lt1"/>
+    </dgm:txFillClrLst>
+    <dgm:txEffectClrLst/>
+  </dgm:styleLbl>
+  <dgm:styleLbl name="trBgShp">
+    <dgm:fillClrLst meth="repeat">
+      <a:schemeClr val="accent1">
+        <a:tint val="50000"/>
+        <a:alpha val="40000"/>
+      </a:schemeClr>
+    </dgm:fillClrLst>
+    <dgm:linClrLst meth="repeat">
+      <a:schemeClr val="accent1"/>
+    </dgm:linClrLst>
+    <dgm:effectClrLst/>
+    <dgm:txLinClrLst/>
+    <dgm:txFillClrLst meth="repeat">
+      <a:schemeClr val="lt1"/>
+    </dgm:txFillClrLst>
+    <dgm:txEffectClrLst/>
+  </dgm:styleLbl>
+  <dgm:styleLbl name="fgShp">
+    <dgm:fillClrLst meth="repeat">
+      <a:schemeClr val="accent1">
+        <a:tint val="60000"/>
+      </a:schemeClr>
+    </dgm:fillClrLst>
+    <dgm:linClrLst meth="repeat">
+      <a:schemeClr val="lt1"/>
+    </dgm:linClrLst>
+    <dgm:effectClrLst/>
+    <dgm:txLinClrLst/>
+    <dgm:txFillClrLst meth="repeat">
+      <a:schemeClr val="dk1"/>
+    </dgm:txFillClrLst>
+    <dgm:txEffectClrLst/>
+  </dgm:styleLbl>
+  <dgm:styleLbl name="revTx">
+    <dgm:fillClrLst meth="repeat">
+      <a:schemeClr val="lt1">
+        <a:alpha val="0"/>
+      </a:schemeClr>
+    </dgm:fillClrLst>
+    <dgm:linClrLst meth="repeat">
+      <a:schemeClr val="dk1">
+        <a:alpha val="0"/>
+      </a:schemeClr>
+    </dgm:linClrLst>
+    <dgm:effectClrLst/>
+    <dgm:txLinClrLst/>
+    <dgm:txFillClrLst meth="repeat">
+      <a:schemeClr val="tx1"/>
+    </dgm:txFillClrLst>
+    <dgm:txEffectClrLst/>
+  </dgm:styleLbl>
+</dgm:colorsDef>
+</file>
+
+<file path=ppt/diagrams/data1.xml><?xml version="1.0" encoding="utf-8"?>
+<dgm:dataModel xmlns:dgm="http://schemas.openxmlformats.org/drawingml/2006/diagram" xmlns:a="http://schemas.openxmlformats.org/drawingml/2006/main">
+  <dgm:ptLst>
+    <dgm:pt modelId="{88A279F5-7EB5-4E96-9F7B-7496F28D7A8F}" type="doc">
+      <dgm:prSet loTypeId="urn:microsoft.com/office/officeart/2005/8/layout/chevron1" loCatId="process" qsTypeId="urn:microsoft.com/office/officeart/2005/8/quickstyle/simple1" qsCatId="simple" csTypeId="urn:microsoft.com/office/officeart/2005/8/colors/accent1_2" csCatId="accent1" phldr="1"/>
+      <dgm:spPr/>
+    </dgm:pt>
+    <dgm:pt modelId="{89A25868-2A83-4B1C-9589-084F96ECC5FA}">
+      <dgm:prSet phldrT="[Text]" custT="1"/>
+      <dgm:spPr>
+        <a:solidFill>
+          <a:schemeClr val="tx2">
+            <a:lumMod val="75000"/>
+          </a:schemeClr>
+        </a:solidFill>
+      </dgm:spPr>
+      <dgm:t>
+        <a:bodyPr/>
+        <a:lstStyle/>
+        <a:p>
+          <a:r>
+            <a:rPr lang="en-US" sz="1400" b="1" dirty="0" smtClean="0"/>
+            <a:t>package</a:t>
+          </a:r>
+          <a:endParaRPr lang="de-DE" sz="1400" b="1" dirty="0"/>
+        </a:p>
+      </dgm:t>
+    </dgm:pt>
+    <dgm:pt modelId="{318960B0-2EAA-4919-9032-BD16785419A8}" type="parTrans" cxnId="{5D46DE91-375A-4696-8D02-EDBFD2EF7480}">
+      <dgm:prSet/>
+      <dgm:spPr/>
+      <dgm:t>
+        <a:bodyPr/>
+        <a:lstStyle/>
+        <a:p>
+          <a:endParaRPr lang="de-DE" sz="1400" b="1"/>
+        </a:p>
+      </dgm:t>
+    </dgm:pt>
+    <dgm:pt modelId="{2DCEDA11-AF4A-475D-A66D-2E9523CAABC4}" type="sibTrans" cxnId="{5D46DE91-375A-4696-8D02-EDBFD2EF7480}">
+      <dgm:prSet/>
+      <dgm:spPr/>
+      <dgm:t>
+        <a:bodyPr/>
+        <a:lstStyle/>
+        <a:p>
+          <a:endParaRPr lang="de-DE" sz="1400" b="1"/>
+        </a:p>
+      </dgm:t>
+    </dgm:pt>
+    <dgm:pt modelId="{73805C4B-7D98-4362-A8FD-44E28FFCD44B}">
+      <dgm:prSet phldrT="[Text]" custT="1"/>
+      <dgm:spPr>
+        <a:solidFill>
+          <a:schemeClr val="tx2">
+            <a:lumMod val="75000"/>
+          </a:schemeClr>
+        </a:solidFill>
+      </dgm:spPr>
+      <dgm:t>
+        <a:bodyPr/>
+        <a:lstStyle/>
+        <a:p>
+          <a:r>
+            <a:rPr lang="en-US" sz="1400" b="1" dirty="0" smtClean="0"/>
+            <a:t>pre-integration-test</a:t>
+          </a:r>
+          <a:endParaRPr lang="de-DE" sz="1400" b="1" dirty="0"/>
+        </a:p>
+      </dgm:t>
+    </dgm:pt>
+    <dgm:pt modelId="{90EAC645-6FE6-4B62-8ED9-2D637F117228}" type="parTrans" cxnId="{74734019-3F03-40C5-BD6A-8F158F06259E}">
+      <dgm:prSet/>
+      <dgm:spPr/>
+      <dgm:t>
+        <a:bodyPr/>
+        <a:lstStyle/>
+        <a:p>
+          <a:endParaRPr lang="de-DE" sz="1400" b="1"/>
+        </a:p>
+      </dgm:t>
+    </dgm:pt>
+    <dgm:pt modelId="{FCB00572-1C8F-4B6D-968B-B082338556BC}" type="sibTrans" cxnId="{74734019-3F03-40C5-BD6A-8F158F06259E}">
+      <dgm:prSet/>
+      <dgm:spPr/>
+      <dgm:t>
+        <a:bodyPr/>
+        <a:lstStyle/>
+        <a:p>
+          <a:endParaRPr lang="de-DE" sz="1400" b="1"/>
+        </a:p>
+      </dgm:t>
+    </dgm:pt>
+    <dgm:pt modelId="{C53F7CE2-31BC-48F5-A2F3-D03B5B9BF278}">
+      <dgm:prSet phldrT="[Text]" custT="1"/>
+      <dgm:spPr>
+        <a:solidFill>
+          <a:schemeClr val="tx2">
+            <a:lumMod val="75000"/>
+          </a:schemeClr>
+        </a:solidFill>
+      </dgm:spPr>
+      <dgm:t>
+        <a:bodyPr/>
+        <a:lstStyle/>
+        <a:p>
+          <a:r>
+            <a:rPr lang="en-US" sz="1400" b="1" dirty="0" smtClean="0"/>
+            <a:t>integration-test</a:t>
+          </a:r>
+          <a:endParaRPr lang="de-DE" sz="1400" b="1" dirty="0"/>
+        </a:p>
+      </dgm:t>
+    </dgm:pt>
+    <dgm:pt modelId="{37D91C21-A23F-4BDF-9629-740E04ADE85A}" type="parTrans" cxnId="{051DADB8-E59A-459E-A282-F6BEF7FEFAF7}">
+      <dgm:prSet/>
+      <dgm:spPr/>
+      <dgm:t>
+        <a:bodyPr/>
+        <a:lstStyle/>
+        <a:p>
+          <a:endParaRPr lang="de-DE" sz="1400" b="1"/>
+        </a:p>
+      </dgm:t>
+    </dgm:pt>
+    <dgm:pt modelId="{1D3C9E28-C2BE-4DF6-99F3-BB5CC8E8C51A}" type="sibTrans" cxnId="{051DADB8-E59A-459E-A282-F6BEF7FEFAF7}">
+      <dgm:prSet/>
+      <dgm:spPr/>
+      <dgm:t>
+        <a:bodyPr/>
+        <a:lstStyle/>
+        <a:p>
+          <a:endParaRPr lang="de-DE" sz="1400" b="1"/>
+        </a:p>
+      </dgm:t>
+    </dgm:pt>
+    <dgm:pt modelId="{A26FF0B8-21EE-440A-A1E5-B58854861A1B}">
+      <dgm:prSet phldrT="[Text]" custT="1"/>
+      <dgm:spPr>
+        <a:solidFill>
+          <a:schemeClr val="tx2">
+            <a:lumMod val="75000"/>
+          </a:schemeClr>
+        </a:solidFill>
+      </dgm:spPr>
+      <dgm:t>
+        <a:bodyPr/>
+        <a:lstStyle/>
+        <a:p>
+          <a:r>
+            <a:rPr lang="en-US" sz="1400" b="1" dirty="0" smtClean="0"/>
+            <a:t>post-integration-test</a:t>
+          </a:r>
+          <a:endParaRPr lang="de-DE" sz="1400" b="1" dirty="0"/>
+        </a:p>
+      </dgm:t>
+    </dgm:pt>
+    <dgm:pt modelId="{9C3E234D-86CF-4441-AD6C-5E0BD9F7940C}" type="parTrans" cxnId="{12D6D7A4-7E1A-402F-A697-0A52FEE372BD}">
+      <dgm:prSet/>
+      <dgm:spPr/>
+      <dgm:t>
+        <a:bodyPr/>
+        <a:lstStyle/>
+        <a:p>
+          <a:endParaRPr lang="de-DE" sz="1400" b="1"/>
+        </a:p>
+      </dgm:t>
+    </dgm:pt>
+    <dgm:pt modelId="{84265283-6A79-49F9-86CC-89FACB483873}" type="sibTrans" cxnId="{12D6D7A4-7E1A-402F-A697-0A52FEE372BD}">
+      <dgm:prSet/>
+      <dgm:spPr/>
+      <dgm:t>
+        <a:bodyPr/>
+        <a:lstStyle/>
+        <a:p>
+          <a:endParaRPr lang="de-DE" sz="1400" b="1"/>
+        </a:p>
+      </dgm:t>
+    </dgm:pt>
+    <dgm:pt modelId="{F08B1DBD-768B-4021-B324-619C7AE9BCDD}">
+      <dgm:prSet phldrT="[Text]" custT="1"/>
+      <dgm:spPr>
+        <a:solidFill>
+          <a:schemeClr val="tx2">
+            <a:lumMod val="75000"/>
+          </a:schemeClr>
+        </a:solidFill>
+      </dgm:spPr>
+      <dgm:t>
+        <a:bodyPr/>
+        <a:lstStyle/>
+        <a:p>
+          <a:r>
+            <a:rPr lang="en-US" sz="1400" b="1" dirty="0" smtClean="0"/>
+            <a:t>deploy</a:t>
+          </a:r>
+          <a:endParaRPr lang="de-DE" sz="1400" b="1" dirty="0"/>
+        </a:p>
+      </dgm:t>
+    </dgm:pt>
+    <dgm:pt modelId="{171AF7EF-C367-442A-A21C-F76F0AA02179}" type="parTrans" cxnId="{1F1B2787-FB06-4198-8718-4400C492D4E6}">
+      <dgm:prSet/>
+      <dgm:spPr/>
+      <dgm:t>
+        <a:bodyPr/>
+        <a:lstStyle/>
+        <a:p>
+          <a:endParaRPr lang="de-DE" sz="1400" b="1"/>
+        </a:p>
+      </dgm:t>
+    </dgm:pt>
+    <dgm:pt modelId="{F834BEDF-43AA-4613-8A4C-4716A1D96B70}" type="sibTrans" cxnId="{1F1B2787-FB06-4198-8718-4400C492D4E6}">
+      <dgm:prSet/>
+      <dgm:spPr/>
+      <dgm:t>
+        <a:bodyPr/>
+        <a:lstStyle/>
+        <a:p>
+          <a:endParaRPr lang="de-DE" sz="1400" b="1"/>
+        </a:p>
+      </dgm:t>
+    </dgm:pt>
+    <dgm:pt modelId="{6B56D85D-4488-48A3-B443-ED31385606F1}" type="pres">
+      <dgm:prSet presAssocID="{88A279F5-7EB5-4E96-9F7B-7496F28D7A8F}" presName="Name0" presStyleCnt="0">
+        <dgm:presLayoutVars>
+          <dgm:dir/>
+          <dgm:animLvl val="lvl"/>
+          <dgm:resizeHandles val="exact"/>
+        </dgm:presLayoutVars>
+      </dgm:prSet>
+      <dgm:spPr/>
+    </dgm:pt>
+    <dgm:pt modelId="{6D72C3A5-1474-40AD-9A10-2534C79C4517}" type="pres">
+      <dgm:prSet presAssocID="{89A25868-2A83-4B1C-9589-084F96ECC5FA}" presName="parTxOnly" presStyleLbl="node1" presStyleIdx="0" presStyleCnt="5">
+        <dgm:presLayoutVars>
+          <dgm:chMax val="0"/>
+          <dgm:chPref val="0"/>
+          <dgm:bulletEnabled val="1"/>
+        </dgm:presLayoutVars>
+      </dgm:prSet>
+      <dgm:spPr/>
+      <dgm:t>
+        <a:bodyPr/>
+        <a:lstStyle/>
+        <a:p>
+          <a:endParaRPr lang="de-DE"/>
+        </a:p>
+      </dgm:t>
+    </dgm:pt>
+    <dgm:pt modelId="{9F477FD7-EE8B-449F-9A31-7EBE455C9E41}" type="pres">
+      <dgm:prSet presAssocID="{2DCEDA11-AF4A-475D-A66D-2E9523CAABC4}" presName="parTxOnlySpace" presStyleCnt="0"/>
+      <dgm:spPr/>
+    </dgm:pt>
+    <dgm:pt modelId="{086EE9E9-692A-4D05-A349-CBDF03FDA677}" type="pres">
+      <dgm:prSet presAssocID="{73805C4B-7D98-4362-A8FD-44E28FFCD44B}" presName="parTxOnly" presStyleLbl="node1" presStyleIdx="1" presStyleCnt="5">
+        <dgm:presLayoutVars>
+          <dgm:chMax val="0"/>
+          <dgm:chPref val="0"/>
+          <dgm:bulletEnabled val="1"/>
+        </dgm:presLayoutVars>
+      </dgm:prSet>
+      <dgm:spPr/>
+    </dgm:pt>
+    <dgm:pt modelId="{EEA037F7-AE2F-4302-AA11-228240B9A75D}" type="pres">
+      <dgm:prSet presAssocID="{FCB00572-1C8F-4B6D-968B-B082338556BC}" presName="parTxOnlySpace" presStyleCnt="0"/>
+      <dgm:spPr/>
+    </dgm:pt>
+    <dgm:pt modelId="{17AF3B93-FA57-409F-9FAF-CA14FC2BCCDA}" type="pres">
+      <dgm:prSet presAssocID="{C53F7CE2-31BC-48F5-A2F3-D03B5B9BF278}" presName="parTxOnly" presStyleLbl="node1" presStyleIdx="2" presStyleCnt="5">
+        <dgm:presLayoutVars>
+          <dgm:chMax val="0"/>
+          <dgm:chPref val="0"/>
+          <dgm:bulletEnabled val="1"/>
+        </dgm:presLayoutVars>
+      </dgm:prSet>
+      <dgm:spPr/>
+    </dgm:pt>
+    <dgm:pt modelId="{C865F029-8CEF-4314-9C3B-0D8926907D83}" type="pres">
+      <dgm:prSet presAssocID="{1D3C9E28-C2BE-4DF6-99F3-BB5CC8E8C51A}" presName="parTxOnlySpace" presStyleCnt="0"/>
+      <dgm:spPr/>
+    </dgm:pt>
+    <dgm:pt modelId="{DEAC2976-8EFE-4204-9FE4-0A0AE01A3B2B}" type="pres">
+      <dgm:prSet presAssocID="{A26FF0B8-21EE-440A-A1E5-B58854861A1B}" presName="parTxOnly" presStyleLbl="node1" presStyleIdx="3" presStyleCnt="5">
+        <dgm:presLayoutVars>
+          <dgm:chMax val="0"/>
+          <dgm:chPref val="0"/>
+          <dgm:bulletEnabled val="1"/>
+        </dgm:presLayoutVars>
+      </dgm:prSet>
+      <dgm:spPr/>
+    </dgm:pt>
+    <dgm:pt modelId="{48E0258A-CCF0-4FE0-A8A2-A7F4B1729A29}" type="pres">
+      <dgm:prSet presAssocID="{84265283-6A79-49F9-86CC-89FACB483873}" presName="parTxOnlySpace" presStyleCnt="0"/>
+      <dgm:spPr/>
+    </dgm:pt>
+    <dgm:pt modelId="{99F52057-642D-4027-97D5-D26EF2913281}" type="pres">
+      <dgm:prSet presAssocID="{F08B1DBD-768B-4021-B324-619C7AE9BCDD}" presName="parTxOnly" presStyleLbl="node1" presStyleIdx="4" presStyleCnt="5">
+        <dgm:presLayoutVars>
+          <dgm:chMax val="0"/>
+          <dgm:chPref val="0"/>
+          <dgm:bulletEnabled val="1"/>
+        </dgm:presLayoutVars>
+      </dgm:prSet>
+      <dgm:spPr/>
+    </dgm:pt>
+  </dgm:ptLst>
+  <dgm:cxnLst>
+    <dgm:cxn modelId="{051DADB8-E59A-459E-A282-F6BEF7FEFAF7}" srcId="{88A279F5-7EB5-4E96-9F7B-7496F28D7A8F}" destId="{C53F7CE2-31BC-48F5-A2F3-D03B5B9BF278}" srcOrd="2" destOrd="0" parTransId="{37D91C21-A23F-4BDF-9629-740E04ADE85A}" sibTransId="{1D3C9E28-C2BE-4DF6-99F3-BB5CC8E8C51A}"/>
+    <dgm:cxn modelId="{1F1B2787-FB06-4198-8718-4400C492D4E6}" srcId="{88A279F5-7EB5-4E96-9F7B-7496F28D7A8F}" destId="{F08B1DBD-768B-4021-B324-619C7AE9BCDD}" srcOrd="4" destOrd="0" parTransId="{171AF7EF-C367-442A-A21C-F76F0AA02179}" sibTransId="{F834BEDF-43AA-4613-8A4C-4716A1D96B70}"/>
+    <dgm:cxn modelId="{5D46DE91-375A-4696-8D02-EDBFD2EF7480}" srcId="{88A279F5-7EB5-4E96-9F7B-7496F28D7A8F}" destId="{89A25868-2A83-4B1C-9589-084F96ECC5FA}" srcOrd="0" destOrd="0" parTransId="{318960B0-2EAA-4919-9032-BD16785419A8}" sibTransId="{2DCEDA11-AF4A-475D-A66D-2E9523CAABC4}"/>
+    <dgm:cxn modelId="{CB6B619F-6395-46A7-8EB0-BD70AE48CC3A}" type="presOf" srcId="{88A279F5-7EB5-4E96-9F7B-7496F28D7A8F}" destId="{6B56D85D-4488-48A3-B443-ED31385606F1}" srcOrd="0" destOrd="0" presId="urn:microsoft.com/office/officeart/2005/8/layout/chevron1"/>
+    <dgm:cxn modelId="{12D6D7A4-7E1A-402F-A697-0A52FEE372BD}" srcId="{88A279F5-7EB5-4E96-9F7B-7496F28D7A8F}" destId="{A26FF0B8-21EE-440A-A1E5-B58854861A1B}" srcOrd="3" destOrd="0" parTransId="{9C3E234D-86CF-4441-AD6C-5E0BD9F7940C}" sibTransId="{84265283-6A79-49F9-86CC-89FACB483873}"/>
+    <dgm:cxn modelId="{B14D75CA-A94B-4DDA-824B-F69333FC21A9}" type="presOf" srcId="{C53F7CE2-31BC-48F5-A2F3-D03B5B9BF278}" destId="{17AF3B93-FA57-409F-9FAF-CA14FC2BCCDA}" srcOrd="0" destOrd="0" presId="urn:microsoft.com/office/officeart/2005/8/layout/chevron1"/>
+    <dgm:cxn modelId="{307BCC6B-08E2-41DD-AA81-6001933DFDC7}" type="presOf" srcId="{F08B1DBD-768B-4021-B324-619C7AE9BCDD}" destId="{99F52057-642D-4027-97D5-D26EF2913281}" srcOrd="0" destOrd="0" presId="urn:microsoft.com/office/officeart/2005/8/layout/chevron1"/>
+    <dgm:cxn modelId="{1CD9CE8A-B346-4678-8331-010EC9C8B801}" type="presOf" srcId="{A26FF0B8-21EE-440A-A1E5-B58854861A1B}" destId="{DEAC2976-8EFE-4204-9FE4-0A0AE01A3B2B}" srcOrd="0" destOrd="0" presId="urn:microsoft.com/office/officeart/2005/8/layout/chevron1"/>
+    <dgm:cxn modelId="{B596800D-F3DE-4533-A550-2BCAFD578C84}" type="presOf" srcId="{73805C4B-7D98-4362-A8FD-44E28FFCD44B}" destId="{086EE9E9-692A-4D05-A349-CBDF03FDA677}" srcOrd="0" destOrd="0" presId="urn:microsoft.com/office/officeart/2005/8/layout/chevron1"/>
+    <dgm:cxn modelId="{74734019-3F03-40C5-BD6A-8F158F06259E}" srcId="{88A279F5-7EB5-4E96-9F7B-7496F28D7A8F}" destId="{73805C4B-7D98-4362-A8FD-44E28FFCD44B}" srcOrd="1" destOrd="0" parTransId="{90EAC645-6FE6-4B62-8ED9-2D637F117228}" sibTransId="{FCB00572-1C8F-4B6D-968B-B082338556BC}"/>
+    <dgm:cxn modelId="{DEF3569A-244B-4C66-9E63-E2A2E4AD5E58}" type="presOf" srcId="{89A25868-2A83-4B1C-9589-084F96ECC5FA}" destId="{6D72C3A5-1474-40AD-9A10-2534C79C4517}" srcOrd="0" destOrd="0" presId="urn:microsoft.com/office/officeart/2005/8/layout/chevron1"/>
+    <dgm:cxn modelId="{79158879-106A-4178-B689-5F9CFDE94412}" type="presParOf" srcId="{6B56D85D-4488-48A3-B443-ED31385606F1}" destId="{6D72C3A5-1474-40AD-9A10-2534C79C4517}" srcOrd="0" destOrd="0" presId="urn:microsoft.com/office/officeart/2005/8/layout/chevron1"/>
+    <dgm:cxn modelId="{BE4FE79A-D8D6-415A-827A-7E3171452CF2}" type="presParOf" srcId="{6B56D85D-4488-48A3-B443-ED31385606F1}" destId="{9F477FD7-EE8B-449F-9A31-7EBE455C9E41}" srcOrd="1" destOrd="0" presId="urn:microsoft.com/office/officeart/2005/8/layout/chevron1"/>
+    <dgm:cxn modelId="{9A145BA1-BFBC-440A-876B-55DCF30228C9}" type="presParOf" srcId="{6B56D85D-4488-48A3-B443-ED31385606F1}" destId="{086EE9E9-692A-4D05-A349-CBDF03FDA677}" srcOrd="2" destOrd="0" presId="urn:microsoft.com/office/officeart/2005/8/layout/chevron1"/>
+    <dgm:cxn modelId="{52F07B8F-2A94-4C8C-8627-EACAA5E387BC}" type="presParOf" srcId="{6B56D85D-4488-48A3-B443-ED31385606F1}" destId="{EEA037F7-AE2F-4302-AA11-228240B9A75D}" srcOrd="3" destOrd="0" presId="urn:microsoft.com/office/officeart/2005/8/layout/chevron1"/>
+    <dgm:cxn modelId="{9B4A557B-C1EE-46AB-88BE-47FC893DFC3F}" type="presParOf" srcId="{6B56D85D-4488-48A3-B443-ED31385606F1}" destId="{17AF3B93-FA57-409F-9FAF-CA14FC2BCCDA}" srcOrd="4" destOrd="0" presId="urn:microsoft.com/office/officeart/2005/8/layout/chevron1"/>
+    <dgm:cxn modelId="{AA62617B-8BD8-4410-A87F-C23C9410754D}" type="presParOf" srcId="{6B56D85D-4488-48A3-B443-ED31385606F1}" destId="{C865F029-8CEF-4314-9C3B-0D8926907D83}" srcOrd="5" destOrd="0" presId="urn:microsoft.com/office/officeart/2005/8/layout/chevron1"/>
+    <dgm:cxn modelId="{4E0C1548-8C02-475C-814B-557CC5016655}" type="presParOf" srcId="{6B56D85D-4488-48A3-B443-ED31385606F1}" destId="{DEAC2976-8EFE-4204-9FE4-0A0AE01A3B2B}" srcOrd="6" destOrd="0" presId="urn:microsoft.com/office/officeart/2005/8/layout/chevron1"/>
+    <dgm:cxn modelId="{9FE3B372-9691-42D5-808A-ECAC95AAF766}" type="presParOf" srcId="{6B56D85D-4488-48A3-B443-ED31385606F1}" destId="{48E0258A-CCF0-4FE0-A8A2-A7F4B1729A29}" srcOrd="7" destOrd="0" presId="urn:microsoft.com/office/officeart/2005/8/layout/chevron1"/>
+    <dgm:cxn modelId="{CAC57C8B-847A-4377-932D-0408CE7944E7}" type="presParOf" srcId="{6B56D85D-4488-48A3-B443-ED31385606F1}" destId="{99F52057-642D-4027-97D5-D26EF2913281}" srcOrd="8" destOrd="0" presId="urn:microsoft.com/office/officeart/2005/8/layout/chevron1"/>
+  </dgm:cxnLst>
+  <dgm:bg/>
+  <dgm:whole/>
+  <dgm:extLst>
+    <a:ext uri="http://schemas.microsoft.com/office/drawing/2008/diagram">
+      <dsp:dataModelExt xmlns:dsp="http://schemas.microsoft.com/office/drawing/2008/diagram" relId="rId10" minVer="http://schemas.openxmlformats.org/drawingml/2006/diagram"/>
+    </a:ext>
+  </dgm:extLst>
+</dgm:dataModel>
+</file>
+
+<file path=ppt/diagrams/drawing1.xml><?xml version="1.0" encoding="utf-8"?>
+<dsp:drawing xmlns:dgm="http://schemas.openxmlformats.org/drawingml/2006/diagram" xmlns:dsp="http://schemas.microsoft.com/office/drawing/2008/diagram" xmlns:a="http://schemas.openxmlformats.org/drawingml/2006/main">
+  <dsp:spTree>
+    <dsp:nvGrpSpPr>
+      <dsp:cNvPr id="0" name=""/>
+      <dsp:cNvGrpSpPr/>
+    </dsp:nvGrpSpPr>
+    <dsp:grpSpPr/>
+    <dsp:sp modelId="{6D72C3A5-1474-40AD-9A10-2534C79C4517}">
+      <dsp:nvSpPr>
+        <dsp:cNvPr id="0" name=""/>
+        <dsp:cNvSpPr/>
+      </dsp:nvSpPr>
+      <dsp:spPr>
+        <a:xfrm>
+          <a:off x="2112" y="562235"/>
+          <a:ext cx="1880185" cy="752074"/>
+        </a:xfrm>
+        <a:prstGeom prst="chevron">
+          <a:avLst/>
+        </a:prstGeom>
+        <a:solidFill>
+          <a:schemeClr val="tx2">
+            <a:lumMod val="75000"/>
+          </a:schemeClr>
+        </a:solidFill>
+        <a:ln w="12700" cap="flat" cmpd="sng" algn="ctr">
+          <a:solidFill>
+            <a:schemeClr val="lt1">
+              <a:hueOff val="0"/>
+              <a:satOff val="0"/>
+              <a:lumOff val="0"/>
+              <a:alphaOff val="0"/>
+            </a:schemeClr>
+          </a:solidFill>
+          <a:prstDash val="solid"/>
+          <a:miter lim="800000"/>
+        </a:ln>
+        <a:effectLst/>
+      </dsp:spPr>
+      <dsp:style>
+        <a:lnRef idx="2">
+          <a:scrgbClr r="0" g="0" b="0"/>
+        </a:lnRef>
+        <a:fillRef idx="1">
+          <a:scrgbClr r="0" g="0" b="0"/>
+        </a:fillRef>
+        <a:effectRef idx="0">
+          <a:scrgbClr r="0" g="0" b="0"/>
+        </a:effectRef>
+        <a:fontRef idx="minor">
+          <a:schemeClr val="lt1"/>
+        </a:fontRef>
+      </dsp:style>
+      <dsp:txBody>
+        <a:bodyPr spcFirstLastPara="0" vert="horz" wrap="square" lIns="56007" tIns="18669" rIns="18669" bIns="18669" numCol="1" spcCol="1270" anchor="ctr" anchorCtr="0">
+          <a:noAutofit/>
+        </a:bodyPr>
+        <a:lstStyle/>
+        <a:p>
+          <a:pPr lvl="0" algn="ctr" defTabSz="622300">
+            <a:lnSpc>
+              <a:spcPct val="90000"/>
+            </a:lnSpc>
+            <a:spcBef>
+              <a:spcPct val="0"/>
+            </a:spcBef>
+            <a:spcAft>
+              <a:spcPct val="35000"/>
+            </a:spcAft>
+          </a:pPr>
+          <a:r>
+            <a:rPr lang="en-US" sz="1400" b="1" kern="1200" dirty="0" smtClean="0"/>
+            <a:t>package</a:t>
+          </a:r>
+          <a:endParaRPr lang="de-DE" sz="1400" b="1" kern="1200" dirty="0"/>
+        </a:p>
+      </dsp:txBody>
+      <dsp:txXfrm>
+        <a:off x="378149" y="562235"/>
+        <a:ext cx="1128111" cy="752074"/>
+      </dsp:txXfrm>
+    </dsp:sp>
+    <dsp:sp modelId="{086EE9E9-692A-4D05-A349-CBDF03FDA677}">
+      <dsp:nvSpPr>
+        <dsp:cNvPr id="0" name=""/>
+        <dsp:cNvSpPr/>
+      </dsp:nvSpPr>
+      <dsp:spPr>
+        <a:xfrm>
+          <a:off x="1694279" y="562235"/>
+          <a:ext cx="1880185" cy="752074"/>
+        </a:xfrm>
+        <a:prstGeom prst="chevron">
+          <a:avLst/>
+        </a:prstGeom>
+        <a:solidFill>
+          <a:schemeClr val="tx2">
+            <a:lumMod val="75000"/>
+          </a:schemeClr>
+        </a:solidFill>
+        <a:ln w="12700" cap="flat" cmpd="sng" algn="ctr">
+          <a:solidFill>
+            <a:schemeClr val="lt1">
+              <a:hueOff val="0"/>
+              <a:satOff val="0"/>
+              <a:lumOff val="0"/>
+              <a:alphaOff val="0"/>
+            </a:schemeClr>
+          </a:solidFill>
+          <a:prstDash val="solid"/>
+          <a:miter lim="800000"/>
+        </a:ln>
+        <a:effectLst/>
+      </dsp:spPr>
+      <dsp:style>
+        <a:lnRef idx="2">
+          <a:scrgbClr r="0" g="0" b="0"/>
+        </a:lnRef>
+        <a:fillRef idx="1">
+          <a:scrgbClr r="0" g="0" b="0"/>
+        </a:fillRef>
+        <a:effectRef idx="0">
+          <a:scrgbClr r="0" g="0" b="0"/>
+        </a:effectRef>
+        <a:fontRef idx="minor">
+          <a:schemeClr val="lt1"/>
+        </a:fontRef>
+      </dsp:style>
+      <dsp:txBody>
+        <a:bodyPr spcFirstLastPara="0" vert="horz" wrap="square" lIns="56007" tIns="18669" rIns="18669" bIns="18669" numCol="1" spcCol="1270" anchor="ctr" anchorCtr="0">
+          <a:noAutofit/>
+        </a:bodyPr>
+        <a:lstStyle/>
+        <a:p>
+          <a:pPr lvl="0" algn="ctr" defTabSz="622300">
+            <a:lnSpc>
+              <a:spcPct val="90000"/>
+            </a:lnSpc>
+            <a:spcBef>
+              <a:spcPct val="0"/>
+            </a:spcBef>
+            <a:spcAft>
+              <a:spcPct val="35000"/>
+            </a:spcAft>
+          </a:pPr>
+          <a:r>
+            <a:rPr lang="en-US" sz="1400" b="1" kern="1200" dirty="0" smtClean="0"/>
+            <a:t>pre-integration-test</a:t>
+          </a:r>
+          <a:endParaRPr lang="de-DE" sz="1400" b="1" kern="1200" dirty="0"/>
+        </a:p>
+      </dsp:txBody>
+      <dsp:txXfrm>
+        <a:off x="2070316" y="562235"/>
+        <a:ext cx="1128111" cy="752074"/>
+      </dsp:txXfrm>
+    </dsp:sp>
+    <dsp:sp modelId="{17AF3B93-FA57-409F-9FAF-CA14FC2BCCDA}">
+      <dsp:nvSpPr>
+        <dsp:cNvPr id="0" name=""/>
+        <dsp:cNvSpPr/>
+      </dsp:nvSpPr>
+      <dsp:spPr>
+        <a:xfrm>
+          <a:off x="3386445" y="562235"/>
+          <a:ext cx="1880185" cy="752074"/>
+        </a:xfrm>
+        <a:prstGeom prst="chevron">
+          <a:avLst/>
+        </a:prstGeom>
+        <a:solidFill>
+          <a:schemeClr val="tx2">
+            <a:lumMod val="75000"/>
+          </a:schemeClr>
+        </a:solidFill>
+        <a:ln w="12700" cap="flat" cmpd="sng" algn="ctr">
+          <a:solidFill>
+            <a:schemeClr val="lt1">
+              <a:hueOff val="0"/>
+              <a:satOff val="0"/>
+              <a:lumOff val="0"/>
+              <a:alphaOff val="0"/>
+            </a:schemeClr>
+          </a:solidFill>
+          <a:prstDash val="solid"/>
+          <a:miter lim="800000"/>
+        </a:ln>
+        <a:effectLst/>
+      </dsp:spPr>
+      <dsp:style>
+        <a:lnRef idx="2">
+          <a:scrgbClr r="0" g="0" b="0"/>
+        </a:lnRef>
+        <a:fillRef idx="1">
+          <a:scrgbClr r="0" g="0" b="0"/>
+        </a:fillRef>
+        <a:effectRef idx="0">
+          <a:scrgbClr r="0" g="0" b="0"/>
+        </a:effectRef>
+        <a:fontRef idx="minor">
+          <a:schemeClr val="lt1"/>
+        </a:fontRef>
+      </dsp:style>
+      <dsp:txBody>
+        <a:bodyPr spcFirstLastPara="0" vert="horz" wrap="square" lIns="56007" tIns="18669" rIns="18669" bIns="18669" numCol="1" spcCol="1270" anchor="ctr" anchorCtr="0">
+          <a:noAutofit/>
+        </a:bodyPr>
+        <a:lstStyle/>
+        <a:p>
+          <a:pPr lvl="0" algn="ctr" defTabSz="622300">
+            <a:lnSpc>
+              <a:spcPct val="90000"/>
+            </a:lnSpc>
+            <a:spcBef>
+              <a:spcPct val="0"/>
+            </a:spcBef>
+            <a:spcAft>
+              <a:spcPct val="35000"/>
+            </a:spcAft>
+          </a:pPr>
+          <a:r>
+            <a:rPr lang="en-US" sz="1400" b="1" kern="1200" dirty="0" smtClean="0"/>
+            <a:t>integration-test</a:t>
+          </a:r>
+          <a:endParaRPr lang="de-DE" sz="1400" b="1" kern="1200" dirty="0"/>
+        </a:p>
+      </dsp:txBody>
+      <dsp:txXfrm>
+        <a:off x="3762482" y="562235"/>
+        <a:ext cx="1128111" cy="752074"/>
+      </dsp:txXfrm>
+    </dsp:sp>
+    <dsp:sp modelId="{DEAC2976-8EFE-4204-9FE4-0A0AE01A3B2B}">
+      <dsp:nvSpPr>
+        <dsp:cNvPr id="0" name=""/>
+        <dsp:cNvSpPr/>
+      </dsp:nvSpPr>
+      <dsp:spPr>
+        <a:xfrm>
+          <a:off x="5078612" y="562235"/>
+          <a:ext cx="1880185" cy="752074"/>
+        </a:xfrm>
+        <a:prstGeom prst="chevron">
+          <a:avLst/>
+        </a:prstGeom>
+        <a:solidFill>
+          <a:schemeClr val="tx2">
+            <a:lumMod val="75000"/>
+          </a:schemeClr>
+        </a:solidFill>
+        <a:ln w="12700" cap="flat" cmpd="sng" algn="ctr">
+          <a:solidFill>
+            <a:schemeClr val="lt1">
+              <a:hueOff val="0"/>
+              <a:satOff val="0"/>
+              <a:lumOff val="0"/>
+              <a:alphaOff val="0"/>
+            </a:schemeClr>
+          </a:solidFill>
+          <a:prstDash val="solid"/>
+          <a:miter lim="800000"/>
+        </a:ln>
+        <a:effectLst/>
+      </dsp:spPr>
+      <dsp:style>
+        <a:lnRef idx="2">
+          <a:scrgbClr r="0" g="0" b="0"/>
+        </a:lnRef>
+        <a:fillRef idx="1">
+          <a:scrgbClr r="0" g="0" b="0"/>
+        </a:fillRef>
+        <a:effectRef idx="0">
+          <a:scrgbClr r="0" g="0" b="0"/>
+        </a:effectRef>
+        <a:fontRef idx="minor">
+          <a:schemeClr val="lt1"/>
+        </a:fontRef>
+      </dsp:style>
+      <dsp:txBody>
+        <a:bodyPr spcFirstLastPara="0" vert="horz" wrap="square" lIns="56007" tIns="18669" rIns="18669" bIns="18669" numCol="1" spcCol="1270" anchor="ctr" anchorCtr="0">
+          <a:noAutofit/>
+        </a:bodyPr>
+        <a:lstStyle/>
+        <a:p>
+          <a:pPr lvl="0" algn="ctr" defTabSz="622300">
+            <a:lnSpc>
+              <a:spcPct val="90000"/>
+            </a:lnSpc>
+            <a:spcBef>
+              <a:spcPct val="0"/>
+            </a:spcBef>
+            <a:spcAft>
+              <a:spcPct val="35000"/>
+            </a:spcAft>
+          </a:pPr>
+          <a:r>
+            <a:rPr lang="en-US" sz="1400" b="1" kern="1200" dirty="0" smtClean="0"/>
+            <a:t>post-integration-test</a:t>
+          </a:r>
+          <a:endParaRPr lang="de-DE" sz="1400" b="1" kern="1200" dirty="0"/>
+        </a:p>
+      </dsp:txBody>
+      <dsp:txXfrm>
+        <a:off x="5454649" y="562235"/>
+        <a:ext cx="1128111" cy="752074"/>
+      </dsp:txXfrm>
+    </dsp:sp>
+    <dsp:sp modelId="{99F52057-642D-4027-97D5-D26EF2913281}">
+      <dsp:nvSpPr>
+        <dsp:cNvPr id="0" name=""/>
+        <dsp:cNvSpPr/>
+      </dsp:nvSpPr>
+      <dsp:spPr>
+        <a:xfrm>
+          <a:off x="6770779" y="562235"/>
+          <a:ext cx="1880185" cy="752074"/>
+        </a:xfrm>
+        <a:prstGeom prst="chevron">
+          <a:avLst/>
+        </a:prstGeom>
+        <a:solidFill>
+          <a:schemeClr val="tx2">
+            <a:lumMod val="75000"/>
+          </a:schemeClr>
+        </a:solidFill>
+        <a:ln w="12700" cap="flat" cmpd="sng" algn="ctr">
+          <a:solidFill>
+            <a:schemeClr val="lt1">
+              <a:hueOff val="0"/>
+              <a:satOff val="0"/>
+              <a:lumOff val="0"/>
+              <a:alphaOff val="0"/>
+            </a:schemeClr>
+          </a:solidFill>
+          <a:prstDash val="solid"/>
+          <a:miter lim="800000"/>
+        </a:ln>
+        <a:effectLst/>
+      </dsp:spPr>
+      <dsp:style>
+        <a:lnRef idx="2">
+          <a:scrgbClr r="0" g="0" b="0"/>
+        </a:lnRef>
+        <a:fillRef idx="1">
+          <a:scrgbClr r="0" g="0" b="0"/>
+        </a:fillRef>
+        <a:effectRef idx="0">
+          <a:scrgbClr r="0" g="0" b="0"/>
+        </a:effectRef>
+        <a:fontRef idx="minor">
+          <a:schemeClr val="lt1"/>
+        </a:fontRef>
+      </dsp:style>
+      <dsp:txBody>
+        <a:bodyPr spcFirstLastPara="0" vert="horz" wrap="square" lIns="56007" tIns="18669" rIns="18669" bIns="18669" numCol="1" spcCol="1270" anchor="ctr" anchorCtr="0">
+          <a:noAutofit/>
+        </a:bodyPr>
+        <a:lstStyle/>
+        <a:p>
+          <a:pPr lvl="0" algn="ctr" defTabSz="622300">
+            <a:lnSpc>
+              <a:spcPct val="90000"/>
+            </a:lnSpc>
+            <a:spcBef>
+              <a:spcPct val="0"/>
+            </a:spcBef>
+            <a:spcAft>
+              <a:spcPct val="35000"/>
+            </a:spcAft>
+          </a:pPr>
+          <a:r>
+            <a:rPr lang="en-US" sz="1400" b="1" kern="1200" dirty="0" smtClean="0"/>
+            <a:t>deploy</a:t>
+          </a:r>
+          <a:endParaRPr lang="de-DE" sz="1400" b="1" kern="1200" dirty="0"/>
+        </a:p>
+      </dsp:txBody>
+      <dsp:txXfrm>
+        <a:off x="7146816" y="562235"/>
+        <a:ext cx="1128111" cy="752074"/>
+      </dsp:txXfrm>
+    </dsp:sp>
+  </dsp:spTree>
+</dsp:drawing>
+</file>
+
+<file path=ppt/diagrams/layout1.xml><?xml version="1.0" encoding="utf-8"?>
+<dgm:layoutDef xmlns:dgm="http://schemas.openxmlformats.org/drawingml/2006/diagram" xmlns:a="http://schemas.openxmlformats.org/drawingml/2006/main" uniqueId="urn:microsoft.com/office/officeart/2005/8/layout/chevron1">
+  <dgm:title val=""/>
+  <dgm:desc val=""/>
+  <dgm:catLst>
+    <dgm:cat type="process" pri="9000"/>
+  </dgm:catLst>
+  <dgm:sampData useDef="1">
+    <dgm:dataModel>
+      <dgm:ptLst/>
+      <dgm:bg/>
+      <dgm:whole/>
+    </dgm:dataModel>
+  </dgm:sampData>
+  <dgm:styleData>
+    <dgm:dataModel>
+      <dgm:ptLst>
+        <dgm:pt modelId="0" type="doc"/>
+        <dgm:pt modelId="1"/>
+        <dgm:pt modelId="2"/>
+      </dgm:ptLst>
+      <dgm:cxnLst>
+        <dgm:cxn modelId="3" srcId="0" destId="1" srcOrd="0" destOrd="0"/>
+        <dgm:cxn modelId="4" srcId="0" destId="2" srcOrd="1" destOrd="0"/>
+      </dgm:cxnLst>
+      <dgm:bg/>
+      <dgm:whole/>
+    </dgm:dataModel>
+  </dgm:styleData>
+  <dgm:clrData>
+    <dgm:dataModel>
+      <dgm:ptLst>
+        <dgm:pt modelId="0" type="doc"/>
+        <dgm:pt modelId="1"/>
+        <dgm:pt modelId="2"/>
+        <dgm:pt modelId="3"/>
+        <dgm:pt modelId="4"/>
+      </dgm:ptLst>
+      <dgm:cxnLst>
+        <dgm:cxn modelId="5" srcId="0" destId="1" srcOrd="0" destOrd="0"/>
+        <dgm:cxn modelId="6" srcId="0" destId="2" srcOrd="1" destOrd="0"/>
+        <dgm:cxn modelId="7" srcId="0" destId="3" srcOrd="2" destOrd="0"/>
+        <dgm:cxn modelId="8" srcId="0" destId="4" srcOrd="3" destOrd="0"/>
+      </dgm:cxnLst>
+      <dgm:bg/>
+      <dgm:whole/>
+    </dgm:dataModel>
+  </dgm:clrData>
+  <dgm:layoutNode name="Name0">
+    <dgm:varLst>
+      <dgm:dir/>
+      <dgm:animLvl val="lvl"/>
+      <dgm:resizeHandles val="exact"/>
+    </dgm:varLst>
+    <dgm:choose name="Name1">
+      <dgm:if name="Name2" func="var" arg="dir" op="equ" val="norm">
+        <dgm:alg type="lin"/>
+      </dgm:if>
+      <dgm:else name="Name3">
+        <dgm:alg type="lin">
+          <dgm:param type="linDir" val="fromR"/>
+        </dgm:alg>
+      </dgm:else>
+    </dgm:choose>
+    <dgm:shape xmlns:r="http://schemas.openxmlformats.org/officeDocument/2006/relationships" r:blip="">
+      <dgm:adjLst/>
+    </dgm:shape>
+    <dgm:presOf/>
+    <dgm:choose name="Name4">
+      <dgm:if name="Name5" axis="des" func="maxDepth" op="gte" val="2">
+        <dgm:constrLst>
+          <dgm:constr type="h" for="ch" forName="composite" refType="h"/>
+          <dgm:constr type="w" for="ch" forName="composite" refType="w"/>
+          <dgm:constr type="w" for="des" forName="parTx"/>
+          <dgm:constr type="h" for="des" forName="parTx" op="equ"/>
+          <dgm:constr type="w" for="des" forName="desTx"/>
+          <dgm:constr type="h" for="des" forName="desTx" op="equ"/>
+          <dgm:constr type="primFontSz" for="des" forName="parTx" val="65"/>
+          <dgm:constr type="secFontSz" for="des" forName="desTx" refType="primFontSz" refFor="des" refForName="parTx" op="equ"/>
+          <dgm:constr type="h" for="des" forName="parTx" refType="primFontSz" refFor="des" refForName="parTx" fact="1.5"/>
+          <dgm:constr type="h" for="des" forName="desTx" refType="primFontSz" refFor="des" refForName="parTx" fact="0.5"/>
+          <dgm:constr type="w" for="ch" forName="space" op="equ" val="-6"/>
+        </dgm:constrLst>
+        <dgm:ruleLst>
+          <dgm:rule type="w" for="ch" forName="composite" val="0" fact="NaN" max="NaN"/>
+          <dgm:rule type="primFontSz" for="des" forName="parTx" val="5" fact="NaN" max="NaN"/>
+        </dgm:ruleLst>
+        <dgm:forEach name="Name6" axis="ch" ptType="node">
+          <dgm:layoutNode name="composite">
+            <dgm:alg type="composite"/>
+            <dgm:shape xmlns:r="http://schemas.openxmlformats.org/officeDocument/2006/relationships" r:blip="">
+              <dgm:adjLst/>
+            </dgm:shape>
+            <dgm:presOf/>
+            <dgm:choose name="Name7">
+              <dgm:if name="Name8" func="var" arg="dir" op="equ" val="norm">
+                <dgm:constrLst>
+                  <dgm:constr type="l" for="ch" forName="parTx"/>
+                  <dgm:constr type="w" for="ch" forName="parTx" refType="w"/>
+                  <dgm:constr type="t" for="ch" forName="parTx"/>
+                  <dgm:constr type="l" for="ch" forName="desTx"/>
+                  <dgm:constr type="w" for="ch" forName="desTx" refType="w" refFor="ch" refForName="parTx" fact="0.8"/>
+                  <dgm:constr type="t" for="ch" forName="desTx" refType="h" refFor="ch" refForName="parTx" fact="1.125"/>
+                </dgm:constrLst>
+              </dgm:if>
+              <dgm:else name="Name9">
+                <dgm:constrLst>
+                  <dgm:constr type="l" for="ch" forName="parTx"/>
+                  <dgm:constr type="w" for="ch" forName="parTx" refType="w"/>
+                  <dgm:constr type="t" for="ch" forName="parTx"/>
+                  <dgm:constr type="l" for="ch" forName="desTx" refType="w" fact="0.2"/>
+                  <dgm:constr type="w" for="ch" forName="desTx" refType="w" refFor="ch" refForName="parTx" fact="0.8"/>
+                  <dgm:constr type="t" for="ch" forName="desTx" refType="h" refFor="ch" refForName="parTx" fact="1.125"/>
+                </dgm:constrLst>
+              </dgm:else>
+            </dgm:choose>
+            <dgm:ruleLst>
+              <dgm:rule type="h" val="INF" fact="NaN" max="NaN"/>
+            </dgm:ruleLst>
+            <dgm:layoutNode name="parTx">
+              <dgm:varLst>
+                <dgm:chMax val="0"/>
+                <dgm:chPref val="0"/>
+                <dgm:bulletEnabled val="1"/>
+              </dgm:varLst>
+              <dgm:alg type="tx"/>
+              <dgm:choose name="Name10">
+                <dgm:if name="Name11" func="var" arg="dir" op="equ" val="norm">
+                  <dgm:shape xmlns:r="http://schemas.openxmlformats.org/officeDocument/2006/relationships" type="chevron" r:blip="">
+                    <dgm:adjLst/>
+                  </dgm:shape>
+                </dgm:if>
+                <dgm:else name="Name12">
+                  <dgm:shape xmlns:r="http://schemas.openxmlformats.org/officeDocument/2006/relationships" rot="180" type="chevron" r:blip="">
+                    <dgm:adjLst/>
+                  </dgm:shape>
+                </dgm:else>
+              </dgm:choose>
+              <dgm:presOf axis="self" ptType="node"/>
+              <dgm:choose name="Name13">
+                <dgm:if name="Name14" func="var" arg="dir" op="equ" val="norm">
+                  <dgm:constrLst>
+                    <dgm:constr type="h" refType="w" op="lte" fact="0.4"/>
+                    <dgm:constr type="h"/>
+                    <dgm:constr type="tMarg" refType="primFontSz" fact="0.105"/>
+                    <dgm:constr type="bMarg" refType="primFontSz" fact="0.105"/>
+                    <dgm:constr type="lMarg" refType="primFontSz" fact="0.315"/>
+                    <dgm:constr type="rMarg" refType="primFontSz" fact="0.105"/>
+                  </dgm:constrLst>
+                </dgm:if>
+                <dgm:else name="Name15">
+                  <dgm:constrLst>
+                    <dgm:constr type="h" refType="w" op="lte" fact="0.4"/>
+                    <dgm:constr type="h"/>
+                    <dgm:constr type="tMarg" refType="primFontSz" fact="0.105"/>
+                    <dgm:constr type="bMarg" refType="primFontSz" fact="0.105"/>
+                    <dgm:constr type="lMarg" refType="primFontSz" fact="0.105"/>
+                    <dgm:constr type="rMarg" refType="primFontSz" fact="0.315"/>
+                  </dgm:constrLst>
+                </dgm:else>
+              </dgm:choose>
+              <dgm:ruleLst>
+                <dgm:rule type="h" val="INF" fact="NaN" max="NaN"/>
+              </dgm:ruleLst>
+            </dgm:layoutNode>
+            <dgm:layoutNode name="desTx" styleLbl="revTx">
+              <dgm:varLst>
+                <dgm:bulletEnabled val="1"/>
+              </dgm:varLst>
+              <dgm:alg type="tx">
+                <dgm:param type="stBulletLvl" val="1"/>
+              </dgm:alg>
+              <dgm:choose name="Name16">
+                <dgm:if name="Name17" axis="ch" ptType="node" func="cnt" op="gte" val="1">
+                  <dgm:shape xmlns:r="http://schemas.openxmlformats.org/officeDocument/2006/relationships" type="rect" r:blip="">
+                    <dgm:adjLst/>
+                  </dgm:shape>
+                </dgm:if>
+                <dgm:else name="Name18">
+                  <dgm:shape xmlns:r="http://schemas.openxmlformats.org/officeDocument/2006/relationships" type="rect" r:blip="" hideGeom="1">
+                    <dgm:adjLst/>
+                  </dgm:shape>
+                </dgm:else>
+              </dgm:choose>
+              <dgm:presOf axis="des" ptType="node"/>
+              <dgm:constrLst>
+                <dgm:constr type="secFontSz" val="65"/>
+                <dgm:constr type="primFontSz" refType="secFontSz"/>
+                <dgm:constr type="h"/>
+                <dgm:constr type="tMarg"/>
+                <dgm:constr type="bMarg"/>
+                <dgm:constr type="rMarg"/>
+                <dgm:constr type="lMarg"/>
+              </dgm:constrLst>
+              <dgm:ruleLst>
+                <dgm:rule type="h" val="INF" fact="NaN" max="NaN"/>
+              </dgm:ruleLst>
+            </dgm:layoutNode>
+          </dgm:layoutNode>
+          <dgm:forEach name="Name19" axis="followSib" ptType="sibTrans" cnt="1">
+            <dgm:layoutNode name="space">
+              <dgm:alg type="sp"/>
+              <dgm:shape xmlns:r="http://schemas.openxmlformats.org/officeDocument/2006/relationships" r:blip="">
+                <dgm:adjLst/>
+              </dgm:shape>
+              <dgm:presOf/>
+              <dgm:constrLst/>
+              <dgm:ruleLst/>
+            </dgm:layoutNode>
+          </dgm:forEach>
+        </dgm:forEach>
+      </dgm:if>
+      <dgm:else name="Name20">
+        <dgm:constrLst>
+          <dgm:constr type="w" for="ch" forName="parTxOnly" refType="w"/>
+          <dgm:constr type="h" for="des" forName="parTxOnly" op="equ"/>
+          <dgm:constr type="primFontSz" for="des" forName="parTxOnly" op="equ" val="65"/>
+          <dgm:constr type="w" for="ch" forName="parTxOnlySpace" refType="w" refFor="ch" refForName="parTxOnly" fact="-0.1"/>
+        </dgm:constrLst>
+        <dgm:ruleLst/>
+        <dgm:forEach name="Name21" axis="ch" ptType="node">
+          <dgm:layoutNode name="parTxOnly">
+            <dgm:varLst>
+              <dgm:chMax val="0"/>
+              <dgm:chPref val="0"/>
+              <dgm:bulletEnabled val="1"/>
+            </dgm:varLst>
+            <dgm:alg type="tx"/>
+            <dgm:choose name="Name22">
+              <dgm:if name="Name23" func="var" arg="dir" op="equ" val="norm">
+                <dgm:shape xmlns:r="http://schemas.openxmlformats.org/officeDocument/2006/relationships" type="chevron" r:blip="">
+                  <dgm:adjLst/>
+                </dgm:shape>
+              </dgm:if>
+              <dgm:else name="Name24">
+                <dgm:shape xmlns:r="http://schemas.openxmlformats.org/officeDocument/2006/relationships" rot="180" type="chevron" r:blip="">
+                  <dgm:adjLst/>
+                </dgm:shape>
+              </dgm:else>
+            </dgm:choose>
+            <dgm:presOf axis="self" ptType="node"/>
+            <dgm:choose name="Name25">
+              <dgm:if name="Name26" func="var" arg="dir" op="equ" val="norm">
+                <dgm:constrLst>
+                  <dgm:constr type="h" refType="w" op="equ" fact="0.4"/>
+                  <dgm:constr type="tMarg" refType="primFontSz" fact="0.105"/>
+                  <dgm:constr type="bMarg" refType="primFontSz" fact="0.105"/>
+                  <dgm:constr type="lMarg" refType="primFontSz" fact="0.315"/>
+                  <dgm:constr type="rMarg" refType="primFontSz" fact="0.105"/>
+                </dgm:constrLst>
+              </dgm:if>
+              <dgm:else name="Name27">
+                <dgm:constrLst>
+                  <dgm:constr type="h" refType="w" op="equ" fact="0.4"/>
+                  <dgm:constr type="tMarg" refType="primFontSz" fact="0.105"/>
+                  <dgm:constr type="bMarg" refType="primFontSz" fact="0.105"/>
+                  <dgm:constr type="lMarg" refType="primFontSz" fact="0.105"/>
+                  <dgm:constr type="rMarg" refType="primFontSz" fact="0.315"/>
+                </dgm:constrLst>
+              </dgm:else>
+            </dgm:choose>
+            <dgm:ruleLst>
+              <dgm:rule type="primFontSz" val="5" fact="NaN" max="NaN"/>
+            </dgm:ruleLst>
+          </dgm:layoutNode>
+          <dgm:forEach name="Name28" axis="followSib" ptType="sibTrans" cnt="1">
+            <dgm:layoutNode name="parTxOnlySpace">
+              <dgm:alg type="sp"/>
+              <dgm:shape xmlns:r="http://schemas.openxmlformats.org/officeDocument/2006/relationships" r:blip="">
+                <dgm:adjLst/>
+              </dgm:shape>
+              <dgm:presOf/>
+              <dgm:constrLst/>
+              <dgm:ruleLst/>
+            </dgm:layoutNode>
+          </dgm:forEach>
+        </dgm:forEach>
+      </dgm:else>
+    </dgm:choose>
+  </dgm:layoutNode>
+</dgm:layoutDef>
+</file>
+
+<file path=ppt/diagrams/quickStyle1.xml><?xml version="1.0" encoding="utf-8"?>
+<dgm:styleDef xmlns:dgm="http://schemas.openxmlformats.org/drawingml/2006/diagram" xmlns:a="http://schemas.openxmlformats.org/drawingml/2006/main" uniqueId="urn:microsoft.com/office/officeart/2005/8/quickstyle/simple1">
+  <dgm:title val=""/>
+  <dgm:desc val=""/>
+  <dgm:catLst>
+    <dgm:cat type="simple" pri="10100"/>
+  </dgm:catLst>
+  <dgm:scene3d>
+    <a:camera prst="orthographicFront"/>
+    <a:lightRig rig="threePt" dir="t"/>
+  </dgm:scene3d>
+  <dgm:styleLbl name="node0">
+    <dgm:scene3d>
+      <a:camera prst="orthographicFront"/>
+      <a:lightRig rig="threePt" dir="t"/>
+    </dgm:scene3d>
+    <dgm:sp3d/>
+    <dgm:txPr/>
+    <dgm:style>
+      <a:lnRef idx="2">
+        <a:scrgbClr r="0" g="0" b="0"/>
+      </a:lnRef>
+      <a:fillRef idx="1">
+        <a:scrgbClr r="0" g="0" b="0"/>
+      </a:fillRef>
+      <a:effectRef idx="0">
+        <a:scrgbClr r="0" g="0" b="0"/>
+      </a:effectRef>
+      <a:fontRef idx="minor">
+        <a:schemeClr val="lt1"/>
+      </a:fontRef>
+    </dgm:style>
+  </dgm:styleLbl>
+  <dgm:styleLbl name="lnNode1">
+    <dgm:scene3d>
+      <a:camera prst="orthographicFront"/>
+      <a:lightRig rig="threePt" dir="t"/>
+    </dgm:scene3d>
+    <dgm:sp3d/>
+    <dgm:txPr/>
+    <dgm:style>
+      <a:lnRef idx="2">
+        <a:scrgbClr r="0" g="0" b="0"/>
+      </a:lnRef>
+      <a:fillRef idx="1">
+        <a:scrgbClr r="0" g="0" b="0"/>
+      </a:fillRef>
+      <a:effectRef idx="0">
+        <a:scrgbClr r="0" g="0" b="0"/>
+      </a:effectRef>
+      <a:fontRef idx="minor">
+        <a:schemeClr val="lt1"/>
+      </a:fontRef>
+    </dgm:style>
+  </dgm:styleLbl>
+  <dgm:styleLbl name="vennNode1">
+    <dgm:scene3d>
+      <a:camera prst="orthographicFront"/>
+      <a:lightRig rig="threePt" dir="t"/>
+    </dgm:scene3d>
+    <dgm:sp3d/>
+    <dgm:txPr/>
+    <dgm:style>
+      <a:lnRef idx="2">
+        <a:scrgbClr r="0" g="0" b="0"/>
+      </a:lnRef>
+      <a:fillRef idx="1">
+        <a:scrgbClr r="0" g="0" b="0"/>
+      </a:fillRef>
+      <a:effectRef idx="0">
+        <a:scrgbClr r="0" g="0" b="0"/>
+      </a:effectRef>
+      <a:fontRef idx="minor">
+        <a:schemeClr val="tx1"/>
+      </a:fontRef>
+    </dgm:style>
+  </dgm:styleLbl>
+  <dgm:styleLbl name="alignNode1">
+    <dgm:scene3d>
+      <a:camera prst="orthographicFront"/>
+      <a:lightRig rig="threePt" dir="t"/>
+    </dgm:scene3d>
+    <dgm:sp3d/>
+    <dgm:txPr/>
+    <dgm:style>
+      <a:lnRef idx="2">
+        <a:scrgbClr r="0" g="0" b="0"/>
+      </a:lnRef>
+      <a:fillRef idx="1">
+        <a:scrgbClr r="0" g="0" b="0"/>
+      </a:fillRef>
+      <a:effectRef idx="0">
+        <a:scrgbClr r="0" g="0" b="0"/>
+      </a:effectRef>
+      <a:fontRef idx="minor">
+        <a:schemeClr val="lt1"/>
+      </a:fontRef>
+    </dgm:style>
+  </dgm:styleLbl>
+  <dgm:styleLbl name="node1">
+    <dgm:scene3d>
+      <a:camera prst="orthographicFront"/>
+      <a:lightRig rig="threePt" dir="t"/>
+    </dgm:scene3d>
+    <dgm:sp3d/>
+    <dgm:txPr/>
+    <dgm:style>
+      <a:lnRef idx="2">
+        <a:scrgbClr r="0" g="0" b="0"/>
+      </a:lnRef>
+      <a:fillRef idx="1">
+        <a:scrgbClr r="0" g="0" b="0"/>
+      </a:fillRef>
+      <a:effectRef idx="0">
+        <a:scrgbClr r="0" g="0" b="0"/>
+      </a:effectRef>
+      <a:fontRef idx="minor">
+        <a:schemeClr val="lt1"/>
+      </a:fontRef>
+    </dgm:style>
+  </dgm:styleLbl>
+  <dgm:styleLbl name="node2">
+    <dgm:scene3d>
+      <a:camera prst="orthographicFront"/>
+      <a:lightRig rig="threePt" dir="t"/>
+    </dgm:scene3d>
+    <dgm:sp3d/>
+    <dgm:txPr/>
+    <dgm:style>
+      <a:lnRef idx="2">
+        <a:scrgbClr r="0" g="0" b="0"/>
+      </a:lnRef>
+      <a:fillRef idx="1">
+        <a:scrgbClr r="0" g="0" b="0"/>
+      </a:fillRef>
+      <a:effectRef idx="0">
+        <a:scrgbClr r="0" g="0" b="0"/>
+      </a:effectRef>
+      <a:fontRef idx="minor">
+        <a:schemeClr val="lt1"/>
+      </a:fontRef>
+    </dgm:style>
+  </dgm:styleLbl>
+  <dgm:styleLbl name="node3">
+    <dgm:scene3d>
+      <a:camera prst="orthographicFront"/>
+      <a:lightRig rig="threePt" dir="t"/>
+    </dgm:scene3d>
+    <dgm:sp3d/>
+    <dgm:txPr/>
+    <dgm:style>
+      <a:lnRef idx="2">
+        <a:scrgbClr r="0" g="0" b="0"/>
+      </a:lnRef>
+      <a:fillRef idx="1">
+        <a:scrgbClr r="0" g="0" b="0"/>
+      </a:fillRef>
+      <a:effectRef idx="0">
+        <a:scrgbClr r="0" g="0" b="0"/>
+      </a:effectRef>
+      <a:fontRef idx="minor">
+        <a:schemeClr val="lt1"/>
+      </a:fontRef>
+    </dgm:style>
+  </dgm:styleLbl>
+  <dgm:styleLbl name="node4">
+    <dgm:scene3d>
+      <a:camera prst="orthographicFront"/>
+      <a:lightRig rig="threePt" dir="t"/>
+    </dgm:scene3d>
+    <dgm:sp3d/>
+    <dgm:txPr/>
+    <dgm:style>
+      <a:lnRef idx="2">
+        <a:scrgbClr r="0" g="0" b="0"/>
+      </a:lnRef>
+      <a:fillRef idx="1">
+        <a:scrgbClr r="0" g="0" b="0"/>
+      </a:fillRef>
+      <a:effectRef idx="0">
+        <a:scrgbClr r="0" g="0" b="0"/>
+      </a:effectRef>
+      <a:fontRef idx="minor">
+        <a:schemeClr val="lt1"/>
+      </a:fontRef>
+    </dgm:style>
+  </dgm:styleLbl>
+  <dgm:styleLbl name="fgImgPlace1">
+    <dgm:scene3d>
+      <a:camera prst="orthographicFront"/>
+      <a:lightRig rig="threePt" dir="t"/>
+    </dgm:scene3d>
+    <dgm:sp3d/>
+    <dgm:txPr/>
+    <dgm:style>
+      <a:lnRef idx="2">
+        <a:scrgbClr r="0" g="0" b="0"/>
+      </a:lnRef>
+      <a:fillRef idx="1">
+        <a:scrgbClr r="0" g="0" b="0"/>
+      </a:fillRef>
+      <a:effectRef idx="0">
+        <a:scrgbClr r="0" g="0" b="0"/>
+      </a:effectRef>
+      <a:fontRef idx="minor"/>
+    </dgm:style>
+  </dgm:styleLbl>
+  <dgm:styleLbl name="alignImgPlace1">
+    <dgm:scene3d>
+      <a:camera prst="orthographicFront"/>
+      <a:lightRig rig="threePt" dir="t"/>
+    </dgm:scene3d>
+    <dgm:sp3d/>
+    <dgm:txPr/>
+    <dgm:style>
+      <a:lnRef idx="2">
+        <a:scrgbClr r="0" g="0" b="0"/>
+      </a:lnRef>
+      <a:fillRef idx="1">
+        <a:scrgbClr r="0" g="0" b="0"/>
+      </a:fillRef>
+      <a:effectRef idx="0">
+        <a:scrgbClr r="0" g="0" b="0"/>
+      </a:effectRef>
+      <a:fontRef idx="minor"/>
+    </dgm:style>
+  </dgm:styleLbl>
+  <dgm:styleLbl name="bgImgPlace1">
+    <dgm:scene3d>
+      <a:camera prst="orthographicFront"/>
+      <a:lightRig rig="threePt" dir="t"/>
+    </dgm:scene3d>
+    <dgm:sp3d/>
+    <dgm:txPr/>
+    <dgm:style>
+      <a:lnRef idx="2">
+        <a:scrgbClr r="0" g="0" b="0"/>
+      </a:lnRef>
+      <a:fillRef idx="1">
+        <a:scrgbClr r="0" g="0" b="0"/>
+      </a:fillRef>
+      <a:effectRef idx="0">
+        <a:scrgbClr r="0" g="0" b="0"/>
+      </a:effectRef>
+      <a:fontRef idx="minor"/>
+    </dgm:style>
+  </dgm:styleLbl>
+  <dgm:styleLbl name="sibTrans2D1">
+    <dgm:scene3d>
+      <a:camera prst="orthographicFront"/>
+      <a:lightRig rig="threePt" dir="t"/>
+    </dgm:scene3d>
+    <dgm:sp3d/>
+    <dgm:txPr/>
+    <dgm:style>
+      <a:lnRef idx="0">
+        <a:scrgbClr r="0" g="0" b="0"/>
+      </a:lnRef>
+      <a:fillRef idx="1">
+        <a:scrgbClr r="0" g="0" b="0"/>
+      </a:fillRef>
+      <a:effectRef idx="0">
+        <a:scrgbClr r="0" g="0" b="0"/>
+      </a:effectRef>
+      <a:fontRef idx="minor">
+        <a:schemeClr val="lt1"/>
+      </a:fontRef>
+    </dgm:style>
+  </dgm:styleLbl>
+  <dgm:styleLbl name="fgSibTrans2D1">
+    <dgm:scene3d>
+      <a:camera prst="orthographicFront"/>
+      <a:lightRig rig="threePt" dir="t"/>
+    </dgm:scene3d>
+    <dgm:sp3d/>
+    <dgm:txPr/>
+    <dgm:style>
+      <a:lnRef idx="0">
+        <a:scrgbClr r="0" g="0" b="0"/>
+      </a:lnRef>
+      <a:fillRef idx="1">
+        <a:scrgbClr r="0" g="0" b="0"/>
+      </a:fillRef>
+      <a:effectRef idx="0">
+        <a:scrgbClr r="0" g="0" b="0"/>
+      </a:effectRef>
+      <a:fontRef idx="minor">
+        <a:schemeClr val="lt1"/>
+      </a:fontRef>
+    </dgm:style>
+  </dgm:styleLbl>
+  <dgm:styleLbl name="bgSibTrans2D1">
+    <dgm:scene3d>
+      <a:camera prst="orthographicFront"/>
+      <a:lightRig rig="threePt" dir="t"/>
+    </dgm:scene3d>
+    <dgm:sp3d/>
+    <dgm:txPr/>
+    <dgm:style>
+      <a:lnRef idx="0">
+        <a:scrgbClr r="0" g="0" b="0"/>
+      </a:lnRef>
+      <a:fillRef idx="1">
+        <a:scrgbClr r="0" g="0" b="0"/>
+      </a:fillRef>
+      <a:effectRef idx="0">
+        <a:scrgbClr r="0" g="0" b="0"/>
+      </a:effectRef>
+      <a:fontRef idx="minor">
+        <a:schemeClr val="lt1"/>
+      </a:fontRef>
+    </dgm:style>
+  </dgm:styleLbl>
+  <dgm:styleLbl name="sibTrans1D1">
+    <dgm:scene3d>
+      <a:camera prst="orthographicFront"/>
+      <a:lightRig rig="threePt" dir="t"/>
+    </dgm:scene3d>
+    <dgm:sp3d/>
+    <dgm:txPr/>
+    <dgm:style>
+      <a:lnRef idx="1">
+        <a:scrgbClr r="0" g="0" b="0"/>
+      </a:lnRef>
+      <a:fillRef idx="0">
+        <a:scrgbClr r="0" g="0" b="0"/>
+      </a:fillRef>
+      <a:effectRef idx="0">
+        <a:scrgbClr r="0" g="0" b="0"/>
+      </a:effectRef>
+      <a:fontRef idx="minor"/>
+    </dgm:style>
+  </dgm:styleLbl>
+  <dgm:styleLbl name="callout">
+    <dgm:scene3d>
+      <a:camera prst="orthographicFront"/>
+      <a:lightRig rig="threePt" dir="t"/>
+    </dgm:scene3d>
+    <dgm:sp3d/>
+    <dgm:txPr/>
+    <dgm:style>
+      <a:lnRef idx="2">
+        <a:scrgbClr r="0" g="0" b="0"/>
+      </a:lnRef>
+      <a:fillRef idx="1">
+        <a:scrgbClr r="0" g="0" b="0"/>
+      </a:fillRef>
+      <a:effectRef idx="0">
+        <a:scrgbClr r="0" g="0" b="0"/>
+      </a:effectRef>
+      <a:fontRef idx="minor"/>
+    </dgm:style>
+  </dgm:styleLbl>
+  <dgm:styleLbl name="asst0">
+    <dgm:scene3d>
+      <a:camera prst="orthographicFront"/>
+      <a:lightRig rig="threePt" dir="t"/>
+    </dgm:scene3d>
+    <dgm:sp3d/>
+    <dgm:txPr/>
+    <dgm:style>
+      <a:lnRef idx="2">
+        <a:scrgbClr r="0" g="0" b="0"/>
+      </a:lnRef>
+      <a:fillRef idx="1">
+        <a:scrgbClr r="0" g="0" b="0"/>
+      </a:fillRef>
+      <a:effectRef idx="0">
+        <a:scrgbClr r="0" g="0" b="0"/>
+      </a:effectRef>
+      <a:fontRef idx="minor">
+        <a:schemeClr val="lt1"/>
+      </a:fontRef>
+    </dgm:style>
+  </dgm:styleLbl>
+  <dgm:styleLbl name="asst1">
+    <dgm:scene3d>
+      <a:camera prst="orthographicFront"/>
+      <a:lightRig rig="threePt" dir="t"/>
+    </dgm:scene3d>
+    <dgm:sp3d/>
+    <dgm:txPr/>
+    <dgm:style>
+      <a:lnRef idx="2">
+        <a:scrgbClr r="0" g="0" b="0"/>
+      </a:lnRef>
+      <a:fillRef idx="1">
+        <a:scrgbClr r="0" g="0" b="0"/>
+      </a:fillRef>
+      <a:effectRef idx="0">
+        <a:scrgbClr r="0" g="0" b="0"/>
+      </a:effectRef>
+      <a:fontRef idx="minor">
+        <a:schemeClr val="lt1"/>
+      </a:fontRef>
+    </dgm:style>
+  </dgm:styleLbl>
+  <dgm:styleLbl name="asst2">
+    <dgm:scene3d>
+      <a:camera prst="orthographicFront"/>
+      <a:lightRig rig="threePt" dir="t"/>
+    </dgm:scene3d>
+    <dgm:sp3d/>
+    <dgm:txPr/>
+    <dgm:style>
+      <a:lnRef idx="2">
+        <a:scrgbClr r="0" g="0" b="0"/>
+      </a:lnRef>
+      <a:fillRef idx="1">
+        <a:scrgbClr r="0" g="0" b="0"/>
+      </a:fillRef>
+      <a:effectRef idx="0">
+        <a:scrgbClr r="0" g="0" b="0"/>
+      </a:effectRef>
+      <a:fontRef idx="minor">
+        <a:schemeClr val="lt1"/>
+      </a:fontRef>
+    </dgm:style>
+  </dgm:styleLbl>
+  <dgm:styleLbl name="asst3">
+    <dgm:scene3d>
+      <a:camera prst="orthographicFront"/>
+      <a:lightRig rig="threePt" dir="t"/>
+    </dgm:scene3d>
+    <dgm:sp3d/>
+    <dgm:txPr/>
+    <dgm:style>
+      <a:lnRef idx="2">
+        <a:scrgbClr r="0" g="0" b="0"/>
+      </a:lnRef>
+      <a:fillRef idx="1">
+        <a:scrgbClr r="0" g="0" b="0"/>
+      </a:fillRef>
+      <a:effectRef idx="0">
+        <a:scrgbClr r="0" g="0" b="0"/>
+      </a:effectRef>
+      <a:fontRef idx="minor">
+        <a:schemeClr val="lt1"/>
+      </a:fontRef>
+    </dgm:style>
+  </dgm:styleLbl>
+  <dgm:styleLbl name="asst4">
+    <dgm:scene3d>
+      <a:camera prst="orthographicFront"/>
+      <a:lightRig rig="threePt" dir="t"/>
+    </dgm:scene3d>
+    <dgm:sp3d/>
+    <dgm:txPr/>
+    <dgm:style>
+      <a:lnRef idx="2">
+        <a:scrgbClr r="0" g="0" b="0"/>
+      </a:lnRef>
+      <a:fillRef idx="1">
+        <a:scrgbClr r="0" g="0" b="0"/>
+      </a:fillRef>
+      <a:effectRef idx="0">
+        <a:scrgbClr r="0" g="0" b="0"/>
+      </a:effectRef>
+      <a:fontRef idx="minor">
+        <a:schemeClr val="lt1"/>
+      </a:fontRef>
+    </dgm:style>
+  </dgm:styleLbl>
+  <dgm:styleLbl name="parChTrans2D1">
+    <dgm:scene3d>
+      <a:camera prst="orthographicFront"/>
+      <a:lightRig rig="threePt" dir="t"/>
+    </dgm:scene3d>
+    <dgm:sp3d/>
+    <dgm:txPr/>
+    <dgm:style>
+      <a:lnRef idx="2">
+        <a:scrgbClr r="0" g="0" b="0"/>
+      </a:lnRef>
+      <a:fillRef idx="1">
+        <a:scrgbClr r="0" g="0" b="0"/>
+      </a:fillRef>
+      <a:effectRef idx="0">
+        <a:scrgbClr r="0" g="0" b="0"/>
+      </a:effectRef>
+      <a:fontRef idx="minor">
+        <a:schemeClr val="lt1"/>
+      </a:fontRef>
+    </dgm:style>
+  </dgm:styleLbl>
+  <dgm:styleLbl name="parChTrans2D2">
+    <dgm:scene3d>
+      <a:camera prst="orthographicFront"/>
+      <a:lightRig rig="threePt" dir="t"/>
+    </dgm:scene3d>
+    <dgm:sp3d/>
+    <dgm:txPr/>
+    <dgm:style>
+      <a:lnRef idx="2">
+        <a:scrgbClr r="0" g="0" b="0"/>
+      </a:lnRef>
+      <a:fillRef idx="1">
+        <a:scrgbClr r="0" g="0" b="0"/>
+      </a:fillRef>
+      <a:effectRef idx="0">
+        <a:scrgbClr r="0" g="0" b="0"/>
+      </a:effectRef>
+      <a:fontRef idx="minor">
+        <a:schemeClr val="lt1"/>
+      </a:fontRef>
+    </dgm:style>
+  </dgm:styleLbl>
+  <dgm:styleLbl name="parChTrans2D3">
+    <dgm:scene3d>
+      <a:camera prst="orthographicFront"/>
+      <a:lightRig rig="threePt" dir="t"/>
+    </dgm:scene3d>
+    <dgm:sp3d/>
+    <dgm:txPr/>
+    <dgm:style>
+      <a:lnRef idx="2">
+        <a:scrgbClr r="0" g="0" b="0"/>
+      </a:lnRef>
+      <a:fillRef idx="1">
+        <a:scrgbClr r="0" g="0" b="0"/>
+      </a:fillRef>
+      <a:effectRef idx="0">
+        <a:scrgbClr r="0" g="0" b="0"/>
+      </a:effectRef>
+      <a:fontRef idx="minor">
+        <a:schemeClr val="lt1"/>
+      </a:fontRef>
+    </dgm:style>
+  </dgm:styleLbl>
+  <dgm:styleLbl name="parChTrans2D4">
+    <dgm:scene3d>
+      <a:camera prst="orthographicFront"/>
+      <a:lightRig rig="threePt" dir="t"/>
+    </dgm:scene3d>
+    <dgm:sp3d/>
+    <dgm:txPr/>
+    <dgm:style>
+      <a:lnRef idx="2">
+        <a:scrgbClr r="0" g="0" b="0"/>
+      </a:lnRef>
+      <a:fillRef idx="1">
+        <a:scrgbClr r="0" g="0" b="0"/>
+      </a:fillRef>
+      <a:effectRef idx="0">
+        <a:scrgbClr r="0" g="0" b="0"/>
+      </a:effectRef>
+      <a:fontRef idx="minor">
+        <a:schemeClr val="lt1"/>
+      </a:fontRef>
+    </dgm:style>
+  </dgm:styleLbl>
+  <dgm:styleLbl name="parChTrans1D1">
+    <dgm:scene3d>
+      <a:camera prst="orthographicFront"/>
+      <a:lightRig rig="threePt" dir="t"/>
+    </dgm:scene3d>
+    <dgm:sp3d/>
+    <dgm:txPr/>
+    <dgm:style>
+      <a:lnRef idx="2">
+        <a:scrgbClr r="0" g="0" b="0"/>
+      </a:lnRef>
+      <a:fillRef idx="0">
+        <a:scrgbClr r="0" g="0" b="0"/>
+      </a:fillRef>
+      <a:effectRef idx="0">
+        <a:scrgbClr r="0" g="0" b="0"/>
+      </a:effectRef>
+      <a:fontRef idx="minor"/>
+    </dgm:style>
+  </dgm:styleLbl>
+  <dgm:styleLbl name="parChTrans1D2">
+    <dgm:scene3d>
+      <a:camera prst="orthographicFront"/>
+      <a:lightRig rig="threePt" dir="t"/>
+    </dgm:scene3d>
+    <dgm:sp3d/>
+    <dgm:txPr/>
+    <dgm:style>
+      <a:lnRef idx="2">
+        <a:scrgbClr r="0" g="0" b="0"/>
+      </a:lnRef>
+      <a:fillRef idx="0">
+        <a:scrgbClr r="0" g="0" b="0"/>
+      </a:fillRef>
+      <a:effectRef idx="0">
+        <a:scrgbClr r="0" g="0" b="0"/>
+      </a:effectRef>
+      <a:fontRef idx="minor"/>
+    </dgm:style>
+  </dgm:styleLbl>
+  <dgm:styleLbl name="parChTrans1D3">
+    <dgm:scene3d>
+      <a:camera prst="orthographicFront"/>
+      <a:lightRig rig="threePt" dir="t"/>
+    </dgm:scene3d>
+    <dgm:sp3d/>
+    <dgm:txPr/>
+    <dgm:style>
+      <a:lnRef idx="2">
+        <a:scrgbClr r="0" g="0" b="0"/>
+      </a:lnRef>
+      <a:fillRef idx="0">
+        <a:scrgbClr r="0" g="0" b="0"/>
+      </a:fillRef>
+      <a:effectRef idx="0">
+        <a:scrgbClr r="0" g="0" b="0"/>
+      </a:effectRef>
+      <a:fontRef idx="minor"/>
+    </dgm:style>
+  </dgm:styleLbl>
+  <dgm:styleLbl name="parChTrans1D4">
+    <dgm:scene3d>
+      <a:camera prst="orthographicFront"/>
+      <a:lightRig rig="threePt" dir="t"/>
+    </dgm:scene3d>
+    <dgm:sp3d/>
+    <dgm:txPr/>
+    <dgm:style>
+      <a:lnRef idx="2">
+        <a:scrgbClr r="0" g="0" b="0"/>
+      </a:lnRef>
+      <a:fillRef idx="0">
+        <a:scrgbClr r="0" g="0" b="0"/>
+      </a:fillRef>
+      <a:effectRef idx="0">
+        <a:scrgbClr r="0" g="0" b="0"/>
+      </a:effectRef>
+      <a:fontRef idx="minor"/>
+    </dgm:style>
+  </dgm:styleLbl>
+  <dgm:styleLbl name="fgAcc1">
+    <dgm:scene3d>
+      <a:camera prst="orthographicFront"/>
+      <a:lightRig rig="threePt" dir="t"/>
+    </dgm:scene3d>
+    <dgm:sp3d/>
+    <dgm:txPr/>
+    <dgm:style>
+      <a:lnRef idx="2">
+        <a:scrgbClr r="0" g="0" b="0"/>
+      </a:lnRef>
+      <a:fillRef idx="1">
+        <a:scrgbClr r="0" g="0" b="0"/>
+      </a:fillRef>
+      <a:effectRef idx="0">
+        <a:scrgbClr r="0" g="0" b="0"/>
+      </a:effectRef>
+      <a:fontRef idx="minor"/>
+    </dgm:style>
+  </dgm:styleLbl>
+  <dgm:styleLbl name="conFgAcc1">
+    <dgm:scene3d>
+      <a:camera prst="orthographicFront"/>
+      <a:lightRig rig="threePt" dir="t"/>
+    </dgm:scene3d>
+    <dgm:sp3d/>
+    <dgm:txPr/>
+    <dgm:style>
+      <a:lnRef idx="2">
+        <a:scrgbClr r="0" g="0" b="0"/>
+      </a:lnRef>
+      <a:fillRef idx="1">
+        <a:scrgbClr r="0" g="0" b="0"/>
+      </a:fillRef>
+      <a:effectRef idx="0">
+        <a:scrgbClr r="0" g="0" b="0"/>
+      </a:effectRef>
+      <a:fontRef idx="minor"/>
+    </dgm:style>
+  </dgm:styleLbl>
+  <dgm:styleLbl name="alignAcc1">
+    <dgm:scene3d>
+      <a:camera prst="orthographicFront"/>
+      <a:lightRig rig="threePt" dir="t"/>
+    </dgm:scene3d>
+    <dgm:sp3d/>
+    <dgm:txPr/>
+    <dgm:style>
+      <a:lnRef idx="2">
+        <a:scrgbClr r="0" g="0" b="0"/>
+      </a:lnRef>
+      <a:fillRef idx="1">
+        <a:scrgbClr r="0" g="0" b="0"/>
+      </a:fillRef>
+      <a:effectRef idx="0">
+        <a:scrgbClr r="0" g="0" b="0"/>
+      </a:effectRef>
+      <a:fontRef idx="minor"/>
+    </dgm:style>
+  </dgm:styleLbl>
+  <dgm:styleLbl name="trAlignAcc1">
+    <dgm:scene3d>
+      <a:camera prst="orthographicFront"/>
+      <a:lightRig rig="threePt" dir="t"/>
+    </dgm:scene3d>
+    <dgm:sp3d/>
+    <dgm:txPr/>
+    <dgm:style>
+      <a:lnRef idx="1">
+        <a:scrgbClr r="0" g="0" b="0"/>
+      </a:lnRef>
+      <a:fillRef idx="1">
+        <a:scrgbClr r="0" g="0" b="0"/>
+      </a:fillRef>
+      <a:effectRef idx="0">
+        <a:scrgbClr r="0" g="0" b="0"/>
+      </a:effectRef>
+      <a:fontRef idx="minor"/>
+    </dgm:style>
+  </dgm:styleLbl>
+  <dgm:styleLbl name="bgAcc1">
+    <dgm:scene3d>
+      <a:camera prst="orthographicFront"/>
+      <a:lightRig rig="threePt" dir="t"/>
+    </dgm:scene3d>
+    <dgm:sp3d/>
+    <dgm:txPr/>
+    <dgm:style>
+      <a:lnRef idx="2">
+        <a:scrgbClr r="0" g="0" b="0"/>
+      </a:lnRef>
+      <a:fillRef idx="1">
+        <a:scrgbClr r="0" g="0" b="0"/>
+      </a:fillRef>
+      <a:effectRef idx="0">
+        <a:scrgbClr r="0" g="0" b="0"/>
+      </a:effectRef>
+      <a:fontRef idx="minor"/>
+    </dgm:style>
+  </dgm:styleLbl>
+  <dgm:styleLbl name="solidFgAcc1">
+    <dgm:scene3d>
+      <a:camera prst="orthographicFront"/>
+      <a:lightRig rig="threePt" dir="t"/>
+    </dgm:scene3d>
+    <dgm:sp3d/>
+    <dgm:txPr/>
+    <dgm:style>
+      <a:lnRef idx="2">
+        <a:scrgbClr r="0" g="0" b="0"/>
+      </a:lnRef>
+      <a:fillRef idx="1">
+        <a:scrgbClr r="0" g="0" b="0"/>
+      </a:fillRef>
+      <a:effectRef idx="0">
+        <a:scrgbClr r="0" g="0" b="0"/>
+      </a:effectRef>
+      <a:fontRef idx="minor"/>
+    </dgm:style>
+  </dgm:styleLbl>
+  <dgm:styleLbl name="solidAlignAcc1">
+    <dgm:scene3d>
+      <a:camera prst="orthographicFront"/>
+      <a:lightRig rig="threePt" dir="t"/>
+    </dgm:scene3d>
+    <dgm:sp3d/>
+    <dgm:txPr/>
+    <dgm:style>
+      <a:lnRef idx="2">
+        <a:scrgbClr r="0" g="0" b="0"/>
+      </a:lnRef>
+      <a:fillRef idx="1">
+        <a:scrgbClr r="0" g="0" b="0"/>
+      </a:fillRef>
+      <a:effectRef idx="0">
+        <a:scrgbClr r="0" g="0" b="0"/>
+      </a:effectRef>
+      <a:fontRef idx="minor"/>
+    </dgm:style>
+  </dgm:styleLbl>
+  <dgm:styleLbl name="solidBgAcc1">
+    <dgm:scene3d>
+      <a:camera prst="orthographicFront"/>
+      <a:lightRig rig="threePt" dir="t"/>
+    </dgm:scene3d>
+    <dgm:sp3d/>
+    <dgm:txPr/>
+    <dgm:style>
+      <a:lnRef idx="2">
+        <a:scrgbClr r="0" g="0" b="0"/>
+      </a:lnRef>
+      <a:fillRef idx="1">
+        <a:scrgbClr r="0" g="0" b="0"/>
+      </a:fillRef>
+      <a:effectRef idx="0">
+        <a:scrgbClr r="0" g="0" b="0"/>
+      </a:effectRef>
+      <a:fontRef idx="minor"/>
+    </dgm:style>
+  </dgm:styleLbl>
+  <dgm:styleLbl name="fgAccFollowNode1">
+    <dgm:scene3d>
+      <a:camera prst="orthographicFront"/>
+      <a:lightRig rig="threePt" dir="t"/>
+    </dgm:scene3d>
+    <dgm:sp3d/>
+    <dgm:txPr/>
+    <dgm:style>
+      <a:lnRef idx="2">
+        <a:scrgbClr r="0" g="0" b="0"/>
+      </a:lnRef>
+      <a:fillRef idx="1">
+        <a:scrgbClr r="0" g="0" b="0"/>
+      </a:fillRef>
+      <a:effectRef idx="0">
+        <a:scrgbClr r="0" g="0" b="0"/>
+      </a:effectRef>
+      <a:fontRef idx="minor"/>
+    </dgm:style>
+  </dgm:styleLbl>
+  <dgm:styleLbl name="alignAccFollowNode1">
+    <dgm:scene3d>
+      <a:camera prst="orthographicFront"/>
+      <a:lightRig rig="threePt" dir="t"/>
+    </dgm:scene3d>
+    <dgm:sp3d/>
+    <dgm:txPr/>
+    <dgm:style>
+      <a:lnRef idx="2">
+        <a:scrgbClr r="0" g="0" b="0"/>
+      </a:lnRef>
+      <a:fillRef idx="1">
+        <a:scrgbClr r="0" g="0" b="0"/>
+      </a:fillRef>
+      <a:effectRef idx="0">
+        <a:scrgbClr r="0" g="0" b="0"/>
+      </a:effectRef>
+      <a:fontRef idx="minor"/>
+    </dgm:style>
+  </dgm:styleLbl>
+  <dgm:styleLbl name="bgAccFollowNode1">
+    <dgm:scene3d>
+      <a:camera prst="orthographicFront"/>
+      <a:lightRig rig="threePt" dir="t"/>
+    </dgm:scene3d>
+    <dgm:sp3d/>
+    <dgm:txPr/>
+    <dgm:style>
+      <a:lnRef idx="2">
+        <a:scrgbClr r="0" g="0" b="0"/>
+      </a:lnRef>
+      <a:fillRef idx="1">
+        <a:scrgbClr r="0" g="0" b="0"/>
+      </a:fillRef>
+      <a:effectRef idx="0">
+        <a:scrgbClr r="0" g="0" b="0"/>
+      </a:effectRef>
+      <a:fontRef idx="minor"/>
+    </dgm:style>
+  </dgm:styleLbl>
+  <dgm:styleLbl name="fgAcc0">
+    <dgm:scene3d>
+      <a:camera prst="orthographicFront"/>
+      <a:lightRig rig="threePt" dir="t"/>
+    </dgm:scene3d>
+    <dgm:sp3d/>
+    <dgm:txPr/>
+    <dgm:style>
+      <a:lnRef idx="2">
+        <a:scrgbClr r="0" g="0" b="0"/>
+      </a:lnRef>
+      <a:fillRef idx="1">
+        <a:scrgbClr r="0" g="0" b="0"/>
+      </a:fillRef>
+      <a:effectRef idx="0">
+        <a:scrgbClr r="0" g="0" b="0"/>
+      </a:effectRef>
+      <a:fontRef idx="minor"/>
+    </dgm:style>
+  </dgm:styleLbl>
+  <dgm:styleLbl name="fgAcc2">
+    <dgm:scene3d>
+      <a:camera prst="orthographicFront"/>
+      <a:lightRig rig="threePt" dir="t"/>
+    </dgm:scene3d>
+    <dgm:sp3d/>
+    <dgm:txPr/>
+    <dgm:style>
+      <a:lnRef idx="2">
+        <a:scrgbClr r="0" g="0" b="0"/>
+      </a:lnRef>
+      <a:fillRef idx="1">
+        <a:scrgbClr r="0" g="0" b="0"/>
+      </a:fillRef>
+      <a:effectRef idx="0">
+        <a:scrgbClr r="0" g="0" b="0"/>
+      </a:effectRef>
+      <a:fontRef idx="minor"/>
+    </dgm:style>
+  </dgm:styleLbl>
+  <dgm:styleLbl name="fgAcc3">
+    <dgm:scene3d>
+      <a:camera prst="orthographicFront"/>
+      <a:lightRig rig="threePt" dir="t"/>
+    </dgm:scene3d>
+    <dgm:sp3d/>
+    <dgm:txPr/>
+    <dgm:style>
+      <a:lnRef idx="2">
+        <a:scrgbClr r="0" g="0" b="0"/>
+      </a:lnRef>
+      <a:fillRef idx="1">
+        <a:scrgbClr r="0" g="0" b="0"/>
+      </a:fillRef>
+      <a:effectRef idx="0">
+        <a:scrgbClr r="0" g="0" b="0"/>
+      </a:effectRef>
+      <a:fontRef idx="minor"/>
+    </dgm:style>
+  </dgm:styleLbl>
+  <dgm:styleLbl name="fgAcc4">
+    <dgm:scene3d>
+      <a:camera prst="orthographicFront"/>
+      <a:lightRig rig="threePt" dir="t"/>
+    </dgm:scene3d>
+    <dgm:sp3d/>
+    <dgm:txPr/>
+    <dgm:style>
+      <a:lnRef idx="2">
+        <a:scrgbClr r="0" g="0" b="0"/>
+      </a:lnRef>
+      <a:fillRef idx="1">
+        <a:scrgbClr r="0" g="0" b="0"/>
+      </a:fillRef>
+      <a:effectRef idx="0">
+        <a:scrgbClr r="0" g="0" b="0"/>
+      </a:effectRef>
+      <a:fontRef idx="minor"/>
+    </dgm:style>
+  </dgm:styleLbl>
+  <dgm:styleLbl name="bgShp">
+    <dgm:scene3d>
+      <a:camera prst="orthographicFront"/>
+      <a:lightRig rig="threePt" dir="t"/>
+    </dgm:scene3d>
+    <dgm:sp3d/>
+    <dgm:txPr/>
+    <dgm:style>
+      <a:lnRef idx="0">
+        <a:scrgbClr r="0" g="0" b="0"/>
+      </a:lnRef>
+      <a:fillRef idx="1">
+        <a:scrgbClr r="0" g="0" b="0"/>
+      </a:fillRef>
+      <a:effectRef idx="0">
+        <a:scrgbClr r="0" g="0" b="0"/>
+      </a:effectRef>
+      <a:fontRef idx="minor"/>
+    </dgm:style>
+  </dgm:styleLbl>
+  <dgm:styleLbl name="dkBgShp">
+    <dgm:scene3d>
+      <a:camera prst="orthographicFront"/>
+      <a:lightRig rig="threePt" dir="t"/>
+    </dgm:scene3d>
+    <dgm:sp3d/>
+    <dgm:txPr/>
+    <dgm:style>
+      <a:lnRef idx="0">
+        <a:scrgbClr r="0" g="0" b="0"/>
+      </a:lnRef>
+      <a:fillRef idx="1">
+        <a:scrgbClr r="0" g="0" b="0"/>
+      </a:fillRef>
+      <a:effectRef idx="0">
+        <a:scrgbClr r="0" g="0" b="0"/>
+      </a:effectRef>
+      <a:fontRef idx="minor"/>
+    </dgm:style>
+  </dgm:styleLbl>
+  <dgm:styleLbl name="trBgShp">
+    <dgm:scene3d>
+      <a:camera prst="orthographicFront"/>
+      <a:lightRig rig="threePt" dir="t"/>
+    </dgm:scene3d>
+    <dgm:sp3d/>
+    <dgm:txPr/>
+    <dgm:style>
+      <a:lnRef idx="0">
+        <a:scrgbClr r="0" g="0" b="0"/>
+      </a:lnRef>
+      <a:fillRef idx="1">
+        <a:scrgbClr r="0" g="0" b="0"/>
+      </a:fillRef>
+      <a:effectRef idx="0">
+        <a:scrgbClr r="0" g="0" b="0"/>
+      </a:effectRef>
+      <a:fontRef idx="minor"/>
+    </dgm:style>
+  </dgm:styleLbl>
+  <dgm:styleLbl name="fgShp">
+    <dgm:scene3d>
+      <a:camera prst="orthographicFront"/>
+      <a:lightRig rig="threePt" dir="t"/>
+    </dgm:scene3d>
+    <dgm:sp3d/>
+    <dgm:txPr/>
+    <dgm:style>
+      <a:lnRef idx="2">
+        <a:scrgbClr r="0" g="0" b="0"/>
+      </a:lnRef>
+      <a:fillRef idx="1">
+        <a:scrgbClr r="0" g="0" b="0"/>
+      </a:fillRef>
+      <a:effectRef idx="0">
+        <a:scrgbClr r="0" g="0" b="0"/>
+      </a:effectRef>
+      <a:fontRef idx="minor"/>
+    </dgm:style>
+  </dgm:styleLbl>
+  <dgm:styleLbl name="revTx">
+    <dgm:scene3d>
+      <a:camera prst="orthographicFront"/>
+      <a:lightRig rig="threePt" dir="t"/>
+    </dgm:scene3d>
+    <dgm:sp3d/>
+    <dgm:txPr/>
+    <dgm:style>
+      <a:lnRef idx="0">
+        <a:scrgbClr r="0" g="0" b="0"/>
+      </a:lnRef>
+      <a:fillRef idx="0">
+        <a:scrgbClr r="0" g="0" b="0"/>
+      </a:fillRef>
+      <a:effectRef idx="0">
+        <a:scrgbClr r="0" g="0" b="0"/>
+      </a:effectRef>
+      <a:fontRef idx="minor"/>
+    </dgm:style>
+  </dgm:styleLbl>
+</dgm:styleDef>
 </file>
 
 <file path=ppt/slideLayouts/slideLayout1.xml><?xml version="1.0" encoding="utf-8"?>
@@ -258,7 +3048,7 @@
           <a:p>
             <a:fld id="{9AA7D095-A676-4F6B-9416-D65D798F5244}" type="datetimeFigureOut">
               <a:rPr lang="de-DE" smtClean="0"/>
-              <a:t>25.04.2015</a:t>
+              <a:t>30.04.2015</a:t>
             </a:fld>
             <a:endParaRPr lang="de-DE"/>
           </a:p>
@@ -428,7 +3218,7 @@
           <a:p>
             <a:fld id="{9AA7D095-A676-4F6B-9416-D65D798F5244}" type="datetimeFigureOut">
               <a:rPr lang="de-DE" smtClean="0"/>
-              <a:t>25.04.2015</a:t>
+              <a:t>30.04.2015</a:t>
             </a:fld>
             <a:endParaRPr lang="de-DE"/>
           </a:p>
@@ -608,7 +3398,7 @@
           <a:p>
             <a:fld id="{9AA7D095-A676-4F6B-9416-D65D798F5244}" type="datetimeFigureOut">
               <a:rPr lang="de-DE" smtClean="0"/>
-              <a:t>25.04.2015</a:t>
+              <a:t>30.04.2015</a:t>
             </a:fld>
             <a:endParaRPr lang="de-DE"/>
           </a:p>
@@ -778,7 +3568,7 @@
           <a:p>
             <a:fld id="{9AA7D095-A676-4F6B-9416-D65D798F5244}" type="datetimeFigureOut">
               <a:rPr lang="de-DE" smtClean="0"/>
-              <a:t>25.04.2015</a:t>
+              <a:t>30.04.2015</a:t>
             </a:fld>
             <a:endParaRPr lang="de-DE"/>
           </a:p>
@@ -1024,7 +3814,7 @@
           <a:p>
             <a:fld id="{9AA7D095-A676-4F6B-9416-D65D798F5244}" type="datetimeFigureOut">
               <a:rPr lang="de-DE" smtClean="0"/>
-              <a:t>25.04.2015</a:t>
+              <a:t>30.04.2015</a:t>
             </a:fld>
             <a:endParaRPr lang="de-DE"/>
           </a:p>
@@ -1256,7 +4046,7 @@
           <a:p>
             <a:fld id="{9AA7D095-A676-4F6B-9416-D65D798F5244}" type="datetimeFigureOut">
               <a:rPr lang="de-DE" smtClean="0"/>
-              <a:t>25.04.2015</a:t>
+              <a:t>30.04.2015</a:t>
             </a:fld>
             <a:endParaRPr lang="de-DE"/>
           </a:p>
@@ -1623,7 +4413,7 @@
           <a:p>
             <a:fld id="{9AA7D095-A676-4F6B-9416-D65D798F5244}" type="datetimeFigureOut">
               <a:rPr lang="de-DE" smtClean="0"/>
-              <a:t>25.04.2015</a:t>
+              <a:t>30.04.2015</a:t>
             </a:fld>
             <a:endParaRPr lang="de-DE"/>
           </a:p>
@@ -1741,7 +4531,7 @@
           <a:p>
             <a:fld id="{9AA7D095-A676-4F6B-9416-D65D798F5244}" type="datetimeFigureOut">
               <a:rPr lang="de-DE" smtClean="0"/>
-              <a:t>25.04.2015</a:t>
+              <a:t>30.04.2015</a:t>
             </a:fld>
             <a:endParaRPr lang="de-DE"/>
           </a:p>
@@ -1836,7 +4626,7 @@
           <a:p>
             <a:fld id="{9AA7D095-A676-4F6B-9416-D65D798F5244}" type="datetimeFigureOut">
               <a:rPr lang="de-DE" smtClean="0"/>
-              <a:t>25.04.2015</a:t>
+              <a:t>30.04.2015</a:t>
             </a:fld>
             <a:endParaRPr lang="de-DE"/>
           </a:p>
@@ -2113,7 +4903,7 @@
           <a:p>
             <a:fld id="{9AA7D095-A676-4F6B-9416-D65D798F5244}" type="datetimeFigureOut">
               <a:rPr lang="de-DE" smtClean="0"/>
-              <a:t>25.04.2015</a:t>
+              <a:t>30.04.2015</a:t>
             </a:fld>
             <a:endParaRPr lang="de-DE"/>
           </a:p>
@@ -2370,7 +5160,7 @@
           <a:p>
             <a:fld id="{9AA7D095-A676-4F6B-9416-D65D798F5244}" type="datetimeFigureOut">
               <a:rPr lang="de-DE" smtClean="0"/>
-              <a:t>25.04.2015</a:t>
+              <a:t>30.04.2015</a:t>
             </a:fld>
             <a:endParaRPr lang="de-DE"/>
           </a:p>
@@ -2583,7 +5373,7 @@
           <a:p>
             <a:fld id="{9AA7D095-A676-4F6B-9416-D65D798F5244}" type="datetimeFigureOut">
               <a:rPr lang="de-DE" smtClean="0"/>
-              <a:t>25.04.2015</a:t>
+              <a:t>30.04.2015</a:t>
             </a:fld>
             <a:endParaRPr lang="de-DE"/>
           </a:p>
@@ -9537,7 +12327,7 @@
         </p:blipFill>
         <p:spPr>
           <a:xfrm>
-            <a:off x="7679446" y="3636268"/>
+            <a:off x="685523" y="5539209"/>
             <a:ext cx="695422" cy="1143160"/>
           </a:xfrm>
           <a:prstGeom prst="rect">
@@ -9567,7 +12357,502 @@
         </p:blipFill>
         <p:spPr>
           <a:xfrm>
-            <a:off x="9854185" y="3878844"/>
+            <a:off x="12444593" y="4107447"/>
+            <a:ext cx="1538745" cy="615498"/>
+          </a:xfrm>
+          <a:prstGeom prst="rect">
+            <a:avLst/>
+          </a:prstGeom>
+        </p:spPr>
+      </p:pic>
+      <p:pic>
+        <p:nvPicPr>
+          <p:cNvPr id="10" name="Picture 9"/>
+          <p:cNvPicPr>
+            <a:picLocks noChangeAspect="1"/>
+          </p:cNvPicPr>
+          <p:nvPr/>
+        </p:nvPicPr>
+        <p:blipFill>
+          <a:blip r:embed="rId4">
+            <a:extLst>
+              <a:ext uri="{28A0092B-C50C-407E-A947-70E740481C1C}">
+                <a14:useLocalDpi xmlns:a14="http://schemas.microsoft.com/office/drawing/2010/main" val="0"/>
+              </a:ext>
+            </a:extLst>
+          </a:blip>
+          <a:stretch>
+            <a:fillRect/>
+          </a:stretch>
+        </p:blipFill>
+        <p:spPr>
+          <a:xfrm>
+            <a:off x="5318605" y="3789056"/>
+            <a:ext cx="809738" cy="952633"/>
+          </a:xfrm>
+          <a:prstGeom prst="rect">
+            <a:avLst/>
+          </a:prstGeom>
+        </p:spPr>
+      </p:pic>
+      <p:cxnSp>
+        <p:nvCxnSpPr>
+          <p:cNvPr id="12" name="Straight Arrow Connector 11"/>
+          <p:cNvCxnSpPr/>
+          <p:nvPr/>
+        </p:nvCxnSpPr>
+        <p:spPr>
+          <a:xfrm flipH="1" flipV="1">
+            <a:off x="5733537" y="4806778"/>
+            <a:ext cx="18566" cy="874085"/>
+          </a:xfrm>
+          <a:prstGeom prst="straightConnector1">
+            <a:avLst/>
+          </a:prstGeom>
+          <a:ln w="111125">
+            <a:solidFill>
+              <a:schemeClr val="accent2">
+                <a:lumMod val="75000"/>
+              </a:schemeClr>
+            </a:solidFill>
+            <a:headEnd type="triangle"/>
+            <a:tailEnd type="triangle"/>
+          </a:ln>
+        </p:spPr>
+        <p:style>
+          <a:lnRef idx="1">
+            <a:schemeClr val="accent1"/>
+          </a:lnRef>
+          <a:fillRef idx="0">
+            <a:schemeClr val="accent1"/>
+          </a:fillRef>
+          <a:effectRef idx="0">
+            <a:schemeClr val="accent1"/>
+          </a:effectRef>
+          <a:fontRef idx="minor">
+            <a:schemeClr val="tx1"/>
+          </a:fontRef>
+        </p:style>
+      </p:cxnSp>
+      <p:sp>
+        <p:nvSpPr>
+          <p:cNvPr id="28" name="Rounded Rectangle 25"/>
+          <p:cNvSpPr/>
+          <p:nvPr/>
+        </p:nvSpPr>
+        <p:spPr>
+          <a:xfrm>
+            <a:off x="2699953" y="4670158"/>
+            <a:ext cx="963911" cy="963908"/>
+          </a:xfrm>
+          <a:prstGeom prst="ellipse">
+            <a:avLst/>
+          </a:prstGeom>
+          <a:solidFill>
+            <a:schemeClr val="accent1">
+              <a:lumMod val="75000"/>
+            </a:schemeClr>
+          </a:solidFill>
+          <a:ln w="76200">
+            <a:solidFill>
+              <a:schemeClr val="accent1">
+                <a:lumMod val="50000"/>
+              </a:schemeClr>
+            </a:solidFill>
+          </a:ln>
+        </p:spPr>
+        <p:style>
+          <a:lnRef idx="2">
+            <a:schemeClr val="accent1">
+              <a:shade val="50000"/>
+            </a:schemeClr>
+          </a:lnRef>
+          <a:fillRef idx="1">
+            <a:schemeClr val="accent1"/>
+          </a:fillRef>
+          <a:effectRef idx="0">
+            <a:schemeClr val="accent1"/>
+          </a:effectRef>
+          <a:fontRef idx="minor">
+            <a:schemeClr val="lt1"/>
+          </a:fontRef>
+        </p:style>
+        <p:txBody>
+          <a:bodyPr rtlCol="0" anchor="ctr"/>
+          <a:lstStyle/>
+          <a:p>
+            <a:pPr algn="ctr"/>
+            <a:r>
+              <a:rPr lang="en-US" sz="1400" b="1" dirty="0" smtClean="0"/>
+              <a:t>Image</a:t>
+            </a:r>
+            <a:endParaRPr lang="de-DE" sz="1400" b="1" dirty="0"/>
+          </a:p>
+        </p:txBody>
+      </p:sp>
+      <p:cxnSp>
+        <p:nvCxnSpPr>
+          <p:cNvPr id="34" name="Straight Arrow Connector 33"/>
+          <p:cNvCxnSpPr/>
+          <p:nvPr/>
+        </p:nvCxnSpPr>
+        <p:spPr>
+          <a:xfrm rot="18847739" flipV="1">
+            <a:off x="4224536" y="5117063"/>
+            <a:ext cx="1227503" cy="10481"/>
+          </a:xfrm>
+          <a:prstGeom prst="straightConnector1">
+            <a:avLst/>
+          </a:prstGeom>
+          <a:ln w="111125">
+            <a:solidFill>
+              <a:schemeClr val="tx1">
+                <a:lumMod val="50000"/>
+                <a:lumOff val="50000"/>
+              </a:schemeClr>
+            </a:solidFill>
+            <a:tailEnd type="triangle"/>
+          </a:ln>
+        </p:spPr>
+        <p:style>
+          <a:lnRef idx="1">
+            <a:schemeClr val="accent1"/>
+          </a:lnRef>
+          <a:fillRef idx="0">
+            <a:schemeClr val="accent1"/>
+          </a:fillRef>
+          <a:effectRef idx="0">
+            <a:schemeClr val="accent1"/>
+          </a:effectRef>
+          <a:fontRef idx="minor">
+            <a:schemeClr val="tx1"/>
+          </a:fontRef>
+        </p:style>
+      </p:cxnSp>
+      <p:cxnSp>
+        <p:nvCxnSpPr>
+          <p:cNvPr id="37" name="Straight Arrow Connector 36"/>
+          <p:cNvCxnSpPr/>
+          <p:nvPr/>
+        </p:nvCxnSpPr>
+        <p:spPr>
+          <a:xfrm rot="2883253" flipV="1">
+            <a:off x="6076264" y="5163168"/>
+            <a:ext cx="1278131" cy="10481"/>
+          </a:xfrm>
+          <a:prstGeom prst="straightConnector1">
+            <a:avLst/>
+          </a:prstGeom>
+          <a:ln w="111125">
+            <a:solidFill>
+              <a:schemeClr val="tx1">
+                <a:lumMod val="50000"/>
+                <a:lumOff val="50000"/>
+              </a:schemeClr>
+            </a:solidFill>
+            <a:tailEnd type="triangle"/>
+          </a:ln>
+        </p:spPr>
+        <p:style>
+          <a:lnRef idx="1">
+            <a:schemeClr val="accent1"/>
+          </a:lnRef>
+          <a:fillRef idx="0">
+            <a:schemeClr val="accent1"/>
+          </a:fillRef>
+          <a:effectRef idx="0">
+            <a:schemeClr val="accent1"/>
+          </a:effectRef>
+          <a:fontRef idx="minor">
+            <a:schemeClr val="tx1"/>
+          </a:fontRef>
+        </p:style>
+      </p:cxnSp>
+      <p:pic>
+        <p:nvPicPr>
+          <p:cNvPr id="24" name="Picture 23"/>
+          <p:cNvPicPr>
+            <a:picLocks noChangeAspect="1"/>
+          </p:cNvPicPr>
+          <p:nvPr/>
+        </p:nvPicPr>
+        <p:blipFill>
+          <a:blip r:embed="rId5"/>
+          <a:stretch>
+            <a:fillRect/>
+          </a:stretch>
+        </p:blipFill>
+        <p:spPr>
+          <a:xfrm>
+            <a:off x="9290532" y="3361037"/>
+            <a:ext cx="2626907" cy="2426685"/>
+          </a:xfrm>
+          <a:prstGeom prst="rect">
+            <a:avLst/>
+          </a:prstGeom>
+        </p:spPr>
+      </p:pic>
+      <p:cxnSp>
+        <p:nvCxnSpPr>
+          <p:cNvPr id="46" name="Straight Arrow Connector 45"/>
+          <p:cNvCxnSpPr/>
+          <p:nvPr/>
+        </p:nvCxnSpPr>
+        <p:spPr>
+          <a:xfrm flipV="1">
+            <a:off x="11410065" y="4430586"/>
+            <a:ext cx="946691" cy="10481"/>
+          </a:xfrm>
+          <a:prstGeom prst="straightConnector1">
+            <a:avLst/>
+          </a:prstGeom>
+          <a:ln w="111125">
+            <a:solidFill>
+              <a:schemeClr val="tx1">
+                <a:lumMod val="50000"/>
+                <a:lumOff val="50000"/>
+              </a:schemeClr>
+            </a:solidFill>
+            <a:tailEnd type="triangle"/>
+          </a:ln>
+        </p:spPr>
+        <p:style>
+          <a:lnRef idx="1">
+            <a:schemeClr val="accent1"/>
+          </a:lnRef>
+          <a:fillRef idx="0">
+            <a:schemeClr val="accent1"/>
+          </a:fillRef>
+          <a:effectRef idx="0">
+            <a:schemeClr val="accent1"/>
+          </a:effectRef>
+          <a:fontRef idx="minor">
+            <a:schemeClr val="tx1"/>
+          </a:fontRef>
+        </p:style>
+      </p:cxnSp>
+      <p:graphicFrame>
+        <p:nvGraphicFramePr>
+          <p:cNvPr id="21" name="Diagram 20"/>
+          <p:cNvGraphicFramePr/>
+          <p:nvPr>
+            <p:extLst>
+              <p:ext uri="{D42A27DB-BD31-4B8C-83A1-F6EECF244321}">
+                <p14:modId xmlns:p14="http://schemas.microsoft.com/office/powerpoint/2010/main" val="2839590977"/>
+              </p:ext>
+            </p:extLst>
+          </p:nvPr>
+        </p:nvGraphicFramePr>
+        <p:xfrm>
+          <a:off x="1547427" y="5196015"/>
+          <a:ext cx="8653077" cy="1876545"/>
+        </p:xfrm>
+        <a:graphic>
+          <a:graphicData uri="http://schemas.openxmlformats.org/drawingml/2006/diagram">
+            <dgm:relIds xmlns:dgm="http://schemas.openxmlformats.org/drawingml/2006/diagram" xmlns:r="http://schemas.openxmlformats.org/officeDocument/2006/relationships" r:dm="rId6" r:lo="rId7" r:qs="rId8" r:cs="rId9"/>
+          </a:graphicData>
+        </a:graphic>
+      </p:graphicFrame>
+      <p:cxnSp>
+        <p:nvCxnSpPr>
+          <p:cNvPr id="40" name="Straight Arrow Connector 39"/>
+          <p:cNvCxnSpPr/>
+          <p:nvPr/>
+        </p:nvCxnSpPr>
+        <p:spPr>
+          <a:xfrm rot="18847739" flipV="1">
+            <a:off x="8819190" y="5145896"/>
+            <a:ext cx="1227503" cy="10481"/>
+          </a:xfrm>
+          <a:prstGeom prst="straightConnector1">
+            <a:avLst/>
+          </a:prstGeom>
+          <a:ln w="111125">
+            <a:solidFill>
+              <a:schemeClr val="tx1">
+                <a:lumMod val="50000"/>
+                <a:lumOff val="50000"/>
+              </a:schemeClr>
+            </a:solidFill>
+            <a:tailEnd type="triangle"/>
+          </a:ln>
+        </p:spPr>
+        <p:style>
+          <a:lnRef idx="1">
+            <a:schemeClr val="accent1"/>
+          </a:lnRef>
+          <a:fillRef idx="0">
+            <a:schemeClr val="accent1"/>
+          </a:fillRef>
+          <a:effectRef idx="0">
+            <a:schemeClr val="accent1"/>
+          </a:effectRef>
+          <a:fontRef idx="minor">
+            <a:schemeClr val="tx1"/>
+          </a:fontRef>
+        </p:style>
+      </p:cxnSp>
+      <p:pic>
+        <p:nvPicPr>
+          <p:cNvPr id="51" name="Picture 2" descr="Logo"/>
+          <p:cNvPicPr>
+            <a:picLocks noChangeAspect="1" noChangeArrowheads="1"/>
+          </p:cNvPicPr>
+          <p:nvPr/>
+        </p:nvPicPr>
+        <p:blipFill>
+          <a:blip r:embed="rId11">
+            <a:extLst>
+              <a:ext uri="{28A0092B-C50C-407E-A947-70E740481C1C}">
+                <a14:useLocalDpi xmlns:a14="http://schemas.microsoft.com/office/drawing/2010/main" val="0"/>
+              </a:ext>
+            </a:extLst>
+          </a:blip>
+          <a:srcRect/>
+          <a:stretch>
+            <a:fillRect/>
+          </a:stretch>
+        </p:blipFill>
+        <p:spPr bwMode="auto">
+          <a:xfrm>
+            <a:off x="4190056" y="6848377"/>
+            <a:ext cx="1648513" cy="374662"/>
+          </a:xfrm>
+          <a:prstGeom prst="rect">
+            <a:avLst/>
+          </a:prstGeom>
+          <a:noFill/>
+          <a:extLst>
+            <a:ext uri="{909E8E84-426E-40DD-AFC4-6F175D3DCCD1}">
+              <a14:hiddenFill xmlns:a14="http://schemas.microsoft.com/office/drawing/2010/main">
+                <a:solidFill>
+                  <a:srgbClr val="FFFFFF"/>
+                </a:solidFill>
+              </a14:hiddenFill>
+            </a:ext>
+          </a:extLst>
+        </p:spPr>
+      </p:pic>
+      <p:pic>
+        <p:nvPicPr>
+          <p:cNvPr id="30" name="Picture 29"/>
+          <p:cNvPicPr>
+            <a:picLocks noChangeAspect="1"/>
+          </p:cNvPicPr>
+          <p:nvPr/>
+        </p:nvPicPr>
+        <p:blipFill>
+          <a:blip r:embed="rId12" cstate="print">
+            <a:extLst>
+              <a:ext uri="{28A0092B-C50C-407E-A947-70E740481C1C}">
+                <a14:useLocalDpi xmlns:a14="http://schemas.microsoft.com/office/drawing/2010/main" val="0"/>
+              </a:ext>
+            </a:extLst>
+          </a:blip>
+          <a:stretch>
+            <a:fillRect/>
+          </a:stretch>
+        </p:blipFill>
+        <p:spPr>
+          <a:xfrm>
+            <a:off x="5943600" y="6787738"/>
+            <a:ext cx="1482810" cy="458528"/>
+          </a:xfrm>
+          <a:prstGeom prst="rect">
+            <a:avLst/>
+          </a:prstGeom>
+        </p:spPr>
+      </p:pic>
+    </p:spTree>
+    <p:extLst>
+      <p:ext uri="{BB962C8B-B14F-4D97-AF65-F5344CB8AC3E}">
+        <p14:creationId xmlns:p14="http://schemas.microsoft.com/office/powerpoint/2010/main" val="1264328124"/>
+      </p:ext>
+    </p:extLst>
+  </p:cSld>
+  <p:clrMapOvr>
+    <a:masterClrMapping/>
+  </p:clrMapOvr>
+  <p:timing>
+    <p:tnLst>
+      <p:par>
+        <p:cTn id="1" dur="indefinite" restart="never" nodeType="tmRoot"/>
+      </p:par>
+    </p:tnLst>
+  </p:timing>
+</p:sld>
+</file>
+
+<file path=ppt/slides/slide17.xml><?xml version="1.0" encoding="utf-8"?>
+<p:sld xmlns:a="http://schemas.openxmlformats.org/drawingml/2006/main" xmlns:r="http://schemas.openxmlformats.org/officeDocument/2006/relationships" xmlns:p="http://schemas.openxmlformats.org/presentationml/2006/main">
+  <p:cSld>
+    <p:spTree>
+      <p:nvGrpSpPr>
+        <p:cNvPr id="1" name=""/>
+        <p:cNvGrpSpPr/>
+        <p:nvPr/>
+      </p:nvGrpSpPr>
+      <p:grpSpPr>
+        <a:xfrm>
+          <a:off x="0" y="0"/>
+          <a:ext cx="0" cy="0"/>
+          <a:chOff x="0" y="0"/>
+          <a:chExt cx="0" cy="0"/>
+        </a:xfrm>
+      </p:grpSpPr>
+      <p:pic>
+        <p:nvPicPr>
+          <p:cNvPr id="7" name="Picture 6"/>
+          <p:cNvPicPr>
+            <a:picLocks noChangeAspect="1"/>
+          </p:cNvPicPr>
+          <p:nvPr/>
+        </p:nvPicPr>
+        <p:blipFill>
+          <a:blip r:embed="rId2">
+            <a:extLst>
+              <a:ext uri="{28A0092B-C50C-407E-A947-70E740481C1C}">
+                <a14:useLocalDpi xmlns:a14="http://schemas.microsoft.com/office/drawing/2010/main" val="0"/>
+              </a:ext>
+            </a:extLst>
+          </a:blip>
+          <a:stretch>
+            <a:fillRect/>
+          </a:stretch>
+        </p:blipFill>
+        <p:spPr>
+          <a:xfrm>
+            <a:off x="7691802" y="516187"/>
+            <a:ext cx="695422" cy="1143160"/>
+          </a:xfrm>
+          <a:prstGeom prst="rect">
+            <a:avLst/>
+          </a:prstGeom>
+        </p:spPr>
+      </p:pic>
+      <p:pic>
+        <p:nvPicPr>
+          <p:cNvPr id="9" name="Picture 8"/>
+          <p:cNvPicPr>
+            <a:picLocks noChangeAspect="1"/>
+          </p:cNvPicPr>
+          <p:nvPr/>
+        </p:nvPicPr>
+        <p:blipFill>
+          <a:blip r:embed="rId3">
+            <a:extLst>
+              <a:ext uri="{28A0092B-C50C-407E-A947-70E740481C1C}">
+                <a14:useLocalDpi xmlns:a14="http://schemas.microsoft.com/office/drawing/2010/main" val="0"/>
+              </a:ext>
+            </a:extLst>
+          </a:blip>
+          <a:stretch>
+            <a:fillRect/>
+          </a:stretch>
+        </p:blipFill>
+        <p:spPr>
+          <a:xfrm>
+            <a:off x="9823294" y="758763"/>
             <a:ext cx="1538745" cy="615498"/>
           </a:xfrm>
           <a:prstGeom prst="rect">
@@ -9583,7 +12868,7 @@
         </p:nvGrpSpPr>
         <p:grpSpPr>
           <a:xfrm>
-            <a:off x="8589474" y="3496052"/>
+            <a:off x="8558583" y="375971"/>
             <a:ext cx="1151769" cy="673166"/>
             <a:chOff x="2334271" y="318043"/>
             <a:chExt cx="1457473" cy="673166"/>
@@ -9656,6 +12941,188 @@
           </p:txBody>
         </p:sp>
       </p:grpSp>
+      <p:pic>
+        <p:nvPicPr>
+          <p:cNvPr id="8" name="Picture 7"/>
+          <p:cNvPicPr>
+            <a:picLocks noChangeAspect="1"/>
+          </p:cNvPicPr>
+          <p:nvPr/>
+        </p:nvPicPr>
+        <p:blipFill>
+          <a:blip r:embed="rId2">
+            <a:extLst>
+              <a:ext uri="{28A0092B-C50C-407E-A947-70E740481C1C}">
+                <a14:useLocalDpi xmlns:a14="http://schemas.microsoft.com/office/drawing/2010/main" val="0"/>
+              </a:ext>
+            </a:extLst>
+          </a:blip>
+          <a:stretch>
+            <a:fillRect/>
+          </a:stretch>
+        </p:blipFill>
+        <p:spPr>
+          <a:xfrm>
+            <a:off x="1054165" y="612982"/>
+            <a:ext cx="695422" cy="1143160"/>
+          </a:xfrm>
+          <a:prstGeom prst="rect">
+            <a:avLst/>
+          </a:prstGeom>
+        </p:spPr>
+      </p:pic>
+      <p:pic>
+        <p:nvPicPr>
+          <p:cNvPr id="10" name="Picture 9"/>
+          <p:cNvPicPr>
+            <a:picLocks noChangeAspect="1"/>
+          </p:cNvPicPr>
+          <p:nvPr/>
+        </p:nvPicPr>
+        <p:blipFill>
+          <a:blip r:embed="rId3">
+            <a:extLst>
+              <a:ext uri="{28A0092B-C50C-407E-A947-70E740481C1C}">
+                <a14:useLocalDpi xmlns:a14="http://schemas.microsoft.com/office/drawing/2010/main" val="0"/>
+              </a:ext>
+            </a:extLst>
+          </a:blip>
+          <a:stretch>
+            <a:fillRect/>
+          </a:stretch>
+        </p:blipFill>
+        <p:spPr>
+          <a:xfrm>
+            <a:off x="3228904" y="855558"/>
+            <a:ext cx="1538745" cy="615498"/>
+          </a:xfrm>
+          <a:prstGeom prst="rect">
+            <a:avLst/>
+          </a:prstGeom>
+        </p:spPr>
+      </p:pic>
+      <p:grpSp>
+        <p:nvGrpSpPr>
+          <p:cNvPr id="11" name="Group 10"/>
+          <p:cNvGrpSpPr/>
+          <p:nvPr/>
+        </p:nvGrpSpPr>
+        <p:grpSpPr>
+          <a:xfrm>
+            <a:off x="1964193" y="472766"/>
+            <a:ext cx="1151769" cy="673166"/>
+            <a:chOff x="2334271" y="318043"/>
+            <a:chExt cx="1457473" cy="673166"/>
+          </a:xfrm>
+        </p:grpSpPr>
+        <p:cxnSp>
+          <p:nvCxnSpPr>
+            <p:cNvPr id="12" name="Straight Arrow Connector 11"/>
+            <p:cNvCxnSpPr/>
+            <p:nvPr/>
+          </p:nvCxnSpPr>
+          <p:spPr>
+            <a:xfrm flipV="1">
+              <a:off x="2346123" y="980728"/>
+              <a:ext cx="1445621" cy="10481"/>
+            </a:xfrm>
+            <a:prstGeom prst="straightConnector1">
+              <a:avLst/>
+            </a:prstGeom>
+            <a:ln w="142875">
+              <a:solidFill>
+                <a:schemeClr val="tx1">
+                  <a:lumMod val="50000"/>
+                  <a:lumOff val="50000"/>
+                </a:schemeClr>
+              </a:solidFill>
+              <a:tailEnd type="triangle"/>
+            </a:ln>
+          </p:spPr>
+          <p:style>
+            <a:lnRef idx="1">
+              <a:schemeClr val="accent1"/>
+            </a:lnRef>
+            <a:fillRef idx="0">
+              <a:schemeClr val="accent1"/>
+            </a:fillRef>
+            <a:effectRef idx="0">
+              <a:schemeClr val="accent1"/>
+            </a:effectRef>
+            <a:fontRef idx="minor">
+              <a:schemeClr val="tx1"/>
+            </a:fontRef>
+          </p:style>
+        </p:cxnSp>
+        <p:sp>
+          <p:nvSpPr>
+            <p:cNvPr id="13" name="TextBox 12"/>
+            <p:cNvSpPr txBox="1"/>
+            <p:nvPr/>
+          </p:nvSpPr>
+          <p:spPr>
+            <a:xfrm>
+              <a:off x="2334271" y="318043"/>
+              <a:ext cx="1408522" cy="523220"/>
+            </a:xfrm>
+            <a:prstGeom prst="rect">
+              <a:avLst/>
+            </a:prstGeom>
+            <a:noFill/>
+          </p:spPr>
+          <p:txBody>
+            <a:bodyPr wrap="square" rtlCol="0">
+              <a:spAutoFit/>
+            </a:bodyPr>
+            <a:lstStyle/>
+            <a:p>
+              <a:pPr algn="ctr"/>
+              <a:endParaRPr lang="de-DE" sz="2800" b="1" dirty="0"/>
+            </a:p>
+          </p:txBody>
+        </p:sp>
+      </p:grpSp>
+      <p:pic>
+        <p:nvPicPr>
+          <p:cNvPr id="1026" name="Picture 2" descr="Logo"/>
+          <p:cNvPicPr>
+            <a:picLocks noChangeAspect="1" noChangeArrowheads="1"/>
+          </p:cNvPicPr>
+          <p:nvPr/>
+        </p:nvPicPr>
+        <p:blipFill>
+          <a:blip r:embed="rId4">
+            <a:extLst>
+              <a:ext uri="{28A0092B-C50C-407E-A947-70E740481C1C}">
+                <a14:useLocalDpi xmlns:a14="http://schemas.microsoft.com/office/drawing/2010/main" val="0"/>
+              </a:ext>
+            </a:extLst>
+          </a:blip>
+          <a:srcRect/>
+          <a:stretch>
+            <a:fillRect/>
+          </a:stretch>
+        </p:blipFill>
+        <p:spPr bwMode="auto">
+          <a:xfrm>
+            <a:off x="8292499" y="1182804"/>
+            <a:ext cx="1648513" cy="374662"/>
+          </a:xfrm>
+          <a:prstGeom prst="rect">
+            <a:avLst/>
+          </a:prstGeom>
+          <a:noFill/>
+          <a:extLst>
+            <a:ext uri="{909E8E84-426E-40DD-AFC4-6F175D3DCCD1}">
+              <a14:hiddenFill xmlns:a14="http://schemas.microsoft.com/office/drawing/2010/main">
+                <a:solidFill>
+                  <a:srgbClr val="FFFFFF"/>
+                </a:solidFill>
+              </a14:hiddenFill>
+            </a:ext>
+          </a:extLst>
+        </p:spPr>
+      </p:pic>
     </p:spTree>
     <p:extLst>
       <p:ext uri="{BB962C8B-B14F-4D97-AF65-F5344CB8AC3E}">

</xml_diff>

<commit_message>
Update for 1.5.0 client
</commit_message>
<xml_diff>
--- a/_sources/GettingStarted.pptx
+++ b/_sources/GettingStarted.pptx
@@ -15,13 +15,14 @@
     <p:sldId id="262" r:id="rId9"/>
     <p:sldId id="263" r:id="rId10"/>
     <p:sldId id="264" r:id="rId11"/>
-    <p:sldId id="265" r:id="rId12"/>
-    <p:sldId id="266" r:id="rId13"/>
-    <p:sldId id="267" r:id="rId14"/>
-    <p:sldId id="268" r:id="rId15"/>
-    <p:sldId id="270" r:id="rId16"/>
-    <p:sldId id="272" r:id="rId17"/>
-    <p:sldId id="271" r:id="rId18"/>
+    <p:sldId id="273" r:id="rId12"/>
+    <p:sldId id="265" r:id="rId13"/>
+    <p:sldId id="266" r:id="rId14"/>
+    <p:sldId id="267" r:id="rId15"/>
+    <p:sldId id="268" r:id="rId16"/>
+    <p:sldId id="270" r:id="rId17"/>
+    <p:sldId id="272" r:id="rId18"/>
+    <p:sldId id="271" r:id="rId19"/>
   </p:sldIdLst>
   <p:sldSz cx="14400213" cy="7559675"/>
   <p:notesSz cx="6858000" cy="9144000"/>
@@ -1137,6 +1138,13 @@
         </dgm:presLayoutVars>
       </dgm:prSet>
       <dgm:spPr/>
+      <dgm:t>
+        <a:bodyPr/>
+        <a:lstStyle/>
+        <a:p>
+          <a:endParaRPr lang="de-DE"/>
+        </a:p>
+      </dgm:t>
     </dgm:pt>
     <dgm:pt modelId="{EEA037F7-AE2F-4302-AA11-228240B9A75D}" type="pres">
       <dgm:prSet presAssocID="{FCB00572-1C8F-4B6D-968B-B082338556BC}" presName="parTxOnlySpace" presStyleCnt="0"/>
@@ -1151,6 +1159,13 @@
         </dgm:presLayoutVars>
       </dgm:prSet>
       <dgm:spPr/>
+      <dgm:t>
+        <a:bodyPr/>
+        <a:lstStyle/>
+        <a:p>
+          <a:endParaRPr lang="de-DE"/>
+        </a:p>
+      </dgm:t>
     </dgm:pt>
     <dgm:pt modelId="{C865F029-8CEF-4314-9C3B-0D8926907D83}" type="pres">
       <dgm:prSet presAssocID="{1D3C9E28-C2BE-4DF6-99F3-BB5CC8E8C51A}" presName="parTxOnlySpace" presStyleCnt="0"/>
@@ -1165,6 +1180,13 @@
         </dgm:presLayoutVars>
       </dgm:prSet>
       <dgm:spPr/>
+      <dgm:t>
+        <a:bodyPr/>
+        <a:lstStyle/>
+        <a:p>
+          <a:endParaRPr lang="de-DE"/>
+        </a:p>
+      </dgm:t>
     </dgm:pt>
     <dgm:pt modelId="{48E0258A-CCF0-4FE0-A8A2-A7F4B1729A29}" type="pres">
       <dgm:prSet presAssocID="{84265283-6A79-49F9-86CC-89FACB483873}" presName="parTxOnlySpace" presStyleCnt="0"/>
@@ -1179,6 +1201,13 @@
         </dgm:presLayoutVars>
       </dgm:prSet>
       <dgm:spPr/>
+      <dgm:t>
+        <a:bodyPr/>
+        <a:lstStyle/>
+        <a:p>
+          <a:endParaRPr lang="de-DE"/>
+        </a:p>
+      </dgm:t>
     </dgm:pt>
   </dgm:ptLst>
   <dgm:cxnLst>
@@ -1221,381 +1250,6 @@
       <dsp:cNvGrpSpPr/>
     </dsp:nvGrpSpPr>
     <dsp:grpSpPr/>
-    <dsp:sp modelId="{6D72C3A5-1474-40AD-9A10-2534C79C4517}">
-      <dsp:nvSpPr>
-        <dsp:cNvPr id="0" name=""/>
-        <dsp:cNvSpPr/>
-      </dsp:nvSpPr>
-      <dsp:spPr>
-        <a:xfrm>
-          <a:off x="2112" y="562235"/>
-          <a:ext cx="1880185" cy="752074"/>
-        </a:xfrm>
-        <a:prstGeom prst="chevron">
-          <a:avLst/>
-        </a:prstGeom>
-        <a:solidFill>
-          <a:schemeClr val="tx2">
-            <a:lumMod val="75000"/>
-          </a:schemeClr>
-        </a:solidFill>
-        <a:ln w="12700" cap="flat" cmpd="sng" algn="ctr">
-          <a:solidFill>
-            <a:schemeClr val="lt1">
-              <a:hueOff val="0"/>
-              <a:satOff val="0"/>
-              <a:lumOff val="0"/>
-              <a:alphaOff val="0"/>
-            </a:schemeClr>
-          </a:solidFill>
-          <a:prstDash val="solid"/>
-          <a:miter lim="800000"/>
-        </a:ln>
-        <a:effectLst/>
-      </dsp:spPr>
-      <dsp:style>
-        <a:lnRef idx="2">
-          <a:scrgbClr r="0" g="0" b="0"/>
-        </a:lnRef>
-        <a:fillRef idx="1">
-          <a:scrgbClr r="0" g="0" b="0"/>
-        </a:fillRef>
-        <a:effectRef idx="0">
-          <a:scrgbClr r="0" g="0" b="0"/>
-        </a:effectRef>
-        <a:fontRef idx="minor">
-          <a:schemeClr val="lt1"/>
-        </a:fontRef>
-      </dsp:style>
-      <dsp:txBody>
-        <a:bodyPr spcFirstLastPara="0" vert="horz" wrap="square" lIns="56007" tIns="18669" rIns="18669" bIns="18669" numCol="1" spcCol="1270" anchor="ctr" anchorCtr="0">
-          <a:noAutofit/>
-        </a:bodyPr>
-        <a:lstStyle/>
-        <a:p>
-          <a:pPr lvl="0" algn="ctr" defTabSz="622300">
-            <a:lnSpc>
-              <a:spcPct val="90000"/>
-            </a:lnSpc>
-            <a:spcBef>
-              <a:spcPct val="0"/>
-            </a:spcBef>
-            <a:spcAft>
-              <a:spcPct val="35000"/>
-            </a:spcAft>
-          </a:pPr>
-          <a:r>
-            <a:rPr lang="en-US" sz="1400" b="1" kern="1200" dirty="0" smtClean="0"/>
-            <a:t>package</a:t>
-          </a:r>
-          <a:endParaRPr lang="de-DE" sz="1400" b="1" kern="1200" dirty="0"/>
-        </a:p>
-      </dsp:txBody>
-      <dsp:txXfrm>
-        <a:off x="378149" y="562235"/>
-        <a:ext cx="1128111" cy="752074"/>
-      </dsp:txXfrm>
-    </dsp:sp>
-    <dsp:sp modelId="{086EE9E9-692A-4D05-A349-CBDF03FDA677}">
-      <dsp:nvSpPr>
-        <dsp:cNvPr id="0" name=""/>
-        <dsp:cNvSpPr/>
-      </dsp:nvSpPr>
-      <dsp:spPr>
-        <a:xfrm>
-          <a:off x="1694279" y="562235"/>
-          <a:ext cx="1880185" cy="752074"/>
-        </a:xfrm>
-        <a:prstGeom prst="chevron">
-          <a:avLst/>
-        </a:prstGeom>
-        <a:solidFill>
-          <a:schemeClr val="tx2">
-            <a:lumMod val="75000"/>
-          </a:schemeClr>
-        </a:solidFill>
-        <a:ln w="12700" cap="flat" cmpd="sng" algn="ctr">
-          <a:solidFill>
-            <a:schemeClr val="lt1">
-              <a:hueOff val="0"/>
-              <a:satOff val="0"/>
-              <a:lumOff val="0"/>
-              <a:alphaOff val="0"/>
-            </a:schemeClr>
-          </a:solidFill>
-          <a:prstDash val="solid"/>
-          <a:miter lim="800000"/>
-        </a:ln>
-        <a:effectLst/>
-      </dsp:spPr>
-      <dsp:style>
-        <a:lnRef idx="2">
-          <a:scrgbClr r="0" g="0" b="0"/>
-        </a:lnRef>
-        <a:fillRef idx="1">
-          <a:scrgbClr r="0" g="0" b="0"/>
-        </a:fillRef>
-        <a:effectRef idx="0">
-          <a:scrgbClr r="0" g="0" b="0"/>
-        </a:effectRef>
-        <a:fontRef idx="minor">
-          <a:schemeClr val="lt1"/>
-        </a:fontRef>
-      </dsp:style>
-      <dsp:txBody>
-        <a:bodyPr spcFirstLastPara="0" vert="horz" wrap="square" lIns="56007" tIns="18669" rIns="18669" bIns="18669" numCol="1" spcCol="1270" anchor="ctr" anchorCtr="0">
-          <a:noAutofit/>
-        </a:bodyPr>
-        <a:lstStyle/>
-        <a:p>
-          <a:pPr lvl="0" algn="ctr" defTabSz="622300">
-            <a:lnSpc>
-              <a:spcPct val="90000"/>
-            </a:lnSpc>
-            <a:spcBef>
-              <a:spcPct val="0"/>
-            </a:spcBef>
-            <a:spcAft>
-              <a:spcPct val="35000"/>
-            </a:spcAft>
-          </a:pPr>
-          <a:r>
-            <a:rPr lang="en-US" sz="1400" b="1" kern="1200" dirty="0" smtClean="0"/>
-            <a:t>pre-integration-test</a:t>
-          </a:r>
-          <a:endParaRPr lang="de-DE" sz="1400" b="1" kern="1200" dirty="0"/>
-        </a:p>
-      </dsp:txBody>
-      <dsp:txXfrm>
-        <a:off x="2070316" y="562235"/>
-        <a:ext cx="1128111" cy="752074"/>
-      </dsp:txXfrm>
-    </dsp:sp>
-    <dsp:sp modelId="{17AF3B93-FA57-409F-9FAF-CA14FC2BCCDA}">
-      <dsp:nvSpPr>
-        <dsp:cNvPr id="0" name=""/>
-        <dsp:cNvSpPr/>
-      </dsp:nvSpPr>
-      <dsp:spPr>
-        <a:xfrm>
-          <a:off x="3386445" y="562235"/>
-          <a:ext cx="1880185" cy="752074"/>
-        </a:xfrm>
-        <a:prstGeom prst="chevron">
-          <a:avLst/>
-        </a:prstGeom>
-        <a:solidFill>
-          <a:schemeClr val="tx2">
-            <a:lumMod val="75000"/>
-          </a:schemeClr>
-        </a:solidFill>
-        <a:ln w="12700" cap="flat" cmpd="sng" algn="ctr">
-          <a:solidFill>
-            <a:schemeClr val="lt1">
-              <a:hueOff val="0"/>
-              <a:satOff val="0"/>
-              <a:lumOff val="0"/>
-              <a:alphaOff val="0"/>
-            </a:schemeClr>
-          </a:solidFill>
-          <a:prstDash val="solid"/>
-          <a:miter lim="800000"/>
-        </a:ln>
-        <a:effectLst/>
-      </dsp:spPr>
-      <dsp:style>
-        <a:lnRef idx="2">
-          <a:scrgbClr r="0" g="0" b="0"/>
-        </a:lnRef>
-        <a:fillRef idx="1">
-          <a:scrgbClr r="0" g="0" b="0"/>
-        </a:fillRef>
-        <a:effectRef idx="0">
-          <a:scrgbClr r="0" g="0" b="0"/>
-        </a:effectRef>
-        <a:fontRef idx="minor">
-          <a:schemeClr val="lt1"/>
-        </a:fontRef>
-      </dsp:style>
-      <dsp:txBody>
-        <a:bodyPr spcFirstLastPara="0" vert="horz" wrap="square" lIns="56007" tIns="18669" rIns="18669" bIns="18669" numCol="1" spcCol="1270" anchor="ctr" anchorCtr="0">
-          <a:noAutofit/>
-        </a:bodyPr>
-        <a:lstStyle/>
-        <a:p>
-          <a:pPr lvl="0" algn="ctr" defTabSz="622300">
-            <a:lnSpc>
-              <a:spcPct val="90000"/>
-            </a:lnSpc>
-            <a:spcBef>
-              <a:spcPct val="0"/>
-            </a:spcBef>
-            <a:spcAft>
-              <a:spcPct val="35000"/>
-            </a:spcAft>
-          </a:pPr>
-          <a:r>
-            <a:rPr lang="en-US" sz="1400" b="1" kern="1200" dirty="0" smtClean="0"/>
-            <a:t>integration-test</a:t>
-          </a:r>
-          <a:endParaRPr lang="de-DE" sz="1400" b="1" kern="1200" dirty="0"/>
-        </a:p>
-      </dsp:txBody>
-      <dsp:txXfrm>
-        <a:off x="3762482" y="562235"/>
-        <a:ext cx="1128111" cy="752074"/>
-      </dsp:txXfrm>
-    </dsp:sp>
-    <dsp:sp modelId="{DEAC2976-8EFE-4204-9FE4-0A0AE01A3B2B}">
-      <dsp:nvSpPr>
-        <dsp:cNvPr id="0" name=""/>
-        <dsp:cNvSpPr/>
-      </dsp:nvSpPr>
-      <dsp:spPr>
-        <a:xfrm>
-          <a:off x="5078612" y="562235"/>
-          <a:ext cx="1880185" cy="752074"/>
-        </a:xfrm>
-        <a:prstGeom prst="chevron">
-          <a:avLst/>
-        </a:prstGeom>
-        <a:solidFill>
-          <a:schemeClr val="tx2">
-            <a:lumMod val="75000"/>
-          </a:schemeClr>
-        </a:solidFill>
-        <a:ln w="12700" cap="flat" cmpd="sng" algn="ctr">
-          <a:solidFill>
-            <a:schemeClr val="lt1">
-              <a:hueOff val="0"/>
-              <a:satOff val="0"/>
-              <a:lumOff val="0"/>
-              <a:alphaOff val="0"/>
-            </a:schemeClr>
-          </a:solidFill>
-          <a:prstDash val="solid"/>
-          <a:miter lim="800000"/>
-        </a:ln>
-        <a:effectLst/>
-      </dsp:spPr>
-      <dsp:style>
-        <a:lnRef idx="2">
-          <a:scrgbClr r="0" g="0" b="0"/>
-        </a:lnRef>
-        <a:fillRef idx="1">
-          <a:scrgbClr r="0" g="0" b="0"/>
-        </a:fillRef>
-        <a:effectRef idx="0">
-          <a:scrgbClr r="0" g="0" b="0"/>
-        </a:effectRef>
-        <a:fontRef idx="minor">
-          <a:schemeClr val="lt1"/>
-        </a:fontRef>
-      </dsp:style>
-      <dsp:txBody>
-        <a:bodyPr spcFirstLastPara="0" vert="horz" wrap="square" lIns="56007" tIns="18669" rIns="18669" bIns="18669" numCol="1" spcCol="1270" anchor="ctr" anchorCtr="0">
-          <a:noAutofit/>
-        </a:bodyPr>
-        <a:lstStyle/>
-        <a:p>
-          <a:pPr lvl="0" algn="ctr" defTabSz="622300">
-            <a:lnSpc>
-              <a:spcPct val="90000"/>
-            </a:lnSpc>
-            <a:spcBef>
-              <a:spcPct val="0"/>
-            </a:spcBef>
-            <a:spcAft>
-              <a:spcPct val="35000"/>
-            </a:spcAft>
-          </a:pPr>
-          <a:r>
-            <a:rPr lang="en-US" sz="1400" b="1" kern="1200" dirty="0" smtClean="0"/>
-            <a:t>post-integration-test</a:t>
-          </a:r>
-          <a:endParaRPr lang="de-DE" sz="1400" b="1" kern="1200" dirty="0"/>
-        </a:p>
-      </dsp:txBody>
-      <dsp:txXfrm>
-        <a:off x="5454649" y="562235"/>
-        <a:ext cx="1128111" cy="752074"/>
-      </dsp:txXfrm>
-    </dsp:sp>
-    <dsp:sp modelId="{99F52057-642D-4027-97D5-D26EF2913281}">
-      <dsp:nvSpPr>
-        <dsp:cNvPr id="0" name=""/>
-        <dsp:cNvSpPr/>
-      </dsp:nvSpPr>
-      <dsp:spPr>
-        <a:xfrm>
-          <a:off x="6770779" y="562235"/>
-          <a:ext cx="1880185" cy="752074"/>
-        </a:xfrm>
-        <a:prstGeom prst="chevron">
-          <a:avLst/>
-        </a:prstGeom>
-        <a:solidFill>
-          <a:schemeClr val="tx2">
-            <a:lumMod val="75000"/>
-          </a:schemeClr>
-        </a:solidFill>
-        <a:ln w="12700" cap="flat" cmpd="sng" algn="ctr">
-          <a:solidFill>
-            <a:schemeClr val="lt1">
-              <a:hueOff val="0"/>
-              <a:satOff val="0"/>
-              <a:lumOff val="0"/>
-              <a:alphaOff val="0"/>
-            </a:schemeClr>
-          </a:solidFill>
-          <a:prstDash val="solid"/>
-          <a:miter lim="800000"/>
-        </a:ln>
-        <a:effectLst/>
-      </dsp:spPr>
-      <dsp:style>
-        <a:lnRef idx="2">
-          <a:scrgbClr r="0" g="0" b="0"/>
-        </a:lnRef>
-        <a:fillRef idx="1">
-          <a:scrgbClr r="0" g="0" b="0"/>
-        </a:fillRef>
-        <a:effectRef idx="0">
-          <a:scrgbClr r="0" g="0" b="0"/>
-        </a:effectRef>
-        <a:fontRef idx="minor">
-          <a:schemeClr val="lt1"/>
-        </a:fontRef>
-      </dsp:style>
-      <dsp:txBody>
-        <a:bodyPr spcFirstLastPara="0" vert="horz" wrap="square" lIns="56007" tIns="18669" rIns="18669" bIns="18669" numCol="1" spcCol="1270" anchor="ctr" anchorCtr="0">
-          <a:noAutofit/>
-        </a:bodyPr>
-        <a:lstStyle/>
-        <a:p>
-          <a:pPr lvl="0" algn="ctr" defTabSz="622300">
-            <a:lnSpc>
-              <a:spcPct val="90000"/>
-            </a:lnSpc>
-            <a:spcBef>
-              <a:spcPct val="0"/>
-            </a:spcBef>
-            <a:spcAft>
-              <a:spcPct val="35000"/>
-            </a:spcAft>
-          </a:pPr>
-          <a:r>
-            <a:rPr lang="en-US" sz="1400" b="1" kern="1200" dirty="0" smtClean="0"/>
-            <a:t>deploy</a:t>
-          </a:r>
-          <a:endParaRPr lang="de-DE" sz="1400" b="1" kern="1200" dirty="0"/>
-        </a:p>
-      </dsp:txBody>
-      <dsp:txXfrm>
-        <a:off x="7146816" y="562235"/>
-        <a:ext cx="1128111" cy="752074"/>
-      </dsp:txXfrm>
-    </dsp:sp>
   </dsp:spTree>
 </dsp:drawing>
 </file>
@@ -3048,7 +2702,7 @@
           <a:p>
             <a:fld id="{9AA7D095-A676-4F6B-9416-D65D798F5244}" type="datetimeFigureOut">
               <a:rPr lang="de-DE" smtClean="0"/>
-              <a:t>30.04.2015</a:t>
+              <a:t>07.05.2015</a:t>
             </a:fld>
             <a:endParaRPr lang="de-DE"/>
           </a:p>
@@ -3218,7 +2872,7 @@
           <a:p>
             <a:fld id="{9AA7D095-A676-4F6B-9416-D65D798F5244}" type="datetimeFigureOut">
               <a:rPr lang="de-DE" smtClean="0"/>
-              <a:t>30.04.2015</a:t>
+              <a:t>07.05.2015</a:t>
             </a:fld>
             <a:endParaRPr lang="de-DE"/>
           </a:p>
@@ -3398,7 +3052,7 @@
           <a:p>
             <a:fld id="{9AA7D095-A676-4F6B-9416-D65D798F5244}" type="datetimeFigureOut">
               <a:rPr lang="de-DE" smtClean="0"/>
-              <a:t>30.04.2015</a:t>
+              <a:t>07.05.2015</a:t>
             </a:fld>
             <a:endParaRPr lang="de-DE"/>
           </a:p>
@@ -3568,7 +3222,7 @@
           <a:p>
             <a:fld id="{9AA7D095-A676-4F6B-9416-D65D798F5244}" type="datetimeFigureOut">
               <a:rPr lang="de-DE" smtClean="0"/>
-              <a:t>30.04.2015</a:t>
+              <a:t>07.05.2015</a:t>
             </a:fld>
             <a:endParaRPr lang="de-DE"/>
           </a:p>
@@ -3814,7 +3468,7 @@
           <a:p>
             <a:fld id="{9AA7D095-A676-4F6B-9416-D65D798F5244}" type="datetimeFigureOut">
               <a:rPr lang="de-DE" smtClean="0"/>
-              <a:t>30.04.2015</a:t>
+              <a:t>07.05.2015</a:t>
             </a:fld>
             <a:endParaRPr lang="de-DE"/>
           </a:p>
@@ -4046,7 +3700,7 @@
           <a:p>
             <a:fld id="{9AA7D095-A676-4F6B-9416-D65D798F5244}" type="datetimeFigureOut">
               <a:rPr lang="de-DE" smtClean="0"/>
-              <a:t>30.04.2015</a:t>
+              <a:t>07.05.2015</a:t>
             </a:fld>
             <a:endParaRPr lang="de-DE"/>
           </a:p>
@@ -4413,7 +4067,7 @@
           <a:p>
             <a:fld id="{9AA7D095-A676-4F6B-9416-D65D798F5244}" type="datetimeFigureOut">
               <a:rPr lang="de-DE" smtClean="0"/>
-              <a:t>30.04.2015</a:t>
+              <a:t>07.05.2015</a:t>
             </a:fld>
             <a:endParaRPr lang="de-DE"/>
           </a:p>
@@ -4531,7 +4185,7 @@
           <a:p>
             <a:fld id="{9AA7D095-A676-4F6B-9416-D65D798F5244}" type="datetimeFigureOut">
               <a:rPr lang="de-DE" smtClean="0"/>
-              <a:t>30.04.2015</a:t>
+              <a:t>07.05.2015</a:t>
             </a:fld>
             <a:endParaRPr lang="de-DE"/>
           </a:p>
@@ -4626,7 +4280,7 @@
           <a:p>
             <a:fld id="{9AA7D095-A676-4F6B-9416-D65D798F5244}" type="datetimeFigureOut">
               <a:rPr lang="de-DE" smtClean="0"/>
-              <a:t>30.04.2015</a:t>
+              <a:t>07.05.2015</a:t>
             </a:fld>
             <a:endParaRPr lang="de-DE"/>
           </a:p>
@@ -4903,7 +4557,7 @@
           <a:p>
             <a:fld id="{9AA7D095-A676-4F6B-9416-D65D798F5244}" type="datetimeFigureOut">
               <a:rPr lang="de-DE" smtClean="0"/>
-              <a:t>30.04.2015</a:t>
+              <a:t>07.05.2015</a:t>
             </a:fld>
             <a:endParaRPr lang="de-DE"/>
           </a:p>
@@ -5160,7 +4814,7 @@
           <a:p>
             <a:fld id="{9AA7D095-A676-4F6B-9416-D65D798F5244}" type="datetimeFigureOut">
               <a:rPr lang="de-DE" smtClean="0"/>
-              <a:t>30.04.2015</a:t>
+              <a:t>07.05.2015</a:t>
             </a:fld>
             <a:endParaRPr lang="de-DE"/>
           </a:p>
@@ -5373,7 +5027,7 @@
           <a:p>
             <a:fld id="{9AA7D095-A676-4F6B-9416-D65D798F5244}" type="datetimeFigureOut">
               <a:rPr lang="de-DE" smtClean="0"/>
-              <a:t>30.04.2015</a:t>
+              <a:t>07.05.2015</a:t>
             </a:fld>
             <a:endParaRPr lang="de-DE"/>
           </a:p>
@@ -8120,6 +7774,893 @@
           <a:chExt cx="0" cy="0"/>
         </a:xfrm>
       </p:grpSpPr>
+      <p:pic>
+        <p:nvPicPr>
+          <p:cNvPr id="6" name="Picture 5"/>
+          <p:cNvPicPr>
+            <a:picLocks noChangeAspect="1"/>
+          </p:cNvPicPr>
+          <p:nvPr/>
+        </p:nvPicPr>
+        <p:blipFill>
+          <a:blip r:embed="rId2"/>
+          <a:stretch>
+            <a:fillRect/>
+          </a:stretch>
+        </p:blipFill>
+        <p:spPr>
+          <a:xfrm>
+            <a:off x="2172790" y="6575683"/>
+            <a:ext cx="1655807" cy="705924"/>
+          </a:xfrm>
+          <a:prstGeom prst="rect">
+            <a:avLst/>
+          </a:prstGeom>
+        </p:spPr>
+      </p:pic>
+      <p:pic>
+        <p:nvPicPr>
+          <p:cNvPr id="85" name="Picture 2" descr="https://a0.awsstatic.com/main/images/logos/aws_logo.png"/>
+          <p:cNvPicPr>
+            <a:picLocks noChangeAspect="1" noChangeArrowheads="1"/>
+          </p:cNvPicPr>
+          <p:nvPr/>
+        </p:nvPicPr>
+        <p:blipFill>
+          <a:blip r:embed="rId3">
+            <a:extLst>
+              <a:ext uri="{28A0092B-C50C-407E-A947-70E740481C1C}">
+                <a14:useLocalDpi xmlns:a14="http://schemas.microsoft.com/office/drawing/2010/main" val="0"/>
+              </a:ext>
+            </a:extLst>
+          </a:blip>
+          <a:srcRect/>
+          <a:stretch>
+            <a:fillRect/>
+          </a:stretch>
+        </p:blipFill>
+        <p:spPr bwMode="auto">
+          <a:xfrm>
+            <a:off x="8991486" y="6660368"/>
+            <a:ext cx="1466377" cy="553964"/>
+          </a:xfrm>
+          <a:prstGeom prst="rect">
+            <a:avLst/>
+          </a:prstGeom>
+          <a:noFill/>
+          <a:extLst>
+            <a:ext uri="{909E8E84-426E-40DD-AFC4-6F175D3DCCD1}">
+              <a14:hiddenFill xmlns:a14="http://schemas.microsoft.com/office/drawing/2010/main">
+                <a:solidFill>
+                  <a:srgbClr val="FFFFFF"/>
+                </a:solidFill>
+              </a14:hiddenFill>
+            </a:ext>
+          </a:extLst>
+        </p:spPr>
+      </p:pic>
+      <p:grpSp>
+        <p:nvGrpSpPr>
+          <p:cNvPr id="8" name="Group 7"/>
+          <p:cNvGrpSpPr/>
+          <p:nvPr/>
+        </p:nvGrpSpPr>
+        <p:grpSpPr>
+          <a:xfrm>
+            <a:off x="2081896" y="2097338"/>
+            <a:ext cx="1896954" cy="4439845"/>
+            <a:chOff x="2081896" y="2055296"/>
+            <a:chExt cx="1896954" cy="4439845"/>
+          </a:xfrm>
+        </p:grpSpPr>
+        <p:grpSp>
+          <p:nvGrpSpPr>
+            <p:cNvPr id="2" name="Group 1"/>
+            <p:cNvGrpSpPr/>
+            <p:nvPr/>
+          </p:nvGrpSpPr>
+          <p:grpSpPr>
+            <a:xfrm>
+              <a:off x="2081896" y="2709318"/>
+              <a:ext cx="1896954" cy="3785823"/>
+              <a:chOff x="2081896" y="2709318"/>
+              <a:chExt cx="1896954" cy="3785823"/>
+            </a:xfrm>
+          </p:grpSpPr>
+          <p:sp>
+            <p:nvSpPr>
+              <p:cNvPr id="73" name="Rounded Rectangle 72"/>
+              <p:cNvSpPr/>
+              <p:nvPr/>
+            </p:nvSpPr>
+            <p:spPr>
+              <a:xfrm>
+                <a:off x="2081896" y="2709318"/>
+                <a:ext cx="1896954" cy="3785823"/>
+              </a:xfrm>
+              <a:prstGeom prst="roundRect">
+                <a:avLst/>
+              </a:prstGeom>
+              <a:noFill/>
+              <a:ln w="57150">
+                <a:solidFill>
+                  <a:schemeClr val="bg1">
+                    <a:lumMod val="50000"/>
+                  </a:schemeClr>
+                </a:solidFill>
+                <a:prstDash val="dash"/>
+              </a:ln>
+            </p:spPr>
+            <p:style>
+              <a:lnRef idx="2">
+                <a:schemeClr val="accent1">
+                  <a:shade val="50000"/>
+                </a:schemeClr>
+              </a:lnRef>
+              <a:fillRef idx="1">
+                <a:schemeClr val="accent1"/>
+              </a:fillRef>
+              <a:effectRef idx="0">
+                <a:schemeClr val="accent1"/>
+              </a:effectRef>
+              <a:fontRef idx="minor">
+                <a:schemeClr val="lt1"/>
+              </a:fontRef>
+            </p:style>
+            <p:txBody>
+              <a:bodyPr rtlCol="0" anchor="ctr"/>
+              <a:lstStyle/>
+              <a:p>
+                <a:pPr algn="ctr"/>
+                <a:endParaRPr lang="de-DE"/>
+              </a:p>
+            </p:txBody>
+          </p:sp>
+          <p:sp>
+            <p:nvSpPr>
+              <p:cNvPr id="76" name="Rounded Rectangle 75"/>
+              <p:cNvSpPr/>
+              <p:nvPr/>
+            </p:nvSpPr>
+            <p:spPr>
+              <a:xfrm>
+                <a:off x="2321374" y="2949403"/>
+                <a:ext cx="1441656" cy="1514439"/>
+              </a:xfrm>
+              <a:prstGeom prst="rect">
+                <a:avLst/>
+              </a:prstGeom>
+              <a:solidFill>
+                <a:schemeClr val="accent2">
+                  <a:lumMod val="75000"/>
+                </a:schemeClr>
+              </a:solidFill>
+              <a:ln w="76200">
+                <a:solidFill>
+                  <a:schemeClr val="accent2">
+                    <a:lumMod val="50000"/>
+                  </a:schemeClr>
+                </a:solidFill>
+              </a:ln>
+            </p:spPr>
+            <p:style>
+              <a:lnRef idx="2">
+                <a:schemeClr val="accent1">
+                  <a:shade val="50000"/>
+                </a:schemeClr>
+              </a:lnRef>
+              <a:fillRef idx="1">
+                <a:schemeClr val="accent1"/>
+              </a:fillRef>
+              <a:effectRef idx="0">
+                <a:schemeClr val="accent1"/>
+              </a:effectRef>
+              <a:fontRef idx="minor">
+                <a:schemeClr val="lt1"/>
+              </a:fontRef>
+            </p:style>
+            <p:txBody>
+              <a:bodyPr rtlCol="0" anchor="ctr"/>
+              <a:lstStyle/>
+              <a:p>
+                <a:pPr algn="ctr"/>
+                <a:r>
+                  <a:rPr lang="en-US" sz="2000" b="1" dirty="0"/>
+                  <a:t>Instance</a:t>
+                </a:r>
+                <a:endParaRPr lang="de-DE" sz="2000" b="1" dirty="0"/>
+              </a:p>
+            </p:txBody>
+          </p:sp>
+          <p:sp>
+            <p:nvSpPr>
+              <p:cNvPr id="66" name="Rounded Rectangle 75"/>
+              <p:cNvSpPr/>
+              <p:nvPr/>
+            </p:nvSpPr>
+            <p:spPr>
+              <a:xfrm>
+                <a:off x="2316119" y="4709885"/>
+                <a:ext cx="1441656" cy="1514439"/>
+              </a:xfrm>
+              <a:prstGeom prst="rect">
+                <a:avLst/>
+              </a:prstGeom>
+              <a:solidFill>
+                <a:schemeClr val="accent2">
+                  <a:lumMod val="75000"/>
+                </a:schemeClr>
+              </a:solidFill>
+              <a:ln w="76200">
+                <a:solidFill>
+                  <a:schemeClr val="accent2">
+                    <a:lumMod val="50000"/>
+                  </a:schemeClr>
+                </a:solidFill>
+              </a:ln>
+            </p:spPr>
+            <p:style>
+              <a:lnRef idx="2">
+                <a:schemeClr val="accent1">
+                  <a:shade val="50000"/>
+                </a:schemeClr>
+              </a:lnRef>
+              <a:fillRef idx="1">
+                <a:schemeClr val="accent1"/>
+              </a:fillRef>
+              <a:effectRef idx="0">
+                <a:schemeClr val="accent1"/>
+              </a:effectRef>
+              <a:fontRef idx="minor">
+                <a:schemeClr val="lt1"/>
+              </a:fontRef>
+            </p:style>
+            <p:txBody>
+              <a:bodyPr rtlCol="0" anchor="ctr"/>
+              <a:lstStyle/>
+              <a:p>
+                <a:pPr algn="ctr"/>
+                <a:r>
+                  <a:rPr lang="en-US" sz="2000" b="1" dirty="0"/>
+                  <a:t>Instance</a:t>
+                </a:r>
+                <a:endParaRPr lang="de-DE" sz="2000" b="1" dirty="0"/>
+              </a:p>
+            </p:txBody>
+          </p:sp>
+        </p:grpSp>
+        <p:sp>
+          <p:nvSpPr>
+            <p:cNvPr id="67" name="TextBox 66"/>
+            <p:cNvSpPr txBox="1"/>
+            <p:nvPr/>
+          </p:nvSpPr>
+          <p:spPr>
+            <a:xfrm>
+              <a:off x="2333359" y="2055296"/>
+              <a:ext cx="1408522" cy="646331"/>
+            </a:xfrm>
+            <a:prstGeom prst="rect">
+              <a:avLst/>
+            </a:prstGeom>
+            <a:noFill/>
+          </p:spPr>
+          <p:txBody>
+            <a:bodyPr wrap="square" rtlCol="0">
+              <a:spAutoFit/>
+            </a:bodyPr>
+            <a:lstStyle/>
+            <a:p>
+              <a:pPr algn="ctr"/>
+              <a:r>
+                <a:rPr lang="en-US" sz="3600" b="1" dirty="0" smtClean="0"/>
+                <a:t>dev</a:t>
+              </a:r>
+              <a:endParaRPr lang="de-DE" sz="3600" b="1" dirty="0"/>
+            </a:p>
+          </p:txBody>
+        </p:sp>
+      </p:grpSp>
+      <p:grpSp>
+        <p:nvGrpSpPr>
+          <p:cNvPr id="92" name="Group 91"/>
+          <p:cNvGrpSpPr/>
+          <p:nvPr/>
+        </p:nvGrpSpPr>
+        <p:grpSpPr>
+          <a:xfrm>
+            <a:off x="5442578" y="2097338"/>
+            <a:ext cx="1896954" cy="4439845"/>
+            <a:chOff x="2081896" y="2055296"/>
+            <a:chExt cx="1896954" cy="4439845"/>
+          </a:xfrm>
+        </p:grpSpPr>
+        <p:grpSp>
+          <p:nvGrpSpPr>
+            <p:cNvPr id="94" name="Group 93"/>
+            <p:cNvGrpSpPr/>
+            <p:nvPr/>
+          </p:nvGrpSpPr>
+          <p:grpSpPr>
+            <a:xfrm>
+              <a:off x="2081896" y="2709318"/>
+              <a:ext cx="1896954" cy="3785823"/>
+              <a:chOff x="2081896" y="2709318"/>
+              <a:chExt cx="1896954" cy="3785823"/>
+            </a:xfrm>
+          </p:grpSpPr>
+          <p:sp>
+            <p:nvSpPr>
+              <p:cNvPr id="99" name="Rounded Rectangle 98"/>
+              <p:cNvSpPr/>
+              <p:nvPr/>
+            </p:nvSpPr>
+            <p:spPr>
+              <a:xfrm>
+                <a:off x="2081896" y="2709318"/>
+                <a:ext cx="1896954" cy="3785823"/>
+              </a:xfrm>
+              <a:prstGeom prst="roundRect">
+                <a:avLst/>
+              </a:prstGeom>
+              <a:noFill/>
+              <a:ln w="57150">
+                <a:solidFill>
+                  <a:schemeClr val="bg1">
+                    <a:lumMod val="50000"/>
+                  </a:schemeClr>
+                </a:solidFill>
+                <a:prstDash val="dash"/>
+              </a:ln>
+            </p:spPr>
+            <p:style>
+              <a:lnRef idx="2">
+                <a:schemeClr val="accent1">
+                  <a:shade val="50000"/>
+                </a:schemeClr>
+              </a:lnRef>
+              <a:fillRef idx="1">
+                <a:schemeClr val="accent1"/>
+              </a:fillRef>
+              <a:effectRef idx="0">
+                <a:schemeClr val="accent1"/>
+              </a:effectRef>
+              <a:fontRef idx="minor">
+                <a:schemeClr val="lt1"/>
+              </a:fontRef>
+            </p:style>
+            <p:txBody>
+              <a:bodyPr rtlCol="0" anchor="ctr"/>
+              <a:lstStyle/>
+              <a:p>
+                <a:pPr algn="ctr"/>
+                <a:endParaRPr lang="de-DE"/>
+              </a:p>
+            </p:txBody>
+          </p:sp>
+          <p:sp>
+            <p:nvSpPr>
+              <p:cNvPr id="100" name="Rounded Rectangle 75"/>
+              <p:cNvSpPr/>
+              <p:nvPr/>
+            </p:nvSpPr>
+            <p:spPr>
+              <a:xfrm>
+                <a:off x="2321374" y="2949403"/>
+                <a:ext cx="1441656" cy="1514439"/>
+              </a:xfrm>
+              <a:prstGeom prst="rect">
+                <a:avLst/>
+              </a:prstGeom>
+              <a:solidFill>
+                <a:schemeClr val="accent2">
+                  <a:lumMod val="75000"/>
+                </a:schemeClr>
+              </a:solidFill>
+              <a:ln w="76200">
+                <a:solidFill>
+                  <a:schemeClr val="accent2">
+                    <a:lumMod val="50000"/>
+                  </a:schemeClr>
+                </a:solidFill>
+              </a:ln>
+            </p:spPr>
+            <p:style>
+              <a:lnRef idx="2">
+                <a:schemeClr val="accent1">
+                  <a:shade val="50000"/>
+                </a:schemeClr>
+              </a:lnRef>
+              <a:fillRef idx="1">
+                <a:schemeClr val="accent1"/>
+              </a:fillRef>
+              <a:effectRef idx="0">
+                <a:schemeClr val="accent1"/>
+              </a:effectRef>
+              <a:fontRef idx="minor">
+                <a:schemeClr val="lt1"/>
+              </a:fontRef>
+            </p:style>
+            <p:txBody>
+              <a:bodyPr rtlCol="0" anchor="ctr"/>
+              <a:lstStyle/>
+              <a:p>
+                <a:pPr algn="ctr"/>
+                <a:r>
+                  <a:rPr lang="en-US" sz="2000" b="1" dirty="0"/>
+                  <a:t>Instance</a:t>
+                </a:r>
+                <a:endParaRPr lang="de-DE" sz="2000" b="1" dirty="0"/>
+              </a:p>
+            </p:txBody>
+          </p:sp>
+          <p:sp>
+            <p:nvSpPr>
+              <p:cNvPr id="101" name="Rounded Rectangle 75"/>
+              <p:cNvSpPr/>
+              <p:nvPr/>
+            </p:nvSpPr>
+            <p:spPr>
+              <a:xfrm>
+                <a:off x="2316119" y="4709885"/>
+                <a:ext cx="1441656" cy="1514439"/>
+              </a:xfrm>
+              <a:prstGeom prst="rect">
+                <a:avLst/>
+              </a:prstGeom>
+              <a:solidFill>
+                <a:schemeClr val="accent2">
+                  <a:lumMod val="75000"/>
+                </a:schemeClr>
+              </a:solidFill>
+              <a:ln w="76200">
+                <a:solidFill>
+                  <a:schemeClr val="accent2">
+                    <a:lumMod val="50000"/>
+                  </a:schemeClr>
+                </a:solidFill>
+              </a:ln>
+            </p:spPr>
+            <p:style>
+              <a:lnRef idx="2">
+                <a:schemeClr val="accent1">
+                  <a:shade val="50000"/>
+                </a:schemeClr>
+              </a:lnRef>
+              <a:fillRef idx="1">
+                <a:schemeClr val="accent1"/>
+              </a:fillRef>
+              <a:effectRef idx="0">
+                <a:schemeClr val="accent1"/>
+              </a:effectRef>
+              <a:fontRef idx="minor">
+                <a:schemeClr val="lt1"/>
+              </a:fontRef>
+            </p:style>
+            <p:txBody>
+              <a:bodyPr rtlCol="0" anchor="ctr"/>
+              <a:lstStyle/>
+              <a:p>
+                <a:pPr algn="ctr"/>
+                <a:r>
+                  <a:rPr lang="en-US" sz="2000" b="1" dirty="0"/>
+                  <a:t>Instance</a:t>
+                </a:r>
+                <a:endParaRPr lang="de-DE" sz="2000" b="1" dirty="0"/>
+              </a:p>
+            </p:txBody>
+          </p:sp>
+        </p:grpSp>
+        <p:sp>
+          <p:nvSpPr>
+            <p:cNvPr id="98" name="TextBox 97"/>
+            <p:cNvSpPr txBox="1"/>
+            <p:nvPr/>
+          </p:nvSpPr>
+          <p:spPr>
+            <a:xfrm>
+              <a:off x="2333359" y="2055296"/>
+              <a:ext cx="1408522" cy="646331"/>
+            </a:xfrm>
+            <a:prstGeom prst="rect">
+              <a:avLst/>
+            </a:prstGeom>
+            <a:noFill/>
+          </p:spPr>
+          <p:txBody>
+            <a:bodyPr wrap="square" rtlCol="0">
+              <a:spAutoFit/>
+            </a:bodyPr>
+            <a:lstStyle/>
+            <a:p>
+              <a:pPr algn="ctr"/>
+              <a:r>
+                <a:rPr lang="en-US" sz="3600" b="1" dirty="0" smtClean="0"/>
+                <a:t>test</a:t>
+              </a:r>
+              <a:endParaRPr lang="de-DE" sz="3600" b="1" dirty="0"/>
+            </a:p>
+          </p:txBody>
+        </p:sp>
+      </p:grpSp>
+      <p:grpSp>
+        <p:nvGrpSpPr>
+          <p:cNvPr id="102" name="Group 101"/>
+          <p:cNvGrpSpPr/>
+          <p:nvPr/>
+        </p:nvGrpSpPr>
+        <p:grpSpPr>
+          <a:xfrm>
+            <a:off x="8803261" y="2097338"/>
+            <a:ext cx="1896954" cy="4439845"/>
+            <a:chOff x="2081896" y="2055296"/>
+            <a:chExt cx="1896954" cy="4439845"/>
+          </a:xfrm>
+        </p:grpSpPr>
+        <p:grpSp>
+          <p:nvGrpSpPr>
+            <p:cNvPr id="103" name="Group 102"/>
+            <p:cNvGrpSpPr/>
+            <p:nvPr/>
+          </p:nvGrpSpPr>
+          <p:grpSpPr>
+            <a:xfrm>
+              <a:off x="2081896" y="2709318"/>
+              <a:ext cx="1896954" cy="3785823"/>
+              <a:chOff x="2081896" y="2709318"/>
+              <a:chExt cx="1896954" cy="3785823"/>
+            </a:xfrm>
+          </p:grpSpPr>
+          <p:sp>
+            <p:nvSpPr>
+              <p:cNvPr id="105" name="Rounded Rectangle 104"/>
+              <p:cNvSpPr/>
+              <p:nvPr/>
+            </p:nvSpPr>
+            <p:spPr>
+              <a:xfrm>
+                <a:off x="2081896" y="2709318"/>
+                <a:ext cx="1896954" cy="3785823"/>
+              </a:xfrm>
+              <a:prstGeom prst="roundRect">
+                <a:avLst/>
+              </a:prstGeom>
+              <a:noFill/>
+              <a:ln w="57150">
+                <a:solidFill>
+                  <a:schemeClr val="bg1">
+                    <a:lumMod val="50000"/>
+                  </a:schemeClr>
+                </a:solidFill>
+                <a:prstDash val="dash"/>
+              </a:ln>
+            </p:spPr>
+            <p:style>
+              <a:lnRef idx="2">
+                <a:schemeClr val="accent1">
+                  <a:shade val="50000"/>
+                </a:schemeClr>
+              </a:lnRef>
+              <a:fillRef idx="1">
+                <a:schemeClr val="accent1"/>
+              </a:fillRef>
+              <a:effectRef idx="0">
+                <a:schemeClr val="accent1"/>
+              </a:effectRef>
+              <a:fontRef idx="minor">
+                <a:schemeClr val="lt1"/>
+              </a:fontRef>
+            </p:style>
+            <p:txBody>
+              <a:bodyPr rtlCol="0" anchor="ctr"/>
+              <a:lstStyle/>
+              <a:p>
+                <a:pPr algn="ctr"/>
+                <a:endParaRPr lang="de-DE"/>
+              </a:p>
+            </p:txBody>
+          </p:sp>
+          <p:sp>
+            <p:nvSpPr>
+              <p:cNvPr id="106" name="Rounded Rectangle 75"/>
+              <p:cNvSpPr/>
+              <p:nvPr/>
+            </p:nvSpPr>
+            <p:spPr>
+              <a:xfrm>
+                <a:off x="2321374" y="2949403"/>
+                <a:ext cx="1441656" cy="1514439"/>
+              </a:xfrm>
+              <a:prstGeom prst="rect">
+                <a:avLst/>
+              </a:prstGeom>
+              <a:solidFill>
+                <a:schemeClr val="accent2">
+                  <a:lumMod val="75000"/>
+                </a:schemeClr>
+              </a:solidFill>
+              <a:ln w="76200">
+                <a:solidFill>
+                  <a:schemeClr val="accent2">
+                    <a:lumMod val="50000"/>
+                  </a:schemeClr>
+                </a:solidFill>
+              </a:ln>
+            </p:spPr>
+            <p:style>
+              <a:lnRef idx="2">
+                <a:schemeClr val="accent1">
+                  <a:shade val="50000"/>
+                </a:schemeClr>
+              </a:lnRef>
+              <a:fillRef idx="1">
+                <a:schemeClr val="accent1"/>
+              </a:fillRef>
+              <a:effectRef idx="0">
+                <a:schemeClr val="accent1"/>
+              </a:effectRef>
+              <a:fontRef idx="minor">
+                <a:schemeClr val="lt1"/>
+              </a:fontRef>
+            </p:style>
+            <p:txBody>
+              <a:bodyPr rtlCol="0" anchor="ctr"/>
+              <a:lstStyle/>
+              <a:p>
+                <a:pPr algn="ctr"/>
+                <a:r>
+                  <a:rPr lang="en-US" sz="2000" b="1" dirty="0"/>
+                  <a:t>Instance</a:t>
+                </a:r>
+                <a:endParaRPr lang="de-DE" sz="2000" b="1" dirty="0"/>
+              </a:p>
+            </p:txBody>
+          </p:sp>
+          <p:sp>
+            <p:nvSpPr>
+              <p:cNvPr id="107" name="Rounded Rectangle 75"/>
+              <p:cNvSpPr/>
+              <p:nvPr/>
+            </p:nvSpPr>
+            <p:spPr>
+              <a:xfrm>
+                <a:off x="2316119" y="4709885"/>
+                <a:ext cx="1441656" cy="1514439"/>
+              </a:xfrm>
+              <a:prstGeom prst="rect">
+                <a:avLst/>
+              </a:prstGeom>
+              <a:solidFill>
+                <a:schemeClr val="accent2">
+                  <a:lumMod val="75000"/>
+                </a:schemeClr>
+              </a:solidFill>
+              <a:ln w="76200">
+                <a:solidFill>
+                  <a:schemeClr val="accent2">
+                    <a:lumMod val="50000"/>
+                  </a:schemeClr>
+                </a:solidFill>
+              </a:ln>
+            </p:spPr>
+            <p:style>
+              <a:lnRef idx="2">
+                <a:schemeClr val="accent1">
+                  <a:shade val="50000"/>
+                </a:schemeClr>
+              </a:lnRef>
+              <a:fillRef idx="1">
+                <a:schemeClr val="accent1"/>
+              </a:fillRef>
+              <a:effectRef idx="0">
+                <a:schemeClr val="accent1"/>
+              </a:effectRef>
+              <a:fontRef idx="minor">
+                <a:schemeClr val="lt1"/>
+              </a:fontRef>
+            </p:style>
+            <p:txBody>
+              <a:bodyPr rtlCol="0" anchor="ctr"/>
+              <a:lstStyle/>
+              <a:p>
+                <a:pPr algn="ctr"/>
+                <a:r>
+                  <a:rPr lang="en-US" sz="2000" b="1" dirty="0"/>
+                  <a:t>Instance</a:t>
+                </a:r>
+                <a:endParaRPr lang="de-DE" sz="2000" b="1" dirty="0"/>
+              </a:p>
+            </p:txBody>
+          </p:sp>
+        </p:grpSp>
+        <p:sp>
+          <p:nvSpPr>
+            <p:cNvPr id="104" name="TextBox 103"/>
+            <p:cNvSpPr txBox="1"/>
+            <p:nvPr/>
+          </p:nvSpPr>
+          <p:spPr>
+            <a:xfrm>
+              <a:off x="2333359" y="2055296"/>
+              <a:ext cx="1408522" cy="646331"/>
+            </a:xfrm>
+            <a:prstGeom prst="rect">
+              <a:avLst/>
+            </a:prstGeom>
+            <a:noFill/>
+          </p:spPr>
+          <p:txBody>
+            <a:bodyPr wrap="square" rtlCol="0">
+              <a:spAutoFit/>
+            </a:bodyPr>
+            <a:lstStyle/>
+            <a:p>
+              <a:pPr algn="ctr"/>
+              <a:r>
+                <a:rPr lang="en-US" sz="3600" b="1" dirty="0" smtClean="0"/>
+                <a:t>prod</a:t>
+              </a:r>
+              <a:endParaRPr lang="de-DE" sz="3600" b="1" dirty="0"/>
+            </a:p>
+          </p:txBody>
+        </p:sp>
+      </p:grpSp>
+      <p:pic>
+        <p:nvPicPr>
+          <p:cNvPr id="108" name="Picture 2" descr="https://a0.awsstatic.com/main/images/logos/aws_logo.png"/>
+          <p:cNvPicPr>
+            <a:picLocks noChangeAspect="1" noChangeArrowheads="1"/>
+          </p:cNvPicPr>
+          <p:nvPr/>
+        </p:nvPicPr>
+        <p:blipFill>
+          <a:blip r:embed="rId3">
+            <a:extLst>
+              <a:ext uri="{28A0092B-C50C-407E-A947-70E740481C1C}">
+                <a14:useLocalDpi xmlns:a14="http://schemas.microsoft.com/office/drawing/2010/main" val="0"/>
+              </a:ext>
+            </a:extLst>
+          </a:blip>
+          <a:srcRect/>
+          <a:stretch>
+            <a:fillRect/>
+          </a:stretch>
+        </p:blipFill>
+        <p:spPr bwMode="auto">
+          <a:xfrm>
+            <a:off x="5643941" y="6655113"/>
+            <a:ext cx="1466377" cy="553964"/>
+          </a:xfrm>
+          <a:prstGeom prst="rect">
+            <a:avLst/>
+          </a:prstGeom>
+          <a:noFill/>
+          <a:extLst>
+            <a:ext uri="{909E8E84-426E-40DD-AFC4-6F175D3DCCD1}">
+              <a14:hiddenFill xmlns:a14="http://schemas.microsoft.com/office/drawing/2010/main">
+                <a:solidFill>
+                  <a:srgbClr val="FFFFFF"/>
+                </a:solidFill>
+              </a14:hiddenFill>
+            </a:ext>
+          </a:extLst>
+        </p:spPr>
+      </p:pic>
+      <p:cxnSp>
+        <p:nvCxnSpPr>
+          <p:cNvPr id="110" name="Straight Arrow Connector 109"/>
+          <p:cNvCxnSpPr/>
+          <p:nvPr/>
+        </p:nvCxnSpPr>
+        <p:spPr>
+          <a:xfrm flipV="1">
+            <a:off x="4146331" y="4630813"/>
+            <a:ext cx="1128120" cy="8626"/>
+          </a:xfrm>
+          <a:prstGeom prst="straightConnector1">
+            <a:avLst/>
+          </a:prstGeom>
+          <a:ln w="142875">
+            <a:solidFill>
+              <a:schemeClr val="tx1">
+                <a:lumMod val="50000"/>
+                <a:lumOff val="50000"/>
+              </a:schemeClr>
+            </a:solidFill>
+            <a:tailEnd type="triangle"/>
+          </a:ln>
+        </p:spPr>
+        <p:style>
+          <a:lnRef idx="1">
+            <a:schemeClr val="accent1"/>
+          </a:lnRef>
+          <a:fillRef idx="0">
+            <a:schemeClr val="accent1"/>
+          </a:fillRef>
+          <a:effectRef idx="0">
+            <a:schemeClr val="accent1"/>
+          </a:effectRef>
+          <a:fontRef idx="minor">
+            <a:schemeClr val="tx1"/>
+          </a:fontRef>
+        </p:style>
+      </p:cxnSp>
+      <p:cxnSp>
+        <p:nvCxnSpPr>
+          <p:cNvPr id="112" name="Straight Arrow Connector 111"/>
+          <p:cNvCxnSpPr/>
+          <p:nvPr/>
+        </p:nvCxnSpPr>
+        <p:spPr>
+          <a:xfrm flipV="1">
+            <a:off x="7499131" y="4630813"/>
+            <a:ext cx="1128120" cy="8626"/>
+          </a:xfrm>
+          <a:prstGeom prst="straightConnector1">
+            <a:avLst/>
+          </a:prstGeom>
+          <a:ln w="142875">
+            <a:solidFill>
+              <a:schemeClr val="tx1">
+                <a:lumMod val="50000"/>
+                <a:lumOff val="50000"/>
+              </a:schemeClr>
+            </a:solidFill>
+            <a:tailEnd type="triangle"/>
+          </a:ln>
+        </p:spPr>
+        <p:style>
+          <a:lnRef idx="1">
+            <a:schemeClr val="accent1"/>
+          </a:lnRef>
+          <a:fillRef idx="0">
+            <a:schemeClr val="accent1"/>
+          </a:fillRef>
+          <a:effectRef idx="0">
+            <a:schemeClr val="accent1"/>
+          </a:effectRef>
+          <a:fontRef idx="minor">
+            <a:schemeClr val="tx1"/>
+          </a:fontRef>
+        </p:style>
+      </p:cxnSp>
+    </p:spTree>
+    <p:extLst>
+      <p:ext uri="{BB962C8B-B14F-4D97-AF65-F5344CB8AC3E}">
+        <p14:creationId xmlns:p14="http://schemas.microsoft.com/office/powerpoint/2010/main" val="3547680725"/>
+      </p:ext>
+    </p:extLst>
+  </p:cSld>
+  <p:clrMapOvr>
+    <a:masterClrMapping/>
+  </p:clrMapOvr>
+  <p:timing>
+    <p:tnLst>
+      <p:par>
+        <p:cTn id="1" dur="indefinite" restart="never" nodeType="tmRoot"/>
+      </p:par>
+    </p:tnLst>
+  </p:timing>
+</p:sld>
+</file>
+
+<file path=ppt/slides/slide12.xml><?xml version="1.0" encoding="utf-8"?>
+<p:sld xmlns:a="http://schemas.openxmlformats.org/drawingml/2006/main" xmlns:r="http://schemas.openxmlformats.org/officeDocument/2006/relationships" xmlns:p="http://schemas.openxmlformats.org/presentationml/2006/main">
+  <p:cSld>
+    <p:spTree>
+      <p:nvGrpSpPr>
+        <p:cNvPr id="1" name=""/>
+        <p:cNvGrpSpPr/>
+        <p:nvPr/>
+      </p:nvGrpSpPr>
+      <p:grpSpPr>
+        <a:xfrm>
+          <a:off x="0" y="0"/>
+          <a:ext cx="0" cy="0"/>
+          <a:chOff x="0" y="0"/>
+          <a:chExt cx="0" cy="0"/>
+        </a:xfrm>
+      </p:grpSpPr>
       <p:sp>
         <p:nvSpPr>
           <p:cNvPr id="62" name="Rounded Rectangle 25"/>
@@ -9188,7 +9729,7 @@
 </p:sld>
 </file>
 
-<file path=ppt/slides/slide12.xml><?xml version="1.0" encoding="utf-8"?>
+<file path=ppt/slides/slide13.xml><?xml version="1.0" encoding="utf-8"?>
 <p:sld xmlns:a="http://schemas.openxmlformats.org/drawingml/2006/main" xmlns:r="http://schemas.openxmlformats.org/officeDocument/2006/relationships" xmlns:p="http://schemas.openxmlformats.org/presentationml/2006/main">
   <p:cSld>
     <p:spTree>
@@ -9975,7 +10516,7 @@
 </p:sld>
 </file>
 
-<file path=ppt/slides/slide13.xml><?xml version="1.0" encoding="utf-8"?>
+<file path=ppt/slides/slide14.xml><?xml version="1.0" encoding="utf-8"?>
 <p:sld xmlns:a="http://schemas.openxmlformats.org/drawingml/2006/main" xmlns:r="http://schemas.openxmlformats.org/officeDocument/2006/relationships" xmlns:p="http://schemas.openxmlformats.org/presentationml/2006/main">
   <p:cSld>
     <p:spTree>
@@ -10495,7 +11036,7 @@
 </p:sld>
 </file>
 
-<file path=ppt/slides/slide14.xml><?xml version="1.0" encoding="utf-8"?>
+<file path=ppt/slides/slide15.xml><?xml version="1.0" encoding="utf-8"?>
 <p:sld xmlns:a="http://schemas.openxmlformats.org/drawingml/2006/main" xmlns:r="http://schemas.openxmlformats.org/officeDocument/2006/relationships" xmlns:p="http://schemas.openxmlformats.org/presentationml/2006/main">
   <p:cSld>
     <p:spTree>
@@ -11342,7 +11883,7 @@
 </p:sld>
 </file>
 
-<file path=ppt/slides/slide15.xml><?xml version="1.0" encoding="utf-8"?>
+<file path=ppt/slides/slide16.xml><?xml version="1.0" encoding="utf-8"?>
 <p:sld xmlns:a="http://schemas.openxmlformats.org/drawingml/2006/main" xmlns:r="http://schemas.openxmlformats.org/officeDocument/2006/relationships" xmlns:p="http://schemas.openxmlformats.org/presentationml/2006/main">
   <p:cSld>
     <p:spTree>
@@ -12288,7 +12829,7 @@
 </p:sld>
 </file>
 
-<file path=ppt/slides/slide16.xml><?xml version="1.0" encoding="utf-8"?>
+<file path=ppt/slides/slide17.xml><?xml version="1.0" encoding="utf-8"?>
 <p:sld xmlns:a="http://schemas.openxmlformats.org/drawingml/2006/main" xmlns:r="http://schemas.openxmlformats.org/officeDocument/2006/relationships" xmlns:p="http://schemas.openxmlformats.org/presentationml/2006/main">
   <p:cSld>
     <p:spTree>
@@ -12783,7 +13324,7 @@
 </p:sld>
 </file>
 
-<file path=ppt/slides/slide17.xml><?xml version="1.0" encoding="utf-8"?>
+<file path=ppt/slides/slide18.xml><?xml version="1.0" encoding="utf-8"?>
 <p:sld xmlns:a="http://schemas.openxmlformats.org/drawingml/2006/main" xmlns:r="http://schemas.openxmlformats.org/officeDocument/2006/relationships" xmlns:p="http://schemas.openxmlformats.org/presentationml/2006/main">
   <p:cSld>
     <p:spTree>

</xml_diff>

<commit_message>
Added Dropwizard part 3 blog
</commit_message>
<xml_diff>
--- a/_sources/GettingStarted.pptx
+++ b/_sources/GettingStarted.pptx
@@ -1250,6 +1250,381 @@
       <dsp:cNvGrpSpPr/>
     </dsp:nvGrpSpPr>
     <dsp:grpSpPr/>
+    <dsp:sp modelId="{6D72C3A5-1474-40AD-9A10-2534C79C4517}">
+      <dsp:nvSpPr>
+        <dsp:cNvPr id="0" name=""/>
+        <dsp:cNvSpPr/>
+      </dsp:nvSpPr>
+      <dsp:spPr>
+        <a:xfrm>
+          <a:off x="2112" y="562235"/>
+          <a:ext cx="1880185" cy="752074"/>
+        </a:xfrm>
+        <a:prstGeom prst="chevron">
+          <a:avLst/>
+        </a:prstGeom>
+        <a:solidFill>
+          <a:schemeClr val="tx2">
+            <a:lumMod val="75000"/>
+          </a:schemeClr>
+        </a:solidFill>
+        <a:ln w="12700" cap="flat" cmpd="sng" algn="ctr">
+          <a:solidFill>
+            <a:schemeClr val="lt1">
+              <a:hueOff val="0"/>
+              <a:satOff val="0"/>
+              <a:lumOff val="0"/>
+              <a:alphaOff val="0"/>
+            </a:schemeClr>
+          </a:solidFill>
+          <a:prstDash val="solid"/>
+          <a:miter lim="800000"/>
+        </a:ln>
+        <a:effectLst/>
+      </dsp:spPr>
+      <dsp:style>
+        <a:lnRef idx="2">
+          <a:scrgbClr r="0" g="0" b="0"/>
+        </a:lnRef>
+        <a:fillRef idx="1">
+          <a:scrgbClr r="0" g="0" b="0"/>
+        </a:fillRef>
+        <a:effectRef idx="0">
+          <a:scrgbClr r="0" g="0" b="0"/>
+        </a:effectRef>
+        <a:fontRef idx="minor">
+          <a:schemeClr val="lt1"/>
+        </a:fontRef>
+      </dsp:style>
+      <dsp:txBody>
+        <a:bodyPr spcFirstLastPara="0" vert="horz" wrap="square" lIns="56007" tIns="18669" rIns="18669" bIns="18669" numCol="1" spcCol="1270" anchor="ctr" anchorCtr="0">
+          <a:noAutofit/>
+        </a:bodyPr>
+        <a:lstStyle/>
+        <a:p>
+          <a:pPr lvl="0" algn="ctr" defTabSz="622300">
+            <a:lnSpc>
+              <a:spcPct val="90000"/>
+            </a:lnSpc>
+            <a:spcBef>
+              <a:spcPct val="0"/>
+            </a:spcBef>
+            <a:spcAft>
+              <a:spcPct val="35000"/>
+            </a:spcAft>
+          </a:pPr>
+          <a:r>
+            <a:rPr lang="en-US" sz="1400" b="1" kern="1200" dirty="0" smtClean="0"/>
+            <a:t>package</a:t>
+          </a:r>
+          <a:endParaRPr lang="de-DE" sz="1400" b="1" kern="1200" dirty="0"/>
+        </a:p>
+      </dsp:txBody>
+      <dsp:txXfrm>
+        <a:off x="378149" y="562235"/>
+        <a:ext cx="1128111" cy="752074"/>
+      </dsp:txXfrm>
+    </dsp:sp>
+    <dsp:sp modelId="{086EE9E9-692A-4D05-A349-CBDF03FDA677}">
+      <dsp:nvSpPr>
+        <dsp:cNvPr id="0" name=""/>
+        <dsp:cNvSpPr/>
+      </dsp:nvSpPr>
+      <dsp:spPr>
+        <a:xfrm>
+          <a:off x="1694279" y="562235"/>
+          <a:ext cx="1880185" cy="752074"/>
+        </a:xfrm>
+        <a:prstGeom prst="chevron">
+          <a:avLst/>
+        </a:prstGeom>
+        <a:solidFill>
+          <a:schemeClr val="tx2">
+            <a:lumMod val="75000"/>
+          </a:schemeClr>
+        </a:solidFill>
+        <a:ln w="12700" cap="flat" cmpd="sng" algn="ctr">
+          <a:solidFill>
+            <a:schemeClr val="lt1">
+              <a:hueOff val="0"/>
+              <a:satOff val="0"/>
+              <a:lumOff val="0"/>
+              <a:alphaOff val="0"/>
+            </a:schemeClr>
+          </a:solidFill>
+          <a:prstDash val="solid"/>
+          <a:miter lim="800000"/>
+        </a:ln>
+        <a:effectLst/>
+      </dsp:spPr>
+      <dsp:style>
+        <a:lnRef idx="2">
+          <a:scrgbClr r="0" g="0" b="0"/>
+        </a:lnRef>
+        <a:fillRef idx="1">
+          <a:scrgbClr r="0" g="0" b="0"/>
+        </a:fillRef>
+        <a:effectRef idx="0">
+          <a:scrgbClr r="0" g="0" b="0"/>
+        </a:effectRef>
+        <a:fontRef idx="minor">
+          <a:schemeClr val="lt1"/>
+        </a:fontRef>
+      </dsp:style>
+      <dsp:txBody>
+        <a:bodyPr spcFirstLastPara="0" vert="horz" wrap="square" lIns="56007" tIns="18669" rIns="18669" bIns="18669" numCol="1" spcCol="1270" anchor="ctr" anchorCtr="0">
+          <a:noAutofit/>
+        </a:bodyPr>
+        <a:lstStyle/>
+        <a:p>
+          <a:pPr lvl="0" algn="ctr" defTabSz="622300">
+            <a:lnSpc>
+              <a:spcPct val="90000"/>
+            </a:lnSpc>
+            <a:spcBef>
+              <a:spcPct val="0"/>
+            </a:spcBef>
+            <a:spcAft>
+              <a:spcPct val="35000"/>
+            </a:spcAft>
+          </a:pPr>
+          <a:r>
+            <a:rPr lang="en-US" sz="1400" b="1" kern="1200" dirty="0" smtClean="0"/>
+            <a:t>pre-integration-test</a:t>
+          </a:r>
+          <a:endParaRPr lang="de-DE" sz="1400" b="1" kern="1200" dirty="0"/>
+        </a:p>
+      </dsp:txBody>
+      <dsp:txXfrm>
+        <a:off x="2070316" y="562235"/>
+        <a:ext cx="1128111" cy="752074"/>
+      </dsp:txXfrm>
+    </dsp:sp>
+    <dsp:sp modelId="{17AF3B93-FA57-409F-9FAF-CA14FC2BCCDA}">
+      <dsp:nvSpPr>
+        <dsp:cNvPr id="0" name=""/>
+        <dsp:cNvSpPr/>
+      </dsp:nvSpPr>
+      <dsp:spPr>
+        <a:xfrm>
+          <a:off x="3386445" y="562235"/>
+          <a:ext cx="1880185" cy="752074"/>
+        </a:xfrm>
+        <a:prstGeom prst="chevron">
+          <a:avLst/>
+        </a:prstGeom>
+        <a:solidFill>
+          <a:schemeClr val="tx2">
+            <a:lumMod val="75000"/>
+          </a:schemeClr>
+        </a:solidFill>
+        <a:ln w="12700" cap="flat" cmpd="sng" algn="ctr">
+          <a:solidFill>
+            <a:schemeClr val="lt1">
+              <a:hueOff val="0"/>
+              <a:satOff val="0"/>
+              <a:lumOff val="0"/>
+              <a:alphaOff val="0"/>
+            </a:schemeClr>
+          </a:solidFill>
+          <a:prstDash val="solid"/>
+          <a:miter lim="800000"/>
+        </a:ln>
+        <a:effectLst/>
+      </dsp:spPr>
+      <dsp:style>
+        <a:lnRef idx="2">
+          <a:scrgbClr r="0" g="0" b="0"/>
+        </a:lnRef>
+        <a:fillRef idx="1">
+          <a:scrgbClr r="0" g="0" b="0"/>
+        </a:fillRef>
+        <a:effectRef idx="0">
+          <a:scrgbClr r="0" g="0" b="0"/>
+        </a:effectRef>
+        <a:fontRef idx="minor">
+          <a:schemeClr val="lt1"/>
+        </a:fontRef>
+      </dsp:style>
+      <dsp:txBody>
+        <a:bodyPr spcFirstLastPara="0" vert="horz" wrap="square" lIns="56007" tIns="18669" rIns="18669" bIns="18669" numCol="1" spcCol="1270" anchor="ctr" anchorCtr="0">
+          <a:noAutofit/>
+        </a:bodyPr>
+        <a:lstStyle/>
+        <a:p>
+          <a:pPr lvl="0" algn="ctr" defTabSz="622300">
+            <a:lnSpc>
+              <a:spcPct val="90000"/>
+            </a:lnSpc>
+            <a:spcBef>
+              <a:spcPct val="0"/>
+            </a:spcBef>
+            <a:spcAft>
+              <a:spcPct val="35000"/>
+            </a:spcAft>
+          </a:pPr>
+          <a:r>
+            <a:rPr lang="en-US" sz="1400" b="1" kern="1200" dirty="0" smtClean="0"/>
+            <a:t>integration-test</a:t>
+          </a:r>
+          <a:endParaRPr lang="de-DE" sz="1400" b="1" kern="1200" dirty="0"/>
+        </a:p>
+      </dsp:txBody>
+      <dsp:txXfrm>
+        <a:off x="3762482" y="562235"/>
+        <a:ext cx="1128111" cy="752074"/>
+      </dsp:txXfrm>
+    </dsp:sp>
+    <dsp:sp modelId="{DEAC2976-8EFE-4204-9FE4-0A0AE01A3B2B}">
+      <dsp:nvSpPr>
+        <dsp:cNvPr id="0" name=""/>
+        <dsp:cNvSpPr/>
+      </dsp:nvSpPr>
+      <dsp:spPr>
+        <a:xfrm>
+          <a:off x="5078612" y="562235"/>
+          <a:ext cx="1880185" cy="752074"/>
+        </a:xfrm>
+        <a:prstGeom prst="chevron">
+          <a:avLst/>
+        </a:prstGeom>
+        <a:solidFill>
+          <a:schemeClr val="tx2">
+            <a:lumMod val="75000"/>
+          </a:schemeClr>
+        </a:solidFill>
+        <a:ln w="12700" cap="flat" cmpd="sng" algn="ctr">
+          <a:solidFill>
+            <a:schemeClr val="lt1">
+              <a:hueOff val="0"/>
+              <a:satOff val="0"/>
+              <a:lumOff val="0"/>
+              <a:alphaOff val="0"/>
+            </a:schemeClr>
+          </a:solidFill>
+          <a:prstDash val="solid"/>
+          <a:miter lim="800000"/>
+        </a:ln>
+        <a:effectLst/>
+      </dsp:spPr>
+      <dsp:style>
+        <a:lnRef idx="2">
+          <a:scrgbClr r="0" g="0" b="0"/>
+        </a:lnRef>
+        <a:fillRef idx="1">
+          <a:scrgbClr r="0" g="0" b="0"/>
+        </a:fillRef>
+        <a:effectRef idx="0">
+          <a:scrgbClr r="0" g="0" b="0"/>
+        </a:effectRef>
+        <a:fontRef idx="minor">
+          <a:schemeClr val="lt1"/>
+        </a:fontRef>
+      </dsp:style>
+      <dsp:txBody>
+        <a:bodyPr spcFirstLastPara="0" vert="horz" wrap="square" lIns="56007" tIns="18669" rIns="18669" bIns="18669" numCol="1" spcCol="1270" anchor="ctr" anchorCtr="0">
+          <a:noAutofit/>
+        </a:bodyPr>
+        <a:lstStyle/>
+        <a:p>
+          <a:pPr lvl="0" algn="ctr" defTabSz="622300">
+            <a:lnSpc>
+              <a:spcPct val="90000"/>
+            </a:lnSpc>
+            <a:spcBef>
+              <a:spcPct val="0"/>
+            </a:spcBef>
+            <a:spcAft>
+              <a:spcPct val="35000"/>
+            </a:spcAft>
+          </a:pPr>
+          <a:r>
+            <a:rPr lang="en-US" sz="1400" b="1" kern="1200" dirty="0" smtClean="0"/>
+            <a:t>post-integration-test</a:t>
+          </a:r>
+          <a:endParaRPr lang="de-DE" sz="1400" b="1" kern="1200" dirty="0"/>
+        </a:p>
+      </dsp:txBody>
+      <dsp:txXfrm>
+        <a:off x="5454649" y="562235"/>
+        <a:ext cx="1128111" cy="752074"/>
+      </dsp:txXfrm>
+    </dsp:sp>
+    <dsp:sp modelId="{99F52057-642D-4027-97D5-D26EF2913281}">
+      <dsp:nvSpPr>
+        <dsp:cNvPr id="0" name=""/>
+        <dsp:cNvSpPr/>
+      </dsp:nvSpPr>
+      <dsp:spPr>
+        <a:xfrm>
+          <a:off x="6770779" y="562235"/>
+          <a:ext cx="1880185" cy="752074"/>
+        </a:xfrm>
+        <a:prstGeom prst="chevron">
+          <a:avLst/>
+        </a:prstGeom>
+        <a:solidFill>
+          <a:schemeClr val="tx2">
+            <a:lumMod val="75000"/>
+          </a:schemeClr>
+        </a:solidFill>
+        <a:ln w="12700" cap="flat" cmpd="sng" algn="ctr">
+          <a:solidFill>
+            <a:schemeClr val="lt1">
+              <a:hueOff val="0"/>
+              <a:satOff val="0"/>
+              <a:lumOff val="0"/>
+              <a:alphaOff val="0"/>
+            </a:schemeClr>
+          </a:solidFill>
+          <a:prstDash val="solid"/>
+          <a:miter lim="800000"/>
+        </a:ln>
+        <a:effectLst/>
+      </dsp:spPr>
+      <dsp:style>
+        <a:lnRef idx="2">
+          <a:scrgbClr r="0" g="0" b="0"/>
+        </a:lnRef>
+        <a:fillRef idx="1">
+          <a:scrgbClr r="0" g="0" b="0"/>
+        </a:fillRef>
+        <a:effectRef idx="0">
+          <a:scrgbClr r="0" g="0" b="0"/>
+        </a:effectRef>
+        <a:fontRef idx="minor">
+          <a:schemeClr val="lt1"/>
+        </a:fontRef>
+      </dsp:style>
+      <dsp:txBody>
+        <a:bodyPr spcFirstLastPara="0" vert="horz" wrap="square" lIns="56007" tIns="18669" rIns="18669" bIns="18669" numCol="1" spcCol="1270" anchor="ctr" anchorCtr="0">
+          <a:noAutofit/>
+        </a:bodyPr>
+        <a:lstStyle/>
+        <a:p>
+          <a:pPr lvl="0" algn="ctr" defTabSz="622300">
+            <a:lnSpc>
+              <a:spcPct val="90000"/>
+            </a:lnSpc>
+            <a:spcBef>
+              <a:spcPct val="0"/>
+            </a:spcBef>
+            <a:spcAft>
+              <a:spcPct val="35000"/>
+            </a:spcAft>
+          </a:pPr>
+          <a:r>
+            <a:rPr lang="en-US" sz="1400" b="1" kern="1200" dirty="0" smtClean="0"/>
+            <a:t>deploy</a:t>
+          </a:r>
+          <a:endParaRPr lang="de-DE" sz="1400" b="1" kern="1200" dirty="0"/>
+        </a:p>
+      </dsp:txBody>
+      <dsp:txXfrm>
+        <a:off x="7146816" y="562235"/>
+        <a:ext cx="1128111" cy="752074"/>
+      </dsp:txXfrm>
+    </dsp:sp>
   </dsp:spTree>
 </dsp:drawing>
 </file>
@@ -2702,7 +3077,7 @@
           <a:p>
             <a:fld id="{9AA7D095-A676-4F6B-9416-D65D798F5244}" type="datetimeFigureOut">
               <a:rPr lang="de-DE" smtClean="0"/>
-              <a:t>07.05.2015</a:t>
+              <a:t>08.05.2015</a:t>
             </a:fld>
             <a:endParaRPr lang="de-DE"/>
           </a:p>
@@ -2872,7 +3247,7 @@
           <a:p>
             <a:fld id="{9AA7D095-A676-4F6B-9416-D65D798F5244}" type="datetimeFigureOut">
               <a:rPr lang="de-DE" smtClean="0"/>
-              <a:t>07.05.2015</a:t>
+              <a:t>08.05.2015</a:t>
             </a:fld>
             <a:endParaRPr lang="de-DE"/>
           </a:p>
@@ -3052,7 +3427,7 @@
           <a:p>
             <a:fld id="{9AA7D095-A676-4F6B-9416-D65D798F5244}" type="datetimeFigureOut">
               <a:rPr lang="de-DE" smtClean="0"/>
-              <a:t>07.05.2015</a:t>
+              <a:t>08.05.2015</a:t>
             </a:fld>
             <a:endParaRPr lang="de-DE"/>
           </a:p>
@@ -3222,7 +3597,7 @@
           <a:p>
             <a:fld id="{9AA7D095-A676-4F6B-9416-D65D798F5244}" type="datetimeFigureOut">
               <a:rPr lang="de-DE" smtClean="0"/>
-              <a:t>07.05.2015</a:t>
+              <a:t>08.05.2015</a:t>
             </a:fld>
             <a:endParaRPr lang="de-DE"/>
           </a:p>
@@ -3468,7 +3843,7 @@
           <a:p>
             <a:fld id="{9AA7D095-A676-4F6B-9416-D65D798F5244}" type="datetimeFigureOut">
               <a:rPr lang="de-DE" smtClean="0"/>
-              <a:t>07.05.2015</a:t>
+              <a:t>08.05.2015</a:t>
             </a:fld>
             <a:endParaRPr lang="de-DE"/>
           </a:p>
@@ -3700,7 +4075,7 @@
           <a:p>
             <a:fld id="{9AA7D095-A676-4F6B-9416-D65D798F5244}" type="datetimeFigureOut">
               <a:rPr lang="de-DE" smtClean="0"/>
-              <a:t>07.05.2015</a:t>
+              <a:t>08.05.2015</a:t>
             </a:fld>
             <a:endParaRPr lang="de-DE"/>
           </a:p>
@@ -4067,7 +4442,7 @@
           <a:p>
             <a:fld id="{9AA7D095-A676-4F6B-9416-D65D798F5244}" type="datetimeFigureOut">
               <a:rPr lang="de-DE" smtClean="0"/>
-              <a:t>07.05.2015</a:t>
+              <a:t>08.05.2015</a:t>
             </a:fld>
             <a:endParaRPr lang="de-DE"/>
           </a:p>
@@ -4185,7 +4560,7 @@
           <a:p>
             <a:fld id="{9AA7D095-A676-4F6B-9416-D65D798F5244}" type="datetimeFigureOut">
               <a:rPr lang="de-DE" smtClean="0"/>
-              <a:t>07.05.2015</a:t>
+              <a:t>08.05.2015</a:t>
             </a:fld>
             <a:endParaRPr lang="de-DE"/>
           </a:p>
@@ -4280,7 +4655,7 @@
           <a:p>
             <a:fld id="{9AA7D095-A676-4F6B-9416-D65D798F5244}" type="datetimeFigureOut">
               <a:rPr lang="de-DE" smtClean="0"/>
-              <a:t>07.05.2015</a:t>
+              <a:t>08.05.2015</a:t>
             </a:fld>
             <a:endParaRPr lang="de-DE"/>
           </a:p>
@@ -4557,7 +4932,7 @@
           <a:p>
             <a:fld id="{9AA7D095-A676-4F6B-9416-D65D798F5244}" type="datetimeFigureOut">
               <a:rPr lang="de-DE" smtClean="0"/>
-              <a:t>07.05.2015</a:t>
+              <a:t>08.05.2015</a:t>
             </a:fld>
             <a:endParaRPr lang="de-DE"/>
           </a:p>
@@ -4814,7 +5189,7 @@
           <a:p>
             <a:fld id="{9AA7D095-A676-4F6B-9416-D65D798F5244}" type="datetimeFigureOut">
               <a:rPr lang="de-DE" smtClean="0"/>
-              <a:t>07.05.2015</a:t>
+              <a:t>08.05.2015</a:t>
             </a:fld>
             <a:endParaRPr lang="de-DE"/>
           </a:p>
@@ -5027,7 +5402,7 @@
           <a:p>
             <a:fld id="{9AA7D095-A676-4F6B-9416-D65D798F5244}" type="datetimeFigureOut">
               <a:rPr lang="de-DE" smtClean="0"/>
-              <a:t>07.05.2015</a:t>
+              <a:t>08.05.2015</a:t>
             </a:fld>
             <a:endParaRPr lang="de-DE"/>
           </a:p>
@@ -13664,6 +14039,297 @@
           </a:extLst>
         </p:spPr>
       </p:pic>
+      <p:pic>
+        <p:nvPicPr>
+          <p:cNvPr id="14" name="Picture 13"/>
+          <p:cNvPicPr>
+            <a:picLocks noChangeAspect="1"/>
+          </p:cNvPicPr>
+          <p:nvPr/>
+        </p:nvPicPr>
+        <p:blipFill>
+          <a:blip r:embed="rId2">
+            <a:extLst>
+              <a:ext uri="{28A0092B-C50C-407E-A947-70E740481C1C}">
+                <a14:useLocalDpi xmlns:a14="http://schemas.microsoft.com/office/drawing/2010/main" val="0"/>
+              </a:ext>
+            </a:extLst>
+          </a:blip>
+          <a:stretch>
+            <a:fillRect/>
+          </a:stretch>
+        </p:blipFill>
+        <p:spPr>
+          <a:xfrm>
+            <a:off x="5941262" y="4598035"/>
+            <a:ext cx="695422" cy="1143160"/>
+          </a:xfrm>
+          <a:prstGeom prst="rect">
+            <a:avLst/>
+          </a:prstGeom>
+        </p:spPr>
+      </p:pic>
+      <p:pic>
+        <p:nvPicPr>
+          <p:cNvPr id="15" name="Picture 14"/>
+          <p:cNvPicPr>
+            <a:picLocks noChangeAspect="1"/>
+          </p:cNvPicPr>
+          <p:nvPr/>
+        </p:nvPicPr>
+        <p:blipFill>
+          <a:blip r:embed="rId3">
+            <a:extLst>
+              <a:ext uri="{28A0092B-C50C-407E-A947-70E740481C1C}">
+                <a14:useLocalDpi xmlns:a14="http://schemas.microsoft.com/office/drawing/2010/main" val="0"/>
+              </a:ext>
+            </a:extLst>
+          </a:blip>
+          <a:stretch>
+            <a:fillRect/>
+          </a:stretch>
+        </p:blipFill>
+        <p:spPr>
+          <a:xfrm>
+            <a:off x="8072754" y="4840611"/>
+            <a:ext cx="1538745" cy="615498"/>
+          </a:xfrm>
+          <a:prstGeom prst="rect">
+            <a:avLst/>
+          </a:prstGeom>
+        </p:spPr>
+      </p:pic>
+      <p:cxnSp>
+        <p:nvCxnSpPr>
+          <p:cNvPr id="17" name="Straight Arrow Connector 16"/>
+          <p:cNvCxnSpPr/>
+          <p:nvPr/>
+        </p:nvCxnSpPr>
+        <p:spPr>
+          <a:xfrm flipV="1">
+            <a:off x="6798874" y="5122564"/>
+            <a:ext cx="1142403" cy="10481"/>
+          </a:xfrm>
+          <a:prstGeom prst="straightConnector1">
+            <a:avLst/>
+          </a:prstGeom>
+          <a:ln w="142875">
+            <a:solidFill>
+              <a:schemeClr val="tx1">
+                <a:lumMod val="50000"/>
+                <a:lumOff val="50000"/>
+              </a:schemeClr>
+            </a:solidFill>
+            <a:tailEnd type="triangle"/>
+          </a:ln>
+        </p:spPr>
+        <p:style>
+          <a:lnRef idx="1">
+            <a:schemeClr val="accent1"/>
+          </a:lnRef>
+          <a:fillRef idx="0">
+            <a:schemeClr val="accent1"/>
+          </a:fillRef>
+          <a:effectRef idx="0">
+            <a:schemeClr val="accent1"/>
+          </a:effectRef>
+          <a:fontRef idx="minor">
+            <a:schemeClr val="tx1"/>
+          </a:fontRef>
+        </p:style>
+      </p:cxnSp>
+      <p:pic>
+        <p:nvPicPr>
+          <p:cNvPr id="19" name="Picture 2" descr="Logo"/>
+          <p:cNvPicPr>
+            <a:picLocks noChangeAspect="1" noChangeArrowheads="1"/>
+          </p:cNvPicPr>
+          <p:nvPr/>
+        </p:nvPicPr>
+        <p:blipFill>
+          <a:blip r:embed="rId4">
+            <a:extLst>
+              <a:ext uri="{28A0092B-C50C-407E-A947-70E740481C1C}">
+                <a14:useLocalDpi xmlns:a14="http://schemas.microsoft.com/office/drawing/2010/main" val="0"/>
+              </a:ext>
+            </a:extLst>
+          </a:blip>
+          <a:srcRect/>
+          <a:stretch>
+            <a:fillRect/>
+          </a:stretch>
+        </p:blipFill>
+        <p:spPr bwMode="auto">
+          <a:xfrm>
+            <a:off x="6541959" y="5264652"/>
+            <a:ext cx="1648513" cy="374662"/>
+          </a:xfrm>
+          <a:prstGeom prst="rect">
+            <a:avLst/>
+          </a:prstGeom>
+          <a:noFill/>
+          <a:extLst>
+            <a:ext uri="{909E8E84-426E-40DD-AFC4-6F175D3DCCD1}">
+              <a14:hiddenFill xmlns:a14="http://schemas.microsoft.com/office/drawing/2010/main">
+                <a:solidFill>
+                  <a:srgbClr val="FFFFFF"/>
+                </a:solidFill>
+              </a14:hiddenFill>
+            </a:ext>
+          </a:extLst>
+        </p:spPr>
+      </p:pic>
+      <p:pic>
+        <p:nvPicPr>
+          <p:cNvPr id="23" name="Picture 22"/>
+          <p:cNvPicPr>
+            <a:picLocks noChangeAspect="1"/>
+          </p:cNvPicPr>
+          <p:nvPr/>
+        </p:nvPicPr>
+        <p:blipFill>
+          <a:blip r:embed="rId5" cstate="print">
+            <a:extLst>
+              <a:ext uri="{28A0092B-C50C-407E-A947-70E740481C1C}">
+                <a14:useLocalDpi xmlns:a14="http://schemas.microsoft.com/office/drawing/2010/main" val="0"/>
+              </a:ext>
+            </a:extLst>
+          </a:blip>
+          <a:stretch>
+            <a:fillRect/>
+          </a:stretch>
+        </p:blipFill>
+        <p:spPr>
+          <a:xfrm>
+            <a:off x="6810478" y="4602693"/>
+            <a:ext cx="1116380" cy="345217"/>
+          </a:xfrm>
+          <a:prstGeom prst="rect">
+            <a:avLst/>
+          </a:prstGeom>
+        </p:spPr>
+      </p:pic>
+      <p:pic>
+        <p:nvPicPr>
+          <p:cNvPr id="2" name="Picture 2" descr="https://assets-cdn.github.com/images/modules/logos_page/Octocat.png"/>
+          <p:cNvPicPr>
+            <a:picLocks noChangeAspect="1" noChangeArrowheads="1"/>
+          </p:cNvPicPr>
+          <p:nvPr/>
+        </p:nvPicPr>
+        <p:blipFill>
+          <a:blip r:embed="rId6" cstate="print">
+            <a:extLst>
+              <a:ext uri="{28A0092B-C50C-407E-A947-70E740481C1C}">
+                <a14:useLocalDpi xmlns:a14="http://schemas.microsoft.com/office/drawing/2010/main" val="0"/>
+              </a:ext>
+            </a:extLst>
+          </a:blip>
+          <a:srcRect/>
+          <a:stretch>
+            <a:fillRect/>
+          </a:stretch>
+        </p:blipFill>
+        <p:spPr bwMode="auto">
+          <a:xfrm>
+            <a:off x="3311436" y="4590536"/>
+            <a:ext cx="1472772" cy="1218385"/>
+          </a:xfrm>
+          <a:prstGeom prst="rect">
+            <a:avLst/>
+          </a:prstGeom>
+          <a:noFill/>
+          <a:extLst>
+            <a:ext uri="{909E8E84-426E-40DD-AFC4-6F175D3DCCD1}">
+              <a14:hiddenFill xmlns:a14="http://schemas.microsoft.com/office/drawing/2010/main">
+                <a:solidFill>
+                  <a:srgbClr val="FFFFFF"/>
+                </a:solidFill>
+              </a14:hiddenFill>
+            </a:ext>
+          </a:extLst>
+        </p:spPr>
+      </p:pic>
+      <p:pic>
+        <p:nvPicPr>
+          <p:cNvPr id="1028" name="Picture 4" descr="https://travis-ci.com/img/brand-standards/logo-downloads/TravisCI-Full-Color-vertical.png"/>
+          <p:cNvPicPr>
+            <a:picLocks noChangeAspect="1" noChangeArrowheads="1"/>
+          </p:cNvPicPr>
+          <p:nvPr/>
+        </p:nvPicPr>
+        <p:blipFill>
+          <a:blip r:embed="rId7">
+            <a:extLst>
+              <a:ext uri="{28A0092B-C50C-407E-A947-70E740481C1C}">
+                <a14:useLocalDpi xmlns:a14="http://schemas.microsoft.com/office/drawing/2010/main" val="0"/>
+              </a:ext>
+            </a:extLst>
+          </a:blip>
+          <a:srcRect/>
+          <a:stretch>
+            <a:fillRect/>
+          </a:stretch>
+        </p:blipFill>
+        <p:spPr bwMode="auto">
+          <a:xfrm>
+            <a:off x="4936524" y="4554365"/>
+            <a:ext cx="478494" cy="611147"/>
+          </a:xfrm>
+          <a:prstGeom prst="rect">
+            <a:avLst/>
+          </a:prstGeom>
+          <a:noFill/>
+          <a:extLst>
+            <a:ext uri="{909E8E84-426E-40DD-AFC4-6F175D3DCCD1}">
+              <a14:hiddenFill xmlns:a14="http://schemas.microsoft.com/office/drawing/2010/main">
+                <a:solidFill>
+                  <a:srgbClr val="FFFFFF"/>
+                </a:solidFill>
+              </a14:hiddenFill>
+            </a:ext>
+          </a:extLst>
+        </p:spPr>
+      </p:pic>
+      <p:cxnSp>
+        <p:nvCxnSpPr>
+          <p:cNvPr id="21" name="Straight Arrow Connector 20"/>
+          <p:cNvCxnSpPr/>
+          <p:nvPr/>
+        </p:nvCxnSpPr>
+        <p:spPr>
+          <a:xfrm flipV="1">
+            <a:off x="4764126" y="5122564"/>
+            <a:ext cx="1142403" cy="10481"/>
+          </a:xfrm>
+          <a:prstGeom prst="straightConnector1">
+            <a:avLst/>
+          </a:prstGeom>
+          <a:ln w="142875">
+            <a:solidFill>
+              <a:schemeClr val="tx1">
+                <a:lumMod val="50000"/>
+                <a:lumOff val="50000"/>
+              </a:schemeClr>
+            </a:solidFill>
+            <a:tailEnd type="triangle"/>
+          </a:ln>
+        </p:spPr>
+        <p:style>
+          <a:lnRef idx="1">
+            <a:schemeClr val="accent1"/>
+          </a:lnRef>
+          <a:fillRef idx="0">
+            <a:schemeClr val="accent1"/>
+          </a:fillRef>
+          <a:effectRef idx="0">
+            <a:schemeClr val="accent1"/>
+          </a:effectRef>
+          <a:fontRef idx="minor">
+            <a:schemeClr val="tx1"/>
+          </a:fontRef>
+        </p:style>
+      </p:cxnSp>
     </p:spTree>
     <p:extLst>
       <p:ext uri="{BB962C8B-B14F-4D97-AF65-F5344CB8AC3E}">

</xml_diff>

<commit_message>
Added Logging  for Cloud Native Apps post
</commit_message>
<xml_diff>
--- a/_sources/GettingStarted.pptx
+++ b/_sources/GettingStarted.pptx
@@ -23,6 +23,7 @@
     <p:sldId id="270" r:id="rId17"/>
     <p:sldId id="272" r:id="rId18"/>
     <p:sldId id="271" r:id="rId19"/>
+    <p:sldId id="274" r:id="rId20"/>
   </p:sldIdLst>
   <p:sldSz cx="14400213" cy="7559675"/>
   <p:notesSz cx="6858000" cy="9144000"/>
@@ -1250,381 +1251,6 @@
       <dsp:cNvGrpSpPr/>
     </dsp:nvGrpSpPr>
     <dsp:grpSpPr/>
-    <dsp:sp modelId="{6D72C3A5-1474-40AD-9A10-2534C79C4517}">
-      <dsp:nvSpPr>
-        <dsp:cNvPr id="0" name=""/>
-        <dsp:cNvSpPr/>
-      </dsp:nvSpPr>
-      <dsp:spPr>
-        <a:xfrm>
-          <a:off x="2112" y="562235"/>
-          <a:ext cx="1880185" cy="752074"/>
-        </a:xfrm>
-        <a:prstGeom prst="chevron">
-          <a:avLst/>
-        </a:prstGeom>
-        <a:solidFill>
-          <a:schemeClr val="tx2">
-            <a:lumMod val="75000"/>
-          </a:schemeClr>
-        </a:solidFill>
-        <a:ln w="12700" cap="flat" cmpd="sng" algn="ctr">
-          <a:solidFill>
-            <a:schemeClr val="lt1">
-              <a:hueOff val="0"/>
-              <a:satOff val="0"/>
-              <a:lumOff val="0"/>
-              <a:alphaOff val="0"/>
-            </a:schemeClr>
-          </a:solidFill>
-          <a:prstDash val="solid"/>
-          <a:miter lim="800000"/>
-        </a:ln>
-        <a:effectLst/>
-      </dsp:spPr>
-      <dsp:style>
-        <a:lnRef idx="2">
-          <a:scrgbClr r="0" g="0" b="0"/>
-        </a:lnRef>
-        <a:fillRef idx="1">
-          <a:scrgbClr r="0" g="0" b="0"/>
-        </a:fillRef>
-        <a:effectRef idx="0">
-          <a:scrgbClr r="0" g="0" b="0"/>
-        </a:effectRef>
-        <a:fontRef idx="minor">
-          <a:schemeClr val="lt1"/>
-        </a:fontRef>
-      </dsp:style>
-      <dsp:txBody>
-        <a:bodyPr spcFirstLastPara="0" vert="horz" wrap="square" lIns="56007" tIns="18669" rIns="18669" bIns="18669" numCol="1" spcCol="1270" anchor="ctr" anchorCtr="0">
-          <a:noAutofit/>
-        </a:bodyPr>
-        <a:lstStyle/>
-        <a:p>
-          <a:pPr lvl="0" algn="ctr" defTabSz="622300">
-            <a:lnSpc>
-              <a:spcPct val="90000"/>
-            </a:lnSpc>
-            <a:spcBef>
-              <a:spcPct val="0"/>
-            </a:spcBef>
-            <a:spcAft>
-              <a:spcPct val="35000"/>
-            </a:spcAft>
-          </a:pPr>
-          <a:r>
-            <a:rPr lang="en-US" sz="1400" b="1" kern="1200" dirty="0" smtClean="0"/>
-            <a:t>package</a:t>
-          </a:r>
-          <a:endParaRPr lang="de-DE" sz="1400" b="1" kern="1200" dirty="0"/>
-        </a:p>
-      </dsp:txBody>
-      <dsp:txXfrm>
-        <a:off x="378149" y="562235"/>
-        <a:ext cx="1128111" cy="752074"/>
-      </dsp:txXfrm>
-    </dsp:sp>
-    <dsp:sp modelId="{086EE9E9-692A-4D05-A349-CBDF03FDA677}">
-      <dsp:nvSpPr>
-        <dsp:cNvPr id="0" name=""/>
-        <dsp:cNvSpPr/>
-      </dsp:nvSpPr>
-      <dsp:spPr>
-        <a:xfrm>
-          <a:off x="1694279" y="562235"/>
-          <a:ext cx="1880185" cy="752074"/>
-        </a:xfrm>
-        <a:prstGeom prst="chevron">
-          <a:avLst/>
-        </a:prstGeom>
-        <a:solidFill>
-          <a:schemeClr val="tx2">
-            <a:lumMod val="75000"/>
-          </a:schemeClr>
-        </a:solidFill>
-        <a:ln w="12700" cap="flat" cmpd="sng" algn="ctr">
-          <a:solidFill>
-            <a:schemeClr val="lt1">
-              <a:hueOff val="0"/>
-              <a:satOff val="0"/>
-              <a:lumOff val="0"/>
-              <a:alphaOff val="0"/>
-            </a:schemeClr>
-          </a:solidFill>
-          <a:prstDash val="solid"/>
-          <a:miter lim="800000"/>
-        </a:ln>
-        <a:effectLst/>
-      </dsp:spPr>
-      <dsp:style>
-        <a:lnRef idx="2">
-          <a:scrgbClr r="0" g="0" b="0"/>
-        </a:lnRef>
-        <a:fillRef idx="1">
-          <a:scrgbClr r="0" g="0" b="0"/>
-        </a:fillRef>
-        <a:effectRef idx="0">
-          <a:scrgbClr r="0" g="0" b="0"/>
-        </a:effectRef>
-        <a:fontRef idx="minor">
-          <a:schemeClr val="lt1"/>
-        </a:fontRef>
-      </dsp:style>
-      <dsp:txBody>
-        <a:bodyPr spcFirstLastPara="0" vert="horz" wrap="square" lIns="56007" tIns="18669" rIns="18669" bIns="18669" numCol="1" spcCol="1270" anchor="ctr" anchorCtr="0">
-          <a:noAutofit/>
-        </a:bodyPr>
-        <a:lstStyle/>
-        <a:p>
-          <a:pPr lvl="0" algn="ctr" defTabSz="622300">
-            <a:lnSpc>
-              <a:spcPct val="90000"/>
-            </a:lnSpc>
-            <a:spcBef>
-              <a:spcPct val="0"/>
-            </a:spcBef>
-            <a:spcAft>
-              <a:spcPct val="35000"/>
-            </a:spcAft>
-          </a:pPr>
-          <a:r>
-            <a:rPr lang="en-US" sz="1400" b="1" kern="1200" dirty="0" smtClean="0"/>
-            <a:t>pre-integration-test</a:t>
-          </a:r>
-          <a:endParaRPr lang="de-DE" sz="1400" b="1" kern="1200" dirty="0"/>
-        </a:p>
-      </dsp:txBody>
-      <dsp:txXfrm>
-        <a:off x="2070316" y="562235"/>
-        <a:ext cx="1128111" cy="752074"/>
-      </dsp:txXfrm>
-    </dsp:sp>
-    <dsp:sp modelId="{17AF3B93-FA57-409F-9FAF-CA14FC2BCCDA}">
-      <dsp:nvSpPr>
-        <dsp:cNvPr id="0" name=""/>
-        <dsp:cNvSpPr/>
-      </dsp:nvSpPr>
-      <dsp:spPr>
-        <a:xfrm>
-          <a:off x="3386445" y="562235"/>
-          <a:ext cx="1880185" cy="752074"/>
-        </a:xfrm>
-        <a:prstGeom prst="chevron">
-          <a:avLst/>
-        </a:prstGeom>
-        <a:solidFill>
-          <a:schemeClr val="tx2">
-            <a:lumMod val="75000"/>
-          </a:schemeClr>
-        </a:solidFill>
-        <a:ln w="12700" cap="flat" cmpd="sng" algn="ctr">
-          <a:solidFill>
-            <a:schemeClr val="lt1">
-              <a:hueOff val="0"/>
-              <a:satOff val="0"/>
-              <a:lumOff val="0"/>
-              <a:alphaOff val="0"/>
-            </a:schemeClr>
-          </a:solidFill>
-          <a:prstDash val="solid"/>
-          <a:miter lim="800000"/>
-        </a:ln>
-        <a:effectLst/>
-      </dsp:spPr>
-      <dsp:style>
-        <a:lnRef idx="2">
-          <a:scrgbClr r="0" g="0" b="0"/>
-        </a:lnRef>
-        <a:fillRef idx="1">
-          <a:scrgbClr r="0" g="0" b="0"/>
-        </a:fillRef>
-        <a:effectRef idx="0">
-          <a:scrgbClr r="0" g="0" b="0"/>
-        </a:effectRef>
-        <a:fontRef idx="minor">
-          <a:schemeClr val="lt1"/>
-        </a:fontRef>
-      </dsp:style>
-      <dsp:txBody>
-        <a:bodyPr spcFirstLastPara="0" vert="horz" wrap="square" lIns="56007" tIns="18669" rIns="18669" bIns="18669" numCol="1" spcCol="1270" anchor="ctr" anchorCtr="0">
-          <a:noAutofit/>
-        </a:bodyPr>
-        <a:lstStyle/>
-        <a:p>
-          <a:pPr lvl="0" algn="ctr" defTabSz="622300">
-            <a:lnSpc>
-              <a:spcPct val="90000"/>
-            </a:lnSpc>
-            <a:spcBef>
-              <a:spcPct val="0"/>
-            </a:spcBef>
-            <a:spcAft>
-              <a:spcPct val="35000"/>
-            </a:spcAft>
-          </a:pPr>
-          <a:r>
-            <a:rPr lang="en-US" sz="1400" b="1" kern="1200" dirty="0" smtClean="0"/>
-            <a:t>integration-test</a:t>
-          </a:r>
-          <a:endParaRPr lang="de-DE" sz="1400" b="1" kern="1200" dirty="0"/>
-        </a:p>
-      </dsp:txBody>
-      <dsp:txXfrm>
-        <a:off x="3762482" y="562235"/>
-        <a:ext cx="1128111" cy="752074"/>
-      </dsp:txXfrm>
-    </dsp:sp>
-    <dsp:sp modelId="{DEAC2976-8EFE-4204-9FE4-0A0AE01A3B2B}">
-      <dsp:nvSpPr>
-        <dsp:cNvPr id="0" name=""/>
-        <dsp:cNvSpPr/>
-      </dsp:nvSpPr>
-      <dsp:spPr>
-        <a:xfrm>
-          <a:off x="5078612" y="562235"/>
-          <a:ext cx="1880185" cy="752074"/>
-        </a:xfrm>
-        <a:prstGeom prst="chevron">
-          <a:avLst/>
-        </a:prstGeom>
-        <a:solidFill>
-          <a:schemeClr val="tx2">
-            <a:lumMod val="75000"/>
-          </a:schemeClr>
-        </a:solidFill>
-        <a:ln w="12700" cap="flat" cmpd="sng" algn="ctr">
-          <a:solidFill>
-            <a:schemeClr val="lt1">
-              <a:hueOff val="0"/>
-              <a:satOff val="0"/>
-              <a:lumOff val="0"/>
-              <a:alphaOff val="0"/>
-            </a:schemeClr>
-          </a:solidFill>
-          <a:prstDash val="solid"/>
-          <a:miter lim="800000"/>
-        </a:ln>
-        <a:effectLst/>
-      </dsp:spPr>
-      <dsp:style>
-        <a:lnRef idx="2">
-          <a:scrgbClr r="0" g="0" b="0"/>
-        </a:lnRef>
-        <a:fillRef idx="1">
-          <a:scrgbClr r="0" g="0" b="0"/>
-        </a:fillRef>
-        <a:effectRef idx="0">
-          <a:scrgbClr r="0" g="0" b="0"/>
-        </a:effectRef>
-        <a:fontRef idx="minor">
-          <a:schemeClr val="lt1"/>
-        </a:fontRef>
-      </dsp:style>
-      <dsp:txBody>
-        <a:bodyPr spcFirstLastPara="0" vert="horz" wrap="square" lIns="56007" tIns="18669" rIns="18669" bIns="18669" numCol="1" spcCol="1270" anchor="ctr" anchorCtr="0">
-          <a:noAutofit/>
-        </a:bodyPr>
-        <a:lstStyle/>
-        <a:p>
-          <a:pPr lvl="0" algn="ctr" defTabSz="622300">
-            <a:lnSpc>
-              <a:spcPct val="90000"/>
-            </a:lnSpc>
-            <a:spcBef>
-              <a:spcPct val="0"/>
-            </a:spcBef>
-            <a:spcAft>
-              <a:spcPct val="35000"/>
-            </a:spcAft>
-          </a:pPr>
-          <a:r>
-            <a:rPr lang="en-US" sz="1400" b="1" kern="1200" dirty="0" smtClean="0"/>
-            <a:t>post-integration-test</a:t>
-          </a:r>
-          <a:endParaRPr lang="de-DE" sz="1400" b="1" kern="1200" dirty="0"/>
-        </a:p>
-      </dsp:txBody>
-      <dsp:txXfrm>
-        <a:off x="5454649" y="562235"/>
-        <a:ext cx="1128111" cy="752074"/>
-      </dsp:txXfrm>
-    </dsp:sp>
-    <dsp:sp modelId="{99F52057-642D-4027-97D5-D26EF2913281}">
-      <dsp:nvSpPr>
-        <dsp:cNvPr id="0" name=""/>
-        <dsp:cNvSpPr/>
-      </dsp:nvSpPr>
-      <dsp:spPr>
-        <a:xfrm>
-          <a:off x="6770779" y="562235"/>
-          <a:ext cx="1880185" cy="752074"/>
-        </a:xfrm>
-        <a:prstGeom prst="chevron">
-          <a:avLst/>
-        </a:prstGeom>
-        <a:solidFill>
-          <a:schemeClr val="tx2">
-            <a:lumMod val="75000"/>
-          </a:schemeClr>
-        </a:solidFill>
-        <a:ln w="12700" cap="flat" cmpd="sng" algn="ctr">
-          <a:solidFill>
-            <a:schemeClr val="lt1">
-              <a:hueOff val="0"/>
-              <a:satOff val="0"/>
-              <a:lumOff val="0"/>
-              <a:alphaOff val="0"/>
-            </a:schemeClr>
-          </a:solidFill>
-          <a:prstDash val="solid"/>
-          <a:miter lim="800000"/>
-        </a:ln>
-        <a:effectLst/>
-      </dsp:spPr>
-      <dsp:style>
-        <a:lnRef idx="2">
-          <a:scrgbClr r="0" g="0" b="0"/>
-        </a:lnRef>
-        <a:fillRef idx="1">
-          <a:scrgbClr r="0" g="0" b="0"/>
-        </a:fillRef>
-        <a:effectRef idx="0">
-          <a:scrgbClr r="0" g="0" b="0"/>
-        </a:effectRef>
-        <a:fontRef idx="minor">
-          <a:schemeClr val="lt1"/>
-        </a:fontRef>
-      </dsp:style>
-      <dsp:txBody>
-        <a:bodyPr spcFirstLastPara="0" vert="horz" wrap="square" lIns="56007" tIns="18669" rIns="18669" bIns="18669" numCol="1" spcCol="1270" anchor="ctr" anchorCtr="0">
-          <a:noAutofit/>
-        </a:bodyPr>
-        <a:lstStyle/>
-        <a:p>
-          <a:pPr lvl="0" algn="ctr" defTabSz="622300">
-            <a:lnSpc>
-              <a:spcPct val="90000"/>
-            </a:lnSpc>
-            <a:spcBef>
-              <a:spcPct val="0"/>
-            </a:spcBef>
-            <a:spcAft>
-              <a:spcPct val="35000"/>
-            </a:spcAft>
-          </a:pPr>
-          <a:r>
-            <a:rPr lang="en-US" sz="1400" b="1" kern="1200" dirty="0" smtClean="0"/>
-            <a:t>deploy</a:t>
-          </a:r>
-          <a:endParaRPr lang="de-DE" sz="1400" b="1" kern="1200" dirty="0"/>
-        </a:p>
-      </dsp:txBody>
-      <dsp:txXfrm>
-        <a:off x="7146816" y="562235"/>
-        <a:ext cx="1128111" cy="752074"/>
-      </dsp:txXfrm>
-    </dsp:sp>
   </dsp:spTree>
 </dsp:drawing>
 </file>
@@ -3077,7 +2703,7 @@
           <a:p>
             <a:fld id="{9AA7D095-A676-4F6B-9416-D65D798F5244}" type="datetimeFigureOut">
               <a:rPr lang="de-DE" smtClean="0"/>
-              <a:t>08.05.2015</a:t>
+              <a:t>18.05.2015</a:t>
             </a:fld>
             <a:endParaRPr lang="de-DE"/>
           </a:p>
@@ -3247,7 +2873,7 @@
           <a:p>
             <a:fld id="{9AA7D095-A676-4F6B-9416-D65D798F5244}" type="datetimeFigureOut">
               <a:rPr lang="de-DE" smtClean="0"/>
-              <a:t>08.05.2015</a:t>
+              <a:t>18.05.2015</a:t>
             </a:fld>
             <a:endParaRPr lang="de-DE"/>
           </a:p>
@@ -3427,7 +3053,7 @@
           <a:p>
             <a:fld id="{9AA7D095-A676-4F6B-9416-D65D798F5244}" type="datetimeFigureOut">
               <a:rPr lang="de-DE" smtClean="0"/>
-              <a:t>08.05.2015</a:t>
+              <a:t>18.05.2015</a:t>
             </a:fld>
             <a:endParaRPr lang="de-DE"/>
           </a:p>
@@ -3597,7 +3223,7 @@
           <a:p>
             <a:fld id="{9AA7D095-A676-4F6B-9416-D65D798F5244}" type="datetimeFigureOut">
               <a:rPr lang="de-DE" smtClean="0"/>
-              <a:t>08.05.2015</a:t>
+              <a:t>18.05.2015</a:t>
             </a:fld>
             <a:endParaRPr lang="de-DE"/>
           </a:p>
@@ -3843,7 +3469,7 @@
           <a:p>
             <a:fld id="{9AA7D095-A676-4F6B-9416-D65D798F5244}" type="datetimeFigureOut">
               <a:rPr lang="de-DE" smtClean="0"/>
-              <a:t>08.05.2015</a:t>
+              <a:t>18.05.2015</a:t>
             </a:fld>
             <a:endParaRPr lang="de-DE"/>
           </a:p>
@@ -4075,7 +3701,7 @@
           <a:p>
             <a:fld id="{9AA7D095-A676-4F6B-9416-D65D798F5244}" type="datetimeFigureOut">
               <a:rPr lang="de-DE" smtClean="0"/>
-              <a:t>08.05.2015</a:t>
+              <a:t>18.05.2015</a:t>
             </a:fld>
             <a:endParaRPr lang="de-DE"/>
           </a:p>
@@ -4442,7 +4068,7 @@
           <a:p>
             <a:fld id="{9AA7D095-A676-4F6B-9416-D65D798F5244}" type="datetimeFigureOut">
               <a:rPr lang="de-DE" smtClean="0"/>
-              <a:t>08.05.2015</a:t>
+              <a:t>18.05.2015</a:t>
             </a:fld>
             <a:endParaRPr lang="de-DE"/>
           </a:p>
@@ -4560,7 +4186,7 @@
           <a:p>
             <a:fld id="{9AA7D095-A676-4F6B-9416-D65D798F5244}" type="datetimeFigureOut">
               <a:rPr lang="de-DE" smtClean="0"/>
-              <a:t>08.05.2015</a:t>
+              <a:t>18.05.2015</a:t>
             </a:fld>
             <a:endParaRPr lang="de-DE"/>
           </a:p>
@@ -4655,7 +4281,7 @@
           <a:p>
             <a:fld id="{9AA7D095-A676-4F6B-9416-D65D798F5244}" type="datetimeFigureOut">
               <a:rPr lang="de-DE" smtClean="0"/>
-              <a:t>08.05.2015</a:t>
+              <a:t>18.05.2015</a:t>
             </a:fld>
             <a:endParaRPr lang="de-DE"/>
           </a:p>
@@ -4932,7 +4558,7 @@
           <a:p>
             <a:fld id="{9AA7D095-A676-4F6B-9416-D65D798F5244}" type="datetimeFigureOut">
               <a:rPr lang="de-DE" smtClean="0"/>
-              <a:t>08.05.2015</a:t>
+              <a:t>18.05.2015</a:t>
             </a:fld>
             <a:endParaRPr lang="de-DE"/>
           </a:p>
@@ -5189,7 +4815,7 @@
           <a:p>
             <a:fld id="{9AA7D095-A676-4F6B-9416-D65D798F5244}" type="datetimeFigureOut">
               <a:rPr lang="de-DE" smtClean="0"/>
-              <a:t>08.05.2015</a:t>
+              <a:t>18.05.2015</a:t>
             </a:fld>
             <a:endParaRPr lang="de-DE"/>
           </a:p>
@@ -5402,7 +5028,7 @@
           <a:p>
             <a:fld id="{9AA7D095-A676-4F6B-9416-D65D798F5244}" type="datetimeFigureOut">
               <a:rPr lang="de-DE" smtClean="0"/>
-              <a:t>08.05.2015</a:t>
+              <a:t>18.05.2015</a:t>
             </a:fld>
             <a:endParaRPr lang="de-DE"/>
           </a:p>
@@ -14334,6 +13960,337 @@
     <p:extLst>
       <p:ext uri="{BB962C8B-B14F-4D97-AF65-F5344CB8AC3E}">
         <p14:creationId xmlns:p14="http://schemas.microsoft.com/office/powerpoint/2010/main" val="1635227564"/>
+      </p:ext>
+    </p:extLst>
+  </p:cSld>
+  <p:clrMapOvr>
+    <a:masterClrMapping/>
+  </p:clrMapOvr>
+  <p:timing>
+    <p:tnLst>
+      <p:par>
+        <p:cTn id="1" dur="indefinite" restart="never" nodeType="tmRoot"/>
+      </p:par>
+    </p:tnLst>
+  </p:timing>
+</p:sld>
+</file>
+
+<file path=ppt/slides/slide19.xml><?xml version="1.0" encoding="utf-8"?>
+<p:sld xmlns:a="http://schemas.openxmlformats.org/drawingml/2006/main" xmlns:r="http://schemas.openxmlformats.org/officeDocument/2006/relationships" xmlns:p="http://schemas.openxmlformats.org/presentationml/2006/main">
+  <p:cSld>
+    <p:spTree>
+      <p:nvGrpSpPr>
+        <p:cNvPr id="1" name=""/>
+        <p:cNvGrpSpPr/>
+        <p:nvPr/>
+      </p:nvGrpSpPr>
+      <p:grpSpPr>
+        <a:xfrm>
+          <a:off x="0" y="0"/>
+          <a:ext cx="0" cy="0"/>
+          <a:chOff x="0" y="0"/>
+          <a:chExt cx="0" cy="0"/>
+        </a:xfrm>
+      </p:grpSpPr>
+      <p:sp>
+        <p:nvSpPr>
+          <p:cNvPr id="6" name="Rounded Rectangle 75"/>
+          <p:cNvSpPr/>
+          <p:nvPr/>
+        </p:nvSpPr>
+        <p:spPr>
+          <a:xfrm>
+            <a:off x="1738157" y="1766426"/>
+            <a:ext cx="1441656" cy="1514439"/>
+          </a:xfrm>
+          <a:prstGeom prst="rect">
+            <a:avLst/>
+          </a:prstGeom>
+          <a:solidFill>
+            <a:schemeClr val="accent2">
+              <a:lumMod val="75000"/>
+            </a:schemeClr>
+          </a:solidFill>
+          <a:ln w="76200">
+            <a:solidFill>
+              <a:schemeClr val="accent2">
+                <a:lumMod val="50000"/>
+              </a:schemeClr>
+            </a:solidFill>
+          </a:ln>
+        </p:spPr>
+        <p:style>
+          <a:lnRef idx="2">
+            <a:schemeClr val="accent1">
+              <a:shade val="50000"/>
+            </a:schemeClr>
+          </a:lnRef>
+          <a:fillRef idx="1">
+            <a:schemeClr val="accent1"/>
+          </a:fillRef>
+          <a:effectRef idx="0">
+            <a:schemeClr val="accent1"/>
+          </a:effectRef>
+          <a:fontRef idx="minor">
+            <a:schemeClr val="lt1"/>
+          </a:fontRef>
+        </p:style>
+        <p:txBody>
+          <a:bodyPr rtlCol="0" anchor="ctr"/>
+          <a:lstStyle/>
+          <a:p>
+            <a:pPr algn="ctr"/>
+            <a:r>
+              <a:rPr lang="en-US" sz="2000" b="1" dirty="0"/>
+              <a:t>Instance</a:t>
+            </a:r>
+            <a:endParaRPr lang="de-DE" sz="2000" b="1" dirty="0"/>
+          </a:p>
+        </p:txBody>
+      </p:sp>
+      <p:grpSp>
+        <p:nvGrpSpPr>
+          <p:cNvPr id="22" name="Group 21"/>
+          <p:cNvGrpSpPr/>
+          <p:nvPr/>
+        </p:nvGrpSpPr>
+        <p:grpSpPr>
+          <a:xfrm>
+            <a:off x="5279415" y="133588"/>
+            <a:ext cx="2242751" cy="1789646"/>
+            <a:chOff x="1294361" y="4557307"/>
+            <a:chExt cx="2242751" cy="1789646"/>
+          </a:xfrm>
+        </p:grpSpPr>
+        <p:pic>
+          <p:nvPicPr>
+            <p:cNvPr id="4" name="Picture 2" descr="Console showing log4J logs"/>
+            <p:cNvPicPr>
+              <a:picLocks noChangeAspect="1" noChangeArrowheads="1"/>
+            </p:cNvPicPr>
+            <p:nvPr/>
+          </p:nvPicPr>
+          <p:blipFill>
+            <a:blip r:embed="rId2">
+              <a:extLst>
+                <a:ext uri="{28A0092B-C50C-407E-A947-70E740481C1C}">
+                  <a14:useLocalDpi xmlns:a14="http://schemas.microsoft.com/office/drawing/2010/main" val="0"/>
+                </a:ext>
+              </a:extLst>
+            </a:blip>
+            <a:srcRect/>
+            <a:stretch>
+              <a:fillRect/>
+            </a:stretch>
+          </p:blipFill>
+          <p:spPr bwMode="auto">
+            <a:xfrm>
+              <a:off x="1421028" y="4557307"/>
+              <a:ext cx="2004202" cy="1459059"/>
+            </a:xfrm>
+            <a:prstGeom prst="rect">
+              <a:avLst/>
+            </a:prstGeom>
+            <a:noFill/>
+            <a:extLst>
+              <a:ext uri="{909E8E84-426E-40DD-AFC4-6F175D3DCCD1}">
+                <a14:hiddenFill xmlns:a14="http://schemas.microsoft.com/office/drawing/2010/main">
+                  <a:solidFill>
+                    <a:srgbClr val="FFFFFF"/>
+                  </a:solidFill>
+                </a14:hiddenFill>
+              </a:ext>
+            </a:extLst>
+          </p:spPr>
+        </p:pic>
+        <p:sp>
+          <p:nvSpPr>
+            <p:cNvPr id="9" name="TextBox 8"/>
+            <p:cNvSpPr txBox="1"/>
+            <p:nvPr/>
+          </p:nvSpPr>
+          <p:spPr>
+            <a:xfrm>
+              <a:off x="1294361" y="5946843"/>
+              <a:ext cx="2242751" cy="400110"/>
+            </a:xfrm>
+            <a:prstGeom prst="rect">
+              <a:avLst/>
+            </a:prstGeom>
+            <a:noFill/>
+          </p:spPr>
+          <p:txBody>
+            <a:bodyPr wrap="square" rtlCol="0">
+              <a:spAutoFit/>
+            </a:bodyPr>
+            <a:lstStyle/>
+            <a:p>
+              <a:pPr algn="ctr"/>
+              <a:r>
+                <a:rPr lang="en-US" sz="2000" b="1" dirty="0"/>
+                <a:t>I</a:t>
+              </a:r>
+              <a:r>
+                <a:rPr lang="en-US" sz="2000" b="1" dirty="0" smtClean="0"/>
+                <a:t>nstance Boot logs</a:t>
+              </a:r>
+              <a:endParaRPr lang="de-DE" sz="2000" b="1" dirty="0"/>
+            </a:p>
+          </p:txBody>
+        </p:sp>
+      </p:grpSp>
+      <p:cxnSp>
+        <p:nvCxnSpPr>
+          <p:cNvPr id="11" name="Straight Arrow Connector 10"/>
+          <p:cNvCxnSpPr/>
+          <p:nvPr/>
+        </p:nvCxnSpPr>
+        <p:spPr>
+          <a:xfrm>
+            <a:off x="3354363" y="2909124"/>
+            <a:ext cx="1823118" cy="699049"/>
+          </a:xfrm>
+          <a:prstGeom prst="straightConnector1">
+            <a:avLst/>
+          </a:prstGeom>
+          <a:ln w="142875">
+            <a:solidFill>
+              <a:schemeClr val="tx1">
+                <a:lumMod val="50000"/>
+                <a:lumOff val="50000"/>
+              </a:schemeClr>
+            </a:solidFill>
+            <a:tailEnd type="triangle"/>
+          </a:ln>
+        </p:spPr>
+        <p:style>
+          <a:lnRef idx="1">
+            <a:schemeClr val="accent1"/>
+          </a:lnRef>
+          <a:fillRef idx="0">
+            <a:schemeClr val="accent1"/>
+          </a:fillRef>
+          <a:effectRef idx="0">
+            <a:schemeClr val="accent1"/>
+          </a:effectRef>
+          <a:fontRef idx="minor">
+            <a:schemeClr val="tx1"/>
+          </a:fontRef>
+        </p:style>
+      </p:cxnSp>
+      <p:cxnSp>
+        <p:nvCxnSpPr>
+          <p:cNvPr id="15" name="Straight Arrow Connector 14"/>
+          <p:cNvCxnSpPr/>
+          <p:nvPr/>
+        </p:nvCxnSpPr>
+        <p:spPr>
+          <a:xfrm flipV="1">
+            <a:off x="3391929" y="1241855"/>
+            <a:ext cx="1822623" cy="908221"/>
+          </a:xfrm>
+          <a:prstGeom prst="straightConnector1">
+            <a:avLst/>
+          </a:prstGeom>
+          <a:ln w="142875">
+            <a:solidFill>
+              <a:schemeClr val="tx1">
+                <a:lumMod val="50000"/>
+                <a:lumOff val="50000"/>
+              </a:schemeClr>
+            </a:solidFill>
+            <a:tailEnd type="triangle"/>
+          </a:ln>
+        </p:spPr>
+        <p:style>
+          <a:lnRef idx="1">
+            <a:schemeClr val="accent1"/>
+          </a:lnRef>
+          <a:fillRef idx="0">
+            <a:schemeClr val="accent1"/>
+          </a:fillRef>
+          <a:effectRef idx="0">
+            <a:schemeClr val="accent1"/>
+          </a:effectRef>
+          <a:fontRef idx="minor">
+            <a:schemeClr val="tx1"/>
+          </a:fontRef>
+        </p:style>
+      </p:cxnSp>
+      <p:grpSp>
+        <p:nvGrpSpPr>
+          <p:cNvPr id="21" name="Group 20"/>
+          <p:cNvGrpSpPr/>
+          <p:nvPr/>
+        </p:nvGrpSpPr>
+        <p:grpSpPr>
+          <a:xfrm>
+            <a:off x="5302071" y="2991597"/>
+            <a:ext cx="2254085" cy="1814879"/>
+            <a:chOff x="5246466" y="1076300"/>
+            <a:chExt cx="2254085" cy="1814879"/>
+          </a:xfrm>
+        </p:grpSpPr>
+        <p:pic>
+          <p:nvPicPr>
+            <p:cNvPr id="19" name="Picture 18"/>
+            <p:cNvPicPr>
+              <a:picLocks noChangeAspect="1"/>
+            </p:cNvPicPr>
+            <p:nvPr/>
+          </p:nvPicPr>
+          <p:blipFill rotWithShape="1">
+            <a:blip r:embed="rId3"/>
+            <a:srcRect l="861" t="13474" r="845" b="1728"/>
+            <a:stretch/>
+          </p:blipFill>
+          <p:spPr>
+            <a:xfrm>
+              <a:off x="5251619" y="1076300"/>
+              <a:ext cx="2248932" cy="1454185"/>
+            </a:xfrm>
+            <a:prstGeom prst="rect">
+              <a:avLst/>
+            </a:prstGeom>
+          </p:spPr>
+        </p:pic>
+        <p:sp>
+          <p:nvSpPr>
+            <p:cNvPr id="20" name="TextBox 19"/>
+            <p:cNvSpPr txBox="1"/>
+            <p:nvPr/>
+          </p:nvSpPr>
+          <p:spPr>
+            <a:xfrm>
+              <a:off x="5246466" y="2491069"/>
+              <a:ext cx="2242751" cy="400110"/>
+            </a:xfrm>
+            <a:prstGeom prst="rect">
+              <a:avLst/>
+            </a:prstGeom>
+            <a:noFill/>
+          </p:spPr>
+          <p:txBody>
+            <a:bodyPr wrap="square" rtlCol="0">
+              <a:spAutoFit/>
+            </a:bodyPr>
+            <a:lstStyle/>
+            <a:p>
+              <a:pPr algn="ctr"/>
+              <a:r>
+                <a:rPr lang="en-US" sz="2000" b="1" dirty="0" smtClean="0"/>
+                <a:t>Application logs</a:t>
+              </a:r>
+              <a:endParaRPr lang="de-DE" sz="2000" b="1" dirty="0"/>
+            </a:p>
+          </p:txBody>
+        </p:sp>
+      </p:grpSp>
+    </p:spTree>
+    <p:extLst>
+      <p:ext uri="{BB962C8B-B14F-4D97-AF65-F5344CB8AC3E}">
+        <p14:creationId xmlns:p14="http://schemas.microsoft.com/office/powerpoint/2010/main" val="2730884054"/>
       </p:ext>
     </p:extLst>
   </p:cSld>

</xml_diff>

<commit_message>
Added Spring Boot blog article
</commit_message>
<xml_diff>
--- a/_sources/GettingStarted.pptx
+++ b/_sources/GettingStarted.pptx
@@ -8,22 +8,23 @@
     <p:sldId id="256" r:id="rId2"/>
     <p:sldId id="258" r:id="rId3"/>
     <p:sldId id="257" r:id="rId4"/>
-    <p:sldId id="259" r:id="rId5"/>
-    <p:sldId id="260" r:id="rId6"/>
-    <p:sldId id="261" r:id="rId7"/>
-    <p:sldId id="269" r:id="rId8"/>
-    <p:sldId id="262" r:id="rId9"/>
-    <p:sldId id="263" r:id="rId10"/>
-    <p:sldId id="264" r:id="rId11"/>
-    <p:sldId id="273" r:id="rId12"/>
-    <p:sldId id="265" r:id="rId13"/>
-    <p:sldId id="266" r:id="rId14"/>
-    <p:sldId id="267" r:id="rId15"/>
-    <p:sldId id="268" r:id="rId16"/>
-    <p:sldId id="270" r:id="rId17"/>
-    <p:sldId id="272" r:id="rId18"/>
-    <p:sldId id="271" r:id="rId19"/>
-    <p:sldId id="274" r:id="rId20"/>
+    <p:sldId id="275" r:id="rId5"/>
+    <p:sldId id="259" r:id="rId6"/>
+    <p:sldId id="260" r:id="rId7"/>
+    <p:sldId id="261" r:id="rId8"/>
+    <p:sldId id="269" r:id="rId9"/>
+    <p:sldId id="262" r:id="rId10"/>
+    <p:sldId id="263" r:id="rId11"/>
+    <p:sldId id="264" r:id="rId12"/>
+    <p:sldId id="273" r:id="rId13"/>
+    <p:sldId id="265" r:id="rId14"/>
+    <p:sldId id="266" r:id="rId15"/>
+    <p:sldId id="267" r:id="rId16"/>
+    <p:sldId id="268" r:id="rId17"/>
+    <p:sldId id="270" r:id="rId18"/>
+    <p:sldId id="272" r:id="rId19"/>
+    <p:sldId id="271" r:id="rId20"/>
+    <p:sldId id="274" r:id="rId21"/>
   </p:sldIdLst>
   <p:sldSz cx="14400213" cy="7559675"/>
   <p:notesSz cx="6858000" cy="9144000"/>
@@ -2703,7 +2704,7 @@
           <a:p>
             <a:fld id="{9AA7D095-A676-4F6B-9416-D65D798F5244}" type="datetimeFigureOut">
               <a:rPr lang="de-DE" smtClean="0"/>
-              <a:t>18.05.2015</a:t>
+              <a:t>09.06.2015</a:t>
             </a:fld>
             <a:endParaRPr lang="de-DE"/>
           </a:p>
@@ -2745,7 +2746,7 @@
           <a:p>
             <a:fld id="{7CA376D3-3280-4351-90C7-FED229B337FE}" type="slidenum">
               <a:rPr lang="de-DE" smtClean="0"/>
-              <a:t>‹#›</a:t>
+              <a:t>‹Nr.›</a:t>
             </a:fld>
             <a:endParaRPr lang="de-DE"/>
           </a:p>
@@ -2873,7 +2874,7 @@
           <a:p>
             <a:fld id="{9AA7D095-A676-4F6B-9416-D65D798F5244}" type="datetimeFigureOut">
               <a:rPr lang="de-DE" smtClean="0"/>
-              <a:t>18.05.2015</a:t>
+              <a:t>09.06.2015</a:t>
             </a:fld>
             <a:endParaRPr lang="de-DE"/>
           </a:p>
@@ -2915,7 +2916,7 @@
           <a:p>
             <a:fld id="{7CA376D3-3280-4351-90C7-FED229B337FE}" type="slidenum">
               <a:rPr lang="de-DE" smtClean="0"/>
-              <a:t>‹#›</a:t>
+              <a:t>‹Nr.›</a:t>
             </a:fld>
             <a:endParaRPr lang="de-DE"/>
           </a:p>
@@ -3053,7 +3054,7 @@
           <a:p>
             <a:fld id="{9AA7D095-A676-4F6B-9416-D65D798F5244}" type="datetimeFigureOut">
               <a:rPr lang="de-DE" smtClean="0"/>
-              <a:t>18.05.2015</a:t>
+              <a:t>09.06.2015</a:t>
             </a:fld>
             <a:endParaRPr lang="de-DE"/>
           </a:p>
@@ -3095,7 +3096,7 @@
           <a:p>
             <a:fld id="{7CA376D3-3280-4351-90C7-FED229B337FE}" type="slidenum">
               <a:rPr lang="de-DE" smtClean="0"/>
-              <a:t>‹#›</a:t>
+              <a:t>‹Nr.›</a:t>
             </a:fld>
             <a:endParaRPr lang="de-DE"/>
           </a:p>
@@ -3223,7 +3224,7 @@
           <a:p>
             <a:fld id="{9AA7D095-A676-4F6B-9416-D65D798F5244}" type="datetimeFigureOut">
               <a:rPr lang="de-DE" smtClean="0"/>
-              <a:t>18.05.2015</a:t>
+              <a:t>09.06.2015</a:t>
             </a:fld>
             <a:endParaRPr lang="de-DE"/>
           </a:p>
@@ -3265,7 +3266,7 @@
           <a:p>
             <a:fld id="{7CA376D3-3280-4351-90C7-FED229B337FE}" type="slidenum">
               <a:rPr lang="de-DE" smtClean="0"/>
-              <a:t>‹#›</a:t>
+              <a:t>‹Nr.›</a:t>
             </a:fld>
             <a:endParaRPr lang="de-DE"/>
           </a:p>
@@ -3469,7 +3470,7 @@
           <a:p>
             <a:fld id="{9AA7D095-A676-4F6B-9416-D65D798F5244}" type="datetimeFigureOut">
               <a:rPr lang="de-DE" smtClean="0"/>
-              <a:t>18.05.2015</a:t>
+              <a:t>09.06.2015</a:t>
             </a:fld>
             <a:endParaRPr lang="de-DE"/>
           </a:p>
@@ -3511,7 +3512,7 @@
           <a:p>
             <a:fld id="{7CA376D3-3280-4351-90C7-FED229B337FE}" type="slidenum">
               <a:rPr lang="de-DE" smtClean="0"/>
-              <a:t>‹#›</a:t>
+              <a:t>‹Nr.›</a:t>
             </a:fld>
             <a:endParaRPr lang="de-DE"/>
           </a:p>
@@ -3701,7 +3702,7 @@
           <a:p>
             <a:fld id="{9AA7D095-A676-4F6B-9416-D65D798F5244}" type="datetimeFigureOut">
               <a:rPr lang="de-DE" smtClean="0"/>
-              <a:t>18.05.2015</a:t>
+              <a:t>09.06.2015</a:t>
             </a:fld>
             <a:endParaRPr lang="de-DE"/>
           </a:p>
@@ -3743,7 +3744,7 @@
           <a:p>
             <a:fld id="{7CA376D3-3280-4351-90C7-FED229B337FE}" type="slidenum">
               <a:rPr lang="de-DE" smtClean="0"/>
-              <a:t>‹#›</a:t>
+              <a:t>‹Nr.›</a:t>
             </a:fld>
             <a:endParaRPr lang="de-DE"/>
           </a:p>
@@ -4068,7 +4069,7 @@
           <a:p>
             <a:fld id="{9AA7D095-A676-4F6B-9416-D65D798F5244}" type="datetimeFigureOut">
               <a:rPr lang="de-DE" smtClean="0"/>
-              <a:t>18.05.2015</a:t>
+              <a:t>09.06.2015</a:t>
             </a:fld>
             <a:endParaRPr lang="de-DE"/>
           </a:p>
@@ -4110,7 +4111,7 @@
           <a:p>
             <a:fld id="{7CA376D3-3280-4351-90C7-FED229B337FE}" type="slidenum">
               <a:rPr lang="de-DE" smtClean="0"/>
-              <a:t>‹#›</a:t>
+              <a:t>‹Nr.›</a:t>
             </a:fld>
             <a:endParaRPr lang="de-DE"/>
           </a:p>
@@ -4186,7 +4187,7 @@
           <a:p>
             <a:fld id="{9AA7D095-A676-4F6B-9416-D65D798F5244}" type="datetimeFigureOut">
               <a:rPr lang="de-DE" smtClean="0"/>
-              <a:t>18.05.2015</a:t>
+              <a:t>09.06.2015</a:t>
             </a:fld>
             <a:endParaRPr lang="de-DE"/>
           </a:p>
@@ -4228,7 +4229,7 @@
           <a:p>
             <a:fld id="{7CA376D3-3280-4351-90C7-FED229B337FE}" type="slidenum">
               <a:rPr lang="de-DE" smtClean="0"/>
-              <a:t>‹#›</a:t>
+              <a:t>‹Nr.›</a:t>
             </a:fld>
             <a:endParaRPr lang="de-DE"/>
           </a:p>
@@ -4281,7 +4282,7 @@
           <a:p>
             <a:fld id="{9AA7D095-A676-4F6B-9416-D65D798F5244}" type="datetimeFigureOut">
               <a:rPr lang="de-DE" smtClean="0"/>
-              <a:t>18.05.2015</a:t>
+              <a:t>09.06.2015</a:t>
             </a:fld>
             <a:endParaRPr lang="de-DE"/>
           </a:p>
@@ -4323,7 +4324,7 @@
           <a:p>
             <a:fld id="{7CA376D3-3280-4351-90C7-FED229B337FE}" type="slidenum">
               <a:rPr lang="de-DE" smtClean="0"/>
-              <a:t>‹#›</a:t>
+              <a:t>‹Nr.›</a:t>
             </a:fld>
             <a:endParaRPr lang="de-DE"/>
           </a:p>
@@ -4558,7 +4559,7 @@
           <a:p>
             <a:fld id="{9AA7D095-A676-4F6B-9416-D65D798F5244}" type="datetimeFigureOut">
               <a:rPr lang="de-DE" smtClean="0"/>
-              <a:t>18.05.2015</a:t>
+              <a:t>09.06.2015</a:t>
             </a:fld>
             <a:endParaRPr lang="de-DE"/>
           </a:p>
@@ -4600,7 +4601,7 @@
           <a:p>
             <a:fld id="{7CA376D3-3280-4351-90C7-FED229B337FE}" type="slidenum">
               <a:rPr lang="de-DE" smtClean="0"/>
-              <a:t>‹#›</a:t>
+              <a:t>‹Nr.›</a:t>
             </a:fld>
             <a:endParaRPr lang="de-DE"/>
           </a:p>
@@ -4815,7 +4816,7 @@
           <a:p>
             <a:fld id="{9AA7D095-A676-4F6B-9416-D65D798F5244}" type="datetimeFigureOut">
               <a:rPr lang="de-DE" smtClean="0"/>
-              <a:t>18.05.2015</a:t>
+              <a:t>09.06.2015</a:t>
             </a:fld>
             <a:endParaRPr lang="de-DE"/>
           </a:p>
@@ -4857,7 +4858,7 @@
           <a:p>
             <a:fld id="{7CA376D3-3280-4351-90C7-FED229B337FE}" type="slidenum">
               <a:rPr lang="de-DE" smtClean="0"/>
-              <a:t>‹#›</a:t>
+              <a:t>‹Nr.›</a:t>
             </a:fld>
             <a:endParaRPr lang="de-DE"/>
           </a:p>
@@ -5028,7 +5029,7 @@
           <a:p>
             <a:fld id="{9AA7D095-A676-4F6B-9416-D65D798F5244}" type="datetimeFigureOut">
               <a:rPr lang="de-DE" smtClean="0"/>
-              <a:t>18.05.2015</a:t>
+              <a:t>09.06.2015</a:t>
             </a:fld>
             <a:endParaRPr lang="de-DE"/>
           </a:p>
@@ -5106,7 +5107,7 @@
           <a:p>
             <a:fld id="{7CA376D3-3280-4351-90C7-FED229B337FE}" type="slidenum">
               <a:rPr lang="de-DE" smtClean="0"/>
-              <a:t>‹#›</a:t>
+              <a:t>‹Nr.›</a:t>
             </a:fld>
             <a:endParaRPr lang="de-DE"/>
           </a:p>
@@ -5633,6 +5634,372 @@
 </file>
 
 <file path=ppt/slides/slide10.xml><?xml version="1.0" encoding="utf-8"?>
+<p:sld xmlns:a="http://schemas.openxmlformats.org/drawingml/2006/main" xmlns:r="http://schemas.openxmlformats.org/officeDocument/2006/relationships" xmlns:p="http://schemas.openxmlformats.org/presentationml/2006/main">
+  <p:cSld>
+    <p:spTree>
+      <p:nvGrpSpPr>
+        <p:cNvPr id="1" name=""/>
+        <p:cNvGrpSpPr/>
+        <p:nvPr/>
+      </p:nvGrpSpPr>
+      <p:grpSpPr>
+        <a:xfrm>
+          <a:off x="0" y="0"/>
+          <a:ext cx="0" cy="0"/>
+          <a:chOff x="0" y="0"/>
+          <a:chExt cx="0" cy="0"/>
+        </a:xfrm>
+      </p:grpSpPr>
+      <p:grpSp>
+        <p:nvGrpSpPr>
+          <p:cNvPr id="25" name="Group 24"/>
+          <p:cNvGrpSpPr/>
+          <p:nvPr/>
+        </p:nvGrpSpPr>
+        <p:grpSpPr>
+          <a:xfrm>
+            <a:off x="2921350" y="2435133"/>
+            <a:ext cx="2839659" cy="2839659"/>
+            <a:chOff x="6448425" y="3933826"/>
+            <a:chExt cx="2628900" cy="1409700"/>
+          </a:xfrm>
+          <a:solidFill>
+            <a:schemeClr val="accent1">
+              <a:lumMod val="75000"/>
+            </a:schemeClr>
+          </a:solidFill>
+        </p:grpSpPr>
+        <p:sp>
+          <p:nvSpPr>
+            <p:cNvPr id="26" name="Rounded Rectangle 25"/>
+            <p:cNvSpPr/>
+            <p:nvPr/>
+          </p:nvSpPr>
+          <p:spPr>
+            <a:xfrm>
+              <a:off x="6448425" y="3933826"/>
+              <a:ext cx="2628900" cy="1409700"/>
+            </a:xfrm>
+            <a:prstGeom prst="ellipse">
+              <a:avLst/>
+            </a:prstGeom>
+            <a:grpFill/>
+            <a:ln w="114300">
+              <a:solidFill>
+                <a:schemeClr val="accent1">
+                  <a:lumMod val="50000"/>
+                </a:schemeClr>
+              </a:solidFill>
+            </a:ln>
+          </p:spPr>
+          <p:style>
+            <a:lnRef idx="2">
+              <a:schemeClr val="accent1">
+                <a:shade val="50000"/>
+              </a:schemeClr>
+            </a:lnRef>
+            <a:fillRef idx="1">
+              <a:schemeClr val="accent1"/>
+            </a:fillRef>
+            <a:effectRef idx="0">
+              <a:schemeClr val="accent1"/>
+            </a:effectRef>
+            <a:fontRef idx="minor">
+              <a:schemeClr val="lt1"/>
+            </a:fontRef>
+          </p:style>
+          <p:txBody>
+            <a:bodyPr rtlCol="0" anchor="ctr"/>
+            <a:lstStyle/>
+            <a:p>
+              <a:pPr algn="ctr"/>
+              <a:endParaRPr lang="de-DE"/>
+            </a:p>
+          </p:txBody>
+        </p:sp>
+        <p:sp>
+          <p:nvSpPr>
+            <p:cNvPr id="27" name="TextBox 26"/>
+            <p:cNvSpPr txBox="1"/>
+            <p:nvPr/>
+          </p:nvSpPr>
+          <p:spPr>
+            <a:xfrm>
+              <a:off x="6496810" y="4229323"/>
+              <a:ext cx="2524067" cy="837924"/>
+            </a:xfrm>
+            <a:prstGeom prst="ellipse">
+              <a:avLst/>
+            </a:prstGeom>
+            <a:grpFill/>
+            <a:ln>
+              <a:noFill/>
+            </a:ln>
+          </p:spPr>
+          <p:txBody>
+            <a:bodyPr wrap="square" rtlCol="0">
+              <a:spAutoFit/>
+            </a:bodyPr>
+            <a:lstStyle/>
+            <a:p>
+              <a:pPr algn="ctr"/>
+              <a:r>
+                <a:rPr lang="en-US" sz="3600" b="1" dirty="0">
+                  <a:solidFill>
+                    <a:schemeClr val="bg1"/>
+                  </a:solidFill>
+                </a:rPr>
+                <a:t>Bootable App</a:t>
+              </a:r>
+              <a:endParaRPr lang="de-DE" sz="3600" b="1" dirty="0">
+                <a:solidFill>
+                  <a:schemeClr val="bg1"/>
+                </a:solidFill>
+              </a:endParaRPr>
+            </a:p>
+          </p:txBody>
+        </p:sp>
+      </p:grpSp>
+      <p:cxnSp>
+        <p:nvCxnSpPr>
+          <p:cNvPr id="30" name="Straight Arrow Connector 29"/>
+          <p:cNvCxnSpPr/>
+          <p:nvPr/>
+        </p:nvCxnSpPr>
+        <p:spPr>
+          <a:xfrm>
+            <a:off x="5819191" y="4545761"/>
+            <a:ext cx="2247191" cy="1115015"/>
+          </a:xfrm>
+          <a:prstGeom prst="straightConnector1">
+            <a:avLst/>
+          </a:prstGeom>
+          <a:ln w="254000">
+            <a:solidFill>
+              <a:schemeClr val="tx1">
+                <a:lumMod val="50000"/>
+                <a:lumOff val="50000"/>
+              </a:schemeClr>
+            </a:solidFill>
+            <a:tailEnd type="triangle"/>
+          </a:ln>
+        </p:spPr>
+        <p:style>
+          <a:lnRef idx="1">
+            <a:schemeClr val="accent1"/>
+          </a:lnRef>
+          <a:fillRef idx="0">
+            <a:schemeClr val="accent1"/>
+          </a:fillRef>
+          <a:effectRef idx="0">
+            <a:schemeClr val="accent1"/>
+          </a:effectRef>
+          <a:fontRef idx="minor">
+            <a:schemeClr val="tx1"/>
+          </a:fontRef>
+        </p:style>
+      </p:cxnSp>
+      <p:cxnSp>
+        <p:nvCxnSpPr>
+          <p:cNvPr id="31" name="Straight Arrow Connector 30"/>
+          <p:cNvCxnSpPr/>
+          <p:nvPr/>
+        </p:nvCxnSpPr>
+        <p:spPr>
+          <a:xfrm flipV="1">
+            <a:off x="5837118" y="2031721"/>
+            <a:ext cx="2059640" cy="1133477"/>
+          </a:xfrm>
+          <a:prstGeom prst="straightConnector1">
+            <a:avLst/>
+          </a:prstGeom>
+          <a:ln w="254000">
+            <a:solidFill>
+              <a:schemeClr val="tx1">
+                <a:lumMod val="50000"/>
+                <a:lumOff val="50000"/>
+              </a:schemeClr>
+            </a:solidFill>
+            <a:tailEnd type="triangle"/>
+          </a:ln>
+        </p:spPr>
+        <p:style>
+          <a:lnRef idx="1">
+            <a:schemeClr val="accent1"/>
+          </a:lnRef>
+          <a:fillRef idx="0">
+            <a:schemeClr val="accent1"/>
+          </a:fillRef>
+          <a:effectRef idx="0">
+            <a:schemeClr val="accent1"/>
+          </a:effectRef>
+          <a:fontRef idx="minor">
+            <a:schemeClr val="tx1"/>
+          </a:fontRef>
+        </p:style>
+      </p:cxnSp>
+      <p:grpSp>
+        <p:nvGrpSpPr>
+          <p:cNvPr id="32" name="Group 31"/>
+          <p:cNvGrpSpPr/>
+          <p:nvPr/>
+        </p:nvGrpSpPr>
+        <p:grpSpPr>
+          <a:xfrm>
+            <a:off x="7472822" y="559386"/>
+            <a:ext cx="4056006" cy="2230805"/>
+            <a:chOff x="996328" y="4911830"/>
+            <a:chExt cx="2857500" cy="1571626"/>
+          </a:xfrm>
+        </p:grpSpPr>
+        <p:pic>
+          <p:nvPicPr>
+            <p:cNvPr id="33" name="Picture 2" descr="http://www.discoposse.com/wp-content/uploads/2013/07/virtualbox-logo.png"/>
+            <p:cNvPicPr>
+              <a:picLocks noChangeAspect="1" noChangeArrowheads="1"/>
+            </p:cNvPicPr>
+            <p:nvPr/>
+          </p:nvPicPr>
+          <p:blipFill rotWithShape="1">
+            <a:blip r:embed="rId2">
+              <a:duotone>
+                <a:prstClr val="black"/>
+                <a:schemeClr val="accent3">
+                  <a:tint val="45000"/>
+                  <a:satMod val="400000"/>
+                </a:schemeClr>
+              </a:duotone>
+              <a:extLst>
+                <a:ext uri="{28A0092B-C50C-407E-A947-70E740481C1C}">
+                  <a14:useLocalDpi xmlns:a14="http://schemas.microsoft.com/office/drawing/2010/main" val="0"/>
+                </a:ext>
+              </a:extLst>
+            </a:blip>
+            <a:srcRect l="41418"/>
+            <a:stretch/>
+          </p:blipFill>
+          <p:spPr bwMode="auto">
+            <a:xfrm>
+              <a:off x="2179864" y="4911830"/>
+              <a:ext cx="1673964" cy="1571626"/>
+            </a:xfrm>
+            <a:prstGeom prst="rect">
+              <a:avLst/>
+            </a:prstGeom>
+            <a:noFill/>
+            <a:extLst>
+              <a:ext uri="{909E8E84-426E-40DD-AFC4-6F175D3DCCD1}">
+                <a14:hiddenFill xmlns:a14="http://schemas.microsoft.com/office/drawing/2010/main">
+                  <a:solidFill>
+                    <a:srgbClr val="FFFFFF"/>
+                  </a:solidFill>
+                </a14:hiddenFill>
+              </a:ext>
+            </a:extLst>
+          </p:spPr>
+        </p:pic>
+        <p:pic>
+          <p:nvPicPr>
+            <p:cNvPr id="34" name="Picture 2" descr="http://www.discoposse.com/wp-content/uploads/2013/07/virtualbox-logo.png"/>
+            <p:cNvPicPr>
+              <a:picLocks noChangeAspect="1" noChangeArrowheads="1"/>
+            </p:cNvPicPr>
+            <p:nvPr/>
+          </p:nvPicPr>
+          <p:blipFill rotWithShape="1">
+            <a:blip r:embed="rId2">
+              <a:extLst>
+                <a:ext uri="{28A0092B-C50C-407E-A947-70E740481C1C}">
+                  <a14:useLocalDpi xmlns:a14="http://schemas.microsoft.com/office/drawing/2010/main" val="0"/>
+                </a:ext>
+              </a:extLst>
+            </a:blip>
+            <a:srcRect r="59153"/>
+            <a:stretch/>
+          </p:blipFill>
+          <p:spPr bwMode="auto">
+            <a:xfrm>
+              <a:off x="996328" y="4911830"/>
+              <a:ext cx="1167208" cy="1571626"/>
+            </a:xfrm>
+            <a:prstGeom prst="rect">
+              <a:avLst/>
+            </a:prstGeom>
+            <a:noFill/>
+            <a:extLst>
+              <a:ext uri="{909E8E84-426E-40DD-AFC4-6F175D3DCCD1}">
+                <a14:hiddenFill xmlns:a14="http://schemas.microsoft.com/office/drawing/2010/main">
+                  <a:solidFill>
+                    <a:srgbClr val="FFFFFF"/>
+                  </a:solidFill>
+                </a14:hiddenFill>
+              </a:ext>
+            </a:extLst>
+          </p:spPr>
+        </p:pic>
+      </p:grpSp>
+      <p:pic>
+        <p:nvPicPr>
+          <p:cNvPr id="1026" name="Picture 2" descr="https://a0.awsstatic.com/main/images/logos/aws_logo.png"/>
+          <p:cNvPicPr>
+            <a:picLocks noChangeAspect="1" noChangeArrowheads="1"/>
+          </p:cNvPicPr>
+          <p:nvPr/>
+        </p:nvPicPr>
+        <p:blipFill>
+          <a:blip r:embed="rId3">
+            <a:extLst>
+              <a:ext uri="{28A0092B-C50C-407E-A947-70E740481C1C}">
+                <a14:useLocalDpi xmlns:a14="http://schemas.microsoft.com/office/drawing/2010/main" val="0"/>
+              </a:ext>
+            </a:extLst>
+          </a:blip>
+          <a:srcRect/>
+          <a:stretch>
+            <a:fillRect/>
+          </a:stretch>
+        </p:blipFill>
+        <p:spPr bwMode="auto">
+          <a:xfrm>
+            <a:off x="8177422" y="5464259"/>
+            <a:ext cx="2729664" cy="1031206"/>
+          </a:xfrm>
+          <a:prstGeom prst="rect">
+            <a:avLst/>
+          </a:prstGeom>
+          <a:noFill/>
+          <a:extLst>
+            <a:ext uri="{909E8E84-426E-40DD-AFC4-6F175D3DCCD1}">
+              <a14:hiddenFill xmlns:a14="http://schemas.microsoft.com/office/drawing/2010/main">
+                <a:solidFill>
+                  <a:srgbClr val="FFFFFF"/>
+                </a:solidFill>
+              </a14:hiddenFill>
+            </a:ext>
+          </a:extLst>
+        </p:spPr>
+      </p:pic>
+    </p:spTree>
+    <p:extLst>
+      <p:ext uri="{BB962C8B-B14F-4D97-AF65-F5344CB8AC3E}">
+        <p14:creationId xmlns:p14="http://schemas.microsoft.com/office/powerpoint/2010/main" val="683032843"/>
+      </p:ext>
+    </p:extLst>
+  </p:cSld>
+  <p:clrMapOvr>
+    <a:masterClrMapping/>
+  </p:clrMapOvr>
+  <p:timing>
+    <p:tnLst>
+      <p:par>
+        <p:cTn id="1" dur="indefinite" restart="never" nodeType="tmRoot"/>
+      </p:par>
+    </p:tnLst>
+  </p:timing>
+</p:sld>
+</file>
+
+<file path=ppt/slides/slide11.xml><?xml version="1.0" encoding="utf-8"?>
 <p:sld xmlns:a="http://schemas.openxmlformats.org/drawingml/2006/main" xmlns:r="http://schemas.openxmlformats.org/officeDocument/2006/relationships" xmlns:p="http://schemas.openxmlformats.org/presentationml/2006/main">
   <p:cSld>
     <p:spTree>
@@ -7738,6 +8105,181 @@
           </p:txBody>
         </p:sp>
       </p:grpSp>
+      <p:grpSp>
+        <p:nvGrpSpPr>
+          <p:cNvPr id="66" name="Group 41"/>
+          <p:cNvGrpSpPr/>
+          <p:nvPr/>
+        </p:nvGrpSpPr>
+        <p:grpSpPr>
+          <a:xfrm>
+            <a:off x="4477826" y="666512"/>
+            <a:ext cx="1423555" cy="685800"/>
+            <a:chOff x="1159246" y="646669"/>
+            <a:chExt cx="1423555" cy="685800"/>
+          </a:xfrm>
+        </p:grpSpPr>
+        <p:sp>
+          <p:nvSpPr>
+            <p:cNvPr id="67" name="Snip Diagonal Corner Rectangle 95"/>
+            <p:cNvSpPr/>
+            <p:nvPr/>
+          </p:nvSpPr>
+          <p:spPr>
+            <a:xfrm>
+              <a:off x="1171833" y="646669"/>
+              <a:ext cx="1402491" cy="685800"/>
+            </a:xfrm>
+            <a:prstGeom prst="snip2SameRect">
+              <a:avLst/>
+            </a:prstGeom>
+            <a:solidFill>
+              <a:srgbClr val="996633"/>
+            </a:solidFill>
+            <a:ln w="76200">
+              <a:solidFill>
+                <a:srgbClr val="663300"/>
+              </a:solidFill>
+            </a:ln>
+          </p:spPr>
+          <p:style>
+            <a:lnRef idx="2">
+              <a:schemeClr val="accent4">
+                <a:shade val="50000"/>
+              </a:schemeClr>
+            </a:lnRef>
+            <a:fillRef idx="1">
+              <a:schemeClr val="accent4"/>
+            </a:fillRef>
+            <a:effectRef idx="0">
+              <a:schemeClr val="accent4"/>
+            </a:effectRef>
+            <a:fontRef idx="minor">
+              <a:schemeClr val="lt1"/>
+            </a:fontRef>
+          </p:style>
+          <p:txBody>
+            <a:bodyPr rtlCol="0" anchor="ctr"/>
+            <a:lstStyle/>
+            <a:p>
+              <a:pPr algn="ctr"/>
+              <a:endParaRPr lang="de-DE" dirty="0"/>
+            </a:p>
+          </p:txBody>
+        </p:sp>
+        <p:sp>
+          <p:nvSpPr>
+            <p:cNvPr id="68" name="TextBox 96"/>
+            <p:cNvSpPr txBox="1"/>
+            <p:nvPr/>
+          </p:nvSpPr>
+          <p:spPr>
+            <a:xfrm>
+              <a:off x="1159246" y="793462"/>
+              <a:ext cx="1423555" cy="442674"/>
+            </a:xfrm>
+            <a:prstGeom prst="snip2SameRect">
+              <a:avLst/>
+            </a:prstGeom>
+            <a:noFill/>
+            <a:ln w="76200">
+              <a:noFill/>
+            </a:ln>
+          </p:spPr>
+          <p:txBody>
+            <a:bodyPr wrap="square" rtlCol="0">
+              <a:spAutoFit/>
+            </a:bodyPr>
+            <a:lstStyle/>
+            <a:p>
+              <a:pPr algn="ctr"/>
+              <a:r>
+                <a:rPr lang="en-US" sz="2000" b="1" dirty="0" smtClean="0">
+                  <a:solidFill>
+                    <a:schemeClr val="bg1"/>
+                  </a:solidFill>
+                </a:rPr>
+                <a:t>App</a:t>
+              </a:r>
+              <a:endParaRPr lang="de-DE" sz="2400" b="1" dirty="0">
+                <a:solidFill>
+                  <a:schemeClr val="bg1"/>
+                </a:solidFill>
+              </a:endParaRPr>
+            </a:p>
+          </p:txBody>
+        </p:sp>
+      </p:grpSp>
+      <p:cxnSp>
+        <p:nvCxnSpPr>
+          <p:cNvPr id="92" name="Straight Arrow Connector 62"/>
+          <p:cNvCxnSpPr/>
+          <p:nvPr/>
+        </p:nvCxnSpPr>
+        <p:spPr>
+          <a:xfrm flipV="1">
+            <a:off x="6148582" y="998999"/>
+            <a:ext cx="1370502" cy="10481"/>
+          </a:xfrm>
+          <a:prstGeom prst="straightConnector1">
+            <a:avLst/>
+          </a:prstGeom>
+          <a:ln w="142875">
+            <a:solidFill>
+              <a:schemeClr val="tx1">
+                <a:lumMod val="50000"/>
+                <a:lumOff val="50000"/>
+              </a:schemeClr>
+            </a:solidFill>
+            <a:tailEnd type="triangle"/>
+          </a:ln>
+        </p:spPr>
+        <p:style>
+          <a:lnRef idx="1">
+            <a:schemeClr val="accent1"/>
+          </a:lnRef>
+          <a:fillRef idx="0">
+            <a:schemeClr val="accent1"/>
+          </a:fillRef>
+          <a:effectRef idx="0">
+            <a:schemeClr val="accent1"/>
+          </a:effectRef>
+          <a:fontRef idx="minor">
+            <a:schemeClr val="tx1"/>
+          </a:fontRef>
+        </p:style>
+      </p:cxnSp>
+      <p:sp>
+        <p:nvSpPr>
+          <p:cNvPr id="94" name="TextBox 63"/>
+          <p:cNvSpPr txBox="1"/>
+          <p:nvPr/>
+        </p:nvSpPr>
+        <p:spPr>
+          <a:xfrm>
+            <a:off x="6124779" y="335412"/>
+            <a:ext cx="1335331" cy="523220"/>
+          </a:xfrm>
+          <a:prstGeom prst="rect">
+            <a:avLst/>
+          </a:prstGeom>
+          <a:noFill/>
+        </p:spPr>
+        <p:txBody>
+          <a:bodyPr wrap="square" rtlCol="0">
+            <a:spAutoFit/>
+          </a:bodyPr>
+          <a:lstStyle/>
+          <a:p>
+            <a:pPr algn="ctr"/>
+            <a:r>
+              <a:rPr lang="en-US" sz="2800" b="1" dirty="0" smtClean="0"/>
+              <a:t>create</a:t>
+            </a:r>
+            <a:endParaRPr lang="de-DE" sz="2800" b="1" dirty="0"/>
+          </a:p>
+        </p:txBody>
+      </p:sp>
     </p:spTree>
     <p:extLst>
       <p:ext uri="{BB962C8B-B14F-4D97-AF65-F5344CB8AC3E}">
@@ -7758,7 +8300,7 @@
 </p:sld>
 </file>
 
-<file path=ppt/slides/slide11.xml><?xml version="1.0" encoding="utf-8"?>
+<file path=ppt/slides/slide12.xml><?xml version="1.0" encoding="utf-8"?>
 <p:sld xmlns:a="http://schemas.openxmlformats.org/drawingml/2006/main" xmlns:r="http://schemas.openxmlformats.org/officeDocument/2006/relationships" xmlns:p="http://schemas.openxmlformats.org/presentationml/2006/main">
   <p:cSld>
     <p:spTree>
@@ -8645,7 +9187,7 @@
 </p:sld>
 </file>
 
-<file path=ppt/slides/slide12.xml><?xml version="1.0" encoding="utf-8"?>
+<file path=ppt/slides/slide13.xml><?xml version="1.0" encoding="utf-8"?>
 <p:sld xmlns:a="http://schemas.openxmlformats.org/drawingml/2006/main" xmlns:r="http://schemas.openxmlformats.org/officeDocument/2006/relationships" xmlns:p="http://schemas.openxmlformats.org/presentationml/2006/main">
   <p:cSld>
     <p:spTree>
@@ -9710,6 +10252,312 @@
           </p:txBody>
         </p:sp>
       </p:grpSp>
+      <p:grpSp>
+        <p:nvGrpSpPr>
+          <p:cNvPr id="35" name="Group 17"/>
+          <p:cNvGrpSpPr/>
+          <p:nvPr/>
+        </p:nvGrpSpPr>
+        <p:grpSpPr>
+          <a:xfrm>
+            <a:off x="10157777" y="4473617"/>
+            <a:ext cx="3239954" cy="2215991"/>
+            <a:chOff x="7477384" y="5317103"/>
+            <a:chExt cx="3239954" cy="2215991"/>
+          </a:xfrm>
+        </p:grpSpPr>
+        <p:sp>
+          <p:nvSpPr>
+            <p:cNvPr id="36" name="Rectangle 15"/>
+            <p:cNvSpPr/>
+            <p:nvPr/>
+          </p:nvSpPr>
+          <p:spPr>
+            <a:xfrm>
+              <a:off x="7926012" y="5317103"/>
+              <a:ext cx="2791326" cy="2215991"/>
+            </a:xfrm>
+            <a:prstGeom prst="rect">
+              <a:avLst/>
+            </a:prstGeom>
+          </p:spPr>
+          <p:txBody>
+            <a:bodyPr wrap="square">
+              <a:spAutoFit/>
+            </a:bodyPr>
+            <a:lstStyle/>
+            <a:p>
+              <a:r>
+                <a:rPr lang="de-DE" sz="13800" dirty="0">
+                  <a:solidFill>
+                    <a:schemeClr val="tx2">
+                      <a:lumMod val="60000"/>
+                      <a:lumOff val="40000"/>
+                    </a:schemeClr>
+                  </a:solidFill>
+                  <a:latin typeface="FontAwesome" pitchFamily="2" charset="0"/>
+                </a:rPr>
+                <a:t></a:t>
+              </a:r>
+              <a:endParaRPr lang="de-DE" sz="2400" dirty="0">
+                <a:latin typeface="FontAwesome" pitchFamily="2" charset="0"/>
+              </a:endParaRPr>
+            </a:p>
+          </p:txBody>
+        </p:sp>
+        <p:sp>
+          <p:nvSpPr>
+            <p:cNvPr id="37" name="Rectangle 16"/>
+            <p:cNvSpPr/>
+            <p:nvPr/>
+          </p:nvSpPr>
+          <p:spPr>
+            <a:xfrm>
+              <a:off x="8428894" y="5748821"/>
+              <a:ext cx="1050288" cy="1708160"/>
+            </a:xfrm>
+            <a:prstGeom prst="rect">
+              <a:avLst/>
+            </a:prstGeom>
+          </p:spPr>
+          <p:txBody>
+            <a:bodyPr wrap="none">
+              <a:spAutoFit/>
+            </a:bodyPr>
+            <a:lstStyle/>
+            <a:p>
+              <a:r>
+                <a:rPr lang="de-DE" sz="10500" dirty="0">
+                  <a:solidFill>
+                    <a:schemeClr val="tx2"/>
+                  </a:solidFill>
+                  <a:latin typeface="FontAwesome" pitchFamily="2" charset="0"/>
+                </a:rPr>
+                <a:t></a:t>
+              </a:r>
+              <a:endParaRPr lang="de-DE" sz="10500" dirty="0">
+                <a:solidFill>
+                  <a:schemeClr val="tx2"/>
+                </a:solidFill>
+              </a:endParaRPr>
+            </a:p>
+          </p:txBody>
+        </p:sp>
+        <p:sp>
+          <p:nvSpPr>
+            <p:cNvPr id="38" name="TextBox 85"/>
+            <p:cNvSpPr txBox="1"/>
+            <p:nvPr/>
+          </p:nvSpPr>
+          <p:spPr>
+            <a:xfrm>
+              <a:off x="7477384" y="6548681"/>
+              <a:ext cx="2953724" cy="400110"/>
+            </a:xfrm>
+            <a:prstGeom prst="rect">
+              <a:avLst/>
+            </a:prstGeom>
+            <a:noFill/>
+          </p:spPr>
+          <p:txBody>
+            <a:bodyPr wrap="square" rtlCol="0">
+              <a:spAutoFit/>
+            </a:bodyPr>
+            <a:lstStyle/>
+            <a:p>
+              <a:pPr algn="ctr"/>
+              <a:r>
+                <a:rPr lang="en-US" sz="2000" b="1" dirty="0">
+                  <a:solidFill>
+                    <a:schemeClr val="bg1"/>
+                  </a:solidFill>
+                </a:rPr>
+                <a:t>Boxfuse Vault</a:t>
+              </a:r>
+              <a:endParaRPr lang="de-DE" sz="2000" b="1" dirty="0">
+                <a:solidFill>
+                  <a:schemeClr val="bg1"/>
+                </a:solidFill>
+              </a:endParaRPr>
+            </a:p>
+          </p:txBody>
+        </p:sp>
+      </p:grpSp>
+      <p:grpSp>
+        <p:nvGrpSpPr>
+          <p:cNvPr id="47" name="Group 41"/>
+          <p:cNvGrpSpPr/>
+          <p:nvPr/>
+        </p:nvGrpSpPr>
+        <p:grpSpPr>
+          <a:xfrm>
+            <a:off x="7511933" y="5458683"/>
+            <a:ext cx="1423555" cy="685800"/>
+            <a:chOff x="1159246" y="646669"/>
+            <a:chExt cx="1423555" cy="685800"/>
+          </a:xfrm>
+        </p:grpSpPr>
+        <p:sp>
+          <p:nvSpPr>
+            <p:cNvPr id="48" name="Snip Diagonal Corner Rectangle 95"/>
+            <p:cNvSpPr/>
+            <p:nvPr/>
+          </p:nvSpPr>
+          <p:spPr>
+            <a:xfrm>
+              <a:off x="1171833" y="646669"/>
+              <a:ext cx="1402491" cy="685800"/>
+            </a:xfrm>
+            <a:prstGeom prst="snip2SameRect">
+              <a:avLst/>
+            </a:prstGeom>
+            <a:solidFill>
+              <a:srgbClr val="996633"/>
+            </a:solidFill>
+            <a:ln w="76200">
+              <a:solidFill>
+                <a:srgbClr val="663300"/>
+              </a:solidFill>
+            </a:ln>
+          </p:spPr>
+          <p:style>
+            <a:lnRef idx="2">
+              <a:schemeClr val="accent4">
+                <a:shade val="50000"/>
+              </a:schemeClr>
+            </a:lnRef>
+            <a:fillRef idx="1">
+              <a:schemeClr val="accent4"/>
+            </a:fillRef>
+            <a:effectRef idx="0">
+              <a:schemeClr val="accent4"/>
+            </a:effectRef>
+            <a:fontRef idx="minor">
+              <a:schemeClr val="lt1"/>
+            </a:fontRef>
+          </p:style>
+          <p:txBody>
+            <a:bodyPr rtlCol="0" anchor="ctr"/>
+            <a:lstStyle/>
+            <a:p>
+              <a:pPr algn="ctr"/>
+              <a:endParaRPr lang="de-DE" dirty="0"/>
+            </a:p>
+          </p:txBody>
+        </p:sp>
+        <p:sp>
+          <p:nvSpPr>
+            <p:cNvPr id="49" name="TextBox 96"/>
+            <p:cNvSpPr txBox="1"/>
+            <p:nvPr/>
+          </p:nvSpPr>
+          <p:spPr>
+            <a:xfrm>
+              <a:off x="1159246" y="793462"/>
+              <a:ext cx="1423555" cy="442674"/>
+            </a:xfrm>
+            <a:prstGeom prst="snip2SameRect">
+              <a:avLst/>
+            </a:prstGeom>
+            <a:noFill/>
+            <a:ln w="76200">
+              <a:noFill/>
+            </a:ln>
+          </p:spPr>
+          <p:txBody>
+            <a:bodyPr wrap="square" rtlCol="0">
+              <a:spAutoFit/>
+            </a:bodyPr>
+            <a:lstStyle/>
+            <a:p>
+              <a:pPr algn="ctr"/>
+              <a:r>
+                <a:rPr lang="en-US" sz="2000" b="1" dirty="0" smtClean="0">
+                  <a:solidFill>
+                    <a:schemeClr val="bg1"/>
+                  </a:solidFill>
+                </a:rPr>
+                <a:t>App</a:t>
+              </a:r>
+              <a:endParaRPr lang="de-DE" sz="2400" b="1" dirty="0">
+                <a:solidFill>
+                  <a:schemeClr val="bg1"/>
+                </a:solidFill>
+              </a:endParaRPr>
+            </a:p>
+          </p:txBody>
+        </p:sp>
+      </p:grpSp>
+      <p:cxnSp>
+        <p:nvCxnSpPr>
+          <p:cNvPr id="50" name="Straight Arrow Connector 62"/>
+          <p:cNvCxnSpPr/>
+          <p:nvPr/>
+        </p:nvCxnSpPr>
+        <p:spPr>
+          <a:xfrm flipV="1">
+            <a:off x="9182689" y="5791170"/>
+            <a:ext cx="1370502" cy="10481"/>
+          </a:xfrm>
+          <a:prstGeom prst="straightConnector1">
+            <a:avLst/>
+          </a:prstGeom>
+          <a:ln w="142875">
+            <a:solidFill>
+              <a:schemeClr val="tx1">
+                <a:lumMod val="50000"/>
+                <a:lumOff val="50000"/>
+              </a:schemeClr>
+            </a:solidFill>
+            <a:tailEnd type="triangle"/>
+          </a:ln>
+        </p:spPr>
+        <p:style>
+          <a:lnRef idx="1">
+            <a:schemeClr val="accent1"/>
+          </a:lnRef>
+          <a:fillRef idx="0">
+            <a:schemeClr val="accent1"/>
+          </a:fillRef>
+          <a:effectRef idx="0">
+            <a:schemeClr val="accent1"/>
+          </a:effectRef>
+          <a:fontRef idx="minor">
+            <a:schemeClr val="tx1"/>
+          </a:fontRef>
+        </p:style>
+      </p:cxnSp>
+      <p:sp>
+        <p:nvSpPr>
+          <p:cNvPr id="51" name="TextBox 63"/>
+          <p:cNvSpPr txBox="1"/>
+          <p:nvPr/>
+        </p:nvSpPr>
+        <p:spPr>
+          <a:xfrm>
+            <a:off x="9158886" y="5127583"/>
+            <a:ext cx="1335331" cy="523220"/>
+          </a:xfrm>
+          <a:prstGeom prst="rect">
+            <a:avLst/>
+          </a:prstGeom>
+          <a:noFill/>
+        </p:spPr>
+        <p:txBody>
+          <a:bodyPr wrap="square" rtlCol="0">
+            <a:spAutoFit/>
+          </a:bodyPr>
+          <a:lstStyle/>
+          <a:p>
+            <a:pPr algn="ctr"/>
+            <a:r>
+              <a:rPr lang="en-US" sz="2800" b="1" dirty="0" smtClean="0"/>
+              <a:t>create</a:t>
+            </a:r>
+            <a:endParaRPr lang="de-DE" sz="2800" b="1" dirty="0"/>
+          </a:p>
+        </p:txBody>
+      </p:sp>
     </p:spTree>
     <p:extLst>
       <p:ext uri="{BB962C8B-B14F-4D97-AF65-F5344CB8AC3E}">
@@ -9730,7 +10578,7 @@
 </p:sld>
 </file>
 
-<file path=ppt/slides/slide13.xml><?xml version="1.0" encoding="utf-8"?>
+<file path=ppt/slides/slide14.xml><?xml version="1.0" encoding="utf-8"?>
 <p:sld xmlns:a="http://schemas.openxmlformats.org/drawingml/2006/main" xmlns:r="http://schemas.openxmlformats.org/officeDocument/2006/relationships" xmlns:p="http://schemas.openxmlformats.org/presentationml/2006/main">
   <p:cSld>
     <p:spTree>
@@ -10517,7 +11365,7 @@
 </p:sld>
 </file>
 
-<file path=ppt/slides/slide14.xml><?xml version="1.0" encoding="utf-8"?>
+<file path=ppt/slides/slide15.xml><?xml version="1.0" encoding="utf-8"?>
 <p:sld xmlns:a="http://schemas.openxmlformats.org/drawingml/2006/main" xmlns:r="http://schemas.openxmlformats.org/officeDocument/2006/relationships" xmlns:p="http://schemas.openxmlformats.org/presentationml/2006/main">
   <p:cSld>
     <p:spTree>
@@ -11037,7 +11885,7 @@
 </p:sld>
 </file>
 
-<file path=ppt/slides/slide15.xml><?xml version="1.0" encoding="utf-8"?>
+<file path=ppt/slides/slide16.xml><?xml version="1.0" encoding="utf-8"?>
 <p:sld xmlns:a="http://schemas.openxmlformats.org/drawingml/2006/main" xmlns:r="http://schemas.openxmlformats.org/officeDocument/2006/relationships" xmlns:p="http://schemas.openxmlformats.org/presentationml/2006/main">
   <p:cSld>
     <p:spTree>
@@ -11884,7 +12732,7 @@
 </p:sld>
 </file>
 
-<file path=ppt/slides/slide16.xml><?xml version="1.0" encoding="utf-8"?>
+<file path=ppt/slides/slide17.xml><?xml version="1.0" encoding="utf-8"?>
 <p:sld xmlns:a="http://schemas.openxmlformats.org/drawingml/2006/main" xmlns:r="http://schemas.openxmlformats.org/officeDocument/2006/relationships" xmlns:p="http://schemas.openxmlformats.org/presentationml/2006/main">
   <p:cSld>
     <p:spTree>
@@ -12830,7 +13678,7 @@
 </p:sld>
 </file>
 
-<file path=ppt/slides/slide17.xml><?xml version="1.0" encoding="utf-8"?>
+<file path=ppt/slides/slide18.xml><?xml version="1.0" encoding="utf-8"?>
 <p:sld xmlns:a="http://schemas.openxmlformats.org/drawingml/2006/main" xmlns:r="http://schemas.openxmlformats.org/officeDocument/2006/relationships" xmlns:p="http://schemas.openxmlformats.org/presentationml/2006/main">
   <p:cSld>
     <p:spTree>
@@ -13325,7 +14173,7 @@
 </p:sld>
 </file>
 
-<file path=ppt/slides/slide18.xml><?xml version="1.0" encoding="utf-8"?>
+<file path=ppt/slides/slide19.xml><?xml version="1.0" encoding="utf-8"?>
 <p:sld xmlns:a="http://schemas.openxmlformats.org/drawingml/2006/main" xmlns:r="http://schemas.openxmlformats.org/officeDocument/2006/relationships" xmlns:p="http://schemas.openxmlformats.org/presentationml/2006/main">
   <p:cSld>
     <p:spTree>
@@ -13976,337 +14824,6 @@
 </p:sld>
 </file>
 
-<file path=ppt/slides/slide19.xml><?xml version="1.0" encoding="utf-8"?>
-<p:sld xmlns:a="http://schemas.openxmlformats.org/drawingml/2006/main" xmlns:r="http://schemas.openxmlformats.org/officeDocument/2006/relationships" xmlns:p="http://schemas.openxmlformats.org/presentationml/2006/main">
-  <p:cSld>
-    <p:spTree>
-      <p:nvGrpSpPr>
-        <p:cNvPr id="1" name=""/>
-        <p:cNvGrpSpPr/>
-        <p:nvPr/>
-      </p:nvGrpSpPr>
-      <p:grpSpPr>
-        <a:xfrm>
-          <a:off x="0" y="0"/>
-          <a:ext cx="0" cy="0"/>
-          <a:chOff x="0" y="0"/>
-          <a:chExt cx="0" cy="0"/>
-        </a:xfrm>
-      </p:grpSpPr>
-      <p:sp>
-        <p:nvSpPr>
-          <p:cNvPr id="6" name="Rounded Rectangle 75"/>
-          <p:cNvSpPr/>
-          <p:nvPr/>
-        </p:nvSpPr>
-        <p:spPr>
-          <a:xfrm>
-            <a:off x="1738157" y="1766426"/>
-            <a:ext cx="1441656" cy="1514439"/>
-          </a:xfrm>
-          <a:prstGeom prst="rect">
-            <a:avLst/>
-          </a:prstGeom>
-          <a:solidFill>
-            <a:schemeClr val="accent2">
-              <a:lumMod val="75000"/>
-            </a:schemeClr>
-          </a:solidFill>
-          <a:ln w="76200">
-            <a:solidFill>
-              <a:schemeClr val="accent2">
-                <a:lumMod val="50000"/>
-              </a:schemeClr>
-            </a:solidFill>
-          </a:ln>
-        </p:spPr>
-        <p:style>
-          <a:lnRef idx="2">
-            <a:schemeClr val="accent1">
-              <a:shade val="50000"/>
-            </a:schemeClr>
-          </a:lnRef>
-          <a:fillRef idx="1">
-            <a:schemeClr val="accent1"/>
-          </a:fillRef>
-          <a:effectRef idx="0">
-            <a:schemeClr val="accent1"/>
-          </a:effectRef>
-          <a:fontRef idx="minor">
-            <a:schemeClr val="lt1"/>
-          </a:fontRef>
-        </p:style>
-        <p:txBody>
-          <a:bodyPr rtlCol="0" anchor="ctr"/>
-          <a:lstStyle/>
-          <a:p>
-            <a:pPr algn="ctr"/>
-            <a:r>
-              <a:rPr lang="en-US" sz="2000" b="1" dirty="0"/>
-              <a:t>Instance</a:t>
-            </a:r>
-            <a:endParaRPr lang="de-DE" sz="2000" b="1" dirty="0"/>
-          </a:p>
-        </p:txBody>
-      </p:sp>
-      <p:grpSp>
-        <p:nvGrpSpPr>
-          <p:cNvPr id="22" name="Group 21"/>
-          <p:cNvGrpSpPr/>
-          <p:nvPr/>
-        </p:nvGrpSpPr>
-        <p:grpSpPr>
-          <a:xfrm>
-            <a:off x="5279415" y="133588"/>
-            <a:ext cx="2242751" cy="1789646"/>
-            <a:chOff x="1294361" y="4557307"/>
-            <a:chExt cx="2242751" cy="1789646"/>
-          </a:xfrm>
-        </p:grpSpPr>
-        <p:pic>
-          <p:nvPicPr>
-            <p:cNvPr id="4" name="Picture 2" descr="Console showing log4J logs"/>
-            <p:cNvPicPr>
-              <a:picLocks noChangeAspect="1" noChangeArrowheads="1"/>
-            </p:cNvPicPr>
-            <p:nvPr/>
-          </p:nvPicPr>
-          <p:blipFill>
-            <a:blip r:embed="rId2">
-              <a:extLst>
-                <a:ext uri="{28A0092B-C50C-407E-A947-70E740481C1C}">
-                  <a14:useLocalDpi xmlns:a14="http://schemas.microsoft.com/office/drawing/2010/main" val="0"/>
-                </a:ext>
-              </a:extLst>
-            </a:blip>
-            <a:srcRect/>
-            <a:stretch>
-              <a:fillRect/>
-            </a:stretch>
-          </p:blipFill>
-          <p:spPr bwMode="auto">
-            <a:xfrm>
-              <a:off x="1421028" y="4557307"/>
-              <a:ext cx="2004202" cy="1459059"/>
-            </a:xfrm>
-            <a:prstGeom prst="rect">
-              <a:avLst/>
-            </a:prstGeom>
-            <a:noFill/>
-            <a:extLst>
-              <a:ext uri="{909E8E84-426E-40DD-AFC4-6F175D3DCCD1}">
-                <a14:hiddenFill xmlns:a14="http://schemas.microsoft.com/office/drawing/2010/main">
-                  <a:solidFill>
-                    <a:srgbClr val="FFFFFF"/>
-                  </a:solidFill>
-                </a14:hiddenFill>
-              </a:ext>
-            </a:extLst>
-          </p:spPr>
-        </p:pic>
-        <p:sp>
-          <p:nvSpPr>
-            <p:cNvPr id="9" name="TextBox 8"/>
-            <p:cNvSpPr txBox="1"/>
-            <p:nvPr/>
-          </p:nvSpPr>
-          <p:spPr>
-            <a:xfrm>
-              <a:off x="1294361" y="5946843"/>
-              <a:ext cx="2242751" cy="400110"/>
-            </a:xfrm>
-            <a:prstGeom prst="rect">
-              <a:avLst/>
-            </a:prstGeom>
-            <a:noFill/>
-          </p:spPr>
-          <p:txBody>
-            <a:bodyPr wrap="square" rtlCol="0">
-              <a:spAutoFit/>
-            </a:bodyPr>
-            <a:lstStyle/>
-            <a:p>
-              <a:pPr algn="ctr"/>
-              <a:r>
-                <a:rPr lang="en-US" sz="2000" b="1" dirty="0"/>
-                <a:t>I</a:t>
-              </a:r>
-              <a:r>
-                <a:rPr lang="en-US" sz="2000" b="1" dirty="0" smtClean="0"/>
-                <a:t>nstance Boot logs</a:t>
-              </a:r>
-              <a:endParaRPr lang="de-DE" sz="2000" b="1" dirty="0"/>
-            </a:p>
-          </p:txBody>
-        </p:sp>
-      </p:grpSp>
-      <p:cxnSp>
-        <p:nvCxnSpPr>
-          <p:cNvPr id="11" name="Straight Arrow Connector 10"/>
-          <p:cNvCxnSpPr/>
-          <p:nvPr/>
-        </p:nvCxnSpPr>
-        <p:spPr>
-          <a:xfrm>
-            <a:off x="3354363" y="2909124"/>
-            <a:ext cx="1823118" cy="699049"/>
-          </a:xfrm>
-          <a:prstGeom prst="straightConnector1">
-            <a:avLst/>
-          </a:prstGeom>
-          <a:ln w="142875">
-            <a:solidFill>
-              <a:schemeClr val="tx1">
-                <a:lumMod val="50000"/>
-                <a:lumOff val="50000"/>
-              </a:schemeClr>
-            </a:solidFill>
-            <a:tailEnd type="triangle"/>
-          </a:ln>
-        </p:spPr>
-        <p:style>
-          <a:lnRef idx="1">
-            <a:schemeClr val="accent1"/>
-          </a:lnRef>
-          <a:fillRef idx="0">
-            <a:schemeClr val="accent1"/>
-          </a:fillRef>
-          <a:effectRef idx="0">
-            <a:schemeClr val="accent1"/>
-          </a:effectRef>
-          <a:fontRef idx="minor">
-            <a:schemeClr val="tx1"/>
-          </a:fontRef>
-        </p:style>
-      </p:cxnSp>
-      <p:cxnSp>
-        <p:nvCxnSpPr>
-          <p:cNvPr id="15" name="Straight Arrow Connector 14"/>
-          <p:cNvCxnSpPr/>
-          <p:nvPr/>
-        </p:nvCxnSpPr>
-        <p:spPr>
-          <a:xfrm flipV="1">
-            <a:off x="3391929" y="1241855"/>
-            <a:ext cx="1822623" cy="908221"/>
-          </a:xfrm>
-          <a:prstGeom prst="straightConnector1">
-            <a:avLst/>
-          </a:prstGeom>
-          <a:ln w="142875">
-            <a:solidFill>
-              <a:schemeClr val="tx1">
-                <a:lumMod val="50000"/>
-                <a:lumOff val="50000"/>
-              </a:schemeClr>
-            </a:solidFill>
-            <a:tailEnd type="triangle"/>
-          </a:ln>
-        </p:spPr>
-        <p:style>
-          <a:lnRef idx="1">
-            <a:schemeClr val="accent1"/>
-          </a:lnRef>
-          <a:fillRef idx="0">
-            <a:schemeClr val="accent1"/>
-          </a:fillRef>
-          <a:effectRef idx="0">
-            <a:schemeClr val="accent1"/>
-          </a:effectRef>
-          <a:fontRef idx="minor">
-            <a:schemeClr val="tx1"/>
-          </a:fontRef>
-        </p:style>
-      </p:cxnSp>
-      <p:grpSp>
-        <p:nvGrpSpPr>
-          <p:cNvPr id="21" name="Group 20"/>
-          <p:cNvGrpSpPr/>
-          <p:nvPr/>
-        </p:nvGrpSpPr>
-        <p:grpSpPr>
-          <a:xfrm>
-            <a:off x="5302071" y="2991597"/>
-            <a:ext cx="2254085" cy="1814879"/>
-            <a:chOff x="5246466" y="1076300"/>
-            <a:chExt cx="2254085" cy="1814879"/>
-          </a:xfrm>
-        </p:grpSpPr>
-        <p:pic>
-          <p:nvPicPr>
-            <p:cNvPr id="19" name="Picture 18"/>
-            <p:cNvPicPr>
-              <a:picLocks noChangeAspect="1"/>
-            </p:cNvPicPr>
-            <p:nvPr/>
-          </p:nvPicPr>
-          <p:blipFill rotWithShape="1">
-            <a:blip r:embed="rId3"/>
-            <a:srcRect l="861" t="13474" r="845" b="1728"/>
-            <a:stretch/>
-          </p:blipFill>
-          <p:spPr>
-            <a:xfrm>
-              <a:off x="5251619" y="1076300"/>
-              <a:ext cx="2248932" cy="1454185"/>
-            </a:xfrm>
-            <a:prstGeom prst="rect">
-              <a:avLst/>
-            </a:prstGeom>
-          </p:spPr>
-        </p:pic>
-        <p:sp>
-          <p:nvSpPr>
-            <p:cNvPr id="20" name="TextBox 19"/>
-            <p:cNvSpPr txBox="1"/>
-            <p:nvPr/>
-          </p:nvSpPr>
-          <p:spPr>
-            <a:xfrm>
-              <a:off x="5246466" y="2491069"/>
-              <a:ext cx="2242751" cy="400110"/>
-            </a:xfrm>
-            <a:prstGeom prst="rect">
-              <a:avLst/>
-            </a:prstGeom>
-            <a:noFill/>
-          </p:spPr>
-          <p:txBody>
-            <a:bodyPr wrap="square" rtlCol="0">
-              <a:spAutoFit/>
-            </a:bodyPr>
-            <a:lstStyle/>
-            <a:p>
-              <a:pPr algn="ctr"/>
-              <a:r>
-                <a:rPr lang="en-US" sz="2000" b="1" dirty="0" smtClean="0"/>
-                <a:t>Application logs</a:t>
-              </a:r>
-              <a:endParaRPr lang="de-DE" sz="2000" b="1" dirty="0"/>
-            </a:p>
-          </p:txBody>
-        </p:sp>
-      </p:grpSp>
-    </p:spTree>
-    <p:extLst>
-      <p:ext uri="{BB962C8B-B14F-4D97-AF65-F5344CB8AC3E}">
-        <p14:creationId xmlns:p14="http://schemas.microsoft.com/office/powerpoint/2010/main" val="2730884054"/>
-      </p:ext>
-    </p:extLst>
-  </p:cSld>
-  <p:clrMapOvr>
-    <a:masterClrMapping/>
-  </p:clrMapOvr>
-  <p:timing>
-    <p:tnLst>
-      <p:par>
-        <p:cTn id="1" dur="indefinite" restart="never" nodeType="tmRoot"/>
-      </p:par>
-    </p:tnLst>
-  </p:timing>
-</p:sld>
-</file>
-
 <file path=ppt/slides/slide2.xml><?xml version="1.0" encoding="utf-8"?>
 <p:sld xmlns:a="http://schemas.openxmlformats.org/drawingml/2006/main" xmlns:r="http://schemas.openxmlformats.org/officeDocument/2006/relationships" xmlns:p="http://schemas.openxmlformats.org/presentationml/2006/main">
   <p:cSld>
@@ -14879,6 +15396,477 @@
   <p:clrMapOvr>
     <a:masterClrMapping/>
   </p:clrMapOvr>
+</p:sld>
+</file>
+
+<file path=ppt/slides/slide20.xml><?xml version="1.0" encoding="utf-8"?>
+<p:sld xmlns:a="http://schemas.openxmlformats.org/drawingml/2006/main" xmlns:r="http://schemas.openxmlformats.org/officeDocument/2006/relationships" xmlns:p="http://schemas.openxmlformats.org/presentationml/2006/main">
+  <p:cSld>
+    <p:spTree>
+      <p:nvGrpSpPr>
+        <p:cNvPr id="1" name=""/>
+        <p:cNvGrpSpPr/>
+        <p:nvPr/>
+      </p:nvGrpSpPr>
+      <p:grpSpPr>
+        <a:xfrm>
+          <a:off x="0" y="0"/>
+          <a:ext cx="0" cy="0"/>
+          <a:chOff x="0" y="0"/>
+          <a:chExt cx="0" cy="0"/>
+        </a:xfrm>
+      </p:grpSpPr>
+      <p:sp>
+        <p:nvSpPr>
+          <p:cNvPr id="6" name="Rounded Rectangle 75"/>
+          <p:cNvSpPr/>
+          <p:nvPr/>
+        </p:nvSpPr>
+        <p:spPr>
+          <a:xfrm>
+            <a:off x="1738157" y="1766426"/>
+            <a:ext cx="1441656" cy="1514439"/>
+          </a:xfrm>
+          <a:prstGeom prst="rect">
+            <a:avLst/>
+          </a:prstGeom>
+          <a:solidFill>
+            <a:schemeClr val="accent2">
+              <a:lumMod val="75000"/>
+            </a:schemeClr>
+          </a:solidFill>
+          <a:ln w="76200">
+            <a:solidFill>
+              <a:schemeClr val="accent2">
+                <a:lumMod val="50000"/>
+              </a:schemeClr>
+            </a:solidFill>
+          </a:ln>
+        </p:spPr>
+        <p:style>
+          <a:lnRef idx="2">
+            <a:schemeClr val="accent1">
+              <a:shade val="50000"/>
+            </a:schemeClr>
+          </a:lnRef>
+          <a:fillRef idx="1">
+            <a:schemeClr val="accent1"/>
+          </a:fillRef>
+          <a:effectRef idx="0">
+            <a:schemeClr val="accent1"/>
+          </a:effectRef>
+          <a:fontRef idx="minor">
+            <a:schemeClr val="lt1"/>
+          </a:fontRef>
+        </p:style>
+        <p:txBody>
+          <a:bodyPr rtlCol="0" anchor="ctr"/>
+          <a:lstStyle/>
+          <a:p>
+            <a:pPr algn="ctr"/>
+            <a:r>
+              <a:rPr lang="en-US" sz="2000" b="1" dirty="0"/>
+              <a:t>Instance</a:t>
+            </a:r>
+            <a:endParaRPr lang="de-DE" sz="2000" b="1" dirty="0"/>
+          </a:p>
+        </p:txBody>
+      </p:sp>
+      <p:grpSp>
+        <p:nvGrpSpPr>
+          <p:cNvPr id="22" name="Group 21"/>
+          <p:cNvGrpSpPr/>
+          <p:nvPr/>
+        </p:nvGrpSpPr>
+        <p:grpSpPr>
+          <a:xfrm>
+            <a:off x="5279415" y="133588"/>
+            <a:ext cx="2242751" cy="1789646"/>
+            <a:chOff x="1294361" y="4557307"/>
+            <a:chExt cx="2242751" cy="1789646"/>
+          </a:xfrm>
+        </p:grpSpPr>
+        <p:pic>
+          <p:nvPicPr>
+            <p:cNvPr id="4" name="Picture 2" descr="Console showing log4J logs"/>
+            <p:cNvPicPr>
+              <a:picLocks noChangeAspect="1" noChangeArrowheads="1"/>
+            </p:cNvPicPr>
+            <p:nvPr/>
+          </p:nvPicPr>
+          <p:blipFill>
+            <a:blip r:embed="rId2">
+              <a:extLst>
+                <a:ext uri="{28A0092B-C50C-407E-A947-70E740481C1C}">
+                  <a14:useLocalDpi xmlns:a14="http://schemas.microsoft.com/office/drawing/2010/main" val="0"/>
+                </a:ext>
+              </a:extLst>
+            </a:blip>
+            <a:srcRect/>
+            <a:stretch>
+              <a:fillRect/>
+            </a:stretch>
+          </p:blipFill>
+          <p:spPr bwMode="auto">
+            <a:xfrm>
+              <a:off x="1421028" y="4557307"/>
+              <a:ext cx="2004202" cy="1459059"/>
+            </a:xfrm>
+            <a:prstGeom prst="rect">
+              <a:avLst/>
+            </a:prstGeom>
+            <a:noFill/>
+            <a:extLst>
+              <a:ext uri="{909E8E84-426E-40DD-AFC4-6F175D3DCCD1}">
+                <a14:hiddenFill xmlns:a14="http://schemas.microsoft.com/office/drawing/2010/main">
+                  <a:solidFill>
+                    <a:srgbClr val="FFFFFF"/>
+                  </a:solidFill>
+                </a14:hiddenFill>
+              </a:ext>
+            </a:extLst>
+          </p:spPr>
+        </p:pic>
+        <p:sp>
+          <p:nvSpPr>
+            <p:cNvPr id="9" name="TextBox 8"/>
+            <p:cNvSpPr txBox="1"/>
+            <p:nvPr/>
+          </p:nvSpPr>
+          <p:spPr>
+            <a:xfrm>
+              <a:off x="1294361" y="5946843"/>
+              <a:ext cx="2242751" cy="400110"/>
+            </a:xfrm>
+            <a:prstGeom prst="rect">
+              <a:avLst/>
+            </a:prstGeom>
+            <a:noFill/>
+          </p:spPr>
+          <p:txBody>
+            <a:bodyPr wrap="square" rtlCol="0">
+              <a:spAutoFit/>
+            </a:bodyPr>
+            <a:lstStyle/>
+            <a:p>
+              <a:pPr algn="ctr"/>
+              <a:r>
+                <a:rPr lang="en-US" sz="2000" b="1" dirty="0"/>
+                <a:t>I</a:t>
+              </a:r>
+              <a:r>
+                <a:rPr lang="en-US" sz="2000" b="1" dirty="0" smtClean="0"/>
+                <a:t>nstance Boot logs</a:t>
+              </a:r>
+              <a:endParaRPr lang="de-DE" sz="2000" b="1" dirty="0"/>
+            </a:p>
+          </p:txBody>
+        </p:sp>
+      </p:grpSp>
+      <p:cxnSp>
+        <p:nvCxnSpPr>
+          <p:cNvPr id="11" name="Straight Arrow Connector 10"/>
+          <p:cNvCxnSpPr/>
+          <p:nvPr/>
+        </p:nvCxnSpPr>
+        <p:spPr>
+          <a:xfrm>
+            <a:off x="3354363" y="2909124"/>
+            <a:ext cx="1823118" cy="699049"/>
+          </a:xfrm>
+          <a:prstGeom prst="straightConnector1">
+            <a:avLst/>
+          </a:prstGeom>
+          <a:ln w="142875">
+            <a:solidFill>
+              <a:schemeClr val="tx1">
+                <a:lumMod val="50000"/>
+                <a:lumOff val="50000"/>
+              </a:schemeClr>
+            </a:solidFill>
+            <a:tailEnd type="triangle"/>
+          </a:ln>
+        </p:spPr>
+        <p:style>
+          <a:lnRef idx="1">
+            <a:schemeClr val="accent1"/>
+          </a:lnRef>
+          <a:fillRef idx="0">
+            <a:schemeClr val="accent1"/>
+          </a:fillRef>
+          <a:effectRef idx="0">
+            <a:schemeClr val="accent1"/>
+          </a:effectRef>
+          <a:fontRef idx="minor">
+            <a:schemeClr val="tx1"/>
+          </a:fontRef>
+        </p:style>
+      </p:cxnSp>
+      <p:cxnSp>
+        <p:nvCxnSpPr>
+          <p:cNvPr id="15" name="Straight Arrow Connector 14"/>
+          <p:cNvCxnSpPr/>
+          <p:nvPr/>
+        </p:nvCxnSpPr>
+        <p:spPr>
+          <a:xfrm flipV="1">
+            <a:off x="3391929" y="1241855"/>
+            <a:ext cx="1822623" cy="908221"/>
+          </a:xfrm>
+          <a:prstGeom prst="straightConnector1">
+            <a:avLst/>
+          </a:prstGeom>
+          <a:ln w="142875">
+            <a:solidFill>
+              <a:schemeClr val="tx1">
+                <a:lumMod val="50000"/>
+                <a:lumOff val="50000"/>
+              </a:schemeClr>
+            </a:solidFill>
+            <a:tailEnd type="triangle"/>
+          </a:ln>
+        </p:spPr>
+        <p:style>
+          <a:lnRef idx="1">
+            <a:schemeClr val="accent1"/>
+          </a:lnRef>
+          <a:fillRef idx="0">
+            <a:schemeClr val="accent1"/>
+          </a:fillRef>
+          <a:effectRef idx="0">
+            <a:schemeClr val="accent1"/>
+          </a:effectRef>
+          <a:fontRef idx="minor">
+            <a:schemeClr val="tx1"/>
+          </a:fontRef>
+        </p:style>
+      </p:cxnSp>
+      <p:grpSp>
+        <p:nvGrpSpPr>
+          <p:cNvPr id="21" name="Group 20"/>
+          <p:cNvGrpSpPr/>
+          <p:nvPr/>
+        </p:nvGrpSpPr>
+        <p:grpSpPr>
+          <a:xfrm>
+            <a:off x="5302071" y="2991597"/>
+            <a:ext cx="2254085" cy="1814879"/>
+            <a:chOff x="5246466" y="1076300"/>
+            <a:chExt cx="2254085" cy="1814879"/>
+          </a:xfrm>
+        </p:grpSpPr>
+        <p:pic>
+          <p:nvPicPr>
+            <p:cNvPr id="19" name="Picture 18"/>
+            <p:cNvPicPr>
+              <a:picLocks noChangeAspect="1"/>
+            </p:cNvPicPr>
+            <p:nvPr/>
+          </p:nvPicPr>
+          <p:blipFill rotWithShape="1">
+            <a:blip r:embed="rId3"/>
+            <a:srcRect l="861" t="13474" r="845" b="1728"/>
+            <a:stretch/>
+          </p:blipFill>
+          <p:spPr>
+            <a:xfrm>
+              <a:off x="5251619" y="1076300"/>
+              <a:ext cx="2248932" cy="1454185"/>
+            </a:xfrm>
+            <a:prstGeom prst="rect">
+              <a:avLst/>
+            </a:prstGeom>
+          </p:spPr>
+        </p:pic>
+        <p:sp>
+          <p:nvSpPr>
+            <p:cNvPr id="20" name="TextBox 19"/>
+            <p:cNvSpPr txBox="1"/>
+            <p:nvPr/>
+          </p:nvSpPr>
+          <p:spPr>
+            <a:xfrm>
+              <a:off x="5246466" y="2491069"/>
+              <a:ext cx="2242751" cy="400110"/>
+            </a:xfrm>
+            <a:prstGeom prst="rect">
+              <a:avLst/>
+            </a:prstGeom>
+            <a:noFill/>
+          </p:spPr>
+          <p:txBody>
+            <a:bodyPr wrap="square" rtlCol="0">
+              <a:spAutoFit/>
+            </a:bodyPr>
+            <a:lstStyle/>
+            <a:p>
+              <a:pPr algn="ctr"/>
+              <a:r>
+                <a:rPr lang="en-US" sz="2000" b="1" dirty="0" smtClean="0"/>
+                <a:t>Application logs</a:t>
+              </a:r>
+              <a:endParaRPr lang="de-DE" sz="2000" b="1" dirty="0"/>
+            </a:p>
+          </p:txBody>
+        </p:sp>
+      </p:grpSp>
+      <p:pic>
+        <p:nvPicPr>
+          <p:cNvPr id="13" name="Picture 14"/>
+          <p:cNvPicPr>
+            <a:picLocks noChangeAspect="1"/>
+          </p:cNvPicPr>
+          <p:nvPr/>
+        </p:nvPicPr>
+        <p:blipFill>
+          <a:blip r:embed="rId4">
+            <a:extLst>
+              <a:ext uri="{28A0092B-C50C-407E-A947-70E740481C1C}">
+                <a14:useLocalDpi xmlns:a14="http://schemas.microsoft.com/office/drawing/2010/main" val="0"/>
+              </a:ext>
+            </a:extLst>
+          </a:blip>
+          <a:stretch>
+            <a:fillRect/>
+          </a:stretch>
+        </p:blipFill>
+        <p:spPr>
+          <a:xfrm>
+            <a:off x="11487162" y="5696645"/>
+            <a:ext cx="1538745" cy="615498"/>
+          </a:xfrm>
+          <a:prstGeom prst="rect">
+            <a:avLst/>
+          </a:prstGeom>
+        </p:spPr>
+      </p:pic>
+      <p:cxnSp>
+        <p:nvCxnSpPr>
+          <p:cNvPr id="14" name="Straight Arrow Connector 16"/>
+          <p:cNvCxnSpPr/>
+          <p:nvPr/>
+        </p:nvCxnSpPr>
+        <p:spPr>
+          <a:xfrm flipV="1">
+            <a:off x="10213282" y="5978598"/>
+            <a:ext cx="1142403" cy="10481"/>
+          </a:xfrm>
+          <a:prstGeom prst="straightConnector1">
+            <a:avLst/>
+          </a:prstGeom>
+          <a:ln w="142875">
+            <a:solidFill>
+              <a:schemeClr val="tx1">
+                <a:lumMod val="50000"/>
+                <a:lumOff val="50000"/>
+              </a:schemeClr>
+            </a:solidFill>
+            <a:tailEnd type="triangle"/>
+          </a:ln>
+        </p:spPr>
+        <p:style>
+          <a:lnRef idx="1">
+            <a:schemeClr val="accent1"/>
+          </a:lnRef>
+          <a:fillRef idx="0">
+            <a:schemeClr val="accent1"/>
+          </a:fillRef>
+          <a:effectRef idx="0">
+            <a:schemeClr val="accent1"/>
+          </a:effectRef>
+          <a:fontRef idx="minor">
+            <a:schemeClr val="tx1"/>
+          </a:fontRef>
+        </p:style>
+      </p:cxnSp>
+      <p:pic>
+        <p:nvPicPr>
+          <p:cNvPr id="17" name="Picture 22"/>
+          <p:cNvPicPr>
+            <a:picLocks noChangeAspect="1"/>
+          </p:cNvPicPr>
+          <p:nvPr/>
+        </p:nvPicPr>
+        <p:blipFill>
+          <a:blip r:embed="rId5" cstate="print">
+            <a:extLst>
+              <a:ext uri="{28A0092B-C50C-407E-A947-70E740481C1C}">
+                <a14:useLocalDpi xmlns:a14="http://schemas.microsoft.com/office/drawing/2010/main" val="0"/>
+              </a:ext>
+            </a:extLst>
+          </a:blip>
+          <a:stretch>
+            <a:fillRect/>
+          </a:stretch>
+        </p:blipFill>
+        <p:spPr>
+          <a:xfrm>
+            <a:off x="10224886" y="5458727"/>
+            <a:ext cx="1116380" cy="345217"/>
+          </a:xfrm>
+          <a:prstGeom prst="rect">
+            <a:avLst/>
+          </a:prstGeom>
+        </p:spPr>
+      </p:pic>
+      <p:pic>
+        <p:nvPicPr>
+          <p:cNvPr id="1026" name="Picture 2" descr="http://localhost:4000/assets/img/springboot.png"/>
+          <p:cNvPicPr>
+            <a:picLocks noChangeAspect="1" noChangeArrowheads="1"/>
+          </p:cNvPicPr>
+          <p:nvPr/>
+        </p:nvPicPr>
+        <p:blipFill>
+          <a:blip r:embed="rId6">
+            <a:extLst>
+              <a:ext uri="{28A0092B-C50C-407E-A947-70E740481C1C}">
+                <a14:useLocalDpi xmlns:a14="http://schemas.microsoft.com/office/drawing/2010/main" val="0"/>
+              </a:ext>
+            </a:extLst>
+          </a:blip>
+          <a:srcRect/>
+          <a:stretch>
+            <a:fillRect/>
+          </a:stretch>
+        </p:blipFill>
+        <p:spPr bwMode="auto">
+          <a:xfrm>
+            <a:off x="9384568" y="5696644"/>
+            <a:ext cx="682818" cy="615499"/>
+          </a:xfrm>
+          <a:prstGeom prst="rect">
+            <a:avLst/>
+          </a:prstGeom>
+          <a:noFill/>
+          <a:extLst>
+            <a:ext uri="{909E8E84-426E-40DD-AFC4-6F175D3DCCD1}">
+              <a14:hiddenFill xmlns:a14="http://schemas.microsoft.com/office/drawing/2010/main">
+                <a:solidFill>
+                  <a:srgbClr val="FFFFFF"/>
+                </a:solidFill>
+              </a14:hiddenFill>
+            </a:ext>
+          </a:extLst>
+        </p:spPr>
+      </p:pic>
+    </p:spTree>
+    <p:extLst>
+      <p:ext uri="{BB962C8B-B14F-4D97-AF65-F5344CB8AC3E}">
+        <p14:creationId xmlns:p14="http://schemas.microsoft.com/office/powerpoint/2010/main" val="2730884054"/>
+      </p:ext>
+    </p:extLst>
+  </p:cSld>
+  <p:clrMapOvr>
+    <a:masterClrMapping/>
+  </p:clrMapOvr>
+  <p:timing>
+    <p:tnLst>
+      <p:par>
+        <p:cTn id="1" dur="indefinite" restart="never" nodeType="tmRoot"/>
+      </p:par>
+    </p:tnLst>
+  </p:timing>
 </p:sld>
 </file>
 
@@ -17320,6 +18308,2168 @@
       </p:grpSpPr>
       <p:grpSp>
         <p:nvGrpSpPr>
+          <p:cNvPr id="27" name="Group 26"/>
+          <p:cNvGrpSpPr/>
+          <p:nvPr/>
+        </p:nvGrpSpPr>
+        <p:grpSpPr>
+          <a:xfrm>
+            <a:off x="91206" y="212283"/>
+            <a:ext cx="3790954" cy="7019356"/>
+            <a:chOff x="57150" y="-755957"/>
+            <a:chExt cx="3790954" cy="7019356"/>
+          </a:xfrm>
+        </p:grpSpPr>
+        <p:grpSp>
+          <p:nvGrpSpPr>
+            <p:cNvPr id="6" name="Group 5"/>
+            <p:cNvGrpSpPr/>
+            <p:nvPr/>
+          </p:nvGrpSpPr>
+          <p:grpSpPr>
+            <a:xfrm>
+              <a:off x="114300" y="95250"/>
+              <a:ext cx="3676650" cy="6168149"/>
+              <a:chOff x="733425" y="285750"/>
+              <a:chExt cx="3676650" cy="6168149"/>
+            </a:xfrm>
+          </p:grpSpPr>
+          <p:sp>
+            <p:nvSpPr>
+              <p:cNvPr id="5" name="Rounded Rectangle 4"/>
+              <p:cNvSpPr/>
+              <p:nvPr/>
+            </p:nvSpPr>
+            <p:spPr>
+              <a:xfrm>
+                <a:off x="733425" y="285750"/>
+                <a:ext cx="3676650" cy="1838327"/>
+              </a:xfrm>
+              <a:prstGeom prst="roundRect">
+                <a:avLst>
+                  <a:gd name="adj" fmla="val 9672"/>
+                </a:avLst>
+              </a:prstGeom>
+              <a:solidFill>
+                <a:schemeClr val="bg2">
+                  <a:lumMod val="90000"/>
+                </a:schemeClr>
+              </a:solidFill>
+              <a:ln w="114300">
+                <a:solidFill>
+                  <a:schemeClr val="bg1">
+                    <a:lumMod val="50000"/>
+                  </a:schemeClr>
+                </a:solidFill>
+              </a:ln>
+            </p:spPr>
+            <p:style>
+              <a:lnRef idx="2">
+                <a:schemeClr val="accent1">
+                  <a:shade val="50000"/>
+                </a:schemeClr>
+              </a:lnRef>
+              <a:fillRef idx="1">
+                <a:schemeClr val="accent1"/>
+              </a:fillRef>
+              <a:effectRef idx="0">
+                <a:schemeClr val="accent1"/>
+              </a:effectRef>
+              <a:fontRef idx="minor">
+                <a:schemeClr val="lt1"/>
+              </a:fontRef>
+            </p:style>
+            <p:txBody>
+              <a:bodyPr rtlCol="0" anchor="ctr"/>
+              <a:lstStyle/>
+              <a:p>
+                <a:pPr algn="ctr"/>
+                <a:endParaRPr lang="de-DE"/>
+              </a:p>
+            </p:txBody>
+          </p:sp>
+          <p:grpSp>
+            <p:nvGrpSpPr>
+              <p:cNvPr id="4" name="Group 3"/>
+              <p:cNvGrpSpPr/>
+              <p:nvPr/>
+            </p:nvGrpSpPr>
+            <p:grpSpPr>
+              <a:xfrm>
+                <a:off x="1019175" y="504826"/>
+                <a:ext cx="3105150" cy="5949073"/>
+                <a:chOff x="1019175" y="504826"/>
+                <a:chExt cx="3105150" cy="5949073"/>
+              </a:xfrm>
+            </p:grpSpPr>
+            <p:grpSp>
+              <p:nvGrpSpPr>
+                <p:cNvPr id="15" name="Group 14"/>
+                <p:cNvGrpSpPr/>
+                <p:nvPr/>
+              </p:nvGrpSpPr>
+              <p:grpSpPr>
+                <a:xfrm>
+                  <a:off x="1019175" y="504826"/>
+                  <a:ext cx="3105150" cy="1409700"/>
+                  <a:chOff x="6448425" y="3933826"/>
+                  <a:chExt cx="2628900" cy="1409700"/>
+                </a:xfrm>
+              </p:grpSpPr>
+              <p:sp>
+                <p:nvSpPr>
+                  <p:cNvPr id="14" name="Rounded Rectangle 13"/>
+                  <p:cNvSpPr/>
+                  <p:nvPr/>
+                </p:nvSpPr>
+                <p:spPr>
+                  <a:xfrm>
+                    <a:off x="6448425" y="3933826"/>
+                    <a:ext cx="2628900" cy="1409700"/>
+                  </a:xfrm>
+                  <a:prstGeom prst="rect">
+                    <a:avLst/>
+                  </a:prstGeom>
+                  <a:solidFill>
+                    <a:schemeClr val="accent6">
+                      <a:lumMod val="75000"/>
+                    </a:schemeClr>
+                  </a:solidFill>
+                  <a:ln w="114300">
+                    <a:solidFill>
+                      <a:schemeClr val="accent6">
+                        <a:lumMod val="50000"/>
+                      </a:schemeClr>
+                    </a:solidFill>
+                  </a:ln>
+                </p:spPr>
+                <p:style>
+                  <a:lnRef idx="2">
+                    <a:schemeClr val="accent1">
+                      <a:shade val="50000"/>
+                    </a:schemeClr>
+                  </a:lnRef>
+                  <a:fillRef idx="1">
+                    <a:schemeClr val="accent1"/>
+                  </a:fillRef>
+                  <a:effectRef idx="0">
+                    <a:schemeClr val="accent1"/>
+                  </a:effectRef>
+                  <a:fontRef idx="minor">
+                    <a:schemeClr val="lt1"/>
+                  </a:fontRef>
+                </p:style>
+                <p:txBody>
+                  <a:bodyPr rtlCol="0" anchor="ctr"/>
+                  <a:lstStyle/>
+                  <a:p>
+                    <a:pPr algn="ctr"/>
+                    <a:endParaRPr lang="de-DE"/>
+                  </a:p>
+                </p:txBody>
+              </p:sp>
+              <p:sp>
+                <p:nvSpPr>
+                  <p:cNvPr id="13" name="TextBox 12"/>
+                  <p:cNvSpPr txBox="1"/>
+                  <p:nvPr/>
+                </p:nvSpPr>
+                <p:spPr>
+                  <a:xfrm>
+                    <a:off x="7077075" y="4286250"/>
+                    <a:ext cx="1333500" cy="646331"/>
+                  </a:xfrm>
+                  <a:prstGeom prst="rect">
+                    <a:avLst/>
+                  </a:prstGeom>
+                  <a:noFill/>
+                </p:spPr>
+                <p:txBody>
+                  <a:bodyPr wrap="square" rtlCol="0">
+                    <a:spAutoFit/>
+                  </a:bodyPr>
+                  <a:lstStyle/>
+                  <a:p>
+                    <a:pPr algn="ctr"/>
+                    <a:r>
+                      <a:rPr lang="en-US" sz="3600" b="1" dirty="0">
+                        <a:solidFill>
+                          <a:schemeClr val="bg1"/>
+                        </a:solidFill>
+                      </a:rPr>
+                      <a:t>App</a:t>
+                    </a:r>
+                    <a:endParaRPr lang="de-DE" sz="3600" b="1" dirty="0">
+                      <a:solidFill>
+                        <a:schemeClr val="bg1"/>
+                      </a:solidFill>
+                    </a:endParaRPr>
+                  </a:p>
+                </p:txBody>
+              </p:sp>
+            </p:grpSp>
+            <p:grpSp>
+              <p:nvGrpSpPr>
+                <p:cNvPr id="7" name="Group 6"/>
+                <p:cNvGrpSpPr/>
+                <p:nvPr/>
+              </p:nvGrpSpPr>
+              <p:grpSpPr>
+                <a:xfrm>
+                  <a:off x="1019175" y="2386725"/>
+                  <a:ext cx="3105150" cy="885824"/>
+                  <a:chOff x="6448425" y="4351806"/>
+                  <a:chExt cx="2628900" cy="1409700"/>
+                </a:xfrm>
+              </p:grpSpPr>
+              <p:sp>
+                <p:nvSpPr>
+                  <p:cNvPr id="9" name="Rectangle 8"/>
+                  <p:cNvSpPr/>
+                  <p:nvPr/>
+                </p:nvSpPr>
+                <p:spPr>
+                  <a:xfrm>
+                    <a:off x="6448425" y="4351806"/>
+                    <a:ext cx="2628900" cy="1409700"/>
+                  </a:xfrm>
+                  <a:prstGeom prst="rect">
+                    <a:avLst/>
+                  </a:prstGeom>
+                  <a:solidFill>
+                    <a:schemeClr val="bg2">
+                      <a:lumMod val="50000"/>
+                    </a:schemeClr>
+                  </a:solidFill>
+                  <a:ln w="114300">
+                    <a:solidFill>
+                      <a:schemeClr val="bg2">
+                        <a:lumMod val="25000"/>
+                      </a:schemeClr>
+                    </a:solidFill>
+                  </a:ln>
+                </p:spPr>
+                <p:style>
+                  <a:lnRef idx="2">
+                    <a:schemeClr val="accent1">
+                      <a:shade val="50000"/>
+                    </a:schemeClr>
+                  </a:lnRef>
+                  <a:fillRef idx="1">
+                    <a:schemeClr val="accent1"/>
+                  </a:fillRef>
+                  <a:effectRef idx="0">
+                    <a:schemeClr val="accent1"/>
+                  </a:effectRef>
+                  <a:fontRef idx="minor">
+                    <a:schemeClr val="lt1"/>
+                  </a:fontRef>
+                </p:style>
+                <p:txBody>
+                  <a:bodyPr rtlCol="0" anchor="ctr"/>
+                  <a:lstStyle/>
+                  <a:p>
+                    <a:pPr algn="ctr"/>
+                    <a:endParaRPr lang="de-DE"/>
+                  </a:p>
+                </p:txBody>
+              </p:sp>
+              <p:sp>
+                <p:nvSpPr>
+                  <p:cNvPr id="11" name="TextBox 10"/>
+                  <p:cNvSpPr txBox="1"/>
+                  <p:nvPr/>
+                </p:nvSpPr>
+                <p:spPr>
+                  <a:xfrm>
+                    <a:off x="6496809" y="4537491"/>
+                    <a:ext cx="2524067" cy="1028571"/>
+                  </a:xfrm>
+                  <a:prstGeom prst="rect">
+                    <a:avLst/>
+                  </a:prstGeom>
+                  <a:noFill/>
+                </p:spPr>
+                <p:txBody>
+                  <a:bodyPr wrap="square" rtlCol="0">
+                    <a:spAutoFit/>
+                  </a:bodyPr>
+                  <a:lstStyle/>
+                  <a:p>
+                    <a:pPr algn="ctr"/>
+                    <a:r>
+                      <a:rPr lang="en-US" sz="3600" b="1" dirty="0">
+                        <a:solidFill>
+                          <a:schemeClr val="bg2">
+                            <a:lumMod val="75000"/>
+                          </a:schemeClr>
+                        </a:solidFill>
+                      </a:rPr>
+                      <a:t>App Server</a:t>
+                    </a:r>
+                    <a:endParaRPr lang="de-DE" sz="3600" b="1" dirty="0">
+                      <a:solidFill>
+                        <a:schemeClr val="bg2">
+                          <a:lumMod val="75000"/>
+                        </a:schemeClr>
+                      </a:solidFill>
+                    </a:endParaRPr>
+                  </a:p>
+                </p:txBody>
+              </p:sp>
+            </p:grpSp>
+            <p:grpSp>
+              <p:nvGrpSpPr>
+                <p:cNvPr id="12" name="Group 11"/>
+                <p:cNvGrpSpPr/>
+                <p:nvPr/>
+              </p:nvGrpSpPr>
+              <p:grpSpPr>
+                <a:xfrm>
+                  <a:off x="1019175" y="5568075"/>
+                  <a:ext cx="3105150" cy="885824"/>
+                  <a:chOff x="6448425" y="4351806"/>
+                  <a:chExt cx="2628900" cy="1409700"/>
+                </a:xfrm>
+              </p:grpSpPr>
+              <p:sp>
+                <p:nvSpPr>
+                  <p:cNvPr id="16" name="Rectangle 15"/>
+                  <p:cNvSpPr/>
+                  <p:nvPr/>
+                </p:nvSpPr>
+                <p:spPr>
+                  <a:xfrm>
+                    <a:off x="6448425" y="4351806"/>
+                    <a:ext cx="2628900" cy="1409700"/>
+                  </a:xfrm>
+                  <a:prstGeom prst="rect">
+                    <a:avLst/>
+                  </a:prstGeom>
+                  <a:solidFill>
+                    <a:schemeClr val="bg2">
+                      <a:lumMod val="50000"/>
+                    </a:schemeClr>
+                  </a:solidFill>
+                  <a:ln w="114300">
+                    <a:solidFill>
+                      <a:schemeClr val="bg2">
+                        <a:lumMod val="25000"/>
+                      </a:schemeClr>
+                    </a:solidFill>
+                  </a:ln>
+                </p:spPr>
+                <p:style>
+                  <a:lnRef idx="2">
+                    <a:schemeClr val="accent1">
+                      <a:shade val="50000"/>
+                    </a:schemeClr>
+                  </a:lnRef>
+                  <a:fillRef idx="1">
+                    <a:schemeClr val="accent1"/>
+                  </a:fillRef>
+                  <a:effectRef idx="0">
+                    <a:schemeClr val="accent1"/>
+                  </a:effectRef>
+                  <a:fontRef idx="minor">
+                    <a:schemeClr val="lt1"/>
+                  </a:fontRef>
+                </p:style>
+                <p:txBody>
+                  <a:bodyPr rtlCol="0" anchor="ctr"/>
+                  <a:lstStyle/>
+                  <a:p>
+                    <a:pPr algn="ctr"/>
+                    <a:endParaRPr lang="de-DE"/>
+                  </a:p>
+                </p:txBody>
+              </p:sp>
+              <p:sp>
+                <p:nvSpPr>
+                  <p:cNvPr id="17" name="TextBox 16"/>
+                  <p:cNvSpPr txBox="1"/>
+                  <p:nvPr/>
+                </p:nvSpPr>
+                <p:spPr>
+                  <a:xfrm>
+                    <a:off x="6496809" y="4537491"/>
+                    <a:ext cx="2524067" cy="1028571"/>
+                  </a:xfrm>
+                  <a:prstGeom prst="rect">
+                    <a:avLst/>
+                  </a:prstGeom>
+                  <a:noFill/>
+                </p:spPr>
+                <p:txBody>
+                  <a:bodyPr wrap="square" rtlCol="0">
+                    <a:spAutoFit/>
+                  </a:bodyPr>
+                  <a:lstStyle/>
+                  <a:p>
+                    <a:pPr algn="ctr"/>
+                    <a:r>
+                      <a:rPr lang="en-US" sz="3600" b="1" dirty="0">
+                        <a:solidFill>
+                          <a:schemeClr val="bg2">
+                            <a:lumMod val="75000"/>
+                          </a:schemeClr>
+                        </a:solidFill>
+                      </a:rPr>
+                      <a:t>OS Kernel</a:t>
+                    </a:r>
+                    <a:endParaRPr lang="de-DE" sz="3600" b="1" dirty="0">
+                      <a:solidFill>
+                        <a:schemeClr val="bg2">
+                          <a:lumMod val="75000"/>
+                        </a:schemeClr>
+                      </a:solidFill>
+                    </a:endParaRPr>
+                  </a:p>
+                </p:txBody>
+              </p:sp>
+            </p:grpSp>
+            <p:grpSp>
+              <p:nvGrpSpPr>
+                <p:cNvPr id="18" name="Group 17"/>
+                <p:cNvGrpSpPr/>
+                <p:nvPr/>
+              </p:nvGrpSpPr>
+              <p:grpSpPr>
+                <a:xfrm>
+                  <a:off x="1019175" y="4510800"/>
+                  <a:ext cx="3105150" cy="885824"/>
+                  <a:chOff x="6448425" y="4351806"/>
+                  <a:chExt cx="2628900" cy="1409700"/>
+                </a:xfrm>
+              </p:grpSpPr>
+              <p:sp>
+                <p:nvSpPr>
+                  <p:cNvPr id="19" name="Rectangle 18"/>
+                  <p:cNvSpPr/>
+                  <p:nvPr/>
+                </p:nvSpPr>
+                <p:spPr>
+                  <a:xfrm>
+                    <a:off x="6448425" y="4351806"/>
+                    <a:ext cx="2628900" cy="1409700"/>
+                  </a:xfrm>
+                  <a:prstGeom prst="rect">
+                    <a:avLst/>
+                  </a:prstGeom>
+                  <a:solidFill>
+                    <a:schemeClr val="bg2">
+                      <a:lumMod val="50000"/>
+                    </a:schemeClr>
+                  </a:solidFill>
+                  <a:ln w="114300">
+                    <a:solidFill>
+                      <a:schemeClr val="bg2">
+                        <a:lumMod val="25000"/>
+                      </a:schemeClr>
+                    </a:solidFill>
+                  </a:ln>
+                </p:spPr>
+                <p:style>
+                  <a:lnRef idx="2">
+                    <a:schemeClr val="accent1">
+                      <a:shade val="50000"/>
+                    </a:schemeClr>
+                  </a:lnRef>
+                  <a:fillRef idx="1">
+                    <a:schemeClr val="accent1"/>
+                  </a:fillRef>
+                  <a:effectRef idx="0">
+                    <a:schemeClr val="accent1"/>
+                  </a:effectRef>
+                  <a:fontRef idx="minor">
+                    <a:schemeClr val="lt1"/>
+                  </a:fontRef>
+                </p:style>
+                <p:txBody>
+                  <a:bodyPr rtlCol="0" anchor="ctr"/>
+                  <a:lstStyle/>
+                  <a:p>
+                    <a:pPr algn="ctr"/>
+                    <a:endParaRPr lang="de-DE"/>
+                  </a:p>
+                </p:txBody>
+              </p:sp>
+              <p:sp>
+                <p:nvSpPr>
+                  <p:cNvPr id="20" name="TextBox 19"/>
+                  <p:cNvSpPr txBox="1"/>
+                  <p:nvPr/>
+                </p:nvSpPr>
+                <p:spPr>
+                  <a:xfrm>
+                    <a:off x="6496809" y="4537491"/>
+                    <a:ext cx="2524067" cy="1028571"/>
+                  </a:xfrm>
+                  <a:prstGeom prst="rect">
+                    <a:avLst/>
+                  </a:prstGeom>
+                  <a:noFill/>
+                </p:spPr>
+                <p:txBody>
+                  <a:bodyPr wrap="square" rtlCol="0">
+                    <a:spAutoFit/>
+                  </a:bodyPr>
+                  <a:lstStyle/>
+                  <a:p>
+                    <a:pPr algn="ctr"/>
+                    <a:r>
+                      <a:rPr lang="en-US" sz="3600" b="1" dirty="0">
+                        <a:solidFill>
+                          <a:schemeClr val="bg2">
+                            <a:lumMod val="75000"/>
+                          </a:schemeClr>
+                        </a:solidFill>
+                      </a:rPr>
+                      <a:t>Libraries</a:t>
+                    </a:r>
+                    <a:endParaRPr lang="de-DE" sz="3600" b="1" dirty="0">
+                      <a:solidFill>
+                        <a:schemeClr val="bg2">
+                          <a:lumMod val="75000"/>
+                        </a:schemeClr>
+                      </a:solidFill>
+                    </a:endParaRPr>
+                  </a:p>
+                </p:txBody>
+              </p:sp>
+            </p:grpSp>
+            <p:grpSp>
+              <p:nvGrpSpPr>
+                <p:cNvPr id="21" name="Group 20"/>
+                <p:cNvGrpSpPr/>
+                <p:nvPr/>
+              </p:nvGrpSpPr>
+              <p:grpSpPr>
+                <a:xfrm>
+                  <a:off x="1019175" y="3444000"/>
+                  <a:ext cx="3105150" cy="885824"/>
+                  <a:chOff x="6448425" y="4351806"/>
+                  <a:chExt cx="2628900" cy="1409700"/>
+                </a:xfrm>
+              </p:grpSpPr>
+              <p:sp>
+                <p:nvSpPr>
+                  <p:cNvPr id="22" name="Rectangle 21"/>
+                  <p:cNvSpPr/>
+                  <p:nvPr/>
+                </p:nvSpPr>
+                <p:spPr>
+                  <a:xfrm>
+                    <a:off x="6448425" y="4351806"/>
+                    <a:ext cx="2628900" cy="1409700"/>
+                  </a:xfrm>
+                  <a:prstGeom prst="rect">
+                    <a:avLst/>
+                  </a:prstGeom>
+                  <a:solidFill>
+                    <a:schemeClr val="bg2">
+                      <a:lumMod val="50000"/>
+                    </a:schemeClr>
+                  </a:solidFill>
+                  <a:ln w="114300">
+                    <a:solidFill>
+                      <a:schemeClr val="bg2">
+                        <a:lumMod val="25000"/>
+                      </a:schemeClr>
+                    </a:solidFill>
+                  </a:ln>
+                </p:spPr>
+                <p:style>
+                  <a:lnRef idx="2">
+                    <a:schemeClr val="accent1">
+                      <a:shade val="50000"/>
+                    </a:schemeClr>
+                  </a:lnRef>
+                  <a:fillRef idx="1">
+                    <a:schemeClr val="accent1"/>
+                  </a:fillRef>
+                  <a:effectRef idx="0">
+                    <a:schemeClr val="accent1"/>
+                  </a:effectRef>
+                  <a:fontRef idx="minor">
+                    <a:schemeClr val="lt1"/>
+                  </a:fontRef>
+                </p:style>
+                <p:txBody>
+                  <a:bodyPr rtlCol="0" anchor="ctr"/>
+                  <a:lstStyle/>
+                  <a:p>
+                    <a:pPr algn="ctr"/>
+                    <a:endParaRPr lang="de-DE"/>
+                  </a:p>
+                </p:txBody>
+              </p:sp>
+              <p:sp>
+                <p:nvSpPr>
+                  <p:cNvPr id="23" name="TextBox 22"/>
+                  <p:cNvSpPr txBox="1"/>
+                  <p:nvPr/>
+                </p:nvSpPr>
+                <p:spPr>
+                  <a:xfrm>
+                    <a:off x="6496809" y="4537491"/>
+                    <a:ext cx="2524067" cy="1028571"/>
+                  </a:xfrm>
+                  <a:prstGeom prst="rect">
+                    <a:avLst/>
+                  </a:prstGeom>
+                  <a:noFill/>
+                </p:spPr>
+                <p:txBody>
+                  <a:bodyPr wrap="square" rtlCol="0">
+                    <a:spAutoFit/>
+                  </a:bodyPr>
+                  <a:lstStyle/>
+                  <a:p>
+                    <a:pPr algn="ctr"/>
+                    <a:r>
+                      <a:rPr lang="en-US" sz="3600" b="1" dirty="0" smtClean="0">
+                        <a:solidFill>
+                          <a:schemeClr val="bg2">
+                            <a:lumMod val="75000"/>
+                          </a:schemeClr>
+                        </a:solidFill>
+                      </a:rPr>
+                      <a:t>JVM</a:t>
+                    </a:r>
+                    <a:endParaRPr lang="de-DE" sz="3600" b="1" dirty="0">
+                      <a:solidFill>
+                        <a:schemeClr val="bg2">
+                          <a:lumMod val="75000"/>
+                        </a:schemeClr>
+                      </a:solidFill>
+                    </a:endParaRPr>
+                  </a:p>
+                </p:txBody>
+              </p:sp>
+            </p:grpSp>
+          </p:grpSp>
+        </p:grpSp>
+        <p:sp>
+          <p:nvSpPr>
+            <p:cNvPr id="25" name="TextBox 24"/>
+            <p:cNvSpPr txBox="1"/>
+            <p:nvPr/>
+          </p:nvSpPr>
+          <p:spPr>
+            <a:xfrm>
+              <a:off x="57150" y="-755957"/>
+              <a:ext cx="3790954" cy="830997"/>
+            </a:xfrm>
+            <a:prstGeom prst="rect">
+              <a:avLst/>
+            </a:prstGeom>
+            <a:noFill/>
+          </p:spPr>
+          <p:txBody>
+            <a:bodyPr wrap="square" rtlCol="0">
+              <a:spAutoFit/>
+            </a:bodyPr>
+            <a:lstStyle/>
+            <a:p>
+              <a:pPr algn="ctr"/>
+              <a:r>
+                <a:rPr lang="en-US" sz="4800" b="1" dirty="0" smtClean="0">
+                  <a:solidFill>
+                    <a:schemeClr val="bg1">
+                      <a:lumMod val="50000"/>
+                    </a:schemeClr>
+                  </a:solidFill>
+                </a:rPr>
+                <a:t>War File</a:t>
+              </a:r>
+              <a:endParaRPr lang="de-DE" sz="4800" b="1" dirty="0">
+                <a:solidFill>
+                  <a:schemeClr val="bg1">
+                    <a:lumMod val="50000"/>
+                  </a:schemeClr>
+                </a:solidFill>
+              </a:endParaRPr>
+            </a:p>
+          </p:txBody>
+        </p:sp>
+      </p:grpSp>
+      <p:grpSp>
+        <p:nvGrpSpPr>
+          <p:cNvPr id="72" name="Group 26"/>
+          <p:cNvGrpSpPr/>
+          <p:nvPr/>
+        </p:nvGrpSpPr>
+        <p:grpSpPr>
+          <a:xfrm>
+            <a:off x="5467359" y="212283"/>
+            <a:ext cx="3790954" cy="7019356"/>
+            <a:chOff x="57150" y="-755957"/>
+            <a:chExt cx="3790954" cy="7019356"/>
+          </a:xfrm>
+        </p:grpSpPr>
+        <p:grpSp>
+          <p:nvGrpSpPr>
+            <p:cNvPr id="73" name="Group 5"/>
+            <p:cNvGrpSpPr/>
+            <p:nvPr/>
+          </p:nvGrpSpPr>
+          <p:grpSpPr>
+            <a:xfrm>
+              <a:off x="114300" y="95250"/>
+              <a:ext cx="3676650" cy="6168149"/>
+              <a:chOff x="733425" y="285750"/>
+              <a:chExt cx="3676650" cy="6168149"/>
+            </a:xfrm>
+          </p:grpSpPr>
+          <p:sp>
+            <p:nvSpPr>
+              <p:cNvPr id="76" name="Rounded Rectangle 4"/>
+              <p:cNvSpPr/>
+              <p:nvPr/>
+            </p:nvSpPr>
+            <p:spPr>
+              <a:xfrm>
+                <a:off x="733425" y="285750"/>
+                <a:ext cx="3676650" cy="2977274"/>
+              </a:xfrm>
+              <a:prstGeom prst="roundRect">
+                <a:avLst>
+                  <a:gd name="adj" fmla="val 9672"/>
+                </a:avLst>
+              </a:prstGeom>
+              <a:solidFill>
+                <a:schemeClr val="bg2">
+                  <a:lumMod val="90000"/>
+                </a:schemeClr>
+              </a:solidFill>
+              <a:ln w="114300">
+                <a:solidFill>
+                  <a:schemeClr val="bg1">
+                    <a:lumMod val="50000"/>
+                  </a:schemeClr>
+                </a:solidFill>
+              </a:ln>
+            </p:spPr>
+            <p:style>
+              <a:lnRef idx="2">
+                <a:schemeClr val="accent1">
+                  <a:shade val="50000"/>
+                </a:schemeClr>
+              </a:lnRef>
+              <a:fillRef idx="1">
+                <a:schemeClr val="accent1"/>
+              </a:fillRef>
+              <a:effectRef idx="0">
+                <a:schemeClr val="accent1"/>
+              </a:effectRef>
+              <a:fontRef idx="minor">
+                <a:schemeClr val="lt1"/>
+              </a:fontRef>
+            </p:style>
+            <p:txBody>
+              <a:bodyPr rtlCol="0" anchor="ctr"/>
+              <a:lstStyle/>
+              <a:p>
+                <a:pPr algn="ctr"/>
+                <a:endParaRPr lang="de-DE"/>
+              </a:p>
+            </p:txBody>
+          </p:sp>
+          <p:grpSp>
+            <p:nvGrpSpPr>
+              <p:cNvPr id="77" name="Group 3"/>
+              <p:cNvGrpSpPr/>
+              <p:nvPr/>
+            </p:nvGrpSpPr>
+            <p:grpSpPr>
+              <a:xfrm>
+                <a:off x="1019175" y="504826"/>
+                <a:ext cx="3105150" cy="5949073"/>
+                <a:chOff x="1019175" y="504826"/>
+                <a:chExt cx="3105150" cy="5949073"/>
+              </a:xfrm>
+            </p:grpSpPr>
+            <p:grpSp>
+              <p:nvGrpSpPr>
+                <p:cNvPr id="86" name="Group 14"/>
+                <p:cNvGrpSpPr/>
+                <p:nvPr/>
+              </p:nvGrpSpPr>
+              <p:grpSpPr>
+                <a:xfrm>
+                  <a:off x="1019175" y="504826"/>
+                  <a:ext cx="3105150" cy="1409700"/>
+                  <a:chOff x="6448425" y="3933826"/>
+                  <a:chExt cx="2628900" cy="1409700"/>
+                </a:xfrm>
+              </p:grpSpPr>
+              <p:sp>
+                <p:nvSpPr>
+                  <p:cNvPr id="99" name="Rounded Rectangle 13"/>
+                  <p:cNvSpPr/>
+                  <p:nvPr/>
+                </p:nvSpPr>
+                <p:spPr>
+                  <a:xfrm>
+                    <a:off x="6448425" y="3933826"/>
+                    <a:ext cx="2628900" cy="1409700"/>
+                  </a:xfrm>
+                  <a:prstGeom prst="rect">
+                    <a:avLst/>
+                  </a:prstGeom>
+                  <a:solidFill>
+                    <a:schemeClr val="accent6">
+                      <a:lumMod val="75000"/>
+                    </a:schemeClr>
+                  </a:solidFill>
+                  <a:ln w="114300">
+                    <a:solidFill>
+                      <a:schemeClr val="accent6">
+                        <a:lumMod val="50000"/>
+                      </a:schemeClr>
+                    </a:solidFill>
+                  </a:ln>
+                </p:spPr>
+                <p:style>
+                  <a:lnRef idx="2">
+                    <a:schemeClr val="accent1">
+                      <a:shade val="50000"/>
+                    </a:schemeClr>
+                  </a:lnRef>
+                  <a:fillRef idx="1">
+                    <a:schemeClr val="accent1"/>
+                  </a:fillRef>
+                  <a:effectRef idx="0">
+                    <a:schemeClr val="accent1"/>
+                  </a:effectRef>
+                  <a:fontRef idx="minor">
+                    <a:schemeClr val="lt1"/>
+                  </a:fontRef>
+                </p:style>
+                <p:txBody>
+                  <a:bodyPr rtlCol="0" anchor="ctr"/>
+                  <a:lstStyle/>
+                  <a:p>
+                    <a:pPr algn="ctr"/>
+                    <a:endParaRPr lang="de-DE"/>
+                  </a:p>
+                </p:txBody>
+              </p:sp>
+              <p:sp>
+                <p:nvSpPr>
+                  <p:cNvPr id="100" name="TextBox 12"/>
+                  <p:cNvSpPr txBox="1"/>
+                  <p:nvPr/>
+                </p:nvSpPr>
+                <p:spPr>
+                  <a:xfrm>
+                    <a:off x="7077075" y="4286250"/>
+                    <a:ext cx="1333500" cy="646331"/>
+                  </a:xfrm>
+                  <a:prstGeom prst="rect">
+                    <a:avLst/>
+                  </a:prstGeom>
+                  <a:noFill/>
+                </p:spPr>
+                <p:txBody>
+                  <a:bodyPr wrap="square" rtlCol="0">
+                    <a:spAutoFit/>
+                  </a:bodyPr>
+                  <a:lstStyle/>
+                  <a:p>
+                    <a:pPr algn="ctr"/>
+                    <a:r>
+                      <a:rPr lang="en-US" sz="3600" b="1" dirty="0">
+                        <a:solidFill>
+                          <a:schemeClr val="bg1"/>
+                        </a:solidFill>
+                      </a:rPr>
+                      <a:t>App</a:t>
+                    </a:r>
+                    <a:endParaRPr lang="de-DE" sz="3600" b="1" dirty="0">
+                      <a:solidFill>
+                        <a:schemeClr val="bg1"/>
+                      </a:solidFill>
+                    </a:endParaRPr>
+                  </a:p>
+                </p:txBody>
+              </p:sp>
+            </p:grpSp>
+            <p:grpSp>
+              <p:nvGrpSpPr>
+                <p:cNvPr id="87" name="Group 6"/>
+                <p:cNvGrpSpPr/>
+                <p:nvPr/>
+              </p:nvGrpSpPr>
+              <p:grpSpPr>
+                <a:xfrm>
+                  <a:off x="1019175" y="2153260"/>
+                  <a:ext cx="3105150" cy="885824"/>
+                  <a:chOff x="6448425" y="3980269"/>
+                  <a:chExt cx="2628900" cy="1409700"/>
+                </a:xfrm>
+              </p:grpSpPr>
+              <p:sp>
+                <p:nvSpPr>
+                  <p:cNvPr id="97" name="Rectangle 8"/>
+                  <p:cNvSpPr/>
+                  <p:nvPr/>
+                </p:nvSpPr>
+                <p:spPr>
+                  <a:xfrm>
+                    <a:off x="6448425" y="3980269"/>
+                    <a:ext cx="2628900" cy="1409700"/>
+                  </a:xfrm>
+                  <a:prstGeom prst="rect">
+                    <a:avLst/>
+                  </a:prstGeom>
+                  <a:solidFill>
+                    <a:schemeClr val="accent4">
+                      <a:lumMod val="75000"/>
+                    </a:schemeClr>
+                  </a:solidFill>
+                  <a:ln w="114300">
+                    <a:solidFill>
+                      <a:schemeClr val="accent4">
+                        <a:lumMod val="50000"/>
+                      </a:schemeClr>
+                    </a:solidFill>
+                  </a:ln>
+                </p:spPr>
+                <p:style>
+                  <a:lnRef idx="2">
+                    <a:schemeClr val="accent1">
+                      <a:shade val="50000"/>
+                    </a:schemeClr>
+                  </a:lnRef>
+                  <a:fillRef idx="1">
+                    <a:schemeClr val="accent1"/>
+                  </a:fillRef>
+                  <a:effectRef idx="0">
+                    <a:schemeClr val="accent1"/>
+                  </a:effectRef>
+                  <a:fontRef idx="minor">
+                    <a:schemeClr val="lt1"/>
+                  </a:fontRef>
+                </p:style>
+                <p:txBody>
+                  <a:bodyPr rtlCol="0" anchor="ctr"/>
+                  <a:lstStyle/>
+                  <a:p>
+                    <a:pPr algn="ctr"/>
+                    <a:endParaRPr lang="de-DE"/>
+                  </a:p>
+                </p:txBody>
+              </p:sp>
+              <p:sp>
+                <p:nvSpPr>
+                  <p:cNvPr id="98" name="TextBox 10"/>
+                  <p:cNvSpPr txBox="1"/>
+                  <p:nvPr/>
+                </p:nvSpPr>
+                <p:spPr>
+                  <a:xfrm>
+                    <a:off x="6496809" y="4165955"/>
+                    <a:ext cx="2524067" cy="1028571"/>
+                  </a:xfrm>
+                  <a:prstGeom prst="rect">
+                    <a:avLst/>
+                  </a:prstGeom>
+                  <a:noFill/>
+                </p:spPr>
+                <p:txBody>
+                  <a:bodyPr wrap="square" rtlCol="0">
+                    <a:spAutoFit/>
+                  </a:bodyPr>
+                  <a:lstStyle/>
+                  <a:p>
+                    <a:pPr algn="ctr"/>
+                    <a:r>
+                      <a:rPr lang="en-US" sz="3600" b="1" dirty="0">
+                        <a:solidFill>
+                          <a:schemeClr val="bg1"/>
+                        </a:solidFill>
+                      </a:rPr>
+                      <a:t>App Server</a:t>
+                    </a:r>
+                    <a:endParaRPr lang="de-DE" sz="3600" b="1" dirty="0">
+                      <a:solidFill>
+                        <a:schemeClr val="bg1"/>
+                      </a:solidFill>
+                    </a:endParaRPr>
+                  </a:p>
+                </p:txBody>
+              </p:sp>
+            </p:grpSp>
+            <p:grpSp>
+              <p:nvGrpSpPr>
+                <p:cNvPr id="88" name="Group 11"/>
+                <p:cNvGrpSpPr/>
+                <p:nvPr/>
+              </p:nvGrpSpPr>
+              <p:grpSpPr>
+                <a:xfrm>
+                  <a:off x="1019175" y="5568075"/>
+                  <a:ext cx="3105150" cy="885824"/>
+                  <a:chOff x="6448425" y="4351806"/>
+                  <a:chExt cx="2628900" cy="1409700"/>
+                </a:xfrm>
+              </p:grpSpPr>
+              <p:sp>
+                <p:nvSpPr>
+                  <p:cNvPr id="95" name="Rectangle 15"/>
+                  <p:cNvSpPr/>
+                  <p:nvPr/>
+                </p:nvSpPr>
+                <p:spPr>
+                  <a:xfrm>
+                    <a:off x="6448425" y="4351806"/>
+                    <a:ext cx="2628900" cy="1409700"/>
+                  </a:xfrm>
+                  <a:prstGeom prst="rect">
+                    <a:avLst/>
+                  </a:prstGeom>
+                  <a:solidFill>
+                    <a:schemeClr val="bg2">
+                      <a:lumMod val="50000"/>
+                    </a:schemeClr>
+                  </a:solidFill>
+                  <a:ln w="114300">
+                    <a:solidFill>
+                      <a:schemeClr val="bg2">
+                        <a:lumMod val="25000"/>
+                      </a:schemeClr>
+                    </a:solidFill>
+                  </a:ln>
+                </p:spPr>
+                <p:style>
+                  <a:lnRef idx="2">
+                    <a:schemeClr val="accent1">
+                      <a:shade val="50000"/>
+                    </a:schemeClr>
+                  </a:lnRef>
+                  <a:fillRef idx="1">
+                    <a:schemeClr val="accent1"/>
+                  </a:fillRef>
+                  <a:effectRef idx="0">
+                    <a:schemeClr val="accent1"/>
+                  </a:effectRef>
+                  <a:fontRef idx="minor">
+                    <a:schemeClr val="lt1"/>
+                  </a:fontRef>
+                </p:style>
+                <p:txBody>
+                  <a:bodyPr rtlCol="0" anchor="ctr"/>
+                  <a:lstStyle/>
+                  <a:p>
+                    <a:pPr algn="ctr"/>
+                    <a:endParaRPr lang="de-DE"/>
+                  </a:p>
+                </p:txBody>
+              </p:sp>
+              <p:sp>
+                <p:nvSpPr>
+                  <p:cNvPr id="96" name="TextBox 16"/>
+                  <p:cNvSpPr txBox="1"/>
+                  <p:nvPr/>
+                </p:nvSpPr>
+                <p:spPr>
+                  <a:xfrm>
+                    <a:off x="6496809" y="4537491"/>
+                    <a:ext cx="2524067" cy="1028571"/>
+                  </a:xfrm>
+                  <a:prstGeom prst="rect">
+                    <a:avLst/>
+                  </a:prstGeom>
+                  <a:noFill/>
+                </p:spPr>
+                <p:txBody>
+                  <a:bodyPr wrap="square" rtlCol="0">
+                    <a:spAutoFit/>
+                  </a:bodyPr>
+                  <a:lstStyle/>
+                  <a:p>
+                    <a:pPr algn="ctr"/>
+                    <a:r>
+                      <a:rPr lang="en-US" sz="3600" b="1" dirty="0">
+                        <a:solidFill>
+                          <a:schemeClr val="bg2">
+                            <a:lumMod val="75000"/>
+                          </a:schemeClr>
+                        </a:solidFill>
+                      </a:rPr>
+                      <a:t>OS Kernel</a:t>
+                    </a:r>
+                    <a:endParaRPr lang="de-DE" sz="3600" b="1" dirty="0">
+                      <a:solidFill>
+                        <a:schemeClr val="bg2">
+                          <a:lumMod val="75000"/>
+                        </a:schemeClr>
+                      </a:solidFill>
+                    </a:endParaRPr>
+                  </a:p>
+                </p:txBody>
+              </p:sp>
+            </p:grpSp>
+            <p:grpSp>
+              <p:nvGrpSpPr>
+                <p:cNvPr id="89" name="Group 17"/>
+                <p:cNvGrpSpPr/>
+                <p:nvPr/>
+              </p:nvGrpSpPr>
+              <p:grpSpPr>
+                <a:xfrm>
+                  <a:off x="1019175" y="4510800"/>
+                  <a:ext cx="3105150" cy="885824"/>
+                  <a:chOff x="6448425" y="4351806"/>
+                  <a:chExt cx="2628900" cy="1409700"/>
+                </a:xfrm>
+              </p:grpSpPr>
+              <p:sp>
+                <p:nvSpPr>
+                  <p:cNvPr id="93" name="Rectangle 18"/>
+                  <p:cNvSpPr/>
+                  <p:nvPr/>
+                </p:nvSpPr>
+                <p:spPr>
+                  <a:xfrm>
+                    <a:off x="6448425" y="4351806"/>
+                    <a:ext cx="2628900" cy="1409700"/>
+                  </a:xfrm>
+                  <a:prstGeom prst="rect">
+                    <a:avLst/>
+                  </a:prstGeom>
+                  <a:solidFill>
+                    <a:schemeClr val="bg2">
+                      <a:lumMod val="50000"/>
+                    </a:schemeClr>
+                  </a:solidFill>
+                  <a:ln w="114300">
+                    <a:solidFill>
+                      <a:schemeClr val="bg2">
+                        <a:lumMod val="25000"/>
+                      </a:schemeClr>
+                    </a:solidFill>
+                  </a:ln>
+                </p:spPr>
+                <p:style>
+                  <a:lnRef idx="2">
+                    <a:schemeClr val="accent1">
+                      <a:shade val="50000"/>
+                    </a:schemeClr>
+                  </a:lnRef>
+                  <a:fillRef idx="1">
+                    <a:schemeClr val="accent1"/>
+                  </a:fillRef>
+                  <a:effectRef idx="0">
+                    <a:schemeClr val="accent1"/>
+                  </a:effectRef>
+                  <a:fontRef idx="minor">
+                    <a:schemeClr val="lt1"/>
+                  </a:fontRef>
+                </p:style>
+                <p:txBody>
+                  <a:bodyPr rtlCol="0" anchor="ctr"/>
+                  <a:lstStyle/>
+                  <a:p>
+                    <a:pPr algn="ctr"/>
+                    <a:endParaRPr lang="de-DE"/>
+                  </a:p>
+                </p:txBody>
+              </p:sp>
+              <p:sp>
+                <p:nvSpPr>
+                  <p:cNvPr id="94" name="TextBox 19"/>
+                  <p:cNvSpPr txBox="1"/>
+                  <p:nvPr/>
+                </p:nvSpPr>
+                <p:spPr>
+                  <a:xfrm>
+                    <a:off x="6496809" y="4537491"/>
+                    <a:ext cx="2524067" cy="1028571"/>
+                  </a:xfrm>
+                  <a:prstGeom prst="rect">
+                    <a:avLst/>
+                  </a:prstGeom>
+                  <a:noFill/>
+                </p:spPr>
+                <p:txBody>
+                  <a:bodyPr wrap="square" rtlCol="0">
+                    <a:spAutoFit/>
+                  </a:bodyPr>
+                  <a:lstStyle/>
+                  <a:p>
+                    <a:pPr algn="ctr"/>
+                    <a:r>
+                      <a:rPr lang="en-US" sz="3600" b="1" dirty="0">
+                        <a:solidFill>
+                          <a:schemeClr val="bg2">
+                            <a:lumMod val="75000"/>
+                          </a:schemeClr>
+                        </a:solidFill>
+                      </a:rPr>
+                      <a:t>Libraries</a:t>
+                    </a:r>
+                    <a:endParaRPr lang="de-DE" sz="3600" b="1" dirty="0">
+                      <a:solidFill>
+                        <a:schemeClr val="bg2">
+                          <a:lumMod val="75000"/>
+                        </a:schemeClr>
+                      </a:solidFill>
+                    </a:endParaRPr>
+                  </a:p>
+                </p:txBody>
+              </p:sp>
+            </p:grpSp>
+            <p:grpSp>
+              <p:nvGrpSpPr>
+                <p:cNvPr id="90" name="Group 20"/>
+                <p:cNvGrpSpPr/>
+                <p:nvPr/>
+              </p:nvGrpSpPr>
+              <p:grpSpPr>
+                <a:xfrm>
+                  <a:off x="1019175" y="3444000"/>
+                  <a:ext cx="3105150" cy="885824"/>
+                  <a:chOff x="6448425" y="4351806"/>
+                  <a:chExt cx="2628900" cy="1409700"/>
+                </a:xfrm>
+              </p:grpSpPr>
+              <p:sp>
+                <p:nvSpPr>
+                  <p:cNvPr id="91" name="Rectangle 21"/>
+                  <p:cNvSpPr/>
+                  <p:nvPr/>
+                </p:nvSpPr>
+                <p:spPr>
+                  <a:xfrm>
+                    <a:off x="6448425" y="4351806"/>
+                    <a:ext cx="2628900" cy="1409700"/>
+                  </a:xfrm>
+                  <a:prstGeom prst="rect">
+                    <a:avLst/>
+                  </a:prstGeom>
+                  <a:solidFill>
+                    <a:schemeClr val="bg2">
+                      <a:lumMod val="50000"/>
+                    </a:schemeClr>
+                  </a:solidFill>
+                  <a:ln w="114300">
+                    <a:solidFill>
+                      <a:schemeClr val="bg2">
+                        <a:lumMod val="25000"/>
+                      </a:schemeClr>
+                    </a:solidFill>
+                  </a:ln>
+                </p:spPr>
+                <p:style>
+                  <a:lnRef idx="2">
+                    <a:schemeClr val="accent1">
+                      <a:shade val="50000"/>
+                    </a:schemeClr>
+                  </a:lnRef>
+                  <a:fillRef idx="1">
+                    <a:schemeClr val="accent1"/>
+                  </a:fillRef>
+                  <a:effectRef idx="0">
+                    <a:schemeClr val="accent1"/>
+                  </a:effectRef>
+                  <a:fontRef idx="minor">
+                    <a:schemeClr val="lt1"/>
+                  </a:fontRef>
+                </p:style>
+                <p:txBody>
+                  <a:bodyPr rtlCol="0" anchor="ctr"/>
+                  <a:lstStyle/>
+                  <a:p>
+                    <a:pPr algn="ctr"/>
+                    <a:endParaRPr lang="de-DE"/>
+                  </a:p>
+                </p:txBody>
+              </p:sp>
+              <p:sp>
+                <p:nvSpPr>
+                  <p:cNvPr id="92" name="TextBox 22"/>
+                  <p:cNvSpPr txBox="1"/>
+                  <p:nvPr/>
+                </p:nvSpPr>
+                <p:spPr>
+                  <a:xfrm>
+                    <a:off x="6496809" y="4537491"/>
+                    <a:ext cx="2524067" cy="1028571"/>
+                  </a:xfrm>
+                  <a:prstGeom prst="rect">
+                    <a:avLst/>
+                  </a:prstGeom>
+                  <a:noFill/>
+                </p:spPr>
+                <p:txBody>
+                  <a:bodyPr wrap="square" rtlCol="0">
+                    <a:spAutoFit/>
+                  </a:bodyPr>
+                  <a:lstStyle/>
+                  <a:p>
+                    <a:pPr algn="ctr"/>
+                    <a:r>
+                      <a:rPr lang="en-US" sz="3600" b="1" dirty="0" smtClean="0">
+                        <a:solidFill>
+                          <a:schemeClr val="bg2">
+                            <a:lumMod val="75000"/>
+                          </a:schemeClr>
+                        </a:solidFill>
+                      </a:rPr>
+                      <a:t>JVM</a:t>
+                    </a:r>
+                    <a:endParaRPr lang="de-DE" sz="3600" b="1" dirty="0">
+                      <a:solidFill>
+                        <a:schemeClr val="bg2">
+                          <a:lumMod val="75000"/>
+                        </a:schemeClr>
+                      </a:solidFill>
+                    </a:endParaRPr>
+                  </a:p>
+                </p:txBody>
+              </p:sp>
+            </p:grpSp>
+          </p:grpSp>
+        </p:grpSp>
+        <p:sp>
+          <p:nvSpPr>
+            <p:cNvPr id="74" name="TextBox 24"/>
+            <p:cNvSpPr txBox="1"/>
+            <p:nvPr/>
+          </p:nvSpPr>
+          <p:spPr>
+            <a:xfrm>
+              <a:off x="57150" y="-755957"/>
+              <a:ext cx="3790954" cy="830997"/>
+            </a:xfrm>
+            <a:prstGeom prst="rect">
+              <a:avLst/>
+            </a:prstGeom>
+            <a:noFill/>
+          </p:spPr>
+          <p:txBody>
+            <a:bodyPr wrap="square" rtlCol="0">
+              <a:spAutoFit/>
+            </a:bodyPr>
+            <a:lstStyle/>
+            <a:p>
+              <a:pPr algn="ctr"/>
+              <a:r>
+                <a:rPr lang="en-US" sz="4800" b="1" dirty="0" smtClean="0">
+                  <a:solidFill>
+                    <a:schemeClr val="bg1">
+                      <a:lumMod val="50000"/>
+                    </a:schemeClr>
+                  </a:solidFill>
+                </a:rPr>
+                <a:t>Spring Boot</a:t>
+              </a:r>
+              <a:endParaRPr lang="de-DE" sz="4800" b="1" dirty="0">
+                <a:solidFill>
+                  <a:schemeClr val="bg1">
+                    <a:lumMod val="50000"/>
+                  </a:schemeClr>
+                </a:solidFill>
+              </a:endParaRPr>
+            </a:p>
+          </p:txBody>
+        </p:sp>
+      </p:grpSp>
+      <p:cxnSp>
+        <p:nvCxnSpPr>
+          <p:cNvPr id="75" name="Straight Arrow Connector 74"/>
+          <p:cNvCxnSpPr/>
+          <p:nvPr/>
+        </p:nvCxnSpPr>
+        <p:spPr>
+          <a:xfrm>
+            <a:off x="3970421" y="2001703"/>
+            <a:ext cx="1383632" cy="0"/>
+          </a:xfrm>
+          <a:prstGeom prst="straightConnector1">
+            <a:avLst/>
+          </a:prstGeom>
+          <a:ln w="228600">
+            <a:solidFill>
+              <a:schemeClr val="accent5">
+                <a:lumMod val="75000"/>
+              </a:schemeClr>
+            </a:solidFill>
+            <a:tailEnd type="triangle"/>
+          </a:ln>
+        </p:spPr>
+        <p:style>
+          <a:lnRef idx="1">
+            <a:schemeClr val="accent1"/>
+          </a:lnRef>
+          <a:fillRef idx="0">
+            <a:schemeClr val="accent1"/>
+          </a:fillRef>
+          <a:effectRef idx="0">
+            <a:schemeClr val="accent1"/>
+          </a:effectRef>
+          <a:fontRef idx="minor">
+            <a:schemeClr val="tx1"/>
+          </a:fontRef>
+        </p:style>
+      </p:cxnSp>
+      <p:grpSp>
+        <p:nvGrpSpPr>
+          <p:cNvPr id="101" name="Group 26"/>
+          <p:cNvGrpSpPr/>
+          <p:nvPr/>
+        </p:nvGrpSpPr>
+        <p:grpSpPr>
+          <a:xfrm>
+            <a:off x="10843512" y="212283"/>
+            <a:ext cx="3790954" cy="7019356"/>
+            <a:chOff x="57150" y="-755957"/>
+            <a:chExt cx="3790954" cy="7019356"/>
+          </a:xfrm>
+        </p:grpSpPr>
+        <p:grpSp>
+          <p:nvGrpSpPr>
+            <p:cNvPr id="102" name="Group 5"/>
+            <p:cNvGrpSpPr/>
+            <p:nvPr/>
+          </p:nvGrpSpPr>
+          <p:grpSpPr>
+            <a:xfrm>
+              <a:off x="114300" y="95249"/>
+              <a:ext cx="3676650" cy="6168150"/>
+              <a:chOff x="733425" y="285749"/>
+              <a:chExt cx="3676650" cy="6168150"/>
+            </a:xfrm>
+          </p:grpSpPr>
+          <p:sp>
+            <p:nvSpPr>
+              <p:cNvPr id="104" name="Rounded Rectangle 4"/>
+              <p:cNvSpPr/>
+              <p:nvPr/>
+            </p:nvSpPr>
+            <p:spPr>
+              <a:xfrm>
+                <a:off x="733425" y="285749"/>
+                <a:ext cx="3676650" cy="6168150"/>
+              </a:xfrm>
+              <a:prstGeom prst="roundRect">
+                <a:avLst>
+                  <a:gd name="adj" fmla="val 9672"/>
+                </a:avLst>
+              </a:prstGeom>
+              <a:solidFill>
+                <a:schemeClr val="bg2">
+                  <a:lumMod val="90000"/>
+                </a:schemeClr>
+              </a:solidFill>
+              <a:ln w="114300">
+                <a:solidFill>
+                  <a:schemeClr val="bg1">
+                    <a:lumMod val="50000"/>
+                  </a:schemeClr>
+                </a:solidFill>
+              </a:ln>
+            </p:spPr>
+            <p:style>
+              <a:lnRef idx="2">
+                <a:schemeClr val="accent1">
+                  <a:shade val="50000"/>
+                </a:schemeClr>
+              </a:lnRef>
+              <a:fillRef idx="1">
+                <a:schemeClr val="accent1"/>
+              </a:fillRef>
+              <a:effectRef idx="0">
+                <a:schemeClr val="accent1"/>
+              </a:effectRef>
+              <a:fontRef idx="minor">
+                <a:schemeClr val="lt1"/>
+              </a:fontRef>
+            </p:style>
+            <p:txBody>
+              <a:bodyPr rtlCol="0" anchor="ctr"/>
+              <a:lstStyle/>
+              <a:p>
+                <a:pPr algn="ctr"/>
+                <a:endParaRPr lang="de-DE"/>
+              </a:p>
+            </p:txBody>
+          </p:sp>
+          <p:grpSp>
+            <p:nvGrpSpPr>
+              <p:cNvPr id="105" name="Group 3"/>
+              <p:cNvGrpSpPr/>
+              <p:nvPr/>
+            </p:nvGrpSpPr>
+            <p:grpSpPr>
+              <a:xfrm>
+                <a:off x="1019175" y="504826"/>
+                <a:ext cx="3105150" cy="5720728"/>
+                <a:chOff x="1019175" y="504826"/>
+                <a:chExt cx="3105150" cy="5720728"/>
+              </a:xfrm>
+            </p:grpSpPr>
+            <p:grpSp>
+              <p:nvGrpSpPr>
+                <p:cNvPr id="106" name="Group 14"/>
+                <p:cNvGrpSpPr/>
+                <p:nvPr/>
+              </p:nvGrpSpPr>
+              <p:grpSpPr>
+                <a:xfrm>
+                  <a:off x="1019175" y="504826"/>
+                  <a:ext cx="3105150" cy="1409700"/>
+                  <a:chOff x="6448425" y="3933826"/>
+                  <a:chExt cx="2628900" cy="1409700"/>
+                </a:xfrm>
+              </p:grpSpPr>
+              <p:sp>
+                <p:nvSpPr>
+                  <p:cNvPr id="119" name="Rounded Rectangle 13"/>
+                  <p:cNvSpPr/>
+                  <p:nvPr/>
+                </p:nvSpPr>
+                <p:spPr>
+                  <a:xfrm>
+                    <a:off x="6448425" y="3933826"/>
+                    <a:ext cx="2628900" cy="1409700"/>
+                  </a:xfrm>
+                  <a:prstGeom prst="rect">
+                    <a:avLst/>
+                  </a:prstGeom>
+                  <a:solidFill>
+                    <a:schemeClr val="accent6">
+                      <a:lumMod val="75000"/>
+                    </a:schemeClr>
+                  </a:solidFill>
+                  <a:ln w="114300">
+                    <a:solidFill>
+                      <a:schemeClr val="accent6">
+                        <a:lumMod val="50000"/>
+                      </a:schemeClr>
+                    </a:solidFill>
+                  </a:ln>
+                </p:spPr>
+                <p:style>
+                  <a:lnRef idx="2">
+                    <a:schemeClr val="accent1">
+                      <a:shade val="50000"/>
+                    </a:schemeClr>
+                  </a:lnRef>
+                  <a:fillRef idx="1">
+                    <a:schemeClr val="accent1"/>
+                  </a:fillRef>
+                  <a:effectRef idx="0">
+                    <a:schemeClr val="accent1"/>
+                  </a:effectRef>
+                  <a:fontRef idx="minor">
+                    <a:schemeClr val="lt1"/>
+                  </a:fontRef>
+                </p:style>
+                <p:txBody>
+                  <a:bodyPr rtlCol="0" anchor="ctr"/>
+                  <a:lstStyle/>
+                  <a:p>
+                    <a:pPr algn="ctr"/>
+                    <a:endParaRPr lang="de-DE"/>
+                  </a:p>
+                </p:txBody>
+              </p:sp>
+              <p:sp>
+                <p:nvSpPr>
+                  <p:cNvPr id="120" name="TextBox 12"/>
+                  <p:cNvSpPr txBox="1"/>
+                  <p:nvPr/>
+                </p:nvSpPr>
+                <p:spPr>
+                  <a:xfrm>
+                    <a:off x="7077075" y="4286250"/>
+                    <a:ext cx="1333500" cy="646331"/>
+                  </a:xfrm>
+                  <a:prstGeom prst="rect">
+                    <a:avLst/>
+                  </a:prstGeom>
+                  <a:noFill/>
+                </p:spPr>
+                <p:txBody>
+                  <a:bodyPr wrap="square" rtlCol="0">
+                    <a:spAutoFit/>
+                  </a:bodyPr>
+                  <a:lstStyle/>
+                  <a:p>
+                    <a:pPr algn="ctr"/>
+                    <a:r>
+                      <a:rPr lang="en-US" sz="3600" b="1" dirty="0">
+                        <a:solidFill>
+                          <a:schemeClr val="bg1"/>
+                        </a:solidFill>
+                      </a:rPr>
+                      <a:t>App</a:t>
+                    </a:r>
+                    <a:endParaRPr lang="de-DE" sz="3600" b="1" dirty="0">
+                      <a:solidFill>
+                        <a:schemeClr val="bg1"/>
+                      </a:solidFill>
+                    </a:endParaRPr>
+                  </a:p>
+                </p:txBody>
+              </p:sp>
+            </p:grpSp>
+            <p:grpSp>
+              <p:nvGrpSpPr>
+                <p:cNvPr id="107" name="Group 6"/>
+                <p:cNvGrpSpPr/>
+                <p:nvPr/>
+              </p:nvGrpSpPr>
+              <p:grpSpPr>
+                <a:xfrm>
+                  <a:off x="1019175" y="2153260"/>
+                  <a:ext cx="3105150" cy="885824"/>
+                  <a:chOff x="6448425" y="3980269"/>
+                  <a:chExt cx="2628900" cy="1409700"/>
+                </a:xfrm>
+              </p:grpSpPr>
+              <p:sp>
+                <p:nvSpPr>
+                  <p:cNvPr id="117" name="Rectangle 8"/>
+                  <p:cNvSpPr/>
+                  <p:nvPr/>
+                </p:nvSpPr>
+                <p:spPr>
+                  <a:xfrm>
+                    <a:off x="6448425" y="3980269"/>
+                    <a:ext cx="2628900" cy="1409700"/>
+                  </a:xfrm>
+                  <a:prstGeom prst="rect">
+                    <a:avLst/>
+                  </a:prstGeom>
+                  <a:solidFill>
+                    <a:schemeClr val="accent4">
+                      <a:lumMod val="75000"/>
+                    </a:schemeClr>
+                  </a:solidFill>
+                  <a:ln w="114300">
+                    <a:solidFill>
+                      <a:schemeClr val="accent4">
+                        <a:lumMod val="50000"/>
+                      </a:schemeClr>
+                    </a:solidFill>
+                  </a:ln>
+                </p:spPr>
+                <p:style>
+                  <a:lnRef idx="2">
+                    <a:schemeClr val="accent1">
+                      <a:shade val="50000"/>
+                    </a:schemeClr>
+                  </a:lnRef>
+                  <a:fillRef idx="1">
+                    <a:schemeClr val="accent1"/>
+                  </a:fillRef>
+                  <a:effectRef idx="0">
+                    <a:schemeClr val="accent1"/>
+                  </a:effectRef>
+                  <a:fontRef idx="minor">
+                    <a:schemeClr val="lt1"/>
+                  </a:fontRef>
+                </p:style>
+                <p:txBody>
+                  <a:bodyPr rtlCol="0" anchor="ctr"/>
+                  <a:lstStyle/>
+                  <a:p>
+                    <a:pPr algn="ctr"/>
+                    <a:endParaRPr lang="de-DE"/>
+                  </a:p>
+                </p:txBody>
+              </p:sp>
+              <p:sp>
+                <p:nvSpPr>
+                  <p:cNvPr id="118" name="TextBox 10"/>
+                  <p:cNvSpPr txBox="1"/>
+                  <p:nvPr/>
+                </p:nvSpPr>
+                <p:spPr>
+                  <a:xfrm>
+                    <a:off x="6496809" y="4165955"/>
+                    <a:ext cx="2524067" cy="1028571"/>
+                  </a:xfrm>
+                  <a:prstGeom prst="rect">
+                    <a:avLst/>
+                  </a:prstGeom>
+                  <a:noFill/>
+                </p:spPr>
+                <p:txBody>
+                  <a:bodyPr wrap="square" rtlCol="0">
+                    <a:spAutoFit/>
+                  </a:bodyPr>
+                  <a:lstStyle/>
+                  <a:p>
+                    <a:pPr algn="ctr"/>
+                    <a:r>
+                      <a:rPr lang="en-US" sz="3600" b="1" dirty="0">
+                        <a:solidFill>
+                          <a:schemeClr val="bg1"/>
+                        </a:solidFill>
+                      </a:rPr>
+                      <a:t>App Server</a:t>
+                    </a:r>
+                    <a:endParaRPr lang="de-DE" sz="3600" b="1" dirty="0">
+                      <a:solidFill>
+                        <a:schemeClr val="bg1"/>
+                      </a:solidFill>
+                    </a:endParaRPr>
+                  </a:p>
+                </p:txBody>
+              </p:sp>
+            </p:grpSp>
+            <p:grpSp>
+              <p:nvGrpSpPr>
+                <p:cNvPr id="108" name="Group 11"/>
+                <p:cNvGrpSpPr/>
+                <p:nvPr/>
+              </p:nvGrpSpPr>
+              <p:grpSpPr>
+                <a:xfrm>
+                  <a:off x="1019175" y="5339730"/>
+                  <a:ext cx="3105150" cy="885824"/>
+                  <a:chOff x="6448425" y="3988416"/>
+                  <a:chExt cx="2628900" cy="1409700"/>
+                </a:xfrm>
+              </p:grpSpPr>
+              <p:sp>
+                <p:nvSpPr>
+                  <p:cNvPr id="115" name="Rectangle 15"/>
+                  <p:cNvSpPr/>
+                  <p:nvPr/>
+                </p:nvSpPr>
+                <p:spPr>
+                  <a:xfrm>
+                    <a:off x="6448425" y="3988416"/>
+                    <a:ext cx="2628900" cy="1409700"/>
+                  </a:xfrm>
+                  <a:prstGeom prst="rect">
+                    <a:avLst/>
+                  </a:prstGeom>
+                  <a:solidFill>
+                    <a:schemeClr val="accent1">
+                      <a:lumMod val="75000"/>
+                    </a:schemeClr>
+                  </a:solidFill>
+                  <a:ln w="114300">
+                    <a:solidFill>
+                      <a:schemeClr val="accent1">
+                        <a:lumMod val="50000"/>
+                      </a:schemeClr>
+                    </a:solidFill>
+                  </a:ln>
+                </p:spPr>
+                <p:style>
+                  <a:lnRef idx="2">
+                    <a:schemeClr val="accent1">
+                      <a:shade val="50000"/>
+                    </a:schemeClr>
+                  </a:lnRef>
+                  <a:fillRef idx="1">
+                    <a:schemeClr val="accent1"/>
+                  </a:fillRef>
+                  <a:effectRef idx="0">
+                    <a:schemeClr val="accent1"/>
+                  </a:effectRef>
+                  <a:fontRef idx="minor">
+                    <a:schemeClr val="lt1"/>
+                  </a:fontRef>
+                </p:style>
+                <p:txBody>
+                  <a:bodyPr rtlCol="0" anchor="ctr"/>
+                  <a:lstStyle/>
+                  <a:p>
+                    <a:pPr algn="ctr"/>
+                    <a:endParaRPr lang="de-DE">
+                      <a:solidFill>
+                        <a:schemeClr val="bg1"/>
+                      </a:solidFill>
+                    </a:endParaRPr>
+                  </a:p>
+                </p:txBody>
+              </p:sp>
+              <p:sp>
+                <p:nvSpPr>
+                  <p:cNvPr id="116" name="TextBox 16"/>
+                  <p:cNvSpPr txBox="1"/>
+                  <p:nvPr/>
+                </p:nvSpPr>
+                <p:spPr>
+                  <a:xfrm>
+                    <a:off x="6496809" y="4174102"/>
+                    <a:ext cx="2524067" cy="1028571"/>
+                  </a:xfrm>
+                  <a:prstGeom prst="rect">
+                    <a:avLst/>
+                  </a:prstGeom>
+                  <a:noFill/>
+                </p:spPr>
+                <p:txBody>
+                  <a:bodyPr wrap="square" rtlCol="0">
+                    <a:spAutoFit/>
+                  </a:bodyPr>
+                  <a:lstStyle/>
+                  <a:p>
+                    <a:pPr algn="ctr"/>
+                    <a:r>
+                      <a:rPr lang="en-US" sz="3600" b="1" dirty="0">
+                        <a:solidFill>
+                          <a:schemeClr val="bg1"/>
+                        </a:solidFill>
+                      </a:rPr>
+                      <a:t>OS Kernel</a:t>
+                    </a:r>
+                    <a:endParaRPr lang="de-DE" sz="3600" b="1" dirty="0">
+                      <a:solidFill>
+                        <a:schemeClr val="bg1"/>
+                      </a:solidFill>
+                    </a:endParaRPr>
+                  </a:p>
+                </p:txBody>
+              </p:sp>
+            </p:grpSp>
+            <p:grpSp>
+              <p:nvGrpSpPr>
+                <p:cNvPr id="109" name="Group 17"/>
+                <p:cNvGrpSpPr/>
+                <p:nvPr/>
+              </p:nvGrpSpPr>
+              <p:grpSpPr>
+                <a:xfrm>
+                  <a:off x="1019175" y="4282455"/>
+                  <a:ext cx="3105150" cy="885824"/>
+                  <a:chOff x="6448425" y="3988416"/>
+                  <a:chExt cx="2628900" cy="1409700"/>
+                </a:xfrm>
+              </p:grpSpPr>
+              <p:sp>
+                <p:nvSpPr>
+                  <p:cNvPr id="113" name="Rectangle 18"/>
+                  <p:cNvSpPr/>
+                  <p:nvPr/>
+                </p:nvSpPr>
+                <p:spPr>
+                  <a:xfrm>
+                    <a:off x="6448425" y="3988416"/>
+                    <a:ext cx="2628900" cy="1409700"/>
+                  </a:xfrm>
+                  <a:prstGeom prst="rect">
+                    <a:avLst/>
+                  </a:prstGeom>
+                  <a:solidFill>
+                    <a:schemeClr val="accent1">
+                      <a:lumMod val="75000"/>
+                    </a:schemeClr>
+                  </a:solidFill>
+                  <a:ln w="114300">
+                    <a:solidFill>
+                      <a:schemeClr val="accent1">
+                        <a:lumMod val="50000"/>
+                      </a:schemeClr>
+                    </a:solidFill>
+                  </a:ln>
+                </p:spPr>
+                <p:style>
+                  <a:lnRef idx="2">
+                    <a:schemeClr val="accent1">
+                      <a:shade val="50000"/>
+                    </a:schemeClr>
+                  </a:lnRef>
+                  <a:fillRef idx="1">
+                    <a:schemeClr val="accent1"/>
+                  </a:fillRef>
+                  <a:effectRef idx="0">
+                    <a:schemeClr val="accent1"/>
+                  </a:effectRef>
+                  <a:fontRef idx="minor">
+                    <a:schemeClr val="lt1"/>
+                  </a:fontRef>
+                </p:style>
+                <p:txBody>
+                  <a:bodyPr rtlCol="0" anchor="ctr"/>
+                  <a:lstStyle/>
+                  <a:p>
+                    <a:pPr algn="ctr"/>
+                    <a:endParaRPr lang="de-DE">
+                      <a:solidFill>
+                        <a:schemeClr val="bg1"/>
+                      </a:solidFill>
+                    </a:endParaRPr>
+                  </a:p>
+                </p:txBody>
+              </p:sp>
+              <p:sp>
+                <p:nvSpPr>
+                  <p:cNvPr id="114" name="TextBox 19"/>
+                  <p:cNvSpPr txBox="1"/>
+                  <p:nvPr/>
+                </p:nvSpPr>
+                <p:spPr>
+                  <a:xfrm>
+                    <a:off x="6496809" y="4174102"/>
+                    <a:ext cx="2524067" cy="1028571"/>
+                  </a:xfrm>
+                  <a:prstGeom prst="rect">
+                    <a:avLst/>
+                  </a:prstGeom>
+                  <a:noFill/>
+                </p:spPr>
+                <p:txBody>
+                  <a:bodyPr wrap="square" rtlCol="0">
+                    <a:spAutoFit/>
+                  </a:bodyPr>
+                  <a:lstStyle/>
+                  <a:p>
+                    <a:pPr algn="ctr"/>
+                    <a:r>
+                      <a:rPr lang="en-US" sz="3600" b="1" dirty="0">
+                        <a:solidFill>
+                          <a:schemeClr val="bg1"/>
+                        </a:solidFill>
+                      </a:rPr>
+                      <a:t>Libraries</a:t>
+                    </a:r>
+                    <a:endParaRPr lang="de-DE" sz="3600" b="1" dirty="0">
+                      <a:solidFill>
+                        <a:schemeClr val="bg1"/>
+                      </a:solidFill>
+                    </a:endParaRPr>
+                  </a:p>
+                </p:txBody>
+              </p:sp>
+            </p:grpSp>
+            <p:grpSp>
+              <p:nvGrpSpPr>
+                <p:cNvPr id="110" name="Group 20"/>
+                <p:cNvGrpSpPr/>
+                <p:nvPr/>
+              </p:nvGrpSpPr>
+              <p:grpSpPr>
+                <a:xfrm>
+                  <a:off x="1019175" y="3215655"/>
+                  <a:ext cx="3105150" cy="885824"/>
+                  <a:chOff x="6448425" y="3988416"/>
+                  <a:chExt cx="2628900" cy="1409700"/>
+                </a:xfrm>
+              </p:grpSpPr>
+              <p:sp>
+                <p:nvSpPr>
+                  <p:cNvPr id="111" name="Rectangle 21"/>
+                  <p:cNvSpPr/>
+                  <p:nvPr/>
+                </p:nvSpPr>
+                <p:spPr>
+                  <a:xfrm>
+                    <a:off x="6448425" y="3988416"/>
+                    <a:ext cx="2628900" cy="1409700"/>
+                  </a:xfrm>
+                  <a:prstGeom prst="rect">
+                    <a:avLst/>
+                  </a:prstGeom>
+                  <a:solidFill>
+                    <a:schemeClr val="accent1">
+                      <a:lumMod val="75000"/>
+                    </a:schemeClr>
+                  </a:solidFill>
+                  <a:ln w="114300">
+                    <a:solidFill>
+                      <a:schemeClr val="accent1">
+                        <a:lumMod val="50000"/>
+                      </a:schemeClr>
+                    </a:solidFill>
+                  </a:ln>
+                </p:spPr>
+                <p:style>
+                  <a:lnRef idx="2">
+                    <a:schemeClr val="accent1">
+                      <a:shade val="50000"/>
+                    </a:schemeClr>
+                  </a:lnRef>
+                  <a:fillRef idx="1">
+                    <a:schemeClr val="accent1"/>
+                  </a:fillRef>
+                  <a:effectRef idx="0">
+                    <a:schemeClr val="accent1"/>
+                  </a:effectRef>
+                  <a:fontRef idx="minor">
+                    <a:schemeClr val="lt1"/>
+                  </a:fontRef>
+                </p:style>
+                <p:txBody>
+                  <a:bodyPr rtlCol="0" anchor="ctr"/>
+                  <a:lstStyle/>
+                  <a:p>
+                    <a:pPr algn="ctr"/>
+                    <a:endParaRPr lang="de-DE">
+                      <a:solidFill>
+                        <a:schemeClr val="bg1"/>
+                      </a:solidFill>
+                    </a:endParaRPr>
+                  </a:p>
+                </p:txBody>
+              </p:sp>
+              <p:sp>
+                <p:nvSpPr>
+                  <p:cNvPr id="112" name="TextBox 22"/>
+                  <p:cNvSpPr txBox="1"/>
+                  <p:nvPr/>
+                </p:nvSpPr>
+                <p:spPr>
+                  <a:xfrm>
+                    <a:off x="6496809" y="4174101"/>
+                    <a:ext cx="2524067" cy="1028571"/>
+                  </a:xfrm>
+                  <a:prstGeom prst="rect">
+                    <a:avLst/>
+                  </a:prstGeom>
+                  <a:noFill/>
+                </p:spPr>
+                <p:txBody>
+                  <a:bodyPr wrap="square" rtlCol="0">
+                    <a:spAutoFit/>
+                  </a:bodyPr>
+                  <a:lstStyle/>
+                  <a:p>
+                    <a:pPr algn="ctr"/>
+                    <a:r>
+                      <a:rPr lang="en-US" sz="3600" b="1" dirty="0" smtClean="0">
+                        <a:solidFill>
+                          <a:schemeClr val="bg1"/>
+                        </a:solidFill>
+                      </a:rPr>
+                      <a:t>JVM</a:t>
+                    </a:r>
+                    <a:endParaRPr lang="de-DE" sz="3600" b="1" dirty="0">
+                      <a:solidFill>
+                        <a:schemeClr val="bg1"/>
+                      </a:solidFill>
+                    </a:endParaRPr>
+                  </a:p>
+                </p:txBody>
+              </p:sp>
+            </p:grpSp>
+          </p:grpSp>
+        </p:grpSp>
+        <p:sp>
+          <p:nvSpPr>
+            <p:cNvPr id="103" name="TextBox 24"/>
+            <p:cNvSpPr txBox="1"/>
+            <p:nvPr/>
+          </p:nvSpPr>
+          <p:spPr>
+            <a:xfrm>
+              <a:off x="57150" y="-755957"/>
+              <a:ext cx="3790954" cy="830997"/>
+            </a:xfrm>
+            <a:prstGeom prst="rect">
+              <a:avLst/>
+            </a:prstGeom>
+            <a:noFill/>
+          </p:spPr>
+          <p:txBody>
+            <a:bodyPr wrap="square" rtlCol="0">
+              <a:spAutoFit/>
+            </a:bodyPr>
+            <a:lstStyle/>
+            <a:p>
+              <a:pPr algn="ctr"/>
+              <a:r>
+                <a:rPr lang="en-US" sz="4800" b="1" dirty="0" smtClean="0">
+                  <a:solidFill>
+                    <a:schemeClr val="bg1">
+                      <a:lumMod val="50000"/>
+                    </a:schemeClr>
+                  </a:solidFill>
+                </a:rPr>
+                <a:t>Boxfuse</a:t>
+              </a:r>
+              <a:endParaRPr lang="de-DE" sz="4800" b="1" dirty="0">
+                <a:solidFill>
+                  <a:schemeClr val="bg1">
+                    <a:lumMod val="50000"/>
+                  </a:schemeClr>
+                </a:solidFill>
+              </a:endParaRPr>
+            </a:p>
+          </p:txBody>
+        </p:sp>
+      </p:grpSp>
+      <p:cxnSp>
+        <p:nvCxnSpPr>
+          <p:cNvPr id="121" name="Straight Arrow Connector 74"/>
+          <p:cNvCxnSpPr/>
+          <p:nvPr/>
+        </p:nvCxnSpPr>
+        <p:spPr>
+          <a:xfrm>
+            <a:off x="9348281" y="2001703"/>
+            <a:ext cx="1404000" cy="0"/>
+          </a:xfrm>
+          <a:prstGeom prst="straightConnector1">
+            <a:avLst/>
+          </a:prstGeom>
+          <a:ln w="228600">
+            <a:solidFill>
+              <a:schemeClr val="accent5">
+                <a:lumMod val="75000"/>
+              </a:schemeClr>
+            </a:solidFill>
+            <a:tailEnd type="triangle"/>
+          </a:ln>
+        </p:spPr>
+        <p:style>
+          <a:lnRef idx="1">
+            <a:schemeClr val="accent1"/>
+          </a:lnRef>
+          <a:fillRef idx="0">
+            <a:schemeClr val="accent1"/>
+          </a:fillRef>
+          <a:effectRef idx="0">
+            <a:schemeClr val="accent1"/>
+          </a:effectRef>
+          <a:fontRef idx="minor">
+            <a:schemeClr val="tx1"/>
+          </a:fontRef>
+        </p:style>
+      </p:cxnSp>
+    </p:spTree>
+    <p:extLst>
+      <p:ext uri="{BB962C8B-B14F-4D97-AF65-F5344CB8AC3E}">
+        <p14:creationId xmlns:p14="http://schemas.microsoft.com/office/powerpoint/2010/main" val="3771349959"/>
+      </p:ext>
+    </p:extLst>
+  </p:cSld>
+  <p:clrMapOvr>
+    <a:masterClrMapping/>
+  </p:clrMapOvr>
+</p:sld>
+</file>
+
+<file path=ppt/slides/slide5.xml><?xml version="1.0" encoding="utf-8"?>
+<p:sld xmlns:a="http://schemas.openxmlformats.org/drawingml/2006/main" xmlns:r="http://schemas.openxmlformats.org/officeDocument/2006/relationships" xmlns:p="http://schemas.openxmlformats.org/presentationml/2006/main">
+  <p:cSld>
+    <p:spTree>
+      <p:nvGrpSpPr>
+        <p:cNvPr id="1" name=""/>
+        <p:cNvGrpSpPr/>
+        <p:nvPr/>
+      </p:nvGrpSpPr>
+      <p:grpSpPr>
+        <a:xfrm>
+          <a:off x="0" y="0"/>
+          <a:ext cx="0" cy="0"/>
+          <a:chOff x="0" y="0"/>
+          <a:chExt cx="0" cy="0"/>
+        </a:xfrm>
+      </p:grpSpPr>
+      <p:grpSp>
+        <p:nvGrpSpPr>
           <p:cNvPr id="4" name="Group 3"/>
           <p:cNvGrpSpPr/>
           <p:nvPr/>
@@ -18026,7 +21176,7 @@
 </p:sld>
 </file>
 
-<file path=ppt/slides/slide5.xml><?xml version="1.0" encoding="utf-8"?>
+<file path=ppt/slides/slide6.xml><?xml version="1.0" encoding="utf-8"?>
 <p:sld xmlns:a="http://schemas.openxmlformats.org/drawingml/2006/main" xmlns:r="http://schemas.openxmlformats.org/officeDocument/2006/relationships" xmlns:p="http://schemas.openxmlformats.org/presentationml/2006/main">
   <p:cSld>
     <p:spTree>
@@ -18788,7 +21938,7 @@
 </p:sld>
 </file>
 
-<file path=ppt/slides/slide6.xml><?xml version="1.0" encoding="utf-8"?>
+<file path=ppt/slides/slide7.xml><?xml version="1.0" encoding="utf-8"?>
 <p:sld xmlns:a="http://schemas.openxmlformats.org/drawingml/2006/main" xmlns:r="http://schemas.openxmlformats.org/officeDocument/2006/relationships" xmlns:p="http://schemas.openxmlformats.org/presentationml/2006/main">
   <p:cSld>
     <p:spTree>
@@ -19462,7 +22612,7 @@
 </p:sld>
 </file>
 
-<file path=ppt/slides/slide7.xml><?xml version="1.0" encoding="utf-8"?>
+<file path=ppt/slides/slide8.xml><?xml version="1.0" encoding="utf-8"?>
 <p:sld xmlns:a="http://schemas.openxmlformats.org/drawingml/2006/main" xmlns:r="http://schemas.openxmlformats.org/officeDocument/2006/relationships" xmlns:p="http://schemas.openxmlformats.org/presentationml/2006/main">
   <p:cSld>
     <p:spTree>
@@ -19973,7 +23123,7 @@
 </p:sld>
 </file>
 
-<file path=ppt/slides/slide8.xml><?xml version="1.0" encoding="utf-8"?>
+<file path=ppt/slides/slide9.xml><?xml version="1.0" encoding="utf-8"?>
 <p:sld xmlns:a="http://schemas.openxmlformats.org/drawingml/2006/main" xmlns:r="http://schemas.openxmlformats.org/officeDocument/2006/relationships" xmlns:p="http://schemas.openxmlformats.org/presentationml/2006/main">
   <p:cSld>
     <p:spTree>
@@ -20351,372 +23501,6 @@
 </p:sld>
 </file>
 
-<file path=ppt/slides/slide9.xml><?xml version="1.0" encoding="utf-8"?>
-<p:sld xmlns:a="http://schemas.openxmlformats.org/drawingml/2006/main" xmlns:r="http://schemas.openxmlformats.org/officeDocument/2006/relationships" xmlns:p="http://schemas.openxmlformats.org/presentationml/2006/main">
-  <p:cSld>
-    <p:spTree>
-      <p:nvGrpSpPr>
-        <p:cNvPr id="1" name=""/>
-        <p:cNvGrpSpPr/>
-        <p:nvPr/>
-      </p:nvGrpSpPr>
-      <p:grpSpPr>
-        <a:xfrm>
-          <a:off x="0" y="0"/>
-          <a:ext cx="0" cy="0"/>
-          <a:chOff x="0" y="0"/>
-          <a:chExt cx="0" cy="0"/>
-        </a:xfrm>
-      </p:grpSpPr>
-      <p:grpSp>
-        <p:nvGrpSpPr>
-          <p:cNvPr id="25" name="Group 24"/>
-          <p:cNvGrpSpPr/>
-          <p:nvPr/>
-        </p:nvGrpSpPr>
-        <p:grpSpPr>
-          <a:xfrm>
-            <a:off x="2921350" y="2435133"/>
-            <a:ext cx="2839659" cy="2839659"/>
-            <a:chOff x="6448425" y="3933826"/>
-            <a:chExt cx="2628900" cy="1409700"/>
-          </a:xfrm>
-          <a:solidFill>
-            <a:schemeClr val="accent1">
-              <a:lumMod val="75000"/>
-            </a:schemeClr>
-          </a:solidFill>
-        </p:grpSpPr>
-        <p:sp>
-          <p:nvSpPr>
-            <p:cNvPr id="26" name="Rounded Rectangle 25"/>
-            <p:cNvSpPr/>
-            <p:nvPr/>
-          </p:nvSpPr>
-          <p:spPr>
-            <a:xfrm>
-              <a:off x="6448425" y="3933826"/>
-              <a:ext cx="2628900" cy="1409700"/>
-            </a:xfrm>
-            <a:prstGeom prst="ellipse">
-              <a:avLst/>
-            </a:prstGeom>
-            <a:grpFill/>
-            <a:ln w="114300">
-              <a:solidFill>
-                <a:schemeClr val="accent1">
-                  <a:lumMod val="50000"/>
-                </a:schemeClr>
-              </a:solidFill>
-            </a:ln>
-          </p:spPr>
-          <p:style>
-            <a:lnRef idx="2">
-              <a:schemeClr val="accent1">
-                <a:shade val="50000"/>
-              </a:schemeClr>
-            </a:lnRef>
-            <a:fillRef idx="1">
-              <a:schemeClr val="accent1"/>
-            </a:fillRef>
-            <a:effectRef idx="0">
-              <a:schemeClr val="accent1"/>
-            </a:effectRef>
-            <a:fontRef idx="minor">
-              <a:schemeClr val="lt1"/>
-            </a:fontRef>
-          </p:style>
-          <p:txBody>
-            <a:bodyPr rtlCol="0" anchor="ctr"/>
-            <a:lstStyle/>
-            <a:p>
-              <a:pPr algn="ctr"/>
-              <a:endParaRPr lang="de-DE"/>
-            </a:p>
-          </p:txBody>
-        </p:sp>
-        <p:sp>
-          <p:nvSpPr>
-            <p:cNvPr id="27" name="TextBox 26"/>
-            <p:cNvSpPr txBox="1"/>
-            <p:nvPr/>
-          </p:nvSpPr>
-          <p:spPr>
-            <a:xfrm>
-              <a:off x="6496810" y="4229323"/>
-              <a:ext cx="2524067" cy="837924"/>
-            </a:xfrm>
-            <a:prstGeom prst="ellipse">
-              <a:avLst/>
-            </a:prstGeom>
-            <a:grpFill/>
-            <a:ln>
-              <a:noFill/>
-            </a:ln>
-          </p:spPr>
-          <p:txBody>
-            <a:bodyPr wrap="square" rtlCol="0">
-              <a:spAutoFit/>
-            </a:bodyPr>
-            <a:lstStyle/>
-            <a:p>
-              <a:pPr algn="ctr"/>
-              <a:r>
-                <a:rPr lang="en-US" sz="3600" b="1" dirty="0">
-                  <a:solidFill>
-                    <a:schemeClr val="bg1"/>
-                  </a:solidFill>
-                </a:rPr>
-                <a:t>Bootable App</a:t>
-              </a:r>
-              <a:endParaRPr lang="de-DE" sz="3600" b="1" dirty="0">
-                <a:solidFill>
-                  <a:schemeClr val="bg1"/>
-                </a:solidFill>
-              </a:endParaRPr>
-            </a:p>
-          </p:txBody>
-        </p:sp>
-      </p:grpSp>
-      <p:cxnSp>
-        <p:nvCxnSpPr>
-          <p:cNvPr id="30" name="Straight Arrow Connector 29"/>
-          <p:cNvCxnSpPr/>
-          <p:nvPr/>
-        </p:nvCxnSpPr>
-        <p:spPr>
-          <a:xfrm>
-            <a:off x="5819191" y="4545761"/>
-            <a:ext cx="2247191" cy="1115015"/>
-          </a:xfrm>
-          <a:prstGeom prst="straightConnector1">
-            <a:avLst/>
-          </a:prstGeom>
-          <a:ln w="254000">
-            <a:solidFill>
-              <a:schemeClr val="tx1">
-                <a:lumMod val="50000"/>
-                <a:lumOff val="50000"/>
-              </a:schemeClr>
-            </a:solidFill>
-            <a:tailEnd type="triangle"/>
-          </a:ln>
-        </p:spPr>
-        <p:style>
-          <a:lnRef idx="1">
-            <a:schemeClr val="accent1"/>
-          </a:lnRef>
-          <a:fillRef idx="0">
-            <a:schemeClr val="accent1"/>
-          </a:fillRef>
-          <a:effectRef idx="0">
-            <a:schemeClr val="accent1"/>
-          </a:effectRef>
-          <a:fontRef idx="minor">
-            <a:schemeClr val="tx1"/>
-          </a:fontRef>
-        </p:style>
-      </p:cxnSp>
-      <p:cxnSp>
-        <p:nvCxnSpPr>
-          <p:cNvPr id="31" name="Straight Arrow Connector 30"/>
-          <p:cNvCxnSpPr/>
-          <p:nvPr/>
-        </p:nvCxnSpPr>
-        <p:spPr>
-          <a:xfrm flipV="1">
-            <a:off x="5837118" y="2031721"/>
-            <a:ext cx="2059640" cy="1133477"/>
-          </a:xfrm>
-          <a:prstGeom prst="straightConnector1">
-            <a:avLst/>
-          </a:prstGeom>
-          <a:ln w="254000">
-            <a:solidFill>
-              <a:schemeClr val="tx1">
-                <a:lumMod val="50000"/>
-                <a:lumOff val="50000"/>
-              </a:schemeClr>
-            </a:solidFill>
-            <a:tailEnd type="triangle"/>
-          </a:ln>
-        </p:spPr>
-        <p:style>
-          <a:lnRef idx="1">
-            <a:schemeClr val="accent1"/>
-          </a:lnRef>
-          <a:fillRef idx="0">
-            <a:schemeClr val="accent1"/>
-          </a:fillRef>
-          <a:effectRef idx="0">
-            <a:schemeClr val="accent1"/>
-          </a:effectRef>
-          <a:fontRef idx="minor">
-            <a:schemeClr val="tx1"/>
-          </a:fontRef>
-        </p:style>
-      </p:cxnSp>
-      <p:grpSp>
-        <p:nvGrpSpPr>
-          <p:cNvPr id="32" name="Group 31"/>
-          <p:cNvGrpSpPr/>
-          <p:nvPr/>
-        </p:nvGrpSpPr>
-        <p:grpSpPr>
-          <a:xfrm>
-            <a:off x="7472822" y="559386"/>
-            <a:ext cx="4056006" cy="2230805"/>
-            <a:chOff x="996328" y="4911830"/>
-            <a:chExt cx="2857500" cy="1571626"/>
-          </a:xfrm>
-        </p:grpSpPr>
-        <p:pic>
-          <p:nvPicPr>
-            <p:cNvPr id="33" name="Picture 2" descr="http://www.discoposse.com/wp-content/uploads/2013/07/virtualbox-logo.png"/>
-            <p:cNvPicPr>
-              <a:picLocks noChangeAspect="1" noChangeArrowheads="1"/>
-            </p:cNvPicPr>
-            <p:nvPr/>
-          </p:nvPicPr>
-          <p:blipFill rotWithShape="1">
-            <a:blip r:embed="rId2">
-              <a:duotone>
-                <a:prstClr val="black"/>
-                <a:schemeClr val="accent3">
-                  <a:tint val="45000"/>
-                  <a:satMod val="400000"/>
-                </a:schemeClr>
-              </a:duotone>
-              <a:extLst>
-                <a:ext uri="{28A0092B-C50C-407E-A947-70E740481C1C}">
-                  <a14:useLocalDpi xmlns:a14="http://schemas.microsoft.com/office/drawing/2010/main" val="0"/>
-                </a:ext>
-              </a:extLst>
-            </a:blip>
-            <a:srcRect l="41418"/>
-            <a:stretch/>
-          </p:blipFill>
-          <p:spPr bwMode="auto">
-            <a:xfrm>
-              <a:off x="2179864" y="4911830"/>
-              <a:ext cx="1673964" cy="1571626"/>
-            </a:xfrm>
-            <a:prstGeom prst="rect">
-              <a:avLst/>
-            </a:prstGeom>
-            <a:noFill/>
-            <a:extLst>
-              <a:ext uri="{909E8E84-426E-40DD-AFC4-6F175D3DCCD1}">
-                <a14:hiddenFill xmlns:a14="http://schemas.microsoft.com/office/drawing/2010/main">
-                  <a:solidFill>
-                    <a:srgbClr val="FFFFFF"/>
-                  </a:solidFill>
-                </a14:hiddenFill>
-              </a:ext>
-            </a:extLst>
-          </p:spPr>
-        </p:pic>
-        <p:pic>
-          <p:nvPicPr>
-            <p:cNvPr id="34" name="Picture 2" descr="http://www.discoposse.com/wp-content/uploads/2013/07/virtualbox-logo.png"/>
-            <p:cNvPicPr>
-              <a:picLocks noChangeAspect="1" noChangeArrowheads="1"/>
-            </p:cNvPicPr>
-            <p:nvPr/>
-          </p:nvPicPr>
-          <p:blipFill rotWithShape="1">
-            <a:blip r:embed="rId2">
-              <a:extLst>
-                <a:ext uri="{28A0092B-C50C-407E-A947-70E740481C1C}">
-                  <a14:useLocalDpi xmlns:a14="http://schemas.microsoft.com/office/drawing/2010/main" val="0"/>
-                </a:ext>
-              </a:extLst>
-            </a:blip>
-            <a:srcRect r="59153"/>
-            <a:stretch/>
-          </p:blipFill>
-          <p:spPr bwMode="auto">
-            <a:xfrm>
-              <a:off x="996328" y="4911830"/>
-              <a:ext cx="1167208" cy="1571626"/>
-            </a:xfrm>
-            <a:prstGeom prst="rect">
-              <a:avLst/>
-            </a:prstGeom>
-            <a:noFill/>
-            <a:extLst>
-              <a:ext uri="{909E8E84-426E-40DD-AFC4-6F175D3DCCD1}">
-                <a14:hiddenFill xmlns:a14="http://schemas.microsoft.com/office/drawing/2010/main">
-                  <a:solidFill>
-                    <a:srgbClr val="FFFFFF"/>
-                  </a:solidFill>
-                </a14:hiddenFill>
-              </a:ext>
-            </a:extLst>
-          </p:spPr>
-        </p:pic>
-      </p:grpSp>
-      <p:pic>
-        <p:nvPicPr>
-          <p:cNvPr id="1026" name="Picture 2" descr="https://a0.awsstatic.com/main/images/logos/aws_logo.png"/>
-          <p:cNvPicPr>
-            <a:picLocks noChangeAspect="1" noChangeArrowheads="1"/>
-          </p:cNvPicPr>
-          <p:nvPr/>
-        </p:nvPicPr>
-        <p:blipFill>
-          <a:blip r:embed="rId3">
-            <a:extLst>
-              <a:ext uri="{28A0092B-C50C-407E-A947-70E740481C1C}">
-                <a14:useLocalDpi xmlns:a14="http://schemas.microsoft.com/office/drawing/2010/main" val="0"/>
-              </a:ext>
-            </a:extLst>
-          </a:blip>
-          <a:srcRect/>
-          <a:stretch>
-            <a:fillRect/>
-          </a:stretch>
-        </p:blipFill>
-        <p:spPr bwMode="auto">
-          <a:xfrm>
-            <a:off x="8177422" y="5464259"/>
-            <a:ext cx="2729664" cy="1031206"/>
-          </a:xfrm>
-          <a:prstGeom prst="rect">
-            <a:avLst/>
-          </a:prstGeom>
-          <a:noFill/>
-          <a:extLst>
-            <a:ext uri="{909E8E84-426E-40DD-AFC4-6F175D3DCCD1}">
-              <a14:hiddenFill xmlns:a14="http://schemas.microsoft.com/office/drawing/2010/main">
-                <a:solidFill>
-                  <a:srgbClr val="FFFFFF"/>
-                </a:solidFill>
-              </a14:hiddenFill>
-            </a:ext>
-          </a:extLst>
-        </p:spPr>
-      </p:pic>
-    </p:spTree>
-    <p:extLst>
-      <p:ext uri="{BB962C8B-B14F-4D97-AF65-F5344CB8AC3E}">
-        <p14:creationId xmlns:p14="http://schemas.microsoft.com/office/powerpoint/2010/main" val="683032843"/>
-      </p:ext>
-    </p:extLst>
-  </p:cSld>
-  <p:clrMapOvr>
-    <a:masterClrMapping/>
-  </p:clrMapOvr>
-  <p:timing>
-    <p:tnLst>
-      <p:par>
-        <p:cTn id="1" dur="indefinite" restart="never" nodeType="tmRoot"/>
-      </p:par>
-    </p:tnLst>
-  </p:timing>
-</p:sld>
-</file>
-
 <file path=ppt/theme/theme1.xml><?xml version="1.0" encoding="utf-8"?>
 <a:theme xmlns:a="http://schemas.openxmlformats.org/drawingml/2006/main" name="Office Theme">
   <a:themeElements>

</xml_diff>

<commit_message>
Completed home page redesign
</commit_message>
<xml_diff>
--- a/_sources/GettingStarted.pptx
+++ b/_sources/GettingStarted.pptx
@@ -16,21 +16,22 @@
     <p:sldId id="262" r:id="rId10"/>
     <p:sldId id="263" r:id="rId11"/>
     <p:sldId id="264" r:id="rId12"/>
-    <p:sldId id="273" r:id="rId13"/>
-    <p:sldId id="265" r:id="rId14"/>
-    <p:sldId id="266" r:id="rId15"/>
-    <p:sldId id="267" r:id="rId16"/>
-    <p:sldId id="268" r:id="rId17"/>
-    <p:sldId id="270" r:id="rId18"/>
-    <p:sldId id="272" r:id="rId19"/>
-    <p:sldId id="271" r:id="rId20"/>
-    <p:sldId id="274" r:id="rId21"/>
-    <p:sldId id="276" r:id="rId22"/>
-    <p:sldId id="277" r:id="rId23"/>
-    <p:sldId id="278" r:id="rId24"/>
-    <p:sldId id="279" r:id="rId25"/>
-    <p:sldId id="280" r:id="rId26"/>
-    <p:sldId id="281" r:id="rId27"/>
+    <p:sldId id="282" r:id="rId13"/>
+    <p:sldId id="273" r:id="rId14"/>
+    <p:sldId id="265" r:id="rId15"/>
+    <p:sldId id="266" r:id="rId16"/>
+    <p:sldId id="267" r:id="rId17"/>
+    <p:sldId id="268" r:id="rId18"/>
+    <p:sldId id="270" r:id="rId19"/>
+    <p:sldId id="272" r:id="rId20"/>
+    <p:sldId id="271" r:id="rId21"/>
+    <p:sldId id="274" r:id="rId22"/>
+    <p:sldId id="276" r:id="rId23"/>
+    <p:sldId id="277" r:id="rId24"/>
+    <p:sldId id="278" r:id="rId25"/>
+    <p:sldId id="279" r:id="rId26"/>
+    <p:sldId id="280" r:id="rId27"/>
+    <p:sldId id="281" r:id="rId28"/>
   </p:sldIdLst>
   <p:sldSz cx="14400213" cy="10799763"/>
   <p:notesSz cx="6858000" cy="9144000"/>
@@ -3085,7 +3086,7 @@
           <a:p>
             <a:fld id="{9AA7D095-A676-4F6B-9416-D65D798F5244}" type="datetimeFigureOut">
               <a:rPr lang="de-DE" smtClean="0"/>
-              <a:t>10.07.2015</a:t>
+              <a:t>23.07.2015</a:t>
             </a:fld>
             <a:endParaRPr lang="de-DE"/>
           </a:p>
@@ -3255,7 +3256,7 @@
           <a:p>
             <a:fld id="{9AA7D095-A676-4F6B-9416-D65D798F5244}" type="datetimeFigureOut">
               <a:rPr lang="de-DE" smtClean="0"/>
-              <a:t>10.07.2015</a:t>
+              <a:t>23.07.2015</a:t>
             </a:fld>
             <a:endParaRPr lang="de-DE"/>
           </a:p>
@@ -3435,7 +3436,7 @@
           <a:p>
             <a:fld id="{9AA7D095-A676-4F6B-9416-D65D798F5244}" type="datetimeFigureOut">
               <a:rPr lang="de-DE" smtClean="0"/>
-              <a:t>10.07.2015</a:t>
+              <a:t>23.07.2015</a:t>
             </a:fld>
             <a:endParaRPr lang="de-DE"/>
           </a:p>
@@ -3605,7 +3606,7 @@
           <a:p>
             <a:fld id="{9AA7D095-A676-4F6B-9416-D65D798F5244}" type="datetimeFigureOut">
               <a:rPr lang="de-DE" smtClean="0"/>
-              <a:t>10.07.2015</a:t>
+              <a:t>23.07.2015</a:t>
             </a:fld>
             <a:endParaRPr lang="de-DE"/>
           </a:p>
@@ -3849,7 +3850,7 @@
           <a:p>
             <a:fld id="{9AA7D095-A676-4F6B-9416-D65D798F5244}" type="datetimeFigureOut">
               <a:rPr lang="de-DE" smtClean="0"/>
-              <a:t>10.07.2015</a:t>
+              <a:t>23.07.2015</a:t>
             </a:fld>
             <a:endParaRPr lang="de-DE"/>
           </a:p>
@@ -4081,7 +4082,7 @@
           <a:p>
             <a:fld id="{9AA7D095-A676-4F6B-9416-D65D798F5244}" type="datetimeFigureOut">
               <a:rPr lang="de-DE" smtClean="0"/>
-              <a:t>10.07.2015</a:t>
+              <a:t>23.07.2015</a:t>
             </a:fld>
             <a:endParaRPr lang="de-DE"/>
           </a:p>
@@ -4448,7 +4449,7 @@
           <a:p>
             <a:fld id="{9AA7D095-A676-4F6B-9416-D65D798F5244}" type="datetimeFigureOut">
               <a:rPr lang="de-DE" smtClean="0"/>
-              <a:t>10.07.2015</a:t>
+              <a:t>23.07.2015</a:t>
             </a:fld>
             <a:endParaRPr lang="de-DE"/>
           </a:p>
@@ -4566,7 +4567,7 @@
           <a:p>
             <a:fld id="{9AA7D095-A676-4F6B-9416-D65D798F5244}" type="datetimeFigureOut">
               <a:rPr lang="de-DE" smtClean="0"/>
-              <a:t>10.07.2015</a:t>
+              <a:t>23.07.2015</a:t>
             </a:fld>
             <a:endParaRPr lang="de-DE"/>
           </a:p>
@@ -4661,7 +4662,7 @@
           <a:p>
             <a:fld id="{9AA7D095-A676-4F6B-9416-D65D798F5244}" type="datetimeFigureOut">
               <a:rPr lang="de-DE" smtClean="0"/>
-              <a:t>10.07.2015</a:t>
+              <a:t>23.07.2015</a:t>
             </a:fld>
             <a:endParaRPr lang="de-DE"/>
           </a:p>
@@ -4938,7 +4939,7 @@
           <a:p>
             <a:fld id="{9AA7D095-A676-4F6B-9416-D65D798F5244}" type="datetimeFigureOut">
               <a:rPr lang="de-DE" smtClean="0"/>
-              <a:t>10.07.2015</a:t>
+              <a:t>23.07.2015</a:t>
             </a:fld>
             <a:endParaRPr lang="de-DE"/>
           </a:p>
@@ -5195,7 +5196,7 @@
           <a:p>
             <a:fld id="{9AA7D095-A676-4F6B-9416-D65D798F5244}" type="datetimeFigureOut">
               <a:rPr lang="de-DE" smtClean="0"/>
-              <a:t>10.07.2015</a:t>
+              <a:t>23.07.2015</a:t>
             </a:fld>
             <a:endParaRPr lang="de-DE"/>
           </a:p>
@@ -5408,7 +5409,7 @@
           <a:p>
             <a:fld id="{9AA7D095-A676-4F6B-9416-D65D798F5244}" type="datetimeFigureOut">
               <a:rPr lang="de-DE" smtClean="0"/>
-              <a:t>10.07.2015</a:t>
+              <a:t>23.07.2015</a:t>
             </a:fld>
             <a:endParaRPr lang="de-DE"/>
           </a:p>
@@ -9209,6 +9210,519 @@
           <a:chExt cx="0" cy="0"/>
         </a:xfrm>
       </p:grpSpPr>
+      <p:sp>
+        <p:nvSpPr>
+          <p:cNvPr id="76" name="Rounded Rectangle 75"/>
+          <p:cNvSpPr/>
+          <p:nvPr/>
+        </p:nvSpPr>
+        <p:spPr>
+          <a:xfrm>
+            <a:off x="8362570" y="5218084"/>
+            <a:ext cx="1441656" cy="1514439"/>
+          </a:xfrm>
+          <a:prstGeom prst="rect">
+            <a:avLst/>
+          </a:prstGeom>
+          <a:solidFill>
+            <a:schemeClr val="accent1">
+              <a:lumMod val="75000"/>
+            </a:schemeClr>
+          </a:solidFill>
+          <a:ln w="76200">
+            <a:solidFill>
+              <a:schemeClr val="accent1">
+                <a:lumMod val="50000"/>
+              </a:schemeClr>
+            </a:solidFill>
+          </a:ln>
+        </p:spPr>
+        <p:style>
+          <a:lnRef idx="2">
+            <a:schemeClr val="accent1">
+              <a:shade val="50000"/>
+            </a:schemeClr>
+          </a:lnRef>
+          <a:fillRef idx="1">
+            <a:schemeClr val="accent1"/>
+          </a:fillRef>
+          <a:effectRef idx="0">
+            <a:schemeClr val="accent1"/>
+          </a:effectRef>
+          <a:fontRef idx="minor">
+            <a:schemeClr val="lt1"/>
+          </a:fontRef>
+        </p:style>
+        <p:txBody>
+          <a:bodyPr rtlCol="0" anchor="ctr"/>
+          <a:lstStyle/>
+          <a:p>
+            <a:pPr algn="ctr"/>
+            <a:r>
+              <a:rPr lang="en-US" sz="2000" b="1" dirty="0" smtClean="0"/>
+              <a:t>V1</a:t>
+            </a:r>
+          </a:p>
+          <a:p>
+            <a:pPr algn="ctr"/>
+            <a:r>
+              <a:rPr lang="en-US" sz="2000" b="1" dirty="0" smtClean="0"/>
+              <a:t>Instance</a:t>
+            </a:r>
+            <a:endParaRPr lang="de-DE" sz="2000" b="1" dirty="0"/>
+          </a:p>
+        </p:txBody>
+      </p:sp>
+      <p:pic>
+        <p:nvPicPr>
+          <p:cNvPr id="85" name="Picture 2" descr="https://a0.awsstatic.com/main/images/logos/aws_logo.png"/>
+          <p:cNvPicPr>
+            <a:picLocks noChangeAspect="1" noChangeArrowheads="1"/>
+          </p:cNvPicPr>
+          <p:nvPr/>
+        </p:nvPicPr>
+        <p:blipFill>
+          <a:blip r:embed="rId2">
+            <a:extLst>
+              <a:ext uri="{28A0092B-C50C-407E-A947-70E740481C1C}">
+                <a14:useLocalDpi xmlns:a14="http://schemas.microsoft.com/office/drawing/2010/main" val="0"/>
+              </a:ext>
+            </a:extLst>
+          </a:blip>
+          <a:srcRect/>
+          <a:stretch>
+            <a:fillRect/>
+          </a:stretch>
+        </p:blipFill>
+        <p:spPr bwMode="auto">
+          <a:xfrm>
+            <a:off x="9501456" y="4382995"/>
+            <a:ext cx="1466377" cy="553964"/>
+          </a:xfrm>
+          <a:prstGeom prst="rect">
+            <a:avLst/>
+          </a:prstGeom>
+          <a:noFill/>
+          <a:extLst>
+            <a:ext uri="{909E8E84-426E-40DD-AFC4-6F175D3DCCD1}">
+              <a14:hiddenFill xmlns:a14="http://schemas.microsoft.com/office/drawing/2010/main">
+                <a:solidFill>
+                  <a:srgbClr val="FFFFFF"/>
+                </a:solidFill>
+              </a14:hiddenFill>
+            </a:ext>
+          </a:extLst>
+        </p:spPr>
+      </p:pic>
+      <p:grpSp>
+        <p:nvGrpSpPr>
+          <p:cNvPr id="66" name="Group 41"/>
+          <p:cNvGrpSpPr/>
+          <p:nvPr/>
+        </p:nvGrpSpPr>
+        <p:grpSpPr>
+          <a:xfrm>
+            <a:off x="8974017" y="3256641"/>
+            <a:ext cx="2634343" cy="708691"/>
+            <a:chOff x="671873" y="646669"/>
+            <a:chExt cx="2634343" cy="708691"/>
+          </a:xfrm>
+        </p:grpSpPr>
+        <p:sp>
+          <p:nvSpPr>
+            <p:cNvPr id="67" name="Snip Diagonal Corner Rectangle 95"/>
+            <p:cNvSpPr/>
+            <p:nvPr/>
+          </p:nvSpPr>
+          <p:spPr>
+            <a:xfrm>
+              <a:off x="671873" y="646669"/>
+              <a:ext cx="2634342" cy="708691"/>
+            </a:xfrm>
+            <a:prstGeom prst="roundRect">
+              <a:avLst/>
+            </a:prstGeom>
+            <a:solidFill>
+              <a:srgbClr val="996633"/>
+            </a:solidFill>
+            <a:ln w="76200">
+              <a:solidFill>
+                <a:srgbClr val="663300"/>
+              </a:solidFill>
+            </a:ln>
+          </p:spPr>
+          <p:style>
+            <a:lnRef idx="2">
+              <a:schemeClr val="accent4">
+                <a:shade val="50000"/>
+              </a:schemeClr>
+            </a:lnRef>
+            <a:fillRef idx="1">
+              <a:schemeClr val="accent4"/>
+            </a:fillRef>
+            <a:effectRef idx="0">
+              <a:schemeClr val="accent4"/>
+            </a:effectRef>
+            <a:fontRef idx="minor">
+              <a:schemeClr val="lt1"/>
+            </a:fontRef>
+          </p:style>
+          <p:txBody>
+            <a:bodyPr rtlCol="0" anchor="ctr"/>
+            <a:lstStyle/>
+            <a:p>
+              <a:pPr algn="ctr"/>
+              <a:endParaRPr lang="de-DE" dirty="0"/>
+            </a:p>
+          </p:txBody>
+        </p:sp>
+        <p:sp>
+          <p:nvSpPr>
+            <p:cNvPr id="68" name="TextBox 96"/>
+            <p:cNvSpPr txBox="1"/>
+            <p:nvPr/>
+          </p:nvSpPr>
+          <p:spPr>
+            <a:xfrm>
+              <a:off x="715416" y="793462"/>
+              <a:ext cx="2590800" cy="434935"/>
+            </a:xfrm>
+            <a:prstGeom prst="snip2SameRect">
+              <a:avLst/>
+            </a:prstGeom>
+            <a:noFill/>
+            <a:ln w="76200">
+              <a:noFill/>
+            </a:ln>
+          </p:spPr>
+          <p:txBody>
+            <a:bodyPr wrap="square" rtlCol="0">
+              <a:spAutoFit/>
+            </a:bodyPr>
+            <a:lstStyle/>
+            <a:p>
+              <a:pPr algn="ctr"/>
+              <a:r>
+                <a:rPr lang="en-US" sz="2000" b="1" dirty="0" smtClean="0">
+                  <a:solidFill>
+                    <a:schemeClr val="bg1"/>
+                  </a:solidFill>
+                </a:rPr>
+                <a:t>Elastic Load Balancer</a:t>
+              </a:r>
+              <a:endParaRPr lang="de-DE" sz="2400" b="1" dirty="0">
+                <a:solidFill>
+                  <a:schemeClr val="bg1"/>
+                </a:solidFill>
+              </a:endParaRPr>
+            </a:p>
+          </p:txBody>
+        </p:sp>
+      </p:grpSp>
+      <p:sp>
+        <p:nvSpPr>
+          <p:cNvPr id="98" name="Rounded Rectangle 75"/>
+          <p:cNvSpPr/>
+          <p:nvPr/>
+        </p:nvSpPr>
+        <p:spPr>
+          <a:xfrm>
+            <a:off x="8180863" y="5370484"/>
+            <a:ext cx="1441656" cy="1514439"/>
+          </a:xfrm>
+          <a:prstGeom prst="rect">
+            <a:avLst/>
+          </a:prstGeom>
+          <a:solidFill>
+            <a:schemeClr val="accent1">
+              <a:lumMod val="75000"/>
+            </a:schemeClr>
+          </a:solidFill>
+          <a:ln w="76200">
+            <a:solidFill>
+              <a:schemeClr val="accent1">
+                <a:lumMod val="50000"/>
+              </a:schemeClr>
+            </a:solidFill>
+          </a:ln>
+        </p:spPr>
+        <p:style>
+          <a:lnRef idx="2">
+            <a:schemeClr val="accent1">
+              <a:shade val="50000"/>
+            </a:schemeClr>
+          </a:lnRef>
+          <a:fillRef idx="1">
+            <a:schemeClr val="accent1"/>
+          </a:fillRef>
+          <a:effectRef idx="0">
+            <a:schemeClr val="accent1"/>
+          </a:effectRef>
+          <a:fontRef idx="minor">
+            <a:schemeClr val="lt1"/>
+          </a:fontRef>
+        </p:style>
+        <p:txBody>
+          <a:bodyPr rtlCol="0" anchor="ctr"/>
+          <a:lstStyle/>
+          <a:p>
+            <a:pPr algn="ctr"/>
+            <a:r>
+              <a:rPr lang="en-US" sz="2000" b="1" dirty="0" smtClean="0"/>
+              <a:t>V1</a:t>
+            </a:r>
+          </a:p>
+          <a:p>
+            <a:pPr algn="ctr"/>
+            <a:r>
+              <a:rPr lang="en-US" sz="2000" b="1" dirty="0" smtClean="0"/>
+              <a:t>Instance</a:t>
+            </a:r>
+            <a:endParaRPr lang="de-DE" sz="2000" b="1" dirty="0"/>
+          </a:p>
+        </p:txBody>
+      </p:sp>
+      <p:sp>
+        <p:nvSpPr>
+          <p:cNvPr id="99" name="Rounded Rectangle 75"/>
+          <p:cNvSpPr/>
+          <p:nvPr/>
+        </p:nvSpPr>
+        <p:spPr>
+          <a:xfrm>
+            <a:off x="10899360" y="5218084"/>
+            <a:ext cx="1441656" cy="1514439"/>
+          </a:xfrm>
+          <a:prstGeom prst="rect">
+            <a:avLst/>
+          </a:prstGeom>
+          <a:solidFill>
+            <a:schemeClr val="accent6">
+              <a:lumMod val="75000"/>
+            </a:schemeClr>
+          </a:solidFill>
+          <a:ln w="76200">
+            <a:solidFill>
+              <a:schemeClr val="accent6">
+                <a:lumMod val="50000"/>
+              </a:schemeClr>
+            </a:solidFill>
+          </a:ln>
+        </p:spPr>
+        <p:style>
+          <a:lnRef idx="2">
+            <a:schemeClr val="accent1">
+              <a:shade val="50000"/>
+            </a:schemeClr>
+          </a:lnRef>
+          <a:fillRef idx="1">
+            <a:schemeClr val="accent1"/>
+          </a:fillRef>
+          <a:effectRef idx="0">
+            <a:schemeClr val="accent1"/>
+          </a:effectRef>
+          <a:fontRef idx="minor">
+            <a:schemeClr val="lt1"/>
+          </a:fontRef>
+        </p:style>
+        <p:txBody>
+          <a:bodyPr rtlCol="0" anchor="ctr"/>
+          <a:lstStyle/>
+          <a:p>
+            <a:pPr algn="ctr"/>
+            <a:r>
+              <a:rPr lang="en-US" sz="2000" b="1" dirty="0" smtClean="0"/>
+              <a:t>V1</a:t>
+            </a:r>
+          </a:p>
+          <a:p>
+            <a:pPr algn="ctr"/>
+            <a:r>
+              <a:rPr lang="en-US" sz="2000" b="1" dirty="0" smtClean="0"/>
+              <a:t>Instance</a:t>
+            </a:r>
+            <a:endParaRPr lang="de-DE" sz="2000" b="1" dirty="0"/>
+          </a:p>
+        </p:txBody>
+      </p:sp>
+      <p:sp>
+        <p:nvSpPr>
+          <p:cNvPr id="101" name="Rounded Rectangle 75"/>
+          <p:cNvSpPr/>
+          <p:nvPr/>
+        </p:nvSpPr>
+        <p:spPr>
+          <a:xfrm>
+            <a:off x="10739424" y="5392256"/>
+            <a:ext cx="1441656" cy="1514439"/>
+          </a:xfrm>
+          <a:prstGeom prst="rect">
+            <a:avLst/>
+          </a:prstGeom>
+          <a:solidFill>
+            <a:schemeClr val="accent6">
+              <a:lumMod val="75000"/>
+            </a:schemeClr>
+          </a:solidFill>
+          <a:ln w="76200">
+            <a:solidFill>
+              <a:schemeClr val="accent6">
+                <a:lumMod val="50000"/>
+              </a:schemeClr>
+            </a:solidFill>
+          </a:ln>
+        </p:spPr>
+        <p:style>
+          <a:lnRef idx="2">
+            <a:schemeClr val="accent1">
+              <a:shade val="50000"/>
+            </a:schemeClr>
+          </a:lnRef>
+          <a:fillRef idx="1">
+            <a:schemeClr val="accent1"/>
+          </a:fillRef>
+          <a:effectRef idx="0">
+            <a:schemeClr val="accent1"/>
+          </a:effectRef>
+          <a:fontRef idx="minor">
+            <a:schemeClr val="lt1"/>
+          </a:fontRef>
+        </p:style>
+        <p:txBody>
+          <a:bodyPr rtlCol="0" anchor="ctr"/>
+          <a:lstStyle/>
+          <a:p>
+            <a:pPr algn="ctr"/>
+            <a:r>
+              <a:rPr lang="en-US" sz="2000" b="1" dirty="0" smtClean="0"/>
+              <a:t>V2</a:t>
+            </a:r>
+          </a:p>
+          <a:p>
+            <a:pPr algn="ctr"/>
+            <a:r>
+              <a:rPr lang="en-US" sz="2000" b="1" dirty="0" smtClean="0"/>
+              <a:t>Instance</a:t>
+            </a:r>
+            <a:endParaRPr lang="de-DE" sz="2000" b="1" dirty="0"/>
+          </a:p>
+        </p:txBody>
+      </p:sp>
+      <p:cxnSp>
+        <p:nvCxnSpPr>
+          <p:cNvPr id="102" name="Straight Arrow Connector 101"/>
+          <p:cNvCxnSpPr/>
+          <p:nvPr/>
+        </p:nvCxnSpPr>
+        <p:spPr>
+          <a:xfrm flipH="1">
+            <a:off x="9066040" y="4088423"/>
+            <a:ext cx="517575" cy="1055293"/>
+          </a:xfrm>
+          <a:prstGeom prst="straightConnector1">
+            <a:avLst/>
+          </a:prstGeom>
+          <a:ln w="142875">
+            <a:solidFill>
+              <a:schemeClr val="tx1">
+                <a:lumMod val="50000"/>
+                <a:lumOff val="50000"/>
+              </a:schemeClr>
+            </a:solidFill>
+            <a:tailEnd type="triangle"/>
+          </a:ln>
+        </p:spPr>
+        <p:style>
+          <a:lnRef idx="1">
+            <a:schemeClr val="accent1"/>
+          </a:lnRef>
+          <a:fillRef idx="0">
+            <a:schemeClr val="accent1"/>
+          </a:fillRef>
+          <a:effectRef idx="0">
+            <a:schemeClr val="accent1"/>
+          </a:effectRef>
+          <a:fontRef idx="minor">
+            <a:schemeClr val="tx1"/>
+          </a:fontRef>
+        </p:style>
+      </p:cxnSp>
+      <p:cxnSp>
+        <p:nvCxnSpPr>
+          <p:cNvPr id="103" name="Straight Arrow Connector 102"/>
+          <p:cNvCxnSpPr/>
+          <p:nvPr/>
+        </p:nvCxnSpPr>
+        <p:spPr>
+          <a:xfrm>
+            <a:off x="10946423" y="4106007"/>
+            <a:ext cx="478887" cy="1040640"/>
+          </a:xfrm>
+          <a:prstGeom prst="straightConnector1">
+            <a:avLst/>
+          </a:prstGeom>
+          <a:ln w="142875">
+            <a:solidFill>
+              <a:schemeClr val="bg1">
+                <a:lumMod val="75000"/>
+              </a:schemeClr>
+            </a:solidFill>
+            <a:prstDash val="sysDot"/>
+            <a:tailEnd type="triangle"/>
+          </a:ln>
+        </p:spPr>
+        <p:style>
+          <a:lnRef idx="1">
+            <a:schemeClr val="accent1"/>
+          </a:lnRef>
+          <a:fillRef idx="0">
+            <a:schemeClr val="accent1"/>
+          </a:fillRef>
+          <a:effectRef idx="0">
+            <a:schemeClr val="accent1"/>
+          </a:effectRef>
+          <a:fontRef idx="minor">
+            <a:schemeClr val="tx1"/>
+          </a:fontRef>
+        </p:style>
+      </p:cxnSp>
+    </p:spTree>
+    <p:extLst>
+      <p:ext uri="{BB962C8B-B14F-4D97-AF65-F5344CB8AC3E}">
+        <p14:creationId xmlns:p14="http://schemas.microsoft.com/office/powerpoint/2010/main" val="1215393091"/>
+      </p:ext>
+    </p:extLst>
+  </p:cSld>
+  <p:clrMapOvr>
+    <a:masterClrMapping/>
+  </p:clrMapOvr>
+  <p:timing>
+    <p:tnLst>
+      <p:par>
+        <p:cTn id="1" dur="indefinite" restart="never" nodeType="tmRoot"/>
+      </p:par>
+    </p:tnLst>
+  </p:timing>
+</p:sld>
+</file>
+
+<file path=ppt/slides/slide13.xml><?xml version="1.0" encoding="utf-8"?>
+<p:sld xmlns:a="http://schemas.openxmlformats.org/drawingml/2006/main" xmlns:r="http://schemas.openxmlformats.org/officeDocument/2006/relationships" xmlns:p="http://schemas.openxmlformats.org/presentationml/2006/main">
+  <p:cSld>
+    <p:spTree>
+      <p:nvGrpSpPr>
+        <p:cNvPr id="1" name=""/>
+        <p:cNvGrpSpPr/>
+        <p:nvPr/>
+      </p:nvGrpSpPr>
+      <p:grpSpPr>
+        <a:xfrm>
+          <a:off x="0" y="0"/>
+          <a:ext cx="0" cy="0"/>
+          <a:chOff x="0" y="0"/>
+          <a:chExt cx="0" cy="0"/>
+        </a:xfrm>
+      </p:grpSpPr>
       <p:pic>
         <p:nvPicPr>
           <p:cNvPr id="6" name="Picture 5"/>
@@ -10079,7 +10593,7 @@
 </p:sld>
 </file>
 
-<file path=ppt/slides/slide13.xml><?xml version="1.0" encoding="utf-8"?>
+<file path=ppt/slides/slide14.xml><?xml version="1.0" encoding="utf-8"?>
 <p:sld xmlns:a="http://schemas.openxmlformats.org/drawingml/2006/main" xmlns:r="http://schemas.openxmlformats.org/officeDocument/2006/relationships" xmlns:p="http://schemas.openxmlformats.org/presentationml/2006/main">
   <p:cSld>
     <p:spTree>
@@ -11465,7 +11979,7 @@
 </p:sld>
 </file>
 
-<file path=ppt/slides/slide14.xml><?xml version="1.0" encoding="utf-8"?>
+<file path=ppt/slides/slide15.xml><?xml version="1.0" encoding="utf-8"?>
 <p:sld xmlns:a="http://schemas.openxmlformats.org/drawingml/2006/main" xmlns:r="http://schemas.openxmlformats.org/officeDocument/2006/relationships" xmlns:p="http://schemas.openxmlformats.org/presentationml/2006/main">
   <p:cSld>
     <p:spTree>
@@ -12252,7 +12766,7 @@
 </p:sld>
 </file>
 
-<file path=ppt/slides/slide15.xml><?xml version="1.0" encoding="utf-8"?>
+<file path=ppt/slides/slide16.xml><?xml version="1.0" encoding="utf-8"?>
 <p:sld xmlns:a="http://schemas.openxmlformats.org/drawingml/2006/main" xmlns:r="http://schemas.openxmlformats.org/officeDocument/2006/relationships" xmlns:p="http://schemas.openxmlformats.org/presentationml/2006/main">
   <p:cSld>
     <p:spTree>
@@ -13025,7 +13539,7 @@
 </p:sld>
 </file>
 
-<file path=ppt/slides/slide16.xml><?xml version="1.0" encoding="utf-8"?>
+<file path=ppt/slides/slide17.xml><?xml version="1.0" encoding="utf-8"?>
 <p:sld xmlns:a="http://schemas.openxmlformats.org/drawingml/2006/main" xmlns:r="http://schemas.openxmlformats.org/officeDocument/2006/relationships" xmlns:p="http://schemas.openxmlformats.org/presentationml/2006/main">
   <p:cSld>
     <p:spTree>
@@ -13872,7 +14386,7 @@
 </p:sld>
 </file>
 
-<file path=ppt/slides/slide17.xml><?xml version="1.0" encoding="utf-8"?>
+<file path=ppt/slides/slide18.xml><?xml version="1.0" encoding="utf-8"?>
 <p:sld xmlns:a="http://schemas.openxmlformats.org/drawingml/2006/main" xmlns:r="http://schemas.openxmlformats.org/officeDocument/2006/relationships" xmlns:p="http://schemas.openxmlformats.org/presentationml/2006/main">
   <p:cSld>
     <p:spTree>
@@ -14818,7 +15332,7 @@
 </p:sld>
 </file>
 
-<file path=ppt/slides/slide18.xml><?xml version="1.0" encoding="utf-8"?>
+<file path=ppt/slides/slide19.xml><?xml version="1.0" encoding="utf-8"?>
 <p:sld xmlns:a="http://schemas.openxmlformats.org/drawingml/2006/main" xmlns:r="http://schemas.openxmlformats.org/officeDocument/2006/relationships" xmlns:p="http://schemas.openxmlformats.org/presentationml/2006/main">
   <p:cSld>
     <p:spTree>
@@ -15297,657 +15811,6 @@
     <p:extLst>
       <p:ext uri="{BB962C8B-B14F-4D97-AF65-F5344CB8AC3E}">
         <p14:creationId xmlns:p14="http://schemas.microsoft.com/office/powerpoint/2010/main" val="1264328124"/>
-      </p:ext>
-    </p:extLst>
-  </p:cSld>
-  <p:clrMapOvr>
-    <a:masterClrMapping/>
-  </p:clrMapOvr>
-  <p:timing>
-    <p:tnLst>
-      <p:par>
-        <p:cTn id="1" dur="indefinite" restart="never" nodeType="tmRoot"/>
-      </p:par>
-    </p:tnLst>
-  </p:timing>
-</p:sld>
-</file>
-
-<file path=ppt/slides/slide19.xml><?xml version="1.0" encoding="utf-8"?>
-<p:sld xmlns:a="http://schemas.openxmlformats.org/drawingml/2006/main" xmlns:r="http://schemas.openxmlformats.org/officeDocument/2006/relationships" xmlns:p="http://schemas.openxmlformats.org/presentationml/2006/main">
-  <p:cSld>
-    <p:spTree>
-      <p:nvGrpSpPr>
-        <p:cNvPr id="1" name=""/>
-        <p:cNvGrpSpPr/>
-        <p:nvPr/>
-      </p:nvGrpSpPr>
-      <p:grpSpPr>
-        <a:xfrm>
-          <a:off x="0" y="0"/>
-          <a:ext cx="0" cy="0"/>
-          <a:chOff x="0" y="0"/>
-          <a:chExt cx="0" cy="0"/>
-        </a:xfrm>
-      </p:grpSpPr>
-      <p:pic>
-        <p:nvPicPr>
-          <p:cNvPr id="7" name="Picture 6"/>
-          <p:cNvPicPr>
-            <a:picLocks noChangeAspect="1"/>
-          </p:cNvPicPr>
-          <p:nvPr/>
-        </p:nvPicPr>
-        <p:blipFill>
-          <a:blip r:embed="rId2">
-            <a:extLst>
-              <a:ext uri="{28A0092B-C50C-407E-A947-70E740481C1C}">
-                <a14:useLocalDpi xmlns:a14="http://schemas.microsoft.com/office/drawing/2010/main" val="0"/>
-              </a:ext>
-            </a:extLst>
-          </a:blip>
-          <a:stretch>
-            <a:fillRect/>
-          </a:stretch>
-        </p:blipFill>
-        <p:spPr>
-          <a:xfrm>
-            <a:off x="7691802" y="2136231"/>
-            <a:ext cx="695422" cy="1143160"/>
-          </a:xfrm>
-          <a:prstGeom prst="rect">
-            <a:avLst/>
-          </a:prstGeom>
-        </p:spPr>
-      </p:pic>
-      <p:pic>
-        <p:nvPicPr>
-          <p:cNvPr id="9" name="Picture 8"/>
-          <p:cNvPicPr>
-            <a:picLocks noChangeAspect="1"/>
-          </p:cNvPicPr>
-          <p:nvPr/>
-        </p:nvPicPr>
-        <p:blipFill>
-          <a:blip r:embed="rId3">
-            <a:extLst>
-              <a:ext uri="{28A0092B-C50C-407E-A947-70E740481C1C}">
-                <a14:useLocalDpi xmlns:a14="http://schemas.microsoft.com/office/drawing/2010/main" val="0"/>
-              </a:ext>
-            </a:extLst>
-          </a:blip>
-          <a:stretch>
-            <a:fillRect/>
-          </a:stretch>
-        </p:blipFill>
-        <p:spPr>
-          <a:xfrm>
-            <a:off x="9823295" y="2378807"/>
-            <a:ext cx="1538745" cy="615498"/>
-          </a:xfrm>
-          <a:prstGeom prst="rect">
-            <a:avLst/>
-          </a:prstGeom>
-        </p:spPr>
-      </p:pic>
-      <p:grpSp>
-        <p:nvGrpSpPr>
-          <p:cNvPr id="45" name="Group 44"/>
-          <p:cNvGrpSpPr/>
-          <p:nvPr/>
-        </p:nvGrpSpPr>
-        <p:grpSpPr>
-          <a:xfrm>
-            <a:off x="8558584" y="1996015"/>
-            <a:ext cx="1151769" cy="673166"/>
-            <a:chOff x="2334271" y="318043"/>
-            <a:chExt cx="1457473" cy="673166"/>
-          </a:xfrm>
-        </p:grpSpPr>
-        <p:cxnSp>
-          <p:nvCxnSpPr>
-            <p:cNvPr id="46" name="Straight Arrow Connector 45"/>
-            <p:cNvCxnSpPr/>
-            <p:nvPr/>
-          </p:nvCxnSpPr>
-          <p:spPr>
-            <a:xfrm flipV="1">
-              <a:off x="2346123" y="980728"/>
-              <a:ext cx="1445621" cy="10481"/>
-            </a:xfrm>
-            <a:prstGeom prst="straightConnector1">
-              <a:avLst/>
-            </a:prstGeom>
-            <a:ln w="142875">
-              <a:solidFill>
-                <a:schemeClr val="tx1">
-                  <a:lumMod val="50000"/>
-                  <a:lumOff val="50000"/>
-                </a:schemeClr>
-              </a:solidFill>
-              <a:tailEnd type="triangle"/>
-            </a:ln>
-          </p:spPr>
-          <p:style>
-            <a:lnRef idx="1">
-              <a:schemeClr val="accent1"/>
-            </a:lnRef>
-            <a:fillRef idx="0">
-              <a:schemeClr val="accent1"/>
-            </a:fillRef>
-            <a:effectRef idx="0">
-              <a:schemeClr val="accent1"/>
-            </a:effectRef>
-            <a:fontRef idx="minor">
-              <a:schemeClr val="tx1"/>
-            </a:fontRef>
-          </p:style>
-        </p:cxnSp>
-        <p:sp>
-          <p:nvSpPr>
-            <p:cNvPr id="47" name="TextBox 46"/>
-            <p:cNvSpPr txBox="1"/>
-            <p:nvPr/>
-          </p:nvSpPr>
-          <p:spPr>
-            <a:xfrm>
-              <a:off x="2334271" y="318043"/>
-              <a:ext cx="1408522" cy="523220"/>
-            </a:xfrm>
-            <a:prstGeom prst="rect">
-              <a:avLst/>
-            </a:prstGeom>
-            <a:noFill/>
-          </p:spPr>
-          <p:txBody>
-            <a:bodyPr wrap="square" rtlCol="0">
-              <a:spAutoFit/>
-            </a:bodyPr>
-            <a:lstStyle/>
-            <a:p>
-              <a:pPr algn="ctr"/>
-              <a:endParaRPr lang="de-DE" sz="2800" b="1" dirty="0"/>
-            </a:p>
-          </p:txBody>
-        </p:sp>
-      </p:grpSp>
-      <p:pic>
-        <p:nvPicPr>
-          <p:cNvPr id="8" name="Picture 7"/>
-          <p:cNvPicPr>
-            <a:picLocks noChangeAspect="1"/>
-          </p:cNvPicPr>
-          <p:nvPr/>
-        </p:nvPicPr>
-        <p:blipFill>
-          <a:blip r:embed="rId2">
-            <a:extLst>
-              <a:ext uri="{28A0092B-C50C-407E-A947-70E740481C1C}">
-                <a14:useLocalDpi xmlns:a14="http://schemas.microsoft.com/office/drawing/2010/main" val="0"/>
-              </a:ext>
-            </a:extLst>
-          </a:blip>
-          <a:stretch>
-            <a:fillRect/>
-          </a:stretch>
-        </p:blipFill>
-        <p:spPr>
-          <a:xfrm>
-            <a:off x="1054165" y="2233026"/>
-            <a:ext cx="695422" cy="1143160"/>
-          </a:xfrm>
-          <a:prstGeom prst="rect">
-            <a:avLst/>
-          </a:prstGeom>
-        </p:spPr>
-      </p:pic>
-      <p:pic>
-        <p:nvPicPr>
-          <p:cNvPr id="10" name="Picture 9"/>
-          <p:cNvPicPr>
-            <a:picLocks noChangeAspect="1"/>
-          </p:cNvPicPr>
-          <p:nvPr/>
-        </p:nvPicPr>
-        <p:blipFill>
-          <a:blip r:embed="rId3">
-            <a:extLst>
-              <a:ext uri="{28A0092B-C50C-407E-A947-70E740481C1C}">
-                <a14:useLocalDpi xmlns:a14="http://schemas.microsoft.com/office/drawing/2010/main" val="0"/>
-              </a:ext>
-            </a:extLst>
-          </a:blip>
-          <a:stretch>
-            <a:fillRect/>
-          </a:stretch>
-        </p:blipFill>
-        <p:spPr>
-          <a:xfrm>
-            <a:off x="3228905" y="2475602"/>
-            <a:ext cx="1538745" cy="615498"/>
-          </a:xfrm>
-          <a:prstGeom prst="rect">
-            <a:avLst/>
-          </a:prstGeom>
-        </p:spPr>
-      </p:pic>
-      <p:grpSp>
-        <p:nvGrpSpPr>
-          <p:cNvPr id="11" name="Group 10"/>
-          <p:cNvGrpSpPr/>
-          <p:nvPr/>
-        </p:nvGrpSpPr>
-        <p:grpSpPr>
-          <a:xfrm>
-            <a:off x="1964194" y="2092810"/>
-            <a:ext cx="1151769" cy="673166"/>
-            <a:chOff x="2334271" y="318043"/>
-            <a:chExt cx="1457473" cy="673166"/>
-          </a:xfrm>
-        </p:grpSpPr>
-        <p:cxnSp>
-          <p:nvCxnSpPr>
-            <p:cNvPr id="12" name="Straight Arrow Connector 11"/>
-            <p:cNvCxnSpPr/>
-            <p:nvPr/>
-          </p:nvCxnSpPr>
-          <p:spPr>
-            <a:xfrm flipV="1">
-              <a:off x="2346123" y="980728"/>
-              <a:ext cx="1445621" cy="10481"/>
-            </a:xfrm>
-            <a:prstGeom prst="straightConnector1">
-              <a:avLst/>
-            </a:prstGeom>
-            <a:ln w="142875">
-              <a:solidFill>
-                <a:schemeClr val="tx1">
-                  <a:lumMod val="50000"/>
-                  <a:lumOff val="50000"/>
-                </a:schemeClr>
-              </a:solidFill>
-              <a:tailEnd type="triangle"/>
-            </a:ln>
-          </p:spPr>
-          <p:style>
-            <a:lnRef idx="1">
-              <a:schemeClr val="accent1"/>
-            </a:lnRef>
-            <a:fillRef idx="0">
-              <a:schemeClr val="accent1"/>
-            </a:fillRef>
-            <a:effectRef idx="0">
-              <a:schemeClr val="accent1"/>
-            </a:effectRef>
-            <a:fontRef idx="minor">
-              <a:schemeClr val="tx1"/>
-            </a:fontRef>
-          </p:style>
-        </p:cxnSp>
-        <p:sp>
-          <p:nvSpPr>
-            <p:cNvPr id="13" name="TextBox 12"/>
-            <p:cNvSpPr txBox="1"/>
-            <p:nvPr/>
-          </p:nvSpPr>
-          <p:spPr>
-            <a:xfrm>
-              <a:off x="2334271" y="318043"/>
-              <a:ext cx="1408522" cy="523220"/>
-            </a:xfrm>
-            <a:prstGeom prst="rect">
-              <a:avLst/>
-            </a:prstGeom>
-            <a:noFill/>
-          </p:spPr>
-          <p:txBody>
-            <a:bodyPr wrap="square" rtlCol="0">
-              <a:spAutoFit/>
-            </a:bodyPr>
-            <a:lstStyle/>
-            <a:p>
-              <a:pPr algn="ctr"/>
-              <a:endParaRPr lang="de-DE" sz="2800" b="1" dirty="0"/>
-            </a:p>
-          </p:txBody>
-        </p:sp>
-      </p:grpSp>
-      <p:pic>
-        <p:nvPicPr>
-          <p:cNvPr id="1026" name="Picture 2" descr="Logo"/>
-          <p:cNvPicPr>
-            <a:picLocks noChangeAspect="1" noChangeArrowheads="1"/>
-          </p:cNvPicPr>
-          <p:nvPr/>
-        </p:nvPicPr>
-        <p:blipFill>
-          <a:blip r:embed="rId4">
-            <a:extLst>
-              <a:ext uri="{28A0092B-C50C-407E-A947-70E740481C1C}">
-                <a14:useLocalDpi xmlns:a14="http://schemas.microsoft.com/office/drawing/2010/main" val="0"/>
-              </a:ext>
-            </a:extLst>
-          </a:blip>
-          <a:srcRect/>
-          <a:stretch>
-            <a:fillRect/>
-          </a:stretch>
-        </p:blipFill>
-        <p:spPr bwMode="auto">
-          <a:xfrm>
-            <a:off x="8292500" y="2802848"/>
-            <a:ext cx="1648513" cy="374662"/>
-          </a:xfrm>
-          <a:prstGeom prst="rect">
-            <a:avLst/>
-          </a:prstGeom>
-          <a:noFill/>
-          <a:extLst>
-            <a:ext uri="{909E8E84-426E-40DD-AFC4-6F175D3DCCD1}">
-              <a14:hiddenFill xmlns:a14="http://schemas.microsoft.com/office/drawing/2010/main">
-                <a:solidFill>
-                  <a:srgbClr val="FFFFFF"/>
-                </a:solidFill>
-              </a14:hiddenFill>
-            </a:ext>
-          </a:extLst>
-        </p:spPr>
-      </p:pic>
-      <p:pic>
-        <p:nvPicPr>
-          <p:cNvPr id="14" name="Picture 13"/>
-          <p:cNvPicPr>
-            <a:picLocks noChangeAspect="1"/>
-          </p:cNvPicPr>
-          <p:nvPr/>
-        </p:nvPicPr>
-        <p:blipFill>
-          <a:blip r:embed="rId2">
-            <a:extLst>
-              <a:ext uri="{28A0092B-C50C-407E-A947-70E740481C1C}">
-                <a14:useLocalDpi xmlns:a14="http://schemas.microsoft.com/office/drawing/2010/main" val="0"/>
-              </a:ext>
-            </a:extLst>
-          </a:blip>
-          <a:stretch>
-            <a:fillRect/>
-          </a:stretch>
-        </p:blipFill>
-        <p:spPr>
-          <a:xfrm>
-            <a:off x="5941262" y="6218079"/>
-            <a:ext cx="695422" cy="1143160"/>
-          </a:xfrm>
-          <a:prstGeom prst="rect">
-            <a:avLst/>
-          </a:prstGeom>
-        </p:spPr>
-      </p:pic>
-      <p:pic>
-        <p:nvPicPr>
-          <p:cNvPr id="15" name="Picture 14"/>
-          <p:cNvPicPr>
-            <a:picLocks noChangeAspect="1"/>
-          </p:cNvPicPr>
-          <p:nvPr/>
-        </p:nvPicPr>
-        <p:blipFill>
-          <a:blip r:embed="rId3">
-            <a:extLst>
-              <a:ext uri="{28A0092B-C50C-407E-A947-70E740481C1C}">
-                <a14:useLocalDpi xmlns:a14="http://schemas.microsoft.com/office/drawing/2010/main" val="0"/>
-              </a:ext>
-            </a:extLst>
-          </a:blip>
-          <a:stretch>
-            <a:fillRect/>
-          </a:stretch>
-        </p:blipFill>
-        <p:spPr>
-          <a:xfrm>
-            <a:off x="8072755" y="6460655"/>
-            <a:ext cx="1538745" cy="615498"/>
-          </a:xfrm>
-          <a:prstGeom prst="rect">
-            <a:avLst/>
-          </a:prstGeom>
-        </p:spPr>
-      </p:pic>
-      <p:cxnSp>
-        <p:nvCxnSpPr>
-          <p:cNvPr id="17" name="Straight Arrow Connector 16"/>
-          <p:cNvCxnSpPr/>
-          <p:nvPr/>
-        </p:nvCxnSpPr>
-        <p:spPr>
-          <a:xfrm flipV="1">
-            <a:off x="6798875" y="6742609"/>
-            <a:ext cx="1142403" cy="10481"/>
-          </a:xfrm>
-          <a:prstGeom prst="straightConnector1">
-            <a:avLst/>
-          </a:prstGeom>
-          <a:ln w="142875">
-            <a:solidFill>
-              <a:schemeClr val="tx1">
-                <a:lumMod val="50000"/>
-                <a:lumOff val="50000"/>
-              </a:schemeClr>
-            </a:solidFill>
-            <a:tailEnd type="triangle"/>
-          </a:ln>
-        </p:spPr>
-        <p:style>
-          <a:lnRef idx="1">
-            <a:schemeClr val="accent1"/>
-          </a:lnRef>
-          <a:fillRef idx="0">
-            <a:schemeClr val="accent1"/>
-          </a:fillRef>
-          <a:effectRef idx="0">
-            <a:schemeClr val="accent1"/>
-          </a:effectRef>
-          <a:fontRef idx="minor">
-            <a:schemeClr val="tx1"/>
-          </a:fontRef>
-        </p:style>
-      </p:cxnSp>
-      <p:pic>
-        <p:nvPicPr>
-          <p:cNvPr id="19" name="Picture 2" descr="Logo"/>
-          <p:cNvPicPr>
-            <a:picLocks noChangeAspect="1" noChangeArrowheads="1"/>
-          </p:cNvPicPr>
-          <p:nvPr/>
-        </p:nvPicPr>
-        <p:blipFill>
-          <a:blip r:embed="rId4">
-            <a:extLst>
-              <a:ext uri="{28A0092B-C50C-407E-A947-70E740481C1C}">
-                <a14:useLocalDpi xmlns:a14="http://schemas.microsoft.com/office/drawing/2010/main" val="0"/>
-              </a:ext>
-            </a:extLst>
-          </a:blip>
-          <a:srcRect/>
-          <a:stretch>
-            <a:fillRect/>
-          </a:stretch>
-        </p:blipFill>
-        <p:spPr bwMode="auto">
-          <a:xfrm>
-            <a:off x="6541960" y="6884696"/>
-            <a:ext cx="1648513" cy="374662"/>
-          </a:xfrm>
-          <a:prstGeom prst="rect">
-            <a:avLst/>
-          </a:prstGeom>
-          <a:noFill/>
-          <a:extLst>
-            <a:ext uri="{909E8E84-426E-40DD-AFC4-6F175D3DCCD1}">
-              <a14:hiddenFill xmlns:a14="http://schemas.microsoft.com/office/drawing/2010/main">
-                <a:solidFill>
-                  <a:srgbClr val="FFFFFF"/>
-                </a:solidFill>
-              </a14:hiddenFill>
-            </a:ext>
-          </a:extLst>
-        </p:spPr>
-      </p:pic>
-      <p:pic>
-        <p:nvPicPr>
-          <p:cNvPr id="23" name="Picture 22"/>
-          <p:cNvPicPr>
-            <a:picLocks noChangeAspect="1"/>
-          </p:cNvPicPr>
-          <p:nvPr/>
-        </p:nvPicPr>
-        <p:blipFill>
-          <a:blip r:embed="rId5" cstate="print">
-            <a:extLst>
-              <a:ext uri="{28A0092B-C50C-407E-A947-70E740481C1C}">
-                <a14:useLocalDpi xmlns:a14="http://schemas.microsoft.com/office/drawing/2010/main" val="0"/>
-              </a:ext>
-            </a:extLst>
-          </a:blip>
-          <a:stretch>
-            <a:fillRect/>
-          </a:stretch>
-        </p:blipFill>
-        <p:spPr>
-          <a:xfrm>
-            <a:off x="6810478" y="6222738"/>
-            <a:ext cx="1116380" cy="345217"/>
-          </a:xfrm>
-          <a:prstGeom prst="rect">
-            <a:avLst/>
-          </a:prstGeom>
-        </p:spPr>
-      </p:pic>
-      <p:pic>
-        <p:nvPicPr>
-          <p:cNvPr id="2" name="Picture 2" descr="https://assets-cdn.github.com/images/modules/logos_page/Octocat.png"/>
-          <p:cNvPicPr>
-            <a:picLocks noChangeAspect="1" noChangeArrowheads="1"/>
-          </p:cNvPicPr>
-          <p:nvPr/>
-        </p:nvPicPr>
-        <p:blipFill>
-          <a:blip r:embed="rId6" cstate="print">
-            <a:extLst>
-              <a:ext uri="{28A0092B-C50C-407E-A947-70E740481C1C}">
-                <a14:useLocalDpi xmlns:a14="http://schemas.microsoft.com/office/drawing/2010/main" val="0"/>
-              </a:ext>
-            </a:extLst>
-          </a:blip>
-          <a:srcRect/>
-          <a:stretch>
-            <a:fillRect/>
-          </a:stretch>
-        </p:blipFill>
-        <p:spPr bwMode="auto">
-          <a:xfrm>
-            <a:off x="3311436" y="6210581"/>
-            <a:ext cx="1472772" cy="1218385"/>
-          </a:xfrm>
-          <a:prstGeom prst="rect">
-            <a:avLst/>
-          </a:prstGeom>
-          <a:noFill/>
-          <a:extLst>
-            <a:ext uri="{909E8E84-426E-40DD-AFC4-6F175D3DCCD1}">
-              <a14:hiddenFill xmlns:a14="http://schemas.microsoft.com/office/drawing/2010/main">
-                <a:solidFill>
-                  <a:srgbClr val="FFFFFF"/>
-                </a:solidFill>
-              </a14:hiddenFill>
-            </a:ext>
-          </a:extLst>
-        </p:spPr>
-      </p:pic>
-      <p:pic>
-        <p:nvPicPr>
-          <p:cNvPr id="1028" name="Picture 4" descr="https://travis-ci.com/img/brand-standards/logo-downloads/TravisCI-Full-Color-vertical.png"/>
-          <p:cNvPicPr>
-            <a:picLocks noChangeAspect="1" noChangeArrowheads="1"/>
-          </p:cNvPicPr>
-          <p:nvPr/>
-        </p:nvPicPr>
-        <p:blipFill>
-          <a:blip r:embed="rId7">
-            <a:extLst>
-              <a:ext uri="{28A0092B-C50C-407E-A947-70E740481C1C}">
-                <a14:useLocalDpi xmlns:a14="http://schemas.microsoft.com/office/drawing/2010/main" val="0"/>
-              </a:ext>
-            </a:extLst>
-          </a:blip>
-          <a:srcRect/>
-          <a:stretch>
-            <a:fillRect/>
-          </a:stretch>
-        </p:blipFill>
-        <p:spPr bwMode="auto">
-          <a:xfrm>
-            <a:off x="4936524" y="6174410"/>
-            <a:ext cx="478494" cy="611147"/>
-          </a:xfrm>
-          <a:prstGeom prst="rect">
-            <a:avLst/>
-          </a:prstGeom>
-          <a:noFill/>
-          <a:extLst>
-            <a:ext uri="{909E8E84-426E-40DD-AFC4-6F175D3DCCD1}">
-              <a14:hiddenFill xmlns:a14="http://schemas.microsoft.com/office/drawing/2010/main">
-                <a:solidFill>
-                  <a:srgbClr val="FFFFFF"/>
-                </a:solidFill>
-              </a14:hiddenFill>
-            </a:ext>
-          </a:extLst>
-        </p:spPr>
-      </p:pic>
-      <p:cxnSp>
-        <p:nvCxnSpPr>
-          <p:cNvPr id="21" name="Straight Arrow Connector 20"/>
-          <p:cNvCxnSpPr/>
-          <p:nvPr/>
-        </p:nvCxnSpPr>
-        <p:spPr>
-          <a:xfrm flipV="1">
-            <a:off x="4764127" y="6742609"/>
-            <a:ext cx="1142403" cy="10481"/>
-          </a:xfrm>
-          <a:prstGeom prst="straightConnector1">
-            <a:avLst/>
-          </a:prstGeom>
-          <a:ln w="142875">
-            <a:solidFill>
-              <a:schemeClr val="tx1">
-                <a:lumMod val="50000"/>
-                <a:lumOff val="50000"/>
-              </a:schemeClr>
-            </a:solidFill>
-            <a:tailEnd type="triangle"/>
-          </a:ln>
-        </p:spPr>
-        <p:style>
-          <a:lnRef idx="1">
-            <a:schemeClr val="accent1"/>
-          </a:lnRef>
-          <a:fillRef idx="0">
-            <a:schemeClr val="accent1"/>
-          </a:fillRef>
-          <a:effectRef idx="0">
-            <a:schemeClr val="accent1"/>
-          </a:effectRef>
-          <a:fontRef idx="minor">
-            <a:schemeClr val="tx1"/>
-          </a:fontRef>
-        </p:style>
-      </p:cxnSp>
-    </p:spTree>
-    <p:extLst>
-      <p:ext uri="{BB962C8B-B14F-4D97-AF65-F5344CB8AC3E}">
-        <p14:creationId xmlns:p14="http://schemas.microsoft.com/office/powerpoint/2010/main" val="1635227564"/>
       </p:ext>
     </p:extLst>
   </p:cSld>
@@ -16563,6 +16426,657 @@
           <a:chExt cx="0" cy="0"/>
         </a:xfrm>
       </p:grpSpPr>
+      <p:pic>
+        <p:nvPicPr>
+          <p:cNvPr id="7" name="Picture 6"/>
+          <p:cNvPicPr>
+            <a:picLocks noChangeAspect="1"/>
+          </p:cNvPicPr>
+          <p:nvPr/>
+        </p:nvPicPr>
+        <p:blipFill>
+          <a:blip r:embed="rId2">
+            <a:extLst>
+              <a:ext uri="{28A0092B-C50C-407E-A947-70E740481C1C}">
+                <a14:useLocalDpi xmlns:a14="http://schemas.microsoft.com/office/drawing/2010/main" val="0"/>
+              </a:ext>
+            </a:extLst>
+          </a:blip>
+          <a:stretch>
+            <a:fillRect/>
+          </a:stretch>
+        </p:blipFill>
+        <p:spPr>
+          <a:xfrm>
+            <a:off x="7691802" y="2136231"/>
+            <a:ext cx="695422" cy="1143160"/>
+          </a:xfrm>
+          <a:prstGeom prst="rect">
+            <a:avLst/>
+          </a:prstGeom>
+        </p:spPr>
+      </p:pic>
+      <p:pic>
+        <p:nvPicPr>
+          <p:cNvPr id="9" name="Picture 8"/>
+          <p:cNvPicPr>
+            <a:picLocks noChangeAspect="1"/>
+          </p:cNvPicPr>
+          <p:nvPr/>
+        </p:nvPicPr>
+        <p:blipFill>
+          <a:blip r:embed="rId3">
+            <a:extLst>
+              <a:ext uri="{28A0092B-C50C-407E-A947-70E740481C1C}">
+                <a14:useLocalDpi xmlns:a14="http://schemas.microsoft.com/office/drawing/2010/main" val="0"/>
+              </a:ext>
+            </a:extLst>
+          </a:blip>
+          <a:stretch>
+            <a:fillRect/>
+          </a:stretch>
+        </p:blipFill>
+        <p:spPr>
+          <a:xfrm>
+            <a:off x="9823295" y="2378807"/>
+            <a:ext cx="1538745" cy="615498"/>
+          </a:xfrm>
+          <a:prstGeom prst="rect">
+            <a:avLst/>
+          </a:prstGeom>
+        </p:spPr>
+      </p:pic>
+      <p:grpSp>
+        <p:nvGrpSpPr>
+          <p:cNvPr id="45" name="Group 44"/>
+          <p:cNvGrpSpPr/>
+          <p:nvPr/>
+        </p:nvGrpSpPr>
+        <p:grpSpPr>
+          <a:xfrm>
+            <a:off x="8558584" y="1996015"/>
+            <a:ext cx="1151769" cy="673166"/>
+            <a:chOff x="2334271" y="318043"/>
+            <a:chExt cx="1457473" cy="673166"/>
+          </a:xfrm>
+        </p:grpSpPr>
+        <p:cxnSp>
+          <p:nvCxnSpPr>
+            <p:cNvPr id="46" name="Straight Arrow Connector 45"/>
+            <p:cNvCxnSpPr/>
+            <p:nvPr/>
+          </p:nvCxnSpPr>
+          <p:spPr>
+            <a:xfrm flipV="1">
+              <a:off x="2346123" y="980728"/>
+              <a:ext cx="1445621" cy="10481"/>
+            </a:xfrm>
+            <a:prstGeom prst="straightConnector1">
+              <a:avLst/>
+            </a:prstGeom>
+            <a:ln w="142875">
+              <a:solidFill>
+                <a:schemeClr val="tx1">
+                  <a:lumMod val="50000"/>
+                  <a:lumOff val="50000"/>
+                </a:schemeClr>
+              </a:solidFill>
+              <a:tailEnd type="triangle"/>
+            </a:ln>
+          </p:spPr>
+          <p:style>
+            <a:lnRef idx="1">
+              <a:schemeClr val="accent1"/>
+            </a:lnRef>
+            <a:fillRef idx="0">
+              <a:schemeClr val="accent1"/>
+            </a:fillRef>
+            <a:effectRef idx="0">
+              <a:schemeClr val="accent1"/>
+            </a:effectRef>
+            <a:fontRef idx="minor">
+              <a:schemeClr val="tx1"/>
+            </a:fontRef>
+          </p:style>
+        </p:cxnSp>
+        <p:sp>
+          <p:nvSpPr>
+            <p:cNvPr id="47" name="TextBox 46"/>
+            <p:cNvSpPr txBox="1"/>
+            <p:nvPr/>
+          </p:nvSpPr>
+          <p:spPr>
+            <a:xfrm>
+              <a:off x="2334271" y="318043"/>
+              <a:ext cx="1408522" cy="523220"/>
+            </a:xfrm>
+            <a:prstGeom prst="rect">
+              <a:avLst/>
+            </a:prstGeom>
+            <a:noFill/>
+          </p:spPr>
+          <p:txBody>
+            <a:bodyPr wrap="square" rtlCol="0">
+              <a:spAutoFit/>
+            </a:bodyPr>
+            <a:lstStyle/>
+            <a:p>
+              <a:pPr algn="ctr"/>
+              <a:endParaRPr lang="de-DE" sz="2800" b="1" dirty="0"/>
+            </a:p>
+          </p:txBody>
+        </p:sp>
+      </p:grpSp>
+      <p:pic>
+        <p:nvPicPr>
+          <p:cNvPr id="8" name="Picture 7"/>
+          <p:cNvPicPr>
+            <a:picLocks noChangeAspect="1"/>
+          </p:cNvPicPr>
+          <p:nvPr/>
+        </p:nvPicPr>
+        <p:blipFill>
+          <a:blip r:embed="rId2">
+            <a:extLst>
+              <a:ext uri="{28A0092B-C50C-407E-A947-70E740481C1C}">
+                <a14:useLocalDpi xmlns:a14="http://schemas.microsoft.com/office/drawing/2010/main" val="0"/>
+              </a:ext>
+            </a:extLst>
+          </a:blip>
+          <a:stretch>
+            <a:fillRect/>
+          </a:stretch>
+        </p:blipFill>
+        <p:spPr>
+          <a:xfrm>
+            <a:off x="1054165" y="2233026"/>
+            <a:ext cx="695422" cy="1143160"/>
+          </a:xfrm>
+          <a:prstGeom prst="rect">
+            <a:avLst/>
+          </a:prstGeom>
+        </p:spPr>
+      </p:pic>
+      <p:pic>
+        <p:nvPicPr>
+          <p:cNvPr id="10" name="Picture 9"/>
+          <p:cNvPicPr>
+            <a:picLocks noChangeAspect="1"/>
+          </p:cNvPicPr>
+          <p:nvPr/>
+        </p:nvPicPr>
+        <p:blipFill>
+          <a:blip r:embed="rId3">
+            <a:extLst>
+              <a:ext uri="{28A0092B-C50C-407E-A947-70E740481C1C}">
+                <a14:useLocalDpi xmlns:a14="http://schemas.microsoft.com/office/drawing/2010/main" val="0"/>
+              </a:ext>
+            </a:extLst>
+          </a:blip>
+          <a:stretch>
+            <a:fillRect/>
+          </a:stretch>
+        </p:blipFill>
+        <p:spPr>
+          <a:xfrm>
+            <a:off x="3228905" y="2475602"/>
+            <a:ext cx="1538745" cy="615498"/>
+          </a:xfrm>
+          <a:prstGeom prst="rect">
+            <a:avLst/>
+          </a:prstGeom>
+        </p:spPr>
+      </p:pic>
+      <p:grpSp>
+        <p:nvGrpSpPr>
+          <p:cNvPr id="11" name="Group 10"/>
+          <p:cNvGrpSpPr/>
+          <p:nvPr/>
+        </p:nvGrpSpPr>
+        <p:grpSpPr>
+          <a:xfrm>
+            <a:off x="1964194" y="2092810"/>
+            <a:ext cx="1151769" cy="673166"/>
+            <a:chOff x="2334271" y="318043"/>
+            <a:chExt cx="1457473" cy="673166"/>
+          </a:xfrm>
+        </p:grpSpPr>
+        <p:cxnSp>
+          <p:nvCxnSpPr>
+            <p:cNvPr id="12" name="Straight Arrow Connector 11"/>
+            <p:cNvCxnSpPr/>
+            <p:nvPr/>
+          </p:nvCxnSpPr>
+          <p:spPr>
+            <a:xfrm flipV="1">
+              <a:off x="2346123" y="980728"/>
+              <a:ext cx="1445621" cy="10481"/>
+            </a:xfrm>
+            <a:prstGeom prst="straightConnector1">
+              <a:avLst/>
+            </a:prstGeom>
+            <a:ln w="142875">
+              <a:solidFill>
+                <a:schemeClr val="tx1">
+                  <a:lumMod val="50000"/>
+                  <a:lumOff val="50000"/>
+                </a:schemeClr>
+              </a:solidFill>
+              <a:tailEnd type="triangle"/>
+            </a:ln>
+          </p:spPr>
+          <p:style>
+            <a:lnRef idx="1">
+              <a:schemeClr val="accent1"/>
+            </a:lnRef>
+            <a:fillRef idx="0">
+              <a:schemeClr val="accent1"/>
+            </a:fillRef>
+            <a:effectRef idx="0">
+              <a:schemeClr val="accent1"/>
+            </a:effectRef>
+            <a:fontRef idx="minor">
+              <a:schemeClr val="tx1"/>
+            </a:fontRef>
+          </p:style>
+        </p:cxnSp>
+        <p:sp>
+          <p:nvSpPr>
+            <p:cNvPr id="13" name="TextBox 12"/>
+            <p:cNvSpPr txBox="1"/>
+            <p:nvPr/>
+          </p:nvSpPr>
+          <p:spPr>
+            <a:xfrm>
+              <a:off x="2334271" y="318043"/>
+              <a:ext cx="1408522" cy="523220"/>
+            </a:xfrm>
+            <a:prstGeom prst="rect">
+              <a:avLst/>
+            </a:prstGeom>
+            <a:noFill/>
+          </p:spPr>
+          <p:txBody>
+            <a:bodyPr wrap="square" rtlCol="0">
+              <a:spAutoFit/>
+            </a:bodyPr>
+            <a:lstStyle/>
+            <a:p>
+              <a:pPr algn="ctr"/>
+              <a:endParaRPr lang="de-DE" sz="2800" b="1" dirty="0"/>
+            </a:p>
+          </p:txBody>
+        </p:sp>
+      </p:grpSp>
+      <p:pic>
+        <p:nvPicPr>
+          <p:cNvPr id="1026" name="Picture 2" descr="Logo"/>
+          <p:cNvPicPr>
+            <a:picLocks noChangeAspect="1" noChangeArrowheads="1"/>
+          </p:cNvPicPr>
+          <p:nvPr/>
+        </p:nvPicPr>
+        <p:blipFill>
+          <a:blip r:embed="rId4">
+            <a:extLst>
+              <a:ext uri="{28A0092B-C50C-407E-A947-70E740481C1C}">
+                <a14:useLocalDpi xmlns:a14="http://schemas.microsoft.com/office/drawing/2010/main" val="0"/>
+              </a:ext>
+            </a:extLst>
+          </a:blip>
+          <a:srcRect/>
+          <a:stretch>
+            <a:fillRect/>
+          </a:stretch>
+        </p:blipFill>
+        <p:spPr bwMode="auto">
+          <a:xfrm>
+            <a:off x="8292500" y="2802848"/>
+            <a:ext cx="1648513" cy="374662"/>
+          </a:xfrm>
+          <a:prstGeom prst="rect">
+            <a:avLst/>
+          </a:prstGeom>
+          <a:noFill/>
+          <a:extLst>
+            <a:ext uri="{909E8E84-426E-40DD-AFC4-6F175D3DCCD1}">
+              <a14:hiddenFill xmlns:a14="http://schemas.microsoft.com/office/drawing/2010/main">
+                <a:solidFill>
+                  <a:srgbClr val="FFFFFF"/>
+                </a:solidFill>
+              </a14:hiddenFill>
+            </a:ext>
+          </a:extLst>
+        </p:spPr>
+      </p:pic>
+      <p:pic>
+        <p:nvPicPr>
+          <p:cNvPr id="14" name="Picture 13"/>
+          <p:cNvPicPr>
+            <a:picLocks noChangeAspect="1"/>
+          </p:cNvPicPr>
+          <p:nvPr/>
+        </p:nvPicPr>
+        <p:blipFill>
+          <a:blip r:embed="rId2">
+            <a:extLst>
+              <a:ext uri="{28A0092B-C50C-407E-A947-70E740481C1C}">
+                <a14:useLocalDpi xmlns:a14="http://schemas.microsoft.com/office/drawing/2010/main" val="0"/>
+              </a:ext>
+            </a:extLst>
+          </a:blip>
+          <a:stretch>
+            <a:fillRect/>
+          </a:stretch>
+        </p:blipFill>
+        <p:spPr>
+          <a:xfrm>
+            <a:off x="5941262" y="6218079"/>
+            <a:ext cx="695422" cy="1143160"/>
+          </a:xfrm>
+          <a:prstGeom prst="rect">
+            <a:avLst/>
+          </a:prstGeom>
+        </p:spPr>
+      </p:pic>
+      <p:pic>
+        <p:nvPicPr>
+          <p:cNvPr id="15" name="Picture 14"/>
+          <p:cNvPicPr>
+            <a:picLocks noChangeAspect="1"/>
+          </p:cNvPicPr>
+          <p:nvPr/>
+        </p:nvPicPr>
+        <p:blipFill>
+          <a:blip r:embed="rId3">
+            <a:extLst>
+              <a:ext uri="{28A0092B-C50C-407E-A947-70E740481C1C}">
+                <a14:useLocalDpi xmlns:a14="http://schemas.microsoft.com/office/drawing/2010/main" val="0"/>
+              </a:ext>
+            </a:extLst>
+          </a:blip>
+          <a:stretch>
+            <a:fillRect/>
+          </a:stretch>
+        </p:blipFill>
+        <p:spPr>
+          <a:xfrm>
+            <a:off x="8072755" y="6460655"/>
+            <a:ext cx="1538745" cy="615498"/>
+          </a:xfrm>
+          <a:prstGeom prst="rect">
+            <a:avLst/>
+          </a:prstGeom>
+        </p:spPr>
+      </p:pic>
+      <p:cxnSp>
+        <p:nvCxnSpPr>
+          <p:cNvPr id="17" name="Straight Arrow Connector 16"/>
+          <p:cNvCxnSpPr/>
+          <p:nvPr/>
+        </p:nvCxnSpPr>
+        <p:spPr>
+          <a:xfrm flipV="1">
+            <a:off x="6798875" y="6742609"/>
+            <a:ext cx="1142403" cy="10481"/>
+          </a:xfrm>
+          <a:prstGeom prst="straightConnector1">
+            <a:avLst/>
+          </a:prstGeom>
+          <a:ln w="142875">
+            <a:solidFill>
+              <a:schemeClr val="tx1">
+                <a:lumMod val="50000"/>
+                <a:lumOff val="50000"/>
+              </a:schemeClr>
+            </a:solidFill>
+            <a:tailEnd type="triangle"/>
+          </a:ln>
+        </p:spPr>
+        <p:style>
+          <a:lnRef idx="1">
+            <a:schemeClr val="accent1"/>
+          </a:lnRef>
+          <a:fillRef idx="0">
+            <a:schemeClr val="accent1"/>
+          </a:fillRef>
+          <a:effectRef idx="0">
+            <a:schemeClr val="accent1"/>
+          </a:effectRef>
+          <a:fontRef idx="minor">
+            <a:schemeClr val="tx1"/>
+          </a:fontRef>
+        </p:style>
+      </p:cxnSp>
+      <p:pic>
+        <p:nvPicPr>
+          <p:cNvPr id="19" name="Picture 2" descr="Logo"/>
+          <p:cNvPicPr>
+            <a:picLocks noChangeAspect="1" noChangeArrowheads="1"/>
+          </p:cNvPicPr>
+          <p:nvPr/>
+        </p:nvPicPr>
+        <p:blipFill>
+          <a:blip r:embed="rId4">
+            <a:extLst>
+              <a:ext uri="{28A0092B-C50C-407E-A947-70E740481C1C}">
+                <a14:useLocalDpi xmlns:a14="http://schemas.microsoft.com/office/drawing/2010/main" val="0"/>
+              </a:ext>
+            </a:extLst>
+          </a:blip>
+          <a:srcRect/>
+          <a:stretch>
+            <a:fillRect/>
+          </a:stretch>
+        </p:blipFill>
+        <p:spPr bwMode="auto">
+          <a:xfrm>
+            <a:off x="6541960" y="6884696"/>
+            <a:ext cx="1648513" cy="374662"/>
+          </a:xfrm>
+          <a:prstGeom prst="rect">
+            <a:avLst/>
+          </a:prstGeom>
+          <a:noFill/>
+          <a:extLst>
+            <a:ext uri="{909E8E84-426E-40DD-AFC4-6F175D3DCCD1}">
+              <a14:hiddenFill xmlns:a14="http://schemas.microsoft.com/office/drawing/2010/main">
+                <a:solidFill>
+                  <a:srgbClr val="FFFFFF"/>
+                </a:solidFill>
+              </a14:hiddenFill>
+            </a:ext>
+          </a:extLst>
+        </p:spPr>
+      </p:pic>
+      <p:pic>
+        <p:nvPicPr>
+          <p:cNvPr id="23" name="Picture 22"/>
+          <p:cNvPicPr>
+            <a:picLocks noChangeAspect="1"/>
+          </p:cNvPicPr>
+          <p:nvPr/>
+        </p:nvPicPr>
+        <p:blipFill>
+          <a:blip r:embed="rId5" cstate="print">
+            <a:extLst>
+              <a:ext uri="{28A0092B-C50C-407E-A947-70E740481C1C}">
+                <a14:useLocalDpi xmlns:a14="http://schemas.microsoft.com/office/drawing/2010/main" val="0"/>
+              </a:ext>
+            </a:extLst>
+          </a:blip>
+          <a:stretch>
+            <a:fillRect/>
+          </a:stretch>
+        </p:blipFill>
+        <p:spPr>
+          <a:xfrm>
+            <a:off x="6810478" y="6222738"/>
+            <a:ext cx="1116380" cy="345217"/>
+          </a:xfrm>
+          <a:prstGeom prst="rect">
+            <a:avLst/>
+          </a:prstGeom>
+        </p:spPr>
+      </p:pic>
+      <p:pic>
+        <p:nvPicPr>
+          <p:cNvPr id="2" name="Picture 2" descr="https://assets-cdn.github.com/images/modules/logos_page/Octocat.png"/>
+          <p:cNvPicPr>
+            <a:picLocks noChangeAspect="1" noChangeArrowheads="1"/>
+          </p:cNvPicPr>
+          <p:nvPr/>
+        </p:nvPicPr>
+        <p:blipFill>
+          <a:blip r:embed="rId6" cstate="print">
+            <a:extLst>
+              <a:ext uri="{28A0092B-C50C-407E-A947-70E740481C1C}">
+                <a14:useLocalDpi xmlns:a14="http://schemas.microsoft.com/office/drawing/2010/main" val="0"/>
+              </a:ext>
+            </a:extLst>
+          </a:blip>
+          <a:srcRect/>
+          <a:stretch>
+            <a:fillRect/>
+          </a:stretch>
+        </p:blipFill>
+        <p:spPr bwMode="auto">
+          <a:xfrm>
+            <a:off x="3311436" y="6210581"/>
+            <a:ext cx="1472772" cy="1218385"/>
+          </a:xfrm>
+          <a:prstGeom prst="rect">
+            <a:avLst/>
+          </a:prstGeom>
+          <a:noFill/>
+          <a:extLst>
+            <a:ext uri="{909E8E84-426E-40DD-AFC4-6F175D3DCCD1}">
+              <a14:hiddenFill xmlns:a14="http://schemas.microsoft.com/office/drawing/2010/main">
+                <a:solidFill>
+                  <a:srgbClr val="FFFFFF"/>
+                </a:solidFill>
+              </a14:hiddenFill>
+            </a:ext>
+          </a:extLst>
+        </p:spPr>
+      </p:pic>
+      <p:pic>
+        <p:nvPicPr>
+          <p:cNvPr id="1028" name="Picture 4" descr="https://travis-ci.com/img/brand-standards/logo-downloads/TravisCI-Full-Color-vertical.png"/>
+          <p:cNvPicPr>
+            <a:picLocks noChangeAspect="1" noChangeArrowheads="1"/>
+          </p:cNvPicPr>
+          <p:nvPr/>
+        </p:nvPicPr>
+        <p:blipFill>
+          <a:blip r:embed="rId7">
+            <a:extLst>
+              <a:ext uri="{28A0092B-C50C-407E-A947-70E740481C1C}">
+                <a14:useLocalDpi xmlns:a14="http://schemas.microsoft.com/office/drawing/2010/main" val="0"/>
+              </a:ext>
+            </a:extLst>
+          </a:blip>
+          <a:srcRect/>
+          <a:stretch>
+            <a:fillRect/>
+          </a:stretch>
+        </p:blipFill>
+        <p:spPr bwMode="auto">
+          <a:xfrm>
+            <a:off x="4936524" y="6174410"/>
+            <a:ext cx="478494" cy="611147"/>
+          </a:xfrm>
+          <a:prstGeom prst="rect">
+            <a:avLst/>
+          </a:prstGeom>
+          <a:noFill/>
+          <a:extLst>
+            <a:ext uri="{909E8E84-426E-40DD-AFC4-6F175D3DCCD1}">
+              <a14:hiddenFill xmlns:a14="http://schemas.microsoft.com/office/drawing/2010/main">
+                <a:solidFill>
+                  <a:srgbClr val="FFFFFF"/>
+                </a:solidFill>
+              </a14:hiddenFill>
+            </a:ext>
+          </a:extLst>
+        </p:spPr>
+      </p:pic>
+      <p:cxnSp>
+        <p:nvCxnSpPr>
+          <p:cNvPr id="21" name="Straight Arrow Connector 20"/>
+          <p:cNvCxnSpPr/>
+          <p:nvPr/>
+        </p:nvCxnSpPr>
+        <p:spPr>
+          <a:xfrm flipV="1">
+            <a:off x="4764127" y="6742609"/>
+            <a:ext cx="1142403" cy="10481"/>
+          </a:xfrm>
+          <a:prstGeom prst="straightConnector1">
+            <a:avLst/>
+          </a:prstGeom>
+          <a:ln w="142875">
+            <a:solidFill>
+              <a:schemeClr val="tx1">
+                <a:lumMod val="50000"/>
+                <a:lumOff val="50000"/>
+              </a:schemeClr>
+            </a:solidFill>
+            <a:tailEnd type="triangle"/>
+          </a:ln>
+        </p:spPr>
+        <p:style>
+          <a:lnRef idx="1">
+            <a:schemeClr val="accent1"/>
+          </a:lnRef>
+          <a:fillRef idx="0">
+            <a:schemeClr val="accent1"/>
+          </a:fillRef>
+          <a:effectRef idx="0">
+            <a:schemeClr val="accent1"/>
+          </a:effectRef>
+          <a:fontRef idx="minor">
+            <a:schemeClr val="tx1"/>
+          </a:fontRef>
+        </p:style>
+      </p:cxnSp>
+    </p:spTree>
+    <p:extLst>
+      <p:ext uri="{BB962C8B-B14F-4D97-AF65-F5344CB8AC3E}">
+        <p14:creationId xmlns:p14="http://schemas.microsoft.com/office/powerpoint/2010/main" val="1635227564"/>
+      </p:ext>
+    </p:extLst>
+  </p:cSld>
+  <p:clrMapOvr>
+    <a:masterClrMapping/>
+  </p:clrMapOvr>
+  <p:timing>
+    <p:tnLst>
+      <p:par>
+        <p:cTn id="1" dur="indefinite" restart="never" nodeType="tmRoot"/>
+      </p:par>
+    </p:tnLst>
+  </p:timing>
+</p:sld>
+</file>
+
+<file path=ppt/slides/slide21.xml><?xml version="1.0" encoding="utf-8"?>
+<p:sld xmlns:a="http://schemas.openxmlformats.org/drawingml/2006/main" xmlns:r="http://schemas.openxmlformats.org/officeDocument/2006/relationships" xmlns:p="http://schemas.openxmlformats.org/presentationml/2006/main">
+  <p:cSld>
+    <p:spTree>
+      <p:nvGrpSpPr>
+        <p:cNvPr id="1" name=""/>
+        <p:cNvGrpSpPr/>
+        <p:nvPr/>
+      </p:nvGrpSpPr>
+      <p:grpSpPr>
+        <a:xfrm>
+          <a:off x="0" y="0"/>
+          <a:ext cx="0" cy="0"/>
+          <a:chOff x="0" y="0"/>
+          <a:chExt cx="0" cy="0"/>
+        </a:xfrm>
+      </p:grpSpPr>
       <p:sp>
         <p:nvSpPr>
           <p:cNvPr id="6" name="Rounded Rectangle 75"/>
@@ -17013,7 +17527,7 @@
 </p:sld>
 </file>
 
-<file path=ppt/slides/slide21.xml><?xml version="1.0" encoding="utf-8"?>
+<file path=ppt/slides/slide22.xml><?xml version="1.0" encoding="utf-8"?>
 <p:sld xmlns:a="http://schemas.openxmlformats.org/drawingml/2006/main" xmlns:r="http://schemas.openxmlformats.org/officeDocument/2006/relationships" xmlns:p="http://schemas.openxmlformats.org/presentationml/2006/main">
   <p:cSld>
     <p:spTree>
@@ -17770,7 +18284,7 @@
 </p:sld>
 </file>
 
-<file path=ppt/slides/slide22.xml><?xml version="1.0" encoding="utf-8"?>
+<file path=ppt/slides/slide23.xml><?xml version="1.0" encoding="utf-8"?>
 <p:sld xmlns:a="http://schemas.openxmlformats.org/drawingml/2006/main" xmlns:r="http://schemas.openxmlformats.org/officeDocument/2006/relationships" xmlns:p="http://schemas.openxmlformats.org/presentationml/2006/main">
   <p:cSld>
     <p:spTree>
@@ -19999,7 +20513,7 @@
 </p:sld>
 </file>
 
-<file path=ppt/slides/slide23.xml><?xml version="1.0" encoding="utf-8"?>
+<file path=ppt/slides/slide24.xml><?xml version="1.0" encoding="utf-8"?>
 <p:sld xmlns:a="http://schemas.openxmlformats.org/drawingml/2006/main" xmlns:r="http://schemas.openxmlformats.org/officeDocument/2006/relationships" xmlns:p="http://schemas.openxmlformats.org/presentationml/2006/main">
   <p:cSld>
     <p:spTree>
@@ -22249,7 +22763,7 @@
 </p:sld>
 </file>
 
-<file path=ppt/slides/slide24.xml><?xml version="1.0" encoding="utf-8"?>
+<file path=ppt/slides/slide25.xml><?xml version="1.0" encoding="utf-8"?>
 <p:sld xmlns:a="http://schemas.openxmlformats.org/drawingml/2006/main" xmlns:r="http://schemas.openxmlformats.org/officeDocument/2006/relationships" xmlns:p="http://schemas.openxmlformats.org/presentationml/2006/main">
   <p:cSld>
     <p:spTree>
@@ -24982,7 +25496,7 @@
 </p:sld>
 </file>
 
-<file path=ppt/slides/slide25.xml><?xml version="1.0" encoding="utf-8"?>
+<file path=ppt/slides/slide26.xml><?xml version="1.0" encoding="utf-8"?>
 <p:sld xmlns:a="http://schemas.openxmlformats.org/drawingml/2006/main" xmlns:r="http://schemas.openxmlformats.org/officeDocument/2006/relationships" xmlns:p="http://schemas.openxmlformats.org/presentationml/2006/main">
   <p:cSld>
     <p:spTree>
@@ -25106,7 +25620,7 @@
 </p:sld>
 </file>
 
-<file path=ppt/slides/slide26.xml><?xml version="1.0" encoding="utf-8"?>
+<file path=ppt/slides/slide27.xml><?xml version="1.0" encoding="utf-8"?>
 <p:sld xmlns:a="http://schemas.openxmlformats.org/drawingml/2006/main" xmlns:r="http://schemas.openxmlformats.org/officeDocument/2006/relationships" xmlns:p="http://schemas.openxmlformats.org/presentationml/2006/main">
   <p:cSld>
     <p:spTree>

</xml_diff>

<commit_message>
Added Boxfuse Convert blog post
</commit_message>
<xml_diff>
--- a/_sources/GettingStarted.pptx
+++ b/_sources/GettingStarted.pptx
@@ -1259,6 +1259,381 @@
       <dsp:cNvGrpSpPr/>
     </dsp:nvGrpSpPr>
     <dsp:grpSpPr/>
+    <dsp:sp modelId="{6D72C3A5-1474-40AD-9A10-2534C79C4517}">
+      <dsp:nvSpPr>
+        <dsp:cNvPr id="0" name=""/>
+        <dsp:cNvSpPr/>
+      </dsp:nvSpPr>
+      <dsp:spPr>
+        <a:xfrm>
+          <a:off x="2112" y="562235"/>
+          <a:ext cx="1880185" cy="752074"/>
+        </a:xfrm>
+        <a:prstGeom prst="chevron">
+          <a:avLst/>
+        </a:prstGeom>
+        <a:solidFill>
+          <a:schemeClr val="tx2">
+            <a:lumMod val="75000"/>
+          </a:schemeClr>
+        </a:solidFill>
+        <a:ln w="12700" cap="flat" cmpd="sng" algn="ctr">
+          <a:solidFill>
+            <a:schemeClr val="lt1">
+              <a:hueOff val="0"/>
+              <a:satOff val="0"/>
+              <a:lumOff val="0"/>
+              <a:alphaOff val="0"/>
+            </a:schemeClr>
+          </a:solidFill>
+          <a:prstDash val="solid"/>
+          <a:miter lim="800000"/>
+        </a:ln>
+        <a:effectLst/>
+      </dsp:spPr>
+      <dsp:style>
+        <a:lnRef idx="2">
+          <a:scrgbClr r="0" g="0" b="0"/>
+        </a:lnRef>
+        <a:fillRef idx="1">
+          <a:scrgbClr r="0" g="0" b="0"/>
+        </a:fillRef>
+        <a:effectRef idx="0">
+          <a:scrgbClr r="0" g="0" b="0"/>
+        </a:effectRef>
+        <a:fontRef idx="minor">
+          <a:schemeClr val="lt1"/>
+        </a:fontRef>
+      </dsp:style>
+      <dsp:txBody>
+        <a:bodyPr spcFirstLastPara="0" vert="horz" wrap="square" lIns="56007" tIns="18669" rIns="18669" bIns="18669" numCol="1" spcCol="1270" anchor="ctr" anchorCtr="0">
+          <a:noAutofit/>
+        </a:bodyPr>
+        <a:lstStyle/>
+        <a:p>
+          <a:pPr lvl="0" algn="ctr" defTabSz="622300">
+            <a:lnSpc>
+              <a:spcPct val="90000"/>
+            </a:lnSpc>
+            <a:spcBef>
+              <a:spcPct val="0"/>
+            </a:spcBef>
+            <a:spcAft>
+              <a:spcPct val="35000"/>
+            </a:spcAft>
+          </a:pPr>
+          <a:r>
+            <a:rPr lang="en-US" sz="1400" b="1" kern="1200" dirty="0" smtClean="0"/>
+            <a:t>package</a:t>
+          </a:r>
+          <a:endParaRPr lang="de-DE" sz="1400" b="1" kern="1200" dirty="0"/>
+        </a:p>
+      </dsp:txBody>
+      <dsp:txXfrm>
+        <a:off x="378149" y="562235"/>
+        <a:ext cx="1128111" cy="752074"/>
+      </dsp:txXfrm>
+    </dsp:sp>
+    <dsp:sp modelId="{086EE9E9-692A-4D05-A349-CBDF03FDA677}">
+      <dsp:nvSpPr>
+        <dsp:cNvPr id="0" name=""/>
+        <dsp:cNvSpPr/>
+      </dsp:nvSpPr>
+      <dsp:spPr>
+        <a:xfrm>
+          <a:off x="1694279" y="562235"/>
+          <a:ext cx="1880185" cy="752074"/>
+        </a:xfrm>
+        <a:prstGeom prst="chevron">
+          <a:avLst/>
+        </a:prstGeom>
+        <a:solidFill>
+          <a:schemeClr val="tx2">
+            <a:lumMod val="75000"/>
+          </a:schemeClr>
+        </a:solidFill>
+        <a:ln w="12700" cap="flat" cmpd="sng" algn="ctr">
+          <a:solidFill>
+            <a:schemeClr val="lt1">
+              <a:hueOff val="0"/>
+              <a:satOff val="0"/>
+              <a:lumOff val="0"/>
+              <a:alphaOff val="0"/>
+            </a:schemeClr>
+          </a:solidFill>
+          <a:prstDash val="solid"/>
+          <a:miter lim="800000"/>
+        </a:ln>
+        <a:effectLst/>
+      </dsp:spPr>
+      <dsp:style>
+        <a:lnRef idx="2">
+          <a:scrgbClr r="0" g="0" b="0"/>
+        </a:lnRef>
+        <a:fillRef idx="1">
+          <a:scrgbClr r="0" g="0" b="0"/>
+        </a:fillRef>
+        <a:effectRef idx="0">
+          <a:scrgbClr r="0" g="0" b="0"/>
+        </a:effectRef>
+        <a:fontRef idx="minor">
+          <a:schemeClr val="lt1"/>
+        </a:fontRef>
+      </dsp:style>
+      <dsp:txBody>
+        <a:bodyPr spcFirstLastPara="0" vert="horz" wrap="square" lIns="56007" tIns="18669" rIns="18669" bIns="18669" numCol="1" spcCol="1270" anchor="ctr" anchorCtr="0">
+          <a:noAutofit/>
+        </a:bodyPr>
+        <a:lstStyle/>
+        <a:p>
+          <a:pPr lvl="0" algn="ctr" defTabSz="622300">
+            <a:lnSpc>
+              <a:spcPct val="90000"/>
+            </a:lnSpc>
+            <a:spcBef>
+              <a:spcPct val="0"/>
+            </a:spcBef>
+            <a:spcAft>
+              <a:spcPct val="35000"/>
+            </a:spcAft>
+          </a:pPr>
+          <a:r>
+            <a:rPr lang="en-US" sz="1400" b="1" kern="1200" dirty="0" smtClean="0"/>
+            <a:t>pre-integration-test</a:t>
+          </a:r>
+          <a:endParaRPr lang="de-DE" sz="1400" b="1" kern="1200" dirty="0"/>
+        </a:p>
+      </dsp:txBody>
+      <dsp:txXfrm>
+        <a:off x="2070316" y="562235"/>
+        <a:ext cx="1128111" cy="752074"/>
+      </dsp:txXfrm>
+    </dsp:sp>
+    <dsp:sp modelId="{17AF3B93-FA57-409F-9FAF-CA14FC2BCCDA}">
+      <dsp:nvSpPr>
+        <dsp:cNvPr id="0" name=""/>
+        <dsp:cNvSpPr/>
+      </dsp:nvSpPr>
+      <dsp:spPr>
+        <a:xfrm>
+          <a:off x="3386445" y="562235"/>
+          <a:ext cx="1880185" cy="752074"/>
+        </a:xfrm>
+        <a:prstGeom prst="chevron">
+          <a:avLst/>
+        </a:prstGeom>
+        <a:solidFill>
+          <a:schemeClr val="tx2">
+            <a:lumMod val="75000"/>
+          </a:schemeClr>
+        </a:solidFill>
+        <a:ln w="12700" cap="flat" cmpd="sng" algn="ctr">
+          <a:solidFill>
+            <a:schemeClr val="lt1">
+              <a:hueOff val="0"/>
+              <a:satOff val="0"/>
+              <a:lumOff val="0"/>
+              <a:alphaOff val="0"/>
+            </a:schemeClr>
+          </a:solidFill>
+          <a:prstDash val="solid"/>
+          <a:miter lim="800000"/>
+        </a:ln>
+        <a:effectLst/>
+      </dsp:spPr>
+      <dsp:style>
+        <a:lnRef idx="2">
+          <a:scrgbClr r="0" g="0" b="0"/>
+        </a:lnRef>
+        <a:fillRef idx="1">
+          <a:scrgbClr r="0" g="0" b="0"/>
+        </a:fillRef>
+        <a:effectRef idx="0">
+          <a:scrgbClr r="0" g="0" b="0"/>
+        </a:effectRef>
+        <a:fontRef idx="minor">
+          <a:schemeClr val="lt1"/>
+        </a:fontRef>
+      </dsp:style>
+      <dsp:txBody>
+        <a:bodyPr spcFirstLastPara="0" vert="horz" wrap="square" lIns="56007" tIns="18669" rIns="18669" bIns="18669" numCol="1" spcCol="1270" anchor="ctr" anchorCtr="0">
+          <a:noAutofit/>
+        </a:bodyPr>
+        <a:lstStyle/>
+        <a:p>
+          <a:pPr lvl="0" algn="ctr" defTabSz="622300">
+            <a:lnSpc>
+              <a:spcPct val="90000"/>
+            </a:lnSpc>
+            <a:spcBef>
+              <a:spcPct val="0"/>
+            </a:spcBef>
+            <a:spcAft>
+              <a:spcPct val="35000"/>
+            </a:spcAft>
+          </a:pPr>
+          <a:r>
+            <a:rPr lang="en-US" sz="1400" b="1" kern="1200" dirty="0" smtClean="0"/>
+            <a:t>integration-test</a:t>
+          </a:r>
+          <a:endParaRPr lang="de-DE" sz="1400" b="1" kern="1200" dirty="0"/>
+        </a:p>
+      </dsp:txBody>
+      <dsp:txXfrm>
+        <a:off x="3762482" y="562235"/>
+        <a:ext cx="1128111" cy="752074"/>
+      </dsp:txXfrm>
+    </dsp:sp>
+    <dsp:sp modelId="{DEAC2976-8EFE-4204-9FE4-0A0AE01A3B2B}">
+      <dsp:nvSpPr>
+        <dsp:cNvPr id="0" name=""/>
+        <dsp:cNvSpPr/>
+      </dsp:nvSpPr>
+      <dsp:spPr>
+        <a:xfrm>
+          <a:off x="5078612" y="562235"/>
+          <a:ext cx="1880185" cy="752074"/>
+        </a:xfrm>
+        <a:prstGeom prst="chevron">
+          <a:avLst/>
+        </a:prstGeom>
+        <a:solidFill>
+          <a:schemeClr val="tx2">
+            <a:lumMod val="75000"/>
+          </a:schemeClr>
+        </a:solidFill>
+        <a:ln w="12700" cap="flat" cmpd="sng" algn="ctr">
+          <a:solidFill>
+            <a:schemeClr val="lt1">
+              <a:hueOff val="0"/>
+              <a:satOff val="0"/>
+              <a:lumOff val="0"/>
+              <a:alphaOff val="0"/>
+            </a:schemeClr>
+          </a:solidFill>
+          <a:prstDash val="solid"/>
+          <a:miter lim="800000"/>
+        </a:ln>
+        <a:effectLst/>
+      </dsp:spPr>
+      <dsp:style>
+        <a:lnRef idx="2">
+          <a:scrgbClr r="0" g="0" b="0"/>
+        </a:lnRef>
+        <a:fillRef idx="1">
+          <a:scrgbClr r="0" g="0" b="0"/>
+        </a:fillRef>
+        <a:effectRef idx="0">
+          <a:scrgbClr r="0" g="0" b="0"/>
+        </a:effectRef>
+        <a:fontRef idx="minor">
+          <a:schemeClr val="lt1"/>
+        </a:fontRef>
+      </dsp:style>
+      <dsp:txBody>
+        <a:bodyPr spcFirstLastPara="0" vert="horz" wrap="square" lIns="56007" tIns="18669" rIns="18669" bIns="18669" numCol="1" spcCol="1270" anchor="ctr" anchorCtr="0">
+          <a:noAutofit/>
+        </a:bodyPr>
+        <a:lstStyle/>
+        <a:p>
+          <a:pPr lvl="0" algn="ctr" defTabSz="622300">
+            <a:lnSpc>
+              <a:spcPct val="90000"/>
+            </a:lnSpc>
+            <a:spcBef>
+              <a:spcPct val="0"/>
+            </a:spcBef>
+            <a:spcAft>
+              <a:spcPct val="35000"/>
+            </a:spcAft>
+          </a:pPr>
+          <a:r>
+            <a:rPr lang="en-US" sz="1400" b="1" kern="1200" dirty="0" smtClean="0"/>
+            <a:t>post-integration-test</a:t>
+          </a:r>
+          <a:endParaRPr lang="de-DE" sz="1400" b="1" kern="1200" dirty="0"/>
+        </a:p>
+      </dsp:txBody>
+      <dsp:txXfrm>
+        <a:off x="5454649" y="562235"/>
+        <a:ext cx="1128111" cy="752074"/>
+      </dsp:txXfrm>
+    </dsp:sp>
+    <dsp:sp modelId="{99F52057-642D-4027-97D5-D26EF2913281}">
+      <dsp:nvSpPr>
+        <dsp:cNvPr id="0" name=""/>
+        <dsp:cNvSpPr/>
+      </dsp:nvSpPr>
+      <dsp:spPr>
+        <a:xfrm>
+          <a:off x="6770779" y="562235"/>
+          <a:ext cx="1880185" cy="752074"/>
+        </a:xfrm>
+        <a:prstGeom prst="chevron">
+          <a:avLst/>
+        </a:prstGeom>
+        <a:solidFill>
+          <a:schemeClr val="tx2">
+            <a:lumMod val="75000"/>
+          </a:schemeClr>
+        </a:solidFill>
+        <a:ln w="12700" cap="flat" cmpd="sng" algn="ctr">
+          <a:solidFill>
+            <a:schemeClr val="lt1">
+              <a:hueOff val="0"/>
+              <a:satOff val="0"/>
+              <a:lumOff val="0"/>
+              <a:alphaOff val="0"/>
+            </a:schemeClr>
+          </a:solidFill>
+          <a:prstDash val="solid"/>
+          <a:miter lim="800000"/>
+        </a:ln>
+        <a:effectLst/>
+      </dsp:spPr>
+      <dsp:style>
+        <a:lnRef idx="2">
+          <a:scrgbClr r="0" g="0" b="0"/>
+        </a:lnRef>
+        <a:fillRef idx="1">
+          <a:scrgbClr r="0" g="0" b="0"/>
+        </a:fillRef>
+        <a:effectRef idx="0">
+          <a:scrgbClr r="0" g="0" b="0"/>
+        </a:effectRef>
+        <a:fontRef idx="minor">
+          <a:schemeClr val="lt1"/>
+        </a:fontRef>
+      </dsp:style>
+      <dsp:txBody>
+        <a:bodyPr spcFirstLastPara="0" vert="horz" wrap="square" lIns="56007" tIns="18669" rIns="18669" bIns="18669" numCol="1" spcCol="1270" anchor="ctr" anchorCtr="0">
+          <a:noAutofit/>
+        </a:bodyPr>
+        <a:lstStyle/>
+        <a:p>
+          <a:pPr lvl="0" algn="ctr" defTabSz="622300">
+            <a:lnSpc>
+              <a:spcPct val="90000"/>
+            </a:lnSpc>
+            <a:spcBef>
+              <a:spcPct val="0"/>
+            </a:spcBef>
+            <a:spcAft>
+              <a:spcPct val="35000"/>
+            </a:spcAft>
+          </a:pPr>
+          <a:r>
+            <a:rPr lang="en-US" sz="1400" b="1" kern="1200" dirty="0" smtClean="0"/>
+            <a:t>deploy</a:t>
+          </a:r>
+          <a:endParaRPr lang="de-DE" sz="1400" b="1" kern="1200" dirty="0"/>
+        </a:p>
+      </dsp:txBody>
+      <dsp:txXfrm>
+        <a:off x="7146816" y="562235"/>
+        <a:ext cx="1128111" cy="752074"/>
+      </dsp:txXfrm>
+    </dsp:sp>
   </dsp:spTree>
 </dsp:drawing>
 </file>
@@ -2711,7 +3086,7 @@
           <a:p>
             <a:fld id="{9AA7D095-A676-4F6B-9416-D65D798F5244}" type="datetimeFigureOut">
               <a:rPr lang="de-DE" smtClean="0"/>
-              <a:t>14.08.2015</a:t>
+              <a:t>19.08.2015</a:t>
             </a:fld>
             <a:endParaRPr lang="de-DE"/>
           </a:p>
@@ -2881,7 +3256,7 @@
           <a:p>
             <a:fld id="{9AA7D095-A676-4F6B-9416-D65D798F5244}" type="datetimeFigureOut">
               <a:rPr lang="de-DE" smtClean="0"/>
-              <a:t>14.08.2015</a:t>
+              <a:t>19.08.2015</a:t>
             </a:fld>
             <a:endParaRPr lang="de-DE"/>
           </a:p>
@@ -3061,7 +3436,7 @@
           <a:p>
             <a:fld id="{9AA7D095-A676-4F6B-9416-D65D798F5244}" type="datetimeFigureOut">
               <a:rPr lang="de-DE" smtClean="0"/>
-              <a:t>14.08.2015</a:t>
+              <a:t>19.08.2015</a:t>
             </a:fld>
             <a:endParaRPr lang="de-DE"/>
           </a:p>
@@ -3231,7 +3606,7 @@
           <a:p>
             <a:fld id="{9AA7D095-A676-4F6B-9416-D65D798F5244}" type="datetimeFigureOut">
               <a:rPr lang="de-DE" smtClean="0"/>
-              <a:t>14.08.2015</a:t>
+              <a:t>19.08.2015</a:t>
             </a:fld>
             <a:endParaRPr lang="de-DE"/>
           </a:p>
@@ -3475,7 +3850,7 @@
           <a:p>
             <a:fld id="{9AA7D095-A676-4F6B-9416-D65D798F5244}" type="datetimeFigureOut">
               <a:rPr lang="de-DE" smtClean="0"/>
-              <a:t>14.08.2015</a:t>
+              <a:t>19.08.2015</a:t>
             </a:fld>
             <a:endParaRPr lang="de-DE"/>
           </a:p>
@@ -3707,7 +4082,7 @@
           <a:p>
             <a:fld id="{9AA7D095-A676-4F6B-9416-D65D798F5244}" type="datetimeFigureOut">
               <a:rPr lang="de-DE" smtClean="0"/>
-              <a:t>14.08.2015</a:t>
+              <a:t>19.08.2015</a:t>
             </a:fld>
             <a:endParaRPr lang="de-DE"/>
           </a:p>
@@ -4074,7 +4449,7 @@
           <a:p>
             <a:fld id="{9AA7D095-A676-4F6B-9416-D65D798F5244}" type="datetimeFigureOut">
               <a:rPr lang="de-DE" smtClean="0"/>
-              <a:t>14.08.2015</a:t>
+              <a:t>19.08.2015</a:t>
             </a:fld>
             <a:endParaRPr lang="de-DE"/>
           </a:p>
@@ -4192,7 +4567,7 @@
           <a:p>
             <a:fld id="{9AA7D095-A676-4F6B-9416-D65D798F5244}" type="datetimeFigureOut">
               <a:rPr lang="de-DE" smtClean="0"/>
-              <a:t>14.08.2015</a:t>
+              <a:t>19.08.2015</a:t>
             </a:fld>
             <a:endParaRPr lang="de-DE"/>
           </a:p>
@@ -4287,7 +4662,7 @@
           <a:p>
             <a:fld id="{9AA7D095-A676-4F6B-9416-D65D798F5244}" type="datetimeFigureOut">
               <a:rPr lang="de-DE" smtClean="0"/>
-              <a:t>14.08.2015</a:t>
+              <a:t>19.08.2015</a:t>
             </a:fld>
             <a:endParaRPr lang="de-DE"/>
           </a:p>
@@ -4564,7 +4939,7 @@
           <a:p>
             <a:fld id="{9AA7D095-A676-4F6B-9416-D65D798F5244}" type="datetimeFigureOut">
               <a:rPr lang="de-DE" smtClean="0"/>
-              <a:t>14.08.2015</a:t>
+              <a:t>19.08.2015</a:t>
             </a:fld>
             <a:endParaRPr lang="de-DE"/>
           </a:p>
@@ -4821,7 +5196,7 @@
           <a:p>
             <a:fld id="{9AA7D095-A676-4F6B-9416-D65D798F5244}" type="datetimeFigureOut">
               <a:rPr lang="de-DE" smtClean="0"/>
-              <a:t>14.08.2015</a:t>
+              <a:t>19.08.2015</a:t>
             </a:fld>
             <a:endParaRPr lang="de-DE"/>
           </a:p>
@@ -5034,7 +5409,7 @@
           <a:p>
             <a:fld id="{9AA7D095-A676-4F6B-9416-D65D798F5244}" type="datetimeFigureOut">
               <a:rPr lang="de-DE" smtClean="0"/>
-              <a:t>14.08.2015</a:t>
+              <a:t>19.08.2015</a:t>
             </a:fld>
             <a:endParaRPr lang="de-DE"/>
           </a:p>
@@ -12724,6 +13099,602 @@
           </a:extLst>
         </p:spPr>
       </p:pic>
+      <p:grpSp>
+        <p:nvGrpSpPr>
+          <p:cNvPr id="28" name="Group 27"/>
+          <p:cNvGrpSpPr/>
+          <p:nvPr/>
+        </p:nvGrpSpPr>
+        <p:grpSpPr>
+          <a:xfrm>
+            <a:off x="5372128" y="8787541"/>
+            <a:ext cx="1496257" cy="679282"/>
+            <a:chOff x="6448425" y="3933827"/>
+            <a:chExt cx="2628900" cy="1409700"/>
+          </a:xfrm>
+        </p:grpSpPr>
+        <p:sp>
+          <p:nvSpPr>
+            <p:cNvPr id="29" name="Rounded Rectangle 28"/>
+            <p:cNvSpPr/>
+            <p:nvPr/>
+          </p:nvSpPr>
+          <p:spPr>
+            <a:xfrm>
+              <a:off x="6448425" y="3933827"/>
+              <a:ext cx="2628900" cy="1409700"/>
+            </a:xfrm>
+            <a:prstGeom prst="roundRect">
+              <a:avLst/>
+            </a:prstGeom>
+            <a:solidFill>
+              <a:schemeClr val="accent6">
+                <a:lumMod val="75000"/>
+              </a:schemeClr>
+            </a:solidFill>
+            <a:ln w="76200">
+              <a:solidFill>
+                <a:schemeClr val="accent6">
+                  <a:lumMod val="50000"/>
+                </a:schemeClr>
+              </a:solidFill>
+            </a:ln>
+          </p:spPr>
+          <p:style>
+            <a:lnRef idx="2">
+              <a:schemeClr val="accent1">
+                <a:shade val="50000"/>
+              </a:schemeClr>
+            </a:lnRef>
+            <a:fillRef idx="1">
+              <a:schemeClr val="accent1"/>
+            </a:fillRef>
+            <a:effectRef idx="0">
+              <a:schemeClr val="accent1"/>
+            </a:effectRef>
+            <a:fontRef idx="minor">
+              <a:schemeClr val="lt1"/>
+            </a:fontRef>
+          </p:style>
+          <p:txBody>
+            <a:bodyPr rtlCol="0" anchor="ctr"/>
+            <a:lstStyle/>
+            <a:p>
+              <a:pPr algn="ctr"/>
+              <a:endParaRPr lang="de-DE"/>
+            </a:p>
+          </p:txBody>
+        </p:sp>
+        <p:sp>
+          <p:nvSpPr>
+            <p:cNvPr id="30" name="TextBox 29"/>
+            <p:cNvSpPr txBox="1"/>
+            <p:nvPr/>
+          </p:nvSpPr>
+          <p:spPr>
+            <a:xfrm>
+              <a:off x="6513804" y="4239101"/>
+              <a:ext cx="2501164" cy="830340"/>
+            </a:xfrm>
+            <a:prstGeom prst="rect">
+              <a:avLst/>
+            </a:prstGeom>
+            <a:noFill/>
+            <a:ln w="76200">
+              <a:noFill/>
+            </a:ln>
+          </p:spPr>
+          <p:txBody>
+            <a:bodyPr wrap="square" rtlCol="0">
+              <a:spAutoFit/>
+            </a:bodyPr>
+            <a:lstStyle/>
+            <a:p>
+              <a:pPr algn="ctr"/>
+              <a:r>
+                <a:rPr lang="en-US" sz="2000" b="1" dirty="0" smtClean="0">
+                  <a:solidFill>
+                    <a:schemeClr val="bg1"/>
+                  </a:solidFill>
+                </a:rPr>
+                <a:t>App</a:t>
+              </a:r>
+              <a:endParaRPr lang="de-DE" sz="2400" b="1" dirty="0">
+                <a:solidFill>
+                  <a:schemeClr val="bg1"/>
+                </a:solidFill>
+              </a:endParaRPr>
+            </a:p>
+          </p:txBody>
+        </p:sp>
+      </p:grpSp>
+      <p:cxnSp>
+        <p:nvCxnSpPr>
+          <p:cNvPr id="36" name="Straight Arrow Connector 35"/>
+          <p:cNvCxnSpPr/>
+          <p:nvPr/>
+        </p:nvCxnSpPr>
+        <p:spPr>
+          <a:xfrm flipV="1">
+            <a:off x="10597351" y="9121942"/>
+            <a:ext cx="1601313" cy="10481"/>
+          </a:xfrm>
+          <a:prstGeom prst="straightConnector1">
+            <a:avLst/>
+          </a:prstGeom>
+          <a:ln w="142875">
+            <a:solidFill>
+              <a:schemeClr val="tx1">
+                <a:lumMod val="50000"/>
+                <a:lumOff val="50000"/>
+              </a:schemeClr>
+            </a:solidFill>
+            <a:tailEnd type="triangle"/>
+          </a:ln>
+        </p:spPr>
+        <p:style>
+          <a:lnRef idx="1">
+            <a:schemeClr val="accent1"/>
+          </a:lnRef>
+          <a:fillRef idx="0">
+            <a:schemeClr val="accent1"/>
+          </a:fillRef>
+          <a:effectRef idx="0">
+            <a:schemeClr val="accent1"/>
+          </a:effectRef>
+          <a:fontRef idx="minor">
+            <a:schemeClr val="tx1"/>
+          </a:fontRef>
+        </p:style>
+      </p:cxnSp>
+      <p:sp>
+        <p:nvSpPr>
+          <p:cNvPr id="32" name="Rounded Rectangle 25"/>
+          <p:cNvSpPr/>
+          <p:nvPr/>
+        </p:nvSpPr>
+        <p:spPr>
+          <a:xfrm>
+            <a:off x="8806365" y="8321991"/>
+            <a:ext cx="1610387" cy="1610382"/>
+          </a:xfrm>
+          <a:prstGeom prst="ellipse">
+            <a:avLst/>
+          </a:prstGeom>
+          <a:solidFill>
+            <a:schemeClr val="accent1">
+              <a:lumMod val="75000"/>
+            </a:schemeClr>
+          </a:solidFill>
+          <a:ln w="76200">
+            <a:solidFill>
+              <a:schemeClr val="accent1">
+                <a:lumMod val="50000"/>
+              </a:schemeClr>
+            </a:solidFill>
+          </a:ln>
+        </p:spPr>
+        <p:style>
+          <a:lnRef idx="2">
+            <a:schemeClr val="accent1">
+              <a:shade val="50000"/>
+            </a:schemeClr>
+          </a:lnRef>
+          <a:fillRef idx="1">
+            <a:schemeClr val="accent1"/>
+          </a:fillRef>
+          <a:effectRef idx="0">
+            <a:schemeClr val="accent1"/>
+          </a:effectRef>
+          <a:fontRef idx="minor">
+            <a:schemeClr val="lt1"/>
+          </a:fontRef>
+        </p:style>
+        <p:txBody>
+          <a:bodyPr rtlCol="0" anchor="ctr"/>
+          <a:lstStyle/>
+          <a:p>
+            <a:pPr algn="ctr"/>
+            <a:endParaRPr lang="en-US" sz="2000" b="1" dirty="0" smtClean="0"/>
+          </a:p>
+          <a:p>
+            <a:pPr algn="ctr"/>
+            <a:endParaRPr lang="en-US" sz="2000" b="1" dirty="0"/>
+          </a:p>
+          <a:p>
+            <a:pPr algn="ctr"/>
+            <a:r>
+              <a:rPr lang="en-US" sz="2000" b="1" dirty="0" smtClean="0"/>
+              <a:t>AMI</a:t>
+            </a:r>
+            <a:endParaRPr lang="de-DE" sz="2000" b="1" dirty="0"/>
+          </a:p>
+        </p:txBody>
+      </p:sp>
+      <p:grpSp>
+        <p:nvGrpSpPr>
+          <p:cNvPr id="4" name="Group 3"/>
+          <p:cNvGrpSpPr/>
+          <p:nvPr/>
+        </p:nvGrpSpPr>
+        <p:grpSpPr>
+          <a:xfrm>
+            <a:off x="12360816" y="8217563"/>
+            <a:ext cx="1746456" cy="1819239"/>
+            <a:chOff x="12360816" y="8217563"/>
+            <a:chExt cx="1746456" cy="1819239"/>
+          </a:xfrm>
+        </p:grpSpPr>
+        <p:sp>
+          <p:nvSpPr>
+            <p:cNvPr id="34" name="Rounded Rectangle 75"/>
+            <p:cNvSpPr/>
+            <p:nvPr/>
+          </p:nvSpPr>
+          <p:spPr>
+            <a:xfrm>
+              <a:off x="12360816" y="8217563"/>
+              <a:ext cx="1441656" cy="1514439"/>
+            </a:xfrm>
+            <a:prstGeom prst="rect">
+              <a:avLst/>
+            </a:prstGeom>
+            <a:solidFill>
+              <a:schemeClr val="accent2">
+                <a:lumMod val="75000"/>
+              </a:schemeClr>
+            </a:solidFill>
+            <a:ln w="76200">
+              <a:solidFill>
+                <a:schemeClr val="accent2">
+                  <a:lumMod val="50000"/>
+                </a:schemeClr>
+              </a:solidFill>
+            </a:ln>
+          </p:spPr>
+          <p:style>
+            <a:lnRef idx="2">
+              <a:schemeClr val="accent1">
+                <a:shade val="50000"/>
+              </a:schemeClr>
+            </a:lnRef>
+            <a:fillRef idx="1">
+              <a:schemeClr val="accent1"/>
+            </a:fillRef>
+            <a:effectRef idx="0">
+              <a:schemeClr val="accent1"/>
+            </a:effectRef>
+            <a:fontRef idx="minor">
+              <a:schemeClr val="lt1"/>
+            </a:fontRef>
+          </p:style>
+          <p:txBody>
+            <a:bodyPr rtlCol="0" anchor="ctr"/>
+            <a:lstStyle/>
+            <a:p>
+              <a:pPr algn="ctr"/>
+              <a:r>
+                <a:rPr lang="en-US" sz="2000" b="1" dirty="0"/>
+                <a:t>Instance</a:t>
+              </a:r>
+              <a:endParaRPr lang="de-DE" sz="2000" b="1" dirty="0"/>
+            </a:p>
+          </p:txBody>
+        </p:sp>
+        <p:sp>
+          <p:nvSpPr>
+            <p:cNvPr id="40" name="Rounded Rectangle 75"/>
+            <p:cNvSpPr/>
+            <p:nvPr/>
+          </p:nvSpPr>
+          <p:spPr>
+            <a:xfrm>
+              <a:off x="12513216" y="8369963"/>
+              <a:ext cx="1441656" cy="1514439"/>
+            </a:xfrm>
+            <a:prstGeom prst="rect">
+              <a:avLst/>
+            </a:prstGeom>
+            <a:solidFill>
+              <a:schemeClr val="accent2">
+                <a:lumMod val="75000"/>
+              </a:schemeClr>
+            </a:solidFill>
+            <a:ln w="76200">
+              <a:solidFill>
+                <a:schemeClr val="accent2">
+                  <a:lumMod val="50000"/>
+                </a:schemeClr>
+              </a:solidFill>
+            </a:ln>
+          </p:spPr>
+          <p:style>
+            <a:lnRef idx="2">
+              <a:schemeClr val="accent1">
+                <a:shade val="50000"/>
+              </a:schemeClr>
+            </a:lnRef>
+            <a:fillRef idx="1">
+              <a:schemeClr val="accent1"/>
+            </a:fillRef>
+            <a:effectRef idx="0">
+              <a:schemeClr val="accent1"/>
+            </a:effectRef>
+            <a:fontRef idx="minor">
+              <a:schemeClr val="lt1"/>
+            </a:fontRef>
+          </p:style>
+          <p:txBody>
+            <a:bodyPr rtlCol="0" anchor="ctr"/>
+            <a:lstStyle/>
+            <a:p>
+              <a:pPr algn="ctr"/>
+              <a:r>
+                <a:rPr lang="en-US" sz="2000" b="1" dirty="0"/>
+                <a:t>Instance</a:t>
+              </a:r>
+              <a:endParaRPr lang="de-DE" sz="2000" b="1" dirty="0"/>
+            </a:p>
+          </p:txBody>
+        </p:sp>
+        <p:sp>
+          <p:nvSpPr>
+            <p:cNvPr id="41" name="Rounded Rectangle 75"/>
+            <p:cNvSpPr/>
+            <p:nvPr/>
+          </p:nvSpPr>
+          <p:spPr>
+            <a:xfrm>
+              <a:off x="12665616" y="8522363"/>
+              <a:ext cx="1441656" cy="1514439"/>
+            </a:xfrm>
+            <a:prstGeom prst="rect">
+              <a:avLst/>
+            </a:prstGeom>
+            <a:solidFill>
+              <a:schemeClr val="accent2">
+                <a:lumMod val="75000"/>
+              </a:schemeClr>
+            </a:solidFill>
+            <a:ln w="76200">
+              <a:solidFill>
+                <a:schemeClr val="accent2">
+                  <a:lumMod val="50000"/>
+                </a:schemeClr>
+              </a:solidFill>
+            </a:ln>
+          </p:spPr>
+          <p:style>
+            <a:lnRef idx="2">
+              <a:schemeClr val="accent1">
+                <a:shade val="50000"/>
+              </a:schemeClr>
+            </a:lnRef>
+            <a:fillRef idx="1">
+              <a:schemeClr val="accent1"/>
+            </a:fillRef>
+            <a:effectRef idx="0">
+              <a:schemeClr val="accent1"/>
+            </a:effectRef>
+            <a:fontRef idx="minor">
+              <a:schemeClr val="lt1"/>
+            </a:fontRef>
+          </p:style>
+          <p:txBody>
+            <a:bodyPr rtlCol="0" anchor="ctr"/>
+            <a:lstStyle/>
+            <a:p>
+              <a:pPr algn="ctr"/>
+              <a:endParaRPr lang="en-US" sz="2000" b="1" dirty="0" smtClean="0"/>
+            </a:p>
+            <a:p>
+              <a:pPr algn="ctr"/>
+              <a:r>
+                <a:rPr lang="en-US" sz="2000" b="1" dirty="0" smtClean="0"/>
+                <a:t>Instance</a:t>
+              </a:r>
+              <a:endParaRPr lang="de-DE" sz="2000" b="1" dirty="0"/>
+            </a:p>
+          </p:txBody>
+        </p:sp>
+      </p:grpSp>
+      <p:sp>
+        <p:nvSpPr>
+          <p:cNvPr id="44" name="TextBox 43"/>
+          <p:cNvSpPr txBox="1"/>
+          <p:nvPr/>
+        </p:nvSpPr>
+        <p:spPr>
+          <a:xfrm>
+            <a:off x="7123302" y="9174954"/>
+            <a:ext cx="1335331" cy="954107"/>
+          </a:xfrm>
+          <a:prstGeom prst="rect">
+            <a:avLst/>
+          </a:prstGeom>
+          <a:noFill/>
+        </p:spPr>
+        <p:txBody>
+          <a:bodyPr wrap="square" rtlCol="0">
+            <a:spAutoFit/>
+          </a:bodyPr>
+          <a:lstStyle/>
+          <a:p>
+            <a:pPr algn="ctr"/>
+            <a:r>
+              <a:rPr lang="en-US" sz="2800" b="1" dirty="0" smtClean="0"/>
+              <a:t>create</a:t>
+            </a:r>
+          </a:p>
+          <a:p>
+            <a:pPr algn="ctr"/>
+            <a:r>
+              <a:rPr lang="en-US" sz="2800" b="1" dirty="0" smtClean="0"/>
+              <a:t>AMI</a:t>
+            </a:r>
+            <a:endParaRPr lang="de-DE" sz="2800" b="1" dirty="0"/>
+          </a:p>
+        </p:txBody>
+      </p:sp>
+      <p:sp>
+        <p:nvSpPr>
+          <p:cNvPr id="45" name="TextBox 44"/>
+          <p:cNvSpPr txBox="1"/>
+          <p:nvPr/>
+        </p:nvSpPr>
+        <p:spPr>
+          <a:xfrm>
+            <a:off x="10410096" y="9174954"/>
+            <a:ext cx="1749669" cy="954107"/>
+          </a:xfrm>
+          <a:prstGeom prst="rect">
+            <a:avLst/>
+          </a:prstGeom>
+          <a:noFill/>
+        </p:spPr>
+        <p:txBody>
+          <a:bodyPr wrap="square" rtlCol="0">
+            <a:spAutoFit/>
+          </a:bodyPr>
+          <a:lstStyle/>
+          <a:p>
+            <a:pPr algn="ctr"/>
+            <a:r>
+              <a:rPr lang="en-US" sz="2800" b="1" dirty="0" smtClean="0"/>
+              <a:t>launch</a:t>
+            </a:r>
+          </a:p>
+          <a:p>
+            <a:pPr algn="ctr"/>
+            <a:r>
+              <a:rPr lang="en-US" sz="2800" b="1" dirty="0" smtClean="0"/>
+              <a:t>instances</a:t>
+            </a:r>
+            <a:endParaRPr lang="de-DE" sz="2800" b="1" dirty="0"/>
+          </a:p>
+        </p:txBody>
+      </p:sp>
+      <p:cxnSp>
+        <p:nvCxnSpPr>
+          <p:cNvPr id="47" name="Straight Arrow Connector 46"/>
+          <p:cNvCxnSpPr/>
+          <p:nvPr/>
+        </p:nvCxnSpPr>
+        <p:spPr>
+          <a:xfrm flipV="1">
+            <a:off x="7092150" y="9121942"/>
+            <a:ext cx="1601313" cy="10481"/>
+          </a:xfrm>
+          <a:prstGeom prst="straightConnector1">
+            <a:avLst/>
+          </a:prstGeom>
+          <a:ln w="142875">
+            <a:solidFill>
+              <a:schemeClr val="tx1">
+                <a:lumMod val="50000"/>
+                <a:lumOff val="50000"/>
+              </a:schemeClr>
+            </a:solidFill>
+            <a:tailEnd type="triangle"/>
+          </a:ln>
+        </p:spPr>
+        <p:style>
+          <a:lnRef idx="1">
+            <a:schemeClr val="accent1"/>
+          </a:lnRef>
+          <a:fillRef idx="0">
+            <a:schemeClr val="accent1"/>
+          </a:fillRef>
+          <a:effectRef idx="0">
+            <a:schemeClr val="accent1"/>
+          </a:effectRef>
+          <a:fontRef idx="minor">
+            <a:schemeClr val="tx1"/>
+          </a:fontRef>
+        </p:style>
+      </p:cxnSp>
+      <p:pic>
+        <p:nvPicPr>
+          <p:cNvPr id="1026" name="Picture 2" descr="http://miamitom.net/content/wp-content/uploads/2015/04/aws-logo-large_white-300x111.png"/>
+          <p:cNvPicPr>
+            <a:picLocks noChangeAspect="1" noChangeArrowheads="1"/>
+          </p:cNvPicPr>
+          <p:nvPr/>
+        </p:nvPicPr>
+        <p:blipFill>
+          <a:blip r:embed="rId4">
+            <a:extLst>
+              <a:ext uri="{28A0092B-C50C-407E-A947-70E740481C1C}">
+                <a14:useLocalDpi xmlns:a14="http://schemas.microsoft.com/office/drawing/2010/main" val="0"/>
+              </a:ext>
+            </a:extLst>
+          </a:blip>
+          <a:srcRect/>
+          <a:stretch>
+            <a:fillRect/>
+          </a:stretch>
+        </p:blipFill>
+        <p:spPr bwMode="auto">
+          <a:xfrm>
+            <a:off x="8994530" y="8715083"/>
+            <a:ext cx="1254614" cy="464208"/>
+          </a:xfrm>
+          <a:prstGeom prst="rect">
+            <a:avLst/>
+          </a:prstGeom>
+          <a:noFill/>
+          <a:extLst>
+            <a:ext uri="{909E8E84-426E-40DD-AFC4-6F175D3DCCD1}">
+              <a14:hiddenFill xmlns:a14="http://schemas.microsoft.com/office/drawing/2010/main">
+                <a:solidFill>
+                  <a:srgbClr val="FFFFFF"/>
+                </a:solidFill>
+              </a14:hiddenFill>
+            </a:ext>
+          </a:extLst>
+        </p:spPr>
+      </p:pic>
+      <p:pic>
+        <p:nvPicPr>
+          <p:cNvPr id="53" name="Picture 2" descr="http://miamitom.net/content/wp-content/uploads/2015/04/aws-logo-large_white-300x111.png"/>
+          <p:cNvPicPr>
+            <a:picLocks noChangeAspect="1" noChangeArrowheads="1"/>
+          </p:cNvPicPr>
+          <p:nvPr/>
+        </p:nvPicPr>
+        <p:blipFill>
+          <a:blip r:embed="rId4">
+            <a:extLst>
+              <a:ext uri="{28A0092B-C50C-407E-A947-70E740481C1C}">
+                <a14:useLocalDpi xmlns:a14="http://schemas.microsoft.com/office/drawing/2010/main" val="0"/>
+              </a:ext>
+            </a:extLst>
+          </a:blip>
+          <a:srcRect/>
+          <a:stretch>
+            <a:fillRect/>
+          </a:stretch>
+        </p:blipFill>
+        <p:spPr bwMode="auto">
+          <a:xfrm>
+            <a:off x="12760568" y="8770768"/>
+            <a:ext cx="1254614" cy="464208"/>
+          </a:xfrm>
+          <a:prstGeom prst="rect">
+            <a:avLst/>
+          </a:prstGeom>
+          <a:noFill/>
+          <a:extLst>
+            <a:ext uri="{909E8E84-426E-40DD-AFC4-6F175D3DCCD1}">
+              <a14:hiddenFill xmlns:a14="http://schemas.microsoft.com/office/drawing/2010/main">
+                <a:solidFill>
+                  <a:srgbClr val="FFFFFF"/>
+                </a:solidFill>
+              </a14:hiddenFill>
+            </a:ext>
+          </a:extLst>
+        </p:spPr>
+      </p:pic>
     </p:spTree>
     <p:extLst>
       <p:ext uri="{BB962C8B-B14F-4D97-AF65-F5344CB8AC3E}">
@@ -12777,7 +13748,7 @@
         </p:blipFill>
         <p:spPr>
           <a:xfrm>
-            <a:off x="7116130" y="3991447"/>
+            <a:off x="7766761" y="5187200"/>
             <a:ext cx="1655807" cy="705924"/>
           </a:xfrm>
           <a:prstGeom prst="rect">
@@ -12793,7 +13764,7 @@
         </p:nvSpPr>
         <p:spPr>
           <a:xfrm>
-            <a:off x="8048943" y="2434288"/>
+            <a:off x="8699574" y="3630041"/>
             <a:ext cx="1441656" cy="1514439"/>
           </a:xfrm>
           <a:prstGeom prst="rect">
@@ -12849,7 +13820,7 @@
         </p:nvGrpSpPr>
         <p:grpSpPr>
           <a:xfrm>
-            <a:off x="9778364" y="2858251"/>
+            <a:off x="10428995" y="4054004"/>
             <a:ext cx="1381738" cy="673166"/>
             <a:chOff x="2334271" y="318043"/>
             <a:chExt cx="1457473" cy="673166"/>
@@ -12948,7 +13919,7 @@
         </p:blipFill>
         <p:spPr>
           <a:xfrm>
-            <a:off x="11297689" y="2663185"/>
+            <a:off x="11948320" y="3858938"/>
             <a:ext cx="2294064" cy="1436808"/>
           </a:xfrm>
           <a:prstGeom prst="rect">
@@ -13226,7 +14197,7 @@
         </p:blipFill>
         <p:spPr bwMode="auto">
           <a:xfrm>
-            <a:off x="8860103" y="4034233"/>
+            <a:off x="9510734" y="5229986"/>
             <a:ext cx="1466377" cy="553964"/>
           </a:xfrm>
           <a:prstGeom prst="rect">
@@ -13497,6 +14468,643 @@
           </a:p>
         </p:txBody>
       </p:sp>
+      <p:grpSp>
+        <p:nvGrpSpPr>
+          <p:cNvPr id="23" name="Group 22"/>
+          <p:cNvGrpSpPr/>
+          <p:nvPr/>
+        </p:nvGrpSpPr>
+        <p:grpSpPr>
+          <a:xfrm>
+            <a:off x="272589" y="874464"/>
+            <a:ext cx="1496257" cy="679282"/>
+            <a:chOff x="6448425" y="3933827"/>
+            <a:chExt cx="2628900" cy="1409700"/>
+          </a:xfrm>
+        </p:grpSpPr>
+        <p:sp>
+          <p:nvSpPr>
+            <p:cNvPr id="24" name="Rounded Rectangle 23"/>
+            <p:cNvSpPr/>
+            <p:nvPr/>
+          </p:nvSpPr>
+          <p:spPr>
+            <a:xfrm>
+              <a:off x="6448425" y="3933827"/>
+              <a:ext cx="2628900" cy="1409700"/>
+            </a:xfrm>
+            <a:prstGeom prst="roundRect">
+              <a:avLst/>
+            </a:prstGeom>
+            <a:solidFill>
+              <a:schemeClr val="accent6">
+                <a:lumMod val="75000"/>
+              </a:schemeClr>
+            </a:solidFill>
+            <a:ln w="76200">
+              <a:solidFill>
+                <a:schemeClr val="accent6">
+                  <a:lumMod val="50000"/>
+                </a:schemeClr>
+              </a:solidFill>
+            </a:ln>
+          </p:spPr>
+          <p:style>
+            <a:lnRef idx="2">
+              <a:schemeClr val="accent1">
+                <a:shade val="50000"/>
+              </a:schemeClr>
+            </a:lnRef>
+            <a:fillRef idx="1">
+              <a:schemeClr val="accent1"/>
+            </a:fillRef>
+            <a:effectRef idx="0">
+              <a:schemeClr val="accent1"/>
+            </a:effectRef>
+            <a:fontRef idx="minor">
+              <a:schemeClr val="lt1"/>
+            </a:fontRef>
+          </p:style>
+          <p:txBody>
+            <a:bodyPr rtlCol="0" anchor="ctr"/>
+            <a:lstStyle/>
+            <a:p>
+              <a:pPr algn="ctr"/>
+              <a:endParaRPr lang="de-DE"/>
+            </a:p>
+          </p:txBody>
+        </p:sp>
+        <p:sp>
+          <p:nvSpPr>
+            <p:cNvPr id="25" name="TextBox 24"/>
+            <p:cNvSpPr txBox="1"/>
+            <p:nvPr/>
+          </p:nvSpPr>
+          <p:spPr>
+            <a:xfrm>
+              <a:off x="6513804" y="4239101"/>
+              <a:ext cx="2501164" cy="830340"/>
+            </a:xfrm>
+            <a:prstGeom prst="rect">
+              <a:avLst/>
+            </a:prstGeom>
+            <a:noFill/>
+            <a:ln w="76200">
+              <a:noFill/>
+            </a:ln>
+          </p:spPr>
+          <p:txBody>
+            <a:bodyPr wrap="square" rtlCol="0">
+              <a:spAutoFit/>
+            </a:bodyPr>
+            <a:lstStyle/>
+            <a:p>
+              <a:pPr algn="ctr"/>
+              <a:r>
+                <a:rPr lang="en-US" sz="2000" b="1" dirty="0" smtClean="0">
+                  <a:solidFill>
+                    <a:schemeClr val="bg1"/>
+                  </a:solidFill>
+                </a:rPr>
+                <a:t>App</a:t>
+              </a:r>
+              <a:endParaRPr lang="de-DE" sz="2400" b="1" dirty="0">
+                <a:solidFill>
+                  <a:schemeClr val="bg1"/>
+                </a:solidFill>
+              </a:endParaRPr>
+            </a:p>
+          </p:txBody>
+        </p:sp>
+      </p:grpSp>
+      <p:cxnSp>
+        <p:nvCxnSpPr>
+          <p:cNvPr id="26" name="Straight Arrow Connector 25"/>
+          <p:cNvCxnSpPr/>
+          <p:nvPr/>
+        </p:nvCxnSpPr>
+        <p:spPr>
+          <a:xfrm flipV="1">
+            <a:off x="5497812" y="1208865"/>
+            <a:ext cx="1601313" cy="10481"/>
+          </a:xfrm>
+          <a:prstGeom prst="straightConnector1">
+            <a:avLst/>
+          </a:prstGeom>
+          <a:ln w="142875">
+            <a:solidFill>
+              <a:schemeClr val="bg2">
+                <a:lumMod val="90000"/>
+              </a:schemeClr>
+            </a:solidFill>
+            <a:tailEnd type="triangle"/>
+          </a:ln>
+        </p:spPr>
+        <p:style>
+          <a:lnRef idx="1">
+            <a:schemeClr val="accent1"/>
+          </a:lnRef>
+          <a:fillRef idx="0">
+            <a:schemeClr val="accent1"/>
+          </a:fillRef>
+          <a:effectRef idx="0">
+            <a:schemeClr val="accent1"/>
+          </a:effectRef>
+          <a:fontRef idx="minor">
+            <a:schemeClr val="tx1"/>
+          </a:fontRef>
+        </p:style>
+      </p:cxnSp>
+      <p:sp>
+        <p:nvSpPr>
+          <p:cNvPr id="27" name="Rounded Rectangle 25"/>
+          <p:cNvSpPr/>
+          <p:nvPr/>
+        </p:nvSpPr>
+        <p:spPr>
+          <a:xfrm>
+            <a:off x="3706826" y="408914"/>
+            <a:ext cx="1610387" cy="1610382"/>
+          </a:xfrm>
+          <a:prstGeom prst="ellipse">
+            <a:avLst/>
+          </a:prstGeom>
+          <a:solidFill>
+            <a:schemeClr val="accent1">
+              <a:lumMod val="75000"/>
+            </a:schemeClr>
+          </a:solidFill>
+          <a:ln w="76200">
+            <a:solidFill>
+              <a:schemeClr val="accent1">
+                <a:lumMod val="50000"/>
+              </a:schemeClr>
+            </a:solidFill>
+          </a:ln>
+        </p:spPr>
+        <p:style>
+          <a:lnRef idx="2">
+            <a:schemeClr val="accent1">
+              <a:shade val="50000"/>
+            </a:schemeClr>
+          </a:lnRef>
+          <a:fillRef idx="1">
+            <a:schemeClr val="accent1"/>
+          </a:fillRef>
+          <a:effectRef idx="0">
+            <a:schemeClr val="accent1"/>
+          </a:effectRef>
+          <a:fontRef idx="minor">
+            <a:schemeClr val="lt1"/>
+          </a:fontRef>
+        </p:style>
+        <p:txBody>
+          <a:bodyPr rtlCol="0" anchor="ctr"/>
+          <a:lstStyle/>
+          <a:p>
+            <a:pPr algn="ctr"/>
+            <a:endParaRPr lang="en-US" sz="2000" b="1" dirty="0" smtClean="0"/>
+          </a:p>
+          <a:p>
+            <a:pPr algn="ctr"/>
+            <a:endParaRPr lang="en-US" sz="2000" b="1" dirty="0"/>
+          </a:p>
+          <a:p>
+            <a:pPr algn="ctr"/>
+            <a:r>
+              <a:rPr lang="en-US" sz="2000" b="1" dirty="0" smtClean="0"/>
+              <a:t>AMI</a:t>
+            </a:r>
+            <a:endParaRPr lang="de-DE" sz="2000" b="1" dirty="0"/>
+          </a:p>
+        </p:txBody>
+      </p:sp>
+      <p:grpSp>
+        <p:nvGrpSpPr>
+          <p:cNvPr id="28" name="Group 27"/>
+          <p:cNvGrpSpPr/>
+          <p:nvPr/>
+        </p:nvGrpSpPr>
+        <p:grpSpPr>
+          <a:xfrm>
+            <a:off x="7261277" y="304486"/>
+            <a:ext cx="1746456" cy="1819239"/>
+            <a:chOff x="12360816" y="8217563"/>
+            <a:chExt cx="1746456" cy="1819239"/>
+          </a:xfrm>
+        </p:grpSpPr>
+        <p:sp>
+          <p:nvSpPr>
+            <p:cNvPr id="29" name="Rounded Rectangle 75"/>
+            <p:cNvSpPr/>
+            <p:nvPr/>
+          </p:nvSpPr>
+          <p:spPr>
+            <a:xfrm>
+              <a:off x="12360816" y="8217563"/>
+              <a:ext cx="1441656" cy="1514439"/>
+            </a:xfrm>
+            <a:prstGeom prst="rect">
+              <a:avLst/>
+            </a:prstGeom>
+            <a:solidFill>
+              <a:schemeClr val="bg2">
+                <a:lumMod val="90000"/>
+              </a:schemeClr>
+            </a:solidFill>
+            <a:ln w="76200">
+              <a:solidFill>
+                <a:schemeClr val="bg2">
+                  <a:lumMod val="75000"/>
+                </a:schemeClr>
+              </a:solidFill>
+            </a:ln>
+          </p:spPr>
+          <p:style>
+            <a:lnRef idx="2">
+              <a:schemeClr val="accent1">
+                <a:shade val="50000"/>
+              </a:schemeClr>
+            </a:lnRef>
+            <a:fillRef idx="1">
+              <a:schemeClr val="accent1"/>
+            </a:fillRef>
+            <a:effectRef idx="0">
+              <a:schemeClr val="accent1"/>
+            </a:effectRef>
+            <a:fontRef idx="minor">
+              <a:schemeClr val="lt1"/>
+            </a:fontRef>
+          </p:style>
+          <p:txBody>
+            <a:bodyPr rtlCol="0" anchor="ctr"/>
+            <a:lstStyle/>
+            <a:p>
+              <a:pPr algn="ctr"/>
+              <a:r>
+                <a:rPr lang="en-US" sz="2000" b="1" dirty="0"/>
+                <a:t>Instance</a:t>
+              </a:r>
+              <a:endParaRPr lang="de-DE" sz="2000" b="1" dirty="0"/>
+            </a:p>
+          </p:txBody>
+        </p:sp>
+        <p:sp>
+          <p:nvSpPr>
+            <p:cNvPr id="30" name="Rounded Rectangle 75"/>
+            <p:cNvSpPr/>
+            <p:nvPr/>
+          </p:nvSpPr>
+          <p:spPr>
+            <a:xfrm>
+              <a:off x="12513216" y="8369963"/>
+              <a:ext cx="1441656" cy="1514439"/>
+            </a:xfrm>
+            <a:prstGeom prst="rect">
+              <a:avLst/>
+            </a:prstGeom>
+            <a:solidFill>
+              <a:schemeClr val="bg2">
+                <a:lumMod val="90000"/>
+              </a:schemeClr>
+            </a:solidFill>
+            <a:ln w="76200">
+              <a:solidFill>
+                <a:schemeClr val="bg2">
+                  <a:lumMod val="75000"/>
+                </a:schemeClr>
+              </a:solidFill>
+            </a:ln>
+          </p:spPr>
+          <p:style>
+            <a:lnRef idx="2">
+              <a:schemeClr val="accent1">
+                <a:shade val="50000"/>
+              </a:schemeClr>
+            </a:lnRef>
+            <a:fillRef idx="1">
+              <a:schemeClr val="accent1"/>
+            </a:fillRef>
+            <a:effectRef idx="0">
+              <a:schemeClr val="accent1"/>
+            </a:effectRef>
+            <a:fontRef idx="minor">
+              <a:schemeClr val="lt1"/>
+            </a:fontRef>
+          </p:style>
+          <p:txBody>
+            <a:bodyPr rtlCol="0" anchor="ctr"/>
+            <a:lstStyle/>
+            <a:p>
+              <a:pPr algn="ctr"/>
+              <a:r>
+                <a:rPr lang="en-US" sz="2000" b="1" dirty="0"/>
+                <a:t>Instance</a:t>
+              </a:r>
+              <a:endParaRPr lang="de-DE" sz="2000" b="1" dirty="0"/>
+            </a:p>
+          </p:txBody>
+        </p:sp>
+        <p:sp>
+          <p:nvSpPr>
+            <p:cNvPr id="31" name="Rounded Rectangle 75"/>
+            <p:cNvSpPr/>
+            <p:nvPr/>
+          </p:nvSpPr>
+          <p:spPr>
+            <a:xfrm>
+              <a:off x="12665616" y="8522363"/>
+              <a:ext cx="1441656" cy="1514439"/>
+            </a:xfrm>
+            <a:prstGeom prst="rect">
+              <a:avLst/>
+            </a:prstGeom>
+            <a:solidFill>
+              <a:schemeClr val="bg2">
+                <a:lumMod val="90000"/>
+              </a:schemeClr>
+            </a:solidFill>
+            <a:ln w="76200">
+              <a:solidFill>
+                <a:schemeClr val="bg2">
+                  <a:lumMod val="75000"/>
+                </a:schemeClr>
+              </a:solidFill>
+            </a:ln>
+          </p:spPr>
+          <p:style>
+            <a:lnRef idx="2">
+              <a:schemeClr val="accent1">
+                <a:shade val="50000"/>
+              </a:schemeClr>
+            </a:lnRef>
+            <a:fillRef idx="1">
+              <a:schemeClr val="accent1"/>
+            </a:fillRef>
+            <a:effectRef idx="0">
+              <a:schemeClr val="accent1"/>
+            </a:effectRef>
+            <a:fontRef idx="minor">
+              <a:schemeClr val="lt1"/>
+            </a:fontRef>
+          </p:style>
+          <p:txBody>
+            <a:bodyPr rtlCol="0" anchor="ctr"/>
+            <a:lstStyle/>
+            <a:p>
+              <a:pPr algn="ctr"/>
+              <a:endParaRPr lang="en-US" sz="2000" b="1" dirty="0" smtClean="0"/>
+            </a:p>
+            <a:p>
+              <a:pPr algn="ctr"/>
+              <a:r>
+                <a:rPr lang="en-US" sz="2000" b="1" dirty="0" smtClean="0"/>
+                <a:t>Instance</a:t>
+              </a:r>
+              <a:endParaRPr lang="de-DE" sz="2000" b="1" dirty="0"/>
+            </a:p>
+          </p:txBody>
+        </p:sp>
+      </p:grpSp>
+      <p:sp>
+        <p:nvSpPr>
+          <p:cNvPr id="32" name="TextBox 31"/>
+          <p:cNvSpPr txBox="1"/>
+          <p:nvPr/>
+        </p:nvSpPr>
+        <p:spPr>
+          <a:xfrm>
+            <a:off x="2120479" y="1297045"/>
+            <a:ext cx="1335331" cy="523220"/>
+          </a:xfrm>
+          <a:prstGeom prst="rect">
+            <a:avLst/>
+          </a:prstGeom>
+          <a:noFill/>
+        </p:spPr>
+        <p:txBody>
+          <a:bodyPr wrap="square" rtlCol="0">
+            <a:spAutoFit/>
+          </a:bodyPr>
+          <a:lstStyle/>
+          <a:p>
+            <a:pPr algn="ctr"/>
+            <a:r>
+              <a:rPr lang="en-US" sz="2800" b="1" dirty="0" smtClean="0"/>
+              <a:t>convert</a:t>
+            </a:r>
+            <a:endParaRPr lang="de-DE" sz="2800" b="1" dirty="0"/>
+          </a:p>
+        </p:txBody>
+      </p:sp>
+      <p:sp>
+        <p:nvSpPr>
+          <p:cNvPr id="33" name="TextBox 32"/>
+          <p:cNvSpPr txBox="1"/>
+          <p:nvPr/>
+        </p:nvSpPr>
+        <p:spPr>
+          <a:xfrm>
+            <a:off x="5292972" y="241969"/>
+            <a:ext cx="1749669" cy="954107"/>
+          </a:xfrm>
+          <a:prstGeom prst="rect">
+            <a:avLst/>
+          </a:prstGeom>
+          <a:noFill/>
+        </p:spPr>
+        <p:txBody>
+          <a:bodyPr wrap="square" rtlCol="0">
+            <a:spAutoFit/>
+          </a:bodyPr>
+          <a:lstStyle/>
+          <a:p>
+            <a:pPr algn="ctr"/>
+            <a:r>
+              <a:rPr lang="en-US" sz="2800" b="1" dirty="0" smtClean="0">
+                <a:solidFill>
+                  <a:schemeClr val="bg2">
+                    <a:lumMod val="75000"/>
+                  </a:schemeClr>
+                </a:solidFill>
+              </a:rPr>
+              <a:t>other</a:t>
+            </a:r>
+          </a:p>
+          <a:p>
+            <a:pPr algn="ctr"/>
+            <a:r>
+              <a:rPr lang="en-US" sz="2800" b="1" dirty="0" smtClean="0">
+                <a:solidFill>
+                  <a:schemeClr val="bg2">
+                    <a:lumMod val="75000"/>
+                  </a:schemeClr>
+                </a:solidFill>
+              </a:rPr>
+              <a:t>tools</a:t>
+            </a:r>
+            <a:endParaRPr lang="de-DE" sz="2800" b="1" dirty="0">
+              <a:solidFill>
+                <a:schemeClr val="bg2">
+                  <a:lumMod val="75000"/>
+                </a:schemeClr>
+              </a:solidFill>
+            </a:endParaRPr>
+          </a:p>
+        </p:txBody>
+      </p:sp>
+      <p:cxnSp>
+        <p:nvCxnSpPr>
+          <p:cNvPr id="34" name="Straight Arrow Connector 33"/>
+          <p:cNvCxnSpPr/>
+          <p:nvPr/>
+        </p:nvCxnSpPr>
+        <p:spPr>
+          <a:xfrm flipV="1">
+            <a:off x="1948649" y="1208865"/>
+            <a:ext cx="1601313" cy="10481"/>
+          </a:xfrm>
+          <a:prstGeom prst="straightConnector1">
+            <a:avLst/>
+          </a:prstGeom>
+          <a:ln w="142875">
+            <a:solidFill>
+              <a:schemeClr val="tx1">
+                <a:lumMod val="50000"/>
+                <a:lumOff val="50000"/>
+              </a:schemeClr>
+            </a:solidFill>
+            <a:tailEnd type="triangle"/>
+          </a:ln>
+        </p:spPr>
+        <p:style>
+          <a:lnRef idx="1">
+            <a:schemeClr val="accent1"/>
+          </a:lnRef>
+          <a:fillRef idx="0">
+            <a:schemeClr val="accent1"/>
+          </a:fillRef>
+          <a:effectRef idx="0">
+            <a:schemeClr val="accent1"/>
+          </a:effectRef>
+          <a:fontRef idx="minor">
+            <a:schemeClr val="tx1"/>
+          </a:fontRef>
+        </p:style>
+      </p:cxnSp>
+      <p:pic>
+        <p:nvPicPr>
+          <p:cNvPr id="35" name="Picture 2" descr="http://miamitom.net/content/wp-content/uploads/2015/04/aws-logo-large_white-300x111.png"/>
+          <p:cNvPicPr>
+            <a:picLocks noChangeAspect="1" noChangeArrowheads="1"/>
+          </p:cNvPicPr>
+          <p:nvPr/>
+        </p:nvPicPr>
+        <p:blipFill>
+          <a:blip r:embed="rId6">
+            <a:extLst>
+              <a:ext uri="{28A0092B-C50C-407E-A947-70E740481C1C}">
+                <a14:useLocalDpi xmlns:a14="http://schemas.microsoft.com/office/drawing/2010/main" val="0"/>
+              </a:ext>
+            </a:extLst>
+          </a:blip>
+          <a:srcRect/>
+          <a:stretch>
+            <a:fillRect/>
+          </a:stretch>
+        </p:blipFill>
+        <p:spPr bwMode="auto">
+          <a:xfrm>
+            <a:off x="3894991" y="802006"/>
+            <a:ext cx="1254614" cy="464208"/>
+          </a:xfrm>
+          <a:prstGeom prst="rect">
+            <a:avLst/>
+          </a:prstGeom>
+          <a:noFill/>
+          <a:extLst>
+            <a:ext uri="{909E8E84-426E-40DD-AFC4-6F175D3DCCD1}">
+              <a14:hiddenFill xmlns:a14="http://schemas.microsoft.com/office/drawing/2010/main">
+                <a:solidFill>
+                  <a:srgbClr val="FFFFFF"/>
+                </a:solidFill>
+              </a14:hiddenFill>
+            </a:ext>
+          </a:extLst>
+        </p:spPr>
+      </p:pic>
+      <p:pic>
+        <p:nvPicPr>
+          <p:cNvPr id="36" name="Picture 2" descr="http://miamitom.net/content/wp-content/uploads/2015/04/aws-logo-large_white-300x111.png"/>
+          <p:cNvPicPr>
+            <a:picLocks noChangeAspect="1" noChangeArrowheads="1"/>
+          </p:cNvPicPr>
+          <p:nvPr/>
+        </p:nvPicPr>
+        <p:blipFill>
+          <a:blip r:embed="rId6">
+            <a:biLevel thresh="50000"/>
+            <a:extLst>
+              <a:ext uri="{28A0092B-C50C-407E-A947-70E740481C1C}">
+                <a14:useLocalDpi xmlns:a14="http://schemas.microsoft.com/office/drawing/2010/main" val="0"/>
+              </a:ext>
+            </a:extLst>
+          </a:blip>
+          <a:srcRect/>
+          <a:stretch>
+            <a:fillRect/>
+          </a:stretch>
+        </p:blipFill>
+        <p:spPr bwMode="auto">
+          <a:xfrm>
+            <a:off x="7661029" y="857691"/>
+            <a:ext cx="1254614" cy="464208"/>
+          </a:xfrm>
+          <a:prstGeom prst="rect">
+            <a:avLst/>
+          </a:prstGeom>
+          <a:noFill/>
+          <a:extLst>
+            <a:ext uri="{909E8E84-426E-40DD-AFC4-6F175D3DCCD1}">
+              <a14:hiddenFill xmlns:a14="http://schemas.microsoft.com/office/drawing/2010/main">
+                <a:solidFill>
+                  <a:srgbClr val="FFFFFF"/>
+                </a:solidFill>
+              </a14:hiddenFill>
+            </a:ext>
+          </a:extLst>
+        </p:spPr>
+      </p:pic>
+      <p:pic>
+        <p:nvPicPr>
+          <p:cNvPr id="37" name="Picture 36"/>
+          <p:cNvPicPr>
+            <a:picLocks noChangeAspect="1"/>
+          </p:cNvPicPr>
+          <p:nvPr/>
+        </p:nvPicPr>
+        <p:blipFill>
+          <a:blip r:embed="rId7" cstate="print">
+            <a:extLst>
+              <a:ext uri="{28A0092B-C50C-407E-A947-70E740481C1C}">
+                <a14:useLocalDpi xmlns:a14="http://schemas.microsoft.com/office/drawing/2010/main" val="0"/>
+              </a:ext>
+            </a:extLst>
+          </a:blip>
+          <a:stretch>
+            <a:fillRect/>
+          </a:stretch>
+        </p:blipFill>
+        <p:spPr>
+          <a:xfrm>
+            <a:off x="1960684" y="547457"/>
+            <a:ext cx="1584702" cy="490036"/>
+          </a:xfrm>
+          <a:prstGeom prst="rect">
+            <a:avLst/>
+          </a:prstGeom>
+        </p:spPr>
+      </p:pic>
     </p:spTree>
     <p:extLst>
       <p:ext uri="{BB962C8B-B14F-4D97-AF65-F5344CB8AC3E}">

</xml_diff>

<commit_message>
Added TomEE blog post
</commit_message>
<xml_diff>
--- a/_sources/GettingStarted.pptx
+++ b/_sources/GettingStarted.pptx
@@ -9,29 +9,30 @@
     <p:sldId id="258" r:id="rId3"/>
     <p:sldId id="257" r:id="rId4"/>
     <p:sldId id="275" r:id="rId5"/>
-    <p:sldId id="259" r:id="rId6"/>
-    <p:sldId id="260" r:id="rId7"/>
-    <p:sldId id="261" r:id="rId8"/>
-    <p:sldId id="269" r:id="rId9"/>
-    <p:sldId id="262" r:id="rId10"/>
-    <p:sldId id="263" r:id="rId11"/>
-    <p:sldId id="264" r:id="rId12"/>
-    <p:sldId id="282" r:id="rId13"/>
-    <p:sldId id="273" r:id="rId14"/>
-    <p:sldId id="265" r:id="rId15"/>
-    <p:sldId id="266" r:id="rId16"/>
-    <p:sldId id="267" r:id="rId17"/>
-    <p:sldId id="268" r:id="rId18"/>
-    <p:sldId id="270" r:id="rId19"/>
-    <p:sldId id="272" r:id="rId20"/>
-    <p:sldId id="271" r:id="rId21"/>
-    <p:sldId id="274" r:id="rId22"/>
-    <p:sldId id="276" r:id="rId23"/>
-    <p:sldId id="277" r:id="rId24"/>
-    <p:sldId id="278" r:id="rId25"/>
-    <p:sldId id="279" r:id="rId26"/>
-    <p:sldId id="280" r:id="rId27"/>
-    <p:sldId id="281" r:id="rId28"/>
+    <p:sldId id="283" r:id="rId6"/>
+    <p:sldId id="259" r:id="rId7"/>
+    <p:sldId id="260" r:id="rId8"/>
+    <p:sldId id="261" r:id="rId9"/>
+    <p:sldId id="269" r:id="rId10"/>
+    <p:sldId id="262" r:id="rId11"/>
+    <p:sldId id="263" r:id="rId12"/>
+    <p:sldId id="264" r:id="rId13"/>
+    <p:sldId id="282" r:id="rId14"/>
+    <p:sldId id="273" r:id="rId15"/>
+    <p:sldId id="265" r:id="rId16"/>
+    <p:sldId id="266" r:id="rId17"/>
+    <p:sldId id="267" r:id="rId18"/>
+    <p:sldId id="268" r:id="rId19"/>
+    <p:sldId id="270" r:id="rId20"/>
+    <p:sldId id="272" r:id="rId21"/>
+    <p:sldId id="271" r:id="rId22"/>
+    <p:sldId id="274" r:id="rId23"/>
+    <p:sldId id="276" r:id="rId24"/>
+    <p:sldId id="277" r:id="rId25"/>
+    <p:sldId id="278" r:id="rId26"/>
+    <p:sldId id="279" r:id="rId27"/>
+    <p:sldId id="280" r:id="rId28"/>
+    <p:sldId id="281" r:id="rId29"/>
   </p:sldIdLst>
   <p:sldSz cx="19199225" cy="10799763"/>
   <p:notesSz cx="6858000" cy="9144000"/>
@@ -1259,381 +1260,6 @@
       <dsp:cNvGrpSpPr/>
     </dsp:nvGrpSpPr>
     <dsp:grpSpPr/>
-    <dsp:sp modelId="{6D72C3A5-1474-40AD-9A10-2534C79C4517}">
-      <dsp:nvSpPr>
-        <dsp:cNvPr id="0" name=""/>
-        <dsp:cNvSpPr/>
-      </dsp:nvSpPr>
-      <dsp:spPr>
-        <a:xfrm>
-          <a:off x="2112" y="562235"/>
-          <a:ext cx="1880185" cy="752074"/>
-        </a:xfrm>
-        <a:prstGeom prst="chevron">
-          <a:avLst/>
-        </a:prstGeom>
-        <a:solidFill>
-          <a:schemeClr val="tx2">
-            <a:lumMod val="75000"/>
-          </a:schemeClr>
-        </a:solidFill>
-        <a:ln w="12700" cap="flat" cmpd="sng" algn="ctr">
-          <a:solidFill>
-            <a:schemeClr val="lt1">
-              <a:hueOff val="0"/>
-              <a:satOff val="0"/>
-              <a:lumOff val="0"/>
-              <a:alphaOff val="0"/>
-            </a:schemeClr>
-          </a:solidFill>
-          <a:prstDash val="solid"/>
-          <a:miter lim="800000"/>
-        </a:ln>
-        <a:effectLst/>
-      </dsp:spPr>
-      <dsp:style>
-        <a:lnRef idx="2">
-          <a:scrgbClr r="0" g="0" b="0"/>
-        </a:lnRef>
-        <a:fillRef idx="1">
-          <a:scrgbClr r="0" g="0" b="0"/>
-        </a:fillRef>
-        <a:effectRef idx="0">
-          <a:scrgbClr r="0" g="0" b="0"/>
-        </a:effectRef>
-        <a:fontRef idx="minor">
-          <a:schemeClr val="lt1"/>
-        </a:fontRef>
-      </dsp:style>
-      <dsp:txBody>
-        <a:bodyPr spcFirstLastPara="0" vert="horz" wrap="square" lIns="56007" tIns="18669" rIns="18669" bIns="18669" numCol="1" spcCol="1270" anchor="ctr" anchorCtr="0">
-          <a:noAutofit/>
-        </a:bodyPr>
-        <a:lstStyle/>
-        <a:p>
-          <a:pPr lvl="0" algn="ctr" defTabSz="622300">
-            <a:lnSpc>
-              <a:spcPct val="90000"/>
-            </a:lnSpc>
-            <a:spcBef>
-              <a:spcPct val="0"/>
-            </a:spcBef>
-            <a:spcAft>
-              <a:spcPct val="35000"/>
-            </a:spcAft>
-          </a:pPr>
-          <a:r>
-            <a:rPr lang="en-US" sz="1400" b="1" kern="1200" dirty="0" smtClean="0"/>
-            <a:t>package</a:t>
-          </a:r>
-          <a:endParaRPr lang="de-DE" sz="1400" b="1" kern="1200" dirty="0"/>
-        </a:p>
-      </dsp:txBody>
-      <dsp:txXfrm>
-        <a:off x="378149" y="562235"/>
-        <a:ext cx="1128111" cy="752074"/>
-      </dsp:txXfrm>
-    </dsp:sp>
-    <dsp:sp modelId="{086EE9E9-692A-4D05-A349-CBDF03FDA677}">
-      <dsp:nvSpPr>
-        <dsp:cNvPr id="0" name=""/>
-        <dsp:cNvSpPr/>
-      </dsp:nvSpPr>
-      <dsp:spPr>
-        <a:xfrm>
-          <a:off x="1694279" y="562235"/>
-          <a:ext cx="1880185" cy="752074"/>
-        </a:xfrm>
-        <a:prstGeom prst="chevron">
-          <a:avLst/>
-        </a:prstGeom>
-        <a:solidFill>
-          <a:schemeClr val="tx2">
-            <a:lumMod val="75000"/>
-          </a:schemeClr>
-        </a:solidFill>
-        <a:ln w="12700" cap="flat" cmpd="sng" algn="ctr">
-          <a:solidFill>
-            <a:schemeClr val="lt1">
-              <a:hueOff val="0"/>
-              <a:satOff val="0"/>
-              <a:lumOff val="0"/>
-              <a:alphaOff val="0"/>
-            </a:schemeClr>
-          </a:solidFill>
-          <a:prstDash val="solid"/>
-          <a:miter lim="800000"/>
-        </a:ln>
-        <a:effectLst/>
-      </dsp:spPr>
-      <dsp:style>
-        <a:lnRef idx="2">
-          <a:scrgbClr r="0" g="0" b="0"/>
-        </a:lnRef>
-        <a:fillRef idx="1">
-          <a:scrgbClr r="0" g="0" b="0"/>
-        </a:fillRef>
-        <a:effectRef idx="0">
-          <a:scrgbClr r="0" g="0" b="0"/>
-        </a:effectRef>
-        <a:fontRef idx="minor">
-          <a:schemeClr val="lt1"/>
-        </a:fontRef>
-      </dsp:style>
-      <dsp:txBody>
-        <a:bodyPr spcFirstLastPara="0" vert="horz" wrap="square" lIns="56007" tIns="18669" rIns="18669" bIns="18669" numCol="1" spcCol="1270" anchor="ctr" anchorCtr="0">
-          <a:noAutofit/>
-        </a:bodyPr>
-        <a:lstStyle/>
-        <a:p>
-          <a:pPr lvl="0" algn="ctr" defTabSz="622300">
-            <a:lnSpc>
-              <a:spcPct val="90000"/>
-            </a:lnSpc>
-            <a:spcBef>
-              <a:spcPct val="0"/>
-            </a:spcBef>
-            <a:spcAft>
-              <a:spcPct val="35000"/>
-            </a:spcAft>
-          </a:pPr>
-          <a:r>
-            <a:rPr lang="en-US" sz="1400" b="1" kern="1200" dirty="0" smtClean="0"/>
-            <a:t>pre-integration-test</a:t>
-          </a:r>
-          <a:endParaRPr lang="de-DE" sz="1400" b="1" kern="1200" dirty="0"/>
-        </a:p>
-      </dsp:txBody>
-      <dsp:txXfrm>
-        <a:off x="2070316" y="562235"/>
-        <a:ext cx="1128111" cy="752074"/>
-      </dsp:txXfrm>
-    </dsp:sp>
-    <dsp:sp modelId="{17AF3B93-FA57-409F-9FAF-CA14FC2BCCDA}">
-      <dsp:nvSpPr>
-        <dsp:cNvPr id="0" name=""/>
-        <dsp:cNvSpPr/>
-      </dsp:nvSpPr>
-      <dsp:spPr>
-        <a:xfrm>
-          <a:off x="3386445" y="562235"/>
-          <a:ext cx="1880185" cy="752074"/>
-        </a:xfrm>
-        <a:prstGeom prst="chevron">
-          <a:avLst/>
-        </a:prstGeom>
-        <a:solidFill>
-          <a:schemeClr val="tx2">
-            <a:lumMod val="75000"/>
-          </a:schemeClr>
-        </a:solidFill>
-        <a:ln w="12700" cap="flat" cmpd="sng" algn="ctr">
-          <a:solidFill>
-            <a:schemeClr val="lt1">
-              <a:hueOff val="0"/>
-              <a:satOff val="0"/>
-              <a:lumOff val="0"/>
-              <a:alphaOff val="0"/>
-            </a:schemeClr>
-          </a:solidFill>
-          <a:prstDash val="solid"/>
-          <a:miter lim="800000"/>
-        </a:ln>
-        <a:effectLst/>
-      </dsp:spPr>
-      <dsp:style>
-        <a:lnRef idx="2">
-          <a:scrgbClr r="0" g="0" b="0"/>
-        </a:lnRef>
-        <a:fillRef idx="1">
-          <a:scrgbClr r="0" g="0" b="0"/>
-        </a:fillRef>
-        <a:effectRef idx="0">
-          <a:scrgbClr r="0" g="0" b="0"/>
-        </a:effectRef>
-        <a:fontRef idx="minor">
-          <a:schemeClr val="lt1"/>
-        </a:fontRef>
-      </dsp:style>
-      <dsp:txBody>
-        <a:bodyPr spcFirstLastPara="0" vert="horz" wrap="square" lIns="56007" tIns="18669" rIns="18669" bIns="18669" numCol="1" spcCol="1270" anchor="ctr" anchorCtr="0">
-          <a:noAutofit/>
-        </a:bodyPr>
-        <a:lstStyle/>
-        <a:p>
-          <a:pPr lvl="0" algn="ctr" defTabSz="622300">
-            <a:lnSpc>
-              <a:spcPct val="90000"/>
-            </a:lnSpc>
-            <a:spcBef>
-              <a:spcPct val="0"/>
-            </a:spcBef>
-            <a:spcAft>
-              <a:spcPct val="35000"/>
-            </a:spcAft>
-          </a:pPr>
-          <a:r>
-            <a:rPr lang="en-US" sz="1400" b="1" kern="1200" dirty="0" smtClean="0"/>
-            <a:t>integration-test</a:t>
-          </a:r>
-          <a:endParaRPr lang="de-DE" sz="1400" b="1" kern="1200" dirty="0"/>
-        </a:p>
-      </dsp:txBody>
-      <dsp:txXfrm>
-        <a:off x="3762482" y="562235"/>
-        <a:ext cx="1128111" cy="752074"/>
-      </dsp:txXfrm>
-    </dsp:sp>
-    <dsp:sp modelId="{DEAC2976-8EFE-4204-9FE4-0A0AE01A3B2B}">
-      <dsp:nvSpPr>
-        <dsp:cNvPr id="0" name=""/>
-        <dsp:cNvSpPr/>
-      </dsp:nvSpPr>
-      <dsp:spPr>
-        <a:xfrm>
-          <a:off x="5078612" y="562235"/>
-          <a:ext cx="1880185" cy="752074"/>
-        </a:xfrm>
-        <a:prstGeom prst="chevron">
-          <a:avLst/>
-        </a:prstGeom>
-        <a:solidFill>
-          <a:schemeClr val="tx2">
-            <a:lumMod val="75000"/>
-          </a:schemeClr>
-        </a:solidFill>
-        <a:ln w="12700" cap="flat" cmpd="sng" algn="ctr">
-          <a:solidFill>
-            <a:schemeClr val="lt1">
-              <a:hueOff val="0"/>
-              <a:satOff val="0"/>
-              <a:lumOff val="0"/>
-              <a:alphaOff val="0"/>
-            </a:schemeClr>
-          </a:solidFill>
-          <a:prstDash val="solid"/>
-          <a:miter lim="800000"/>
-        </a:ln>
-        <a:effectLst/>
-      </dsp:spPr>
-      <dsp:style>
-        <a:lnRef idx="2">
-          <a:scrgbClr r="0" g="0" b="0"/>
-        </a:lnRef>
-        <a:fillRef idx="1">
-          <a:scrgbClr r="0" g="0" b="0"/>
-        </a:fillRef>
-        <a:effectRef idx="0">
-          <a:scrgbClr r="0" g="0" b="0"/>
-        </a:effectRef>
-        <a:fontRef idx="minor">
-          <a:schemeClr val="lt1"/>
-        </a:fontRef>
-      </dsp:style>
-      <dsp:txBody>
-        <a:bodyPr spcFirstLastPara="0" vert="horz" wrap="square" lIns="56007" tIns="18669" rIns="18669" bIns="18669" numCol="1" spcCol="1270" anchor="ctr" anchorCtr="0">
-          <a:noAutofit/>
-        </a:bodyPr>
-        <a:lstStyle/>
-        <a:p>
-          <a:pPr lvl="0" algn="ctr" defTabSz="622300">
-            <a:lnSpc>
-              <a:spcPct val="90000"/>
-            </a:lnSpc>
-            <a:spcBef>
-              <a:spcPct val="0"/>
-            </a:spcBef>
-            <a:spcAft>
-              <a:spcPct val="35000"/>
-            </a:spcAft>
-          </a:pPr>
-          <a:r>
-            <a:rPr lang="en-US" sz="1400" b="1" kern="1200" dirty="0" smtClean="0"/>
-            <a:t>post-integration-test</a:t>
-          </a:r>
-          <a:endParaRPr lang="de-DE" sz="1400" b="1" kern="1200" dirty="0"/>
-        </a:p>
-      </dsp:txBody>
-      <dsp:txXfrm>
-        <a:off x="5454649" y="562235"/>
-        <a:ext cx="1128111" cy="752074"/>
-      </dsp:txXfrm>
-    </dsp:sp>
-    <dsp:sp modelId="{99F52057-642D-4027-97D5-D26EF2913281}">
-      <dsp:nvSpPr>
-        <dsp:cNvPr id="0" name=""/>
-        <dsp:cNvSpPr/>
-      </dsp:nvSpPr>
-      <dsp:spPr>
-        <a:xfrm>
-          <a:off x="6770779" y="562235"/>
-          <a:ext cx="1880185" cy="752074"/>
-        </a:xfrm>
-        <a:prstGeom prst="chevron">
-          <a:avLst/>
-        </a:prstGeom>
-        <a:solidFill>
-          <a:schemeClr val="tx2">
-            <a:lumMod val="75000"/>
-          </a:schemeClr>
-        </a:solidFill>
-        <a:ln w="12700" cap="flat" cmpd="sng" algn="ctr">
-          <a:solidFill>
-            <a:schemeClr val="lt1">
-              <a:hueOff val="0"/>
-              <a:satOff val="0"/>
-              <a:lumOff val="0"/>
-              <a:alphaOff val="0"/>
-            </a:schemeClr>
-          </a:solidFill>
-          <a:prstDash val="solid"/>
-          <a:miter lim="800000"/>
-        </a:ln>
-        <a:effectLst/>
-      </dsp:spPr>
-      <dsp:style>
-        <a:lnRef idx="2">
-          <a:scrgbClr r="0" g="0" b="0"/>
-        </a:lnRef>
-        <a:fillRef idx="1">
-          <a:scrgbClr r="0" g="0" b="0"/>
-        </a:fillRef>
-        <a:effectRef idx="0">
-          <a:scrgbClr r="0" g="0" b="0"/>
-        </a:effectRef>
-        <a:fontRef idx="minor">
-          <a:schemeClr val="lt1"/>
-        </a:fontRef>
-      </dsp:style>
-      <dsp:txBody>
-        <a:bodyPr spcFirstLastPara="0" vert="horz" wrap="square" lIns="56007" tIns="18669" rIns="18669" bIns="18669" numCol="1" spcCol="1270" anchor="ctr" anchorCtr="0">
-          <a:noAutofit/>
-        </a:bodyPr>
-        <a:lstStyle/>
-        <a:p>
-          <a:pPr lvl="0" algn="ctr" defTabSz="622300">
-            <a:lnSpc>
-              <a:spcPct val="90000"/>
-            </a:lnSpc>
-            <a:spcBef>
-              <a:spcPct val="0"/>
-            </a:spcBef>
-            <a:spcAft>
-              <a:spcPct val="35000"/>
-            </a:spcAft>
-          </a:pPr>
-          <a:r>
-            <a:rPr lang="en-US" sz="1400" b="1" kern="1200" dirty="0" smtClean="0"/>
-            <a:t>deploy</a:t>
-          </a:r>
-          <a:endParaRPr lang="de-DE" sz="1400" b="1" kern="1200" dirty="0"/>
-        </a:p>
-      </dsp:txBody>
-      <dsp:txXfrm>
-        <a:off x="7146816" y="562235"/>
-        <a:ext cx="1128111" cy="752074"/>
-      </dsp:txXfrm>
-    </dsp:sp>
   </dsp:spTree>
 </dsp:drawing>
 </file>
@@ -3086,7 +2712,7 @@
           <a:p>
             <a:fld id="{9AA7D095-A676-4F6B-9416-D65D798F5244}" type="datetimeFigureOut">
               <a:rPr lang="de-DE" smtClean="0"/>
-              <a:t>07.09.2015</a:t>
+              <a:t>28.09.2015</a:t>
             </a:fld>
             <a:endParaRPr lang="de-DE"/>
           </a:p>
@@ -3256,7 +2882,7 @@
           <a:p>
             <a:fld id="{9AA7D095-A676-4F6B-9416-D65D798F5244}" type="datetimeFigureOut">
               <a:rPr lang="de-DE" smtClean="0"/>
-              <a:t>07.09.2015</a:t>
+              <a:t>28.09.2015</a:t>
             </a:fld>
             <a:endParaRPr lang="de-DE"/>
           </a:p>
@@ -3436,7 +3062,7 @@
           <a:p>
             <a:fld id="{9AA7D095-A676-4F6B-9416-D65D798F5244}" type="datetimeFigureOut">
               <a:rPr lang="de-DE" smtClean="0"/>
-              <a:t>07.09.2015</a:t>
+              <a:t>28.09.2015</a:t>
             </a:fld>
             <a:endParaRPr lang="de-DE"/>
           </a:p>
@@ -3606,7 +3232,7 @@
           <a:p>
             <a:fld id="{9AA7D095-A676-4F6B-9416-D65D798F5244}" type="datetimeFigureOut">
               <a:rPr lang="de-DE" smtClean="0"/>
-              <a:t>07.09.2015</a:t>
+              <a:t>28.09.2015</a:t>
             </a:fld>
             <a:endParaRPr lang="de-DE"/>
           </a:p>
@@ -3852,7 +3478,7 @@
           <a:p>
             <a:fld id="{9AA7D095-A676-4F6B-9416-D65D798F5244}" type="datetimeFigureOut">
               <a:rPr lang="de-DE" smtClean="0"/>
-              <a:t>07.09.2015</a:t>
+              <a:t>28.09.2015</a:t>
             </a:fld>
             <a:endParaRPr lang="de-DE"/>
           </a:p>
@@ -4084,7 +3710,7 @@
           <a:p>
             <a:fld id="{9AA7D095-A676-4F6B-9416-D65D798F5244}" type="datetimeFigureOut">
               <a:rPr lang="de-DE" smtClean="0"/>
-              <a:t>07.09.2015</a:t>
+              <a:t>28.09.2015</a:t>
             </a:fld>
             <a:endParaRPr lang="de-DE"/>
           </a:p>
@@ -4451,7 +4077,7 @@
           <a:p>
             <a:fld id="{9AA7D095-A676-4F6B-9416-D65D798F5244}" type="datetimeFigureOut">
               <a:rPr lang="de-DE" smtClean="0"/>
-              <a:t>07.09.2015</a:t>
+              <a:t>28.09.2015</a:t>
             </a:fld>
             <a:endParaRPr lang="de-DE"/>
           </a:p>
@@ -4569,7 +4195,7 @@
           <a:p>
             <a:fld id="{9AA7D095-A676-4F6B-9416-D65D798F5244}" type="datetimeFigureOut">
               <a:rPr lang="de-DE" smtClean="0"/>
-              <a:t>07.09.2015</a:t>
+              <a:t>28.09.2015</a:t>
             </a:fld>
             <a:endParaRPr lang="de-DE"/>
           </a:p>
@@ -4664,7 +4290,7 @@
           <a:p>
             <a:fld id="{9AA7D095-A676-4F6B-9416-D65D798F5244}" type="datetimeFigureOut">
               <a:rPr lang="de-DE" smtClean="0"/>
-              <a:t>07.09.2015</a:t>
+              <a:t>28.09.2015</a:t>
             </a:fld>
             <a:endParaRPr lang="de-DE"/>
           </a:p>
@@ -4941,7 +4567,7 @@
           <a:p>
             <a:fld id="{9AA7D095-A676-4F6B-9416-D65D798F5244}" type="datetimeFigureOut">
               <a:rPr lang="de-DE" smtClean="0"/>
-              <a:t>07.09.2015</a:t>
+              <a:t>28.09.2015</a:t>
             </a:fld>
             <a:endParaRPr lang="de-DE"/>
           </a:p>
@@ -5198,7 +4824,7 @@
           <a:p>
             <a:fld id="{9AA7D095-A676-4F6B-9416-D65D798F5244}" type="datetimeFigureOut">
               <a:rPr lang="de-DE" smtClean="0"/>
-              <a:t>07.09.2015</a:t>
+              <a:t>28.09.2015</a:t>
             </a:fld>
             <a:endParaRPr lang="de-DE"/>
           </a:p>
@@ -5411,7 +5037,7 @@
           <a:p>
             <a:fld id="{9AA7D095-A676-4F6B-9416-D65D798F5244}" type="datetimeFigureOut">
               <a:rPr lang="de-DE" smtClean="0"/>
-              <a:t>07.09.2015</a:t>
+              <a:t>28.09.2015</a:t>
             </a:fld>
             <a:endParaRPr lang="de-DE"/>
           </a:p>
@@ -6040,6 +5666,364 @@
         </p:nvGrpSpPr>
         <p:grpSpPr>
           <a:xfrm>
+            <a:off x="12820515" y="6063545"/>
+            <a:ext cx="1765988" cy="1360685"/>
+            <a:chOff x="6081914" y="3933826"/>
+            <a:chExt cx="3411961" cy="1409700"/>
+          </a:xfrm>
+          <a:solidFill>
+            <a:schemeClr val="accent1">
+              <a:lumMod val="75000"/>
+            </a:schemeClr>
+          </a:solidFill>
+        </p:grpSpPr>
+        <p:sp>
+          <p:nvSpPr>
+            <p:cNvPr id="26" name="Rounded Rectangle 25"/>
+            <p:cNvSpPr/>
+            <p:nvPr/>
+          </p:nvSpPr>
+          <p:spPr>
+            <a:xfrm>
+              <a:off x="6448425" y="3933826"/>
+              <a:ext cx="2628900" cy="1409700"/>
+            </a:xfrm>
+            <a:prstGeom prst="ellipse">
+              <a:avLst/>
+            </a:prstGeom>
+            <a:grpFill/>
+            <a:ln w="114300">
+              <a:solidFill>
+                <a:schemeClr val="accent1">
+                  <a:lumMod val="50000"/>
+                </a:schemeClr>
+              </a:solidFill>
+            </a:ln>
+          </p:spPr>
+          <p:style>
+            <a:lnRef idx="2">
+              <a:schemeClr val="accent1">
+                <a:shade val="50000"/>
+              </a:schemeClr>
+            </a:lnRef>
+            <a:fillRef idx="1">
+              <a:schemeClr val="accent1"/>
+            </a:fillRef>
+            <a:effectRef idx="0">
+              <a:schemeClr val="accent1"/>
+            </a:effectRef>
+            <a:fontRef idx="minor">
+              <a:schemeClr val="lt1"/>
+            </a:fontRef>
+          </p:style>
+          <p:txBody>
+            <a:bodyPr rtlCol="0" anchor="ctr"/>
+            <a:lstStyle/>
+            <a:p>
+              <a:pPr algn="ctr"/>
+              <a:endParaRPr lang="de-DE"/>
+            </a:p>
+          </p:txBody>
+        </p:sp>
+        <p:sp>
+          <p:nvSpPr>
+            <p:cNvPr id="27" name="TextBox 26"/>
+            <p:cNvSpPr txBox="1"/>
+            <p:nvPr/>
+          </p:nvSpPr>
+          <p:spPr>
+            <a:xfrm>
+              <a:off x="6081914" y="4139724"/>
+              <a:ext cx="3411961" cy="1120955"/>
+            </a:xfrm>
+            <a:prstGeom prst="ellipse">
+              <a:avLst/>
+            </a:prstGeom>
+            <a:noFill/>
+            <a:ln>
+              <a:noFill/>
+            </a:ln>
+          </p:spPr>
+          <p:txBody>
+            <a:bodyPr wrap="square" rtlCol="0">
+              <a:spAutoFit/>
+            </a:bodyPr>
+            <a:lstStyle/>
+            <a:p>
+              <a:pPr algn="ctr"/>
+              <a:r>
+                <a:rPr lang="en-US" sz="2200" b="1" dirty="0">
+                  <a:solidFill>
+                    <a:schemeClr val="bg1"/>
+                  </a:solidFill>
+                </a:rPr>
+                <a:t>Bootable App</a:t>
+              </a:r>
+              <a:endParaRPr lang="de-DE" sz="2200" b="1" dirty="0">
+                <a:solidFill>
+                  <a:schemeClr val="bg1"/>
+                </a:solidFill>
+              </a:endParaRPr>
+            </a:p>
+          </p:txBody>
+        </p:sp>
+      </p:grpSp>
+      <p:grpSp>
+        <p:nvGrpSpPr>
+          <p:cNvPr id="18" name="Group 17"/>
+          <p:cNvGrpSpPr/>
+          <p:nvPr/>
+        </p:nvGrpSpPr>
+        <p:grpSpPr>
+          <a:xfrm>
+            <a:off x="2604452" y="1633030"/>
+            <a:ext cx="5896303" cy="5791199"/>
+            <a:chOff x="6448425" y="3933826"/>
+            <a:chExt cx="2628900" cy="1409700"/>
+          </a:xfrm>
+        </p:grpSpPr>
+        <p:sp>
+          <p:nvSpPr>
+            <p:cNvPr id="19" name="Rounded Rectangle 18"/>
+            <p:cNvSpPr/>
+            <p:nvPr/>
+          </p:nvSpPr>
+          <p:spPr>
+            <a:xfrm>
+              <a:off x="6448425" y="3933826"/>
+              <a:ext cx="2628900" cy="1409700"/>
+            </a:xfrm>
+            <a:prstGeom prst="roundRect">
+              <a:avLst/>
+            </a:prstGeom>
+            <a:solidFill>
+              <a:schemeClr val="accent1">
+                <a:lumMod val="50000"/>
+              </a:schemeClr>
+            </a:solidFill>
+            <a:ln w="114300">
+              <a:solidFill>
+                <a:schemeClr val="accent5">
+                  <a:lumMod val="50000"/>
+                </a:schemeClr>
+              </a:solidFill>
+            </a:ln>
+          </p:spPr>
+          <p:style>
+            <a:lnRef idx="2">
+              <a:schemeClr val="accent1">
+                <a:shade val="50000"/>
+              </a:schemeClr>
+            </a:lnRef>
+            <a:fillRef idx="1">
+              <a:schemeClr val="accent1"/>
+            </a:fillRef>
+            <a:effectRef idx="0">
+              <a:schemeClr val="accent1"/>
+            </a:effectRef>
+            <a:fontRef idx="minor">
+              <a:schemeClr val="lt1"/>
+            </a:fontRef>
+          </p:style>
+          <p:txBody>
+            <a:bodyPr rtlCol="0" anchor="ctr"/>
+            <a:lstStyle/>
+            <a:p>
+              <a:pPr algn="ctr"/>
+              <a:endParaRPr lang="de-DE"/>
+            </a:p>
+          </p:txBody>
+        </p:sp>
+        <p:sp>
+          <p:nvSpPr>
+            <p:cNvPr id="20" name="TextBox 19"/>
+            <p:cNvSpPr txBox="1"/>
+            <p:nvPr/>
+          </p:nvSpPr>
+          <p:spPr>
+            <a:xfrm>
+              <a:off x="6496810" y="4534818"/>
+              <a:ext cx="2524067" cy="202282"/>
+            </a:xfrm>
+            <a:prstGeom prst="rect">
+              <a:avLst/>
+            </a:prstGeom>
+            <a:noFill/>
+          </p:spPr>
+          <p:txBody>
+            <a:bodyPr wrap="square" rtlCol="0">
+              <a:spAutoFit/>
+            </a:bodyPr>
+            <a:lstStyle/>
+            <a:p>
+              <a:pPr algn="ctr"/>
+              <a:r>
+                <a:rPr lang="en-US" sz="4800" b="1" dirty="0">
+                  <a:solidFill>
+                    <a:schemeClr val="bg1"/>
+                  </a:solidFill>
+                </a:rPr>
+                <a:t>Machine Image</a:t>
+              </a:r>
+              <a:endParaRPr lang="de-DE" sz="4800" b="1" dirty="0">
+                <a:solidFill>
+                  <a:schemeClr val="bg1"/>
+                </a:solidFill>
+              </a:endParaRPr>
+            </a:p>
+          </p:txBody>
+        </p:sp>
+      </p:grpSp>
+      <p:sp>
+        <p:nvSpPr>
+          <p:cNvPr id="21" name="TextBox 20"/>
+          <p:cNvSpPr txBox="1"/>
+          <p:nvPr/>
+        </p:nvSpPr>
+        <p:spPr>
+          <a:xfrm>
+            <a:off x="3713814" y="7484543"/>
+            <a:ext cx="3801979" cy="1323439"/>
+          </a:xfrm>
+          <a:prstGeom prst="rect">
+            <a:avLst/>
+          </a:prstGeom>
+          <a:noFill/>
+        </p:spPr>
+        <p:txBody>
+          <a:bodyPr wrap="square" rtlCol="0">
+            <a:spAutoFit/>
+          </a:bodyPr>
+          <a:lstStyle/>
+          <a:p>
+            <a:pPr algn="ctr"/>
+            <a:r>
+              <a:rPr lang="en-US" sz="4000" b="1" dirty="0">
+                <a:solidFill>
+                  <a:schemeClr val="bg1">
+                    <a:lumMod val="50000"/>
+                  </a:schemeClr>
+                </a:solidFill>
+              </a:rPr>
+              <a:t>Legacy OS</a:t>
+            </a:r>
+          </a:p>
+          <a:p>
+            <a:pPr algn="ctr"/>
+            <a:r>
+              <a:rPr lang="en-US" sz="4000" b="1" dirty="0">
+                <a:solidFill>
+                  <a:schemeClr val="bg1">
+                    <a:lumMod val="50000"/>
+                  </a:schemeClr>
+                </a:solidFill>
+              </a:rPr>
+              <a:t>Multiple GBs</a:t>
+            </a:r>
+          </a:p>
+        </p:txBody>
+      </p:sp>
+      <p:sp>
+        <p:nvSpPr>
+          <p:cNvPr id="22" name="TextBox 21"/>
+          <p:cNvSpPr txBox="1"/>
+          <p:nvPr/>
+        </p:nvSpPr>
+        <p:spPr>
+          <a:xfrm>
+            <a:off x="10648718" y="7543486"/>
+            <a:ext cx="6136103" cy="1323439"/>
+          </a:xfrm>
+          <a:prstGeom prst="rect">
+            <a:avLst/>
+          </a:prstGeom>
+          <a:noFill/>
+        </p:spPr>
+        <p:txBody>
+          <a:bodyPr wrap="square" rtlCol="0">
+            <a:spAutoFit/>
+          </a:bodyPr>
+          <a:lstStyle/>
+          <a:p>
+            <a:pPr algn="ctr"/>
+            <a:r>
+              <a:rPr lang="en-US" sz="4000" b="1" dirty="0">
+                <a:solidFill>
+                  <a:schemeClr val="bg1">
+                    <a:lumMod val="50000"/>
+                  </a:schemeClr>
+                </a:solidFill>
+              </a:rPr>
+              <a:t>Boxfuse Secure Micro OS</a:t>
+            </a:r>
+          </a:p>
+          <a:p>
+            <a:pPr algn="ctr"/>
+            <a:r>
+              <a:rPr lang="en-US" sz="4000" b="1" dirty="0">
+                <a:solidFill>
+                  <a:schemeClr val="bg1">
+                    <a:lumMod val="50000"/>
+                  </a:schemeClr>
+                </a:solidFill>
+              </a:rPr>
+              <a:t>Few MBs</a:t>
+            </a:r>
+            <a:endParaRPr lang="de-DE" sz="4000" b="1" dirty="0">
+              <a:solidFill>
+                <a:schemeClr val="bg1">
+                  <a:lumMod val="50000"/>
+                </a:schemeClr>
+              </a:solidFill>
+            </a:endParaRPr>
+          </a:p>
+        </p:txBody>
+      </p:sp>
+    </p:spTree>
+    <p:extLst>
+      <p:ext uri="{BB962C8B-B14F-4D97-AF65-F5344CB8AC3E}">
+        <p14:creationId xmlns:p14="http://schemas.microsoft.com/office/powerpoint/2010/main" val="4154683558"/>
+      </p:ext>
+    </p:extLst>
+  </p:cSld>
+  <p:clrMapOvr>
+    <a:masterClrMapping/>
+  </p:clrMapOvr>
+  <p:timing>
+    <p:tnLst>
+      <p:par>
+        <p:cTn id="1" dur="indefinite" restart="never" nodeType="tmRoot"/>
+      </p:par>
+    </p:tnLst>
+  </p:timing>
+</p:sld>
+</file>
+
+<file path=ppt/slides/slide11.xml><?xml version="1.0" encoding="utf-8"?>
+<p:sld xmlns:a="http://schemas.openxmlformats.org/drawingml/2006/main" xmlns:r="http://schemas.openxmlformats.org/officeDocument/2006/relationships" xmlns:p="http://schemas.openxmlformats.org/presentationml/2006/main">
+  <p:cSld>
+    <p:spTree>
+      <p:nvGrpSpPr>
+        <p:cNvPr id="1" name=""/>
+        <p:cNvGrpSpPr/>
+        <p:nvPr/>
+      </p:nvGrpSpPr>
+      <p:grpSpPr>
+        <a:xfrm>
+          <a:off x="0" y="0"/>
+          <a:ext cx="0" cy="0"/>
+          <a:chOff x="0" y="0"/>
+          <a:chExt cx="0" cy="0"/>
+        </a:xfrm>
+      </p:grpSpPr>
+      <p:grpSp>
+        <p:nvGrpSpPr>
+          <p:cNvPr id="25" name="Group 24"/>
+          <p:cNvGrpSpPr/>
+          <p:nvPr/>
+        </p:nvGrpSpPr>
+        <p:grpSpPr>
+          <a:xfrm>
             <a:off x="5320858" y="4055179"/>
             <a:ext cx="2839659" cy="2839659"/>
             <a:chOff x="6448425" y="3933826"/>
@@ -6381,7 +6365,7 @@
 </p:sld>
 </file>
 
-<file path=ppt/slides/slide11.xml><?xml version="1.0" encoding="utf-8"?>
+<file path=ppt/slides/slide12.xml><?xml version="1.0" encoding="utf-8"?>
 <p:sld xmlns:a="http://schemas.openxmlformats.org/drawingml/2006/main" xmlns:r="http://schemas.openxmlformats.org/officeDocument/2006/relationships" xmlns:p="http://schemas.openxmlformats.org/presentationml/2006/main">
   <p:cSld>
     <p:spTree>
@@ -10814,7 +10798,7 @@
 </p:sld>
 </file>
 
-<file path=ppt/slides/slide12.xml><?xml version="1.0" encoding="utf-8"?>
+<file path=ppt/slides/slide13.xml><?xml version="1.0" encoding="utf-8"?>
 <p:sld xmlns:a="http://schemas.openxmlformats.org/drawingml/2006/main" xmlns:r="http://schemas.openxmlformats.org/officeDocument/2006/relationships" xmlns:p="http://schemas.openxmlformats.org/presentationml/2006/main">
   <p:cSld>
     <p:spTree>
@@ -11950,7 +11934,7 @@
 </p:sld>
 </file>
 
-<file path=ppt/slides/slide13.xml><?xml version="1.0" encoding="utf-8"?>
+<file path=ppt/slides/slide14.xml><?xml version="1.0" encoding="utf-8"?>
 <p:sld xmlns:a="http://schemas.openxmlformats.org/drawingml/2006/main" xmlns:r="http://schemas.openxmlformats.org/officeDocument/2006/relationships" xmlns:p="http://schemas.openxmlformats.org/presentationml/2006/main">
   <p:cSld>
     <p:spTree>
@@ -12837,7 +12821,7 @@
 </p:sld>
 </file>
 
-<file path=ppt/slides/slide14.xml><?xml version="1.0" encoding="utf-8"?>
+<file path=ppt/slides/slide15.xml><?xml version="1.0" encoding="utf-8"?>
 <p:sld xmlns:a="http://schemas.openxmlformats.org/drawingml/2006/main" xmlns:r="http://schemas.openxmlformats.org/officeDocument/2006/relationships" xmlns:p="http://schemas.openxmlformats.org/presentationml/2006/main">
   <p:cSld>
     <p:spTree>
@@ -14223,7 +14207,7 @@
 </p:sld>
 </file>
 
-<file path=ppt/slides/slide15.xml><?xml version="1.0" encoding="utf-8"?>
+<file path=ppt/slides/slide16.xml><?xml version="1.0" encoding="utf-8"?>
 <p:sld xmlns:a="http://schemas.openxmlformats.org/drawingml/2006/main" xmlns:r="http://schemas.openxmlformats.org/officeDocument/2006/relationships" xmlns:p="http://schemas.openxmlformats.org/presentationml/2006/main">
   <p:cSld>
     <p:spTree>
@@ -15863,7 +15847,7 @@
 </p:sld>
 </file>
 
-<file path=ppt/slides/slide16.xml><?xml version="1.0" encoding="utf-8"?>
+<file path=ppt/slides/slide17.xml><?xml version="1.0" encoding="utf-8"?>
 <p:sld xmlns:a="http://schemas.openxmlformats.org/drawingml/2006/main" xmlns:r="http://schemas.openxmlformats.org/officeDocument/2006/relationships" xmlns:p="http://schemas.openxmlformats.org/presentationml/2006/main">
   <p:cSld>
     <p:spTree>
@@ -17273,7 +17257,7 @@
 </p:sld>
 </file>
 
-<file path=ppt/slides/slide17.xml><?xml version="1.0" encoding="utf-8"?>
+<file path=ppt/slides/slide18.xml><?xml version="1.0" encoding="utf-8"?>
 <p:sld xmlns:a="http://schemas.openxmlformats.org/drawingml/2006/main" xmlns:r="http://schemas.openxmlformats.org/officeDocument/2006/relationships" xmlns:p="http://schemas.openxmlformats.org/presentationml/2006/main">
   <p:cSld>
     <p:spTree>
@@ -18120,7 +18104,7 @@
 </p:sld>
 </file>
 
-<file path=ppt/slides/slide18.xml><?xml version="1.0" encoding="utf-8"?>
+<file path=ppt/slides/slide19.xml><?xml version="1.0" encoding="utf-8"?>
 <p:sld xmlns:a="http://schemas.openxmlformats.org/drawingml/2006/main" xmlns:r="http://schemas.openxmlformats.org/officeDocument/2006/relationships" xmlns:p="http://schemas.openxmlformats.org/presentationml/2006/main">
   <p:cSld>
     <p:spTree>
@@ -19050,501 +19034,6 @@
     <p:extLst>
       <p:ext uri="{BB962C8B-B14F-4D97-AF65-F5344CB8AC3E}">
         <p14:creationId xmlns:p14="http://schemas.microsoft.com/office/powerpoint/2010/main" val="4213274243"/>
-      </p:ext>
-    </p:extLst>
-  </p:cSld>
-  <p:clrMapOvr>
-    <a:masterClrMapping/>
-  </p:clrMapOvr>
-  <p:timing>
-    <p:tnLst>
-      <p:par>
-        <p:cTn id="1" dur="indefinite" restart="never" nodeType="tmRoot"/>
-      </p:par>
-    </p:tnLst>
-  </p:timing>
-</p:sld>
-</file>
-
-<file path=ppt/slides/slide19.xml><?xml version="1.0" encoding="utf-8"?>
-<p:sld xmlns:a="http://schemas.openxmlformats.org/drawingml/2006/main" xmlns:r="http://schemas.openxmlformats.org/officeDocument/2006/relationships" xmlns:p="http://schemas.openxmlformats.org/presentationml/2006/main">
-  <p:cSld>
-    <p:spTree>
-      <p:nvGrpSpPr>
-        <p:cNvPr id="1" name=""/>
-        <p:cNvGrpSpPr/>
-        <p:nvPr/>
-      </p:nvGrpSpPr>
-      <p:grpSpPr>
-        <a:xfrm>
-          <a:off x="0" y="0"/>
-          <a:ext cx="0" cy="0"/>
-          <a:chOff x="0" y="0"/>
-          <a:chExt cx="0" cy="0"/>
-        </a:xfrm>
-      </p:grpSpPr>
-      <p:pic>
-        <p:nvPicPr>
-          <p:cNvPr id="7" name="Picture 6"/>
-          <p:cNvPicPr>
-            <a:picLocks noChangeAspect="1"/>
-          </p:cNvPicPr>
-          <p:nvPr/>
-        </p:nvPicPr>
-        <p:blipFill>
-          <a:blip r:embed="rId2">
-            <a:extLst>
-              <a:ext uri="{28A0092B-C50C-407E-A947-70E740481C1C}">
-                <a14:useLocalDpi xmlns:a14="http://schemas.microsoft.com/office/drawing/2010/main" val="0"/>
-              </a:ext>
-            </a:extLst>
-          </a:blip>
-          <a:stretch>
-            <a:fillRect/>
-          </a:stretch>
-        </p:blipFill>
-        <p:spPr>
-          <a:xfrm>
-            <a:off x="3085029" y="7159253"/>
-            <a:ext cx="695422" cy="1143160"/>
-          </a:xfrm>
-          <a:prstGeom prst="rect">
-            <a:avLst/>
-          </a:prstGeom>
-        </p:spPr>
-      </p:pic>
-      <p:pic>
-        <p:nvPicPr>
-          <p:cNvPr id="9" name="Picture 8"/>
-          <p:cNvPicPr>
-            <a:picLocks noChangeAspect="1"/>
-          </p:cNvPicPr>
-          <p:nvPr/>
-        </p:nvPicPr>
-        <p:blipFill>
-          <a:blip r:embed="rId3">
-            <a:extLst>
-              <a:ext uri="{28A0092B-C50C-407E-A947-70E740481C1C}">
-                <a14:useLocalDpi xmlns:a14="http://schemas.microsoft.com/office/drawing/2010/main" val="0"/>
-              </a:ext>
-            </a:extLst>
-          </a:blip>
-          <a:stretch>
-            <a:fillRect/>
-          </a:stretch>
-        </p:blipFill>
-        <p:spPr>
-          <a:xfrm>
-            <a:off x="14844101" y="5727491"/>
-            <a:ext cx="1538745" cy="615498"/>
-          </a:xfrm>
-          <a:prstGeom prst="rect">
-            <a:avLst/>
-          </a:prstGeom>
-        </p:spPr>
-      </p:pic>
-      <p:pic>
-        <p:nvPicPr>
-          <p:cNvPr id="10" name="Picture 9"/>
-          <p:cNvPicPr>
-            <a:picLocks noChangeAspect="1"/>
-          </p:cNvPicPr>
-          <p:nvPr/>
-        </p:nvPicPr>
-        <p:blipFill>
-          <a:blip r:embed="rId4">
-            <a:extLst>
-              <a:ext uri="{28A0092B-C50C-407E-A947-70E740481C1C}">
-                <a14:useLocalDpi xmlns:a14="http://schemas.microsoft.com/office/drawing/2010/main" val="0"/>
-              </a:ext>
-            </a:extLst>
-          </a:blip>
-          <a:stretch>
-            <a:fillRect/>
-          </a:stretch>
-        </p:blipFill>
-        <p:spPr>
-          <a:xfrm>
-            <a:off x="7718111" y="5409102"/>
-            <a:ext cx="809738" cy="952633"/>
-          </a:xfrm>
-          <a:prstGeom prst="rect">
-            <a:avLst/>
-          </a:prstGeom>
-        </p:spPr>
-      </p:pic>
-      <p:cxnSp>
-        <p:nvCxnSpPr>
-          <p:cNvPr id="12" name="Straight Arrow Connector 11"/>
-          <p:cNvCxnSpPr/>
-          <p:nvPr/>
-        </p:nvCxnSpPr>
-        <p:spPr>
-          <a:xfrm flipH="1" flipV="1">
-            <a:off x="8133043" y="6426824"/>
-            <a:ext cx="18566" cy="874085"/>
-          </a:xfrm>
-          <a:prstGeom prst="straightConnector1">
-            <a:avLst/>
-          </a:prstGeom>
-          <a:ln w="111125">
-            <a:solidFill>
-              <a:schemeClr val="accent2">
-                <a:lumMod val="75000"/>
-              </a:schemeClr>
-            </a:solidFill>
-            <a:headEnd type="triangle"/>
-            <a:tailEnd type="triangle"/>
-          </a:ln>
-        </p:spPr>
-        <p:style>
-          <a:lnRef idx="1">
-            <a:schemeClr val="accent1"/>
-          </a:lnRef>
-          <a:fillRef idx="0">
-            <a:schemeClr val="accent1"/>
-          </a:fillRef>
-          <a:effectRef idx="0">
-            <a:schemeClr val="accent1"/>
-          </a:effectRef>
-          <a:fontRef idx="minor">
-            <a:schemeClr val="tx1"/>
-          </a:fontRef>
-        </p:style>
-      </p:cxnSp>
-      <p:sp>
-        <p:nvSpPr>
-          <p:cNvPr id="28" name="Rounded Rectangle 25"/>
-          <p:cNvSpPr/>
-          <p:nvPr/>
-        </p:nvSpPr>
-        <p:spPr>
-          <a:xfrm>
-            <a:off x="5099461" y="6290202"/>
-            <a:ext cx="963911" cy="963908"/>
-          </a:xfrm>
-          <a:prstGeom prst="ellipse">
-            <a:avLst/>
-          </a:prstGeom>
-          <a:solidFill>
-            <a:schemeClr val="accent1">
-              <a:lumMod val="75000"/>
-            </a:schemeClr>
-          </a:solidFill>
-          <a:ln w="76200">
-            <a:solidFill>
-              <a:schemeClr val="accent1">
-                <a:lumMod val="50000"/>
-              </a:schemeClr>
-            </a:solidFill>
-          </a:ln>
-        </p:spPr>
-        <p:style>
-          <a:lnRef idx="2">
-            <a:schemeClr val="accent1">
-              <a:shade val="50000"/>
-            </a:schemeClr>
-          </a:lnRef>
-          <a:fillRef idx="1">
-            <a:schemeClr val="accent1"/>
-          </a:fillRef>
-          <a:effectRef idx="0">
-            <a:schemeClr val="accent1"/>
-          </a:effectRef>
-          <a:fontRef idx="minor">
-            <a:schemeClr val="lt1"/>
-          </a:fontRef>
-        </p:style>
-        <p:txBody>
-          <a:bodyPr rtlCol="0" anchor="ctr"/>
-          <a:lstStyle/>
-          <a:p>
-            <a:pPr algn="ctr"/>
-            <a:r>
-              <a:rPr lang="en-US" sz="1400" b="1" dirty="0"/>
-              <a:t>Image</a:t>
-            </a:r>
-            <a:endParaRPr lang="de-DE" sz="1400" b="1" dirty="0"/>
-          </a:p>
-        </p:txBody>
-      </p:sp>
-      <p:cxnSp>
-        <p:nvCxnSpPr>
-          <p:cNvPr id="34" name="Straight Arrow Connector 33"/>
-          <p:cNvCxnSpPr/>
-          <p:nvPr/>
-        </p:nvCxnSpPr>
-        <p:spPr>
-          <a:xfrm rot="18847739" flipV="1">
-            <a:off x="6624044" y="6737109"/>
-            <a:ext cx="1227503" cy="10481"/>
-          </a:xfrm>
-          <a:prstGeom prst="straightConnector1">
-            <a:avLst/>
-          </a:prstGeom>
-          <a:ln w="111125">
-            <a:solidFill>
-              <a:schemeClr val="tx1">
-                <a:lumMod val="50000"/>
-                <a:lumOff val="50000"/>
-              </a:schemeClr>
-            </a:solidFill>
-            <a:tailEnd type="triangle"/>
-          </a:ln>
-        </p:spPr>
-        <p:style>
-          <a:lnRef idx="1">
-            <a:schemeClr val="accent1"/>
-          </a:lnRef>
-          <a:fillRef idx="0">
-            <a:schemeClr val="accent1"/>
-          </a:fillRef>
-          <a:effectRef idx="0">
-            <a:schemeClr val="accent1"/>
-          </a:effectRef>
-          <a:fontRef idx="minor">
-            <a:schemeClr val="tx1"/>
-          </a:fontRef>
-        </p:style>
-      </p:cxnSp>
-      <p:cxnSp>
-        <p:nvCxnSpPr>
-          <p:cNvPr id="37" name="Straight Arrow Connector 36"/>
-          <p:cNvCxnSpPr/>
-          <p:nvPr/>
-        </p:nvCxnSpPr>
-        <p:spPr>
-          <a:xfrm rot="2883253" flipV="1">
-            <a:off x="8475772" y="6783214"/>
-            <a:ext cx="1278131" cy="10481"/>
-          </a:xfrm>
-          <a:prstGeom prst="straightConnector1">
-            <a:avLst/>
-          </a:prstGeom>
-          <a:ln w="111125">
-            <a:solidFill>
-              <a:schemeClr val="tx1">
-                <a:lumMod val="50000"/>
-                <a:lumOff val="50000"/>
-              </a:schemeClr>
-            </a:solidFill>
-            <a:tailEnd type="triangle"/>
-          </a:ln>
-        </p:spPr>
-        <p:style>
-          <a:lnRef idx="1">
-            <a:schemeClr val="accent1"/>
-          </a:lnRef>
-          <a:fillRef idx="0">
-            <a:schemeClr val="accent1"/>
-          </a:fillRef>
-          <a:effectRef idx="0">
-            <a:schemeClr val="accent1"/>
-          </a:effectRef>
-          <a:fontRef idx="minor">
-            <a:schemeClr val="tx1"/>
-          </a:fontRef>
-        </p:style>
-      </p:cxnSp>
-      <p:pic>
-        <p:nvPicPr>
-          <p:cNvPr id="24" name="Picture 23"/>
-          <p:cNvPicPr>
-            <a:picLocks noChangeAspect="1"/>
-          </p:cNvPicPr>
-          <p:nvPr/>
-        </p:nvPicPr>
-        <p:blipFill>
-          <a:blip r:embed="rId5"/>
-          <a:stretch>
-            <a:fillRect/>
-          </a:stretch>
-        </p:blipFill>
-        <p:spPr>
-          <a:xfrm>
-            <a:off x="11690040" y="4981083"/>
-            <a:ext cx="2626907" cy="2426685"/>
-          </a:xfrm>
-          <a:prstGeom prst="rect">
-            <a:avLst/>
-          </a:prstGeom>
-        </p:spPr>
-      </p:pic>
-      <p:cxnSp>
-        <p:nvCxnSpPr>
-          <p:cNvPr id="46" name="Straight Arrow Connector 45"/>
-          <p:cNvCxnSpPr/>
-          <p:nvPr/>
-        </p:nvCxnSpPr>
-        <p:spPr>
-          <a:xfrm flipV="1">
-            <a:off x="13809573" y="6050632"/>
-            <a:ext cx="946691" cy="10481"/>
-          </a:xfrm>
-          <a:prstGeom prst="straightConnector1">
-            <a:avLst/>
-          </a:prstGeom>
-          <a:ln w="111125">
-            <a:solidFill>
-              <a:schemeClr val="tx1">
-                <a:lumMod val="50000"/>
-                <a:lumOff val="50000"/>
-              </a:schemeClr>
-            </a:solidFill>
-            <a:tailEnd type="triangle"/>
-          </a:ln>
-        </p:spPr>
-        <p:style>
-          <a:lnRef idx="1">
-            <a:schemeClr val="accent1"/>
-          </a:lnRef>
-          <a:fillRef idx="0">
-            <a:schemeClr val="accent1"/>
-          </a:fillRef>
-          <a:effectRef idx="0">
-            <a:schemeClr val="accent1"/>
-          </a:effectRef>
-          <a:fontRef idx="minor">
-            <a:schemeClr val="tx1"/>
-          </a:fontRef>
-        </p:style>
-      </p:cxnSp>
-      <p:graphicFrame>
-        <p:nvGraphicFramePr>
-          <p:cNvPr id="21" name="Diagram 20"/>
-          <p:cNvGraphicFramePr/>
-          <p:nvPr>
-            <p:extLst>
-              <p:ext uri="{D42A27DB-BD31-4B8C-83A1-F6EECF244321}">
-                <p14:modId xmlns:p14="http://schemas.microsoft.com/office/powerpoint/2010/main" val="2839590977"/>
-              </p:ext>
-            </p:extLst>
-          </p:nvPr>
-        </p:nvGraphicFramePr>
-        <p:xfrm>
-          <a:off x="3946935" y="6816061"/>
-          <a:ext cx="8653077" cy="1876545"/>
-        </p:xfrm>
-        <a:graphic>
-          <a:graphicData uri="http://schemas.openxmlformats.org/drawingml/2006/diagram">
-            <dgm:relIds xmlns:dgm="http://schemas.openxmlformats.org/drawingml/2006/diagram" xmlns:r="http://schemas.openxmlformats.org/officeDocument/2006/relationships" r:dm="rId6" r:lo="rId7" r:qs="rId8" r:cs="rId9"/>
-          </a:graphicData>
-        </a:graphic>
-      </p:graphicFrame>
-      <p:cxnSp>
-        <p:nvCxnSpPr>
-          <p:cNvPr id="40" name="Straight Arrow Connector 39"/>
-          <p:cNvCxnSpPr/>
-          <p:nvPr/>
-        </p:nvCxnSpPr>
-        <p:spPr>
-          <a:xfrm rot="18847739" flipV="1">
-            <a:off x="11218698" y="6765942"/>
-            <a:ext cx="1227503" cy="10481"/>
-          </a:xfrm>
-          <a:prstGeom prst="straightConnector1">
-            <a:avLst/>
-          </a:prstGeom>
-          <a:ln w="111125">
-            <a:solidFill>
-              <a:schemeClr val="tx1">
-                <a:lumMod val="50000"/>
-                <a:lumOff val="50000"/>
-              </a:schemeClr>
-            </a:solidFill>
-            <a:tailEnd type="triangle"/>
-          </a:ln>
-        </p:spPr>
-        <p:style>
-          <a:lnRef idx="1">
-            <a:schemeClr val="accent1"/>
-          </a:lnRef>
-          <a:fillRef idx="0">
-            <a:schemeClr val="accent1"/>
-          </a:fillRef>
-          <a:effectRef idx="0">
-            <a:schemeClr val="accent1"/>
-          </a:effectRef>
-          <a:fontRef idx="minor">
-            <a:schemeClr val="tx1"/>
-          </a:fontRef>
-        </p:style>
-      </p:cxnSp>
-      <p:pic>
-        <p:nvPicPr>
-          <p:cNvPr id="51" name="Picture 2" descr="Logo"/>
-          <p:cNvPicPr>
-            <a:picLocks noChangeAspect="1" noChangeArrowheads="1"/>
-          </p:cNvPicPr>
-          <p:nvPr/>
-        </p:nvPicPr>
-        <p:blipFill>
-          <a:blip r:embed="rId11">
-            <a:extLst>
-              <a:ext uri="{28A0092B-C50C-407E-A947-70E740481C1C}">
-                <a14:useLocalDpi xmlns:a14="http://schemas.microsoft.com/office/drawing/2010/main" val="0"/>
-              </a:ext>
-            </a:extLst>
-          </a:blip>
-          <a:srcRect/>
-          <a:stretch>
-            <a:fillRect/>
-          </a:stretch>
-        </p:blipFill>
-        <p:spPr bwMode="auto">
-          <a:xfrm>
-            <a:off x="6589564" y="8468421"/>
-            <a:ext cx="1648513" cy="374662"/>
-          </a:xfrm>
-          <a:prstGeom prst="rect">
-            <a:avLst/>
-          </a:prstGeom>
-          <a:noFill/>
-          <a:extLst>
-            <a:ext uri="{909E8E84-426E-40DD-AFC4-6F175D3DCCD1}">
-              <a14:hiddenFill xmlns:a14="http://schemas.microsoft.com/office/drawing/2010/main">
-                <a:solidFill>
-                  <a:srgbClr val="FFFFFF"/>
-                </a:solidFill>
-              </a14:hiddenFill>
-            </a:ext>
-          </a:extLst>
-        </p:spPr>
-      </p:pic>
-      <p:pic>
-        <p:nvPicPr>
-          <p:cNvPr id="30" name="Picture 29"/>
-          <p:cNvPicPr>
-            <a:picLocks noChangeAspect="1"/>
-          </p:cNvPicPr>
-          <p:nvPr/>
-        </p:nvPicPr>
-        <p:blipFill>
-          <a:blip r:embed="rId12" cstate="print">
-            <a:extLst>
-              <a:ext uri="{28A0092B-C50C-407E-A947-70E740481C1C}">
-                <a14:useLocalDpi xmlns:a14="http://schemas.microsoft.com/office/drawing/2010/main" val="0"/>
-              </a:ext>
-            </a:extLst>
-          </a:blip>
-          <a:stretch>
-            <a:fillRect/>
-          </a:stretch>
-        </p:blipFill>
-        <p:spPr>
-          <a:xfrm>
-            <a:off x="8343106" y="8407782"/>
-            <a:ext cx="1482810" cy="458528"/>
-          </a:xfrm>
-          <a:prstGeom prst="rect">
-            <a:avLst/>
-          </a:prstGeom>
-        </p:spPr>
-      </p:pic>
-    </p:spTree>
-    <p:extLst>
-      <p:ext uri="{BB962C8B-B14F-4D97-AF65-F5344CB8AC3E}">
-        <p14:creationId xmlns:p14="http://schemas.microsoft.com/office/powerpoint/2010/main" val="1264328124"/>
       </p:ext>
     </p:extLst>
   </p:cSld>
@@ -20182,6 +19671,501 @@
         </p:blipFill>
         <p:spPr>
           <a:xfrm>
+            <a:off x="3085029" y="7159253"/>
+            <a:ext cx="695422" cy="1143160"/>
+          </a:xfrm>
+          <a:prstGeom prst="rect">
+            <a:avLst/>
+          </a:prstGeom>
+        </p:spPr>
+      </p:pic>
+      <p:pic>
+        <p:nvPicPr>
+          <p:cNvPr id="9" name="Picture 8"/>
+          <p:cNvPicPr>
+            <a:picLocks noChangeAspect="1"/>
+          </p:cNvPicPr>
+          <p:nvPr/>
+        </p:nvPicPr>
+        <p:blipFill>
+          <a:blip r:embed="rId3">
+            <a:extLst>
+              <a:ext uri="{28A0092B-C50C-407E-A947-70E740481C1C}">
+                <a14:useLocalDpi xmlns:a14="http://schemas.microsoft.com/office/drawing/2010/main" val="0"/>
+              </a:ext>
+            </a:extLst>
+          </a:blip>
+          <a:stretch>
+            <a:fillRect/>
+          </a:stretch>
+        </p:blipFill>
+        <p:spPr>
+          <a:xfrm>
+            <a:off x="14844101" y="5727491"/>
+            <a:ext cx="1538745" cy="615498"/>
+          </a:xfrm>
+          <a:prstGeom prst="rect">
+            <a:avLst/>
+          </a:prstGeom>
+        </p:spPr>
+      </p:pic>
+      <p:pic>
+        <p:nvPicPr>
+          <p:cNvPr id="10" name="Picture 9"/>
+          <p:cNvPicPr>
+            <a:picLocks noChangeAspect="1"/>
+          </p:cNvPicPr>
+          <p:nvPr/>
+        </p:nvPicPr>
+        <p:blipFill>
+          <a:blip r:embed="rId4">
+            <a:extLst>
+              <a:ext uri="{28A0092B-C50C-407E-A947-70E740481C1C}">
+                <a14:useLocalDpi xmlns:a14="http://schemas.microsoft.com/office/drawing/2010/main" val="0"/>
+              </a:ext>
+            </a:extLst>
+          </a:blip>
+          <a:stretch>
+            <a:fillRect/>
+          </a:stretch>
+        </p:blipFill>
+        <p:spPr>
+          <a:xfrm>
+            <a:off x="7718111" y="5409102"/>
+            <a:ext cx="809738" cy="952633"/>
+          </a:xfrm>
+          <a:prstGeom prst="rect">
+            <a:avLst/>
+          </a:prstGeom>
+        </p:spPr>
+      </p:pic>
+      <p:cxnSp>
+        <p:nvCxnSpPr>
+          <p:cNvPr id="12" name="Straight Arrow Connector 11"/>
+          <p:cNvCxnSpPr/>
+          <p:nvPr/>
+        </p:nvCxnSpPr>
+        <p:spPr>
+          <a:xfrm flipH="1" flipV="1">
+            <a:off x="8133043" y="6426824"/>
+            <a:ext cx="18566" cy="874085"/>
+          </a:xfrm>
+          <a:prstGeom prst="straightConnector1">
+            <a:avLst/>
+          </a:prstGeom>
+          <a:ln w="111125">
+            <a:solidFill>
+              <a:schemeClr val="accent2">
+                <a:lumMod val="75000"/>
+              </a:schemeClr>
+            </a:solidFill>
+            <a:headEnd type="triangle"/>
+            <a:tailEnd type="triangle"/>
+          </a:ln>
+        </p:spPr>
+        <p:style>
+          <a:lnRef idx="1">
+            <a:schemeClr val="accent1"/>
+          </a:lnRef>
+          <a:fillRef idx="0">
+            <a:schemeClr val="accent1"/>
+          </a:fillRef>
+          <a:effectRef idx="0">
+            <a:schemeClr val="accent1"/>
+          </a:effectRef>
+          <a:fontRef idx="minor">
+            <a:schemeClr val="tx1"/>
+          </a:fontRef>
+        </p:style>
+      </p:cxnSp>
+      <p:sp>
+        <p:nvSpPr>
+          <p:cNvPr id="28" name="Rounded Rectangle 25"/>
+          <p:cNvSpPr/>
+          <p:nvPr/>
+        </p:nvSpPr>
+        <p:spPr>
+          <a:xfrm>
+            <a:off x="5099461" y="6290202"/>
+            <a:ext cx="963911" cy="963908"/>
+          </a:xfrm>
+          <a:prstGeom prst="ellipse">
+            <a:avLst/>
+          </a:prstGeom>
+          <a:solidFill>
+            <a:schemeClr val="accent1">
+              <a:lumMod val="75000"/>
+            </a:schemeClr>
+          </a:solidFill>
+          <a:ln w="76200">
+            <a:solidFill>
+              <a:schemeClr val="accent1">
+                <a:lumMod val="50000"/>
+              </a:schemeClr>
+            </a:solidFill>
+          </a:ln>
+        </p:spPr>
+        <p:style>
+          <a:lnRef idx="2">
+            <a:schemeClr val="accent1">
+              <a:shade val="50000"/>
+            </a:schemeClr>
+          </a:lnRef>
+          <a:fillRef idx="1">
+            <a:schemeClr val="accent1"/>
+          </a:fillRef>
+          <a:effectRef idx="0">
+            <a:schemeClr val="accent1"/>
+          </a:effectRef>
+          <a:fontRef idx="minor">
+            <a:schemeClr val="lt1"/>
+          </a:fontRef>
+        </p:style>
+        <p:txBody>
+          <a:bodyPr rtlCol="0" anchor="ctr"/>
+          <a:lstStyle/>
+          <a:p>
+            <a:pPr algn="ctr"/>
+            <a:r>
+              <a:rPr lang="en-US" sz="1400" b="1" dirty="0"/>
+              <a:t>Image</a:t>
+            </a:r>
+            <a:endParaRPr lang="de-DE" sz="1400" b="1" dirty="0"/>
+          </a:p>
+        </p:txBody>
+      </p:sp>
+      <p:cxnSp>
+        <p:nvCxnSpPr>
+          <p:cNvPr id="34" name="Straight Arrow Connector 33"/>
+          <p:cNvCxnSpPr/>
+          <p:nvPr/>
+        </p:nvCxnSpPr>
+        <p:spPr>
+          <a:xfrm rot="18847739" flipV="1">
+            <a:off x="6624044" y="6737109"/>
+            <a:ext cx="1227503" cy="10481"/>
+          </a:xfrm>
+          <a:prstGeom prst="straightConnector1">
+            <a:avLst/>
+          </a:prstGeom>
+          <a:ln w="111125">
+            <a:solidFill>
+              <a:schemeClr val="tx1">
+                <a:lumMod val="50000"/>
+                <a:lumOff val="50000"/>
+              </a:schemeClr>
+            </a:solidFill>
+            <a:tailEnd type="triangle"/>
+          </a:ln>
+        </p:spPr>
+        <p:style>
+          <a:lnRef idx="1">
+            <a:schemeClr val="accent1"/>
+          </a:lnRef>
+          <a:fillRef idx="0">
+            <a:schemeClr val="accent1"/>
+          </a:fillRef>
+          <a:effectRef idx="0">
+            <a:schemeClr val="accent1"/>
+          </a:effectRef>
+          <a:fontRef idx="minor">
+            <a:schemeClr val="tx1"/>
+          </a:fontRef>
+        </p:style>
+      </p:cxnSp>
+      <p:cxnSp>
+        <p:nvCxnSpPr>
+          <p:cNvPr id="37" name="Straight Arrow Connector 36"/>
+          <p:cNvCxnSpPr/>
+          <p:nvPr/>
+        </p:nvCxnSpPr>
+        <p:spPr>
+          <a:xfrm rot="2883253" flipV="1">
+            <a:off x="8475772" y="6783214"/>
+            <a:ext cx="1278131" cy="10481"/>
+          </a:xfrm>
+          <a:prstGeom prst="straightConnector1">
+            <a:avLst/>
+          </a:prstGeom>
+          <a:ln w="111125">
+            <a:solidFill>
+              <a:schemeClr val="tx1">
+                <a:lumMod val="50000"/>
+                <a:lumOff val="50000"/>
+              </a:schemeClr>
+            </a:solidFill>
+            <a:tailEnd type="triangle"/>
+          </a:ln>
+        </p:spPr>
+        <p:style>
+          <a:lnRef idx="1">
+            <a:schemeClr val="accent1"/>
+          </a:lnRef>
+          <a:fillRef idx="0">
+            <a:schemeClr val="accent1"/>
+          </a:fillRef>
+          <a:effectRef idx="0">
+            <a:schemeClr val="accent1"/>
+          </a:effectRef>
+          <a:fontRef idx="minor">
+            <a:schemeClr val="tx1"/>
+          </a:fontRef>
+        </p:style>
+      </p:cxnSp>
+      <p:pic>
+        <p:nvPicPr>
+          <p:cNvPr id="24" name="Picture 23"/>
+          <p:cNvPicPr>
+            <a:picLocks noChangeAspect="1"/>
+          </p:cNvPicPr>
+          <p:nvPr/>
+        </p:nvPicPr>
+        <p:blipFill>
+          <a:blip r:embed="rId5"/>
+          <a:stretch>
+            <a:fillRect/>
+          </a:stretch>
+        </p:blipFill>
+        <p:spPr>
+          <a:xfrm>
+            <a:off x="11690040" y="4981083"/>
+            <a:ext cx="2626907" cy="2426685"/>
+          </a:xfrm>
+          <a:prstGeom prst="rect">
+            <a:avLst/>
+          </a:prstGeom>
+        </p:spPr>
+      </p:pic>
+      <p:cxnSp>
+        <p:nvCxnSpPr>
+          <p:cNvPr id="46" name="Straight Arrow Connector 45"/>
+          <p:cNvCxnSpPr/>
+          <p:nvPr/>
+        </p:nvCxnSpPr>
+        <p:spPr>
+          <a:xfrm flipV="1">
+            <a:off x="13809573" y="6050632"/>
+            <a:ext cx="946691" cy="10481"/>
+          </a:xfrm>
+          <a:prstGeom prst="straightConnector1">
+            <a:avLst/>
+          </a:prstGeom>
+          <a:ln w="111125">
+            <a:solidFill>
+              <a:schemeClr val="tx1">
+                <a:lumMod val="50000"/>
+                <a:lumOff val="50000"/>
+              </a:schemeClr>
+            </a:solidFill>
+            <a:tailEnd type="triangle"/>
+          </a:ln>
+        </p:spPr>
+        <p:style>
+          <a:lnRef idx="1">
+            <a:schemeClr val="accent1"/>
+          </a:lnRef>
+          <a:fillRef idx="0">
+            <a:schemeClr val="accent1"/>
+          </a:fillRef>
+          <a:effectRef idx="0">
+            <a:schemeClr val="accent1"/>
+          </a:effectRef>
+          <a:fontRef idx="minor">
+            <a:schemeClr val="tx1"/>
+          </a:fontRef>
+        </p:style>
+      </p:cxnSp>
+      <p:graphicFrame>
+        <p:nvGraphicFramePr>
+          <p:cNvPr id="21" name="Diagram 20"/>
+          <p:cNvGraphicFramePr/>
+          <p:nvPr>
+            <p:extLst>
+              <p:ext uri="{D42A27DB-BD31-4B8C-83A1-F6EECF244321}">
+                <p14:modId xmlns:p14="http://schemas.microsoft.com/office/powerpoint/2010/main" val="2839590977"/>
+              </p:ext>
+            </p:extLst>
+          </p:nvPr>
+        </p:nvGraphicFramePr>
+        <p:xfrm>
+          <a:off x="3946935" y="6816061"/>
+          <a:ext cx="8653077" cy="1876545"/>
+        </p:xfrm>
+        <a:graphic>
+          <a:graphicData uri="http://schemas.openxmlformats.org/drawingml/2006/diagram">
+            <dgm:relIds xmlns:dgm="http://schemas.openxmlformats.org/drawingml/2006/diagram" xmlns:r="http://schemas.openxmlformats.org/officeDocument/2006/relationships" r:dm="rId6" r:lo="rId7" r:qs="rId8" r:cs="rId9"/>
+          </a:graphicData>
+        </a:graphic>
+      </p:graphicFrame>
+      <p:cxnSp>
+        <p:nvCxnSpPr>
+          <p:cNvPr id="40" name="Straight Arrow Connector 39"/>
+          <p:cNvCxnSpPr/>
+          <p:nvPr/>
+        </p:nvCxnSpPr>
+        <p:spPr>
+          <a:xfrm rot="18847739" flipV="1">
+            <a:off x="11218698" y="6765942"/>
+            <a:ext cx="1227503" cy="10481"/>
+          </a:xfrm>
+          <a:prstGeom prst="straightConnector1">
+            <a:avLst/>
+          </a:prstGeom>
+          <a:ln w="111125">
+            <a:solidFill>
+              <a:schemeClr val="tx1">
+                <a:lumMod val="50000"/>
+                <a:lumOff val="50000"/>
+              </a:schemeClr>
+            </a:solidFill>
+            <a:tailEnd type="triangle"/>
+          </a:ln>
+        </p:spPr>
+        <p:style>
+          <a:lnRef idx="1">
+            <a:schemeClr val="accent1"/>
+          </a:lnRef>
+          <a:fillRef idx="0">
+            <a:schemeClr val="accent1"/>
+          </a:fillRef>
+          <a:effectRef idx="0">
+            <a:schemeClr val="accent1"/>
+          </a:effectRef>
+          <a:fontRef idx="minor">
+            <a:schemeClr val="tx1"/>
+          </a:fontRef>
+        </p:style>
+      </p:cxnSp>
+      <p:pic>
+        <p:nvPicPr>
+          <p:cNvPr id="51" name="Picture 2" descr="Logo"/>
+          <p:cNvPicPr>
+            <a:picLocks noChangeAspect="1" noChangeArrowheads="1"/>
+          </p:cNvPicPr>
+          <p:nvPr/>
+        </p:nvPicPr>
+        <p:blipFill>
+          <a:blip r:embed="rId11">
+            <a:extLst>
+              <a:ext uri="{28A0092B-C50C-407E-A947-70E740481C1C}">
+                <a14:useLocalDpi xmlns:a14="http://schemas.microsoft.com/office/drawing/2010/main" val="0"/>
+              </a:ext>
+            </a:extLst>
+          </a:blip>
+          <a:srcRect/>
+          <a:stretch>
+            <a:fillRect/>
+          </a:stretch>
+        </p:blipFill>
+        <p:spPr bwMode="auto">
+          <a:xfrm>
+            <a:off x="6589564" y="8468421"/>
+            <a:ext cx="1648513" cy="374662"/>
+          </a:xfrm>
+          <a:prstGeom prst="rect">
+            <a:avLst/>
+          </a:prstGeom>
+          <a:noFill/>
+          <a:extLst>
+            <a:ext uri="{909E8E84-426E-40DD-AFC4-6F175D3DCCD1}">
+              <a14:hiddenFill xmlns:a14="http://schemas.microsoft.com/office/drawing/2010/main">
+                <a:solidFill>
+                  <a:srgbClr val="FFFFFF"/>
+                </a:solidFill>
+              </a14:hiddenFill>
+            </a:ext>
+          </a:extLst>
+        </p:spPr>
+      </p:pic>
+      <p:pic>
+        <p:nvPicPr>
+          <p:cNvPr id="30" name="Picture 29"/>
+          <p:cNvPicPr>
+            <a:picLocks noChangeAspect="1"/>
+          </p:cNvPicPr>
+          <p:nvPr/>
+        </p:nvPicPr>
+        <p:blipFill>
+          <a:blip r:embed="rId12" cstate="print">
+            <a:extLst>
+              <a:ext uri="{28A0092B-C50C-407E-A947-70E740481C1C}">
+                <a14:useLocalDpi xmlns:a14="http://schemas.microsoft.com/office/drawing/2010/main" val="0"/>
+              </a:ext>
+            </a:extLst>
+          </a:blip>
+          <a:stretch>
+            <a:fillRect/>
+          </a:stretch>
+        </p:blipFill>
+        <p:spPr>
+          <a:xfrm>
+            <a:off x="8343106" y="8407782"/>
+            <a:ext cx="1482810" cy="458528"/>
+          </a:xfrm>
+          <a:prstGeom prst="rect">
+            <a:avLst/>
+          </a:prstGeom>
+        </p:spPr>
+      </p:pic>
+    </p:spTree>
+    <p:extLst>
+      <p:ext uri="{BB962C8B-B14F-4D97-AF65-F5344CB8AC3E}">
+        <p14:creationId xmlns:p14="http://schemas.microsoft.com/office/powerpoint/2010/main" val="1264328124"/>
+      </p:ext>
+    </p:extLst>
+  </p:cSld>
+  <p:clrMapOvr>
+    <a:masterClrMapping/>
+  </p:clrMapOvr>
+  <p:timing>
+    <p:tnLst>
+      <p:par>
+        <p:cTn id="1" dur="indefinite" restart="never" nodeType="tmRoot"/>
+      </p:par>
+    </p:tnLst>
+  </p:timing>
+</p:sld>
+</file>
+
+<file path=ppt/slides/slide21.xml><?xml version="1.0" encoding="utf-8"?>
+<p:sld xmlns:a="http://schemas.openxmlformats.org/drawingml/2006/main" xmlns:r="http://schemas.openxmlformats.org/officeDocument/2006/relationships" xmlns:p="http://schemas.openxmlformats.org/presentationml/2006/main">
+  <p:cSld>
+    <p:spTree>
+      <p:nvGrpSpPr>
+        <p:cNvPr id="1" name=""/>
+        <p:cNvGrpSpPr/>
+        <p:nvPr/>
+      </p:nvGrpSpPr>
+      <p:grpSpPr>
+        <a:xfrm>
+          <a:off x="0" y="0"/>
+          <a:ext cx="0" cy="0"/>
+          <a:chOff x="0" y="0"/>
+          <a:chExt cx="0" cy="0"/>
+        </a:xfrm>
+      </p:grpSpPr>
+      <p:pic>
+        <p:nvPicPr>
+          <p:cNvPr id="7" name="Picture 6"/>
+          <p:cNvPicPr>
+            <a:picLocks noChangeAspect="1"/>
+          </p:cNvPicPr>
+          <p:nvPr/>
+        </p:nvPicPr>
+        <p:blipFill>
+          <a:blip r:embed="rId2">
+            <a:extLst>
+              <a:ext uri="{28A0092B-C50C-407E-A947-70E740481C1C}">
+                <a14:useLocalDpi xmlns:a14="http://schemas.microsoft.com/office/drawing/2010/main" val="0"/>
+              </a:ext>
+            </a:extLst>
+          </a:blip>
+          <a:stretch>
+            <a:fillRect/>
+          </a:stretch>
+        </p:blipFill>
+        <p:spPr>
+          <a:xfrm>
             <a:off x="10091308" y="2136231"/>
             <a:ext cx="695422" cy="1143160"/>
           </a:xfrm>
@@ -20774,6 +20758,177 @@
           </a:fontRef>
         </p:style>
       </p:cxnSp>
+      <p:pic>
+        <p:nvPicPr>
+          <p:cNvPr id="24" name="Picture 23"/>
+          <p:cNvPicPr>
+            <a:picLocks noChangeAspect="1"/>
+          </p:cNvPicPr>
+          <p:nvPr/>
+        </p:nvPicPr>
+        <p:blipFill>
+          <a:blip r:embed="rId3">
+            <a:extLst>
+              <a:ext uri="{28A0092B-C50C-407E-A947-70E740481C1C}">
+                <a14:useLocalDpi xmlns:a14="http://schemas.microsoft.com/office/drawing/2010/main" val="0"/>
+              </a:ext>
+            </a:extLst>
+          </a:blip>
+          <a:stretch>
+            <a:fillRect/>
+          </a:stretch>
+        </p:blipFill>
+        <p:spPr>
+          <a:xfrm>
+            <a:off x="3371719" y="8870541"/>
+            <a:ext cx="1538745" cy="615498"/>
+          </a:xfrm>
+          <a:prstGeom prst="rect">
+            <a:avLst/>
+          </a:prstGeom>
+        </p:spPr>
+      </p:pic>
+      <p:grpSp>
+        <p:nvGrpSpPr>
+          <p:cNvPr id="25" name="Group 24"/>
+          <p:cNvGrpSpPr/>
+          <p:nvPr/>
+        </p:nvGrpSpPr>
+        <p:grpSpPr>
+          <a:xfrm>
+            <a:off x="2107008" y="8487749"/>
+            <a:ext cx="1151769" cy="673166"/>
+            <a:chOff x="2334271" y="318043"/>
+            <a:chExt cx="1457473" cy="673166"/>
+          </a:xfrm>
+        </p:grpSpPr>
+        <p:cxnSp>
+          <p:nvCxnSpPr>
+            <p:cNvPr id="26" name="Straight Arrow Connector 25"/>
+            <p:cNvCxnSpPr/>
+            <p:nvPr/>
+          </p:nvCxnSpPr>
+          <p:spPr>
+            <a:xfrm flipV="1">
+              <a:off x="2346123" y="980728"/>
+              <a:ext cx="1445621" cy="10481"/>
+            </a:xfrm>
+            <a:prstGeom prst="straightConnector1">
+              <a:avLst/>
+            </a:prstGeom>
+            <a:ln w="142875">
+              <a:solidFill>
+                <a:schemeClr val="tx1">
+                  <a:lumMod val="50000"/>
+                  <a:lumOff val="50000"/>
+                </a:schemeClr>
+              </a:solidFill>
+              <a:tailEnd type="triangle"/>
+            </a:ln>
+          </p:spPr>
+          <p:style>
+            <a:lnRef idx="1">
+              <a:schemeClr val="accent1"/>
+            </a:lnRef>
+            <a:fillRef idx="0">
+              <a:schemeClr val="accent1"/>
+            </a:fillRef>
+            <a:effectRef idx="0">
+              <a:schemeClr val="accent1"/>
+            </a:effectRef>
+            <a:fontRef idx="minor">
+              <a:schemeClr val="tx1"/>
+            </a:fontRef>
+          </p:style>
+        </p:cxnSp>
+        <p:sp>
+          <p:nvSpPr>
+            <p:cNvPr id="27" name="TextBox 26"/>
+            <p:cNvSpPr txBox="1"/>
+            <p:nvPr/>
+          </p:nvSpPr>
+          <p:spPr>
+            <a:xfrm>
+              <a:off x="2334271" y="318043"/>
+              <a:ext cx="1408522" cy="523220"/>
+            </a:xfrm>
+            <a:prstGeom prst="rect">
+              <a:avLst/>
+            </a:prstGeom>
+            <a:noFill/>
+          </p:spPr>
+          <p:txBody>
+            <a:bodyPr wrap="square" rtlCol="0">
+              <a:spAutoFit/>
+            </a:bodyPr>
+            <a:lstStyle/>
+            <a:p>
+              <a:pPr algn="ctr"/>
+              <a:endParaRPr lang="de-DE" sz="2800" b="1" dirty="0"/>
+            </a:p>
+          </p:txBody>
+        </p:sp>
+      </p:grpSp>
+      <p:pic>
+        <p:nvPicPr>
+          <p:cNvPr id="28" name="Picture 27"/>
+          <p:cNvPicPr>
+            <a:picLocks noChangeAspect="1"/>
+          </p:cNvPicPr>
+          <p:nvPr/>
+        </p:nvPicPr>
+        <p:blipFill>
+          <a:blip r:embed="rId5" cstate="print">
+            <a:extLst>
+              <a:ext uri="{28A0092B-C50C-407E-A947-70E740481C1C}">
+                <a14:useLocalDpi xmlns:a14="http://schemas.microsoft.com/office/drawing/2010/main" val="0"/>
+              </a:ext>
+            </a:extLst>
+          </a:blip>
+          <a:stretch>
+            <a:fillRect/>
+          </a:stretch>
+        </p:blipFill>
+        <p:spPr>
+          <a:xfrm>
+            <a:off x="2108730" y="8643554"/>
+            <a:ext cx="1116380" cy="345217"/>
+          </a:xfrm>
+          <a:prstGeom prst="rect">
+            <a:avLst/>
+          </a:prstGeom>
+        </p:spPr>
+      </p:pic>
+      <p:pic>
+        <p:nvPicPr>
+          <p:cNvPr id="3" name="Picture 2"/>
+          <p:cNvPicPr>
+            <a:picLocks noChangeAspect="1"/>
+          </p:cNvPicPr>
+          <p:nvPr/>
+        </p:nvPicPr>
+        <p:blipFill>
+          <a:blip r:embed="rId8">
+            <a:extLst>
+              <a:ext uri="{28A0092B-C50C-407E-A947-70E740481C1C}">
+                <a14:useLocalDpi xmlns:a14="http://schemas.microsoft.com/office/drawing/2010/main" val="0"/>
+              </a:ext>
+            </a:extLst>
+          </a:blip>
+          <a:stretch>
+            <a:fillRect/>
+          </a:stretch>
+        </p:blipFill>
+        <p:spPr>
+          <a:xfrm>
+            <a:off x="774221" y="8809892"/>
+            <a:ext cx="1234388" cy="877527"/>
+          </a:xfrm>
+          <a:prstGeom prst="rect">
+            <a:avLst/>
+          </a:prstGeom>
+        </p:spPr>
+      </p:pic>
     </p:spTree>
     <p:extLst>
       <p:ext uri="{BB962C8B-B14F-4D97-AF65-F5344CB8AC3E}">
@@ -20794,7 +20949,7 @@
 </p:sld>
 </file>
 
-<file path=ppt/slides/slide21.xml><?xml version="1.0" encoding="utf-8"?>
+<file path=ppt/slides/slide22.xml><?xml version="1.0" encoding="utf-8"?>
 <p:sld xmlns:a="http://schemas.openxmlformats.org/drawingml/2006/main" xmlns:r="http://schemas.openxmlformats.org/officeDocument/2006/relationships" xmlns:p="http://schemas.openxmlformats.org/presentationml/2006/main">
   <p:cSld>
     <p:spTree>
@@ -21261,7 +21416,7 @@
 </p:sld>
 </file>
 
-<file path=ppt/slides/slide22.xml><?xml version="1.0" encoding="utf-8"?>
+<file path=ppt/slides/slide23.xml><?xml version="1.0" encoding="utf-8"?>
 <p:sld xmlns:a="http://schemas.openxmlformats.org/drawingml/2006/main" xmlns:r="http://schemas.openxmlformats.org/officeDocument/2006/relationships" xmlns:p="http://schemas.openxmlformats.org/presentationml/2006/main">
   <p:cSld>
     <p:spTree>
@@ -22018,7 +22173,7 @@
 </p:sld>
 </file>
 
-<file path=ppt/slides/slide23.xml><?xml version="1.0" encoding="utf-8"?>
+<file path=ppt/slides/slide24.xml><?xml version="1.0" encoding="utf-8"?>
 <p:sld xmlns:a="http://schemas.openxmlformats.org/drawingml/2006/main" xmlns:r="http://schemas.openxmlformats.org/officeDocument/2006/relationships" xmlns:p="http://schemas.openxmlformats.org/presentationml/2006/main">
   <p:cSld>
     <p:spTree>
@@ -24247,7 +24402,7 @@
 </p:sld>
 </file>
 
-<file path=ppt/slides/slide24.xml><?xml version="1.0" encoding="utf-8"?>
+<file path=ppt/slides/slide25.xml><?xml version="1.0" encoding="utf-8"?>
 <p:sld xmlns:a="http://schemas.openxmlformats.org/drawingml/2006/main" xmlns:r="http://schemas.openxmlformats.org/officeDocument/2006/relationships" xmlns:p="http://schemas.openxmlformats.org/presentationml/2006/main">
   <p:cSld>
     <p:spTree>
@@ -26497,7 +26652,7 @@
 </p:sld>
 </file>
 
-<file path=ppt/slides/slide25.xml><?xml version="1.0" encoding="utf-8"?>
+<file path=ppt/slides/slide26.xml><?xml version="1.0" encoding="utf-8"?>
 <p:sld xmlns:a="http://schemas.openxmlformats.org/drawingml/2006/main" xmlns:r="http://schemas.openxmlformats.org/officeDocument/2006/relationships" xmlns:p="http://schemas.openxmlformats.org/presentationml/2006/main">
   <p:cSld>
     <p:spTree>
@@ -29230,7 +29385,7 @@
 </p:sld>
 </file>
 
-<file path=ppt/slides/slide26.xml><?xml version="1.0" encoding="utf-8"?>
+<file path=ppt/slides/slide27.xml><?xml version="1.0" encoding="utf-8"?>
 <p:sld xmlns:a="http://schemas.openxmlformats.org/drawingml/2006/main" xmlns:r="http://schemas.openxmlformats.org/officeDocument/2006/relationships" xmlns:p="http://schemas.openxmlformats.org/presentationml/2006/main">
   <p:cSld>
     <p:spTree>
@@ -29354,7 +29509,7 @@
 </p:sld>
 </file>
 
-<file path=ppt/slides/slide27.xml><?xml version="1.0" encoding="utf-8"?>
+<file path=ppt/slides/slide28.xml><?xml version="1.0" encoding="utf-8"?>
 <p:sld xmlns:a="http://schemas.openxmlformats.org/drawingml/2006/main" xmlns:r="http://schemas.openxmlformats.org/officeDocument/2006/relationships" xmlns:p="http://schemas.openxmlformats.org/presentationml/2006/main">
   <p:cSld>
     <p:spTree>
@@ -37090,6 +37245,1740 @@
       </p:grpSpPr>
       <p:grpSp>
         <p:nvGrpSpPr>
+          <p:cNvPr id="27" name="Group 26"/>
+          <p:cNvGrpSpPr/>
+          <p:nvPr/>
+        </p:nvGrpSpPr>
+        <p:grpSpPr>
+          <a:xfrm>
+            <a:off x="2490712" y="1832327"/>
+            <a:ext cx="3790954" cy="7019356"/>
+            <a:chOff x="57150" y="-755957"/>
+            <a:chExt cx="3790954" cy="7019356"/>
+          </a:xfrm>
+        </p:grpSpPr>
+        <p:grpSp>
+          <p:nvGrpSpPr>
+            <p:cNvPr id="6" name="Group 5"/>
+            <p:cNvGrpSpPr/>
+            <p:nvPr/>
+          </p:nvGrpSpPr>
+          <p:grpSpPr>
+            <a:xfrm>
+              <a:off x="114300" y="95250"/>
+              <a:ext cx="3676650" cy="6168149"/>
+              <a:chOff x="733425" y="285750"/>
+              <a:chExt cx="3676650" cy="6168149"/>
+            </a:xfrm>
+          </p:grpSpPr>
+          <p:sp>
+            <p:nvSpPr>
+              <p:cNvPr id="5" name="Rounded Rectangle 4"/>
+              <p:cNvSpPr/>
+              <p:nvPr/>
+            </p:nvSpPr>
+            <p:spPr>
+              <a:xfrm>
+                <a:off x="733425" y="285750"/>
+                <a:ext cx="3676650" cy="1838327"/>
+              </a:xfrm>
+              <a:prstGeom prst="roundRect">
+                <a:avLst>
+                  <a:gd name="adj" fmla="val 9672"/>
+                </a:avLst>
+              </a:prstGeom>
+              <a:solidFill>
+                <a:schemeClr val="bg2">
+                  <a:lumMod val="90000"/>
+                </a:schemeClr>
+              </a:solidFill>
+              <a:ln w="114300">
+                <a:solidFill>
+                  <a:schemeClr val="tx1">
+                    <a:lumMod val="50000"/>
+                    <a:lumOff val="50000"/>
+                  </a:schemeClr>
+                </a:solidFill>
+              </a:ln>
+            </p:spPr>
+            <p:style>
+              <a:lnRef idx="2">
+                <a:schemeClr val="accent1">
+                  <a:shade val="50000"/>
+                </a:schemeClr>
+              </a:lnRef>
+              <a:fillRef idx="1">
+                <a:schemeClr val="accent1"/>
+              </a:fillRef>
+              <a:effectRef idx="0">
+                <a:schemeClr val="accent1"/>
+              </a:effectRef>
+              <a:fontRef idx="minor">
+                <a:schemeClr val="lt1"/>
+              </a:fontRef>
+            </p:style>
+            <p:txBody>
+              <a:bodyPr rtlCol="0" anchor="ctr"/>
+              <a:lstStyle/>
+              <a:p>
+                <a:pPr algn="ctr"/>
+                <a:endParaRPr lang="de-DE"/>
+              </a:p>
+            </p:txBody>
+          </p:sp>
+          <p:grpSp>
+            <p:nvGrpSpPr>
+              <p:cNvPr id="4" name="Group 3"/>
+              <p:cNvGrpSpPr/>
+              <p:nvPr/>
+            </p:nvGrpSpPr>
+            <p:grpSpPr>
+              <a:xfrm>
+                <a:off x="1019175" y="504826"/>
+                <a:ext cx="3105150" cy="5949073"/>
+                <a:chOff x="1019175" y="504826"/>
+                <a:chExt cx="3105150" cy="5949073"/>
+              </a:xfrm>
+            </p:grpSpPr>
+            <p:grpSp>
+              <p:nvGrpSpPr>
+                <p:cNvPr id="15" name="Group 14"/>
+                <p:cNvGrpSpPr/>
+                <p:nvPr/>
+              </p:nvGrpSpPr>
+              <p:grpSpPr>
+                <a:xfrm>
+                  <a:off x="1019175" y="504826"/>
+                  <a:ext cx="3105150" cy="1409700"/>
+                  <a:chOff x="6448425" y="3933826"/>
+                  <a:chExt cx="2628900" cy="1409700"/>
+                </a:xfrm>
+              </p:grpSpPr>
+              <p:sp>
+                <p:nvSpPr>
+                  <p:cNvPr id="14" name="Rounded Rectangle 13"/>
+                  <p:cNvSpPr/>
+                  <p:nvPr/>
+                </p:nvSpPr>
+                <p:spPr>
+                  <a:xfrm>
+                    <a:off x="6448425" y="3933826"/>
+                    <a:ext cx="2628900" cy="1409700"/>
+                  </a:xfrm>
+                  <a:prstGeom prst="rect">
+                    <a:avLst/>
+                  </a:prstGeom>
+                  <a:solidFill>
+                    <a:schemeClr val="accent6">
+                      <a:lumMod val="75000"/>
+                    </a:schemeClr>
+                  </a:solidFill>
+                  <a:ln w="114300">
+                    <a:solidFill>
+                      <a:schemeClr val="accent6">
+                        <a:lumMod val="50000"/>
+                      </a:schemeClr>
+                    </a:solidFill>
+                  </a:ln>
+                </p:spPr>
+                <p:style>
+                  <a:lnRef idx="2">
+                    <a:schemeClr val="accent1">
+                      <a:shade val="50000"/>
+                    </a:schemeClr>
+                  </a:lnRef>
+                  <a:fillRef idx="1">
+                    <a:schemeClr val="accent1"/>
+                  </a:fillRef>
+                  <a:effectRef idx="0">
+                    <a:schemeClr val="accent1"/>
+                  </a:effectRef>
+                  <a:fontRef idx="minor">
+                    <a:schemeClr val="lt1"/>
+                  </a:fontRef>
+                </p:style>
+                <p:txBody>
+                  <a:bodyPr rtlCol="0" anchor="ctr"/>
+                  <a:lstStyle/>
+                  <a:p>
+                    <a:pPr algn="ctr"/>
+                    <a:endParaRPr lang="de-DE"/>
+                  </a:p>
+                </p:txBody>
+              </p:sp>
+              <p:sp>
+                <p:nvSpPr>
+                  <p:cNvPr id="13" name="TextBox 12"/>
+                  <p:cNvSpPr txBox="1"/>
+                  <p:nvPr/>
+                </p:nvSpPr>
+                <p:spPr>
+                  <a:xfrm>
+                    <a:off x="7077075" y="4286250"/>
+                    <a:ext cx="1333500" cy="646331"/>
+                  </a:xfrm>
+                  <a:prstGeom prst="rect">
+                    <a:avLst/>
+                  </a:prstGeom>
+                  <a:noFill/>
+                </p:spPr>
+                <p:txBody>
+                  <a:bodyPr wrap="square" rtlCol="0">
+                    <a:spAutoFit/>
+                  </a:bodyPr>
+                  <a:lstStyle/>
+                  <a:p>
+                    <a:pPr algn="ctr"/>
+                    <a:r>
+                      <a:rPr lang="en-US" sz="3600" b="1" dirty="0">
+                        <a:solidFill>
+                          <a:schemeClr val="bg1"/>
+                        </a:solidFill>
+                      </a:rPr>
+                      <a:t>App</a:t>
+                    </a:r>
+                    <a:endParaRPr lang="de-DE" sz="3600" b="1" dirty="0">
+                      <a:solidFill>
+                        <a:schemeClr val="bg1"/>
+                      </a:solidFill>
+                    </a:endParaRPr>
+                  </a:p>
+                </p:txBody>
+              </p:sp>
+            </p:grpSp>
+            <p:grpSp>
+              <p:nvGrpSpPr>
+                <p:cNvPr id="7" name="Group 6"/>
+                <p:cNvGrpSpPr/>
+                <p:nvPr/>
+              </p:nvGrpSpPr>
+              <p:grpSpPr>
+                <a:xfrm>
+                  <a:off x="1019175" y="2386725"/>
+                  <a:ext cx="3105150" cy="885824"/>
+                  <a:chOff x="6448425" y="4351806"/>
+                  <a:chExt cx="2628900" cy="1409700"/>
+                </a:xfrm>
+              </p:grpSpPr>
+              <p:sp>
+                <p:nvSpPr>
+                  <p:cNvPr id="9" name="Rectangle 8"/>
+                  <p:cNvSpPr/>
+                  <p:nvPr/>
+                </p:nvSpPr>
+                <p:spPr>
+                  <a:xfrm>
+                    <a:off x="6448425" y="4351806"/>
+                    <a:ext cx="2628900" cy="1409700"/>
+                  </a:xfrm>
+                  <a:prstGeom prst="rect">
+                    <a:avLst/>
+                  </a:prstGeom>
+                  <a:solidFill>
+                    <a:schemeClr val="bg2">
+                      <a:lumMod val="50000"/>
+                    </a:schemeClr>
+                  </a:solidFill>
+                  <a:ln w="114300">
+                    <a:solidFill>
+                      <a:schemeClr val="bg2">
+                        <a:lumMod val="25000"/>
+                      </a:schemeClr>
+                    </a:solidFill>
+                  </a:ln>
+                </p:spPr>
+                <p:style>
+                  <a:lnRef idx="2">
+                    <a:schemeClr val="accent1">
+                      <a:shade val="50000"/>
+                    </a:schemeClr>
+                  </a:lnRef>
+                  <a:fillRef idx="1">
+                    <a:schemeClr val="accent1"/>
+                  </a:fillRef>
+                  <a:effectRef idx="0">
+                    <a:schemeClr val="accent1"/>
+                  </a:effectRef>
+                  <a:fontRef idx="minor">
+                    <a:schemeClr val="lt1"/>
+                  </a:fontRef>
+                </p:style>
+                <p:txBody>
+                  <a:bodyPr rtlCol="0" anchor="ctr"/>
+                  <a:lstStyle/>
+                  <a:p>
+                    <a:pPr algn="ctr"/>
+                    <a:endParaRPr lang="de-DE"/>
+                  </a:p>
+                </p:txBody>
+              </p:sp>
+              <p:sp>
+                <p:nvSpPr>
+                  <p:cNvPr id="11" name="TextBox 10"/>
+                  <p:cNvSpPr txBox="1"/>
+                  <p:nvPr/>
+                </p:nvSpPr>
+                <p:spPr>
+                  <a:xfrm>
+                    <a:off x="6496809" y="4537491"/>
+                    <a:ext cx="2524067" cy="1028571"/>
+                  </a:xfrm>
+                  <a:prstGeom prst="rect">
+                    <a:avLst/>
+                  </a:prstGeom>
+                  <a:noFill/>
+                </p:spPr>
+                <p:txBody>
+                  <a:bodyPr wrap="square" rtlCol="0">
+                    <a:spAutoFit/>
+                  </a:bodyPr>
+                  <a:lstStyle/>
+                  <a:p>
+                    <a:pPr algn="ctr"/>
+                    <a:r>
+                      <a:rPr lang="en-US" sz="3600" b="1" dirty="0" err="1" smtClean="0">
+                        <a:solidFill>
+                          <a:schemeClr val="bg2">
+                            <a:lumMod val="75000"/>
+                          </a:schemeClr>
+                        </a:solidFill>
+                      </a:rPr>
+                      <a:t>TomEE</a:t>
+                    </a:r>
+                    <a:endParaRPr lang="de-DE" sz="3600" b="1" dirty="0">
+                      <a:solidFill>
+                        <a:schemeClr val="bg2">
+                          <a:lumMod val="75000"/>
+                        </a:schemeClr>
+                      </a:solidFill>
+                    </a:endParaRPr>
+                  </a:p>
+                </p:txBody>
+              </p:sp>
+            </p:grpSp>
+            <p:grpSp>
+              <p:nvGrpSpPr>
+                <p:cNvPr id="12" name="Group 11"/>
+                <p:cNvGrpSpPr/>
+                <p:nvPr/>
+              </p:nvGrpSpPr>
+              <p:grpSpPr>
+                <a:xfrm>
+                  <a:off x="1019175" y="5568075"/>
+                  <a:ext cx="3105150" cy="885824"/>
+                  <a:chOff x="6448425" y="4351806"/>
+                  <a:chExt cx="2628900" cy="1409700"/>
+                </a:xfrm>
+              </p:grpSpPr>
+              <p:sp>
+                <p:nvSpPr>
+                  <p:cNvPr id="16" name="Rectangle 15"/>
+                  <p:cNvSpPr/>
+                  <p:nvPr/>
+                </p:nvSpPr>
+                <p:spPr>
+                  <a:xfrm>
+                    <a:off x="6448425" y="4351806"/>
+                    <a:ext cx="2628900" cy="1409700"/>
+                  </a:xfrm>
+                  <a:prstGeom prst="rect">
+                    <a:avLst/>
+                  </a:prstGeom>
+                  <a:solidFill>
+                    <a:schemeClr val="bg2">
+                      <a:lumMod val="50000"/>
+                    </a:schemeClr>
+                  </a:solidFill>
+                  <a:ln w="114300">
+                    <a:solidFill>
+                      <a:schemeClr val="bg2">
+                        <a:lumMod val="25000"/>
+                      </a:schemeClr>
+                    </a:solidFill>
+                  </a:ln>
+                </p:spPr>
+                <p:style>
+                  <a:lnRef idx="2">
+                    <a:schemeClr val="accent1">
+                      <a:shade val="50000"/>
+                    </a:schemeClr>
+                  </a:lnRef>
+                  <a:fillRef idx="1">
+                    <a:schemeClr val="accent1"/>
+                  </a:fillRef>
+                  <a:effectRef idx="0">
+                    <a:schemeClr val="accent1"/>
+                  </a:effectRef>
+                  <a:fontRef idx="minor">
+                    <a:schemeClr val="lt1"/>
+                  </a:fontRef>
+                </p:style>
+                <p:txBody>
+                  <a:bodyPr rtlCol="0" anchor="ctr"/>
+                  <a:lstStyle/>
+                  <a:p>
+                    <a:pPr algn="ctr"/>
+                    <a:endParaRPr lang="de-DE"/>
+                  </a:p>
+                </p:txBody>
+              </p:sp>
+              <p:sp>
+                <p:nvSpPr>
+                  <p:cNvPr id="17" name="TextBox 16"/>
+                  <p:cNvSpPr txBox="1"/>
+                  <p:nvPr/>
+                </p:nvSpPr>
+                <p:spPr>
+                  <a:xfrm>
+                    <a:off x="6496809" y="4537491"/>
+                    <a:ext cx="2524067" cy="1028571"/>
+                  </a:xfrm>
+                  <a:prstGeom prst="rect">
+                    <a:avLst/>
+                  </a:prstGeom>
+                  <a:noFill/>
+                </p:spPr>
+                <p:txBody>
+                  <a:bodyPr wrap="square" rtlCol="0">
+                    <a:spAutoFit/>
+                  </a:bodyPr>
+                  <a:lstStyle/>
+                  <a:p>
+                    <a:pPr algn="ctr"/>
+                    <a:r>
+                      <a:rPr lang="en-US" sz="3600" b="1" dirty="0">
+                        <a:solidFill>
+                          <a:schemeClr val="bg2">
+                            <a:lumMod val="75000"/>
+                          </a:schemeClr>
+                        </a:solidFill>
+                      </a:rPr>
+                      <a:t>OS Kernel</a:t>
+                    </a:r>
+                    <a:endParaRPr lang="de-DE" sz="3600" b="1" dirty="0">
+                      <a:solidFill>
+                        <a:schemeClr val="bg2">
+                          <a:lumMod val="75000"/>
+                        </a:schemeClr>
+                      </a:solidFill>
+                    </a:endParaRPr>
+                  </a:p>
+                </p:txBody>
+              </p:sp>
+            </p:grpSp>
+            <p:grpSp>
+              <p:nvGrpSpPr>
+                <p:cNvPr id="18" name="Group 17"/>
+                <p:cNvGrpSpPr/>
+                <p:nvPr/>
+              </p:nvGrpSpPr>
+              <p:grpSpPr>
+                <a:xfrm>
+                  <a:off x="1019175" y="4510800"/>
+                  <a:ext cx="3105150" cy="885824"/>
+                  <a:chOff x="6448425" y="4351806"/>
+                  <a:chExt cx="2628900" cy="1409700"/>
+                </a:xfrm>
+              </p:grpSpPr>
+              <p:sp>
+                <p:nvSpPr>
+                  <p:cNvPr id="19" name="Rectangle 18"/>
+                  <p:cNvSpPr/>
+                  <p:nvPr/>
+                </p:nvSpPr>
+                <p:spPr>
+                  <a:xfrm>
+                    <a:off x="6448425" y="4351806"/>
+                    <a:ext cx="2628900" cy="1409700"/>
+                  </a:xfrm>
+                  <a:prstGeom prst="rect">
+                    <a:avLst/>
+                  </a:prstGeom>
+                  <a:solidFill>
+                    <a:schemeClr val="bg2">
+                      <a:lumMod val="50000"/>
+                    </a:schemeClr>
+                  </a:solidFill>
+                  <a:ln w="114300">
+                    <a:solidFill>
+                      <a:schemeClr val="bg2">
+                        <a:lumMod val="25000"/>
+                      </a:schemeClr>
+                    </a:solidFill>
+                  </a:ln>
+                </p:spPr>
+                <p:style>
+                  <a:lnRef idx="2">
+                    <a:schemeClr val="accent1">
+                      <a:shade val="50000"/>
+                    </a:schemeClr>
+                  </a:lnRef>
+                  <a:fillRef idx="1">
+                    <a:schemeClr val="accent1"/>
+                  </a:fillRef>
+                  <a:effectRef idx="0">
+                    <a:schemeClr val="accent1"/>
+                  </a:effectRef>
+                  <a:fontRef idx="minor">
+                    <a:schemeClr val="lt1"/>
+                  </a:fontRef>
+                </p:style>
+                <p:txBody>
+                  <a:bodyPr rtlCol="0" anchor="ctr"/>
+                  <a:lstStyle/>
+                  <a:p>
+                    <a:pPr algn="ctr"/>
+                    <a:endParaRPr lang="de-DE"/>
+                  </a:p>
+                </p:txBody>
+              </p:sp>
+              <p:sp>
+                <p:nvSpPr>
+                  <p:cNvPr id="20" name="TextBox 19"/>
+                  <p:cNvSpPr txBox="1"/>
+                  <p:nvPr/>
+                </p:nvSpPr>
+                <p:spPr>
+                  <a:xfrm>
+                    <a:off x="6496809" y="4537491"/>
+                    <a:ext cx="2524067" cy="1028571"/>
+                  </a:xfrm>
+                  <a:prstGeom prst="rect">
+                    <a:avLst/>
+                  </a:prstGeom>
+                  <a:noFill/>
+                </p:spPr>
+                <p:txBody>
+                  <a:bodyPr wrap="square" rtlCol="0">
+                    <a:spAutoFit/>
+                  </a:bodyPr>
+                  <a:lstStyle/>
+                  <a:p>
+                    <a:pPr algn="ctr"/>
+                    <a:r>
+                      <a:rPr lang="en-US" sz="3600" b="1" dirty="0">
+                        <a:solidFill>
+                          <a:schemeClr val="bg2">
+                            <a:lumMod val="75000"/>
+                          </a:schemeClr>
+                        </a:solidFill>
+                      </a:rPr>
+                      <a:t>Libraries</a:t>
+                    </a:r>
+                    <a:endParaRPr lang="de-DE" sz="3600" b="1" dirty="0">
+                      <a:solidFill>
+                        <a:schemeClr val="bg2">
+                          <a:lumMod val="75000"/>
+                        </a:schemeClr>
+                      </a:solidFill>
+                    </a:endParaRPr>
+                  </a:p>
+                </p:txBody>
+              </p:sp>
+            </p:grpSp>
+            <p:grpSp>
+              <p:nvGrpSpPr>
+                <p:cNvPr id="21" name="Group 20"/>
+                <p:cNvGrpSpPr/>
+                <p:nvPr/>
+              </p:nvGrpSpPr>
+              <p:grpSpPr>
+                <a:xfrm>
+                  <a:off x="1019175" y="3444000"/>
+                  <a:ext cx="3105150" cy="885824"/>
+                  <a:chOff x="6448425" y="4351806"/>
+                  <a:chExt cx="2628900" cy="1409700"/>
+                </a:xfrm>
+              </p:grpSpPr>
+              <p:sp>
+                <p:nvSpPr>
+                  <p:cNvPr id="22" name="Rectangle 21"/>
+                  <p:cNvSpPr/>
+                  <p:nvPr/>
+                </p:nvSpPr>
+                <p:spPr>
+                  <a:xfrm>
+                    <a:off x="6448425" y="4351806"/>
+                    <a:ext cx="2628900" cy="1409700"/>
+                  </a:xfrm>
+                  <a:prstGeom prst="rect">
+                    <a:avLst/>
+                  </a:prstGeom>
+                  <a:solidFill>
+                    <a:schemeClr val="bg2">
+                      <a:lumMod val="50000"/>
+                    </a:schemeClr>
+                  </a:solidFill>
+                  <a:ln w="114300">
+                    <a:solidFill>
+                      <a:schemeClr val="bg2">
+                        <a:lumMod val="25000"/>
+                      </a:schemeClr>
+                    </a:solidFill>
+                  </a:ln>
+                </p:spPr>
+                <p:style>
+                  <a:lnRef idx="2">
+                    <a:schemeClr val="accent1">
+                      <a:shade val="50000"/>
+                    </a:schemeClr>
+                  </a:lnRef>
+                  <a:fillRef idx="1">
+                    <a:schemeClr val="accent1"/>
+                  </a:fillRef>
+                  <a:effectRef idx="0">
+                    <a:schemeClr val="accent1"/>
+                  </a:effectRef>
+                  <a:fontRef idx="minor">
+                    <a:schemeClr val="lt1"/>
+                  </a:fontRef>
+                </p:style>
+                <p:txBody>
+                  <a:bodyPr rtlCol="0" anchor="ctr"/>
+                  <a:lstStyle/>
+                  <a:p>
+                    <a:pPr algn="ctr"/>
+                    <a:endParaRPr lang="de-DE"/>
+                  </a:p>
+                </p:txBody>
+              </p:sp>
+              <p:sp>
+                <p:nvSpPr>
+                  <p:cNvPr id="23" name="TextBox 22"/>
+                  <p:cNvSpPr txBox="1"/>
+                  <p:nvPr/>
+                </p:nvSpPr>
+                <p:spPr>
+                  <a:xfrm>
+                    <a:off x="6496809" y="4537491"/>
+                    <a:ext cx="2524067" cy="1028571"/>
+                  </a:xfrm>
+                  <a:prstGeom prst="rect">
+                    <a:avLst/>
+                  </a:prstGeom>
+                  <a:noFill/>
+                </p:spPr>
+                <p:txBody>
+                  <a:bodyPr wrap="square" rtlCol="0">
+                    <a:spAutoFit/>
+                  </a:bodyPr>
+                  <a:lstStyle/>
+                  <a:p>
+                    <a:pPr algn="ctr"/>
+                    <a:r>
+                      <a:rPr lang="en-US" sz="3600" b="1" dirty="0">
+                        <a:solidFill>
+                          <a:schemeClr val="bg2">
+                            <a:lumMod val="75000"/>
+                          </a:schemeClr>
+                        </a:solidFill>
+                      </a:rPr>
+                      <a:t>JVM</a:t>
+                    </a:r>
+                    <a:endParaRPr lang="de-DE" sz="3600" b="1" dirty="0">
+                      <a:solidFill>
+                        <a:schemeClr val="bg2">
+                          <a:lumMod val="75000"/>
+                        </a:schemeClr>
+                      </a:solidFill>
+                    </a:endParaRPr>
+                  </a:p>
+                </p:txBody>
+              </p:sp>
+            </p:grpSp>
+          </p:grpSp>
+        </p:grpSp>
+        <p:sp>
+          <p:nvSpPr>
+            <p:cNvPr id="25" name="TextBox 24"/>
+            <p:cNvSpPr txBox="1"/>
+            <p:nvPr/>
+          </p:nvSpPr>
+          <p:spPr>
+            <a:xfrm>
+              <a:off x="57150" y="-755957"/>
+              <a:ext cx="3790954" cy="769441"/>
+            </a:xfrm>
+            <a:prstGeom prst="rect">
+              <a:avLst/>
+            </a:prstGeom>
+            <a:noFill/>
+          </p:spPr>
+          <p:txBody>
+            <a:bodyPr wrap="square" rtlCol="0">
+              <a:spAutoFit/>
+            </a:bodyPr>
+            <a:lstStyle/>
+            <a:p>
+              <a:pPr algn="ctr"/>
+              <a:r>
+                <a:rPr lang="en-US" sz="4400" b="1" dirty="0" err="1" smtClean="0">
+                  <a:solidFill>
+                    <a:schemeClr val="tx1">
+                      <a:lumMod val="75000"/>
+                      <a:lumOff val="25000"/>
+                    </a:schemeClr>
+                  </a:solidFill>
+                </a:rPr>
+                <a:t>TomEE</a:t>
+              </a:r>
+              <a:r>
+                <a:rPr lang="en-US" sz="4400" b="1" dirty="0" smtClean="0">
+                  <a:solidFill>
+                    <a:schemeClr val="tx1">
+                      <a:lumMod val="75000"/>
+                      <a:lumOff val="25000"/>
+                    </a:schemeClr>
+                  </a:solidFill>
+                </a:rPr>
+                <a:t> War </a:t>
+              </a:r>
+              <a:r>
+                <a:rPr lang="en-US" sz="4400" b="1" dirty="0">
+                  <a:solidFill>
+                    <a:schemeClr val="tx1">
+                      <a:lumMod val="75000"/>
+                      <a:lumOff val="25000"/>
+                    </a:schemeClr>
+                  </a:solidFill>
+                </a:rPr>
+                <a:t>File</a:t>
+              </a:r>
+              <a:endParaRPr lang="de-DE" sz="4400" b="1" dirty="0">
+                <a:solidFill>
+                  <a:schemeClr val="tx1">
+                    <a:lumMod val="75000"/>
+                    <a:lumOff val="25000"/>
+                  </a:schemeClr>
+                </a:solidFill>
+              </a:endParaRPr>
+            </a:p>
+          </p:txBody>
+        </p:sp>
+      </p:grpSp>
+      <p:cxnSp>
+        <p:nvCxnSpPr>
+          <p:cNvPr id="75" name="Straight Arrow Connector 74"/>
+          <p:cNvCxnSpPr/>
+          <p:nvPr/>
+        </p:nvCxnSpPr>
+        <p:spPr>
+          <a:xfrm>
+            <a:off x="6435969" y="3636401"/>
+            <a:ext cx="1792374" cy="0"/>
+          </a:xfrm>
+          <a:prstGeom prst="straightConnector1">
+            <a:avLst/>
+          </a:prstGeom>
+          <a:ln w="228600">
+            <a:solidFill>
+              <a:schemeClr val="bg2">
+                <a:lumMod val="75000"/>
+              </a:schemeClr>
+            </a:solidFill>
+            <a:tailEnd type="triangle"/>
+          </a:ln>
+        </p:spPr>
+        <p:style>
+          <a:lnRef idx="1">
+            <a:schemeClr val="accent1"/>
+          </a:lnRef>
+          <a:fillRef idx="0">
+            <a:schemeClr val="accent1"/>
+          </a:fillRef>
+          <a:effectRef idx="0">
+            <a:schemeClr val="accent1"/>
+          </a:effectRef>
+          <a:fontRef idx="minor">
+            <a:schemeClr val="tx1"/>
+          </a:fontRef>
+        </p:style>
+      </p:cxnSp>
+      <p:grpSp>
+        <p:nvGrpSpPr>
+          <p:cNvPr id="101" name="Group 26"/>
+          <p:cNvGrpSpPr/>
+          <p:nvPr/>
+        </p:nvGrpSpPr>
+        <p:grpSpPr>
+          <a:xfrm>
+            <a:off x="8354498" y="1823535"/>
+            <a:ext cx="3790954" cy="7019356"/>
+            <a:chOff x="57150" y="-755957"/>
+            <a:chExt cx="3790954" cy="7019356"/>
+          </a:xfrm>
+        </p:grpSpPr>
+        <p:grpSp>
+          <p:nvGrpSpPr>
+            <p:cNvPr id="102" name="Group 5"/>
+            <p:cNvGrpSpPr/>
+            <p:nvPr/>
+          </p:nvGrpSpPr>
+          <p:grpSpPr>
+            <a:xfrm>
+              <a:off x="114300" y="95249"/>
+              <a:ext cx="3676650" cy="6168150"/>
+              <a:chOff x="733425" y="285749"/>
+              <a:chExt cx="3676650" cy="6168150"/>
+            </a:xfrm>
+          </p:grpSpPr>
+          <p:sp>
+            <p:nvSpPr>
+              <p:cNvPr id="104" name="Rounded Rectangle 4"/>
+              <p:cNvSpPr/>
+              <p:nvPr/>
+            </p:nvSpPr>
+            <p:spPr>
+              <a:xfrm>
+                <a:off x="733425" y="285749"/>
+                <a:ext cx="3676650" cy="6168150"/>
+              </a:xfrm>
+              <a:prstGeom prst="roundRect">
+                <a:avLst>
+                  <a:gd name="adj" fmla="val 9672"/>
+                </a:avLst>
+              </a:prstGeom>
+              <a:solidFill>
+                <a:schemeClr val="bg2">
+                  <a:lumMod val="90000"/>
+                </a:schemeClr>
+              </a:solidFill>
+              <a:ln w="114300">
+                <a:solidFill>
+                  <a:schemeClr val="tx1">
+                    <a:lumMod val="50000"/>
+                    <a:lumOff val="50000"/>
+                  </a:schemeClr>
+                </a:solidFill>
+              </a:ln>
+            </p:spPr>
+            <p:style>
+              <a:lnRef idx="2">
+                <a:schemeClr val="accent1">
+                  <a:shade val="50000"/>
+                </a:schemeClr>
+              </a:lnRef>
+              <a:fillRef idx="1">
+                <a:schemeClr val="accent1"/>
+              </a:fillRef>
+              <a:effectRef idx="0">
+                <a:schemeClr val="accent1"/>
+              </a:effectRef>
+              <a:fontRef idx="minor">
+                <a:schemeClr val="lt1"/>
+              </a:fontRef>
+            </p:style>
+            <p:txBody>
+              <a:bodyPr rtlCol="0" anchor="ctr"/>
+              <a:lstStyle/>
+              <a:p>
+                <a:pPr algn="ctr"/>
+                <a:endParaRPr lang="de-DE"/>
+              </a:p>
+            </p:txBody>
+          </p:sp>
+          <p:grpSp>
+            <p:nvGrpSpPr>
+              <p:cNvPr id="105" name="Group 3"/>
+              <p:cNvGrpSpPr/>
+              <p:nvPr/>
+            </p:nvGrpSpPr>
+            <p:grpSpPr>
+              <a:xfrm>
+                <a:off x="1019175" y="504826"/>
+                <a:ext cx="3105150" cy="5720728"/>
+                <a:chOff x="1019175" y="504826"/>
+                <a:chExt cx="3105150" cy="5720728"/>
+              </a:xfrm>
+            </p:grpSpPr>
+            <p:grpSp>
+              <p:nvGrpSpPr>
+                <p:cNvPr id="106" name="Group 14"/>
+                <p:cNvGrpSpPr/>
+                <p:nvPr/>
+              </p:nvGrpSpPr>
+              <p:grpSpPr>
+                <a:xfrm>
+                  <a:off x="1019175" y="504826"/>
+                  <a:ext cx="3105150" cy="1409700"/>
+                  <a:chOff x="6448425" y="3933826"/>
+                  <a:chExt cx="2628900" cy="1409700"/>
+                </a:xfrm>
+              </p:grpSpPr>
+              <p:sp>
+                <p:nvSpPr>
+                  <p:cNvPr id="119" name="Rounded Rectangle 13"/>
+                  <p:cNvSpPr/>
+                  <p:nvPr/>
+                </p:nvSpPr>
+                <p:spPr>
+                  <a:xfrm>
+                    <a:off x="6448425" y="3933826"/>
+                    <a:ext cx="2628900" cy="1409700"/>
+                  </a:xfrm>
+                  <a:prstGeom prst="rect">
+                    <a:avLst/>
+                  </a:prstGeom>
+                  <a:solidFill>
+                    <a:schemeClr val="accent6">
+                      <a:lumMod val="75000"/>
+                    </a:schemeClr>
+                  </a:solidFill>
+                  <a:ln w="114300">
+                    <a:solidFill>
+                      <a:schemeClr val="accent6">
+                        <a:lumMod val="50000"/>
+                      </a:schemeClr>
+                    </a:solidFill>
+                  </a:ln>
+                </p:spPr>
+                <p:style>
+                  <a:lnRef idx="2">
+                    <a:schemeClr val="accent1">
+                      <a:shade val="50000"/>
+                    </a:schemeClr>
+                  </a:lnRef>
+                  <a:fillRef idx="1">
+                    <a:schemeClr val="accent1"/>
+                  </a:fillRef>
+                  <a:effectRef idx="0">
+                    <a:schemeClr val="accent1"/>
+                  </a:effectRef>
+                  <a:fontRef idx="minor">
+                    <a:schemeClr val="lt1"/>
+                  </a:fontRef>
+                </p:style>
+                <p:txBody>
+                  <a:bodyPr rtlCol="0" anchor="ctr"/>
+                  <a:lstStyle/>
+                  <a:p>
+                    <a:pPr algn="ctr"/>
+                    <a:endParaRPr lang="de-DE"/>
+                  </a:p>
+                </p:txBody>
+              </p:sp>
+              <p:sp>
+                <p:nvSpPr>
+                  <p:cNvPr id="120" name="TextBox 12"/>
+                  <p:cNvSpPr txBox="1"/>
+                  <p:nvPr/>
+                </p:nvSpPr>
+                <p:spPr>
+                  <a:xfrm>
+                    <a:off x="7077075" y="4286250"/>
+                    <a:ext cx="1333500" cy="646331"/>
+                  </a:xfrm>
+                  <a:prstGeom prst="rect">
+                    <a:avLst/>
+                  </a:prstGeom>
+                  <a:noFill/>
+                </p:spPr>
+                <p:txBody>
+                  <a:bodyPr wrap="square" rtlCol="0">
+                    <a:spAutoFit/>
+                  </a:bodyPr>
+                  <a:lstStyle/>
+                  <a:p>
+                    <a:pPr algn="ctr"/>
+                    <a:r>
+                      <a:rPr lang="en-US" sz="3600" b="1" dirty="0">
+                        <a:solidFill>
+                          <a:schemeClr val="bg1"/>
+                        </a:solidFill>
+                      </a:rPr>
+                      <a:t>App</a:t>
+                    </a:r>
+                    <a:endParaRPr lang="de-DE" sz="3600" b="1" dirty="0">
+                      <a:solidFill>
+                        <a:schemeClr val="bg1"/>
+                      </a:solidFill>
+                    </a:endParaRPr>
+                  </a:p>
+                </p:txBody>
+              </p:sp>
+            </p:grpSp>
+            <p:grpSp>
+              <p:nvGrpSpPr>
+                <p:cNvPr id="107" name="Group 6"/>
+                <p:cNvGrpSpPr/>
+                <p:nvPr/>
+              </p:nvGrpSpPr>
+              <p:grpSpPr>
+                <a:xfrm>
+                  <a:off x="1019175" y="2153260"/>
+                  <a:ext cx="3105150" cy="885824"/>
+                  <a:chOff x="6448425" y="3980269"/>
+                  <a:chExt cx="2628900" cy="1409700"/>
+                </a:xfrm>
+              </p:grpSpPr>
+              <p:sp>
+                <p:nvSpPr>
+                  <p:cNvPr id="117" name="Rectangle 8"/>
+                  <p:cNvSpPr/>
+                  <p:nvPr/>
+                </p:nvSpPr>
+                <p:spPr>
+                  <a:xfrm>
+                    <a:off x="6448425" y="3980269"/>
+                    <a:ext cx="2628900" cy="1409700"/>
+                  </a:xfrm>
+                  <a:prstGeom prst="rect">
+                    <a:avLst/>
+                  </a:prstGeom>
+                  <a:solidFill>
+                    <a:schemeClr val="accent4">
+                      <a:lumMod val="75000"/>
+                    </a:schemeClr>
+                  </a:solidFill>
+                  <a:ln w="114300">
+                    <a:solidFill>
+                      <a:schemeClr val="accent4">
+                        <a:lumMod val="50000"/>
+                      </a:schemeClr>
+                    </a:solidFill>
+                  </a:ln>
+                </p:spPr>
+                <p:style>
+                  <a:lnRef idx="2">
+                    <a:schemeClr val="accent1">
+                      <a:shade val="50000"/>
+                    </a:schemeClr>
+                  </a:lnRef>
+                  <a:fillRef idx="1">
+                    <a:schemeClr val="accent1"/>
+                  </a:fillRef>
+                  <a:effectRef idx="0">
+                    <a:schemeClr val="accent1"/>
+                  </a:effectRef>
+                  <a:fontRef idx="minor">
+                    <a:schemeClr val="lt1"/>
+                  </a:fontRef>
+                </p:style>
+                <p:txBody>
+                  <a:bodyPr rtlCol="0" anchor="ctr"/>
+                  <a:lstStyle/>
+                  <a:p>
+                    <a:pPr algn="ctr"/>
+                    <a:endParaRPr lang="de-DE"/>
+                  </a:p>
+                </p:txBody>
+              </p:sp>
+              <p:sp>
+                <p:nvSpPr>
+                  <p:cNvPr id="118" name="TextBox 10"/>
+                  <p:cNvSpPr txBox="1"/>
+                  <p:nvPr/>
+                </p:nvSpPr>
+                <p:spPr>
+                  <a:xfrm>
+                    <a:off x="6496809" y="4165955"/>
+                    <a:ext cx="2524067" cy="1028571"/>
+                  </a:xfrm>
+                  <a:prstGeom prst="rect">
+                    <a:avLst/>
+                  </a:prstGeom>
+                  <a:noFill/>
+                </p:spPr>
+                <p:txBody>
+                  <a:bodyPr wrap="square" rtlCol="0">
+                    <a:spAutoFit/>
+                  </a:bodyPr>
+                  <a:lstStyle/>
+                  <a:p>
+                    <a:pPr algn="ctr"/>
+                    <a:r>
+                      <a:rPr lang="en-US" sz="3600" b="1" dirty="0" err="1" smtClean="0">
+                        <a:solidFill>
+                          <a:schemeClr val="bg1"/>
+                        </a:solidFill>
+                      </a:rPr>
+                      <a:t>TomEE</a:t>
+                    </a:r>
+                    <a:endParaRPr lang="de-DE" sz="3600" b="1" dirty="0">
+                      <a:solidFill>
+                        <a:schemeClr val="bg1"/>
+                      </a:solidFill>
+                    </a:endParaRPr>
+                  </a:p>
+                </p:txBody>
+              </p:sp>
+            </p:grpSp>
+            <p:grpSp>
+              <p:nvGrpSpPr>
+                <p:cNvPr id="108" name="Group 11"/>
+                <p:cNvGrpSpPr/>
+                <p:nvPr/>
+              </p:nvGrpSpPr>
+              <p:grpSpPr>
+                <a:xfrm>
+                  <a:off x="1019175" y="5339730"/>
+                  <a:ext cx="3105150" cy="885824"/>
+                  <a:chOff x="6448425" y="3988416"/>
+                  <a:chExt cx="2628900" cy="1409700"/>
+                </a:xfrm>
+              </p:grpSpPr>
+              <p:sp>
+                <p:nvSpPr>
+                  <p:cNvPr id="115" name="Rectangle 15"/>
+                  <p:cNvSpPr/>
+                  <p:nvPr/>
+                </p:nvSpPr>
+                <p:spPr>
+                  <a:xfrm>
+                    <a:off x="6448425" y="3988416"/>
+                    <a:ext cx="2628900" cy="1409700"/>
+                  </a:xfrm>
+                  <a:prstGeom prst="rect">
+                    <a:avLst/>
+                  </a:prstGeom>
+                  <a:solidFill>
+                    <a:schemeClr val="accent1">
+                      <a:lumMod val="75000"/>
+                    </a:schemeClr>
+                  </a:solidFill>
+                  <a:ln w="114300">
+                    <a:solidFill>
+                      <a:schemeClr val="accent1">
+                        <a:lumMod val="50000"/>
+                      </a:schemeClr>
+                    </a:solidFill>
+                  </a:ln>
+                </p:spPr>
+                <p:style>
+                  <a:lnRef idx="2">
+                    <a:schemeClr val="accent1">
+                      <a:shade val="50000"/>
+                    </a:schemeClr>
+                  </a:lnRef>
+                  <a:fillRef idx="1">
+                    <a:schemeClr val="accent1"/>
+                  </a:fillRef>
+                  <a:effectRef idx="0">
+                    <a:schemeClr val="accent1"/>
+                  </a:effectRef>
+                  <a:fontRef idx="minor">
+                    <a:schemeClr val="lt1"/>
+                  </a:fontRef>
+                </p:style>
+                <p:txBody>
+                  <a:bodyPr rtlCol="0" anchor="ctr"/>
+                  <a:lstStyle/>
+                  <a:p>
+                    <a:pPr algn="ctr"/>
+                    <a:endParaRPr lang="de-DE">
+                      <a:solidFill>
+                        <a:schemeClr val="bg1"/>
+                      </a:solidFill>
+                    </a:endParaRPr>
+                  </a:p>
+                </p:txBody>
+              </p:sp>
+              <p:sp>
+                <p:nvSpPr>
+                  <p:cNvPr id="116" name="TextBox 16"/>
+                  <p:cNvSpPr txBox="1"/>
+                  <p:nvPr/>
+                </p:nvSpPr>
+                <p:spPr>
+                  <a:xfrm>
+                    <a:off x="6496809" y="4174102"/>
+                    <a:ext cx="2524067" cy="1028571"/>
+                  </a:xfrm>
+                  <a:prstGeom prst="rect">
+                    <a:avLst/>
+                  </a:prstGeom>
+                  <a:noFill/>
+                </p:spPr>
+                <p:txBody>
+                  <a:bodyPr wrap="square" rtlCol="0">
+                    <a:spAutoFit/>
+                  </a:bodyPr>
+                  <a:lstStyle/>
+                  <a:p>
+                    <a:pPr algn="ctr"/>
+                    <a:r>
+                      <a:rPr lang="en-US" sz="3600" b="1" dirty="0">
+                        <a:solidFill>
+                          <a:schemeClr val="bg1"/>
+                        </a:solidFill>
+                      </a:rPr>
+                      <a:t>OS Kernel</a:t>
+                    </a:r>
+                    <a:endParaRPr lang="de-DE" sz="3600" b="1" dirty="0">
+                      <a:solidFill>
+                        <a:schemeClr val="bg1"/>
+                      </a:solidFill>
+                    </a:endParaRPr>
+                  </a:p>
+                </p:txBody>
+              </p:sp>
+            </p:grpSp>
+            <p:grpSp>
+              <p:nvGrpSpPr>
+                <p:cNvPr id="109" name="Group 17"/>
+                <p:cNvGrpSpPr/>
+                <p:nvPr/>
+              </p:nvGrpSpPr>
+              <p:grpSpPr>
+                <a:xfrm>
+                  <a:off x="1019175" y="4282455"/>
+                  <a:ext cx="3105150" cy="885824"/>
+                  <a:chOff x="6448425" y="3988416"/>
+                  <a:chExt cx="2628900" cy="1409700"/>
+                </a:xfrm>
+              </p:grpSpPr>
+              <p:sp>
+                <p:nvSpPr>
+                  <p:cNvPr id="113" name="Rectangle 18"/>
+                  <p:cNvSpPr/>
+                  <p:nvPr/>
+                </p:nvSpPr>
+                <p:spPr>
+                  <a:xfrm>
+                    <a:off x="6448425" y="3988416"/>
+                    <a:ext cx="2628900" cy="1409700"/>
+                  </a:xfrm>
+                  <a:prstGeom prst="rect">
+                    <a:avLst/>
+                  </a:prstGeom>
+                  <a:solidFill>
+                    <a:schemeClr val="accent1">
+                      <a:lumMod val="75000"/>
+                    </a:schemeClr>
+                  </a:solidFill>
+                  <a:ln w="114300">
+                    <a:solidFill>
+                      <a:schemeClr val="accent1">
+                        <a:lumMod val="50000"/>
+                      </a:schemeClr>
+                    </a:solidFill>
+                  </a:ln>
+                </p:spPr>
+                <p:style>
+                  <a:lnRef idx="2">
+                    <a:schemeClr val="accent1">
+                      <a:shade val="50000"/>
+                    </a:schemeClr>
+                  </a:lnRef>
+                  <a:fillRef idx="1">
+                    <a:schemeClr val="accent1"/>
+                  </a:fillRef>
+                  <a:effectRef idx="0">
+                    <a:schemeClr val="accent1"/>
+                  </a:effectRef>
+                  <a:fontRef idx="minor">
+                    <a:schemeClr val="lt1"/>
+                  </a:fontRef>
+                </p:style>
+                <p:txBody>
+                  <a:bodyPr rtlCol="0" anchor="ctr"/>
+                  <a:lstStyle/>
+                  <a:p>
+                    <a:pPr algn="ctr"/>
+                    <a:endParaRPr lang="de-DE">
+                      <a:solidFill>
+                        <a:schemeClr val="bg1"/>
+                      </a:solidFill>
+                    </a:endParaRPr>
+                  </a:p>
+                </p:txBody>
+              </p:sp>
+              <p:sp>
+                <p:nvSpPr>
+                  <p:cNvPr id="114" name="TextBox 19"/>
+                  <p:cNvSpPr txBox="1"/>
+                  <p:nvPr/>
+                </p:nvSpPr>
+                <p:spPr>
+                  <a:xfrm>
+                    <a:off x="6496809" y="4174102"/>
+                    <a:ext cx="2524067" cy="1028571"/>
+                  </a:xfrm>
+                  <a:prstGeom prst="rect">
+                    <a:avLst/>
+                  </a:prstGeom>
+                  <a:noFill/>
+                </p:spPr>
+                <p:txBody>
+                  <a:bodyPr wrap="square" rtlCol="0">
+                    <a:spAutoFit/>
+                  </a:bodyPr>
+                  <a:lstStyle/>
+                  <a:p>
+                    <a:pPr algn="ctr"/>
+                    <a:r>
+                      <a:rPr lang="en-US" sz="3600" b="1" dirty="0">
+                        <a:solidFill>
+                          <a:schemeClr val="bg1"/>
+                        </a:solidFill>
+                      </a:rPr>
+                      <a:t>Libraries</a:t>
+                    </a:r>
+                    <a:endParaRPr lang="de-DE" sz="3600" b="1" dirty="0">
+                      <a:solidFill>
+                        <a:schemeClr val="bg1"/>
+                      </a:solidFill>
+                    </a:endParaRPr>
+                  </a:p>
+                </p:txBody>
+              </p:sp>
+            </p:grpSp>
+            <p:grpSp>
+              <p:nvGrpSpPr>
+                <p:cNvPr id="110" name="Group 20"/>
+                <p:cNvGrpSpPr/>
+                <p:nvPr/>
+              </p:nvGrpSpPr>
+              <p:grpSpPr>
+                <a:xfrm>
+                  <a:off x="1019175" y="3215655"/>
+                  <a:ext cx="3105150" cy="885824"/>
+                  <a:chOff x="6448425" y="3988416"/>
+                  <a:chExt cx="2628900" cy="1409700"/>
+                </a:xfrm>
+              </p:grpSpPr>
+              <p:sp>
+                <p:nvSpPr>
+                  <p:cNvPr id="111" name="Rectangle 21"/>
+                  <p:cNvSpPr/>
+                  <p:nvPr/>
+                </p:nvSpPr>
+                <p:spPr>
+                  <a:xfrm>
+                    <a:off x="6448425" y="3988416"/>
+                    <a:ext cx="2628900" cy="1409700"/>
+                  </a:xfrm>
+                  <a:prstGeom prst="rect">
+                    <a:avLst/>
+                  </a:prstGeom>
+                  <a:solidFill>
+                    <a:schemeClr val="accent1">
+                      <a:lumMod val="75000"/>
+                    </a:schemeClr>
+                  </a:solidFill>
+                  <a:ln w="114300">
+                    <a:solidFill>
+                      <a:schemeClr val="accent1">
+                        <a:lumMod val="50000"/>
+                      </a:schemeClr>
+                    </a:solidFill>
+                  </a:ln>
+                </p:spPr>
+                <p:style>
+                  <a:lnRef idx="2">
+                    <a:schemeClr val="accent1">
+                      <a:shade val="50000"/>
+                    </a:schemeClr>
+                  </a:lnRef>
+                  <a:fillRef idx="1">
+                    <a:schemeClr val="accent1"/>
+                  </a:fillRef>
+                  <a:effectRef idx="0">
+                    <a:schemeClr val="accent1"/>
+                  </a:effectRef>
+                  <a:fontRef idx="minor">
+                    <a:schemeClr val="lt1"/>
+                  </a:fontRef>
+                </p:style>
+                <p:txBody>
+                  <a:bodyPr rtlCol="0" anchor="ctr"/>
+                  <a:lstStyle/>
+                  <a:p>
+                    <a:pPr algn="ctr"/>
+                    <a:endParaRPr lang="de-DE">
+                      <a:solidFill>
+                        <a:schemeClr val="bg1"/>
+                      </a:solidFill>
+                    </a:endParaRPr>
+                  </a:p>
+                </p:txBody>
+              </p:sp>
+              <p:sp>
+                <p:nvSpPr>
+                  <p:cNvPr id="112" name="TextBox 22"/>
+                  <p:cNvSpPr txBox="1"/>
+                  <p:nvPr/>
+                </p:nvSpPr>
+                <p:spPr>
+                  <a:xfrm>
+                    <a:off x="6496809" y="4174101"/>
+                    <a:ext cx="2524067" cy="1028571"/>
+                  </a:xfrm>
+                  <a:prstGeom prst="rect">
+                    <a:avLst/>
+                  </a:prstGeom>
+                  <a:noFill/>
+                </p:spPr>
+                <p:txBody>
+                  <a:bodyPr wrap="square" rtlCol="0">
+                    <a:spAutoFit/>
+                  </a:bodyPr>
+                  <a:lstStyle/>
+                  <a:p>
+                    <a:pPr algn="ctr"/>
+                    <a:r>
+                      <a:rPr lang="en-US" sz="3600" b="1" dirty="0">
+                        <a:solidFill>
+                          <a:schemeClr val="bg1"/>
+                        </a:solidFill>
+                      </a:rPr>
+                      <a:t>JVM</a:t>
+                    </a:r>
+                    <a:endParaRPr lang="de-DE" sz="3600" b="1" dirty="0">
+                      <a:solidFill>
+                        <a:schemeClr val="bg1"/>
+                      </a:solidFill>
+                    </a:endParaRPr>
+                  </a:p>
+                </p:txBody>
+              </p:sp>
+            </p:grpSp>
+          </p:grpSp>
+        </p:grpSp>
+        <p:sp>
+          <p:nvSpPr>
+            <p:cNvPr id="103" name="TextBox 24"/>
+            <p:cNvSpPr txBox="1"/>
+            <p:nvPr/>
+          </p:nvSpPr>
+          <p:spPr>
+            <a:xfrm>
+              <a:off x="57150" y="-755957"/>
+              <a:ext cx="3790954" cy="769441"/>
+            </a:xfrm>
+            <a:prstGeom prst="rect">
+              <a:avLst/>
+            </a:prstGeom>
+            <a:noFill/>
+          </p:spPr>
+          <p:txBody>
+            <a:bodyPr wrap="square" rtlCol="0">
+              <a:spAutoFit/>
+            </a:bodyPr>
+            <a:lstStyle/>
+            <a:p>
+              <a:pPr algn="ctr"/>
+              <a:r>
+                <a:rPr lang="en-US" sz="4400" b="1" dirty="0" smtClean="0">
+                  <a:solidFill>
+                    <a:schemeClr val="tx1">
+                      <a:lumMod val="75000"/>
+                      <a:lumOff val="25000"/>
+                    </a:schemeClr>
+                  </a:solidFill>
+                </a:rPr>
+                <a:t>Boxfuse Image</a:t>
+              </a:r>
+              <a:endParaRPr lang="de-DE" sz="4400" b="1" dirty="0">
+                <a:solidFill>
+                  <a:schemeClr val="tx1">
+                    <a:lumMod val="75000"/>
+                    <a:lumOff val="25000"/>
+                  </a:schemeClr>
+                </a:solidFill>
+              </a:endParaRPr>
+            </a:p>
+          </p:txBody>
+        </p:sp>
+      </p:grpSp>
+      <p:grpSp>
+        <p:nvGrpSpPr>
+          <p:cNvPr id="66" name="Group 65"/>
+          <p:cNvGrpSpPr/>
+          <p:nvPr/>
+        </p:nvGrpSpPr>
+        <p:grpSpPr>
+          <a:xfrm>
+            <a:off x="14347084" y="2678410"/>
+            <a:ext cx="4011254" cy="4178422"/>
+            <a:chOff x="12360816" y="8217563"/>
+            <a:chExt cx="1746456" cy="1819239"/>
+          </a:xfrm>
+        </p:grpSpPr>
+        <p:sp>
+          <p:nvSpPr>
+            <p:cNvPr id="67" name="Rounded Rectangle 75"/>
+            <p:cNvSpPr/>
+            <p:nvPr/>
+          </p:nvSpPr>
+          <p:spPr>
+            <a:xfrm>
+              <a:off x="12360816" y="8217563"/>
+              <a:ext cx="1441656" cy="1514439"/>
+            </a:xfrm>
+            <a:prstGeom prst="rect">
+              <a:avLst/>
+            </a:prstGeom>
+            <a:solidFill>
+              <a:schemeClr val="accent2">
+                <a:lumMod val="75000"/>
+              </a:schemeClr>
+            </a:solidFill>
+            <a:ln w="76200">
+              <a:solidFill>
+                <a:schemeClr val="accent2">
+                  <a:lumMod val="50000"/>
+                </a:schemeClr>
+              </a:solidFill>
+            </a:ln>
+          </p:spPr>
+          <p:style>
+            <a:lnRef idx="2">
+              <a:schemeClr val="accent1">
+                <a:shade val="50000"/>
+              </a:schemeClr>
+            </a:lnRef>
+            <a:fillRef idx="1">
+              <a:schemeClr val="accent1"/>
+            </a:fillRef>
+            <a:effectRef idx="0">
+              <a:schemeClr val="accent1"/>
+            </a:effectRef>
+            <a:fontRef idx="minor">
+              <a:schemeClr val="lt1"/>
+            </a:fontRef>
+          </p:style>
+          <p:txBody>
+            <a:bodyPr rtlCol="0" anchor="ctr"/>
+            <a:lstStyle/>
+            <a:p>
+              <a:pPr algn="ctr"/>
+              <a:r>
+                <a:rPr lang="en-US" sz="2000" b="1" dirty="0"/>
+                <a:t>Instance</a:t>
+              </a:r>
+              <a:endParaRPr lang="de-DE" sz="2000" b="1" dirty="0"/>
+            </a:p>
+          </p:txBody>
+        </p:sp>
+        <p:sp>
+          <p:nvSpPr>
+            <p:cNvPr id="68" name="Rounded Rectangle 75"/>
+            <p:cNvSpPr/>
+            <p:nvPr/>
+          </p:nvSpPr>
+          <p:spPr>
+            <a:xfrm>
+              <a:off x="12513216" y="8369963"/>
+              <a:ext cx="1441656" cy="1514439"/>
+            </a:xfrm>
+            <a:prstGeom prst="rect">
+              <a:avLst/>
+            </a:prstGeom>
+            <a:solidFill>
+              <a:schemeClr val="accent2">
+                <a:lumMod val="75000"/>
+              </a:schemeClr>
+            </a:solidFill>
+            <a:ln w="76200">
+              <a:solidFill>
+                <a:schemeClr val="accent2">
+                  <a:lumMod val="50000"/>
+                </a:schemeClr>
+              </a:solidFill>
+            </a:ln>
+          </p:spPr>
+          <p:style>
+            <a:lnRef idx="2">
+              <a:schemeClr val="accent1">
+                <a:shade val="50000"/>
+              </a:schemeClr>
+            </a:lnRef>
+            <a:fillRef idx="1">
+              <a:schemeClr val="accent1"/>
+            </a:fillRef>
+            <a:effectRef idx="0">
+              <a:schemeClr val="accent1"/>
+            </a:effectRef>
+            <a:fontRef idx="minor">
+              <a:schemeClr val="lt1"/>
+            </a:fontRef>
+          </p:style>
+          <p:txBody>
+            <a:bodyPr rtlCol="0" anchor="ctr"/>
+            <a:lstStyle/>
+            <a:p>
+              <a:pPr algn="ctr"/>
+              <a:r>
+                <a:rPr lang="en-US" sz="2000" b="1" dirty="0"/>
+                <a:t>Instance</a:t>
+              </a:r>
+              <a:endParaRPr lang="de-DE" sz="2000" b="1" dirty="0"/>
+            </a:p>
+          </p:txBody>
+        </p:sp>
+        <p:sp>
+          <p:nvSpPr>
+            <p:cNvPr id="69" name="Rounded Rectangle 75"/>
+            <p:cNvSpPr/>
+            <p:nvPr/>
+          </p:nvSpPr>
+          <p:spPr>
+            <a:xfrm>
+              <a:off x="12665616" y="8522363"/>
+              <a:ext cx="1441656" cy="1514439"/>
+            </a:xfrm>
+            <a:prstGeom prst="rect">
+              <a:avLst/>
+            </a:prstGeom>
+            <a:solidFill>
+              <a:schemeClr val="accent2">
+                <a:lumMod val="75000"/>
+              </a:schemeClr>
+            </a:solidFill>
+            <a:ln w="76200">
+              <a:solidFill>
+                <a:schemeClr val="accent2">
+                  <a:lumMod val="50000"/>
+                </a:schemeClr>
+              </a:solidFill>
+            </a:ln>
+          </p:spPr>
+          <p:style>
+            <a:lnRef idx="2">
+              <a:schemeClr val="accent1">
+                <a:shade val="50000"/>
+              </a:schemeClr>
+            </a:lnRef>
+            <a:fillRef idx="1">
+              <a:schemeClr val="accent1"/>
+            </a:fillRef>
+            <a:effectRef idx="0">
+              <a:schemeClr val="accent1"/>
+            </a:effectRef>
+            <a:fontRef idx="minor">
+              <a:schemeClr val="lt1"/>
+            </a:fontRef>
+          </p:style>
+          <p:txBody>
+            <a:bodyPr rtlCol="0" anchor="ctr"/>
+            <a:lstStyle/>
+            <a:p>
+              <a:pPr algn="ctr"/>
+              <a:endParaRPr lang="en-US" sz="3600" b="1" dirty="0"/>
+            </a:p>
+            <a:p>
+              <a:pPr algn="ctr"/>
+              <a:r>
+                <a:rPr lang="en-US" sz="3600" b="1" dirty="0"/>
+                <a:t>Instance</a:t>
+              </a:r>
+              <a:endParaRPr lang="de-DE" sz="3600" b="1" dirty="0"/>
+            </a:p>
+          </p:txBody>
+        </p:sp>
+      </p:grpSp>
+      <p:pic>
+        <p:nvPicPr>
+          <p:cNvPr id="71" name="Picture 2" descr="http://miamitom.net/content/wp-content/uploads/2015/04/aws-logo-large_white-300x111.png"/>
+          <p:cNvPicPr>
+            <a:picLocks noChangeAspect="1" noChangeArrowheads="1"/>
+          </p:cNvPicPr>
+          <p:nvPr/>
+        </p:nvPicPr>
+        <p:blipFill>
+          <a:blip r:embed="rId2">
+            <a:extLst>
+              <a:ext uri="{28A0092B-C50C-407E-A947-70E740481C1C}">
+                <a14:useLocalDpi xmlns:a14="http://schemas.microsoft.com/office/drawing/2010/main" val="0"/>
+              </a:ext>
+            </a:extLst>
+          </a:blip>
+          <a:srcRect/>
+          <a:stretch>
+            <a:fillRect/>
+          </a:stretch>
+        </p:blipFill>
+        <p:spPr bwMode="auto">
+          <a:xfrm>
+            <a:off x="15256789" y="3961374"/>
+            <a:ext cx="2881593" cy="1066191"/>
+          </a:xfrm>
+          <a:prstGeom prst="rect">
+            <a:avLst/>
+          </a:prstGeom>
+          <a:noFill/>
+          <a:extLst>
+            <a:ext uri="{909E8E84-426E-40DD-AFC4-6F175D3DCCD1}">
+              <a14:hiddenFill xmlns:a14="http://schemas.microsoft.com/office/drawing/2010/main">
+                <a:solidFill>
+                  <a:srgbClr val="FFFFFF"/>
+                </a:solidFill>
+              </a14:hiddenFill>
+            </a:ext>
+          </a:extLst>
+        </p:spPr>
+      </p:pic>
+      <p:cxnSp>
+        <p:nvCxnSpPr>
+          <p:cNvPr id="78" name="Straight Arrow Connector 77"/>
+          <p:cNvCxnSpPr/>
+          <p:nvPr/>
+        </p:nvCxnSpPr>
+        <p:spPr>
+          <a:xfrm>
+            <a:off x="12347330" y="3636401"/>
+            <a:ext cx="1792374" cy="0"/>
+          </a:xfrm>
+          <a:prstGeom prst="straightConnector1">
+            <a:avLst/>
+          </a:prstGeom>
+          <a:ln w="228600">
+            <a:solidFill>
+              <a:schemeClr val="bg2">
+                <a:lumMod val="75000"/>
+              </a:schemeClr>
+            </a:solidFill>
+            <a:tailEnd type="triangle"/>
+          </a:ln>
+        </p:spPr>
+        <p:style>
+          <a:lnRef idx="1">
+            <a:schemeClr val="accent1"/>
+          </a:lnRef>
+          <a:fillRef idx="0">
+            <a:schemeClr val="accent1"/>
+          </a:fillRef>
+          <a:effectRef idx="0">
+            <a:schemeClr val="accent1"/>
+          </a:effectRef>
+          <a:fontRef idx="minor">
+            <a:schemeClr val="tx1"/>
+          </a:fontRef>
+        </p:style>
+      </p:cxnSp>
+    </p:spTree>
+    <p:extLst>
+      <p:ext uri="{BB962C8B-B14F-4D97-AF65-F5344CB8AC3E}">
+        <p14:creationId xmlns:p14="http://schemas.microsoft.com/office/powerpoint/2010/main" val="2819173523"/>
+      </p:ext>
+    </p:extLst>
+  </p:cSld>
+  <p:clrMapOvr>
+    <a:masterClrMapping/>
+  </p:clrMapOvr>
+</p:sld>
+</file>
+
+<file path=ppt/slides/slide6.xml><?xml version="1.0" encoding="utf-8"?>
+<p:sld xmlns:a="http://schemas.openxmlformats.org/drawingml/2006/main" xmlns:r="http://schemas.openxmlformats.org/officeDocument/2006/relationships" xmlns:p="http://schemas.openxmlformats.org/presentationml/2006/main">
+  <p:cSld>
+    <p:spTree>
+      <p:nvGrpSpPr>
+        <p:cNvPr id="1" name=""/>
+        <p:cNvGrpSpPr/>
+        <p:nvPr/>
+      </p:nvGrpSpPr>
+      <p:grpSpPr>
+        <a:xfrm>
+          <a:off x="0" y="0"/>
+          <a:ext cx="0" cy="0"/>
+          <a:chOff x="0" y="0"/>
+          <a:chExt cx="0" cy="0"/>
+        </a:xfrm>
+      </p:grpSpPr>
+      <p:grpSp>
+        <p:nvGrpSpPr>
           <p:cNvPr id="4" name="Group 3"/>
           <p:cNvGrpSpPr/>
           <p:nvPr/>
@@ -37796,7 +39685,7 @@
 </p:sld>
 </file>
 
-<file path=ppt/slides/slide6.xml><?xml version="1.0" encoding="utf-8"?>
+<file path=ppt/slides/slide7.xml><?xml version="1.0" encoding="utf-8"?>
 <p:sld xmlns:a="http://schemas.openxmlformats.org/drawingml/2006/main" xmlns:r="http://schemas.openxmlformats.org/officeDocument/2006/relationships" xmlns:p="http://schemas.openxmlformats.org/presentationml/2006/main">
   <p:cSld>
     <p:spTree>
@@ -38558,7 +40447,7 @@
 </p:sld>
 </file>
 
-<file path=ppt/slides/slide7.xml><?xml version="1.0" encoding="utf-8"?>
+<file path=ppt/slides/slide8.xml><?xml version="1.0" encoding="utf-8"?>
 <p:sld xmlns:a="http://schemas.openxmlformats.org/drawingml/2006/main" xmlns:r="http://schemas.openxmlformats.org/officeDocument/2006/relationships" xmlns:p="http://schemas.openxmlformats.org/presentationml/2006/main">
   <p:cSld>
     <p:spTree>
@@ -39232,7 +41121,7 @@
 </p:sld>
 </file>
 
-<file path=ppt/slides/slide8.xml><?xml version="1.0" encoding="utf-8"?>
+<file path=ppt/slides/slide9.xml><?xml version="1.0" encoding="utf-8"?>
 <p:sld xmlns:a="http://schemas.openxmlformats.org/drawingml/2006/main" xmlns:r="http://schemas.openxmlformats.org/officeDocument/2006/relationships" xmlns:p="http://schemas.openxmlformats.org/presentationml/2006/main">
   <p:cSld>
     <p:spTree>
@@ -39720,364 +41609,6 @@
     <p:extLst>
       <p:ext uri="{BB962C8B-B14F-4D97-AF65-F5344CB8AC3E}">
         <p14:creationId xmlns:p14="http://schemas.microsoft.com/office/powerpoint/2010/main" val="4273925918"/>
-      </p:ext>
-    </p:extLst>
-  </p:cSld>
-  <p:clrMapOvr>
-    <a:masterClrMapping/>
-  </p:clrMapOvr>
-  <p:timing>
-    <p:tnLst>
-      <p:par>
-        <p:cTn id="1" dur="indefinite" restart="never" nodeType="tmRoot"/>
-      </p:par>
-    </p:tnLst>
-  </p:timing>
-</p:sld>
-</file>
-
-<file path=ppt/slides/slide9.xml><?xml version="1.0" encoding="utf-8"?>
-<p:sld xmlns:a="http://schemas.openxmlformats.org/drawingml/2006/main" xmlns:r="http://schemas.openxmlformats.org/officeDocument/2006/relationships" xmlns:p="http://schemas.openxmlformats.org/presentationml/2006/main">
-  <p:cSld>
-    <p:spTree>
-      <p:nvGrpSpPr>
-        <p:cNvPr id="1" name=""/>
-        <p:cNvGrpSpPr/>
-        <p:nvPr/>
-      </p:nvGrpSpPr>
-      <p:grpSpPr>
-        <a:xfrm>
-          <a:off x="0" y="0"/>
-          <a:ext cx="0" cy="0"/>
-          <a:chOff x="0" y="0"/>
-          <a:chExt cx="0" cy="0"/>
-        </a:xfrm>
-      </p:grpSpPr>
-      <p:grpSp>
-        <p:nvGrpSpPr>
-          <p:cNvPr id="25" name="Group 24"/>
-          <p:cNvGrpSpPr/>
-          <p:nvPr/>
-        </p:nvGrpSpPr>
-        <p:grpSpPr>
-          <a:xfrm>
-            <a:off x="12820515" y="6063545"/>
-            <a:ext cx="1765988" cy="1360685"/>
-            <a:chOff x="6081914" y="3933826"/>
-            <a:chExt cx="3411961" cy="1409700"/>
-          </a:xfrm>
-          <a:solidFill>
-            <a:schemeClr val="accent1">
-              <a:lumMod val="75000"/>
-            </a:schemeClr>
-          </a:solidFill>
-        </p:grpSpPr>
-        <p:sp>
-          <p:nvSpPr>
-            <p:cNvPr id="26" name="Rounded Rectangle 25"/>
-            <p:cNvSpPr/>
-            <p:nvPr/>
-          </p:nvSpPr>
-          <p:spPr>
-            <a:xfrm>
-              <a:off x="6448425" y="3933826"/>
-              <a:ext cx="2628900" cy="1409700"/>
-            </a:xfrm>
-            <a:prstGeom prst="ellipse">
-              <a:avLst/>
-            </a:prstGeom>
-            <a:grpFill/>
-            <a:ln w="114300">
-              <a:solidFill>
-                <a:schemeClr val="accent1">
-                  <a:lumMod val="50000"/>
-                </a:schemeClr>
-              </a:solidFill>
-            </a:ln>
-          </p:spPr>
-          <p:style>
-            <a:lnRef idx="2">
-              <a:schemeClr val="accent1">
-                <a:shade val="50000"/>
-              </a:schemeClr>
-            </a:lnRef>
-            <a:fillRef idx="1">
-              <a:schemeClr val="accent1"/>
-            </a:fillRef>
-            <a:effectRef idx="0">
-              <a:schemeClr val="accent1"/>
-            </a:effectRef>
-            <a:fontRef idx="minor">
-              <a:schemeClr val="lt1"/>
-            </a:fontRef>
-          </p:style>
-          <p:txBody>
-            <a:bodyPr rtlCol="0" anchor="ctr"/>
-            <a:lstStyle/>
-            <a:p>
-              <a:pPr algn="ctr"/>
-              <a:endParaRPr lang="de-DE"/>
-            </a:p>
-          </p:txBody>
-        </p:sp>
-        <p:sp>
-          <p:nvSpPr>
-            <p:cNvPr id="27" name="TextBox 26"/>
-            <p:cNvSpPr txBox="1"/>
-            <p:nvPr/>
-          </p:nvSpPr>
-          <p:spPr>
-            <a:xfrm>
-              <a:off x="6081914" y="4139724"/>
-              <a:ext cx="3411961" cy="1120955"/>
-            </a:xfrm>
-            <a:prstGeom prst="ellipse">
-              <a:avLst/>
-            </a:prstGeom>
-            <a:noFill/>
-            <a:ln>
-              <a:noFill/>
-            </a:ln>
-          </p:spPr>
-          <p:txBody>
-            <a:bodyPr wrap="square" rtlCol="0">
-              <a:spAutoFit/>
-            </a:bodyPr>
-            <a:lstStyle/>
-            <a:p>
-              <a:pPr algn="ctr"/>
-              <a:r>
-                <a:rPr lang="en-US" sz="2200" b="1" dirty="0">
-                  <a:solidFill>
-                    <a:schemeClr val="bg1"/>
-                  </a:solidFill>
-                </a:rPr>
-                <a:t>Bootable App</a:t>
-              </a:r>
-              <a:endParaRPr lang="de-DE" sz="2200" b="1" dirty="0">
-                <a:solidFill>
-                  <a:schemeClr val="bg1"/>
-                </a:solidFill>
-              </a:endParaRPr>
-            </a:p>
-          </p:txBody>
-        </p:sp>
-      </p:grpSp>
-      <p:grpSp>
-        <p:nvGrpSpPr>
-          <p:cNvPr id="18" name="Group 17"/>
-          <p:cNvGrpSpPr/>
-          <p:nvPr/>
-        </p:nvGrpSpPr>
-        <p:grpSpPr>
-          <a:xfrm>
-            <a:off x="2604452" y="1633030"/>
-            <a:ext cx="5896303" cy="5791199"/>
-            <a:chOff x="6448425" y="3933826"/>
-            <a:chExt cx="2628900" cy="1409700"/>
-          </a:xfrm>
-        </p:grpSpPr>
-        <p:sp>
-          <p:nvSpPr>
-            <p:cNvPr id="19" name="Rounded Rectangle 18"/>
-            <p:cNvSpPr/>
-            <p:nvPr/>
-          </p:nvSpPr>
-          <p:spPr>
-            <a:xfrm>
-              <a:off x="6448425" y="3933826"/>
-              <a:ext cx="2628900" cy="1409700"/>
-            </a:xfrm>
-            <a:prstGeom prst="roundRect">
-              <a:avLst/>
-            </a:prstGeom>
-            <a:solidFill>
-              <a:schemeClr val="accent1">
-                <a:lumMod val="50000"/>
-              </a:schemeClr>
-            </a:solidFill>
-            <a:ln w="114300">
-              <a:solidFill>
-                <a:schemeClr val="accent5">
-                  <a:lumMod val="50000"/>
-                </a:schemeClr>
-              </a:solidFill>
-            </a:ln>
-          </p:spPr>
-          <p:style>
-            <a:lnRef idx="2">
-              <a:schemeClr val="accent1">
-                <a:shade val="50000"/>
-              </a:schemeClr>
-            </a:lnRef>
-            <a:fillRef idx="1">
-              <a:schemeClr val="accent1"/>
-            </a:fillRef>
-            <a:effectRef idx="0">
-              <a:schemeClr val="accent1"/>
-            </a:effectRef>
-            <a:fontRef idx="minor">
-              <a:schemeClr val="lt1"/>
-            </a:fontRef>
-          </p:style>
-          <p:txBody>
-            <a:bodyPr rtlCol="0" anchor="ctr"/>
-            <a:lstStyle/>
-            <a:p>
-              <a:pPr algn="ctr"/>
-              <a:endParaRPr lang="de-DE"/>
-            </a:p>
-          </p:txBody>
-        </p:sp>
-        <p:sp>
-          <p:nvSpPr>
-            <p:cNvPr id="20" name="TextBox 19"/>
-            <p:cNvSpPr txBox="1"/>
-            <p:nvPr/>
-          </p:nvSpPr>
-          <p:spPr>
-            <a:xfrm>
-              <a:off x="6496810" y="4534818"/>
-              <a:ext cx="2524067" cy="202282"/>
-            </a:xfrm>
-            <a:prstGeom prst="rect">
-              <a:avLst/>
-            </a:prstGeom>
-            <a:noFill/>
-          </p:spPr>
-          <p:txBody>
-            <a:bodyPr wrap="square" rtlCol="0">
-              <a:spAutoFit/>
-            </a:bodyPr>
-            <a:lstStyle/>
-            <a:p>
-              <a:pPr algn="ctr"/>
-              <a:r>
-                <a:rPr lang="en-US" sz="4800" b="1" dirty="0">
-                  <a:solidFill>
-                    <a:schemeClr val="bg1"/>
-                  </a:solidFill>
-                </a:rPr>
-                <a:t>Machine Image</a:t>
-              </a:r>
-              <a:endParaRPr lang="de-DE" sz="4800" b="1" dirty="0">
-                <a:solidFill>
-                  <a:schemeClr val="bg1"/>
-                </a:solidFill>
-              </a:endParaRPr>
-            </a:p>
-          </p:txBody>
-        </p:sp>
-      </p:grpSp>
-      <p:sp>
-        <p:nvSpPr>
-          <p:cNvPr id="21" name="TextBox 20"/>
-          <p:cNvSpPr txBox="1"/>
-          <p:nvPr/>
-        </p:nvSpPr>
-        <p:spPr>
-          <a:xfrm>
-            <a:off x="3713814" y="7484543"/>
-            <a:ext cx="3801979" cy="1323439"/>
-          </a:xfrm>
-          <a:prstGeom prst="rect">
-            <a:avLst/>
-          </a:prstGeom>
-          <a:noFill/>
-        </p:spPr>
-        <p:txBody>
-          <a:bodyPr wrap="square" rtlCol="0">
-            <a:spAutoFit/>
-          </a:bodyPr>
-          <a:lstStyle/>
-          <a:p>
-            <a:pPr algn="ctr"/>
-            <a:r>
-              <a:rPr lang="en-US" sz="4000" b="1" dirty="0">
-                <a:solidFill>
-                  <a:schemeClr val="bg1">
-                    <a:lumMod val="50000"/>
-                  </a:schemeClr>
-                </a:solidFill>
-              </a:rPr>
-              <a:t>Legacy OS</a:t>
-            </a:r>
-          </a:p>
-          <a:p>
-            <a:pPr algn="ctr"/>
-            <a:r>
-              <a:rPr lang="en-US" sz="4000" b="1" dirty="0">
-                <a:solidFill>
-                  <a:schemeClr val="bg1">
-                    <a:lumMod val="50000"/>
-                  </a:schemeClr>
-                </a:solidFill>
-              </a:rPr>
-              <a:t>Multiple GBs</a:t>
-            </a:r>
-          </a:p>
-        </p:txBody>
-      </p:sp>
-      <p:sp>
-        <p:nvSpPr>
-          <p:cNvPr id="22" name="TextBox 21"/>
-          <p:cNvSpPr txBox="1"/>
-          <p:nvPr/>
-        </p:nvSpPr>
-        <p:spPr>
-          <a:xfrm>
-            <a:off x="10648718" y="7543486"/>
-            <a:ext cx="6136103" cy="1323439"/>
-          </a:xfrm>
-          <a:prstGeom prst="rect">
-            <a:avLst/>
-          </a:prstGeom>
-          <a:noFill/>
-        </p:spPr>
-        <p:txBody>
-          <a:bodyPr wrap="square" rtlCol="0">
-            <a:spAutoFit/>
-          </a:bodyPr>
-          <a:lstStyle/>
-          <a:p>
-            <a:pPr algn="ctr"/>
-            <a:r>
-              <a:rPr lang="en-US" sz="4000" b="1" dirty="0">
-                <a:solidFill>
-                  <a:schemeClr val="bg1">
-                    <a:lumMod val="50000"/>
-                  </a:schemeClr>
-                </a:solidFill>
-              </a:rPr>
-              <a:t>Boxfuse Secure Micro OS</a:t>
-            </a:r>
-          </a:p>
-          <a:p>
-            <a:pPr algn="ctr"/>
-            <a:r>
-              <a:rPr lang="en-US" sz="4000" b="1" dirty="0">
-                <a:solidFill>
-                  <a:schemeClr val="bg1">
-                    <a:lumMod val="50000"/>
-                  </a:schemeClr>
-                </a:solidFill>
-              </a:rPr>
-              <a:t>Few MBs</a:t>
-            </a:r>
-            <a:endParaRPr lang="de-DE" sz="4000" b="1" dirty="0">
-              <a:solidFill>
-                <a:schemeClr val="bg1">
-                  <a:lumMod val="50000"/>
-                </a:schemeClr>
-              </a:solidFill>
-            </a:endParaRPr>
-          </a:p>
-        </p:txBody>
-      </p:sp>
-    </p:spTree>
-    <p:extLst>
-      <p:ext uri="{BB962C8B-B14F-4D97-AF65-F5344CB8AC3E}">
-        <p14:creationId xmlns:p14="http://schemas.microsoft.com/office/powerpoint/2010/main" val="4154683558"/>
       </p:ext>
     </p:extLst>
   </p:cSld>

</xml_diff>

<commit_message>
Added Play to homepage
</commit_message>
<xml_diff>
--- a/_sources/GettingStarted.pptx
+++ b/_sources/GettingStarted.pptx
@@ -39,6 +39,7 @@
     <p:sldId id="279" r:id="rId33"/>
     <p:sldId id="280" r:id="rId34"/>
     <p:sldId id="281" r:id="rId35"/>
+    <p:sldId id="290" r:id="rId36"/>
   </p:sldIdLst>
   <p:sldSz cx="19199225" cy="10799763"/>
   <p:notesSz cx="6858000" cy="9144000"/>
@@ -3093,7 +3094,7 @@
           <a:p>
             <a:fld id="{9AA7D095-A676-4F6B-9416-D65D798F5244}" type="datetimeFigureOut">
               <a:rPr lang="de-DE" smtClean="0"/>
-              <a:t>16.11.2015</a:t>
+              <a:t>17.11.2015</a:t>
             </a:fld>
             <a:endParaRPr lang="de-DE"/>
           </a:p>
@@ -3263,7 +3264,7 @@
           <a:p>
             <a:fld id="{9AA7D095-A676-4F6B-9416-D65D798F5244}" type="datetimeFigureOut">
               <a:rPr lang="de-DE" smtClean="0"/>
-              <a:t>16.11.2015</a:t>
+              <a:t>17.11.2015</a:t>
             </a:fld>
             <a:endParaRPr lang="de-DE"/>
           </a:p>
@@ -3443,7 +3444,7 @@
           <a:p>
             <a:fld id="{9AA7D095-A676-4F6B-9416-D65D798F5244}" type="datetimeFigureOut">
               <a:rPr lang="de-DE" smtClean="0"/>
-              <a:t>16.11.2015</a:t>
+              <a:t>17.11.2015</a:t>
             </a:fld>
             <a:endParaRPr lang="de-DE"/>
           </a:p>
@@ -3613,7 +3614,7 @@
           <a:p>
             <a:fld id="{9AA7D095-A676-4F6B-9416-D65D798F5244}" type="datetimeFigureOut">
               <a:rPr lang="de-DE" smtClean="0"/>
-              <a:t>16.11.2015</a:t>
+              <a:t>17.11.2015</a:t>
             </a:fld>
             <a:endParaRPr lang="de-DE"/>
           </a:p>
@@ -3859,7 +3860,7 @@
           <a:p>
             <a:fld id="{9AA7D095-A676-4F6B-9416-D65D798F5244}" type="datetimeFigureOut">
               <a:rPr lang="de-DE" smtClean="0"/>
-              <a:t>16.11.2015</a:t>
+              <a:t>17.11.2015</a:t>
             </a:fld>
             <a:endParaRPr lang="de-DE"/>
           </a:p>
@@ -4091,7 +4092,7 @@
           <a:p>
             <a:fld id="{9AA7D095-A676-4F6B-9416-D65D798F5244}" type="datetimeFigureOut">
               <a:rPr lang="de-DE" smtClean="0"/>
-              <a:t>16.11.2015</a:t>
+              <a:t>17.11.2015</a:t>
             </a:fld>
             <a:endParaRPr lang="de-DE"/>
           </a:p>
@@ -4458,7 +4459,7 @@
           <a:p>
             <a:fld id="{9AA7D095-A676-4F6B-9416-D65D798F5244}" type="datetimeFigureOut">
               <a:rPr lang="de-DE" smtClean="0"/>
-              <a:t>16.11.2015</a:t>
+              <a:t>17.11.2015</a:t>
             </a:fld>
             <a:endParaRPr lang="de-DE"/>
           </a:p>
@@ -4576,7 +4577,7 @@
           <a:p>
             <a:fld id="{9AA7D095-A676-4F6B-9416-D65D798F5244}" type="datetimeFigureOut">
               <a:rPr lang="de-DE" smtClean="0"/>
-              <a:t>16.11.2015</a:t>
+              <a:t>17.11.2015</a:t>
             </a:fld>
             <a:endParaRPr lang="de-DE"/>
           </a:p>
@@ -4671,7 +4672,7 @@
           <a:p>
             <a:fld id="{9AA7D095-A676-4F6B-9416-D65D798F5244}" type="datetimeFigureOut">
               <a:rPr lang="de-DE" smtClean="0"/>
-              <a:t>16.11.2015</a:t>
+              <a:t>17.11.2015</a:t>
             </a:fld>
             <a:endParaRPr lang="de-DE"/>
           </a:p>
@@ -4948,7 +4949,7 @@
           <a:p>
             <a:fld id="{9AA7D095-A676-4F6B-9416-D65D798F5244}" type="datetimeFigureOut">
               <a:rPr lang="de-DE" smtClean="0"/>
-              <a:t>16.11.2015</a:t>
+              <a:t>17.11.2015</a:t>
             </a:fld>
             <a:endParaRPr lang="de-DE"/>
           </a:p>
@@ -5205,7 +5206,7 @@
           <a:p>
             <a:fld id="{9AA7D095-A676-4F6B-9416-D65D798F5244}" type="datetimeFigureOut">
               <a:rPr lang="de-DE" smtClean="0"/>
-              <a:t>16.11.2015</a:t>
+              <a:t>17.11.2015</a:t>
             </a:fld>
             <a:endParaRPr lang="de-DE"/>
           </a:p>
@@ -5418,7 +5419,7 @@
           <a:p>
             <a:fld id="{9AA7D095-A676-4F6B-9416-D65D798F5244}" type="datetimeFigureOut">
               <a:rPr lang="de-DE" smtClean="0"/>
-              <a:t>16.11.2015</a:t>
+              <a:t>17.11.2015</a:t>
             </a:fld>
             <a:endParaRPr lang="de-DE"/>
           </a:p>
@@ -6488,35 +6489,8 @@
                   </a:schemeClr>
                 </a:solidFill>
               </a:rPr>
-              <a:t>generated on-the-fly (&lt;</a:t>
+              <a:t>generated on-the-fly (&lt;10 secs provisioning)</a:t>
             </a:r>
-            <a:r>
-              <a:rPr lang="en-US" sz="3200" b="1" dirty="0" smtClean="0">
-                <a:solidFill>
-                  <a:schemeClr val="bg1">
-                    <a:lumMod val="50000"/>
-                  </a:schemeClr>
-                </a:solidFill>
-              </a:rPr>
-              <a:t>10 secs </a:t>
-            </a:r>
-            <a:r>
-              <a:rPr lang="en-US" sz="3200" b="1" dirty="0" smtClean="0">
-                <a:solidFill>
-                  <a:schemeClr val="bg1">
-                    <a:lumMod val="50000"/>
-                  </a:schemeClr>
-                </a:solidFill>
-              </a:rPr>
-              <a:t>provisioning)</a:t>
-            </a:r>
-            <a:endParaRPr lang="en-US" sz="3200" b="1" dirty="0" smtClean="0">
-              <a:solidFill>
-                <a:schemeClr val="bg1">
-                  <a:lumMod val="50000"/>
-                </a:schemeClr>
-              </a:solidFill>
-            </a:endParaRPr>
           </a:p>
           <a:p>
             <a:pPr marL="571500" indent="-571500">
@@ -6567,27 +6541,7 @@
                   </a:schemeClr>
                 </a:solidFill>
               </a:rPr>
-              <a:t>secure </a:t>
-            </a:r>
-            <a:r>
-              <a:rPr lang="en-US" sz="3200" b="1" dirty="0" smtClean="0">
-                <a:solidFill>
-                  <a:schemeClr val="bg1">
-                    <a:lumMod val="50000"/>
-                  </a:schemeClr>
-                </a:solidFill>
-              </a:rPr>
-              <a:t>(smallest attack surface</a:t>
-            </a:r>
-            <a:r>
-              <a:rPr lang="en-US" sz="3200" b="1" dirty="0" smtClean="0">
-                <a:solidFill>
-                  <a:schemeClr val="bg1">
-                    <a:lumMod val="50000"/>
-                  </a:schemeClr>
-                </a:solidFill>
-              </a:rPr>
-              <a:t>)</a:t>
+              <a:t>secure (smallest attack surface)</a:t>
             </a:r>
           </a:p>
           <a:p>
@@ -6625,13 +6579,6 @@
               </a:rPr>
               <a:t> &amp; AWS</a:t>
             </a:r>
-            <a:endParaRPr lang="en-US" sz="3200" b="1" dirty="0" smtClean="0">
-              <a:solidFill>
-                <a:schemeClr val="bg1">
-                  <a:lumMod val="50000"/>
-                </a:schemeClr>
-              </a:solidFill>
-            </a:endParaRPr>
           </a:p>
         </p:txBody>
       </p:sp>
@@ -7515,35 +7462,8 @@
                   </a:schemeClr>
                 </a:solidFill>
               </a:rPr>
-              <a:t>generated on-the-fly (&lt;</a:t>
+              <a:t>generated on-the-fly (&lt;10 secs provisioning)</a:t>
             </a:r>
-            <a:r>
-              <a:rPr lang="en-US" sz="3200" b="1" dirty="0" smtClean="0">
-                <a:solidFill>
-                  <a:schemeClr val="bg1">
-                    <a:lumMod val="50000"/>
-                  </a:schemeClr>
-                </a:solidFill>
-              </a:rPr>
-              <a:t>10 secs </a:t>
-            </a:r>
-            <a:r>
-              <a:rPr lang="en-US" sz="3200" b="1" dirty="0" smtClean="0">
-                <a:solidFill>
-                  <a:schemeClr val="bg1">
-                    <a:lumMod val="50000"/>
-                  </a:schemeClr>
-                </a:solidFill>
-              </a:rPr>
-              <a:t>provisioning)</a:t>
-            </a:r>
-            <a:endParaRPr lang="en-US" sz="3200" b="1" dirty="0" smtClean="0">
-              <a:solidFill>
-                <a:schemeClr val="bg1">
-                  <a:lumMod val="50000"/>
-                </a:schemeClr>
-              </a:solidFill>
-            </a:endParaRPr>
           </a:p>
           <a:p>
             <a:pPr marL="571500" indent="-571500">
@@ -7594,27 +7514,7 @@
                   </a:schemeClr>
                 </a:solidFill>
               </a:rPr>
-              <a:t>secure </a:t>
-            </a:r>
-            <a:r>
-              <a:rPr lang="en-US" sz="3200" b="1" dirty="0" smtClean="0">
-                <a:solidFill>
-                  <a:schemeClr val="bg1">
-                    <a:lumMod val="50000"/>
-                  </a:schemeClr>
-                </a:solidFill>
-              </a:rPr>
-              <a:t>(smallest attack surface</a:t>
-            </a:r>
-            <a:r>
-              <a:rPr lang="en-US" sz="3200" b="1" dirty="0" smtClean="0">
-                <a:solidFill>
-                  <a:schemeClr val="bg1">
-                    <a:lumMod val="50000"/>
-                  </a:schemeClr>
-                </a:solidFill>
-              </a:rPr>
-              <a:t>)</a:t>
+              <a:t>secure (smallest attack surface)</a:t>
             </a:r>
           </a:p>
           <a:p>
@@ -7652,13 +7552,6 @@
               </a:rPr>
               <a:t> &amp; AWS</a:t>
             </a:r>
-            <a:endParaRPr lang="en-US" sz="3200" b="1" dirty="0" smtClean="0">
-              <a:solidFill>
-                <a:schemeClr val="bg1">
-                  <a:lumMod val="50000"/>
-                </a:schemeClr>
-              </a:solidFill>
-            </a:endParaRPr>
           </a:p>
         </p:txBody>
       </p:sp>
@@ -39635,6 +39528,246 @@
       </p:par>
     </p:tnLst>
   </p:timing>
+</p:sld>
+</file>
+
+<file path=ppt/slides/slide35.xml><?xml version="1.0" encoding="utf-8"?>
+<p:sld xmlns:a="http://schemas.openxmlformats.org/drawingml/2006/main" xmlns:r="http://schemas.openxmlformats.org/officeDocument/2006/relationships" xmlns:p="http://schemas.openxmlformats.org/presentationml/2006/main">
+  <p:cSld>
+    <p:spTree>
+      <p:nvGrpSpPr>
+        <p:cNvPr id="1" name=""/>
+        <p:cNvGrpSpPr/>
+        <p:nvPr/>
+      </p:nvGrpSpPr>
+      <p:grpSpPr>
+        <a:xfrm>
+          <a:off x="0" y="0"/>
+          <a:ext cx="0" cy="0"/>
+          <a:chOff x="0" y="0"/>
+          <a:chExt cx="0" cy="0"/>
+        </a:xfrm>
+      </p:grpSpPr>
+      <p:pic>
+        <p:nvPicPr>
+          <p:cNvPr id="10" name="Picture 9"/>
+          <p:cNvPicPr>
+            <a:picLocks noChangeAspect="1"/>
+          </p:cNvPicPr>
+          <p:nvPr/>
+        </p:nvPicPr>
+        <p:blipFill>
+          <a:blip r:embed="rId2">
+            <a:extLst>
+              <a:ext uri="{28A0092B-C50C-407E-A947-70E740481C1C}">
+                <a14:useLocalDpi xmlns:a14="http://schemas.microsoft.com/office/drawing/2010/main" val="0"/>
+              </a:ext>
+            </a:extLst>
+          </a:blip>
+          <a:stretch>
+            <a:fillRect/>
+          </a:stretch>
+        </p:blipFill>
+        <p:spPr>
+          <a:xfrm>
+            <a:off x="7120331" y="4350058"/>
+            <a:ext cx="1527651" cy="1086008"/>
+          </a:xfrm>
+          <a:prstGeom prst="rect">
+            <a:avLst/>
+          </a:prstGeom>
+        </p:spPr>
+      </p:pic>
+      <p:pic>
+        <p:nvPicPr>
+          <p:cNvPr id="4" name="Picture 3"/>
+          <p:cNvPicPr>
+            <a:picLocks noChangeAspect="1"/>
+          </p:cNvPicPr>
+          <p:nvPr/>
+        </p:nvPicPr>
+        <p:blipFill>
+          <a:blip r:embed="rId3">
+            <a:extLst>
+              <a:ext uri="{28A0092B-C50C-407E-A947-70E740481C1C}">
+                <a14:useLocalDpi xmlns:a14="http://schemas.microsoft.com/office/drawing/2010/main" val="0"/>
+              </a:ext>
+            </a:extLst>
+          </a:blip>
+          <a:stretch>
+            <a:fillRect/>
+          </a:stretch>
+        </p:blipFill>
+        <p:spPr>
+          <a:xfrm>
+            <a:off x="7014728" y="5298819"/>
+            <a:ext cx="695422" cy="1143160"/>
+          </a:xfrm>
+          <a:prstGeom prst="rect">
+            <a:avLst/>
+          </a:prstGeom>
+        </p:spPr>
+      </p:pic>
+      <p:pic>
+        <p:nvPicPr>
+          <p:cNvPr id="5" name="Picture 4"/>
+          <p:cNvPicPr>
+            <a:picLocks noChangeAspect="1"/>
+          </p:cNvPicPr>
+          <p:nvPr/>
+        </p:nvPicPr>
+        <p:blipFill>
+          <a:blip r:embed="rId4">
+            <a:extLst>
+              <a:ext uri="{28A0092B-C50C-407E-A947-70E740481C1C}">
+                <a14:useLocalDpi xmlns:a14="http://schemas.microsoft.com/office/drawing/2010/main" val="0"/>
+              </a:ext>
+            </a:extLst>
+          </a:blip>
+          <a:stretch>
+            <a:fillRect/>
+          </a:stretch>
+        </p:blipFill>
+        <p:spPr>
+          <a:xfrm>
+            <a:off x="6589403" y="4718458"/>
+            <a:ext cx="514422" cy="952633"/>
+          </a:xfrm>
+          <a:prstGeom prst="rect">
+            <a:avLst/>
+          </a:prstGeom>
+        </p:spPr>
+      </p:pic>
+      <p:pic>
+        <p:nvPicPr>
+          <p:cNvPr id="6" name="Picture 5"/>
+          <p:cNvPicPr>
+            <a:picLocks noChangeAspect="1"/>
+          </p:cNvPicPr>
+          <p:nvPr/>
+        </p:nvPicPr>
+        <p:blipFill>
+          <a:blip r:embed="rId5">
+            <a:extLst>
+              <a:ext uri="{28A0092B-C50C-407E-A947-70E740481C1C}">
+                <a14:useLocalDpi xmlns:a14="http://schemas.microsoft.com/office/drawing/2010/main" val="0"/>
+              </a:ext>
+            </a:extLst>
+          </a:blip>
+          <a:stretch>
+            <a:fillRect/>
+          </a:stretch>
+        </p:blipFill>
+        <p:spPr>
+          <a:xfrm>
+            <a:off x="5681236" y="5308845"/>
+            <a:ext cx="535282" cy="938576"/>
+          </a:xfrm>
+          <a:prstGeom prst="rect">
+            <a:avLst/>
+          </a:prstGeom>
+        </p:spPr>
+      </p:pic>
+      <p:pic>
+        <p:nvPicPr>
+          <p:cNvPr id="7" name="Picture 6"/>
+          <p:cNvPicPr>
+            <a:picLocks noChangeAspect="1"/>
+          </p:cNvPicPr>
+          <p:nvPr/>
+        </p:nvPicPr>
+        <p:blipFill>
+          <a:blip r:embed="rId6" cstate="print">
+            <a:extLst>
+              <a:ext uri="{28A0092B-C50C-407E-A947-70E740481C1C}">
+                <a14:useLocalDpi xmlns:a14="http://schemas.microsoft.com/office/drawing/2010/main" val="0"/>
+              </a:ext>
+            </a:extLst>
+          </a:blip>
+          <a:stretch>
+            <a:fillRect/>
+          </a:stretch>
+        </p:blipFill>
+        <p:spPr>
+          <a:xfrm>
+            <a:off x="6205490" y="5836460"/>
+            <a:ext cx="466953" cy="687847"/>
+          </a:xfrm>
+          <a:prstGeom prst="rect">
+            <a:avLst/>
+          </a:prstGeom>
+        </p:spPr>
+      </p:pic>
+      <p:pic>
+        <p:nvPicPr>
+          <p:cNvPr id="8" name="Picture 7"/>
+          <p:cNvPicPr>
+            <a:picLocks noChangeAspect="1"/>
+          </p:cNvPicPr>
+          <p:nvPr/>
+        </p:nvPicPr>
+        <p:blipFill>
+          <a:blip r:embed="rId7">
+            <a:extLst>
+              <a:ext uri="{28A0092B-C50C-407E-A947-70E740481C1C}">
+                <a14:useLocalDpi xmlns:a14="http://schemas.microsoft.com/office/drawing/2010/main" val="0"/>
+              </a:ext>
+            </a:extLst>
+          </a:blip>
+          <a:stretch>
+            <a:fillRect/>
+          </a:stretch>
+        </p:blipFill>
+        <p:spPr>
+          <a:xfrm>
+            <a:off x="7774341" y="5495277"/>
+            <a:ext cx="1019493" cy="918979"/>
+          </a:xfrm>
+          <a:prstGeom prst="rect">
+            <a:avLst/>
+          </a:prstGeom>
+        </p:spPr>
+      </p:pic>
+      <p:pic>
+        <p:nvPicPr>
+          <p:cNvPr id="9" name="Picture 8"/>
+          <p:cNvPicPr>
+            <a:picLocks noChangeAspect="1"/>
+          </p:cNvPicPr>
+          <p:nvPr/>
+        </p:nvPicPr>
+        <p:blipFill>
+          <a:blip r:embed="rId8">
+            <a:extLst>
+              <a:ext uri="{28A0092B-C50C-407E-A947-70E740481C1C}">
+                <a14:useLocalDpi xmlns:a14="http://schemas.microsoft.com/office/drawing/2010/main" val="0"/>
+              </a:ext>
+            </a:extLst>
+          </a:blip>
+          <a:stretch>
+            <a:fillRect/>
+          </a:stretch>
+        </p:blipFill>
+        <p:spPr>
+          <a:xfrm>
+            <a:off x="5326602" y="4376697"/>
+            <a:ext cx="1160678" cy="827770"/>
+          </a:xfrm>
+          <a:prstGeom prst="rect">
+            <a:avLst/>
+          </a:prstGeom>
+        </p:spPr>
+      </p:pic>
+    </p:spTree>
+    <p:extLst>
+      <p:ext uri="{BB962C8B-B14F-4D97-AF65-F5344CB8AC3E}">
+        <p14:creationId xmlns:p14="http://schemas.microsoft.com/office/powerpoint/2010/main" val="1764014461"/>
+      </p:ext>
+    </p:extLst>
+  </p:cSld>
+  <p:clrMapOvr>
+    <a:masterClrMapping/>
+  </p:clrMapOvr>
 </p:sld>
 </file>
 

</xml_diff>

<commit_message>
Added initial Node.js docs
</commit_message>
<xml_diff>
--- a/_sources/GettingStarted.pptx
+++ b/_sources/GettingStarted.pptx
@@ -917,7 +917,7 @@
         <a:lstStyle/>
         <a:p>
           <a:r>
-            <a:rPr lang="en-US" sz="1400" b="1" dirty="0" smtClean="0"/>
+            <a:rPr lang="en-US" sz="1400" b="1" dirty="0"/>
             <a:t>package</a:t>
           </a:r>
           <a:endParaRPr lang="de-DE" sz="1400" b="1" dirty="0"/>
@@ -960,7 +960,7 @@
         <a:lstStyle/>
         <a:p>
           <a:r>
-            <a:rPr lang="en-US" sz="1400" b="1" dirty="0" smtClean="0"/>
+            <a:rPr lang="en-US" sz="1400" b="1" dirty="0"/>
             <a:t>pre-integration-test</a:t>
           </a:r>
           <a:endParaRPr lang="de-DE" sz="1400" b="1" dirty="0"/>
@@ -1003,7 +1003,7 @@
         <a:lstStyle/>
         <a:p>
           <a:r>
-            <a:rPr lang="en-US" sz="1400" b="1" dirty="0" smtClean="0"/>
+            <a:rPr lang="en-US" sz="1400" b="1" dirty="0"/>
             <a:t>integration-test</a:t>
           </a:r>
           <a:endParaRPr lang="de-DE" sz="1400" b="1" dirty="0"/>
@@ -1046,7 +1046,7 @@
         <a:lstStyle/>
         <a:p>
           <a:r>
-            <a:rPr lang="en-US" sz="1400" b="1" dirty="0" smtClean="0"/>
+            <a:rPr lang="en-US" sz="1400" b="1" dirty="0"/>
             <a:t>post-integration-test</a:t>
           </a:r>
           <a:endParaRPr lang="de-DE" sz="1400" b="1" dirty="0"/>
@@ -1089,7 +1089,7 @@
         <a:lstStyle/>
         <a:p>
           <a:r>
-            <a:rPr lang="en-US" sz="1400" b="1" dirty="0" smtClean="0"/>
+            <a:rPr lang="en-US" sz="1400" b="1" dirty="0"/>
             <a:t>deploy</a:t>
           </a:r>
           <a:endParaRPr lang="de-DE" sz="1400" b="1" dirty="0"/>
@@ -1137,13 +1137,6 @@
         </dgm:presLayoutVars>
       </dgm:prSet>
       <dgm:spPr/>
-      <dgm:t>
-        <a:bodyPr/>
-        <a:lstStyle/>
-        <a:p>
-          <a:endParaRPr lang="de-DE"/>
-        </a:p>
-      </dgm:t>
     </dgm:pt>
     <dgm:pt modelId="{9F477FD7-EE8B-449F-9A31-7EBE455C9E41}" type="pres">
       <dgm:prSet presAssocID="{2DCEDA11-AF4A-475D-A66D-2E9523CAABC4}" presName="parTxOnlySpace" presStyleCnt="0"/>
@@ -1158,13 +1151,6 @@
         </dgm:presLayoutVars>
       </dgm:prSet>
       <dgm:spPr/>
-      <dgm:t>
-        <a:bodyPr/>
-        <a:lstStyle/>
-        <a:p>
-          <a:endParaRPr lang="de-DE"/>
-        </a:p>
-      </dgm:t>
     </dgm:pt>
     <dgm:pt modelId="{EEA037F7-AE2F-4302-AA11-228240B9A75D}" type="pres">
       <dgm:prSet presAssocID="{FCB00572-1C8F-4B6D-968B-B082338556BC}" presName="parTxOnlySpace" presStyleCnt="0"/>
@@ -1179,13 +1165,6 @@
         </dgm:presLayoutVars>
       </dgm:prSet>
       <dgm:spPr/>
-      <dgm:t>
-        <a:bodyPr/>
-        <a:lstStyle/>
-        <a:p>
-          <a:endParaRPr lang="de-DE"/>
-        </a:p>
-      </dgm:t>
     </dgm:pt>
     <dgm:pt modelId="{C865F029-8CEF-4314-9C3B-0D8926907D83}" type="pres">
       <dgm:prSet presAssocID="{1D3C9E28-C2BE-4DF6-99F3-BB5CC8E8C51A}" presName="parTxOnlySpace" presStyleCnt="0"/>
@@ -1200,13 +1179,6 @@
         </dgm:presLayoutVars>
       </dgm:prSet>
       <dgm:spPr/>
-      <dgm:t>
-        <a:bodyPr/>
-        <a:lstStyle/>
-        <a:p>
-          <a:endParaRPr lang="de-DE"/>
-        </a:p>
-      </dgm:t>
     </dgm:pt>
     <dgm:pt modelId="{48E0258A-CCF0-4FE0-A8A2-A7F4B1729A29}" type="pres">
       <dgm:prSet presAssocID="{84265283-6A79-49F9-86CC-89FACB483873}" presName="parTxOnlySpace" presStyleCnt="0"/>
@@ -1221,13 +1193,6 @@
         </dgm:presLayoutVars>
       </dgm:prSet>
       <dgm:spPr/>
-      <dgm:t>
-        <a:bodyPr/>
-        <a:lstStyle/>
-        <a:p>
-          <a:endParaRPr lang="de-DE"/>
-        </a:p>
-      </dgm:t>
     </dgm:pt>
   </dgm:ptLst>
   <dgm:cxnLst>
@@ -1334,7 +1299,7 @@
             </a:spcAft>
           </a:pPr>
           <a:r>
-            <a:rPr lang="en-US" sz="1400" b="1" kern="1200" dirty="0" smtClean="0"/>
+            <a:rPr lang="en-US" sz="1400" b="1" kern="1200" dirty="0"/>
             <a:t>package</a:t>
           </a:r>
           <a:endParaRPr lang="de-DE" sz="1400" b="1" kern="1200" dirty="0"/>
@@ -1409,7 +1374,7 @@
             </a:spcAft>
           </a:pPr>
           <a:r>
-            <a:rPr lang="en-US" sz="1400" b="1" kern="1200" dirty="0" smtClean="0"/>
+            <a:rPr lang="en-US" sz="1400" b="1" kern="1200" dirty="0"/>
             <a:t>pre-integration-test</a:t>
           </a:r>
           <a:endParaRPr lang="de-DE" sz="1400" b="1" kern="1200" dirty="0"/>
@@ -1484,7 +1449,7 @@
             </a:spcAft>
           </a:pPr>
           <a:r>
-            <a:rPr lang="en-US" sz="1400" b="1" kern="1200" dirty="0" smtClean="0"/>
+            <a:rPr lang="en-US" sz="1400" b="1" kern="1200" dirty="0"/>
             <a:t>integration-test</a:t>
           </a:r>
           <a:endParaRPr lang="de-DE" sz="1400" b="1" kern="1200" dirty="0"/>
@@ -1559,7 +1524,7 @@
             </a:spcAft>
           </a:pPr>
           <a:r>
-            <a:rPr lang="en-US" sz="1400" b="1" kern="1200" dirty="0" smtClean="0"/>
+            <a:rPr lang="en-US" sz="1400" b="1" kern="1200" dirty="0"/>
             <a:t>post-integration-test</a:t>
           </a:r>
           <a:endParaRPr lang="de-DE" sz="1400" b="1" kern="1200" dirty="0"/>
@@ -1634,7 +1599,7 @@
             </a:spcAft>
           </a:pPr>
           <a:r>
-            <a:rPr lang="en-US" sz="1400" b="1" kern="1200" dirty="0" smtClean="0"/>
+            <a:rPr lang="en-US" sz="1400" b="1" kern="1200" dirty="0"/>
             <a:t>deploy</a:t>
           </a:r>
           <a:endParaRPr lang="de-DE" sz="1400" b="1" kern="1200" dirty="0"/>
@@ -3008,7 +2973,7 @@
           </a:lstStyle>
           <a:p>
             <a:r>
-              <a:rPr lang="en-US" smtClean="0"/>
+              <a:rPr lang="en-US"/>
               <a:t>Click to edit Master title style</a:t>
             </a:r>
             <a:endParaRPr lang="en-US" dirty="0"/>
@@ -3073,7 +3038,7 @@
           </a:lstStyle>
           <a:p>
             <a:r>
-              <a:rPr lang="en-US" smtClean="0"/>
+              <a:rPr lang="en-US"/>
               <a:t>Click to edit Master subtitle style</a:t>
             </a:r>
             <a:endParaRPr lang="en-US" dirty="0"/>
@@ -3097,7 +3062,7 @@
           <a:p>
             <a:fld id="{9AA7D095-A676-4F6B-9416-D65D798F5244}" type="datetimeFigureOut">
               <a:rPr lang="de-DE" smtClean="0"/>
-              <a:t>11.02.2016</a:t>
+              <a:t>03.03.2016</a:t>
             </a:fld>
             <a:endParaRPr lang="de-DE"/>
           </a:p>
@@ -3191,7 +3156,7 @@
           <a:lstStyle/>
           <a:p>
             <a:r>
-              <a:rPr lang="en-US" smtClean="0"/>
+              <a:rPr lang="en-US"/>
               <a:t>Click to edit Master title style</a:t>
             </a:r>
             <a:endParaRPr lang="en-US" dirty="0"/>
@@ -3215,35 +3180,35 @@
           <a:p>
             <a:pPr lvl="0"/>
             <a:r>
-              <a:rPr lang="en-US" smtClean="0"/>
+              <a:rPr lang="en-US"/>
               <a:t>Click to edit Master text styles</a:t>
             </a:r>
           </a:p>
           <a:p>
             <a:pPr lvl="1"/>
             <a:r>
-              <a:rPr lang="en-US" smtClean="0"/>
+              <a:rPr lang="en-US"/>
               <a:t>Second level</a:t>
             </a:r>
           </a:p>
           <a:p>
             <a:pPr lvl="2"/>
             <a:r>
-              <a:rPr lang="en-US" smtClean="0"/>
+              <a:rPr lang="en-US"/>
               <a:t>Third level</a:t>
             </a:r>
           </a:p>
           <a:p>
             <a:pPr lvl="3"/>
             <a:r>
-              <a:rPr lang="en-US" smtClean="0"/>
+              <a:rPr lang="en-US"/>
               <a:t>Fourth level</a:t>
             </a:r>
           </a:p>
           <a:p>
             <a:pPr lvl="4"/>
             <a:r>
-              <a:rPr lang="en-US" smtClean="0"/>
+              <a:rPr lang="en-US"/>
               <a:t>Fifth level</a:t>
             </a:r>
             <a:endParaRPr lang="en-US" dirty="0"/>
@@ -3267,7 +3232,7 @@
           <a:p>
             <a:fld id="{9AA7D095-A676-4F6B-9416-D65D798F5244}" type="datetimeFigureOut">
               <a:rPr lang="de-DE" smtClean="0"/>
-              <a:t>11.02.2016</a:t>
+              <a:t>03.03.2016</a:t>
             </a:fld>
             <a:endParaRPr lang="de-DE"/>
           </a:p>
@@ -3366,7 +3331,7 @@
           <a:lstStyle/>
           <a:p>
             <a:r>
-              <a:rPr lang="en-US" smtClean="0"/>
+              <a:rPr lang="en-US"/>
               <a:t>Click to edit Master title style</a:t>
             </a:r>
             <a:endParaRPr lang="en-US" dirty="0"/>
@@ -3395,35 +3360,35 @@
           <a:p>
             <a:pPr lvl="0"/>
             <a:r>
-              <a:rPr lang="en-US" smtClean="0"/>
+              <a:rPr lang="en-US"/>
               <a:t>Click to edit Master text styles</a:t>
             </a:r>
           </a:p>
           <a:p>
             <a:pPr lvl="1"/>
             <a:r>
-              <a:rPr lang="en-US" smtClean="0"/>
+              <a:rPr lang="en-US"/>
               <a:t>Second level</a:t>
             </a:r>
           </a:p>
           <a:p>
             <a:pPr lvl="2"/>
             <a:r>
-              <a:rPr lang="en-US" smtClean="0"/>
+              <a:rPr lang="en-US"/>
               <a:t>Third level</a:t>
             </a:r>
           </a:p>
           <a:p>
             <a:pPr lvl="3"/>
             <a:r>
-              <a:rPr lang="en-US" smtClean="0"/>
+              <a:rPr lang="en-US"/>
               <a:t>Fourth level</a:t>
             </a:r>
           </a:p>
           <a:p>
             <a:pPr lvl="4"/>
             <a:r>
-              <a:rPr lang="en-US" smtClean="0"/>
+              <a:rPr lang="en-US"/>
               <a:t>Fifth level</a:t>
             </a:r>
             <a:endParaRPr lang="en-US" dirty="0"/>
@@ -3447,7 +3412,7 @@
           <a:p>
             <a:fld id="{9AA7D095-A676-4F6B-9416-D65D798F5244}" type="datetimeFigureOut">
               <a:rPr lang="de-DE" smtClean="0"/>
-              <a:t>11.02.2016</a:t>
+              <a:t>03.03.2016</a:t>
             </a:fld>
             <a:endParaRPr lang="de-DE"/>
           </a:p>
@@ -3541,7 +3506,7 @@
           <a:lstStyle/>
           <a:p>
             <a:r>
-              <a:rPr lang="en-US" smtClean="0"/>
+              <a:rPr lang="en-US"/>
               <a:t>Click to edit Master title style</a:t>
             </a:r>
             <a:endParaRPr lang="en-US" dirty="0"/>
@@ -3565,35 +3530,35 @@
           <a:p>
             <a:pPr lvl="0"/>
             <a:r>
-              <a:rPr lang="en-US" smtClean="0"/>
+              <a:rPr lang="en-US"/>
               <a:t>Click to edit Master text styles</a:t>
             </a:r>
           </a:p>
           <a:p>
             <a:pPr lvl="1"/>
             <a:r>
-              <a:rPr lang="en-US" smtClean="0"/>
+              <a:rPr lang="en-US"/>
               <a:t>Second level</a:t>
             </a:r>
           </a:p>
           <a:p>
             <a:pPr lvl="2"/>
             <a:r>
-              <a:rPr lang="en-US" smtClean="0"/>
+              <a:rPr lang="en-US"/>
               <a:t>Third level</a:t>
             </a:r>
           </a:p>
           <a:p>
             <a:pPr lvl="3"/>
             <a:r>
-              <a:rPr lang="en-US" smtClean="0"/>
+              <a:rPr lang="en-US"/>
               <a:t>Fourth level</a:t>
             </a:r>
           </a:p>
           <a:p>
             <a:pPr lvl="4"/>
             <a:r>
-              <a:rPr lang="en-US" smtClean="0"/>
+              <a:rPr lang="en-US"/>
               <a:t>Fifth level</a:t>
             </a:r>
             <a:endParaRPr lang="en-US" dirty="0"/>
@@ -3617,7 +3582,7 @@
           <a:p>
             <a:fld id="{9AA7D095-A676-4F6B-9416-D65D798F5244}" type="datetimeFigureOut">
               <a:rPr lang="de-DE" smtClean="0"/>
-              <a:t>11.02.2016</a:t>
+              <a:t>03.03.2016</a:t>
             </a:fld>
             <a:endParaRPr lang="de-DE"/>
           </a:p>
@@ -3720,7 +3685,7 @@
           </a:lstStyle>
           <a:p>
             <a:r>
-              <a:rPr lang="en-US" smtClean="0"/>
+              <a:rPr lang="en-US"/>
               <a:t>Click to edit Master title style</a:t>
             </a:r>
             <a:endParaRPr lang="en-US" dirty="0"/>
@@ -3840,7 +3805,7 @@
           <a:p>
             <a:pPr lvl="0"/>
             <a:r>
-              <a:rPr lang="en-US" smtClean="0"/>
+              <a:rPr lang="en-US"/>
               <a:t>Click to edit Master text styles</a:t>
             </a:r>
           </a:p>
@@ -3863,7 +3828,7 @@
           <a:p>
             <a:fld id="{9AA7D095-A676-4F6B-9416-D65D798F5244}" type="datetimeFigureOut">
               <a:rPr lang="de-DE" smtClean="0"/>
-              <a:t>11.02.2016</a:t>
+              <a:t>03.03.2016</a:t>
             </a:fld>
             <a:endParaRPr lang="de-DE"/>
           </a:p>
@@ -3957,7 +3922,7 @@
           <a:lstStyle/>
           <a:p>
             <a:r>
-              <a:rPr lang="en-US" smtClean="0"/>
+              <a:rPr lang="en-US"/>
               <a:t>Click to edit Master title style</a:t>
             </a:r>
             <a:endParaRPr lang="en-US" dirty="0"/>
@@ -3986,35 +3951,35 @@
           <a:p>
             <a:pPr lvl="0"/>
             <a:r>
-              <a:rPr lang="en-US" smtClean="0"/>
+              <a:rPr lang="en-US"/>
               <a:t>Click to edit Master text styles</a:t>
             </a:r>
           </a:p>
           <a:p>
             <a:pPr lvl="1"/>
             <a:r>
-              <a:rPr lang="en-US" smtClean="0"/>
+              <a:rPr lang="en-US"/>
               <a:t>Second level</a:t>
             </a:r>
           </a:p>
           <a:p>
             <a:pPr lvl="2"/>
             <a:r>
-              <a:rPr lang="en-US" smtClean="0"/>
+              <a:rPr lang="en-US"/>
               <a:t>Third level</a:t>
             </a:r>
           </a:p>
           <a:p>
             <a:pPr lvl="3"/>
             <a:r>
-              <a:rPr lang="en-US" smtClean="0"/>
+              <a:rPr lang="en-US"/>
               <a:t>Fourth level</a:t>
             </a:r>
           </a:p>
           <a:p>
             <a:pPr lvl="4"/>
             <a:r>
-              <a:rPr lang="en-US" smtClean="0"/>
+              <a:rPr lang="en-US"/>
               <a:t>Fifth level</a:t>
             </a:r>
             <a:endParaRPr lang="en-US" dirty="0"/>
@@ -4043,35 +4008,35 @@
           <a:p>
             <a:pPr lvl="0"/>
             <a:r>
-              <a:rPr lang="en-US" smtClean="0"/>
+              <a:rPr lang="en-US"/>
               <a:t>Click to edit Master text styles</a:t>
             </a:r>
           </a:p>
           <a:p>
             <a:pPr lvl="1"/>
             <a:r>
-              <a:rPr lang="en-US" smtClean="0"/>
+              <a:rPr lang="en-US"/>
               <a:t>Second level</a:t>
             </a:r>
           </a:p>
           <a:p>
             <a:pPr lvl="2"/>
             <a:r>
-              <a:rPr lang="en-US" smtClean="0"/>
+              <a:rPr lang="en-US"/>
               <a:t>Third level</a:t>
             </a:r>
           </a:p>
           <a:p>
             <a:pPr lvl="3"/>
             <a:r>
-              <a:rPr lang="en-US" smtClean="0"/>
+              <a:rPr lang="en-US"/>
               <a:t>Fourth level</a:t>
             </a:r>
           </a:p>
           <a:p>
             <a:pPr lvl="4"/>
             <a:r>
-              <a:rPr lang="en-US" smtClean="0"/>
+              <a:rPr lang="en-US"/>
               <a:t>Fifth level</a:t>
             </a:r>
             <a:endParaRPr lang="en-US" dirty="0"/>
@@ -4095,7 +4060,7 @@
           <a:p>
             <a:fld id="{9AA7D095-A676-4F6B-9416-D65D798F5244}" type="datetimeFigureOut">
               <a:rPr lang="de-DE" smtClean="0"/>
-              <a:t>11.02.2016</a:t>
+              <a:t>03.03.2016</a:t>
             </a:fld>
             <a:endParaRPr lang="de-DE"/>
           </a:p>
@@ -4194,7 +4159,7 @@
           <a:lstStyle/>
           <a:p>
             <a:r>
-              <a:rPr lang="en-US" smtClean="0"/>
+              <a:rPr lang="en-US"/>
               <a:t>Click to edit Master title style</a:t>
             </a:r>
             <a:endParaRPr lang="en-US" dirty="0"/>
@@ -4260,7 +4225,7 @@
           <a:p>
             <a:pPr lvl="0"/>
             <a:r>
-              <a:rPr lang="en-US" smtClean="0"/>
+              <a:rPr lang="en-US"/>
               <a:t>Click to edit Master text styles</a:t>
             </a:r>
           </a:p>
@@ -4288,35 +4253,35 @@
           <a:p>
             <a:pPr lvl="0"/>
             <a:r>
-              <a:rPr lang="en-US" smtClean="0"/>
+              <a:rPr lang="en-US"/>
               <a:t>Click to edit Master text styles</a:t>
             </a:r>
           </a:p>
           <a:p>
             <a:pPr lvl="1"/>
             <a:r>
-              <a:rPr lang="en-US" smtClean="0"/>
+              <a:rPr lang="en-US"/>
               <a:t>Second level</a:t>
             </a:r>
           </a:p>
           <a:p>
             <a:pPr lvl="2"/>
             <a:r>
-              <a:rPr lang="en-US" smtClean="0"/>
+              <a:rPr lang="en-US"/>
               <a:t>Third level</a:t>
             </a:r>
           </a:p>
           <a:p>
             <a:pPr lvl="3"/>
             <a:r>
-              <a:rPr lang="en-US" smtClean="0"/>
+              <a:rPr lang="en-US"/>
               <a:t>Fourth level</a:t>
             </a:r>
           </a:p>
           <a:p>
             <a:pPr lvl="4"/>
             <a:r>
-              <a:rPr lang="en-US" smtClean="0"/>
+              <a:rPr lang="en-US"/>
               <a:t>Fifth level</a:t>
             </a:r>
             <a:endParaRPr lang="en-US" dirty="0"/>
@@ -4382,7 +4347,7 @@
           <a:p>
             <a:pPr lvl="0"/>
             <a:r>
-              <a:rPr lang="en-US" smtClean="0"/>
+              <a:rPr lang="en-US"/>
               <a:t>Click to edit Master text styles</a:t>
             </a:r>
           </a:p>
@@ -4410,35 +4375,35 @@
           <a:p>
             <a:pPr lvl="0"/>
             <a:r>
-              <a:rPr lang="en-US" smtClean="0"/>
+              <a:rPr lang="en-US"/>
               <a:t>Click to edit Master text styles</a:t>
             </a:r>
           </a:p>
           <a:p>
             <a:pPr lvl="1"/>
             <a:r>
-              <a:rPr lang="en-US" smtClean="0"/>
+              <a:rPr lang="en-US"/>
               <a:t>Second level</a:t>
             </a:r>
           </a:p>
           <a:p>
             <a:pPr lvl="2"/>
             <a:r>
-              <a:rPr lang="en-US" smtClean="0"/>
+              <a:rPr lang="en-US"/>
               <a:t>Third level</a:t>
             </a:r>
           </a:p>
           <a:p>
             <a:pPr lvl="3"/>
             <a:r>
-              <a:rPr lang="en-US" smtClean="0"/>
+              <a:rPr lang="en-US"/>
               <a:t>Fourth level</a:t>
             </a:r>
           </a:p>
           <a:p>
             <a:pPr lvl="4"/>
             <a:r>
-              <a:rPr lang="en-US" smtClean="0"/>
+              <a:rPr lang="en-US"/>
               <a:t>Fifth level</a:t>
             </a:r>
             <a:endParaRPr lang="en-US" dirty="0"/>
@@ -4462,7 +4427,7 @@
           <a:p>
             <a:fld id="{9AA7D095-A676-4F6B-9416-D65D798F5244}" type="datetimeFigureOut">
               <a:rPr lang="de-DE" smtClean="0"/>
-              <a:t>11.02.2016</a:t>
+              <a:t>03.03.2016</a:t>
             </a:fld>
             <a:endParaRPr lang="de-DE"/>
           </a:p>
@@ -4556,7 +4521,7 @@
           <a:lstStyle/>
           <a:p>
             <a:r>
-              <a:rPr lang="en-US" smtClean="0"/>
+              <a:rPr lang="en-US"/>
               <a:t>Click to edit Master title style</a:t>
             </a:r>
             <a:endParaRPr lang="en-US" dirty="0"/>
@@ -4580,7 +4545,7 @@
           <a:p>
             <a:fld id="{9AA7D095-A676-4F6B-9416-D65D798F5244}" type="datetimeFigureOut">
               <a:rPr lang="de-DE" smtClean="0"/>
-              <a:t>11.02.2016</a:t>
+              <a:t>03.03.2016</a:t>
             </a:fld>
             <a:endParaRPr lang="de-DE"/>
           </a:p>
@@ -4675,7 +4640,7 @@
           <a:p>
             <a:fld id="{9AA7D095-A676-4F6B-9416-D65D798F5244}" type="datetimeFigureOut">
               <a:rPr lang="de-DE" smtClean="0"/>
-              <a:t>11.02.2016</a:t>
+              <a:t>03.03.2016</a:t>
             </a:fld>
             <a:endParaRPr lang="de-DE"/>
           </a:p>
@@ -4778,7 +4743,7 @@
           </a:lstStyle>
           <a:p>
             <a:r>
-              <a:rPr lang="en-US" smtClean="0"/>
+              <a:rPr lang="en-US"/>
               <a:t>Click to edit Master title style</a:t>
             </a:r>
             <a:endParaRPr lang="en-US" dirty="0"/>
@@ -4835,35 +4800,35 @@
           <a:p>
             <a:pPr lvl="0"/>
             <a:r>
-              <a:rPr lang="en-US" smtClean="0"/>
+              <a:rPr lang="en-US"/>
               <a:t>Click to edit Master text styles</a:t>
             </a:r>
           </a:p>
           <a:p>
             <a:pPr lvl="1"/>
             <a:r>
-              <a:rPr lang="en-US" smtClean="0"/>
+              <a:rPr lang="en-US"/>
               <a:t>Second level</a:t>
             </a:r>
           </a:p>
           <a:p>
             <a:pPr lvl="2"/>
             <a:r>
-              <a:rPr lang="en-US" smtClean="0"/>
+              <a:rPr lang="en-US"/>
               <a:t>Third level</a:t>
             </a:r>
           </a:p>
           <a:p>
             <a:pPr lvl="3"/>
             <a:r>
-              <a:rPr lang="en-US" smtClean="0"/>
+              <a:rPr lang="en-US"/>
               <a:t>Fourth level</a:t>
             </a:r>
           </a:p>
           <a:p>
             <a:pPr lvl="4"/>
             <a:r>
-              <a:rPr lang="en-US" smtClean="0"/>
+              <a:rPr lang="en-US"/>
               <a:t>Fifth level</a:t>
             </a:r>
             <a:endParaRPr lang="en-US" dirty="0"/>
@@ -4929,7 +4894,7 @@
           <a:p>
             <a:pPr lvl="0"/>
             <a:r>
-              <a:rPr lang="en-US" smtClean="0"/>
+              <a:rPr lang="en-US"/>
               <a:t>Click to edit Master text styles</a:t>
             </a:r>
           </a:p>
@@ -4952,7 +4917,7 @@
           <a:p>
             <a:fld id="{9AA7D095-A676-4F6B-9416-D65D798F5244}" type="datetimeFigureOut">
               <a:rPr lang="de-DE" smtClean="0"/>
-              <a:t>11.02.2016</a:t>
+              <a:t>03.03.2016</a:t>
             </a:fld>
             <a:endParaRPr lang="de-DE"/>
           </a:p>
@@ -5055,7 +5020,7 @@
           </a:lstStyle>
           <a:p>
             <a:r>
-              <a:rPr lang="en-US" smtClean="0"/>
+              <a:rPr lang="en-US"/>
               <a:t>Click to edit Master title style</a:t>
             </a:r>
             <a:endParaRPr lang="en-US" dirty="0"/>
@@ -5120,7 +5085,7 @@
           </a:lstStyle>
           <a:p>
             <a:r>
-              <a:rPr lang="en-US" smtClean="0"/>
+              <a:rPr lang="en-US"/>
               <a:t>Click icon to add picture</a:t>
             </a:r>
             <a:endParaRPr lang="en-US" dirty="0"/>
@@ -5186,7 +5151,7 @@
           <a:p>
             <a:pPr lvl="0"/>
             <a:r>
-              <a:rPr lang="en-US" smtClean="0"/>
+              <a:rPr lang="en-US"/>
               <a:t>Click to edit Master text styles</a:t>
             </a:r>
           </a:p>
@@ -5209,7 +5174,7 @@
           <a:p>
             <a:fld id="{9AA7D095-A676-4F6B-9416-D65D798F5244}" type="datetimeFigureOut">
               <a:rPr lang="de-DE" smtClean="0"/>
-              <a:t>11.02.2016</a:t>
+              <a:t>03.03.2016</a:t>
             </a:fld>
             <a:endParaRPr lang="de-DE"/>
           </a:p>
@@ -5318,7 +5283,7 @@
           <a:lstStyle/>
           <a:p>
             <a:r>
-              <a:rPr lang="en-US" smtClean="0"/>
+              <a:rPr lang="en-US"/>
               <a:t>Click to edit Master title style</a:t>
             </a:r>
             <a:endParaRPr lang="en-US" dirty="0"/>
@@ -5352,35 +5317,35 @@
           <a:p>
             <a:pPr lvl="0"/>
             <a:r>
-              <a:rPr lang="en-US" smtClean="0"/>
+              <a:rPr lang="en-US"/>
               <a:t>Click to edit Master text styles</a:t>
             </a:r>
           </a:p>
           <a:p>
             <a:pPr lvl="1"/>
             <a:r>
-              <a:rPr lang="en-US" smtClean="0"/>
+              <a:rPr lang="en-US"/>
               <a:t>Second level</a:t>
             </a:r>
           </a:p>
           <a:p>
             <a:pPr lvl="2"/>
             <a:r>
-              <a:rPr lang="en-US" smtClean="0"/>
+              <a:rPr lang="en-US"/>
               <a:t>Third level</a:t>
             </a:r>
           </a:p>
           <a:p>
             <a:pPr lvl="3"/>
             <a:r>
-              <a:rPr lang="en-US" smtClean="0"/>
+              <a:rPr lang="en-US"/>
               <a:t>Fourth level</a:t>
             </a:r>
           </a:p>
           <a:p>
             <a:pPr lvl="4"/>
             <a:r>
-              <a:rPr lang="en-US" smtClean="0"/>
+              <a:rPr lang="en-US"/>
               <a:t>Fifth level</a:t>
             </a:r>
             <a:endParaRPr lang="en-US" dirty="0"/>
@@ -5422,7 +5387,7 @@
           <a:p>
             <a:fld id="{9AA7D095-A676-4F6B-9416-D65D798F5244}" type="datetimeFigureOut">
               <a:rPr lang="de-DE" smtClean="0"/>
-              <a:t>11.02.2016</a:t>
+              <a:t>03.03.2016</a:t>
             </a:fld>
             <a:endParaRPr lang="de-DE"/>
           </a:p>
@@ -6140,7 +6105,7 @@
               <a:p>
                 <a:pPr algn="ctr"/>
                 <a:r>
-                  <a:rPr lang="en-US" sz="3600" b="1" dirty="0" smtClean="0">
+                  <a:rPr lang="en-US" sz="3600" b="1" dirty="0">
                     <a:solidFill>
                       <a:schemeClr val="bg1"/>
                     </a:solidFill>
@@ -6151,7 +6116,7 @@
               <a:p>
                 <a:pPr algn="ctr"/>
                 <a:r>
-                  <a:rPr lang="en-US" sz="3600" b="1" dirty="0" err="1" smtClean="0">
+                  <a:rPr lang="en-US" sz="3600" b="1" dirty="0" err="1">
                     <a:solidFill>
                       <a:schemeClr val="bg1"/>
                     </a:solidFill>
@@ -6159,7 +6124,7 @@
                   <a:t>Dist</a:t>
                 </a:r>
                 <a:r>
-                  <a:rPr lang="en-US" sz="3600" b="1" dirty="0" smtClean="0">
+                  <a:rPr lang="en-US" sz="3600" b="1" dirty="0">
                     <a:solidFill>
                       <a:schemeClr val="bg1"/>
                     </a:solidFill>
@@ -6396,41 +6361,14 @@
                   </a:schemeClr>
                 </a:solidFill>
               </a:rPr>
-              <a:t> </a:t>
+              <a:t> Bootable App</a:t>
             </a:r>
-            <a:r>
-              <a:rPr lang="en-US" sz="4000" b="1" dirty="0" smtClean="0">
-                <a:solidFill>
-                  <a:schemeClr val="bg2">
-                    <a:lumMod val="25000"/>
-                  </a:schemeClr>
-                </a:solidFill>
-              </a:rPr>
-              <a:t>Bootable App</a:t>
-            </a:r>
-            <a:endParaRPr lang="en-US" sz="4000" b="1" dirty="0">
-              <a:solidFill>
-                <a:schemeClr val="bg2">
-                  <a:lumMod val="25000"/>
-                </a:schemeClr>
-              </a:solidFill>
-            </a:endParaRPr>
           </a:p>
           <a:p>
             <a:pPr marL="571500" indent="-571500">
               <a:buFont typeface="Wingdings" panose="05000000000000000000" pitchFamily="2" charset="2"/>
               <a:buChar char="ü"/>
             </a:pPr>
-            <a:r>
-              <a:rPr lang="en-US" sz="3200" b="1" dirty="0" smtClean="0">
-                <a:solidFill>
-                  <a:schemeClr val="bg1">
-                    <a:lumMod val="50000"/>
-                  </a:schemeClr>
-                </a:solidFill>
-              </a:rPr>
-              <a:t>minimal </a:t>
-            </a:r>
             <a:r>
               <a:rPr lang="en-US" sz="3200" b="1" dirty="0">
                 <a:solidFill>
@@ -6439,37 +6377,7 @@
                   </a:schemeClr>
                 </a:solidFill>
               </a:rPr>
-              <a:t>Linux-based </a:t>
-            </a:r>
-            <a:r>
-              <a:rPr lang="en-US" sz="3200" b="1" dirty="0" smtClean="0">
-                <a:solidFill>
-                  <a:schemeClr val="bg1">
-                    <a:lumMod val="50000"/>
-                  </a:schemeClr>
-                </a:solidFill>
-              </a:rPr>
-              <a:t>Image (100x </a:t>
-            </a:r>
-            <a:r>
-              <a:rPr lang="en-US" sz="3200" b="1" dirty="0">
-                <a:solidFill>
-                  <a:schemeClr val="bg1">
-                    <a:lumMod val="50000"/>
-                  </a:schemeClr>
-                </a:solidFill>
-              </a:rPr>
-              <a:t>smaller</a:t>
-            </a:r>
-            <a:r>
-              <a:rPr lang="en-US" sz="3200" b="1" dirty="0" smtClean="0">
-                <a:solidFill>
-                  <a:schemeClr val="bg1">
-                    <a:lumMod val="50000"/>
-                  </a:schemeClr>
-                </a:solidFill>
-              </a:rPr>
-              <a:t>)</a:t>
+              <a:t>minimal Linux-based Image (100x smaller)</a:t>
             </a:r>
           </a:p>
           <a:p>
@@ -6478,7 +6386,7 @@
               <a:buChar char="ü"/>
             </a:pPr>
             <a:r>
-              <a:rPr lang="en-US" sz="3200" b="1" dirty="0" smtClean="0">
+              <a:rPr lang="en-US" sz="3200" b="1" dirty="0">
                 <a:solidFill>
                   <a:schemeClr val="bg1">
                     <a:lumMod val="50000"/>
@@ -6501,27 +6409,7 @@
                   </a:schemeClr>
                 </a:solidFill>
               </a:rPr>
-              <a:t>contains </a:t>
-            </a:r>
-            <a:r>
-              <a:rPr lang="en-US" sz="3200" b="1" dirty="0" smtClean="0">
-                <a:solidFill>
-                  <a:schemeClr val="bg1">
-                    <a:lumMod val="50000"/>
-                  </a:schemeClr>
-                </a:solidFill>
-              </a:rPr>
-              <a:t>only App</a:t>
-            </a:r>
-            <a:r>
-              <a:rPr lang="en-US" sz="3200" b="1" dirty="0">
-                <a:solidFill>
-                  <a:schemeClr val="bg1">
-                    <a:lumMod val="50000"/>
-                  </a:schemeClr>
-                </a:solidFill>
-              </a:rPr>
-              <a:t>, JVM &amp; Linux kernel</a:t>
+              <a:t>contains only App, JVM &amp; Linux kernel</a:t>
             </a:r>
           </a:p>
           <a:p>
@@ -6530,7 +6418,7 @@
               <a:buChar char="ü"/>
             </a:pPr>
             <a:r>
-              <a:rPr lang="en-US" sz="3200" b="1" dirty="0" smtClean="0">
+              <a:rPr lang="en-US" sz="3200" b="1" dirty="0">
                 <a:solidFill>
                   <a:schemeClr val="bg1">
                     <a:lumMod val="50000"/>
@@ -6546,7 +6434,7 @@
               <a:buChar char="ü"/>
             </a:pPr>
             <a:r>
-              <a:rPr lang="en-US" sz="3200" b="1" dirty="0" smtClean="0">
+              <a:rPr lang="en-US" sz="3200" b="1" dirty="0">
                 <a:solidFill>
                   <a:schemeClr val="bg1">
                     <a:lumMod val="50000"/>
@@ -6556,7 +6444,7 @@
               <a:t>boots directly on </a:t>
             </a:r>
             <a:r>
-              <a:rPr lang="en-US" sz="3200" b="1" dirty="0" err="1" smtClean="0">
+              <a:rPr lang="en-US" sz="3200" b="1" dirty="0" err="1">
                 <a:solidFill>
                   <a:schemeClr val="bg1">
                     <a:lumMod val="50000"/>
@@ -6566,7 +6454,7 @@
               <a:t>VirtualBox</a:t>
             </a:r>
             <a:r>
-              <a:rPr lang="en-US" sz="3200" b="1" dirty="0" smtClean="0">
+              <a:rPr lang="en-US" sz="3200" b="1" dirty="0">
                 <a:solidFill>
                   <a:schemeClr val="bg1">
                     <a:lumMod val="50000"/>
@@ -7106,7 +6994,7 @@
               <a:p>
                 <a:pPr algn="ctr"/>
                 <a:r>
-                  <a:rPr lang="en-US" sz="3600" b="1" dirty="0" smtClean="0">
+                  <a:rPr lang="en-US" sz="3600" b="1" dirty="0">
                     <a:solidFill>
                       <a:schemeClr val="bg1"/>
                     </a:solidFill>
@@ -7117,7 +7005,7 @@
               <a:p>
                 <a:pPr algn="ctr"/>
                 <a:r>
-                  <a:rPr lang="en-US" sz="3600" b="1" dirty="0" err="1" smtClean="0">
+                  <a:rPr lang="en-US" sz="3600" b="1" dirty="0" err="1">
                     <a:solidFill>
                       <a:schemeClr val="bg1"/>
                     </a:solidFill>
@@ -7125,7 +7013,7 @@
                   <a:t>Dist</a:t>
                 </a:r>
                 <a:r>
-                  <a:rPr lang="en-US" sz="3600" b="1" dirty="0" smtClean="0">
+                  <a:rPr lang="en-US" sz="3600" b="1" dirty="0">
                     <a:solidFill>
                       <a:schemeClr val="bg1"/>
                     </a:solidFill>
@@ -7362,41 +7250,14 @@
                   </a:schemeClr>
                 </a:solidFill>
               </a:rPr>
-              <a:t> </a:t>
+              <a:t> Bootable App</a:t>
             </a:r>
-            <a:r>
-              <a:rPr lang="en-US" sz="4000" b="1" dirty="0" smtClean="0">
-                <a:solidFill>
-                  <a:schemeClr val="bg2">
-                    <a:lumMod val="25000"/>
-                  </a:schemeClr>
-                </a:solidFill>
-              </a:rPr>
-              <a:t>Bootable App</a:t>
-            </a:r>
-            <a:endParaRPr lang="en-US" sz="4000" b="1" dirty="0">
-              <a:solidFill>
-                <a:schemeClr val="bg2">
-                  <a:lumMod val="25000"/>
-                </a:schemeClr>
-              </a:solidFill>
-            </a:endParaRPr>
           </a:p>
           <a:p>
             <a:pPr marL="571500" indent="-571500">
               <a:buFont typeface="Wingdings" panose="05000000000000000000" pitchFamily="2" charset="2"/>
               <a:buChar char="ü"/>
             </a:pPr>
-            <a:r>
-              <a:rPr lang="en-US" sz="3200" b="1" dirty="0" smtClean="0">
-                <a:solidFill>
-                  <a:schemeClr val="bg1">
-                    <a:lumMod val="50000"/>
-                  </a:schemeClr>
-                </a:solidFill>
-              </a:rPr>
-              <a:t>minimal </a:t>
-            </a:r>
             <a:r>
               <a:rPr lang="en-US" sz="3200" b="1" dirty="0">
                 <a:solidFill>
@@ -7405,37 +7266,7 @@
                   </a:schemeClr>
                 </a:solidFill>
               </a:rPr>
-              <a:t>Linux-based </a:t>
-            </a:r>
-            <a:r>
-              <a:rPr lang="en-US" sz="3200" b="1" dirty="0" smtClean="0">
-                <a:solidFill>
-                  <a:schemeClr val="bg1">
-                    <a:lumMod val="50000"/>
-                  </a:schemeClr>
-                </a:solidFill>
-              </a:rPr>
-              <a:t>Image (100x </a:t>
-            </a:r>
-            <a:r>
-              <a:rPr lang="en-US" sz="3200" b="1" dirty="0">
-                <a:solidFill>
-                  <a:schemeClr val="bg1">
-                    <a:lumMod val="50000"/>
-                  </a:schemeClr>
-                </a:solidFill>
-              </a:rPr>
-              <a:t>smaller</a:t>
-            </a:r>
-            <a:r>
-              <a:rPr lang="en-US" sz="3200" b="1" dirty="0" smtClean="0">
-                <a:solidFill>
-                  <a:schemeClr val="bg1">
-                    <a:lumMod val="50000"/>
-                  </a:schemeClr>
-                </a:solidFill>
-              </a:rPr>
-              <a:t>)</a:t>
+              <a:t>minimal Linux-based Image (100x smaller)</a:t>
             </a:r>
           </a:p>
           <a:p>
@@ -7444,7 +7275,7 @@
               <a:buChar char="ü"/>
             </a:pPr>
             <a:r>
-              <a:rPr lang="en-US" sz="3200" b="1" dirty="0" smtClean="0">
+              <a:rPr lang="en-US" sz="3200" b="1" dirty="0">
                 <a:solidFill>
                   <a:schemeClr val="bg1">
                     <a:lumMod val="50000"/>
@@ -7467,27 +7298,7 @@
                   </a:schemeClr>
                 </a:solidFill>
               </a:rPr>
-              <a:t>contains </a:t>
-            </a:r>
-            <a:r>
-              <a:rPr lang="en-US" sz="3200" b="1" dirty="0" smtClean="0">
-                <a:solidFill>
-                  <a:schemeClr val="bg1">
-                    <a:lumMod val="50000"/>
-                  </a:schemeClr>
-                </a:solidFill>
-              </a:rPr>
-              <a:t>only App</a:t>
-            </a:r>
-            <a:r>
-              <a:rPr lang="en-US" sz="3200" b="1" dirty="0">
-                <a:solidFill>
-                  <a:schemeClr val="bg1">
-                    <a:lumMod val="50000"/>
-                  </a:schemeClr>
-                </a:solidFill>
-              </a:rPr>
-              <a:t>, JVM &amp; Linux kernel</a:t>
+              <a:t>contains only App, JVM &amp; Linux kernel</a:t>
             </a:r>
           </a:p>
           <a:p>
@@ -7496,7 +7307,7 @@
               <a:buChar char="ü"/>
             </a:pPr>
             <a:r>
-              <a:rPr lang="en-US" sz="3200" b="1" dirty="0" smtClean="0">
+              <a:rPr lang="en-US" sz="3200" b="1" dirty="0">
                 <a:solidFill>
                   <a:schemeClr val="bg1">
                     <a:lumMod val="50000"/>
@@ -7512,7 +7323,7 @@
               <a:buChar char="ü"/>
             </a:pPr>
             <a:r>
-              <a:rPr lang="en-US" sz="3200" b="1" dirty="0" smtClean="0">
+              <a:rPr lang="en-US" sz="3200" b="1" dirty="0">
                 <a:solidFill>
                   <a:schemeClr val="bg1">
                     <a:lumMod val="50000"/>
@@ -7522,7 +7333,7 @@
               <a:t>boots directly on </a:t>
             </a:r>
             <a:r>
-              <a:rPr lang="en-US" sz="3200" b="1" dirty="0" err="1" smtClean="0">
+              <a:rPr lang="en-US" sz="3200" b="1" dirty="0" err="1">
                 <a:solidFill>
                   <a:schemeClr val="bg1">
                     <a:lumMod val="50000"/>
@@ -7532,7 +7343,7 @@
               <a:t>VirtualBox</a:t>
             </a:r>
             <a:r>
-              <a:rPr lang="en-US" sz="3200" b="1" dirty="0" smtClean="0">
+              <a:rPr lang="en-US" sz="3200" b="1" dirty="0">
                 <a:solidFill>
                   <a:schemeClr val="bg1">
                     <a:lumMod val="50000"/>
@@ -7825,7 +7636,7 @@
           <a:p>
             <a:pPr algn="ctr"/>
             <a:r>
-              <a:rPr lang="en-US" sz="3600" b="1" dirty="0" smtClean="0">
+              <a:rPr lang="en-US" sz="3600" b="1" dirty="0">
                 <a:solidFill>
                   <a:schemeClr val="bg1"/>
                 </a:solidFill>
@@ -7836,7 +7647,7 @@
           <a:p>
             <a:pPr algn="ctr"/>
             <a:r>
-              <a:rPr lang="en-US" sz="2300" b="1" dirty="0" smtClean="0">
+              <a:rPr lang="en-US" sz="2300" b="1" dirty="0">
                 <a:solidFill>
                   <a:schemeClr val="bg1"/>
                 </a:solidFill>
@@ -8020,41 +7831,14 @@
                   </a:schemeClr>
                 </a:solidFill>
               </a:rPr>
-              <a:t>Boxfuse </a:t>
+              <a:t>Boxfuse Minimal Image</a:t>
             </a:r>
-            <a:r>
-              <a:rPr lang="en-US" sz="4000" b="1" dirty="0" smtClean="0">
-                <a:solidFill>
-                  <a:schemeClr val="bg2">
-                    <a:lumMod val="25000"/>
-                  </a:schemeClr>
-                </a:solidFill>
-              </a:rPr>
-              <a:t>Minimal Image</a:t>
-            </a:r>
-            <a:endParaRPr lang="en-US" sz="4000" b="1" dirty="0">
-              <a:solidFill>
-                <a:schemeClr val="bg2">
-                  <a:lumMod val="25000"/>
-                </a:schemeClr>
-              </a:solidFill>
-            </a:endParaRPr>
           </a:p>
           <a:p>
             <a:pPr marL="571500" indent="-571500">
               <a:buFont typeface="Wingdings" panose="05000000000000000000" pitchFamily="2" charset="2"/>
               <a:buChar char="ü"/>
             </a:pPr>
-            <a:r>
-              <a:rPr lang="en-US" sz="3200" b="1" dirty="0" smtClean="0">
-                <a:solidFill>
-                  <a:schemeClr val="bg1">
-                    <a:lumMod val="50000"/>
-                  </a:schemeClr>
-                </a:solidFill>
-              </a:rPr>
-              <a:t>minimal </a:t>
-            </a:r>
             <a:r>
               <a:rPr lang="en-US" sz="3200" b="1" dirty="0">
                 <a:solidFill>
@@ -8063,37 +7847,7 @@
                   </a:schemeClr>
                 </a:solidFill>
               </a:rPr>
-              <a:t>Linux-based </a:t>
-            </a:r>
-            <a:r>
-              <a:rPr lang="en-US" sz="3200" b="1" dirty="0" smtClean="0">
-                <a:solidFill>
-                  <a:schemeClr val="bg1">
-                    <a:lumMod val="50000"/>
-                  </a:schemeClr>
-                </a:solidFill>
-              </a:rPr>
-              <a:t>Image (100x </a:t>
-            </a:r>
-            <a:r>
-              <a:rPr lang="en-US" sz="3200" b="1" dirty="0">
-                <a:solidFill>
-                  <a:schemeClr val="bg1">
-                    <a:lumMod val="50000"/>
-                  </a:schemeClr>
-                </a:solidFill>
-              </a:rPr>
-              <a:t>smaller</a:t>
-            </a:r>
-            <a:r>
-              <a:rPr lang="en-US" sz="3200" b="1" dirty="0" smtClean="0">
-                <a:solidFill>
-                  <a:schemeClr val="bg1">
-                    <a:lumMod val="50000"/>
-                  </a:schemeClr>
-                </a:solidFill>
-              </a:rPr>
-              <a:t>)</a:t>
+              <a:t>minimal Linux-based Image (100x smaller)</a:t>
             </a:r>
           </a:p>
           <a:p>
@@ -8102,7 +7856,7 @@
               <a:buChar char="ü"/>
             </a:pPr>
             <a:r>
-              <a:rPr lang="en-US" sz="3200" b="1" dirty="0" smtClean="0">
+              <a:rPr lang="en-US" sz="3200" b="1" dirty="0">
                 <a:solidFill>
                   <a:schemeClr val="bg1">
                     <a:lumMod val="50000"/>
@@ -8125,27 +7879,7 @@
                   </a:schemeClr>
                 </a:solidFill>
               </a:rPr>
-              <a:t>contains </a:t>
-            </a:r>
-            <a:r>
-              <a:rPr lang="en-US" sz="3200" b="1" dirty="0" smtClean="0">
-                <a:solidFill>
-                  <a:schemeClr val="bg1">
-                    <a:lumMod val="50000"/>
-                  </a:schemeClr>
-                </a:solidFill>
-              </a:rPr>
-              <a:t>only App</a:t>
-            </a:r>
-            <a:r>
-              <a:rPr lang="en-US" sz="3200" b="1" dirty="0">
-                <a:solidFill>
-                  <a:schemeClr val="bg1">
-                    <a:lumMod val="50000"/>
-                  </a:schemeClr>
-                </a:solidFill>
-              </a:rPr>
-              <a:t>, JVM &amp; Linux kernel</a:t>
+              <a:t>contains only App, JVM &amp; Linux kernel</a:t>
             </a:r>
           </a:p>
           <a:p>
@@ -8154,7 +7888,7 @@
               <a:buChar char="ü"/>
             </a:pPr>
             <a:r>
-              <a:rPr lang="en-US" sz="3200" b="1" dirty="0" smtClean="0">
+              <a:rPr lang="en-US" sz="3200" b="1" dirty="0">
                 <a:solidFill>
                   <a:schemeClr val="bg1">
                     <a:lumMod val="50000"/>
@@ -8170,7 +7904,7 @@
               <a:buChar char="ü"/>
             </a:pPr>
             <a:r>
-              <a:rPr lang="en-US" sz="3200" b="1" dirty="0" smtClean="0">
+              <a:rPr lang="en-US" sz="3200" b="1" dirty="0">
                 <a:solidFill>
                   <a:schemeClr val="bg1">
                     <a:lumMod val="50000"/>
@@ -8180,7 +7914,7 @@
               <a:t>boots directly on </a:t>
             </a:r>
             <a:r>
-              <a:rPr lang="en-US" sz="3200" b="1" dirty="0" err="1" smtClean="0">
+              <a:rPr lang="en-US" sz="3200" b="1" dirty="0" err="1">
                 <a:solidFill>
                   <a:schemeClr val="bg1">
                     <a:lumMod val="50000"/>
@@ -8190,7 +7924,7 @@
               <a:t>VirtualBox</a:t>
             </a:r>
             <a:r>
-              <a:rPr lang="en-US" sz="3200" b="1" dirty="0" smtClean="0">
+              <a:rPr lang="en-US" sz="3200" b="1" dirty="0">
                 <a:solidFill>
                   <a:schemeClr val="bg1">
                     <a:lumMod val="50000"/>
@@ -10870,21 +10604,13 @@
                     <a:schemeClr val="bg1"/>
                   </a:solidFill>
                 </a:rPr>
-                <a:t>Machine </a:t>
-              </a:r>
-              <a:r>
-                <a:rPr lang="en-US" sz="4800" b="1" dirty="0" smtClean="0">
-                  <a:solidFill>
-                    <a:schemeClr val="bg1"/>
-                  </a:solidFill>
-                </a:rPr>
-                <a:t>Image</a:t>
+                <a:t>Machine Image</a:t>
               </a:r>
             </a:p>
             <a:p>
               <a:pPr algn="ctr"/>
               <a:r>
-                <a:rPr lang="en-US" sz="4800" b="1" dirty="0" smtClean="0">
+                <a:rPr lang="en-US" sz="4800" b="1" dirty="0">
                   <a:solidFill>
                     <a:schemeClr val="bg1"/>
                   </a:solidFill>
@@ -10895,7 +10621,7 @@
             <a:p>
               <a:pPr algn="ctr"/>
               <a:r>
-                <a:rPr lang="en-US" sz="4800" b="1" dirty="0" smtClean="0">
+                <a:rPr lang="en-US" sz="4800" b="1" dirty="0">
                   <a:solidFill>
                     <a:schemeClr val="bg1"/>
                   </a:solidFill>
@@ -10936,27 +10662,7 @@
                   </a:schemeClr>
                 </a:solidFill>
               </a:rPr>
-              <a:t>Boxfuse </a:t>
-            </a:r>
-            <a:r>
-              <a:rPr lang="en-US" sz="4000" b="1" dirty="0" smtClean="0">
-                <a:solidFill>
-                  <a:schemeClr val="bg2">
-                    <a:lumMod val="25000"/>
-                  </a:schemeClr>
-                </a:solidFill>
-              </a:rPr>
-              <a:t>Micro </a:t>
-            </a:r>
-            <a:r>
-              <a:rPr lang="en-US" sz="4000" b="1" dirty="0">
-                <a:solidFill>
-                  <a:schemeClr val="bg2">
-                    <a:lumMod val="25000"/>
-                  </a:schemeClr>
-                </a:solidFill>
-              </a:rPr>
-              <a:t>OS</a:t>
+              <a:t>Boxfuse Micro OS</a:t>
             </a:r>
           </a:p>
           <a:p>
@@ -10965,7 +10671,7 @@
               <a:buChar char="ü"/>
             </a:pPr>
             <a:r>
-              <a:rPr lang="en-US" sz="3200" b="1" dirty="0" smtClean="0">
+              <a:rPr lang="en-US" sz="3200" b="1" dirty="0">
                 <a:solidFill>
                   <a:schemeClr val="bg1">
                     <a:lumMod val="50000"/>
@@ -10981,7 +10687,7 @@
               <a:buChar char="ü"/>
             </a:pPr>
             <a:r>
-              <a:rPr lang="en-US" sz="3200" b="1" dirty="0" smtClean="0">
+              <a:rPr lang="en-US" sz="3200" b="1" dirty="0">
                 <a:solidFill>
                   <a:schemeClr val="bg1">
                     <a:lumMod val="50000"/>
@@ -10997,7 +10703,7 @@
               <a:buChar char="ü"/>
             </a:pPr>
             <a:r>
-              <a:rPr lang="en-US" sz="3200" b="1" dirty="0" smtClean="0">
+              <a:rPr lang="en-US" sz="3200" b="1" dirty="0">
                 <a:solidFill>
                   <a:schemeClr val="bg1">
                     <a:lumMod val="50000"/>
@@ -12136,11 +11842,11 @@
           <a:p>
             <a:pPr algn="ctr"/>
             <a:r>
-              <a:rPr lang="en-US" sz="2800" b="1" dirty="0" err="1" smtClean="0"/>
+              <a:rPr lang="en-US" sz="2800" b="1" dirty="0" err="1"/>
               <a:t>ps</a:t>
             </a:r>
             <a:r>
-              <a:rPr lang="en-US" sz="2800" b="1" dirty="0" smtClean="0"/>
+              <a:rPr lang="en-US" sz="2800" b="1" dirty="0"/>
               <a:t> / info</a:t>
             </a:r>
             <a:endParaRPr lang="de-DE" sz="2800" b="1" dirty="0"/>
@@ -13741,11 +13447,11 @@
             <a:p>
               <a:pPr algn="ctr"/>
               <a:r>
-                <a:rPr lang="en-US" sz="2800" b="1" dirty="0" err="1" smtClean="0"/>
+                <a:rPr lang="en-US" sz="2800" b="1" dirty="0" err="1"/>
                 <a:t>rm</a:t>
               </a:r>
               <a:r>
-                <a:rPr lang="en-US" sz="2800" b="1" dirty="0" smtClean="0"/>
+                <a:rPr lang="en-US" sz="2800" b="1" dirty="0"/>
                 <a:t> -vault</a:t>
               </a:r>
               <a:endParaRPr lang="de-DE" sz="2800" b="1" dirty="0"/>
@@ -13826,7 +13532,7 @@
           <a:p>
             <a:pPr algn="ctr"/>
             <a:r>
-              <a:rPr lang="en-US" sz="2800" b="1" dirty="0" smtClean="0"/>
+              <a:rPr lang="en-US" sz="2800" b="1" dirty="0"/>
               <a:t>ls -vault</a:t>
             </a:r>
             <a:endParaRPr lang="de-DE" sz="2800" b="1" dirty="0"/>
@@ -14279,11 +13985,11 @@
           <a:p>
             <a:pPr algn="ctr"/>
             <a:r>
-              <a:rPr lang="en-US" sz="2800" b="1" dirty="0" err="1" smtClean="0"/>
+              <a:rPr lang="en-US" sz="2800" b="1" dirty="0" err="1"/>
               <a:t>rm</a:t>
             </a:r>
             <a:r>
-              <a:rPr lang="en-US" sz="2800" b="1" dirty="0" smtClean="0"/>
+              <a:rPr lang="en-US" sz="2800" b="1" dirty="0"/>
               <a:t> -vault</a:t>
             </a:r>
             <a:endParaRPr lang="de-DE" sz="2800" b="1" dirty="0"/>
@@ -14425,7 +14131,7 @@
             <a:p>
               <a:pPr algn="ctr"/>
               <a:r>
-                <a:rPr lang="en-US" sz="1600" b="1" dirty="0" smtClean="0">
+                <a:rPr lang="en-US" sz="1600" b="1" dirty="0">
                   <a:solidFill>
                     <a:schemeClr val="bg1"/>
                   </a:solidFill>
@@ -15141,18 +14847,18 @@
             <a:p>
               <a:pPr algn="ctr"/>
               <a:r>
-                <a:rPr lang="en-US" sz="2800" b="1" dirty="0" err="1" smtClean="0"/>
+                <a:rPr lang="en-US" sz="2800" b="1" dirty="0" err="1"/>
                 <a:t>cfg</a:t>
               </a:r>
               <a:r>
-                <a:rPr lang="en-US" sz="2800" b="1" dirty="0" smtClean="0"/>
+                <a:rPr lang="en-US" sz="2800" b="1" dirty="0"/>
                 <a:t> /</a:t>
               </a:r>
               <a:br>
-                <a:rPr lang="en-US" sz="2800" b="1" dirty="0" smtClean="0"/>
+                <a:rPr lang="en-US" sz="2800" b="1" dirty="0"/>
               </a:br>
               <a:r>
-                <a:rPr lang="en-US" sz="2800" b="1" dirty="0" smtClean="0"/>
+                <a:rPr lang="en-US" sz="2800" b="1" dirty="0"/>
                 <a:t>scale</a:t>
               </a:r>
               <a:endParaRPr lang="de-DE" sz="2800" b="1" dirty="0"/>
@@ -15279,11 +14985,11 @@
             <a:p>
               <a:pPr algn="ctr"/>
               <a:r>
-                <a:rPr lang="en-US" sz="2800" b="1" dirty="0" smtClean="0"/>
+                <a:rPr lang="en-US" sz="2800" b="1" dirty="0"/>
                 <a:t>open -</a:t>
               </a:r>
               <a:r>
-                <a:rPr lang="en-US" sz="2800" b="1" dirty="0" err="1" smtClean="0"/>
+                <a:rPr lang="en-US" sz="2800" b="1" dirty="0" err="1"/>
                 <a:t>db</a:t>
               </a:r>
               <a:endParaRPr lang="de-DE" sz="2800" b="1" dirty="0"/>
@@ -17137,7 +16843,7 @@
             <a:p>
               <a:pPr algn="ctr"/>
               <a:r>
-                <a:rPr lang="en-US" sz="2800" b="1" dirty="0" err="1" smtClean="0"/>
+                <a:rPr lang="en-US" sz="2800" b="1" dirty="0" err="1"/>
                 <a:t>cfg</a:t>
               </a:r>
               <a:endParaRPr lang="de-DE" sz="2800" b="1" dirty="0"/>
@@ -17274,7 +16980,7 @@
           <a:p>
             <a:pPr algn="ctr"/>
             <a:r>
-              <a:rPr lang="en-US" sz="2800" b="1" dirty="0" smtClean="0"/>
+              <a:rPr lang="en-US" sz="2800" b="1" dirty="0"/>
               <a:t>info</a:t>
             </a:r>
             <a:endParaRPr lang="de-DE" sz="2800" b="1" dirty="0"/>
@@ -18291,7 +17997,7 @@
           <a:p>
             <a:pPr algn="ctr"/>
             <a:r>
-              <a:rPr lang="en-US" sz="2000" b="1" dirty="0" smtClean="0"/>
+              <a:rPr lang="en-US" sz="2000" b="1" dirty="0"/>
               <a:t>Elastic Load Balancer</a:t>
             </a:r>
             <a:endParaRPr lang="de-DE" sz="2000" b="1" dirty="0"/>
@@ -18525,7 +18231,7 @@
             <a:p>
               <a:pPr algn="ctr"/>
               <a:r>
-                <a:rPr lang="en-US" sz="1600" b="1" dirty="0" smtClean="0">
+                <a:rPr lang="en-US" sz="1600" b="1" dirty="0">
                   <a:solidFill>
                     <a:schemeClr val="accent2">
                       <a:lumMod val="50000"/>
@@ -18831,13 +18537,13 @@
           <a:p>
             <a:pPr algn="ctr"/>
             <a:r>
-              <a:rPr lang="en-US" sz="2000" b="1" dirty="0" smtClean="0"/>
+              <a:rPr lang="en-US" sz="2000" b="1" dirty="0"/>
               <a:t>Instance</a:t>
             </a:r>
           </a:p>
           <a:p>
             <a:pPr algn="ctr"/>
-            <a:endParaRPr lang="en-US" sz="2000" b="1" dirty="0" smtClean="0"/>
+            <a:endParaRPr lang="en-US" sz="2000" b="1" dirty="0"/>
           </a:p>
           <a:p>
             <a:pPr algn="ctr"/>
@@ -19024,7 +18730,7 @@
             <a:p>
               <a:pPr algn="ctr"/>
               <a:r>
-                <a:rPr lang="en-US" sz="2800" b="1" dirty="0" smtClean="0"/>
+                <a:rPr lang="en-US" sz="2800" b="1" dirty="0"/>
                 <a:t>RDS</a:t>
               </a:r>
               <a:endParaRPr lang="de-DE" sz="2800" b="1" dirty="0"/>
@@ -19097,7 +18803,7 @@
           <a:p>
             <a:pPr algn="ctr"/>
             <a:r>
-              <a:rPr lang="en-US" sz="2800" b="1" dirty="0" smtClean="0"/>
+              <a:rPr lang="en-US" sz="2800" b="1" dirty="0"/>
               <a:t>Database per Service pattern</a:t>
             </a:r>
             <a:endParaRPr lang="de-DE" sz="2800" b="1" dirty="0"/>
@@ -19245,10 +18951,9 @@
             <a:p>
               <a:pPr algn="ctr"/>
               <a:r>
-                <a:rPr lang="en-US" sz="2000" b="1" dirty="0" smtClean="0"/>
+                <a:rPr lang="en-US" sz="2000" b="1" dirty="0"/>
                 <a:t>Instance</a:t>
               </a:r>
-              <a:endParaRPr lang="en-US" sz="2000" b="1" dirty="0" smtClean="0"/>
             </a:p>
           </p:txBody>
         </p:sp>
@@ -19301,13 +19006,13 @@
             <a:p>
               <a:pPr algn="ctr"/>
               <a:r>
-                <a:rPr lang="en-US" sz="2000" b="1" dirty="0" smtClean="0"/>
+                <a:rPr lang="en-US" sz="2000" b="1" dirty="0"/>
                 <a:t>Dev VM</a:t>
               </a:r>
             </a:p>
             <a:p>
               <a:pPr algn="ctr"/>
-              <a:endParaRPr lang="en-US" sz="2000" b="1" dirty="0" smtClean="0"/>
+              <a:endParaRPr lang="en-US" sz="2000" b="1" dirty="0"/>
             </a:p>
             <a:p>
               <a:pPr algn="ctr"/>
@@ -19472,14 +19177,14 @@
             <a:p>
               <a:pPr algn="ctr"/>
               <a:r>
-                <a:rPr lang="en-US" sz="2800" b="1" dirty="0" smtClean="0"/>
+                <a:rPr lang="en-US" sz="2800" b="1" dirty="0"/>
                 <a:t>Dev Environment</a:t>
               </a:r>
               <a:br>
-                <a:rPr lang="en-US" sz="2800" b="1" dirty="0" smtClean="0"/>
+                <a:rPr lang="en-US" sz="2800" b="1" dirty="0"/>
               </a:br>
               <a:r>
-                <a:rPr lang="en-US" sz="2800" b="1" dirty="0" smtClean="0"/>
+                <a:rPr lang="en-US" sz="2800" b="1" dirty="0"/>
                 <a:t>with PostgreSQL</a:t>
               </a:r>
               <a:endParaRPr lang="de-DE" sz="2800" b="1" dirty="0"/>
@@ -19645,10 +19350,9 @@
             <a:p>
               <a:pPr algn="ctr"/>
               <a:r>
-                <a:rPr lang="en-US" sz="2000" b="1" dirty="0" smtClean="0"/>
+                <a:rPr lang="en-US" sz="2000" b="1" dirty="0"/>
                 <a:t>Instance</a:t>
               </a:r>
-              <a:endParaRPr lang="en-US" sz="2000" b="1" dirty="0"/>
             </a:p>
           </p:txBody>
         </p:sp>
@@ -19701,13 +19405,13 @@
             <a:p>
               <a:pPr algn="ctr"/>
               <a:r>
-                <a:rPr lang="en-US" sz="2000" b="1" dirty="0" smtClean="0"/>
+                <a:rPr lang="en-US" sz="2000" b="1" dirty="0"/>
                 <a:t>Dev VM</a:t>
               </a:r>
             </a:p>
             <a:p>
               <a:pPr algn="ctr"/>
-              <a:endParaRPr lang="en-US" sz="2000" b="1" dirty="0" smtClean="0"/>
+              <a:endParaRPr lang="en-US" sz="2000" b="1" dirty="0"/>
             </a:p>
             <a:p>
               <a:pPr algn="ctr"/>
@@ -19872,23 +19576,15 @@
             <a:p>
               <a:pPr algn="ctr"/>
               <a:r>
-                <a:rPr lang="en-US" sz="2800" b="1" dirty="0" smtClean="0"/>
+                <a:rPr lang="en-US" sz="2800" b="1" dirty="0"/>
                 <a:t>Dev Environment</a:t>
               </a:r>
               <a:br>
-                <a:rPr lang="en-US" sz="2800" b="1" dirty="0" smtClean="0"/>
+                <a:rPr lang="en-US" sz="2800" b="1" dirty="0"/>
               </a:br>
               <a:r>
-                <a:rPr lang="en-US" sz="2800" b="1" dirty="0" smtClean="0"/>
-                <a:t>with </a:t>
-              </a:r>
-              <a:r>
-                <a:rPr lang="en-US" sz="2800" b="1" dirty="0" smtClean="0"/>
-                <a:t>My</a:t>
-              </a:r>
-              <a:r>
-                <a:rPr lang="en-US" sz="2800" b="1" dirty="0" smtClean="0"/>
-                <a:t>SQL</a:t>
+                <a:rPr lang="en-US" sz="2800" b="1" dirty="0"/>
+                <a:t>with MySQL</a:t>
               </a:r>
               <a:endParaRPr lang="de-DE" sz="2800" b="1" dirty="0"/>
             </a:p>
@@ -20003,7 +19699,7 @@
           <a:p>
             <a:pPr algn="ctr"/>
             <a:r>
-              <a:rPr lang="en-US" sz="2000" b="1" dirty="0" smtClean="0"/>
+              <a:rPr lang="en-US" sz="2000" b="1" dirty="0"/>
               <a:t>Instance</a:t>
             </a:r>
           </a:p>
@@ -20072,13 +19768,13 @@
             <a:p>
               <a:pPr algn="ctr"/>
               <a:r>
-                <a:rPr lang="en-US" sz="2000" b="1" dirty="0" smtClean="0"/>
+                <a:rPr lang="en-US" sz="2000" b="1" dirty="0"/>
                 <a:t>Dev VM</a:t>
               </a:r>
             </a:p>
             <a:p>
               <a:pPr algn="ctr"/>
-              <a:endParaRPr lang="en-US" sz="2000" b="1" dirty="0" smtClean="0"/>
+              <a:endParaRPr lang="en-US" sz="2000" b="1" dirty="0"/>
             </a:p>
             <a:p>
               <a:pPr algn="ctr"/>
@@ -20244,7 +19940,7 @@
           <a:p>
             <a:pPr algn="ctr"/>
             <a:r>
-              <a:rPr lang="en-US" sz="2000" b="1" dirty="0" smtClean="0"/>
+              <a:rPr lang="en-US" sz="2000" b="1" dirty="0"/>
               <a:t>Instance</a:t>
             </a:r>
           </a:p>
@@ -20425,7 +20121,7 @@
             <a:p>
               <a:pPr algn="ctr"/>
               <a:r>
-                <a:rPr lang="en-US" sz="2800" b="1" dirty="0" smtClean="0"/>
+                <a:rPr lang="en-US" sz="2800" b="1" dirty="0"/>
                 <a:t>RDS</a:t>
               </a:r>
               <a:endParaRPr lang="de-DE" sz="2800" b="1" dirty="0"/>
@@ -20591,10 +20287,9 @@
             <a:p>
               <a:pPr algn="ctr"/>
               <a:r>
-                <a:rPr lang="en-US" sz="2000" b="1" dirty="0" smtClean="0"/>
+                <a:rPr lang="en-US" sz="2000" b="1" dirty="0"/>
                 <a:t>Instance</a:t>
               </a:r>
-              <a:endParaRPr lang="en-US" sz="2000" b="1" dirty="0" smtClean="0"/>
             </a:p>
           </p:txBody>
         </p:sp>
@@ -20703,18 +20398,14 @@
             <a:p>
               <a:pPr algn="ctr"/>
               <a:r>
-                <a:rPr lang="en-US" sz="2800" b="1" dirty="0" smtClean="0"/>
-                <a:t>Test &amp; Prod</a:t>
-              </a:r>
-              <a:r>
-                <a:rPr lang="en-US" sz="2800" b="1" dirty="0" smtClean="0"/>
-                <a:t> Environments</a:t>
+                <a:rPr lang="en-US" sz="2800" b="1" dirty="0"/>
+                <a:t>Test &amp; Prod Environments</a:t>
               </a:r>
               <a:br>
-                <a:rPr lang="en-US" sz="2800" b="1" dirty="0" smtClean="0"/>
+                <a:rPr lang="en-US" sz="2800" b="1" dirty="0"/>
               </a:br>
               <a:r>
-                <a:rPr lang="en-US" sz="2800" b="1" dirty="0" smtClean="0"/>
+                <a:rPr lang="en-US" sz="2800" b="1" dirty="0"/>
                 <a:t>with PostgreSQL</a:t>
               </a:r>
               <a:endParaRPr lang="de-DE" sz="2800" b="1" dirty="0"/>
@@ -20880,10 +20571,9 @@
             <a:p>
               <a:pPr algn="ctr"/>
               <a:r>
-                <a:rPr lang="en-US" sz="2000" b="1" dirty="0" smtClean="0"/>
+                <a:rPr lang="en-US" sz="2000" b="1" dirty="0"/>
                 <a:t>Instance</a:t>
               </a:r>
-              <a:endParaRPr lang="en-US" sz="2000" b="1" dirty="0"/>
             </a:p>
           </p:txBody>
         </p:sp>
@@ -20992,23 +20682,15 @@
             <a:p>
               <a:pPr algn="ctr"/>
               <a:r>
-                <a:rPr lang="en-US" sz="2800" b="1" dirty="0" smtClean="0"/>
+                <a:rPr lang="en-US" sz="2800" b="1" dirty="0"/>
                 <a:t>Test &amp; Prod Environments</a:t>
               </a:r>
               <a:br>
-                <a:rPr lang="en-US" sz="2800" b="1" dirty="0" smtClean="0"/>
+                <a:rPr lang="en-US" sz="2800" b="1" dirty="0"/>
               </a:br>
               <a:r>
-                <a:rPr lang="en-US" sz="2800" b="1" dirty="0" smtClean="0"/>
-                <a:t>with </a:t>
-              </a:r>
-              <a:r>
-                <a:rPr lang="en-US" sz="2800" b="1" dirty="0" smtClean="0"/>
-                <a:t>My</a:t>
-              </a:r>
-              <a:r>
-                <a:rPr lang="en-US" sz="2800" b="1" dirty="0" smtClean="0"/>
-                <a:t>SQL</a:t>
+                <a:rPr lang="en-US" sz="2800" b="1" dirty="0"/>
+                <a:t>with MySQL</a:t>
               </a:r>
               <a:endParaRPr lang="de-DE" sz="2800" b="1" dirty="0"/>
             </a:p>
@@ -21232,7 +20914,7 @@
           <a:p>
             <a:pPr algn="ctr"/>
             <a:r>
-              <a:rPr lang="en-US" sz="2800" b="1" dirty="0" smtClean="0"/>
+              <a:rPr lang="en-US" sz="2800" b="1" dirty="0"/>
               <a:t>RDS</a:t>
             </a:r>
             <a:endParaRPr lang="de-DE" sz="2800" b="1" dirty="0"/>
@@ -21263,7 +20945,7 @@
           <a:p>
             <a:pPr algn="ctr"/>
             <a:r>
-              <a:rPr lang="en-US" sz="2800" b="1" dirty="0" smtClean="0"/>
+              <a:rPr lang="en-US" sz="2800" b="1" dirty="0"/>
               <a:t>RDS</a:t>
             </a:r>
             <a:endParaRPr lang="de-DE" sz="2800" b="1" dirty="0"/>
@@ -25804,11 +25486,11 @@
             <a:p>
               <a:pPr algn="ctr"/>
               <a:r>
-                <a:rPr lang="en-US" sz="2800" b="1" dirty="0" smtClean="0"/>
+                <a:rPr lang="en-US" sz="2800" b="1" dirty="0"/>
                 <a:t>open -</a:t>
               </a:r>
               <a:r>
-                <a:rPr lang="en-US" sz="2800" b="1" dirty="0" err="1" smtClean="0"/>
+                <a:rPr lang="en-US" sz="2800" b="1" dirty="0" err="1"/>
                 <a:t>db</a:t>
               </a:r>
               <a:endParaRPr lang="de-DE" sz="2800" b="1" dirty="0"/>
@@ -43247,7 +42929,7 @@
         </p:blipFill>
         <p:spPr>
           <a:xfrm>
-            <a:off x="8551644" y="4486939"/>
+            <a:off x="8751943" y="4486939"/>
             <a:ext cx="1095799" cy="779004"/>
           </a:xfrm>
           <a:prstGeom prst="rect">
@@ -43277,7 +42959,7 @@
         </p:blipFill>
         <p:spPr>
           <a:xfrm>
-            <a:off x="9807752" y="3530010"/>
+            <a:off x="9502949" y="3530010"/>
             <a:ext cx="470403" cy="824816"/>
           </a:xfrm>
           <a:prstGeom prst="rect">
@@ -43307,7 +42989,7 @@
         </p:blipFill>
         <p:spPr>
           <a:xfrm>
-            <a:off x="9565379" y="2667957"/>
+            <a:off x="9365078" y="2807298"/>
             <a:ext cx="466953" cy="687847"/>
           </a:xfrm>
           <a:prstGeom prst="rect">
@@ -43337,7 +43019,7 @@
         </p:blipFill>
         <p:spPr>
           <a:xfrm>
-            <a:off x="7104943" y="3551274"/>
+            <a:off x="7427162" y="3551274"/>
             <a:ext cx="817021" cy="736469"/>
           </a:xfrm>
           <a:prstGeom prst="rect">
@@ -43367,7 +43049,7 @@
         </p:blipFill>
         <p:spPr>
           <a:xfrm>
-            <a:off x="7454677" y="4508204"/>
+            <a:off x="7654976" y="4508204"/>
             <a:ext cx="946464" cy="674997"/>
           </a:xfrm>
           <a:prstGeom prst="rect">
@@ -43397,7 +43079,7 @@
         </p:blipFill>
         <p:spPr>
           <a:xfrm>
-            <a:off x="8727163" y="3508745"/>
+            <a:off x="8422360" y="3508745"/>
             <a:ext cx="842140" cy="842140"/>
           </a:xfrm>
           <a:prstGeom prst="rect">
@@ -43427,7 +43109,7 @@
         </p:blipFill>
         <p:spPr>
           <a:xfrm>
-            <a:off x="8022860" y="3508743"/>
+            <a:off x="7021376" y="4405726"/>
             <a:ext cx="516629" cy="849253"/>
           </a:xfrm>
           <a:prstGeom prst="rect">
@@ -43457,7 +43139,7 @@
         </p:blipFill>
         <p:spPr>
           <a:xfrm>
-            <a:off x="7503802" y="2485621"/>
+            <a:off x="6780993" y="3391316"/>
             <a:ext cx="514422" cy="952633"/>
           </a:xfrm>
           <a:prstGeom prst="rect">
@@ -43487,8 +43169,38 @@
         </p:blipFill>
         <p:spPr>
           <a:xfrm>
-            <a:off x="8187071" y="2717275"/>
+            <a:off x="8047730" y="2786946"/>
             <a:ext cx="1216726" cy="602279"/>
+          </a:xfrm>
+          <a:prstGeom prst="rect">
+            <a:avLst/>
+          </a:prstGeom>
+        </p:spPr>
+      </p:pic>
+      <p:pic>
+        <p:nvPicPr>
+          <p:cNvPr id="11" name="Picture 10"/>
+          <p:cNvPicPr>
+            <a:picLocks noChangeAspect="1"/>
+          </p:cNvPicPr>
+          <p:nvPr/>
+        </p:nvPicPr>
+        <p:blipFill>
+          <a:blip r:embed="rId11" cstate="print">
+            <a:extLst>
+              <a:ext uri="{28A0092B-C50C-407E-A947-70E740481C1C}">
+                <a14:useLocalDpi xmlns:a14="http://schemas.microsoft.com/office/drawing/2010/main" val="0"/>
+              </a:ext>
+            </a:extLst>
+          </a:blip>
+          <a:stretch>
+            <a:fillRect/>
+          </a:stretch>
+        </p:blipFill>
+        <p:spPr>
+          <a:xfrm>
+            <a:off x="6914732" y="2804114"/>
+            <a:ext cx="1053609" cy="645067"/>
           </a:xfrm>
           <a:prstGeom prst="rect">
             <a:avLst/>
@@ -45980,7 +45692,7 @@
                   <a:p>
                     <a:pPr algn="ctr"/>
                     <a:r>
-                      <a:rPr lang="en-US" sz="3600" b="1" dirty="0" err="1" smtClean="0">
+                      <a:rPr lang="en-US" sz="3600" b="1" dirty="0" err="1">
                         <a:solidFill>
                           <a:schemeClr val="bg2">
                             <a:lumMod val="75000"/>
@@ -46356,7 +46068,7 @@
             <a:p>
               <a:pPr algn="ctr"/>
               <a:r>
-                <a:rPr lang="en-US" sz="4400" b="1" dirty="0" err="1" smtClean="0">
+                <a:rPr lang="en-US" sz="4400" b="1" dirty="0" err="1">
                   <a:solidFill>
                     <a:schemeClr val="tx1">
                       <a:lumMod val="75000"/>
@@ -46367,17 +46079,6 @@
                 <a:t>TomEE</a:t>
               </a:r>
               <a:r>
-                <a:rPr lang="en-US" sz="4400" b="1" dirty="0" smtClean="0">
-                  <a:solidFill>
-                    <a:schemeClr val="tx1">
-                      <a:lumMod val="75000"/>
-                      <a:lumOff val="25000"/>
-                    </a:schemeClr>
-                  </a:solidFill>
-                </a:rPr>
-                <a:t> War </a:t>
-              </a:r>
-              <a:r>
                 <a:rPr lang="en-US" sz="4400" b="1" dirty="0">
                   <a:solidFill>
                     <a:schemeClr val="tx1">
@@ -46386,7 +46087,7 @@
                     </a:schemeClr>
                   </a:solidFill>
                 </a:rPr>
-                <a:t>File</a:t>
+                <a:t> War File</a:t>
               </a:r>
               <a:endParaRPr lang="de-DE" sz="4400" b="1" dirty="0">
                 <a:solidFill>
@@ -46731,7 +46432,7 @@
                   <a:p>
                     <a:pPr algn="ctr"/>
                     <a:r>
-                      <a:rPr lang="en-US" sz="3600" b="1" dirty="0" err="1" smtClean="0">
+                      <a:rPr lang="en-US" sz="3600" b="1" dirty="0" err="1">
                         <a:solidFill>
                           <a:schemeClr val="bg1"/>
                         </a:solidFill>
@@ -47103,7 +46804,7 @@
             <a:p>
               <a:pPr algn="ctr"/>
               <a:r>
-                <a:rPr lang="en-US" sz="4400" b="1" dirty="0" smtClean="0">
+                <a:rPr lang="en-US" sz="4400" b="1" dirty="0">
                   <a:solidFill>
                     <a:schemeClr val="tx1">
                       <a:lumMod val="75000"/>
@@ -47512,7 +47213,7 @@
             <a:p>
               <a:pPr algn="ctr"/>
               <a:r>
-                <a:rPr lang="en-US" sz="2800" dirty="0" smtClean="0">
+                <a:rPr lang="en-US" sz="2800" dirty="0">
                   <a:solidFill>
                     <a:schemeClr val="bg1"/>
                   </a:solidFill>
@@ -47523,7 +47224,7 @@
             <a:p>
               <a:pPr algn="ctr"/>
               <a:r>
-                <a:rPr lang="en-US" sz="2800" dirty="0" smtClean="0">
+                <a:rPr lang="en-US" sz="2800" dirty="0">
                   <a:solidFill>
                     <a:schemeClr val="bg1"/>
                   </a:solidFill>
@@ -47630,7 +47331,7 @@
             <a:p>
               <a:pPr algn="ctr"/>
               <a:r>
-                <a:rPr lang="en-US" sz="2800" dirty="0" smtClean="0">
+                <a:rPr lang="en-US" sz="2800" dirty="0">
                   <a:solidFill>
                     <a:schemeClr val="bg1"/>
                   </a:solidFill>
@@ -47641,7 +47342,7 @@
             <a:p>
               <a:pPr algn="ctr"/>
               <a:r>
-                <a:rPr lang="en-US" sz="2800" dirty="0" smtClean="0">
+                <a:rPr lang="en-US" sz="2800" dirty="0">
                   <a:solidFill>
                     <a:schemeClr val="bg1"/>
                   </a:solidFill>
@@ -47860,7 +47561,7 @@
           <a:p>
             <a:pPr algn="ctr"/>
             <a:r>
-              <a:rPr lang="en-US" sz="4000" b="1" dirty="0" smtClean="0"/>
+              <a:rPr lang="en-US" sz="4000" b="1" dirty="0"/>
               <a:t>App</a:t>
             </a:r>
             <a:endParaRPr lang="de-DE" sz="4800" b="1" dirty="0"/>
@@ -48088,7 +47789,7 @@
           <a:p>
             <a:pPr algn="ctr"/>
             <a:r>
-              <a:rPr lang="en-US" sz="3600" b="1" dirty="0" smtClean="0"/>
+              <a:rPr lang="en-US" sz="3600" b="1" dirty="0"/>
               <a:t>Internet</a:t>
             </a:r>
             <a:endParaRPr lang="de-DE" sz="3600" b="1" dirty="0"/>
@@ -48146,7 +47847,7 @@
           <a:p>
             <a:pPr algn="ctr"/>
             <a:r>
-              <a:rPr lang="en-US" sz="3600" b="1" dirty="0" smtClean="0"/>
+              <a:rPr lang="en-US" sz="3600" b="1" dirty="0"/>
               <a:t>Your Workstation</a:t>
             </a:r>
             <a:endParaRPr lang="de-DE" sz="3600" b="1" dirty="0"/>
@@ -48177,7 +47878,7 @@
           <a:p>
             <a:pPr algn="ctr"/>
             <a:r>
-              <a:rPr lang="en-US" sz="3600" dirty="0" smtClean="0">
+              <a:rPr lang="en-US" sz="3600" dirty="0">
                 <a:solidFill>
                   <a:schemeClr val="tx1">
                     <a:lumMod val="50000"/>
@@ -48188,7 +47889,7 @@
               <a:t>run -</a:t>
             </a:r>
             <a:r>
-              <a:rPr lang="en-US" sz="3600" dirty="0" err="1" smtClean="0">
+              <a:rPr lang="en-US" sz="3600" dirty="0" err="1">
                 <a:solidFill>
                   <a:schemeClr val="tx1">
                     <a:lumMod val="50000"/>
@@ -48199,7 +47900,7 @@
               <a:t>ports.http</a:t>
             </a:r>
             <a:r>
-              <a:rPr lang="en-US" sz="3600" dirty="0" smtClean="0">
+              <a:rPr lang="en-US" sz="3600" dirty="0">
                 <a:solidFill>
                   <a:schemeClr val="tx1">
                     <a:lumMod val="50000"/>
@@ -48210,7 +47911,7 @@
               <a:t>=80 </a:t>
             </a:r>
             <a:br>
-              <a:rPr lang="en-US" sz="3600" dirty="0" smtClean="0">
+              <a:rPr lang="en-US" sz="3600" dirty="0">
                 <a:solidFill>
                   <a:schemeClr val="tx1">
                     <a:lumMod val="50000"/>
@@ -48220,7 +47921,7 @@
               </a:rPr>
             </a:br>
             <a:r>
-              <a:rPr lang="en-US" sz="3600" dirty="0" smtClean="0">
+              <a:rPr lang="en-US" sz="3600" dirty="0">
                 <a:solidFill>
                   <a:schemeClr val="tx1">
                     <a:lumMod val="50000"/>
@@ -48231,7 +47932,7 @@
               <a:t>-</a:t>
             </a:r>
             <a:r>
-              <a:rPr lang="en-US" sz="3600" dirty="0" err="1" smtClean="0">
+              <a:rPr lang="en-US" sz="3600" dirty="0" err="1">
                 <a:solidFill>
                   <a:schemeClr val="tx1">
                     <a:lumMod val="50000"/>
@@ -48242,7 +47943,7 @@
               <a:t>ports.admin</a:t>
             </a:r>
             <a:r>
-              <a:rPr lang="en-US" sz="3600" dirty="0" smtClean="0">
+              <a:rPr lang="en-US" sz="3600" dirty="0">
                 <a:solidFill>
                   <a:schemeClr val="tx1">
                     <a:lumMod val="50000"/>
@@ -48253,7 +47954,7 @@
               <a:t>=</a:t>
             </a:r>
             <a:r>
-              <a:rPr lang="en-US" sz="3600" b="1" dirty="0" smtClean="0"/>
+              <a:rPr lang="en-US" sz="3600" b="1" dirty="0"/>
               <a:t>8081</a:t>
             </a:r>
             <a:endParaRPr lang="de-DE" sz="3600" b="1" dirty="0"/>
@@ -48482,7 +48183,7 @@
           <a:p>
             <a:pPr algn="ctr"/>
             <a:r>
-              <a:rPr lang="en-US" sz="3600" b="1" dirty="0" smtClean="0"/>
+              <a:rPr lang="en-US" sz="3600" b="1" dirty="0"/>
               <a:t>Internet</a:t>
             </a:r>
             <a:endParaRPr lang="de-DE" sz="3600" b="1" dirty="0"/>
@@ -48580,7 +48281,7 @@
             <a:p>
               <a:pPr algn="ctr"/>
               <a:r>
-                <a:rPr lang="en-US" sz="2800" dirty="0" smtClean="0">
+                <a:rPr lang="en-US" sz="2800" dirty="0">
                   <a:solidFill>
                     <a:schemeClr val="bg1"/>
                   </a:solidFill>
@@ -48591,7 +48292,7 @@
             <a:p>
               <a:pPr algn="ctr"/>
               <a:r>
-                <a:rPr lang="en-US" sz="2800" dirty="0" smtClean="0">
+                <a:rPr lang="en-US" sz="2800" dirty="0">
                   <a:solidFill>
                     <a:schemeClr val="bg1"/>
                   </a:solidFill>
@@ -48698,7 +48399,7 @@
             <a:p>
               <a:pPr algn="ctr"/>
               <a:r>
-                <a:rPr lang="en-US" sz="2800" dirty="0" smtClean="0">
+                <a:rPr lang="en-US" sz="2800" dirty="0">
                   <a:solidFill>
                     <a:schemeClr val="bg1"/>
                   </a:solidFill>
@@ -48709,7 +48410,7 @@
             <a:p>
               <a:pPr algn="ctr"/>
               <a:r>
-                <a:rPr lang="en-US" sz="2800" dirty="0" smtClean="0">
+                <a:rPr lang="en-US" sz="2800" dirty="0">
                   <a:solidFill>
                     <a:schemeClr val="bg1"/>
                   </a:solidFill>
@@ -48928,7 +48629,7 @@
           <a:p>
             <a:pPr algn="ctr"/>
             <a:r>
-              <a:rPr lang="en-US" sz="4000" b="1" dirty="0" smtClean="0"/>
+              <a:rPr lang="en-US" sz="4000" b="1" dirty="0"/>
               <a:t>App</a:t>
             </a:r>
             <a:endParaRPr lang="de-DE" sz="4800" b="1" dirty="0"/>
@@ -48989,7 +48690,7 @@
           <a:p>
             <a:pPr algn="ctr"/>
             <a:r>
-              <a:rPr lang="en-US" sz="3600" dirty="0" smtClean="0">
+              <a:rPr lang="en-US" sz="3600" dirty="0">
                 <a:solidFill>
                   <a:schemeClr val="tx1">
                     <a:lumMod val="50000"/>
@@ -49000,7 +48701,7 @@
               <a:t>run -</a:t>
             </a:r>
             <a:r>
-              <a:rPr lang="en-US" sz="3600" dirty="0" err="1" smtClean="0">
+              <a:rPr lang="en-US" sz="3600" dirty="0" err="1">
                 <a:solidFill>
                   <a:schemeClr val="tx1">
                     <a:lumMod val="50000"/>
@@ -49011,7 +48712,7 @@
               <a:t>ports.http</a:t>
             </a:r>
             <a:r>
-              <a:rPr lang="en-US" sz="3600" dirty="0" smtClean="0">
+              <a:rPr lang="en-US" sz="3600" dirty="0">
                 <a:solidFill>
                   <a:schemeClr val="tx1">
                     <a:lumMod val="50000"/>
@@ -49022,7 +48723,7 @@
               <a:t>=80 </a:t>
             </a:r>
             <a:br>
-              <a:rPr lang="en-US" sz="3600" dirty="0" smtClean="0">
+              <a:rPr lang="en-US" sz="3600" dirty="0">
                 <a:solidFill>
                   <a:schemeClr val="tx1">
                     <a:lumMod val="50000"/>
@@ -49032,7 +48733,7 @@
               </a:rPr>
             </a:br>
             <a:r>
-              <a:rPr lang="en-US" sz="3600" dirty="0" smtClean="0">
+              <a:rPr lang="en-US" sz="3600" dirty="0">
                 <a:solidFill>
                   <a:schemeClr val="tx1">
                     <a:lumMod val="50000"/>
@@ -49043,7 +48744,7 @@
               <a:t>-</a:t>
             </a:r>
             <a:r>
-              <a:rPr lang="en-US" sz="3600" dirty="0" err="1" smtClean="0">
+              <a:rPr lang="en-US" sz="3600" dirty="0" err="1">
                 <a:solidFill>
                   <a:schemeClr val="tx1">
                     <a:lumMod val="50000"/>
@@ -49054,7 +48755,7 @@
               <a:t>ports.admin</a:t>
             </a:r>
             <a:r>
-              <a:rPr lang="en-US" sz="3600" dirty="0" smtClean="0">
+              <a:rPr lang="en-US" sz="3600" dirty="0">
                 <a:solidFill>
                   <a:schemeClr val="tx1">
                     <a:lumMod val="50000"/>
@@ -49065,7 +48766,7 @@
               <a:t>=</a:t>
             </a:r>
             <a:r>
-              <a:rPr lang="en-US" sz="3600" b="1" dirty="0" smtClean="0"/>
+              <a:rPr lang="en-US" sz="3600" b="1" dirty="0"/>
               <a:t>8081:@</a:t>
             </a:r>
             <a:endParaRPr lang="de-DE" sz="3600" b="1" dirty="0"/>
@@ -49123,7 +48824,7 @@
           <a:p>
             <a:pPr algn="ctr"/>
             <a:r>
-              <a:rPr lang="en-US" sz="3600" b="1" dirty="0" smtClean="0"/>
+              <a:rPr lang="en-US" sz="3600" b="1" dirty="0"/>
               <a:t>Your Workstation</a:t>
             </a:r>
             <a:endParaRPr lang="de-DE" sz="3600" b="1" dirty="0"/>

</xml_diff>

<commit_message>
Added Go and Revel docs
</commit_message>
<xml_diff>
--- a/_sources/GettingStarted.pptx
+++ b/_sources/GettingStarted.pptx
@@ -3074,7 +3074,7 @@
           <a:p>
             <a:fld id="{9AA7D095-A676-4F6B-9416-D65D798F5244}" type="datetimeFigureOut">
               <a:rPr lang="de-DE" smtClean="0"/>
-              <a:t>04.08.2016</a:t>
+              <a:t>09.08.2016</a:t>
             </a:fld>
             <a:endParaRPr lang="de-DE"/>
           </a:p>
@@ -3244,7 +3244,7 @@
           <a:p>
             <a:fld id="{9AA7D095-A676-4F6B-9416-D65D798F5244}" type="datetimeFigureOut">
               <a:rPr lang="de-DE" smtClean="0"/>
-              <a:t>04.08.2016</a:t>
+              <a:t>09.08.2016</a:t>
             </a:fld>
             <a:endParaRPr lang="de-DE"/>
           </a:p>
@@ -3424,7 +3424,7 @@
           <a:p>
             <a:fld id="{9AA7D095-A676-4F6B-9416-D65D798F5244}" type="datetimeFigureOut">
               <a:rPr lang="de-DE" smtClean="0"/>
-              <a:t>04.08.2016</a:t>
+              <a:t>09.08.2016</a:t>
             </a:fld>
             <a:endParaRPr lang="de-DE"/>
           </a:p>
@@ -3594,7 +3594,7 @@
           <a:p>
             <a:fld id="{9AA7D095-A676-4F6B-9416-D65D798F5244}" type="datetimeFigureOut">
               <a:rPr lang="de-DE" smtClean="0"/>
-              <a:t>04.08.2016</a:t>
+              <a:t>09.08.2016</a:t>
             </a:fld>
             <a:endParaRPr lang="de-DE"/>
           </a:p>
@@ -3840,7 +3840,7 @@
           <a:p>
             <a:fld id="{9AA7D095-A676-4F6B-9416-D65D798F5244}" type="datetimeFigureOut">
               <a:rPr lang="de-DE" smtClean="0"/>
-              <a:t>04.08.2016</a:t>
+              <a:t>09.08.2016</a:t>
             </a:fld>
             <a:endParaRPr lang="de-DE"/>
           </a:p>
@@ -4072,7 +4072,7 @@
           <a:p>
             <a:fld id="{9AA7D095-A676-4F6B-9416-D65D798F5244}" type="datetimeFigureOut">
               <a:rPr lang="de-DE" smtClean="0"/>
-              <a:t>04.08.2016</a:t>
+              <a:t>09.08.2016</a:t>
             </a:fld>
             <a:endParaRPr lang="de-DE"/>
           </a:p>
@@ -4439,7 +4439,7 @@
           <a:p>
             <a:fld id="{9AA7D095-A676-4F6B-9416-D65D798F5244}" type="datetimeFigureOut">
               <a:rPr lang="de-DE" smtClean="0"/>
-              <a:t>04.08.2016</a:t>
+              <a:t>09.08.2016</a:t>
             </a:fld>
             <a:endParaRPr lang="de-DE"/>
           </a:p>
@@ -4557,7 +4557,7 @@
           <a:p>
             <a:fld id="{9AA7D095-A676-4F6B-9416-D65D798F5244}" type="datetimeFigureOut">
               <a:rPr lang="de-DE" smtClean="0"/>
-              <a:t>04.08.2016</a:t>
+              <a:t>09.08.2016</a:t>
             </a:fld>
             <a:endParaRPr lang="de-DE"/>
           </a:p>
@@ -4652,7 +4652,7 @@
           <a:p>
             <a:fld id="{9AA7D095-A676-4F6B-9416-D65D798F5244}" type="datetimeFigureOut">
               <a:rPr lang="de-DE" smtClean="0"/>
-              <a:t>04.08.2016</a:t>
+              <a:t>09.08.2016</a:t>
             </a:fld>
             <a:endParaRPr lang="de-DE"/>
           </a:p>
@@ -4929,7 +4929,7 @@
           <a:p>
             <a:fld id="{9AA7D095-A676-4F6B-9416-D65D798F5244}" type="datetimeFigureOut">
               <a:rPr lang="de-DE" smtClean="0"/>
-              <a:t>04.08.2016</a:t>
+              <a:t>09.08.2016</a:t>
             </a:fld>
             <a:endParaRPr lang="de-DE"/>
           </a:p>
@@ -5186,7 +5186,7 @@
           <a:p>
             <a:fld id="{9AA7D095-A676-4F6B-9416-D65D798F5244}" type="datetimeFigureOut">
               <a:rPr lang="de-DE" smtClean="0"/>
-              <a:t>04.08.2016</a:t>
+              <a:t>09.08.2016</a:t>
             </a:fld>
             <a:endParaRPr lang="de-DE"/>
           </a:p>
@@ -5399,7 +5399,7 @@
           <a:p>
             <a:fld id="{9AA7D095-A676-4F6B-9416-D65D798F5244}" type="datetimeFigureOut">
               <a:rPr lang="de-DE" smtClean="0"/>
-              <a:t>04.08.2016</a:t>
+              <a:t>09.08.2016</a:t>
             </a:fld>
             <a:endParaRPr lang="de-DE"/>
           </a:p>
@@ -52908,7 +52908,7 @@
         </p:blipFill>
         <p:spPr>
           <a:xfrm>
-            <a:off x="8751943" y="4486939"/>
+            <a:off x="8507392" y="4455040"/>
             <a:ext cx="1095799" cy="779004"/>
           </a:xfrm>
           <a:prstGeom prst="rect">
@@ -52968,7 +52968,7 @@
         </p:blipFill>
         <p:spPr>
           <a:xfrm>
-            <a:off x="9365078" y="2807298"/>
+            <a:off x="9226852" y="2807298"/>
             <a:ext cx="466953" cy="687847"/>
           </a:xfrm>
           <a:prstGeom prst="rect">
@@ -53028,7 +53028,7 @@
         </p:blipFill>
         <p:spPr>
           <a:xfrm>
-            <a:off x="7654976" y="4508204"/>
+            <a:off x="7410425" y="4476305"/>
             <a:ext cx="946464" cy="674997"/>
           </a:xfrm>
           <a:prstGeom prst="rect">
@@ -53088,7 +53088,7 @@
         </p:blipFill>
         <p:spPr>
           <a:xfrm>
-            <a:off x="7021376" y="4405726"/>
+            <a:off x="6946946" y="4118646"/>
             <a:ext cx="516629" cy="849253"/>
           </a:xfrm>
           <a:prstGeom prst="rect">
@@ -53118,7 +53118,7 @@
         </p:blipFill>
         <p:spPr>
           <a:xfrm>
-            <a:off x="6780993" y="3391316"/>
+            <a:off x="6557709" y="3391316"/>
             <a:ext cx="514422" cy="952633"/>
           </a:xfrm>
           <a:prstGeom prst="rect">
@@ -53148,7 +53148,7 @@
         </p:blipFill>
         <p:spPr>
           <a:xfrm>
-            <a:off x="8047730" y="2786946"/>
+            <a:off x="7909504" y="2786946"/>
             <a:ext cx="1216726" cy="602279"/>
           </a:xfrm>
           <a:prstGeom prst="rect">
@@ -53178,12 +53178,94 @@
         </p:blipFill>
         <p:spPr>
           <a:xfrm>
-            <a:off x="6914732" y="2804114"/>
+            <a:off x="6850934" y="2952969"/>
             <a:ext cx="1053609" cy="645067"/>
           </a:xfrm>
           <a:prstGeom prst="rect">
             <a:avLst/>
           </a:prstGeom>
+        </p:spPr>
+      </p:pic>
+      <p:pic>
+        <p:nvPicPr>
+          <p:cNvPr id="1026" name="Picture 2" descr="http://localhost:4000/assets/img/revel.png"/>
+          <p:cNvPicPr>
+            <a:picLocks noChangeAspect="1" noChangeArrowheads="1"/>
+          </p:cNvPicPr>
+          <p:nvPr/>
+        </p:nvPicPr>
+        <p:blipFill>
+          <a:blip r:embed="rId12" cstate="print">
+            <a:extLst>
+              <a:ext uri="{28A0092B-C50C-407E-A947-70E740481C1C}">
+                <a14:useLocalDpi xmlns:a14="http://schemas.microsoft.com/office/drawing/2010/main" val="0"/>
+              </a:ext>
+            </a:extLst>
+          </a:blip>
+          <a:srcRect/>
+          <a:stretch>
+            <a:fillRect/>
+          </a:stretch>
+        </p:blipFill>
+        <p:spPr bwMode="auto">
+          <a:xfrm>
+            <a:off x="9828546" y="4125433"/>
+            <a:ext cx="683806" cy="976866"/>
+          </a:xfrm>
+          <a:prstGeom prst="rect">
+            <a:avLst/>
+          </a:prstGeom>
+          <a:noFill/>
+          <a:extLst>
+            <a:ext uri="{909E8E84-426E-40DD-AFC4-6F175D3DCCD1}">
+              <a14:hiddenFill xmlns:a14="http://schemas.microsoft.com/office/drawing/2010/main">
+                <a:solidFill>
+                  <a:srgbClr val="FFFFFF"/>
+                </a:solidFill>
+              </a14:hiddenFill>
+            </a:ext>
+          </a:extLst>
+        </p:spPr>
+      </p:pic>
+      <p:pic>
+        <p:nvPicPr>
+          <p:cNvPr id="1028" name="Picture 4" descr="http://localhost:4000/assets/img/go.png"/>
+          <p:cNvPicPr>
+            <a:picLocks noChangeAspect="1" noChangeArrowheads="1"/>
+          </p:cNvPicPr>
+          <p:nvPr/>
+        </p:nvPicPr>
+        <p:blipFill>
+          <a:blip r:embed="rId13" cstate="print">
+            <a:extLst>
+              <a:ext uri="{28A0092B-C50C-407E-A947-70E740481C1C}">
+                <a14:useLocalDpi xmlns:a14="http://schemas.microsoft.com/office/drawing/2010/main" val="0"/>
+              </a:ext>
+            </a:extLst>
+          </a:blip>
+          <a:srcRect/>
+          <a:stretch>
+            <a:fillRect/>
+          </a:stretch>
+        </p:blipFill>
+        <p:spPr bwMode="auto">
+          <a:xfrm>
+            <a:off x="9824483" y="2944017"/>
+            <a:ext cx="605242" cy="744150"/>
+          </a:xfrm>
+          <a:prstGeom prst="rect">
+            <a:avLst/>
+          </a:prstGeom>
+          <a:noFill/>
+          <a:extLst>
+            <a:ext uri="{909E8E84-426E-40DD-AFC4-6F175D3DCCD1}">
+              <a14:hiddenFill xmlns:a14="http://schemas.microsoft.com/office/drawing/2010/main">
+                <a:solidFill>
+                  <a:srgbClr val="FFFFFF"/>
+                </a:solidFill>
+              </a14:hiddenFill>
+            </a:ext>
+          </a:extLst>
         </p:spPr>
       </p:pic>
     </p:spTree>

</xml_diff>

<commit_message>
Added Go blog post
</commit_message>
<xml_diff>
--- a/_sources/GettingStarted.pptx
+++ b/_sources/GettingStarted.pptx
@@ -43,13 +43,14 @@
     <p:sldId id="272" r:id="rId37"/>
     <p:sldId id="271" r:id="rId38"/>
     <p:sldId id="274" r:id="rId39"/>
-    <p:sldId id="276" r:id="rId40"/>
-    <p:sldId id="277" r:id="rId41"/>
-    <p:sldId id="278" r:id="rId42"/>
-    <p:sldId id="279" r:id="rId43"/>
-    <p:sldId id="280" r:id="rId44"/>
-    <p:sldId id="281" r:id="rId45"/>
-    <p:sldId id="290" r:id="rId46"/>
+    <p:sldId id="301" r:id="rId40"/>
+    <p:sldId id="276" r:id="rId41"/>
+    <p:sldId id="277" r:id="rId42"/>
+    <p:sldId id="278" r:id="rId43"/>
+    <p:sldId id="279" r:id="rId44"/>
+    <p:sldId id="280" r:id="rId45"/>
+    <p:sldId id="281" r:id="rId46"/>
+    <p:sldId id="290" r:id="rId47"/>
   </p:sldIdLst>
   <p:sldSz cx="19199225" cy="10799763"/>
   <p:notesSz cx="6858000" cy="9144000"/>
@@ -39537,167 +39538,127 @@
           <a:chExt cx="0" cy="0"/>
         </a:xfrm>
       </p:grpSpPr>
-      <p:sp>
-        <p:nvSpPr>
-          <p:cNvPr id="4" name="Rounded Rectangle 75"/>
-          <p:cNvSpPr/>
-          <p:nvPr/>
-        </p:nvSpPr>
+      <p:pic>
+        <p:nvPicPr>
+          <p:cNvPr id="16" name="Picture 15"/>
+          <p:cNvPicPr>
+            <a:picLocks noChangeAspect="1"/>
+          </p:cNvPicPr>
+          <p:nvPr/>
+        </p:nvPicPr>
+        <p:blipFill>
+          <a:blip r:embed="rId2">
+            <a:extLst>
+              <a:ext uri="{28A0092B-C50C-407E-A947-70E740481C1C}">
+                <a14:useLocalDpi xmlns:a14="http://schemas.microsoft.com/office/drawing/2010/main" val="0"/>
+              </a:ext>
+            </a:extLst>
+          </a:blip>
+          <a:stretch>
+            <a:fillRect/>
+          </a:stretch>
+        </p:blipFill>
         <p:spPr>
           <a:xfrm>
-            <a:off x="7742509" y="4785914"/>
-            <a:ext cx="1441656" cy="1514439"/>
+            <a:off x="15039844" y="4371975"/>
+            <a:ext cx="2712473" cy="1084989"/>
           </a:xfrm>
           <a:prstGeom prst="rect">
             <a:avLst/>
           </a:prstGeom>
-          <a:solidFill>
-            <a:schemeClr val="accent2">
-              <a:lumMod val="75000"/>
-            </a:schemeClr>
-          </a:solidFill>
-          <a:ln w="76200">
-            <a:solidFill>
-              <a:schemeClr val="accent2">
-                <a:lumMod val="50000"/>
-              </a:schemeClr>
-            </a:solidFill>
-          </a:ln>
         </p:spPr>
-        <p:style>
-          <a:lnRef idx="2">
-            <a:schemeClr val="accent1">
-              <a:shade val="50000"/>
-            </a:schemeClr>
-          </a:lnRef>
-          <a:fillRef idx="1">
-            <a:schemeClr val="accent1"/>
-          </a:fillRef>
-          <a:effectRef idx="0">
-            <a:schemeClr val="accent1"/>
-          </a:effectRef>
-          <a:fontRef idx="minor">
-            <a:schemeClr val="lt1"/>
-          </a:fontRef>
-        </p:style>
-        <p:txBody>
-          <a:bodyPr rtlCol="0" anchor="ctr"/>
-          <a:lstStyle/>
-          <a:p>
-            <a:pPr algn="ctr"/>
-            <a:r>
-              <a:rPr lang="en-US" sz="2000" b="1" dirty="0"/>
-              <a:t>Instance</a:t>
-            </a:r>
-            <a:endParaRPr lang="de-DE" sz="2000" b="1" dirty="0"/>
-          </a:p>
-        </p:txBody>
-      </p:sp>
+      </p:pic>
+      <p:grpSp>
+        <p:nvGrpSpPr>
+          <p:cNvPr id="18" name="Group 17"/>
+          <p:cNvGrpSpPr/>
+          <p:nvPr/>
+        </p:nvGrpSpPr>
+        <p:grpSpPr>
+          <a:xfrm>
+            <a:off x="10803333" y="4382474"/>
+            <a:ext cx="1151769" cy="673166"/>
+            <a:chOff x="2334271" y="318043"/>
+            <a:chExt cx="1457473" cy="673166"/>
+          </a:xfrm>
+        </p:grpSpPr>
+        <p:cxnSp>
+          <p:nvCxnSpPr>
+            <p:cNvPr id="23" name="Straight Arrow Connector 22"/>
+            <p:cNvCxnSpPr/>
+            <p:nvPr/>
+          </p:nvCxnSpPr>
+          <p:spPr>
+            <a:xfrm flipV="1">
+              <a:off x="2346123" y="980728"/>
+              <a:ext cx="1445621" cy="10481"/>
+            </a:xfrm>
+            <a:prstGeom prst="straightConnector1">
+              <a:avLst/>
+            </a:prstGeom>
+            <a:ln w="142875">
+              <a:solidFill>
+                <a:schemeClr val="tx1">
+                  <a:lumMod val="50000"/>
+                  <a:lumOff val="50000"/>
+                </a:schemeClr>
+              </a:solidFill>
+              <a:tailEnd type="triangle"/>
+            </a:ln>
+          </p:spPr>
+          <p:style>
+            <a:lnRef idx="1">
+              <a:schemeClr val="accent1"/>
+            </a:lnRef>
+            <a:fillRef idx="0">
+              <a:schemeClr val="accent1"/>
+            </a:fillRef>
+            <a:effectRef idx="0">
+              <a:schemeClr val="accent1"/>
+            </a:effectRef>
+            <a:fontRef idx="minor">
+              <a:schemeClr val="tx1"/>
+            </a:fontRef>
+          </p:style>
+        </p:cxnSp>
+        <p:sp>
+          <p:nvSpPr>
+            <p:cNvPr id="24" name="TextBox 23"/>
+            <p:cNvSpPr txBox="1"/>
+            <p:nvPr/>
+          </p:nvSpPr>
+          <p:spPr>
+            <a:xfrm>
+              <a:off x="2334271" y="318043"/>
+              <a:ext cx="1408522" cy="523220"/>
+            </a:xfrm>
+            <a:prstGeom prst="rect">
+              <a:avLst/>
+            </a:prstGeom>
+            <a:noFill/>
+          </p:spPr>
+          <p:txBody>
+            <a:bodyPr wrap="square" rtlCol="0">
+              <a:spAutoFit/>
+            </a:bodyPr>
+            <a:lstStyle/>
+            <a:p>
+              <a:pPr algn="ctr"/>
+              <a:endParaRPr lang="de-DE" sz="2800" b="1" dirty="0"/>
+            </a:p>
+          </p:txBody>
+        </p:sp>
+      </p:grpSp>
       <p:sp>
         <p:nvSpPr>
-          <p:cNvPr id="5" name="Rounded Rectangle 75"/>
-          <p:cNvSpPr/>
+          <p:cNvPr id="27" name="TextBox 26"/>
+          <p:cNvSpPr txBox="1"/>
           <p:nvPr/>
         </p:nvSpPr>
         <p:spPr>
           <a:xfrm>
-            <a:off x="9512693" y="4785914"/>
-            <a:ext cx="1441656" cy="1514439"/>
-          </a:xfrm>
-          <a:prstGeom prst="rect">
-            <a:avLst/>
-          </a:prstGeom>
-          <a:solidFill>
-            <a:schemeClr val="accent2">
-              <a:lumMod val="75000"/>
-            </a:schemeClr>
-          </a:solidFill>
-          <a:ln w="76200">
-            <a:solidFill>
-              <a:schemeClr val="accent2">
-                <a:lumMod val="50000"/>
-              </a:schemeClr>
-            </a:solidFill>
-          </a:ln>
-        </p:spPr>
-        <p:style>
-          <a:lnRef idx="2">
-            <a:schemeClr val="accent1">
-              <a:shade val="50000"/>
-            </a:schemeClr>
-          </a:lnRef>
-          <a:fillRef idx="1">
-            <a:schemeClr val="accent1"/>
-          </a:fillRef>
-          <a:effectRef idx="0">
-            <a:schemeClr val="accent1"/>
-          </a:effectRef>
-          <a:fontRef idx="minor">
-            <a:schemeClr val="lt1"/>
-          </a:fontRef>
-        </p:style>
-        <p:txBody>
-          <a:bodyPr rtlCol="0" anchor="ctr"/>
-          <a:lstStyle/>
-          <a:p>
-            <a:pPr algn="ctr"/>
-            <a:r>
-              <a:rPr lang="en-US" sz="2000" b="1" dirty="0"/>
-              <a:t>Instance</a:t>
-            </a:r>
-            <a:endParaRPr lang="de-DE" sz="2000" b="1" dirty="0"/>
-          </a:p>
-        </p:txBody>
-      </p:sp>
-      <p:cxnSp>
-        <p:nvCxnSpPr>
-          <p:cNvPr id="6" name="Straight Arrow Connector 5"/>
-          <p:cNvCxnSpPr/>
-          <p:nvPr/>
-        </p:nvCxnSpPr>
-        <p:spPr>
-          <a:xfrm>
-            <a:off x="11187515" y="5549075"/>
-            <a:ext cx="2096868" cy="0"/>
-          </a:xfrm>
-          <a:prstGeom prst="straightConnector1">
-            <a:avLst/>
-          </a:prstGeom>
-          <a:ln w="142875">
-            <a:solidFill>
-              <a:schemeClr val="tx1">
-                <a:lumMod val="50000"/>
-                <a:lumOff val="50000"/>
-              </a:schemeClr>
-            </a:solidFill>
-            <a:tailEnd type="triangle"/>
-          </a:ln>
-        </p:spPr>
-        <p:style>
-          <a:lnRef idx="1">
-            <a:schemeClr val="accent1"/>
-          </a:lnRef>
-          <a:fillRef idx="0">
-            <a:schemeClr val="accent1"/>
-          </a:fillRef>
-          <a:effectRef idx="0">
-            <a:schemeClr val="accent1"/>
-          </a:effectRef>
-          <a:fontRef idx="minor">
-            <a:schemeClr val="tx1"/>
-          </a:fontRef>
-        </p:style>
-      </p:cxnSp>
-      <p:sp>
-        <p:nvSpPr>
-          <p:cNvPr id="10" name="TextBox 9"/>
-          <p:cNvSpPr txBox="1"/>
-          <p:nvPr/>
-        </p:nvSpPr>
-        <p:spPr>
-          <a:xfrm>
-            <a:off x="11289847" y="4985990"/>
-            <a:ext cx="1519752" cy="523220"/>
+            <a:off x="11685510" y="5803960"/>
+            <a:ext cx="4535565" cy="2062103"/>
           </a:xfrm>
           <a:prstGeom prst="rect">
             <a:avLst/>
@@ -39710,557 +39671,342 @@
           </a:bodyPr>
           <a:lstStyle/>
           <a:p>
-            <a:pPr algn="ctr"/>
             <a:r>
-              <a:rPr lang="en-US" sz="2800" b="1" dirty="0"/>
-              <a:t>scale out</a:t>
+              <a:rPr lang="en-US" sz="2800" b="1" dirty="0">
+                <a:solidFill>
+                  <a:schemeClr val="bg2">
+                    <a:lumMod val="25000"/>
+                  </a:schemeClr>
+                </a:solidFill>
+              </a:rPr>
+              <a:t>Boxfuse Image</a:t>
             </a:r>
-            <a:endParaRPr lang="de-DE" sz="2800" b="1" dirty="0"/>
+          </a:p>
+          <a:p>
+            <a:pPr marL="360363" indent="-360363">
+              <a:buFont typeface="Wingdings" panose="05000000000000000000" pitchFamily="2" charset="2"/>
+              <a:buChar char="ü"/>
+            </a:pPr>
+            <a:r>
+              <a:rPr lang="en-US" sz="2000" b="1" dirty="0">
+                <a:solidFill>
+                  <a:schemeClr val="bg1">
+                    <a:lumMod val="50000"/>
+                  </a:schemeClr>
+                </a:solidFill>
+              </a:rPr>
+              <a:t>7 MB</a:t>
+            </a:r>
+          </a:p>
+          <a:p>
+            <a:pPr marL="360363" indent="-360363">
+              <a:buFont typeface="Wingdings" panose="05000000000000000000" pitchFamily="2" charset="2"/>
+              <a:buChar char="ü"/>
+            </a:pPr>
+            <a:r>
+              <a:rPr lang="en-US" sz="2000" b="1" dirty="0">
+                <a:solidFill>
+                  <a:schemeClr val="bg1">
+                    <a:lumMod val="50000"/>
+                  </a:schemeClr>
+                </a:solidFill>
+              </a:rPr>
+              <a:t>&lt; 1 sec provisioning</a:t>
+            </a:r>
+          </a:p>
+          <a:p>
+            <a:pPr marL="360363" indent="-360363">
+              <a:buFont typeface="Wingdings" panose="05000000000000000000" pitchFamily="2" charset="2"/>
+              <a:buChar char="ü"/>
+            </a:pPr>
+            <a:r>
+              <a:rPr lang="en-US" sz="2000" b="1" dirty="0">
+                <a:solidFill>
+                  <a:schemeClr val="bg1">
+                    <a:lumMod val="50000"/>
+                  </a:schemeClr>
+                </a:solidFill>
+              </a:rPr>
+              <a:t>only app ELF64 binary &amp; Linux kernel</a:t>
+            </a:r>
+          </a:p>
+          <a:p>
+            <a:pPr marL="360363" indent="-360363">
+              <a:buFont typeface="Wingdings" panose="05000000000000000000" pitchFamily="2" charset="2"/>
+              <a:buChar char="ü"/>
+            </a:pPr>
+            <a:r>
+              <a:rPr lang="en-US" sz="2000" b="1" dirty="0">
+                <a:solidFill>
+                  <a:schemeClr val="bg1">
+                    <a:lumMod val="50000"/>
+                  </a:schemeClr>
+                </a:solidFill>
+              </a:rPr>
+              <a:t>secure</a:t>
+            </a:r>
+          </a:p>
+          <a:p>
+            <a:pPr marL="360363" indent="-360363">
+              <a:buFont typeface="Wingdings" panose="05000000000000000000" pitchFamily="2" charset="2"/>
+              <a:buChar char="ü"/>
+            </a:pPr>
+            <a:r>
+              <a:rPr lang="en-US" sz="2000" b="1" dirty="0">
+                <a:solidFill>
+                  <a:schemeClr val="bg1">
+                    <a:lumMod val="50000"/>
+                  </a:schemeClr>
+                </a:solidFill>
+              </a:rPr>
+              <a:t>boots directly on </a:t>
+            </a:r>
+            <a:r>
+              <a:rPr lang="en-US" sz="2000" b="1" dirty="0" err="1">
+                <a:solidFill>
+                  <a:schemeClr val="bg1">
+                    <a:lumMod val="50000"/>
+                  </a:schemeClr>
+                </a:solidFill>
+              </a:rPr>
+              <a:t>VirtualBox</a:t>
+            </a:r>
+            <a:r>
+              <a:rPr lang="en-US" sz="2000" b="1" dirty="0">
+                <a:solidFill>
+                  <a:schemeClr val="bg1">
+                    <a:lumMod val="50000"/>
+                  </a:schemeClr>
+                </a:solidFill>
+              </a:rPr>
+              <a:t> &amp; AWS</a:t>
+            </a:r>
           </a:p>
         </p:txBody>
       </p:sp>
-      <p:sp>
-        <p:nvSpPr>
-          <p:cNvPr id="11" name="Rounded Rectangle 75"/>
-          <p:cNvSpPr/>
-          <p:nvPr/>
-        </p:nvSpPr>
-        <p:spPr>
-          <a:xfrm>
-            <a:off x="13460440" y="5712037"/>
-            <a:ext cx="1441656" cy="1514439"/>
-          </a:xfrm>
-          <a:prstGeom prst="rect">
-            <a:avLst/>
-          </a:prstGeom>
-          <a:solidFill>
-            <a:schemeClr val="accent2">
-              <a:lumMod val="75000"/>
-            </a:schemeClr>
-          </a:solidFill>
-          <a:ln w="76200">
+      <p:grpSp>
+        <p:nvGrpSpPr>
+          <p:cNvPr id="28" name="Group 27"/>
+          <p:cNvGrpSpPr/>
+          <p:nvPr/>
+        </p:nvGrpSpPr>
+        <p:grpSpPr>
+          <a:xfrm>
+            <a:off x="12169414" y="4379497"/>
+            <a:ext cx="1309662" cy="1309662"/>
+            <a:chOff x="8287098" y="3699247"/>
+            <a:chExt cx="1309662" cy="1309662"/>
+          </a:xfrm>
+        </p:grpSpPr>
+        <p:sp>
+          <p:nvSpPr>
+            <p:cNvPr id="29" name="Rounded Rectangle 25"/>
+            <p:cNvSpPr/>
+            <p:nvPr/>
+          </p:nvSpPr>
+          <p:spPr>
+            <a:xfrm>
+              <a:off x="8287098" y="3699247"/>
+              <a:ext cx="1309662" cy="1309662"/>
+            </a:xfrm>
+            <a:prstGeom prst="ellipse">
+              <a:avLst/>
+            </a:prstGeom>
             <a:solidFill>
-              <a:schemeClr val="accent2">
-                <a:lumMod val="50000"/>
+              <a:schemeClr val="accent1">
+                <a:lumMod val="75000"/>
               </a:schemeClr>
             </a:solidFill>
-          </a:ln>
-        </p:spPr>
-        <p:style>
-          <a:lnRef idx="2">
-            <a:schemeClr val="accent1">
-              <a:shade val="50000"/>
-            </a:schemeClr>
-          </a:lnRef>
-          <a:fillRef idx="1">
-            <a:schemeClr val="accent1"/>
-          </a:fillRef>
-          <a:effectRef idx="0">
-            <a:schemeClr val="accent1"/>
-          </a:effectRef>
-          <a:fontRef idx="minor">
-            <a:schemeClr val="lt1"/>
-          </a:fontRef>
-        </p:style>
-        <p:txBody>
-          <a:bodyPr rtlCol="0" anchor="ctr"/>
-          <a:lstStyle/>
-          <a:p>
-            <a:pPr algn="ctr"/>
-            <a:r>
-              <a:rPr lang="en-US" sz="2000" b="1" dirty="0"/>
-              <a:t>Instance</a:t>
-            </a:r>
-            <a:endParaRPr lang="de-DE" sz="2000" b="1" dirty="0"/>
-          </a:p>
-        </p:txBody>
-      </p:sp>
-      <p:sp>
-        <p:nvSpPr>
-          <p:cNvPr id="12" name="Rounded Rectangle 75"/>
-          <p:cNvSpPr/>
-          <p:nvPr/>
-        </p:nvSpPr>
-        <p:spPr>
-          <a:xfrm>
-            <a:off x="15230624" y="5712037"/>
-            <a:ext cx="1441656" cy="1514439"/>
-          </a:xfrm>
-          <a:prstGeom prst="rect">
-            <a:avLst/>
-          </a:prstGeom>
-          <a:solidFill>
-            <a:schemeClr val="accent2">
-              <a:lumMod val="75000"/>
-            </a:schemeClr>
-          </a:solidFill>
-          <a:ln w="76200">
-            <a:solidFill>
-              <a:schemeClr val="accent2">
-                <a:lumMod val="50000"/>
+            <a:ln w="114300">
+              <a:solidFill>
+                <a:schemeClr val="accent1">
+                  <a:lumMod val="50000"/>
+                </a:schemeClr>
+              </a:solidFill>
+            </a:ln>
+          </p:spPr>
+          <p:style>
+            <a:lnRef idx="2">
+              <a:schemeClr val="accent1">
+                <a:shade val="50000"/>
               </a:schemeClr>
-            </a:solidFill>
-          </a:ln>
-        </p:spPr>
-        <p:style>
-          <a:lnRef idx="2">
-            <a:schemeClr val="accent1">
-              <a:shade val="50000"/>
-            </a:schemeClr>
-          </a:lnRef>
-          <a:fillRef idx="1">
-            <a:schemeClr val="accent1"/>
-          </a:fillRef>
-          <a:effectRef idx="0">
-            <a:schemeClr val="accent1"/>
-          </a:effectRef>
-          <a:fontRef idx="minor">
-            <a:schemeClr val="lt1"/>
-          </a:fontRef>
-        </p:style>
-        <p:txBody>
-          <a:bodyPr rtlCol="0" anchor="ctr"/>
-          <a:lstStyle/>
-          <a:p>
-            <a:pPr algn="ctr"/>
-            <a:r>
-              <a:rPr lang="en-US" sz="2000" b="1" dirty="0"/>
-              <a:t>Instance</a:t>
-            </a:r>
-            <a:endParaRPr lang="de-DE" sz="2000" b="1" dirty="0"/>
-          </a:p>
-        </p:txBody>
-      </p:sp>
-      <p:sp>
-        <p:nvSpPr>
-          <p:cNvPr id="13" name="Rounded Rectangle 75"/>
-          <p:cNvSpPr/>
-          <p:nvPr/>
-        </p:nvSpPr>
-        <p:spPr>
-          <a:xfrm>
-            <a:off x="13454578" y="3886168"/>
-            <a:ext cx="1441656" cy="1514439"/>
-          </a:xfrm>
-          <a:prstGeom prst="rect">
-            <a:avLst/>
-          </a:prstGeom>
-          <a:solidFill>
-            <a:schemeClr val="accent2">
-              <a:lumMod val="75000"/>
-            </a:schemeClr>
-          </a:solidFill>
-          <a:ln w="76200">
-            <a:solidFill>
-              <a:schemeClr val="accent2">
-                <a:lumMod val="50000"/>
-              </a:schemeClr>
-            </a:solidFill>
-          </a:ln>
-        </p:spPr>
-        <p:style>
-          <a:lnRef idx="2">
-            <a:schemeClr val="accent1">
-              <a:shade val="50000"/>
-            </a:schemeClr>
-          </a:lnRef>
-          <a:fillRef idx="1">
-            <a:schemeClr val="accent1"/>
-          </a:fillRef>
-          <a:effectRef idx="0">
-            <a:schemeClr val="accent1"/>
-          </a:effectRef>
-          <a:fontRef idx="minor">
-            <a:schemeClr val="lt1"/>
-          </a:fontRef>
-        </p:style>
-        <p:txBody>
-          <a:bodyPr rtlCol="0" anchor="ctr"/>
-          <a:lstStyle/>
-          <a:p>
-            <a:pPr algn="ctr"/>
-            <a:r>
-              <a:rPr lang="en-US" sz="2000" b="1" dirty="0"/>
-              <a:t>Instance</a:t>
-            </a:r>
-            <a:endParaRPr lang="de-DE" sz="2000" b="1" dirty="0"/>
-          </a:p>
-        </p:txBody>
-      </p:sp>
-      <p:sp>
-        <p:nvSpPr>
-          <p:cNvPr id="14" name="Rounded Rectangle 75"/>
-          <p:cNvSpPr/>
-          <p:nvPr/>
-        </p:nvSpPr>
-        <p:spPr>
-          <a:xfrm>
-            <a:off x="15224762" y="3886168"/>
-            <a:ext cx="1441656" cy="1514439"/>
-          </a:xfrm>
-          <a:prstGeom prst="rect">
-            <a:avLst/>
-          </a:prstGeom>
-          <a:solidFill>
-            <a:schemeClr val="accent2">
-              <a:lumMod val="75000"/>
-            </a:schemeClr>
-          </a:solidFill>
-          <a:ln w="76200">
-            <a:solidFill>
-              <a:schemeClr val="accent2">
-                <a:lumMod val="50000"/>
-              </a:schemeClr>
-            </a:solidFill>
-          </a:ln>
-        </p:spPr>
-        <p:style>
-          <a:lnRef idx="2">
-            <a:schemeClr val="accent1">
-              <a:shade val="50000"/>
-            </a:schemeClr>
-          </a:lnRef>
-          <a:fillRef idx="1">
-            <a:schemeClr val="accent1"/>
-          </a:fillRef>
-          <a:effectRef idx="0">
-            <a:schemeClr val="accent1"/>
-          </a:effectRef>
-          <a:fontRef idx="minor">
-            <a:schemeClr val="lt1"/>
-          </a:fontRef>
-        </p:style>
-        <p:txBody>
-          <a:bodyPr rtlCol="0" anchor="ctr"/>
-          <a:lstStyle/>
-          <a:p>
-            <a:pPr algn="ctr"/>
-            <a:r>
-              <a:rPr lang="en-US" sz="2000" b="1" dirty="0"/>
-              <a:t>Instance</a:t>
-            </a:r>
-            <a:endParaRPr lang="de-DE" sz="2000" b="1" dirty="0"/>
-          </a:p>
-        </p:txBody>
-      </p:sp>
-      <p:cxnSp>
-        <p:nvCxnSpPr>
-          <p:cNvPr id="15" name="Straight Arrow Connector 14"/>
-          <p:cNvCxnSpPr/>
-          <p:nvPr/>
-        </p:nvCxnSpPr>
-        <p:spPr>
-          <a:xfrm flipH="1" flipV="1">
-            <a:off x="5426992" y="5525631"/>
-            <a:ext cx="2089638" cy="4730"/>
-          </a:xfrm>
-          <a:prstGeom prst="straightConnector1">
-            <a:avLst/>
-          </a:prstGeom>
-          <a:ln w="142875">
-            <a:solidFill>
-              <a:schemeClr val="tx1">
-                <a:lumMod val="50000"/>
-                <a:lumOff val="50000"/>
-              </a:schemeClr>
-            </a:solidFill>
-            <a:tailEnd type="triangle"/>
-          </a:ln>
-        </p:spPr>
-        <p:style>
-          <a:lnRef idx="1">
-            <a:schemeClr val="accent1"/>
-          </a:lnRef>
-          <a:fillRef idx="0">
-            <a:schemeClr val="accent1"/>
-          </a:fillRef>
-          <a:effectRef idx="0">
-            <a:schemeClr val="accent1"/>
-          </a:effectRef>
-          <a:fontRef idx="minor">
-            <a:schemeClr val="tx1"/>
-          </a:fontRef>
-        </p:style>
-      </p:cxnSp>
-      <p:sp>
-        <p:nvSpPr>
-          <p:cNvPr id="16" name="TextBox 15"/>
-          <p:cNvSpPr txBox="1"/>
-          <p:nvPr/>
-        </p:nvSpPr>
-        <p:spPr>
-          <a:xfrm>
-            <a:off x="5938262" y="4953752"/>
-            <a:ext cx="1519752" cy="523220"/>
+            </a:lnRef>
+            <a:fillRef idx="1">
+              <a:schemeClr val="accent1"/>
+            </a:fillRef>
+            <a:effectRef idx="0">
+              <a:schemeClr val="accent1"/>
+            </a:effectRef>
+            <a:fontRef idx="minor">
+              <a:schemeClr val="lt1"/>
+            </a:fontRef>
+          </p:style>
+          <p:txBody>
+            <a:bodyPr rtlCol="0" anchor="ctr"/>
+            <a:lstStyle/>
+            <a:p>
+              <a:pPr algn="ctr"/>
+              <a:endParaRPr lang="de-DE" sz="1000"/>
+            </a:p>
+          </p:txBody>
+        </p:sp>
+        <p:pic>
+          <p:nvPicPr>
+            <p:cNvPr id="30" name="Picture 29"/>
+            <p:cNvPicPr>
+              <a:picLocks noChangeAspect="1"/>
+            </p:cNvPicPr>
+            <p:nvPr/>
+          </p:nvPicPr>
+          <p:blipFill>
+            <a:blip r:embed="rId3" cstate="print">
+              <a:extLst>
+                <a:ext uri="{28A0092B-C50C-407E-A947-70E740481C1C}">
+                  <a14:useLocalDpi xmlns:a14="http://schemas.microsoft.com/office/drawing/2010/main" val="0"/>
+                </a:ext>
+              </a:extLst>
+            </a:blip>
+            <a:stretch>
+              <a:fillRect/>
+            </a:stretch>
+          </p:blipFill>
+          <p:spPr>
+            <a:xfrm>
+              <a:off x="8340739" y="3731301"/>
+              <a:ext cx="1238267" cy="1238267"/>
+            </a:xfrm>
+            <a:prstGeom prst="rect">
+              <a:avLst/>
+            </a:prstGeom>
+          </p:spPr>
+        </p:pic>
+      </p:grpSp>
+      <p:grpSp>
+        <p:nvGrpSpPr>
+          <p:cNvPr id="31" name="Group 30"/>
+          <p:cNvGrpSpPr/>
+          <p:nvPr/>
+        </p:nvGrpSpPr>
+        <p:grpSpPr>
+          <a:xfrm>
+            <a:off x="13737033" y="4334849"/>
+            <a:ext cx="1151769" cy="673166"/>
+            <a:chOff x="2334271" y="318043"/>
+            <a:chExt cx="1457473" cy="673166"/>
+          </a:xfrm>
+        </p:grpSpPr>
+        <p:cxnSp>
+          <p:nvCxnSpPr>
+            <p:cNvPr id="32" name="Straight Arrow Connector 31"/>
+            <p:cNvCxnSpPr/>
+            <p:nvPr/>
+          </p:nvCxnSpPr>
+          <p:spPr>
+            <a:xfrm flipV="1">
+              <a:off x="2346123" y="980728"/>
+              <a:ext cx="1445621" cy="10481"/>
+            </a:xfrm>
+            <a:prstGeom prst="straightConnector1">
+              <a:avLst/>
+            </a:prstGeom>
+            <a:ln w="142875">
+              <a:solidFill>
+                <a:schemeClr val="tx1">
+                  <a:lumMod val="50000"/>
+                  <a:lumOff val="50000"/>
+                </a:schemeClr>
+              </a:solidFill>
+              <a:tailEnd type="triangle"/>
+            </a:ln>
+          </p:spPr>
+          <p:style>
+            <a:lnRef idx="1">
+              <a:schemeClr val="accent1"/>
+            </a:lnRef>
+            <a:fillRef idx="0">
+              <a:schemeClr val="accent1"/>
+            </a:fillRef>
+            <a:effectRef idx="0">
+              <a:schemeClr val="accent1"/>
+            </a:effectRef>
+            <a:fontRef idx="minor">
+              <a:schemeClr val="tx1"/>
+            </a:fontRef>
+          </p:style>
+        </p:cxnSp>
+        <p:sp>
+          <p:nvSpPr>
+            <p:cNvPr id="33" name="TextBox 32"/>
+            <p:cNvSpPr txBox="1"/>
+            <p:nvPr/>
+          </p:nvSpPr>
+          <p:spPr>
+            <a:xfrm>
+              <a:off x="2334271" y="318043"/>
+              <a:ext cx="1408522" cy="523220"/>
+            </a:xfrm>
+            <a:prstGeom prst="rect">
+              <a:avLst/>
+            </a:prstGeom>
+            <a:noFill/>
+          </p:spPr>
+          <p:txBody>
+            <a:bodyPr wrap="square" rtlCol="0">
+              <a:spAutoFit/>
+            </a:bodyPr>
+            <a:lstStyle/>
+            <a:p>
+              <a:pPr algn="ctr"/>
+              <a:endParaRPr lang="de-DE" sz="2800" b="1" dirty="0"/>
+            </a:p>
+          </p:txBody>
+        </p:sp>
+      </p:grpSp>
+      <p:pic>
+        <p:nvPicPr>
+          <p:cNvPr id="3" name="Picture 2" descr="https://boxfuse.com/assets/img/go.png"/>
+          <p:cNvPicPr>
+            <a:picLocks noChangeAspect="1" noChangeArrowheads="1"/>
+          </p:cNvPicPr>
+          <p:nvPr/>
+        </p:nvPicPr>
+        <p:blipFill>
+          <a:blip r:embed="rId4">
+            <a:extLst>
+              <a:ext uri="{28A0092B-C50C-407E-A947-70E740481C1C}">
+                <a14:useLocalDpi xmlns:a14="http://schemas.microsoft.com/office/drawing/2010/main" val="0"/>
+              </a:ext>
+            </a:extLst>
+          </a:blip>
+          <a:srcRect/>
+          <a:stretch>
+            <a:fillRect/>
+          </a:stretch>
+        </p:blipFill>
+        <p:spPr bwMode="auto">
+          <a:xfrm>
+            <a:off x="9448431" y="4385931"/>
+            <a:ext cx="1162050" cy="1428750"/>
           </a:xfrm>
           <a:prstGeom prst="rect">
             <a:avLst/>
           </a:prstGeom>
           <a:noFill/>
-        </p:spPr>
-        <p:txBody>
-          <a:bodyPr wrap="square" rtlCol="0">
-            <a:spAutoFit/>
-          </a:bodyPr>
-          <a:lstStyle/>
-          <a:p>
-            <a:pPr algn="ctr"/>
-            <a:r>
-              <a:rPr lang="en-US" sz="2800" b="1" dirty="0"/>
-              <a:t>scale in</a:t>
-            </a:r>
-            <a:endParaRPr lang="de-DE" sz="2800" b="1" dirty="0"/>
-          </a:p>
-        </p:txBody>
-      </p:sp>
-      <p:sp>
-        <p:nvSpPr>
-          <p:cNvPr id="22" name="Rounded Rectangle 75"/>
-          <p:cNvSpPr/>
-          <p:nvPr/>
-        </p:nvSpPr>
-        <p:spPr>
-          <a:xfrm>
-            <a:off x="3815278" y="4736091"/>
-            <a:ext cx="1441656" cy="1514439"/>
-          </a:xfrm>
-          <a:prstGeom prst="rect">
-            <a:avLst/>
-          </a:prstGeom>
-          <a:solidFill>
-            <a:schemeClr val="accent2">
-              <a:lumMod val="75000"/>
-            </a:schemeClr>
-          </a:solidFill>
-          <a:ln w="76200">
-            <a:solidFill>
-              <a:schemeClr val="accent2">
-                <a:lumMod val="50000"/>
-              </a:schemeClr>
-            </a:solidFill>
-          </a:ln>
-        </p:spPr>
-        <p:style>
-          <a:lnRef idx="2">
-            <a:schemeClr val="accent1">
-              <a:shade val="50000"/>
-            </a:schemeClr>
-          </a:lnRef>
-          <a:fillRef idx="1">
-            <a:schemeClr val="accent1"/>
-          </a:fillRef>
-          <a:effectRef idx="0">
-            <a:schemeClr val="accent1"/>
-          </a:effectRef>
-          <a:fontRef idx="minor">
-            <a:schemeClr val="lt1"/>
-          </a:fontRef>
-        </p:style>
-        <p:txBody>
-          <a:bodyPr rtlCol="0" anchor="ctr"/>
-          <a:lstStyle/>
-          <a:p>
-            <a:pPr algn="ctr"/>
-            <a:r>
-              <a:rPr lang="en-US" sz="2000" b="1" dirty="0"/>
-              <a:t>Instance</a:t>
-            </a:r>
-            <a:endParaRPr lang="de-DE" sz="2000" b="1" dirty="0"/>
-          </a:p>
-        </p:txBody>
-      </p:sp>
-      <p:cxnSp>
-        <p:nvCxnSpPr>
-          <p:cNvPr id="23" name="Straight Arrow Connector 22"/>
-          <p:cNvCxnSpPr/>
-          <p:nvPr/>
-        </p:nvCxnSpPr>
-        <p:spPr>
-          <a:xfrm flipV="1">
-            <a:off x="9339569" y="2514600"/>
-            <a:ext cx="5860" cy="1998784"/>
-          </a:xfrm>
-          <a:prstGeom prst="straightConnector1">
-            <a:avLst/>
-          </a:prstGeom>
-          <a:ln w="142875">
-            <a:solidFill>
-              <a:schemeClr val="tx1">
-                <a:lumMod val="50000"/>
-                <a:lumOff val="50000"/>
-              </a:schemeClr>
-            </a:solidFill>
-            <a:tailEnd type="triangle"/>
-          </a:ln>
-        </p:spPr>
-        <p:style>
-          <a:lnRef idx="1">
-            <a:schemeClr val="accent1"/>
-          </a:lnRef>
-          <a:fillRef idx="0">
-            <a:schemeClr val="accent1"/>
-          </a:fillRef>
-          <a:effectRef idx="0">
-            <a:schemeClr val="accent1"/>
-          </a:effectRef>
-          <a:fontRef idx="minor">
-            <a:schemeClr val="tx1"/>
-          </a:fontRef>
-        </p:style>
-      </p:cxnSp>
-      <p:sp>
-        <p:nvSpPr>
-          <p:cNvPr id="25" name="TextBox 24"/>
-          <p:cNvSpPr txBox="1"/>
-          <p:nvPr/>
-        </p:nvSpPr>
-        <p:spPr>
-          <a:xfrm rot="5400000">
-            <a:off x="8904201" y="3435613"/>
-            <a:ext cx="1519752" cy="523220"/>
-          </a:xfrm>
-          <a:prstGeom prst="rect">
-            <a:avLst/>
-          </a:prstGeom>
-          <a:noFill/>
-        </p:spPr>
-        <p:txBody>
-          <a:bodyPr wrap="square" rtlCol="0">
-            <a:spAutoFit/>
-          </a:bodyPr>
-          <a:lstStyle/>
-          <a:p>
-            <a:pPr algn="ctr"/>
-            <a:r>
-              <a:rPr lang="en-US" sz="2800" b="1" dirty="0"/>
-              <a:t>scale up</a:t>
-            </a:r>
-            <a:endParaRPr lang="de-DE" sz="2800" b="1" dirty="0"/>
-          </a:p>
-        </p:txBody>
-      </p:sp>
-      <p:pic>
-        <p:nvPicPr>
-          <p:cNvPr id="26" name="Picture 25"/>
-          <p:cNvPicPr>
-            <a:picLocks noChangeAspect="1"/>
-          </p:cNvPicPr>
-          <p:nvPr/>
-        </p:nvPicPr>
-        <p:blipFill>
-          <a:blip r:embed="rId2"/>
-          <a:stretch>
-            <a:fillRect/>
-          </a:stretch>
-        </p:blipFill>
-        <p:spPr>
-          <a:xfrm>
-            <a:off x="6924850" y="1"/>
-            <a:ext cx="4838464" cy="2347551"/>
-          </a:xfrm>
-          <a:prstGeom prst="rect">
-            <a:avLst/>
-          </a:prstGeom>
-        </p:spPr>
-      </p:pic>
-      <p:cxnSp>
-        <p:nvCxnSpPr>
-          <p:cNvPr id="27" name="Straight Arrow Connector 26"/>
-          <p:cNvCxnSpPr/>
-          <p:nvPr/>
-        </p:nvCxnSpPr>
-        <p:spPr>
-          <a:xfrm>
-            <a:off x="9351292" y="6573715"/>
-            <a:ext cx="11722" cy="2165839"/>
-          </a:xfrm>
-          <a:prstGeom prst="straightConnector1">
-            <a:avLst/>
-          </a:prstGeom>
-          <a:ln w="142875">
-            <a:solidFill>
-              <a:schemeClr val="tx1">
-                <a:lumMod val="50000"/>
-                <a:lumOff val="50000"/>
-              </a:schemeClr>
-            </a:solidFill>
-            <a:tailEnd type="triangle"/>
-          </a:ln>
-        </p:spPr>
-        <p:style>
-          <a:lnRef idx="1">
-            <a:schemeClr val="accent1"/>
-          </a:lnRef>
-          <a:fillRef idx="0">
-            <a:schemeClr val="accent1"/>
-          </a:fillRef>
-          <a:effectRef idx="0">
-            <a:schemeClr val="accent1"/>
-          </a:effectRef>
-          <a:fontRef idx="minor">
-            <a:schemeClr val="tx1"/>
-          </a:fontRef>
-        </p:style>
-      </p:cxnSp>
-      <p:sp>
-        <p:nvSpPr>
-          <p:cNvPr id="32" name="TextBox 31"/>
-          <p:cNvSpPr txBox="1"/>
-          <p:nvPr/>
-        </p:nvSpPr>
-        <p:spPr>
-          <a:xfrm rot="5400000">
-            <a:off x="8648924" y="7169713"/>
-            <a:ext cx="2071338" cy="523220"/>
-          </a:xfrm>
-          <a:prstGeom prst="rect">
-            <a:avLst/>
-          </a:prstGeom>
-          <a:noFill/>
-        </p:spPr>
-        <p:txBody>
-          <a:bodyPr wrap="square" rtlCol="0">
-            <a:spAutoFit/>
-          </a:bodyPr>
-          <a:lstStyle/>
-          <a:p>
-            <a:pPr algn="ctr"/>
-            <a:r>
-              <a:rPr lang="en-US" sz="2800" b="1" dirty="0"/>
-              <a:t>scale down</a:t>
-            </a:r>
-            <a:endParaRPr lang="de-DE" sz="2800" b="1" dirty="0"/>
-          </a:p>
-        </p:txBody>
-      </p:sp>
-      <p:pic>
-        <p:nvPicPr>
-          <p:cNvPr id="33" name="Picture 32"/>
-          <p:cNvPicPr>
-            <a:picLocks noChangeAspect="1"/>
-          </p:cNvPicPr>
-          <p:nvPr/>
-        </p:nvPicPr>
-        <p:blipFill>
-          <a:blip r:embed="rId2"/>
-          <a:stretch>
-            <a:fillRect/>
-          </a:stretch>
-        </p:blipFill>
-        <p:spPr>
-          <a:xfrm>
-            <a:off x="8299144" y="8893579"/>
-            <a:ext cx="2128845" cy="1032884"/>
-          </a:xfrm>
-          <a:prstGeom prst="rect">
-            <a:avLst/>
-          </a:prstGeom>
+          <a:extLst>
+            <a:ext uri="{909E8E84-426E-40DD-AFC4-6F175D3DCCD1}">
+              <a14:hiddenFill xmlns:a14="http://schemas.microsoft.com/office/drawing/2010/main">
+                <a:solidFill>
+                  <a:srgbClr val="FFFFFF"/>
+                </a:solidFill>
+              </a14:hiddenFill>
+            </a:ext>
+          </a:extLst>
         </p:spPr>
       </p:pic>
     </p:spTree>
     <p:extLst>
       <p:ext uri="{BB962C8B-B14F-4D97-AF65-F5344CB8AC3E}">
-        <p14:creationId xmlns:p14="http://schemas.microsoft.com/office/powerpoint/2010/main" val="1846117782"/>
+        <p14:creationId xmlns:p14="http://schemas.microsoft.com/office/powerpoint/2010/main" val="3492492041"/>
       </p:ext>
     </p:extLst>
   </p:cSld>
@@ -42451,6 +42197,756 @@
       </p:grpSpPr>
       <p:sp>
         <p:nvSpPr>
+          <p:cNvPr id="4" name="Rounded Rectangle 75"/>
+          <p:cNvSpPr/>
+          <p:nvPr/>
+        </p:nvSpPr>
+        <p:spPr>
+          <a:xfrm>
+            <a:off x="7742509" y="4785914"/>
+            <a:ext cx="1441656" cy="1514439"/>
+          </a:xfrm>
+          <a:prstGeom prst="rect">
+            <a:avLst/>
+          </a:prstGeom>
+          <a:solidFill>
+            <a:schemeClr val="accent2">
+              <a:lumMod val="75000"/>
+            </a:schemeClr>
+          </a:solidFill>
+          <a:ln w="76200">
+            <a:solidFill>
+              <a:schemeClr val="accent2">
+                <a:lumMod val="50000"/>
+              </a:schemeClr>
+            </a:solidFill>
+          </a:ln>
+        </p:spPr>
+        <p:style>
+          <a:lnRef idx="2">
+            <a:schemeClr val="accent1">
+              <a:shade val="50000"/>
+            </a:schemeClr>
+          </a:lnRef>
+          <a:fillRef idx="1">
+            <a:schemeClr val="accent1"/>
+          </a:fillRef>
+          <a:effectRef idx="0">
+            <a:schemeClr val="accent1"/>
+          </a:effectRef>
+          <a:fontRef idx="minor">
+            <a:schemeClr val="lt1"/>
+          </a:fontRef>
+        </p:style>
+        <p:txBody>
+          <a:bodyPr rtlCol="0" anchor="ctr"/>
+          <a:lstStyle/>
+          <a:p>
+            <a:pPr algn="ctr"/>
+            <a:r>
+              <a:rPr lang="en-US" sz="2000" b="1" dirty="0"/>
+              <a:t>Instance</a:t>
+            </a:r>
+            <a:endParaRPr lang="de-DE" sz="2000" b="1" dirty="0"/>
+          </a:p>
+        </p:txBody>
+      </p:sp>
+      <p:sp>
+        <p:nvSpPr>
+          <p:cNvPr id="5" name="Rounded Rectangle 75"/>
+          <p:cNvSpPr/>
+          <p:nvPr/>
+        </p:nvSpPr>
+        <p:spPr>
+          <a:xfrm>
+            <a:off x="9512693" y="4785914"/>
+            <a:ext cx="1441656" cy="1514439"/>
+          </a:xfrm>
+          <a:prstGeom prst="rect">
+            <a:avLst/>
+          </a:prstGeom>
+          <a:solidFill>
+            <a:schemeClr val="accent2">
+              <a:lumMod val="75000"/>
+            </a:schemeClr>
+          </a:solidFill>
+          <a:ln w="76200">
+            <a:solidFill>
+              <a:schemeClr val="accent2">
+                <a:lumMod val="50000"/>
+              </a:schemeClr>
+            </a:solidFill>
+          </a:ln>
+        </p:spPr>
+        <p:style>
+          <a:lnRef idx="2">
+            <a:schemeClr val="accent1">
+              <a:shade val="50000"/>
+            </a:schemeClr>
+          </a:lnRef>
+          <a:fillRef idx="1">
+            <a:schemeClr val="accent1"/>
+          </a:fillRef>
+          <a:effectRef idx="0">
+            <a:schemeClr val="accent1"/>
+          </a:effectRef>
+          <a:fontRef idx="minor">
+            <a:schemeClr val="lt1"/>
+          </a:fontRef>
+        </p:style>
+        <p:txBody>
+          <a:bodyPr rtlCol="0" anchor="ctr"/>
+          <a:lstStyle/>
+          <a:p>
+            <a:pPr algn="ctr"/>
+            <a:r>
+              <a:rPr lang="en-US" sz="2000" b="1" dirty="0"/>
+              <a:t>Instance</a:t>
+            </a:r>
+            <a:endParaRPr lang="de-DE" sz="2000" b="1" dirty="0"/>
+          </a:p>
+        </p:txBody>
+      </p:sp>
+      <p:cxnSp>
+        <p:nvCxnSpPr>
+          <p:cNvPr id="6" name="Straight Arrow Connector 5"/>
+          <p:cNvCxnSpPr/>
+          <p:nvPr/>
+        </p:nvCxnSpPr>
+        <p:spPr>
+          <a:xfrm>
+            <a:off x="11187515" y="5549075"/>
+            <a:ext cx="2096868" cy="0"/>
+          </a:xfrm>
+          <a:prstGeom prst="straightConnector1">
+            <a:avLst/>
+          </a:prstGeom>
+          <a:ln w="142875">
+            <a:solidFill>
+              <a:schemeClr val="tx1">
+                <a:lumMod val="50000"/>
+                <a:lumOff val="50000"/>
+              </a:schemeClr>
+            </a:solidFill>
+            <a:tailEnd type="triangle"/>
+          </a:ln>
+        </p:spPr>
+        <p:style>
+          <a:lnRef idx="1">
+            <a:schemeClr val="accent1"/>
+          </a:lnRef>
+          <a:fillRef idx="0">
+            <a:schemeClr val="accent1"/>
+          </a:fillRef>
+          <a:effectRef idx="0">
+            <a:schemeClr val="accent1"/>
+          </a:effectRef>
+          <a:fontRef idx="minor">
+            <a:schemeClr val="tx1"/>
+          </a:fontRef>
+        </p:style>
+      </p:cxnSp>
+      <p:sp>
+        <p:nvSpPr>
+          <p:cNvPr id="10" name="TextBox 9"/>
+          <p:cNvSpPr txBox="1"/>
+          <p:nvPr/>
+        </p:nvSpPr>
+        <p:spPr>
+          <a:xfrm>
+            <a:off x="11289847" y="4985990"/>
+            <a:ext cx="1519752" cy="523220"/>
+          </a:xfrm>
+          <a:prstGeom prst="rect">
+            <a:avLst/>
+          </a:prstGeom>
+          <a:noFill/>
+        </p:spPr>
+        <p:txBody>
+          <a:bodyPr wrap="square" rtlCol="0">
+            <a:spAutoFit/>
+          </a:bodyPr>
+          <a:lstStyle/>
+          <a:p>
+            <a:pPr algn="ctr"/>
+            <a:r>
+              <a:rPr lang="en-US" sz="2800" b="1" dirty="0"/>
+              <a:t>scale out</a:t>
+            </a:r>
+            <a:endParaRPr lang="de-DE" sz="2800" b="1" dirty="0"/>
+          </a:p>
+        </p:txBody>
+      </p:sp>
+      <p:sp>
+        <p:nvSpPr>
+          <p:cNvPr id="11" name="Rounded Rectangle 75"/>
+          <p:cNvSpPr/>
+          <p:nvPr/>
+        </p:nvSpPr>
+        <p:spPr>
+          <a:xfrm>
+            <a:off x="13460440" y="5712037"/>
+            <a:ext cx="1441656" cy="1514439"/>
+          </a:xfrm>
+          <a:prstGeom prst="rect">
+            <a:avLst/>
+          </a:prstGeom>
+          <a:solidFill>
+            <a:schemeClr val="accent2">
+              <a:lumMod val="75000"/>
+            </a:schemeClr>
+          </a:solidFill>
+          <a:ln w="76200">
+            <a:solidFill>
+              <a:schemeClr val="accent2">
+                <a:lumMod val="50000"/>
+              </a:schemeClr>
+            </a:solidFill>
+          </a:ln>
+        </p:spPr>
+        <p:style>
+          <a:lnRef idx="2">
+            <a:schemeClr val="accent1">
+              <a:shade val="50000"/>
+            </a:schemeClr>
+          </a:lnRef>
+          <a:fillRef idx="1">
+            <a:schemeClr val="accent1"/>
+          </a:fillRef>
+          <a:effectRef idx="0">
+            <a:schemeClr val="accent1"/>
+          </a:effectRef>
+          <a:fontRef idx="minor">
+            <a:schemeClr val="lt1"/>
+          </a:fontRef>
+        </p:style>
+        <p:txBody>
+          <a:bodyPr rtlCol="0" anchor="ctr"/>
+          <a:lstStyle/>
+          <a:p>
+            <a:pPr algn="ctr"/>
+            <a:r>
+              <a:rPr lang="en-US" sz="2000" b="1" dirty="0"/>
+              <a:t>Instance</a:t>
+            </a:r>
+            <a:endParaRPr lang="de-DE" sz="2000" b="1" dirty="0"/>
+          </a:p>
+        </p:txBody>
+      </p:sp>
+      <p:sp>
+        <p:nvSpPr>
+          <p:cNvPr id="12" name="Rounded Rectangle 75"/>
+          <p:cNvSpPr/>
+          <p:nvPr/>
+        </p:nvSpPr>
+        <p:spPr>
+          <a:xfrm>
+            <a:off x="15230624" y="5712037"/>
+            <a:ext cx="1441656" cy="1514439"/>
+          </a:xfrm>
+          <a:prstGeom prst="rect">
+            <a:avLst/>
+          </a:prstGeom>
+          <a:solidFill>
+            <a:schemeClr val="accent2">
+              <a:lumMod val="75000"/>
+            </a:schemeClr>
+          </a:solidFill>
+          <a:ln w="76200">
+            <a:solidFill>
+              <a:schemeClr val="accent2">
+                <a:lumMod val="50000"/>
+              </a:schemeClr>
+            </a:solidFill>
+          </a:ln>
+        </p:spPr>
+        <p:style>
+          <a:lnRef idx="2">
+            <a:schemeClr val="accent1">
+              <a:shade val="50000"/>
+            </a:schemeClr>
+          </a:lnRef>
+          <a:fillRef idx="1">
+            <a:schemeClr val="accent1"/>
+          </a:fillRef>
+          <a:effectRef idx="0">
+            <a:schemeClr val="accent1"/>
+          </a:effectRef>
+          <a:fontRef idx="minor">
+            <a:schemeClr val="lt1"/>
+          </a:fontRef>
+        </p:style>
+        <p:txBody>
+          <a:bodyPr rtlCol="0" anchor="ctr"/>
+          <a:lstStyle/>
+          <a:p>
+            <a:pPr algn="ctr"/>
+            <a:r>
+              <a:rPr lang="en-US" sz="2000" b="1" dirty="0"/>
+              <a:t>Instance</a:t>
+            </a:r>
+            <a:endParaRPr lang="de-DE" sz="2000" b="1" dirty="0"/>
+          </a:p>
+        </p:txBody>
+      </p:sp>
+      <p:sp>
+        <p:nvSpPr>
+          <p:cNvPr id="13" name="Rounded Rectangle 75"/>
+          <p:cNvSpPr/>
+          <p:nvPr/>
+        </p:nvSpPr>
+        <p:spPr>
+          <a:xfrm>
+            <a:off x="13454578" y="3886168"/>
+            <a:ext cx="1441656" cy="1514439"/>
+          </a:xfrm>
+          <a:prstGeom prst="rect">
+            <a:avLst/>
+          </a:prstGeom>
+          <a:solidFill>
+            <a:schemeClr val="accent2">
+              <a:lumMod val="75000"/>
+            </a:schemeClr>
+          </a:solidFill>
+          <a:ln w="76200">
+            <a:solidFill>
+              <a:schemeClr val="accent2">
+                <a:lumMod val="50000"/>
+              </a:schemeClr>
+            </a:solidFill>
+          </a:ln>
+        </p:spPr>
+        <p:style>
+          <a:lnRef idx="2">
+            <a:schemeClr val="accent1">
+              <a:shade val="50000"/>
+            </a:schemeClr>
+          </a:lnRef>
+          <a:fillRef idx="1">
+            <a:schemeClr val="accent1"/>
+          </a:fillRef>
+          <a:effectRef idx="0">
+            <a:schemeClr val="accent1"/>
+          </a:effectRef>
+          <a:fontRef idx="minor">
+            <a:schemeClr val="lt1"/>
+          </a:fontRef>
+        </p:style>
+        <p:txBody>
+          <a:bodyPr rtlCol="0" anchor="ctr"/>
+          <a:lstStyle/>
+          <a:p>
+            <a:pPr algn="ctr"/>
+            <a:r>
+              <a:rPr lang="en-US" sz="2000" b="1" dirty="0"/>
+              <a:t>Instance</a:t>
+            </a:r>
+            <a:endParaRPr lang="de-DE" sz="2000" b="1" dirty="0"/>
+          </a:p>
+        </p:txBody>
+      </p:sp>
+      <p:sp>
+        <p:nvSpPr>
+          <p:cNvPr id="14" name="Rounded Rectangle 75"/>
+          <p:cNvSpPr/>
+          <p:nvPr/>
+        </p:nvSpPr>
+        <p:spPr>
+          <a:xfrm>
+            <a:off x="15224762" y="3886168"/>
+            <a:ext cx="1441656" cy="1514439"/>
+          </a:xfrm>
+          <a:prstGeom prst="rect">
+            <a:avLst/>
+          </a:prstGeom>
+          <a:solidFill>
+            <a:schemeClr val="accent2">
+              <a:lumMod val="75000"/>
+            </a:schemeClr>
+          </a:solidFill>
+          <a:ln w="76200">
+            <a:solidFill>
+              <a:schemeClr val="accent2">
+                <a:lumMod val="50000"/>
+              </a:schemeClr>
+            </a:solidFill>
+          </a:ln>
+        </p:spPr>
+        <p:style>
+          <a:lnRef idx="2">
+            <a:schemeClr val="accent1">
+              <a:shade val="50000"/>
+            </a:schemeClr>
+          </a:lnRef>
+          <a:fillRef idx="1">
+            <a:schemeClr val="accent1"/>
+          </a:fillRef>
+          <a:effectRef idx="0">
+            <a:schemeClr val="accent1"/>
+          </a:effectRef>
+          <a:fontRef idx="minor">
+            <a:schemeClr val="lt1"/>
+          </a:fontRef>
+        </p:style>
+        <p:txBody>
+          <a:bodyPr rtlCol="0" anchor="ctr"/>
+          <a:lstStyle/>
+          <a:p>
+            <a:pPr algn="ctr"/>
+            <a:r>
+              <a:rPr lang="en-US" sz="2000" b="1" dirty="0"/>
+              <a:t>Instance</a:t>
+            </a:r>
+            <a:endParaRPr lang="de-DE" sz="2000" b="1" dirty="0"/>
+          </a:p>
+        </p:txBody>
+      </p:sp>
+      <p:cxnSp>
+        <p:nvCxnSpPr>
+          <p:cNvPr id="15" name="Straight Arrow Connector 14"/>
+          <p:cNvCxnSpPr/>
+          <p:nvPr/>
+        </p:nvCxnSpPr>
+        <p:spPr>
+          <a:xfrm flipH="1" flipV="1">
+            <a:off x="5426992" y="5525631"/>
+            <a:ext cx="2089638" cy="4730"/>
+          </a:xfrm>
+          <a:prstGeom prst="straightConnector1">
+            <a:avLst/>
+          </a:prstGeom>
+          <a:ln w="142875">
+            <a:solidFill>
+              <a:schemeClr val="tx1">
+                <a:lumMod val="50000"/>
+                <a:lumOff val="50000"/>
+              </a:schemeClr>
+            </a:solidFill>
+            <a:tailEnd type="triangle"/>
+          </a:ln>
+        </p:spPr>
+        <p:style>
+          <a:lnRef idx="1">
+            <a:schemeClr val="accent1"/>
+          </a:lnRef>
+          <a:fillRef idx="0">
+            <a:schemeClr val="accent1"/>
+          </a:fillRef>
+          <a:effectRef idx="0">
+            <a:schemeClr val="accent1"/>
+          </a:effectRef>
+          <a:fontRef idx="minor">
+            <a:schemeClr val="tx1"/>
+          </a:fontRef>
+        </p:style>
+      </p:cxnSp>
+      <p:sp>
+        <p:nvSpPr>
+          <p:cNvPr id="16" name="TextBox 15"/>
+          <p:cNvSpPr txBox="1"/>
+          <p:nvPr/>
+        </p:nvSpPr>
+        <p:spPr>
+          <a:xfrm>
+            <a:off x="5938262" y="4953752"/>
+            <a:ext cx="1519752" cy="523220"/>
+          </a:xfrm>
+          <a:prstGeom prst="rect">
+            <a:avLst/>
+          </a:prstGeom>
+          <a:noFill/>
+        </p:spPr>
+        <p:txBody>
+          <a:bodyPr wrap="square" rtlCol="0">
+            <a:spAutoFit/>
+          </a:bodyPr>
+          <a:lstStyle/>
+          <a:p>
+            <a:pPr algn="ctr"/>
+            <a:r>
+              <a:rPr lang="en-US" sz="2800" b="1" dirty="0"/>
+              <a:t>scale in</a:t>
+            </a:r>
+            <a:endParaRPr lang="de-DE" sz="2800" b="1" dirty="0"/>
+          </a:p>
+        </p:txBody>
+      </p:sp>
+      <p:sp>
+        <p:nvSpPr>
+          <p:cNvPr id="22" name="Rounded Rectangle 75"/>
+          <p:cNvSpPr/>
+          <p:nvPr/>
+        </p:nvSpPr>
+        <p:spPr>
+          <a:xfrm>
+            <a:off x="3815278" y="4736091"/>
+            <a:ext cx="1441656" cy="1514439"/>
+          </a:xfrm>
+          <a:prstGeom prst="rect">
+            <a:avLst/>
+          </a:prstGeom>
+          <a:solidFill>
+            <a:schemeClr val="accent2">
+              <a:lumMod val="75000"/>
+            </a:schemeClr>
+          </a:solidFill>
+          <a:ln w="76200">
+            <a:solidFill>
+              <a:schemeClr val="accent2">
+                <a:lumMod val="50000"/>
+              </a:schemeClr>
+            </a:solidFill>
+          </a:ln>
+        </p:spPr>
+        <p:style>
+          <a:lnRef idx="2">
+            <a:schemeClr val="accent1">
+              <a:shade val="50000"/>
+            </a:schemeClr>
+          </a:lnRef>
+          <a:fillRef idx="1">
+            <a:schemeClr val="accent1"/>
+          </a:fillRef>
+          <a:effectRef idx="0">
+            <a:schemeClr val="accent1"/>
+          </a:effectRef>
+          <a:fontRef idx="minor">
+            <a:schemeClr val="lt1"/>
+          </a:fontRef>
+        </p:style>
+        <p:txBody>
+          <a:bodyPr rtlCol="0" anchor="ctr"/>
+          <a:lstStyle/>
+          <a:p>
+            <a:pPr algn="ctr"/>
+            <a:r>
+              <a:rPr lang="en-US" sz="2000" b="1" dirty="0"/>
+              <a:t>Instance</a:t>
+            </a:r>
+            <a:endParaRPr lang="de-DE" sz="2000" b="1" dirty="0"/>
+          </a:p>
+        </p:txBody>
+      </p:sp>
+      <p:cxnSp>
+        <p:nvCxnSpPr>
+          <p:cNvPr id="23" name="Straight Arrow Connector 22"/>
+          <p:cNvCxnSpPr/>
+          <p:nvPr/>
+        </p:nvCxnSpPr>
+        <p:spPr>
+          <a:xfrm flipV="1">
+            <a:off x="9339569" y="2514600"/>
+            <a:ext cx="5860" cy="1998784"/>
+          </a:xfrm>
+          <a:prstGeom prst="straightConnector1">
+            <a:avLst/>
+          </a:prstGeom>
+          <a:ln w="142875">
+            <a:solidFill>
+              <a:schemeClr val="tx1">
+                <a:lumMod val="50000"/>
+                <a:lumOff val="50000"/>
+              </a:schemeClr>
+            </a:solidFill>
+            <a:tailEnd type="triangle"/>
+          </a:ln>
+        </p:spPr>
+        <p:style>
+          <a:lnRef idx="1">
+            <a:schemeClr val="accent1"/>
+          </a:lnRef>
+          <a:fillRef idx="0">
+            <a:schemeClr val="accent1"/>
+          </a:fillRef>
+          <a:effectRef idx="0">
+            <a:schemeClr val="accent1"/>
+          </a:effectRef>
+          <a:fontRef idx="minor">
+            <a:schemeClr val="tx1"/>
+          </a:fontRef>
+        </p:style>
+      </p:cxnSp>
+      <p:sp>
+        <p:nvSpPr>
+          <p:cNvPr id="25" name="TextBox 24"/>
+          <p:cNvSpPr txBox="1"/>
+          <p:nvPr/>
+        </p:nvSpPr>
+        <p:spPr>
+          <a:xfrm rot="5400000">
+            <a:off x="8904201" y="3435613"/>
+            <a:ext cx="1519752" cy="523220"/>
+          </a:xfrm>
+          <a:prstGeom prst="rect">
+            <a:avLst/>
+          </a:prstGeom>
+          <a:noFill/>
+        </p:spPr>
+        <p:txBody>
+          <a:bodyPr wrap="square" rtlCol="0">
+            <a:spAutoFit/>
+          </a:bodyPr>
+          <a:lstStyle/>
+          <a:p>
+            <a:pPr algn="ctr"/>
+            <a:r>
+              <a:rPr lang="en-US" sz="2800" b="1" dirty="0"/>
+              <a:t>scale up</a:t>
+            </a:r>
+            <a:endParaRPr lang="de-DE" sz="2800" b="1" dirty="0"/>
+          </a:p>
+        </p:txBody>
+      </p:sp>
+      <p:pic>
+        <p:nvPicPr>
+          <p:cNvPr id="26" name="Picture 25"/>
+          <p:cNvPicPr>
+            <a:picLocks noChangeAspect="1"/>
+          </p:cNvPicPr>
+          <p:nvPr/>
+        </p:nvPicPr>
+        <p:blipFill>
+          <a:blip r:embed="rId2"/>
+          <a:stretch>
+            <a:fillRect/>
+          </a:stretch>
+        </p:blipFill>
+        <p:spPr>
+          <a:xfrm>
+            <a:off x="6924850" y="1"/>
+            <a:ext cx="4838464" cy="2347551"/>
+          </a:xfrm>
+          <a:prstGeom prst="rect">
+            <a:avLst/>
+          </a:prstGeom>
+        </p:spPr>
+      </p:pic>
+      <p:cxnSp>
+        <p:nvCxnSpPr>
+          <p:cNvPr id="27" name="Straight Arrow Connector 26"/>
+          <p:cNvCxnSpPr/>
+          <p:nvPr/>
+        </p:nvCxnSpPr>
+        <p:spPr>
+          <a:xfrm>
+            <a:off x="9351292" y="6573715"/>
+            <a:ext cx="11722" cy="2165839"/>
+          </a:xfrm>
+          <a:prstGeom prst="straightConnector1">
+            <a:avLst/>
+          </a:prstGeom>
+          <a:ln w="142875">
+            <a:solidFill>
+              <a:schemeClr val="tx1">
+                <a:lumMod val="50000"/>
+                <a:lumOff val="50000"/>
+              </a:schemeClr>
+            </a:solidFill>
+            <a:tailEnd type="triangle"/>
+          </a:ln>
+        </p:spPr>
+        <p:style>
+          <a:lnRef idx="1">
+            <a:schemeClr val="accent1"/>
+          </a:lnRef>
+          <a:fillRef idx="0">
+            <a:schemeClr val="accent1"/>
+          </a:fillRef>
+          <a:effectRef idx="0">
+            <a:schemeClr val="accent1"/>
+          </a:effectRef>
+          <a:fontRef idx="minor">
+            <a:schemeClr val="tx1"/>
+          </a:fontRef>
+        </p:style>
+      </p:cxnSp>
+      <p:sp>
+        <p:nvSpPr>
+          <p:cNvPr id="32" name="TextBox 31"/>
+          <p:cNvSpPr txBox="1"/>
+          <p:nvPr/>
+        </p:nvSpPr>
+        <p:spPr>
+          <a:xfrm rot="5400000">
+            <a:off x="8648924" y="7169713"/>
+            <a:ext cx="2071338" cy="523220"/>
+          </a:xfrm>
+          <a:prstGeom prst="rect">
+            <a:avLst/>
+          </a:prstGeom>
+          <a:noFill/>
+        </p:spPr>
+        <p:txBody>
+          <a:bodyPr wrap="square" rtlCol="0">
+            <a:spAutoFit/>
+          </a:bodyPr>
+          <a:lstStyle/>
+          <a:p>
+            <a:pPr algn="ctr"/>
+            <a:r>
+              <a:rPr lang="en-US" sz="2800" b="1" dirty="0"/>
+              <a:t>scale down</a:t>
+            </a:r>
+            <a:endParaRPr lang="de-DE" sz="2800" b="1" dirty="0"/>
+          </a:p>
+        </p:txBody>
+      </p:sp>
+      <p:pic>
+        <p:nvPicPr>
+          <p:cNvPr id="33" name="Picture 32"/>
+          <p:cNvPicPr>
+            <a:picLocks noChangeAspect="1"/>
+          </p:cNvPicPr>
+          <p:nvPr/>
+        </p:nvPicPr>
+        <p:blipFill>
+          <a:blip r:embed="rId2"/>
+          <a:stretch>
+            <a:fillRect/>
+          </a:stretch>
+        </p:blipFill>
+        <p:spPr>
+          <a:xfrm>
+            <a:off x="8299144" y="8893579"/>
+            <a:ext cx="2128845" cy="1032884"/>
+          </a:xfrm>
+          <a:prstGeom prst="rect">
+            <a:avLst/>
+          </a:prstGeom>
+        </p:spPr>
+      </p:pic>
+    </p:spTree>
+    <p:extLst>
+      <p:ext uri="{BB962C8B-B14F-4D97-AF65-F5344CB8AC3E}">
+        <p14:creationId xmlns:p14="http://schemas.microsoft.com/office/powerpoint/2010/main" val="1846117782"/>
+      </p:ext>
+    </p:extLst>
+  </p:cSld>
+  <p:clrMapOvr>
+    <a:masterClrMapping/>
+  </p:clrMapOvr>
+</p:sld>
+</file>
+
+<file path=ppt/slides/slide41.xml><?xml version="1.0" encoding="utf-8"?>
+<p:sld xmlns:a="http://schemas.openxmlformats.org/drawingml/2006/main" xmlns:r="http://schemas.openxmlformats.org/officeDocument/2006/relationships" xmlns:p="http://schemas.openxmlformats.org/presentationml/2006/main">
+  <p:cSld>
+    <p:spTree>
+      <p:nvGrpSpPr>
+        <p:cNvPr id="1" name=""/>
+        <p:cNvGrpSpPr/>
+        <p:nvPr/>
+      </p:nvGrpSpPr>
+      <p:grpSpPr>
+        <a:xfrm>
+          <a:off x="0" y="0"/>
+          <a:ext cx="0" cy="0"/>
+          <a:chOff x="0" y="0"/>
+          <a:chExt cx="0" cy="0"/>
+        </a:xfrm>
+      </p:grpSpPr>
+      <p:sp>
+        <p:nvSpPr>
           <p:cNvPr id="4" name="TextBox 3"/>
           <p:cNvSpPr txBox="1"/>
           <p:nvPr/>
@@ -44654,7 +45150,7 @@
 </p:sld>
 </file>
 
-<file path=ppt/slides/slide41.xml><?xml version="1.0" encoding="utf-8"?>
+<file path=ppt/slides/slide42.xml><?xml version="1.0" encoding="utf-8"?>
 <p:sld xmlns:a="http://schemas.openxmlformats.org/drawingml/2006/main" xmlns:r="http://schemas.openxmlformats.org/officeDocument/2006/relationships" xmlns:p="http://schemas.openxmlformats.org/presentationml/2006/main">
   <p:cSld>
     <p:spTree>
@@ -46897,7 +47393,7 @@
 </p:sld>
 </file>
 
-<file path=ppt/slides/slide42.xml><?xml version="1.0" encoding="utf-8"?>
+<file path=ppt/slides/slide43.xml><?xml version="1.0" encoding="utf-8"?>
 <p:sld xmlns:a="http://schemas.openxmlformats.org/drawingml/2006/main" xmlns:r="http://schemas.openxmlformats.org/officeDocument/2006/relationships" xmlns:p="http://schemas.openxmlformats.org/presentationml/2006/main">
   <p:cSld>
     <p:spTree>
@@ -49623,7 +50119,7 @@
 </p:sld>
 </file>
 
-<file path=ppt/slides/slide43.xml><?xml version="1.0" encoding="utf-8"?>
+<file path=ppt/slides/slide44.xml><?xml version="1.0" encoding="utf-8"?>
 <p:sld xmlns:a="http://schemas.openxmlformats.org/drawingml/2006/main" xmlns:r="http://schemas.openxmlformats.org/officeDocument/2006/relationships" xmlns:p="http://schemas.openxmlformats.org/presentationml/2006/main">
   <p:cSld>
     <p:spTree>
@@ -49740,7 +50236,7 @@
 </p:sld>
 </file>
 
-<file path=ppt/slides/slide44.xml><?xml version="1.0" encoding="utf-8"?>
+<file path=ppt/slides/slide45.xml><?xml version="1.0" encoding="utf-8"?>
 <p:sld xmlns:a="http://schemas.openxmlformats.org/drawingml/2006/main" xmlns:r="http://schemas.openxmlformats.org/officeDocument/2006/relationships" xmlns:p="http://schemas.openxmlformats.org/presentationml/2006/main">
   <p:cSld>
     <p:spTree>
@@ -52869,7 +53365,7 @@
 </p:sld>
 </file>
 
-<file path=ppt/slides/slide45.xml><?xml version="1.0" encoding="utf-8"?>
+<file path=ppt/slides/slide46.xml><?xml version="1.0" encoding="utf-8"?>
 <p:sld xmlns:a="http://schemas.openxmlformats.org/drawingml/2006/main" xmlns:r="http://schemas.openxmlformats.org/officeDocument/2006/relationships" xmlns:p="http://schemas.openxmlformats.org/presentationml/2006/main">
   <p:cSld>
     <p:spTree>

</xml_diff>

<commit_message>
Added appender blog post
</commit_message>
<xml_diff>
--- a/_sources/GettingStarted.pptx
+++ b/_sources/GettingStarted.pptx
@@ -34,24 +34,25 @@
     <p:sldId id="282" r:id="rId28"/>
     <p:sldId id="273" r:id="rId29"/>
     <p:sldId id="292" r:id="rId30"/>
-    <p:sldId id="293" r:id="rId31"/>
-    <p:sldId id="265" r:id="rId32"/>
-    <p:sldId id="295" r:id="rId33"/>
-    <p:sldId id="266" r:id="rId34"/>
-    <p:sldId id="267" r:id="rId35"/>
-    <p:sldId id="268" r:id="rId36"/>
-    <p:sldId id="270" r:id="rId37"/>
-    <p:sldId id="272" r:id="rId38"/>
-    <p:sldId id="271" r:id="rId39"/>
-    <p:sldId id="274" r:id="rId40"/>
-    <p:sldId id="301" r:id="rId41"/>
-    <p:sldId id="276" r:id="rId42"/>
-    <p:sldId id="277" r:id="rId43"/>
-    <p:sldId id="278" r:id="rId44"/>
-    <p:sldId id="279" r:id="rId45"/>
-    <p:sldId id="280" r:id="rId46"/>
-    <p:sldId id="281" r:id="rId47"/>
-    <p:sldId id="290" r:id="rId48"/>
+    <p:sldId id="303" r:id="rId31"/>
+    <p:sldId id="293" r:id="rId32"/>
+    <p:sldId id="265" r:id="rId33"/>
+    <p:sldId id="295" r:id="rId34"/>
+    <p:sldId id="266" r:id="rId35"/>
+    <p:sldId id="267" r:id="rId36"/>
+    <p:sldId id="268" r:id="rId37"/>
+    <p:sldId id="270" r:id="rId38"/>
+    <p:sldId id="272" r:id="rId39"/>
+    <p:sldId id="271" r:id="rId40"/>
+    <p:sldId id="274" r:id="rId41"/>
+    <p:sldId id="301" r:id="rId42"/>
+    <p:sldId id="276" r:id="rId43"/>
+    <p:sldId id="277" r:id="rId44"/>
+    <p:sldId id="278" r:id="rId45"/>
+    <p:sldId id="279" r:id="rId46"/>
+    <p:sldId id="280" r:id="rId47"/>
+    <p:sldId id="281" r:id="rId48"/>
+    <p:sldId id="290" r:id="rId49"/>
   </p:sldIdLst>
   <p:sldSz cx="19199225" cy="10799763"/>
   <p:notesSz cx="6858000" cy="9144000"/>
@@ -3076,7 +3077,7 @@
           <a:p>
             <a:fld id="{9AA7D095-A676-4F6B-9416-D65D798F5244}" type="datetimeFigureOut">
               <a:rPr lang="de-DE" smtClean="0"/>
-              <a:t>16.11.2016</a:t>
+              <a:t>09.12.2016</a:t>
             </a:fld>
             <a:endParaRPr lang="de-DE"/>
           </a:p>
@@ -3246,7 +3247,7 @@
           <a:p>
             <a:fld id="{9AA7D095-A676-4F6B-9416-D65D798F5244}" type="datetimeFigureOut">
               <a:rPr lang="de-DE" smtClean="0"/>
-              <a:t>16.11.2016</a:t>
+              <a:t>09.12.2016</a:t>
             </a:fld>
             <a:endParaRPr lang="de-DE"/>
           </a:p>
@@ -3426,7 +3427,7 @@
           <a:p>
             <a:fld id="{9AA7D095-A676-4F6B-9416-D65D798F5244}" type="datetimeFigureOut">
               <a:rPr lang="de-DE" smtClean="0"/>
-              <a:t>16.11.2016</a:t>
+              <a:t>09.12.2016</a:t>
             </a:fld>
             <a:endParaRPr lang="de-DE"/>
           </a:p>
@@ -3596,7 +3597,7 @@
           <a:p>
             <a:fld id="{9AA7D095-A676-4F6B-9416-D65D798F5244}" type="datetimeFigureOut">
               <a:rPr lang="de-DE" smtClean="0"/>
-              <a:t>16.11.2016</a:t>
+              <a:t>09.12.2016</a:t>
             </a:fld>
             <a:endParaRPr lang="de-DE"/>
           </a:p>
@@ -3842,7 +3843,7 @@
           <a:p>
             <a:fld id="{9AA7D095-A676-4F6B-9416-D65D798F5244}" type="datetimeFigureOut">
               <a:rPr lang="de-DE" smtClean="0"/>
-              <a:t>16.11.2016</a:t>
+              <a:t>09.12.2016</a:t>
             </a:fld>
             <a:endParaRPr lang="de-DE"/>
           </a:p>
@@ -4074,7 +4075,7 @@
           <a:p>
             <a:fld id="{9AA7D095-A676-4F6B-9416-D65D798F5244}" type="datetimeFigureOut">
               <a:rPr lang="de-DE" smtClean="0"/>
-              <a:t>16.11.2016</a:t>
+              <a:t>09.12.2016</a:t>
             </a:fld>
             <a:endParaRPr lang="de-DE"/>
           </a:p>
@@ -4441,7 +4442,7 @@
           <a:p>
             <a:fld id="{9AA7D095-A676-4F6B-9416-D65D798F5244}" type="datetimeFigureOut">
               <a:rPr lang="de-DE" smtClean="0"/>
-              <a:t>16.11.2016</a:t>
+              <a:t>09.12.2016</a:t>
             </a:fld>
             <a:endParaRPr lang="de-DE"/>
           </a:p>
@@ -4559,7 +4560,7 @@
           <a:p>
             <a:fld id="{9AA7D095-A676-4F6B-9416-D65D798F5244}" type="datetimeFigureOut">
               <a:rPr lang="de-DE" smtClean="0"/>
-              <a:t>16.11.2016</a:t>
+              <a:t>09.12.2016</a:t>
             </a:fld>
             <a:endParaRPr lang="de-DE"/>
           </a:p>
@@ -4654,7 +4655,7 @@
           <a:p>
             <a:fld id="{9AA7D095-A676-4F6B-9416-D65D798F5244}" type="datetimeFigureOut">
               <a:rPr lang="de-DE" smtClean="0"/>
-              <a:t>16.11.2016</a:t>
+              <a:t>09.12.2016</a:t>
             </a:fld>
             <a:endParaRPr lang="de-DE"/>
           </a:p>
@@ -4931,7 +4932,7 @@
           <a:p>
             <a:fld id="{9AA7D095-A676-4F6B-9416-D65D798F5244}" type="datetimeFigureOut">
               <a:rPr lang="de-DE" smtClean="0"/>
-              <a:t>16.11.2016</a:t>
+              <a:t>09.12.2016</a:t>
             </a:fld>
             <a:endParaRPr lang="de-DE"/>
           </a:p>
@@ -5188,7 +5189,7 @@
           <a:p>
             <a:fld id="{9AA7D095-A676-4F6B-9416-D65D798F5244}" type="datetimeFigureOut">
               <a:rPr lang="de-DE" smtClean="0"/>
-              <a:t>16.11.2016</a:t>
+              <a:t>09.12.2016</a:t>
             </a:fld>
             <a:endParaRPr lang="de-DE"/>
           </a:p>
@@ -5401,7 +5402,7 @@
           <a:p>
             <a:fld id="{9AA7D095-A676-4F6B-9416-D65D798F5244}" type="datetimeFigureOut">
               <a:rPr lang="de-DE" smtClean="0"/>
-              <a:t>16.11.2016</a:t>
+              <a:t>09.12.2016</a:t>
             </a:fld>
             <a:endParaRPr lang="de-DE"/>
           </a:p>
@@ -27971,6 +27972,1274 @@
       </p:grpSpPr>
       <p:sp>
         <p:nvSpPr>
+          <p:cNvPr id="57" name="Rounded Rectangle 75"/>
+          <p:cNvSpPr/>
+          <p:nvPr/>
+        </p:nvSpPr>
+        <p:spPr>
+          <a:xfrm>
+            <a:off x="576072" y="736841"/>
+            <a:ext cx="8613648" cy="3350527"/>
+          </a:xfrm>
+          <a:prstGeom prst="rect">
+            <a:avLst/>
+          </a:prstGeom>
+          <a:solidFill>
+            <a:schemeClr val="accent2">
+              <a:lumMod val="75000"/>
+            </a:schemeClr>
+          </a:solidFill>
+          <a:ln w="76200">
+            <a:solidFill>
+              <a:schemeClr val="accent2">
+                <a:lumMod val="50000"/>
+              </a:schemeClr>
+            </a:solidFill>
+          </a:ln>
+        </p:spPr>
+        <p:style>
+          <a:lnRef idx="2">
+            <a:schemeClr val="accent1">
+              <a:shade val="50000"/>
+            </a:schemeClr>
+          </a:lnRef>
+          <a:fillRef idx="1">
+            <a:schemeClr val="accent1"/>
+          </a:fillRef>
+          <a:effectRef idx="0">
+            <a:schemeClr val="accent1"/>
+          </a:effectRef>
+          <a:fontRef idx="minor">
+            <a:schemeClr val="lt1"/>
+          </a:fontRef>
+        </p:style>
+        <p:txBody>
+          <a:bodyPr rtlCol="0" anchor="ctr"/>
+          <a:lstStyle/>
+          <a:p>
+            <a:pPr algn="ctr"/>
+            <a:r>
+              <a:rPr lang="en-US" sz="2000" b="1" dirty="0" err="1"/>
+              <a:t>myuser</a:t>
+            </a:r>
+            <a:r>
+              <a:rPr lang="en-US" sz="2000" b="1" dirty="0"/>
+              <a:t>/myapp:123 instance</a:t>
+            </a:r>
+          </a:p>
+          <a:p>
+            <a:pPr algn="ctr"/>
+            <a:endParaRPr lang="en-US" sz="2000" b="1" dirty="0"/>
+          </a:p>
+          <a:p>
+            <a:pPr algn="ctr"/>
+            <a:endParaRPr lang="en-US" sz="2000" b="1" dirty="0"/>
+          </a:p>
+          <a:p>
+            <a:pPr algn="ctr"/>
+            <a:endParaRPr lang="en-US" sz="2000" b="1" dirty="0"/>
+          </a:p>
+          <a:p>
+            <a:pPr algn="ctr"/>
+            <a:endParaRPr lang="en-US" sz="2000" b="1" dirty="0"/>
+          </a:p>
+          <a:p>
+            <a:pPr algn="ctr"/>
+            <a:endParaRPr lang="en-US" sz="2000" b="1" dirty="0"/>
+          </a:p>
+          <a:p>
+            <a:pPr algn="ctr"/>
+            <a:endParaRPr lang="en-US" sz="2000" b="1" dirty="0"/>
+          </a:p>
+          <a:p>
+            <a:pPr algn="ctr"/>
+            <a:endParaRPr lang="en-US" sz="2000" b="1" dirty="0"/>
+          </a:p>
+          <a:p>
+            <a:pPr algn="ctr"/>
+            <a:endParaRPr lang="en-US" sz="2000" b="1" dirty="0"/>
+          </a:p>
+          <a:p>
+            <a:pPr algn="ctr"/>
+            <a:endParaRPr lang="de-DE" sz="2000" b="1" dirty="0"/>
+          </a:p>
+        </p:txBody>
+      </p:sp>
+      <p:sp>
+        <p:nvSpPr>
+          <p:cNvPr id="50" name="Rounded Rectangle 75"/>
+          <p:cNvSpPr/>
+          <p:nvPr/>
+        </p:nvSpPr>
+        <p:spPr>
+          <a:xfrm>
+            <a:off x="813816" y="1308279"/>
+            <a:ext cx="5504688" cy="2550489"/>
+          </a:xfrm>
+          <a:prstGeom prst="rect">
+            <a:avLst/>
+          </a:prstGeom>
+          <a:solidFill>
+            <a:schemeClr val="tx2">
+              <a:lumMod val="40000"/>
+              <a:lumOff val="60000"/>
+            </a:schemeClr>
+          </a:solidFill>
+          <a:ln w="57150">
+            <a:solidFill>
+              <a:schemeClr val="tx2">
+                <a:lumMod val="75000"/>
+              </a:schemeClr>
+            </a:solidFill>
+          </a:ln>
+        </p:spPr>
+        <p:style>
+          <a:lnRef idx="2">
+            <a:schemeClr val="accent1">
+              <a:shade val="50000"/>
+            </a:schemeClr>
+          </a:lnRef>
+          <a:fillRef idx="1">
+            <a:schemeClr val="accent1"/>
+          </a:fillRef>
+          <a:effectRef idx="0">
+            <a:schemeClr val="accent1"/>
+          </a:effectRef>
+          <a:fontRef idx="minor">
+            <a:schemeClr val="lt1"/>
+          </a:fontRef>
+        </p:style>
+        <p:txBody>
+          <a:bodyPr rtlCol="0" anchor="ctr"/>
+          <a:lstStyle/>
+          <a:p>
+            <a:pPr algn="ctr"/>
+            <a:r>
+              <a:rPr lang="en-US" sz="2000" b="1" dirty="0"/>
+              <a:t>JVM</a:t>
+            </a:r>
+          </a:p>
+          <a:p>
+            <a:pPr algn="ctr"/>
+            <a:endParaRPr lang="en-US" sz="2000" b="1" dirty="0"/>
+          </a:p>
+          <a:p>
+            <a:pPr algn="ctr"/>
+            <a:endParaRPr lang="en-US" sz="2000" b="1" dirty="0"/>
+          </a:p>
+          <a:p>
+            <a:pPr algn="ctr"/>
+            <a:endParaRPr lang="en-US" sz="2000" b="1" dirty="0"/>
+          </a:p>
+          <a:p>
+            <a:pPr algn="ctr"/>
+            <a:endParaRPr lang="en-US" sz="2000" b="1" dirty="0"/>
+          </a:p>
+          <a:p>
+            <a:pPr algn="ctr"/>
+            <a:endParaRPr lang="en-US" sz="2000" b="1" dirty="0"/>
+          </a:p>
+          <a:p>
+            <a:pPr algn="ctr"/>
+            <a:endParaRPr lang="en-US" sz="2000" b="1" dirty="0"/>
+          </a:p>
+          <a:p>
+            <a:pPr algn="ctr"/>
+            <a:endParaRPr lang="en-US" sz="2000" b="1" dirty="0"/>
+          </a:p>
+        </p:txBody>
+      </p:sp>
+      <p:sp>
+        <p:nvSpPr>
+          <p:cNvPr id="55" name="Rounded Rectangle 75"/>
+          <p:cNvSpPr/>
+          <p:nvPr/>
+        </p:nvSpPr>
+        <p:spPr>
+          <a:xfrm>
+            <a:off x="978671" y="1756335"/>
+            <a:ext cx="1718809" cy="730833"/>
+          </a:xfrm>
+          <a:prstGeom prst="rect">
+            <a:avLst/>
+          </a:prstGeom>
+          <a:solidFill>
+            <a:schemeClr val="accent4"/>
+          </a:solidFill>
+          <a:ln w="38100">
+            <a:solidFill>
+              <a:schemeClr val="accent4">
+                <a:lumMod val="75000"/>
+              </a:schemeClr>
+            </a:solidFill>
+          </a:ln>
+        </p:spPr>
+        <p:style>
+          <a:lnRef idx="2">
+            <a:schemeClr val="accent1">
+              <a:shade val="50000"/>
+            </a:schemeClr>
+          </a:lnRef>
+          <a:fillRef idx="1">
+            <a:schemeClr val="accent1"/>
+          </a:fillRef>
+          <a:effectRef idx="0">
+            <a:schemeClr val="accent1"/>
+          </a:effectRef>
+          <a:fontRef idx="minor">
+            <a:schemeClr val="lt1"/>
+          </a:fontRef>
+        </p:style>
+        <p:txBody>
+          <a:bodyPr rtlCol="0" anchor="ctr"/>
+          <a:lstStyle/>
+          <a:p>
+            <a:pPr algn="ctr"/>
+            <a:r>
+              <a:rPr lang="en-US" sz="1600" b="1" dirty="0"/>
+              <a:t>App</a:t>
+            </a:r>
+          </a:p>
+        </p:txBody>
+      </p:sp>
+      <p:sp>
+        <p:nvSpPr>
+          <p:cNvPr id="59" name="Rounded Rectangle 75"/>
+          <p:cNvSpPr/>
+          <p:nvPr/>
+        </p:nvSpPr>
+        <p:spPr>
+          <a:xfrm>
+            <a:off x="3328416" y="1762431"/>
+            <a:ext cx="960797" cy="715593"/>
+          </a:xfrm>
+          <a:prstGeom prst="rect">
+            <a:avLst/>
+          </a:prstGeom>
+          <a:solidFill>
+            <a:schemeClr val="bg1">
+              <a:lumMod val="65000"/>
+            </a:schemeClr>
+          </a:solidFill>
+          <a:ln w="38100">
+            <a:solidFill>
+              <a:schemeClr val="bg1">
+                <a:lumMod val="50000"/>
+              </a:schemeClr>
+            </a:solidFill>
+          </a:ln>
+        </p:spPr>
+        <p:style>
+          <a:lnRef idx="2">
+            <a:schemeClr val="accent1">
+              <a:shade val="50000"/>
+            </a:schemeClr>
+          </a:lnRef>
+          <a:fillRef idx="1">
+            <a:schemeClr val="accent1"/>
+          </a:fillRef>
+          <a:effectRef idx="0">
+            <a:schemeClr val="accent1"/>
+          </a:effectRef>
+          <a:fontRef idx="minor">
+            <a:schemeClr val="lt1"/>
+          </a:fontRef>
+        </p:style>
+        <p:txBody>
+          <a:bodyPr rtlCol="0" anchor="ctr"/>
+          <a:lstStyle/>
+          <a:p>
+            <a:pPr algn="ctr"/>
+            <a:r>
+              <a:rPr lang="en-US" sz="1600" b="1" dirty="0" err="1"/>
+              <a:t>Logback</a:t>
+            </a:r>
+            <a:endParaRPr lang="en-US" sz="1600" b="1" dirty="0"/>
+          </a:p>
+        </p:txBody>
+      </p:sp>
+      <p:grpSp>
+        <p:nvGrpSpPr>
+          <p:cNvPr id="5" name="Group 4"/>
+          <p:cNvGrpSpPr/>
+          <p:nvPr/>
+        </p:nvGrpSpPr>
+        <p:grpSpPr>
+          <a:xfrm>
+            <a:off x="4910328" y="1759383"/>
+            <a:ext cx="1277789" cy="715593"/>
+            <a:chOff x="12289536" y="1759383"/>
+            <a:chExt cx="1277789" cy="715593"/>
+          </a:xfrm>
+        </p:grpSpPr>
+        <p:sp>
+          <p:nvSpPr>
+            <p:cNvPr id="60" name="Rounded Rectangle 75"/>
+            <p:cNvSpPr/>
+            <p:nvPr/>
+          </p:nvSpPr>
+          <p:spPr>
+            <a:xfrm>
+              <a:off x="12289536" y="1759383"/>
+              <a:ext cx="1277789" cy="715593"/>
+            </a:xfrm>
+            <a:prstGeom prst="rect">
+              <a:avLst/>
+            </a:prstGeom>
+            <a:solidFill>
+              <a:schemeClr val="accent1">
+                <a:lumMod val="75000"/>
+              </a:schemeClr>
+            </a:solidFill>
+            <a:ln w="38100">
+              <a:solidFill>
+                <a:schemeClr val="accent1">
+                  <a:lumMod val="50000"/>
+                </a:schemeClr>
+              </a:solidFill>
+            </a:ln>
+          </p:spPr>
+          <p:style>
+            <a:lnRef idx="2">
+              <a:schemeClr val="accent1">
+                <a:shade val="50000"/>
+              </a:schemeClr>
+            </a:lnRef>
+            <a:fillRef idx="1">
+              <a:schemeClr val="accent1"/>
+            </a:fillRef>
+            <a:effectRef idx="0">
+              <a:schemeClr val="accent1"/>
+            </a:effectRef>
+            <a:fontRef idx="minor">
+              <a:schemeClr val="lt1"/>
+            </a:fontRef>
+          </p:style>
+          <p:txBody>
+            <a:bodyPr rtlCol="0" anchor="ctr"/>
+            <a:lstStyle/>
+            <a:p>
+              <a:pPr algn="ctr"/>
+              <a:endParaRPr lang="en-US" sz="1200" b="1" dirty="0"/>
+            </a:p>
+            <a:p>
+              <a:pPr algn="ctr"/>
+              <a:r>
+                <a:rPr lang="en-US" sz="1200" b="1" dirty="0" err="1"/>
+                <a:t>Cloudwatch</a:t>
+              </a:r>
+              <a:r>
+                <a:rPr lang="en-US" sz="1200" b="1" dirty="0"/>
+                <a:t> Logs </a:t>
+              </a:r>
+              <a:r>
+                <a:rPr lang="en-US" sz="1200" b="1" dirty="0" err="1"/>
+                <a:t>Appender</a:t>
+              </a:r>
+              <a:endParaRPr lang="en-US" sz="1200" b="1" dirty="0"/>
+            </a:p>
+          </p:txBody>
+        </p:sp>
+        <p:pic>
+          <p:nvPicPr>
+            <p:cNvPr id="63" name="Picture 62"/>
+            <p:cNvPicPr>
+              <a:picLocks noChangeAspect="1"/>
+            </p:cNvPicPr>
+            <p:nvPr/>
+          </p:nvPicPr>
+          <p:blipFill>
+            <a:blip r:embed="rId2" cstate="print">
+              <a:extLst>
+                <a:ext uri="{28A0092B-C50C-407E-A947-70E740481C1C}">
+                  <a14:useLocalDpi xmlns:a14="http://schemas.microsoft.com/office/drawing/2010/main" val="0"/>
+                </a:ext>
+              </a:extLst>
+            </a:blip>
+            <a:stretch>
+              <a:fillRect/>
+            </a:stretch>
+          </p:blipFill>
+          <p:spPr>
+            <a:xfrm>
+              <a:off x="12783312" y="1764931"/>
+              <a:ext cx="296248" cy="296248"/>
+            </a:xfrm>
+            <a:prstGeom prst="rect">
+              <a:avLst/>
+            </a:prstGeom>
+          </p:spPr>
+        </p:pic>
+      </p:grpSp>
+      <p:sp>
+        <p:nvSpPr>
+          <p:cNvPr id="67" name="Rounded Rectangle 75"/>
+          <p:cNvSpPr/>
+          <p:nvPr/>
+        </p:nvSpPr>
+        <p:spPr>
+          <a:xfrm>
+            <a:off x="5812536" y="2820087"/>
+            <a:ext cx="960797" cy="371169"/>
+          </a:xfrm>
+          <a:prstGeom prst="rect">
+            <a:avLst/>
+          </a:prstGeom>
+          <a:solidFill>
+            <a:schemeClr val="accent6">
+              <a:lumMod val="75000"/>
+            </a:schemeClr>
+          </a:solidFill>
+          <a:ln w="38100">
+            <a:solidFill>
+              <a:schemeClr val="accent6">
+                <a:lumMod val="50000"/>
+              </a:schemeClr>
+            </a:solidFill>
+          </a:ln>
+        </p:spPr>
+        <p:style>
+          <a:lnRef idx="2">
+            <a:schemeClr val="accent1">
+              <a:shade val="50000"/>
+            </a:schemeClr>
+          </a:lnRef>
+          <a:fillRef idx="1">
+            <a:schemeClr val="accent1"/>
+          </a:fillRef>
+          <a:effectRef idx="0">
+            <a:schemeClr val="accent1"/>
+          </a:effectRef>
+          <a:fontRef idx="minor">
+            <a:schemeClr val="lt1"/>
+          </a:fontRef>
+        </p:style>
+        <p:txBody>
+          <a:bodyPr rtlCol="0" anchor="ctr"/>
+          <a:lstStyle/>
+          <a:p>
+            <a:pPr algn="ctr"/>
+            <a:r>
+              <a:rPr lang="en-US" sz="1600" b="1" dirty="0"/>
+              <a:t>STDOUT</a:t>
+            </a:r>
+          </a:p>
+        </p:txBody>
+      </p:sp>
+      <p:sp>
+        <p:nvSpPr>
+          <p:cNvPr id="70" name="Rounded Rectangle 75"/>
+          <p:cNvSpPr/>
+          <p:nvPr/>
+        </p:nvSpPr>
+        <p:spPr>
+          <a:xfrm>
+            <a:off x="5827776" y="3329103"/>
+            <a:ext cx="960797" cy="371169"/>
+          </a:xfrm>
+          <a:prstGeom prst="rect">
+            <a:avLst/>
+          </a:prstGeom>
+          <a:solidFill>
+            <a:schemeClr val="accent6">
+              <a:lumMod val="75000"/>
+            </a:schemeClr>
+          </a:solidFill>
+          <a:ln w="38100">
+            <a:solidFill>
+              <a:schemeClr val="accent6">
+                <a:lumMod val="50000"/>
+              </a:schemeClr>
+            </a:solidFill>
+          </a:ln>
+        </p:spPr>
+        <p:style>
+          <a:lnRef idx="2">
+            <a:schemeClr val="accent1">
+              <a:shade val="50000"/>
+            </a:schemeClr>
+          </a:lnRef>
+          <a:fillRef idx="1">
+            <a:schemeClr val="accent1"/>
+          </a:fillRef>
+          <a:effectRef idx="0">
+            <a:schemeClr val="accent1"/>
+          </a:effectRef>
+          <a:fontRef idx="minor">
+            <a:schemeClr val="lt1"/>
+          </a:fontRef>
+        </p:style>
+        <p:txBody>
+          <a:bodyPr rtlCol="0" anchor="ctr"/>
+          <a:lstStyle/>
+          <a:p>
+            <a:pPr algn="ctr"/>
+            <a:r>
+              <a:rPr lang="en-US" sz="1600" b="1" dirty="0"/>
+              <a:t>STDERR</a:t>
+            </a:r>
+          </a:p>
+        </p:txBody>
+      </p:sp>
+      <p:sp>
+        <p:nvSpPr>
+          <p:cNvPr id="71" name="Rounded Rectangle 75"/>
+          <p:cNvSpPr/>
+          <p:nvPr/>
+        </p:nvSpPr>
+        <p:spPr>
+          <a:xfrm>
+            <a:off x="7504176" y="2908479"/>
+            <a:ext cx="1277789" cy="715593"/>
+          </a:xfrm>
+          <a:prstGeom prst="rect">
+            <a:avLst/>
+          </a:prstGeom>
+          <a:solidFill>
+            <a:schemeClr val="accent1">
+              <a:lumMod val="75000"/>
+            </a:schemeClr>
+          </a:solidFill>
+          <a:ln w="38100">
+            <a:solidFill>
+              <a:schemeClr val="accent1">
+                <a:lumMod val="50000"/>
+              </a:schemeClr>
+            </a:solidFill>
+          </a:ln>
+        </p:spPr>
+        <p:style>
+          <a:lnRef idx="2">
+            <a:schemeClr val="accent1">
+              <a:shade val="50000"/>
+            </a:schemeClr>
+          </a:lnRef>
+          <a:fillRef idx="1">
+            <a:schemeClr val="accent1"/>
+          </a:fillRef>
+          <a:effectRef idx="0">
+            <a:schemeClr val="accent1"/>
+          </a:effectRef>
+          <a:fontRef idx="minor">
+            <a:schemeClr val="lt1"/>
+          </a:fontRef>
+        </p:style>
+        <p:txBody>
+          <a:bodyPr rtlCol="0" anchor="ctr"/>
+          <a:lstStyle/>
+          <a:p>
+            <a:pPr algn="ctr"/>
+            <a:endParaRPr lang="en-US" sz="1200" b="1" dirty="0"/>
+          </a:p>
+          <a:p>
+            <a:pPr algn="ctr"/>
+            <a:r>
+              <a:rPr lang="en-US" sz="1200" b="1" dirty="0" err="1"/>
+              <a:t>Cloudwatch</a:t>
+            </a:r>
+            <a:r>
+              <a:rPr lang="en-US" sz="1200" b="1" dirty="0"/>
+              <a:t> Logs Agent</a:t>
+            </a:r>
+          </a:p>
+        </p:txBody>
+      </p:sp>
+      <p:pic>
+        <p:nvPicPr>
+          <p:cNvPr id="72" name="Picture 71"/>
+          <p:cNvPicPr>
+            <a:picLocks noChangeAspect="1"/>
+          </p:cNvPicPr>
+          <p:nvPr/>
+        </p:nvPicPr>
+        <p:blipFill>
+          <a:blip r:embed="rId2" cstate="print">
+            <a:extLst>
+              <a:ext uri="{28A0092B-C50C-407E-A947-70E740481C1C}">
+                <a14:useLocalDpi xmlns:a14="http://schemas.microsoft.com/office/drawing/2010/main" val="0"/>
+              </a:ext>
+            </a:extLst>
+          </a:blip>
+          <a:stretch>
+            <a:fillRect/>
+          </a:stretch>
+        </p:blipFill>
+        <p:spPr>
+          <a:xfrm>
+            <a:off x="8016240" y="2914027"/>
+            <a:ext cx="296248" cy="296248"/>
+          </a:xfrm>
+          <a:prstGeom prst="rect">
+            <a:avLst/>
+          </a:prstGeom>
+        </p:spPr>
+      </p:pic>
+      <p:cxnSp>
+        <p:nvCxnSpPr>
+          <p:cNvPr id="62" name="Straight Arrow Connector 61"/>
+          <p:cNvCxnSpPr/>
+          <p:nvPr/>
+        </p:nvCxnSpPr>
+        <p:spPr>
+          <a:xfrm>
+            <a:off x="2743200" y="2121408"/>
+            <a:ext cx="502920" cy="0"/>
+          </a:xfrm>
+          <a:prstGeom prst="straightConnector1">
+            <a:avLst/>
+          </a:prstGeom>
+          <a:ln w="57150">
+            <a:solidFill>
+              <a:schemeClr val="tx1">
+                <a:lumMod val="95000"/>
+                <a:lumOff val="5000"/>
+              </a:schemeClr>
+            </a:solidFill>
+            <a:tailEnd type="triangle"/>
+          </a:ln>
+        </p:spPr>
+        <p:style>
+          <a:lnRef idx="1">
+            <a:schemeClr val="accent1"/>
+          </a:lnRef>
+          <a:fillRef idx="0">
+            <a:schemeClr val="accent1"/>
+          </a:fillRef>
+          <a:effectRef idx="0">
+            <a:schemeClr val="accent1"/>
+          </a:effectRef>
+          <a:fontRef idx="minor">
+            <a:schemeClr val="tx1"/>
+          </a:fontRef>
+        </p:style>
+      </p:cxnSp>
+      <p:cxnSp>
+        <p:nvCxnSpPr>
+          <p:cNvPr id="74" name="Straight Arrow Connector 73"/>
+          <p:cNvCxnSpPr/>
+          <p:nvPr/>
+        </p:nvCxnSpPr>
+        <p:spPr>
+          <a:xfrm>
+            <a:off x="4358640" y="2136648"/>
+            <a:ext cx="502920" cy="0"/>
+          </a:xfrm>
+          <a:prstGeom prst="straightConnector1">
+            <a:avLst/>
+          </a:prstGeom>
+          <a:ln w="57150">
+            <a:solidFill>
+              <a:schemeClr val="tx1">
+                <a:lumMod val="95000"/>
+                <a:lumOff val="5000"/>
+              </a:schemeClr>
+            </a:solidFill>
+            <a:tailEnd type="triangle"/>
+          </a:ln>
+        </p:spPr>
+        <p:style>
+          <a:lnRef idx="1">
+            <a:schemeClr val="accent1"/>
+          </a:lnRef>
+          <a:fillRef idx="0">
+            <a:schemeClr val="accent1"/>
+          </a:fillRef>
+          <a:effectRef idx="0">
+            <a:schemeClr val="accent1"/>
+          </a:effectRef>
+          <a:fontRef idx="minor">
+            <a:schemeClr val="tx1"/>
+          </a:fontRef>
+        </p:style>
+      </p:cxnSp>
+      <p:cxnSp>
+        <p:nvCxnSpPr>
+          <p:cNvPr id="75" name="Straight Arrow Connector 74"/>
+          <p:cNvCxnSpPr/>
+          <p:nvPr/>
+        </p:nvCxnSpPr>
+        <p:spPr>
+          <a:xfrm flipV="1">
+            <a:off x="6888480" y="3328416"/>
+            <a:ext cx="499872" cy="185928"/>
+          </a:xfrm>
+          <a:prstGeom prst="straightConnector1">
+            <a:avLst/>
+          </a:prstGeom>
+          <a:ln w="57150">
+            <a:solidFill>
+              <a:schemeClr val="tx1">
+                <a:lumMod val="95000"/>
+                <a:lumOff val="5000"/>
+              </a:schemeClr>
+            </a:solidFill>
+            <a:prstDash val="sysDash"/>
+            <a:tailEnd type="triangle"/>
+          </a:ln>
+        </p:spPr>
+        <p:style>
+          <a:lnRef idx="1">
+            <a:schemeClr val="accent1"/>
+          </a:lnRef>
+          <a:fillRef idx="0">
+            <a:schemeClr val="accent1"/>
+          </a:fillRef>
+          <a:effectRef idx="0">
+            <a:schemeClr val="accent1"/>
+          </a:effectRef>
+          <a:fontRef idx="minor">
+            <a:schemeClr val="tx1"/>
+          </a:fontRef>
+        </p:style>
+      </p:cxnSp>
+      <p:cxnSp>
+        <p:nvCxnSpPr>
+          <p:cNvPr id="77" name="Straight Arrow Connector 76"/>
+          <p:cNvCxnSpPr/>
+          <p:nvPr/>
+        </p:nvCxnSpPr>
+        <p:spPr>
+          <a:xfrm>
+            <a:off x="6903720" y="2980944"/>
+            <a:ext cx="484632" cy="173736"/>
+          </a:xfrm>
+          <a:prstGeom prst="straightConnector1">
+            <a:avLst/>
+          </a:prstGeom>
+          <a:ln w="57150">
+            <a:solidFill>
+              <a:schemeClr val="tx1">
+                <a:lumMod val="95000"/>
+                <a:lumOff val="5000"/>
+              </a:schemeClr>
+            </a:solidFill>
+            <a:prstDash val="sysDash"/>
+            <a:tailEnd type="triangle"/>
+          </a:ln>
+        </p:spPr>
+        <p:style>
+          <a:lnRef idx="1">
+            <a:schemeClr val="accent1"/>
+          </a:lnRef>
+          <a:fillRef idx="0">
+            <a:schemeClr val="accent1"/>
+          </a:fillRef>
+          <a:effectRef idx="0">
+            <a:schemeClr val="accent1"/>
+          </a:effectRef>
+          <a:fontRef idx="minor">
+            <a:schemeClr val="tx1"/>
+          </a:fontRef>
+        </p:style>
+      </p:cxnSp>
+      <p:cxnSp>
+        <p:nvCxnSpPr>
+          <p:cNvPr id="80" name="Straight Arrow Connector 79"/>
+          <p:cNvCxnSpPr/>
+          <p:nvPr/>
+        </p:nvCxnSpPr>
+        <p:spPr>
+          <a:xfrm>
+            <a:off x="1862328" y="2996184"/>
+            <a:ext cx="3843528" cy="0"/>
+          </a:xfrm>
+          <a:prstGeom prst="straightConnector1">
+            <a:avLst/>
+          </a:prstGeom>
+          <a:ln w="57150">
+            <a:solidFill>
+              <a:schemeClr val="tx1">
+                <a:lumMod val="95000"/>
+                <a:lumOff val="5000"/>
+              </a:schemeClr>
+            </a:solidFill>
+            <a:prstDash val="sysDash"/>
+            <a:tailEnd type="triangle"/>
+          </a:ln>
+        </p:spPr>
+        <p:style>
+          <a:lnRef idx="1">
+            <a:schemeClr val="accent1"/>
+          </a:lnRef>
+          <a:fillRef idx="0">
+            <a:schemeClr val="accent1"/>
+          </a:fillRef>
+          <a:effectRef idx="0">
+            <a:schemeClr val="accent1"/>
+          </a:effectRef>
+          <a:fontRef idx="minor">
+            <a:schemeClr val="tx1"/>
+          </a:fontRef>
+        </p:style>
+      </p:cxnSp>
+      <p:cxnSp>
+        <p:nvCxnSpPr>
+          <p:cNvPr id="81" name="Straight Arrow Connector 80"/>
+          <p:cNvCxnSpPr/>
+          <p:nvPr/>
+        </p:nvCxnSpPr>
+        <p:spPr>
+          <a:xfrm>
+            <a:off x="1868424" y="3514344"/>
+            <a:ext cx="3843528" cy="0"/>
+          </a:xfrm>
+          <a:prstGeom prst="straightConnector1">
+            <a:avLst/>
+          </a:prstGeom>
+          <a:ln w="57150">
+            <a:solidFill>
+              <a:schemeClr val="tx1">
+                <a:lumMod val="95000"/>
+                <a:lumOff val="5000"/>
+              </a:schemeClr>
+            </a:solidFill>
+            <a:prstDash val="sysDash"/>
+            <a:tailEnd type="triangle"/>
+          </a:ln>
+        </p:spPr>
+        <p:style>
+          <a:lnRef idx="1">
+            <a:schemeClr val="accent1"/>
+          </a:lnRef>
+          <a:fillRef idx="0">
+            <a:schemeClr val="accent1"/>
+          </a:fillRef>
+          <a:effectRef idx="0">
+            <a:schemeClr val="accent1"/>
+          </a:effectRef>
+          <a:fontRef idx="minor">
+            <a:schemeClr val="tx1"/>
+          </a:fontRef>
+        </p:style>
+      </p:cxnSp>
+      <p:cxnSp>
+        <p:nvCxnSpPr>
+          <p:cNvPr id="82" name="Straight Connector 81"/>
+          <p:cNvCxnSpPr/>
+          <p:nvPr/>
+        </p:nvCxnSpPr>
+        <p:spPr>
+          <a:xfrm>
+            <a:off x="1883664" y="2642616"/>
+            <a:ext cx="0" cy="886968"/>
+          </a:xfrm>
+          <a:prstGeom prst="line">
+            <a:avLst/>
+          </a:prstGeom>
+          <a:ln w="57150">
+            <a:solidFill>
+              <a:schemeClr val="tx1">
+                <a:lumMod val="95000"/>
+                <a:lumOff val="5000"/>
+              </a:schemeClr>
+            </a:solidFill>
+            <a:prstDash val="sysDash"/>
+          </a:ln>
+        </p:spPr>
+        <p:style>
+          <a:lnRef idx="1">
+            <a:schemeClr val="accent1"/>
+          </a:lnRef>
+          <a:fillRef idx="0">
+            <a:schemeClr val="accent1"/>
+          </a:fillRef>
+          <a:effectRef idx="0">
+            <a:schemeClr val="accent1"/>
+          </a:effectRef>
+          <a:fontRef idx="minor">
+            <a:schemeClr val="tx1"/>
+          </a:fontRef>
+        </p:style>
+      </p:cxnSp>
+      <p:sp>
+        <p:nvSpPr>
+          <p:cNvPr id="83" name="Rounded Rectangle 72"/>
+          <p:cNvSpPr/>
+          <p:nvPr/>
+        </p:nvSpPr>
+        <p:spPr>
+          <a:xfrm>
+            <a:off x="10354648" y="1810512"/>
+            <a:ext cx="3443648" cy="1444752"/>
+          </a:xfrm>
+          <a:prstGeom prst="roundRect">
+            <a:avLst>
+              <a:gd name="adj" fmla="val 6680"/>
+            </a:avLst>
+          </a:prstGeom>
+          <a:solidFill>
+            <a:schemeClr val="bg2"/>
+          </a:solidFill>
+          <a:ln w="57150">
+            <a:solidFill>
+              <a:schemeClr val="bg1">
+                <a:lumMod val="50000"/>
+              </a:schemeClr>
+            </a:solidFill>
+            <a:prstDash val="solid"/>
+          </a:ln>
+        </p:spPr>
+        <p:style>
+          <a:lnRef idx="2">
+            <a:schemeClr val="accent1">
+              <a:shade val="50000"/>
+            </a:schemeClr>
+          </a:lnRef>
+          <a:fillRef idx="1">
+            <a:schemeClr val="accent1"/>
+          </a:fillRef>
+          <a:effectRef idx="0">
+            <a:schemeClr val="accent1"/>
+          </a:effectRef>
+          <a:fontRef idx="minor">
+            <a:schemeClr val="lt1"/>
+          </a:fontRef>
+        </p:style>
+        <p:txBody>
+          <a:bodyPr rtlCol="0" anchor="ctr"/>
+          <a:lstStyle/>
+          <a:p>
+            <a:pPr algn="ctr"/>
+            <a:endParaRPr lang="de-DE"/>
+          </a:p>
+        </p:txBody>
+      </p:sp>
+      <p:pic>
+        <p:nvPicPr>
+          <p:cNvPr id="84" name="Picture 2" descr="https://a0.awsstatic.com/main/images/logos/aws_logo.png"/>
+          <p:cNvPicPr>
+            <a:picLocks noChangeAspect="1" noChangeArrowheads="1"/>
+          </p:cNvPicPr>
+          <p:nvPr/>
+        </p:nvPicPr>
+        <p:blipFill>
+          <a:blip r:embed="rId3">
+            <a:extLst>
+              <a:ext uri="{28A0092B-C50C-407E-A947-70E740481C1C}">
+                <a14:useLocalDpi xmlns:a14="http://schemas.microsoft.com/office/drawing/2010/main" val="0"/>
+              </a:ext>
+            </a:extLst>
+          </a:blip>
+          <a:srcRect/>
+          <a:stretch>
+            <a:fillRect/>
+          </a:stretch>
+        </p:blipFill>
+        <p:spPr bwMode="auto">
+          <a:xfrm>
+            <a:off x="10337345" y="1091189"/>
+            <a:ext cx="1466377" cy="553964"/>
+          </a:xfrm>
+          <a:prstGeom prst="rect">
+            <a:avLst/>
+          </a:prstGeom>
+          <a:noFill/>
+          <a:extLst>
+            <a:ext uri="{909E8E84-426E-40DD-AFC4-6F175D3DCCD1}">
+              <a14:hiddenFill xmlns:a14="http://schemas.microsoft.com/office/drawing/2010/main">
+                <a:solidFill>
+                  <a:srgbClr val="FFFFFF"/>
+                </a:solidFill>
+              </a14:hiddenFill>
+            </a:ext>
+          </a:extLst>
+        </p:spPr>
+      </p:pic>
+      <p:sp>
+        <p:nvSpPr>
+          <p:cNvPr id="85" name="TextBox 84"/>
+          <p:cNvSpPr txBox="1"/>
+          <p:nvPr/>
+        </p:nvSpPr>
+        <p:spPr>
+          <a:xfrm>
+            <a:off x="11759184" y="1231433"/>
+            <a:ext cx="2011680" cy="400110"/>
+          </a:xfrm>
+          <a:prstGeom prst="rect">
+            <a:avLst/>
+          </a:prstGeom>
+          <a:noFill/>
+        </p:spPr>
+        <p:txBody>
+          <a:bodyPr wrap="square" rtlCol="0">
+            <a:spAutoFit/>
+          </a:bodyPr>
+          <a:lstStyle/>
+          <a:p>
+            <a:pPr algn="ctr"/>
+            <a:r>
+              <a:rPr lang="en-US" sz="2000" b="1" dirty="0" err="1"/>
+              <a:t>CloudWatch</a:t>
+            </a:r>
+            <a:r>
+              <a:rPr lang="en-US" sz="2000" b="1" dirty="0"/>
+              <a:t> Logs</a:t>
+            </a:r>
+            <a:endParaRPr lang="de-DE" sz="2000" b="1" dirty="0"/>
+          </a:p>
+        </p:txBody>
+      </p:sp>
+      <p:sp>
+        <p:nvSpPr>
+          <p:cNvPr id="86" name="Rounded Rectangle 75"/>
+          <p:cNvSpPr/>
+          <p:nvPr/>
+        </p:nvSpPr>
+        <p:spPr>
+          <a:xfrm>
+            <a:off x="10698480" y="2304289"/>
+            <a:ext cx="2798064" cy="722376"/>
+          </a:xfrm>
+          <a:prstGeom prst="rect">
+            <a:avLst/>
+          </a:prstGeom>
+          <a:solidFill>
+            <a:schemeClr val="accent1">
+              <a:lumMod val="75000"/>
+            </a:schemeClr>
+          </a:solidFill>
+          <a:ln w="38100">
+            <a:solidFill>
+              <a:schemeClr val="accent1">
+                <a:lumMod val="50000"/>
+              </a:schemeClr>
+            </a:solidFill>
+          </a:ln>
+        </p:spPr>
+        <p:style>
+          <a:lnRef idx="2">
+            <a:schemeClr val="accent1">
+              <a:shade val="50000"/>
+            </a:schemeClr>
+          </a:lnRef>
+          <a:fillRef idx="1">
+            <a:schemeClr val="accent1"/>
+          </a:fillRef>
+          <a:effectRef idx="0">
+            <a:schemeClr val="accent1"/>
+          </a:effectRef>
+          <a:fontRef idx="minor">
+            <a:schemeClr val="lt1"/>
+          </a:fontRef>
+        </p:style>
+        <p:txBody>
+          <a:bodyPr rtlCol="0" anchor="ctr"/>
+          <a:lstStyle/>
+          <a:p>
+            <a:pPr algn="ctr"/>
+            <a:r>
+              <a:rPr lang="en-US" i="1" dirty="0" err="1"/>
+              <a:t>LogStream</a:t>
+            </a:r>
+            <a:br>
+              <a:rPr lang="en-US" b="1" dirty="0"/>
+            </a:br>
+            <a:r>
+              <a:rPr lang="en-US" b="1" dirty="0" err="1"/>
+              <a:t>myuser</a:t>
+            </a:r>
+            <a:r>
+              <a:rPr lang="en-US" b="1" dirty="0"/>
+              <a:t>/</a:t>
+            </a:r>
+            <a:r>
+              <a:rPr lang="en-US" b="1" dirty="0" err="1"/>
+              <a:t>myapp</a:t>
+            </a:r>
+            <a:endParaRPr lang="en-US" b="1" dirty="0"/>
+          </a:p>
+        </p:txBody>
+      </p:sp>
+      <p:sp>
+        <p:nvSpPr>
+          <p:cNvPr id="87" name="TextBox 86"/>
+          <p:cNvSpPr txBox="1"/>
+          <p:nvPr/>
+        </p:nvSpPr>
+        <p:spPr>
+          <a:xfrm>
+            <a:off x="10332720" y="1886753"/>
+            <a:ext cx="3456432" cy="369332"/>
+          </a:xfrm>
+          <a:prstGeom prst="rect">
+            <a:avLst/>
+          </a:prstGeom>
+          <a:noFill/>
+        </p:spPr>
+        <p:txBody>
+          <a:bodyPr wrap="square" rtlCol="0">
+            <a:spAutoFit/>
+          </a:bodyPr>
+          <a:lstStyle/>
+          <a:p>
+            <a:pPr algn="ctr"/>
+            <a:r>
+              <a:rPr lang="en-US" i="1" dirty="0" err="1">
+                <a:solidFill>
+                  <a:schemeClr val="tx1">
+                    <a:lumMod val="65000"/>
+                    <a:lumOff val="35000"/>
+                  </a:schemeClr>
+                </a:solidFill>
+              </a:rPr>
+              <a:t>LogGroup</a:t>
+            </a:r>
+            <a:r>
+              <a:rPr lang="en-US" b="1" dirty="0">
+                <a:solidFill>
+                  <a:schemeClr val="tx1">
+                    <a:lumMod val="65000"/>
+                    <a:lumOff val="35000"/>
+                  </a:schemeClr>
+                </a:solidFill>
+              </a:rPr>
+              <a:t> </a:t>
+            </a:r>
+            <a:r>
+              <a:rPr lang="en-US" b="1" dirty="0" err="1">
+                <a:solidFill>
+                  <a:schemeClr val="tx1">
+                    <a:lumMod val="65000"/>
+                    <a:lumOff val="35000"/>
+                  </a:schemeClr>
+                </a:solidFill>
+              </a:rPr>
+              <a:t>boxfuse</a:t>
+            </a:r>
+            <a:r>
+              <a:rPr lang="en-US" b="1" dirty="0">
+                <a:solidFill>
+                  <a:schemeClr val="tx1">
+                    <a:lumMod val="65000"/>
+                    <a:lumOff val="35000"/>
+                  </a:schemeClr>
+                </a:solidFill>
+              </a:rPr>
+              <a:t>/prod</a:t>
+            </a:r>
+            <a:endParaRPr lang="de-DE" b="1" dirty="0">
+              <a:solidFill>
+                <a:schemeClr val="tx1">
+                  <a:lumMod val="65000"/>
+                  <a:lumOff val="35000"/>
+                </a:schemeClr>
+              </a:solidFill>
+            </a:endParaRPr>
+          </a:p>
+        </p:txBody>
+      </p:sp>
+      <p:cxnSp>
+        <p:nvCxnSpPr>
+          <p:cNvPr id="88" name="Straight Arrow Connector 87"/>
+          <p:cNvCxnSpPr/>
+          <p:nvPr/>
+        </p:nvCxnSpPr>
+        <p:spPr>
+          <a:xfrm>
+            <a:off x="6242304" y="2109216"/>
+            <a:ext cx="4364736" cy="451104"/>
+          </a:xfrm>
+          <a:prstGeom prst="straightConnector1">
+            <a:avLst/>
+          </a:prstGeom>
+          <a:ln w="57150">
+            <a:solidFill>
+              <a:schemeClr val="tx1">
+                <a:lumMod val="95000"/>
+                <a:lumOff val="5000"/>
+              </a:schemeClr>
+            </a:solidFill>
+            <a:tailEnd type="triangle"/>
+          </a:ln>
+        </p:spPr>
+        <p:style>
+          <a:lnRef idx="1">
+            <a:schemeClr val="accent1"/>
+          </a:lnRef>
+          <a:fillRef idx="0">
+            <a:schemeClr val="accent1"/>
+          </a:fillRef>
+          <a:effectRef idx="0">
+            <a:schemeClr val="accent1"/>
+          </a:effectRef>
+          <a:fontRef idx="minor">
+            <a:schemeClr val="tx1"/>
+          </a:fontRef>
+        </p:style>
+      </p:cxnSp>
+      <p:cxnSp>
+        <p:nvCxnSpPr>
+          <p:cNvPr id="90" name="Straight Arrow Connector 89"/>
+          <p:cNvCxnSpPr/>
+          <p:nvPr/>
+        </p:nvCxnSpPr>
+        <p:spPr>
+          <a:xfrm flipV="1">
+            <a:off x="8878824" y="2834640"/>
+            <a:ext cx="1737360" cy="438912"/>
+          </a:xfrm>
+          <a:prstGeom prst="straightConnector1">
+            <a:avLst/>
+          </a:prstGeom>
+          <a:ln w="57150">
+            <a:solidFill>
+              <a:schemeClr val="tx1">
+                <a:lumMod val="95000"/>
+                <a:lumOff val="5000"/>
+              </a:schemeClr>
+            </a:solidFill>
+            <a:prstDash val="sysDash"/>
+            <a:tailEnd type="triangle"/>
+          </a:ln>
+        </p:spPr>
+        <p:style>
+          <a:lnRef idx="1">
+            <a:schemeClr val="accent1"/>
+          </a:lnRef>
+          <a:fillRef idx="0">
+            <a:schemeClr val="accent1"/>
+          </a:fillRef>
+          <a:effectRef idx="0">
+            <a:schemeClr val="accent1"/>
+          </a:effectRef>
+          <a:fontRef idx="minor">
+            <a:schemeClr val="tx1"/>
+          </a:fontRef>
+        </p:style>
+      </p:cxnSp>
+    </p:spTree>
+    <p:extLst>
+      <p:ext uri="{BB962C8B-B14F-4D97-AF65-F5344CB8AC3E}">
+        <p14:creationId xmlns:p14="http://schemas.microsoft.com/office/powerpoint/2010/main" val="3285664789"/>
+      </p:ext>
+    </p:extLst>
+  </p:cSld>
+  <p:clrMapOvr>
+    <a:masterClrMapping/>
+  </p:clrMapOvr>
+</p:sld>
+</file>
+
+<file path=ppt/slides/slide31.xml><?xml version="1.0" encoding="utf-8"?>
+<p:sld xmlns:a="http://schemas.openxmlformats.org/drawingml/2006/main" xmlns:r="http://schemas.openxmlformats.org/officeDocument/2006/relationships" xmlns:p="http://schemas.openxmlformats.org/presentationml/2006/main">
+  <p:cSld>
+    <p:spTree>
+      <p:nvGrpSpPr>
+        <p:cNvPr id="1" name=""/>
+        <p:cNvGrpSpPr/>
+        <p:nvPr/>
+      </p:nvGrpSpPr>
+      <p:grpSpPr>
+        <a:xfrm>
+          <a:off x="0" y="0"/>
+          <a:ext cx="0" cy="0"/>
+          <a:chOff x="0" y="0"/>
+          <a:chExt cx="0" cy="0"/>
+        </a:xfrm>
+      </p:grpSpPr>
+      <p:sp>
+        <p:nvSpPr>
           <p:cNvPr id="47" name="Rounded Rectangle 75"/>
           <p:cNvSpPr/>
           <p:nvPr/>
@@ -29284,7 +30553,7 @@
 </p:sld>
 </file>
 
-<file path=ppt/slides/slide31.xml><?xml version="1.0" encoding="utf-8"?>
+<file path=ppt/slides/slide32.xml><?xml version="1.0" encoding="utf-8"?>
 <p:sld xmlns:a="http://schemas.openxmlformats.org/drawingml/2006/main" xmlns:r="http://schemas.openxmlformats.org/officeDocument/2006/relationships" xmlns:p="http://schemas.openxmlformats.org/presentationml/2006/main">
   <p:cSld>
     <p:spTree>
@@ -30861,7 +32130,7 @@
 </p:sld>
 </file>
 
-<file path=ppt/slides/slide32.xml><?xml version="1.0" encoding="utf-8"?>
+<file path=ppt/slides/slide33.xml><?xml version="1.0" encoding="utf-8"?>
 <p:sld xmlns:a="http://schemas.openxmlformats.org/drawingml/2006/main" xmlns:r="http://schemas.openxmlformats.org/officeDocument/2006/relationships" xmlns:p="http://schemas.openxmlformats.org/presentationml/2006/main">
   <p:cSld>
     <p:spTree>
@@ -32673,7 +33942,7 @@
 </p:sld>
 </file>
 
-<file path=ppt/slides/slide33.xml><?xml version="1.0" encoding="utf-8"?>
+<file path=ppt/slides/slide34.xml><?xml version="1.0" encoding="utf-8"?>
 <p:sld xmlns:a="http://schemas.openxmlformats.org/drawingml/2006/main" xmlns:r="http://schemas.openxmlformats.org/officeDocument/2006/relationships" xmlns:p="http://schemas.openxmlformats.org/presentationml/2006/main">
   <p:cSld>
     <p:spTree>
@@ -34306,7 +35575,7 @@
 </p:sld>
 </file>
 
-<file path=ppt/slides/slide34.xml><?xml version="1.0" encoding="utf-8"?>
+<file path=ppt/slides/slide35.xml><?xml version="1.0" encoding="utf-8"?>
 <p:sld xmlns:a="http://schemas.openxmlformats.org/drawingml/2006/main" xmlns:r="http://schemas.openxmlformats.org/officeDocument/2006/relationships" xmlns:p="http://schemas.openxmlformats.org/presentationml/2006/main">
   <p:cSld>
     <p:spTree>
@@ -35840,7 +37109,7 @@
 </p:sld>
 </file>
 
-<file path=ppt/slides/slide35.xml><?xml version="1.0" encoding="utf-8"?>
+<file path=ppt/slides/slide36.xml><?xml version="1.0" encoding="utf-8"?>
 <p:sld xmlns:a="http://schemas.openxmlformats.org/drawingml/2006/main" xmlns:r="http://schemas.openxmlformats.org/officeDocument/2006/relationships" xmlns:p="http://schemas.openxmlformats.org/presentationml/2006/main">
   <p:cSld>
     <p:spTree>
@@ -36680,7 +37949,7 @@
 </p:sld>
 </file>
 
-<file path=ppt/slides/slide36.xml><?xml version="1.0" encoding="utf-8"?>
+<file path=ppt/slides/slide37.xml><?xml version="1.0" encoding="utf-8"?>
 <p:sld xmlns:a="http://schemas.openxmlformats.org/drawingml/2006/main" xmlns:r="http://schemas.openxmlformats.org/officeDocument/2006/relationships" xmlns:p="http://schemas.openxmlformats.org/presentationml/2006/main">
   <p:cSld>
     <p:spTree>
@@ -37619,7 +38888,7 @@
 </p:sld>
 </file>
 
-<file path=ppt/slides/slide37.xml><?xml version="1.0" encoding="utf-8"?>
+<file path=ppt/slides/slide38.xml><?xml version="1.0" encoding="utf-8"?>
 <p:sld xmlns:a="http://schemas.openxmlformats.org/drawingml/2006/main" xmlns:r="http://schemas.openxmlformats.org/officeDocument/2006/relationships" xmlns:p="http://schemas.openxmlformats.org/presentationml/2006/main">
   <p:cSld>
     <p:spTree>
@@ -38107,7 +39376,7 @@
 </p:sld>
 </file>
 
-<file path=ppt/slides/slide38.xml><?xml version="1.0" encoding="utf-8"?>
+<file path=ppt/slides/slide39.xml><?xml version="1.0" encoding="utf-8"?>
 <p:sld xmlns:a="http://schemas.openxmlformats.org/drawingml/2006/main" xmlns:r="http://schemas.openxmlformats.org/officeDocument/2006/relationships" xmlns:p="http://schemas.openxmlformats.org/presentationml/2006/main">
   <p:cSld>
     <p:spTree>
@@ -39144,950 +40413,6 @@
     <p:extLst>
       <p:ext uri="{BB962C8B-B14F-4D97-AF65-F5344CB8AC3E}">
         <p14:creationId xmlns:p14="http://schemas.microsoft.com/office/powerpoint/2010/main" val="1635227564"/>
-      </p:ext>
-    </p:extLst>
-  </p:cSld>
-  <p:clrMapOvr>
-    <a:masterClrMapping/>
-  </p:clrMapOvr>
-</p:sld>
-</file>
-
-<file path=ppt/slides/slide39.xml><?xml version="1.0" encoding="utf-8"?>
-<p:sld xmlns:a="http://schemas.openxmlformats.org/drawingml/2006/main" xmlns:r="http://schemas.openxmlformats.org/officeDocument/2006/relationships" xmlns:p="http://schemas.openxmlformats.org/presentationml/2006/main">
-  <p:cSld>
-    <p:spTree>
-      <p:nvGrpSpPr>
-        <p:cNvPr id="1" name=""/>
-        <p:cNvGrpSpPr/>
-        <p:nvPr/>
-      </p:nvGrpSpPr>
-      <p:grpSpPr>
-        <a:xfrm>
-          <a:off x="0" y="0"/>
-          <a:ext cx="0" cy="0"/>
-          <a:chOff x="0" y="0"/>
-          <a:chExt cx="0" cy="0"/>
-        </a:xfrm>
-      </p:grpSpPr>
-      <p:sp>
-        <p:nvSpPr>
-          <p:cNvPr id="6" name="Rounded Rectangle 75"/>
-          <p:cNvSpPr/>
-          <p:nvPr/>
-        </p:nvSpPr>
-        <p:spPr>
-          <a:xfrm>
-            <a:off x="508638" y="1929147"/>
-            <a:ext cx="1441656" cy="1514439"/>
-          </a:xfrm>
-          <a:prstGeom prst="rect">
-            <a:avLst/>
-          </a:prstGeom>
-          <a:solidFill>
-            <a:schemeClr val="accent2">
-              <a:lumMod val="75000"/>
-            </a:schemeClr>
-          </a:solidFill>
-          <a:ln w="76200">
-            <a:solidFill>
-              <a:schemeClr val="accent2">
-                <a:lumMod val="50000"/>
-              </a:schemeClr>
-            </a:solidFill>
-          </a:ln>
-        </p:spPr>
-        <p:style>
-          <a:lnRef idx="2">
-            <a:schemeClr val="accent1">
-              <a:shade val="50000"/>
-            </a:schemeClr>
-          </a:lnRef>
-          <a:fillRef idx="1">
-            <a:schemeClr val="accent1"/>
-          </a:fillRef>
-          <a:effectRef idx="0">
-            <a:schemeClr val="accent1"/>
-          </a:effectRef>
-          <a:fontRef idx="minor">
-            <a:schemeClr val="lt1"/>
-          </a:fontRef>
-        </p:style>
-        <p:txBody>
-          <a:bodyPr rtlCol="0" anchor="ctr"/>
-          <a:lstStyle/>
-          <a:p>
-            <a:pPr algn="ctr"/>
-            <a:r>
-              <a:rPr lang="en-US" sz="2000" b="1" dirty="0"/>
-              <a:t>Instance</a:t>
-            </a:r>
-            <a:endParaRPr lang="de-DE" sz="2000" b="1" dirty="0"/>
-          </a:p>
-        </p:txBody>
-      </p:sp>
-      <p:grpSp>
-        <p:nvGrpSpPr>
-          <p:cNvPr id="22" name="Group 21"/>
-          <p:cNvGrpSpPr/>
-          <p:nvPr/>
-        </p:nvGrpSpPr>
-        <p:grpSpPr>
-          <a:xfrm>
-            <a:off x="4049898" y="296307"/>
-            <a:ext cx="2242751" cy="1789646"/>
-            <a:chOff x="1294361" y="4557307"/>
-            <a:chExt cx="2242751" cy="1789646"/>
-          </a:xfrm>
-        </p:grpSpPr>
-        <p:pic>
-          <p:nvPicPr>
-            <p:cNvPr id="4" name="Picture 2" descr="Console showing log4J logs"/>
-            <p:cNvPicPr>
-              <a:picLocks noChangeAspect="1" noChangeArrowheads="1"/>
-            </p:cNvPicPr>
-            <p:nvPr/>
-          </p:nvPicPr>
-          <p:blipFill>
-            <a:blip r:embed="rId2">
-              <a:extLst>
-                <a:ext uri="{28A0092B-C50C-407E-A947-70E740481C1C}">
-                  <a14:useLocalDpi xmlns:a14="http://schemas.microsoft.com/office/drawing/2010/main" val="0"/>
-                </a:ext>
-              </a:extLst>
-            </a:blip>
-            <a:srcRect/>
-            <a:stretch>
-              <a:fillRect/>
-            </a:stretch>
-          </p:blipFill>
-          <p:spPr bwMode="auto">
-            <a:xfrm>
-              <a:off x="1421028" y="4557307"/>
-              <a:ext cx="2004202" cy="1459059"/>
-            </a:xfrm>
-            <a:prstGeom prst="rect">
-              <a:avLst/>
-            </a:prstGeom>
-            <a:noFill/>
-            <a:extLst>
-              <a:ext uri="{909E8E84-426E-40DD-AFC4-6F175D3DCCD1}">
-                <a14:hiddenFill xmlns:a14="http://schemas.microsoft.com/office/drawing/2010/main">
-                  <a:solidFill>
-                    <a:srgbClr val="FFFFFF"/>
-                  </a:solidFill>
-                </a14:hiddenFill>
-              </a:ext>
-            </a:extLst>
-          </p:spPr>
-        </p:pic>
-        <p:sp>
-          <p:nvSpPr>
-            <p:cNvPr id="9" name="TextBox 8"/>
-            <p:cNvSpPr txBox="1"/>
-            <p:nvPr/>
-          </p:nvSpPr>
-          <p:spPr>
-            <a:xfrm>
-              <a:off x="1294361" y="5946843"/>
-              <a:ext cx="2242751" cy="400110"/>
-            </a:xfrm>
-            <a:prstGeom prst="rect">
-              <a:avLst/>
-            </a:prstGeom>
-            <a:noFill/>
-          </p:spPr>
-          <p:txBody>
-            <a:bodyPr wrap="square" rtlCol="0">
-              <a:spAutoFit/>
-            </a:bodyPr>
-            <a:lstStyle/>
-            <a:p>
-              <a:pPr algn="ctr"/>
-              <a:r>
-                <a:rPr lang="en-US" sz="2000" b="1" dirty="0"/>
-                <a:t>Instance Boot logs</a:t>
-              </a:r>
-              <a:endParaRPr lang="de-DE" sz="2000" b="1" dirty="0"/>
-            </a:p>
-          </p:txBody>
-        </p:sp>
-      </p:grpSp>
-      <p:cxnSp>
-        <p:nvCxnSpPr>
-          <p:cNvPr id="11" name="Straight Arrow Connector 10"/>
-          <p:cNvCxnSpPr/>
-          <p:nvPr/>
-        </p:nvCxnSpPr>
-        <p:spPr>
-          <a:xfrm>
-            <a:off x="2124844" y="3071845"/>
-            <a:ext cx="1823118" cy="699049"/>
-          </a:xfrm>
-          <a:prstGeom prst="straightConnector1">
-            <a:avLst/>
-          </a:prstGeom>
-          <a:ln w="142875">
-            <a:solidFill>
-              <a:schemeClr val="tx1">
-                <a:lumMod val="50000"/>
-                <a:lumOff val="50000"/>
-              </a:schemeClr>
-            </a:solidFill>
-            <a:tailEnd type="triangle"/>
-          </a:ln>
-        </p:spPr>
-        <p:style>
-          <a:lnRef idx="1">
-            <a:schemeClr val="accent1"/>
-          </a:lnRef>
-          <a:fillRef idx="0">
-            <a:schemeClr val="accent1"/>
-          </a:fillRef>
-          <a:effectRef idx="0">
-            <a:schemeClr val="accent1"/>
-          </a:effectRef>
-          <a:fontRef idx="minor">
-            <a:schemeClr val="tx1"/>
-          </a:fontRef>
-        </p:style>
-      </p:cxnSp>
-      <p:cxnSp>
-        <p:nvCxnSpPr>
-          <p:cNvPr id="15" name="Straight Arrow Connector 14"/>
-          <p:cNvCxnSpPr/>
-          <p:nvPr/>
-        </p:nvCxnSpPr>
-        <p:spPr>
-          <a:xfrm flipV="1">
-            <a:off x="2162412" y="1404576"/>
-            <a:ext cx="1822623" cy="908221"/>
-          </a:xfrm>
-          <a:prstGeom prst="straightConnector1">
-            <a:avLst/>
-          </a:prstGeom>
-          <a:ln w="142875">
-            <a:solidFill>
-              <a:schemeClr val="tx1">
-                <a:lumMod val="50000"/>
-                <a:lumOff val="50000"/>
-              </a:schemeClr>
-            </a:solidFill>
-            <a:tailEnd type="triangle"/>
-          </a:ln>
-        </p:spPr>
-        <p:style>
-          <a:lnRef idx="1">
-            <a:schemeClr val="accent1"/>
-          </a:lnRef>
-          <a:fillRef idx="0">
-            <a:schemeClr val="accent1"/>
-          </a:fillRef>
-          <a:effectRef idx="0">
-            <a:schemeClr val="accent1"/>
-          </a:effectRef>
-          <a:fontRef idx="minor">
-            <a:schemeClr val="tx1"/>
-          </a:fontRef>
-        </p:style>
-      </p:cxnSp>
-      <p:grpSp>
-        <p:nvGrpSpPr>
-          <p:cNvPr id="21" name="Group 20"/>
-          <p:cNvGrpSpPr/>
-          <p:nvPr/>
-        </p:nvGrpSpPr>
-        <p:grpSpPr>
-          <a:xfrm>
-            <a:off x="4072554" y="3154318"/>
-            <a:ext cx="2254085" cy="1814879"/>
-            <a:chOff x="5246466" y="1076300"/>
-            <a:chExt cx="2254085" cy="1814879"/>
-          </a:xfrm>
-        </p:grpSpPr>
-        <p:pic>
-          <p:nvPicPr>
-            <p:cNvPr id="19" name="Picture 18"/>
-            <p:cNvPicPr>
-              <a:picLocks noChangeAspect="1"/>
-            </p:cNvPicPr>
-            <p:nvPr/>
-          </p:nvPicPr>
-          <p:blipFill rotWithShape="1">
-            <a:blip r:embed="rId3"/>
-            <a:srcRect l="861" t="13474" r="845" b="1728"/>
-            <a:stretch/>
-          </p:blipFill>
-          <p:spPr>
-            <a:xfrm>
-              <a:off x="5251619" y="1076300"/>
-              <a:ext cx="2248932" cy="1454185"/>
-            </a:xfrm>
-            <a:prstGeom prst="rect">
-              <a:avLst/>
-            </a:prstGeom>
-          </p:spPr>
-        </p:pic>
-        <p:sp>
-          <p:nvSpPr>
-            <p:cNvPr id="20" name="TextBox 19"/>
-            <p:cNvSpPr txBox="1"/>
-            <p:nvPr/>
-          </p:nvSpPr>
-          <p:spPr>
-            <a:xfrm>
-              <a:off x="5246466" y="2491069"/>
-              <a:ext cx="2242751" cy="400110"/>
-            </a:xfrm>
-            <a:prstGeom prst="rect">
-              <a:avLst/>
-            </a:prstGeom>
-            <a:noFill/>
-          </p:spPr>
-          <p:txBody>
-            <a:bodyPr wrap="square" rtlCol="0">
-              <a:spAutoFit/>
-            </a:bodyPr>
-            <a:lstStyle/>
-            <a:p>
-              <a:pPr algn="ctr"/>
-              <a:r>
-                <a:rPr lang="en-US" sz="2000" b="1" dirty="0"/>
-                <a:t>Application logs</a:t>
-              </a:r>
-              <a:endParaRPr lang="de-DE" sz="2000" b="1" dirty="0"/>
-            </a:p>
-          </p:txBody>
-        </p:sp>
-      </p:grpSp>
-      <p:pic>
-        <p:nvPicPr>
-          <p:cNvPr id="13" name="Picture 14"/>
-          <p:cNvPicPr>
-            <a:picLocks noChangeAspect="1"/>
-          </p:cNvPicPr>
-          <p:nvPr/>
-        </p:nvPicPr>
-        <p:blipFill>
-          <a:blip r:embed="rId4">
-            <a:extLst>
-              <a:ext uri="{28A0092B-C50C-407E-A947-70E740481C1C}">
-                <a14:useLocalDpi xmlns:a14="http://schemas.microsoft.com/office/drawing/2010/main" val="0"/>
-              </a:ext>
-            </a:extLst>
-          </a:blip>
-          <a:stretch>
-            <a:fillRect/>
-          </a:stretch>
-        </p:blipFill>
-        <p:spPr>
-          <a:xfrm>
-            <a:off x="9514695" y="506314"/>
-            <a:ext cx="1538745" cy="615498"/>
-          </a:xfrm>
-          <a:prstGeom prst="rect">
-            <a:avLst/>
-          </a:prstGeom>
-        </p:spPr>
-      </p:pic>
-      <p:cxnSp>
-        <p:nvCxnSpPr>
-          <p:cNvPr id="14" name="Straight Arrow Connector 16"/>
-          <p:cNvCxnSpPr/>
-          <p:nvPr/>
-        </p:nvCxnSpPr>
-        <p:spPr>
-          <a:xfrm flipV="1">
-            <a:off x="8240815" y="788269"/>
-            <a:ext cx="1142403" cy="10481"/>
-          </a:xfrm>
-          <a:prstGeom prst="straightConnector1">
-            <a:avLst/>
-          </a:prstGeom>
-          <a:ln w="142875">
-            <a:solidFill>
-              <a:schemeClr val="tx1">
-                <a:lumMod val="50000"/>
-                <a:lumOff val="50000"/>
-              </a:schemeClr>
-            </a:solidFill>
-            <a:tailEnd type="triangle"/>
-          </a:ln>
-        </p:spPr>
-        <p:style>
-          <a:lnRef idx="1">
-            <a:schemeClr val="accent1"/>
-          </a:lnRef>
-          <a:fillRef idx="0">
-            <a:schemeClr val="accent1"/>
-          </a:fillRef>
-          <a:effectRef idx="0">
-            <a:schemeClr val="accent1"/>
-          </a:effectRef>
-          <a:fontRef idx="minor">
-            <a:schemeClr val="tx1"/>
-          </a:fontRef>
-        </p:style>
-      </p:cxnSp>
-      <p:pic>
-        <p:nvPicPr>
-          <p:cNvPr id="17" name="Picture 22"/>
-          <p:cNvPicPr>
-            <a:picLocks noChangeAspect="1"/>
-          </p:cNvPicPr>
-          <p:nvPr/>
-        </p:nvPicPr>
-        <p:blipFill>
-          <a:blip r:embed="rId5" cstate="print">
-            <a:extLst>
-              <a:ext uri="{28A0092B-C50C-407E-A947-70E740481C1C}">
-                <a14:useLocalDpi xmlns:a14="http://schemas.microsoft.com/office/drawing/2010/main" val="0"/>
-              </a:ext>
-            </a:extLst>
-          </a:blip>
-          <a:stretch>
-            <a:fillRect/>
-          </a:stretch>
-        </p:blipFill>
-        <p:spPr>
-          <a:xfrm>
-            <a:off x="8252417" y="268398"/>
-            <a:ext cx="1116380" cy="345217"/>
-          </a:xfrm>
-          <a:prstGeom prst="rect">
-            <a:avLst/>
-          </a:prstGeom>
-        </p:spPr>
-      </p:pic>
-      <p:pic>
-        <p:nvPicPr>
-          <p:cNvPr id="1026" name="Picture 2" descr="http://localhost:4000/assets/img/springboot.png"/>
-          <p:cNvPicPr>
-            <a:picLocks noChangeAspect="1" noChangeArrowheads="1"/>
-          </p:cNvPicPr>
-          <p:nvPr/>
-        </p:nvPicPr>
-        <p:blipFill>
-          <a:blip r:embed="rId6">
-            <a:extLst>
-              <a:ext uri="{28A0092B-C50C-407E-A947-70E740481C1C}">
-                <a14:useLocalDpi xmlns:a14="http://schemas.microsoft.com/office/drawing/2010/main" val="0"/>
-              </a:ext>
-            </a:extLst>
-          </a:blip>
-          <a:srcRect/>
-          <a:stretch>
-            <a:fillRect/>
-          </a:stretch>
-        </p:blipFill>
-        <p:spPr bwMode="auto">
-          <a:xfrm>
-            <a:off x="7412099" y="506315"/>
-            <a:ext cx="682818" cy="615499"/>
-          </a:xfrm>
-          <a:prstGeom prst="rect">
-            <a:avLst/>
-          </a:prstGeom>
-          <a:noFill/>
-          <a:extLst>
-            <a:ext uri="{909E8E84-426E-40DD-AFC4-6F175D3DCCD1}">
-              <a14:hiddenFill xmlns:a14="http://schemas.microsoft.com/office/drawing/2010/main">
-                <a:solidFill>
-                  <a:srgbClr val="FFFFFF"/>
-                </a:solidFill>
-              </a14:hiddenFill>
-            </a:ext>
-          </a:extLst>
-        </p:spPr>
-      </p:pic>
-      <p:pic>
-        <p:nvPicPr>
-          <p:cNvPr id="16" name="Picture 15"/>
-          <p:cNvPicPr>
-            <a:picLocks noChangeAspect="1"/>
-          </p:cNvPicPr>
-          <p:nvPr/>
-        </p:nvPicPr>
-        <p:blipFill>
-          <a:blip r:embed="rId4">
-            <a:extLst>
-              <a:ext uri="{28A0092B-C50C-407E-A947-70E740481C1C}">
-                <a14:useLocalDpi xmlns:a14="http://schemas.microsoft.com/office/drawing/2010/main" val="0"/>
-              </a:ext>
-            </a:extLst>
-          </a:blip>
-          <a:stretch>
-            <a:fillRect/>
-          </a:stretch>
-        </p:blipFill>
-        <p:spPr>
-          <a:xfrm>
-            <a:off x="15039844" y="4371975"/>
-            <a:ext cx="2712473" cy="1084989"/>
-          </a:xfrm>
-          <a:prstGeom prst="rect">
-            <a:avLst/>
-          </a:prstGeom>
-        </p:spPr>
-      </p:pic>
-      <p:grpSp>
-        <p:nvGrpSpPr>
-          <p:cNvPr id="18" name="Group 17"/>
-          <p:cNvGrpSpPr/>
-          <p:nvPr/>
-        </p:nvGrpSpPr>
-        <p:grpSpPr>
-          <a:xfrm>
-            <a:off x="10803333" y="4382474"/>
-            <a:ext cx="1151769" cy="673166"/>
-            <a:chOff x="2334271" y="318043"/>
-            <a:chExt cx="1457473" cy="673166"/>
-          </a:xfrm>
-        </p:grpSpPr>
-        <p:cxnSp>
-          <p:nvCxnSpPr>
-            <p:cNvPr id="23" name="Straight Arrow Connector 22"/>
-            <p:cNvCxnSpPr/>
-            <p:nvPr/>
-          </p:nvCxnSpPr>
-          <p:spPr>
-            <a:xfrm flipV="1">
-              <a:off x="2346123" y="980728"/>
-              <a:ext cx="1445621" cy="10481"/>
-            </a:xfrm>
-            <a:prstGeom prst="straightConnector1">
-              <a:avLst/>
-            </a:prstGeom>
-            <a:ln w="142875">
-              <a:solidFill>
-                <a:schemeClr val="tx1">
-                  <a:lumMod val="50000"/>
-                  <a:lumOff val="50000"/>
-                </a:schemeClr>
-              </a:solidFill>
-              <a:tailEnd type="triangle"/>
-            </a:ln>
-          </p:spPr>
-          <p:style>
-            <a:lnRef idx="1">
-              <a:schemeClr val="accent1"/>
-            </a:lnRef>
-            <a:fillRef idx="0">
-              <a:schemeClr val="accent1"/>
-            </a:fillRef>
-            <a:effectRef idx="0">
-              <a:schemeClr val="accent1"/>
-            </a:effectRef>
-            <a:fontRef idx="minor">
-              <a:schemeClr val="tx1"/>
-            </a:fontRef>
-          </p:style>
-        </p:cxnSp>
-        <p:sp>
-          <p:nvSpPr>
-            <p:cNvPr id="24" name="TextBox 23"/>
-            <p:cNvSpPr txBox="1"/>
-            <p:nvPr/>
-          </p:nvSpPr>
-          <p:spPr>
-            <a:xfrm>
-              <a:off x="2334271" y="318043"/>
-              <a:ext cx="1408522" cy="523220"/>
-            </a:xfrm>
-            <a:prstGeom prst="rect">
-              <a:avLst/>
-            </a:prstGeom>
-            <a:noFill/>
-          </p:spPr>
-          <p:txBody>
-            <a:bodyPr wrap="square" rtlCol="0">
-              <a:spAutoFit/>
-            </a:bodyPr>
-            <a:lstStyle/>
-            <a:p>
-              <a:pPr algn="ctr"/>
-              <a:endParaRPr lang="de-DE" sz="2800" b="1" dirty="0"/>
-            </a:p>
-          </p:txBody>
-        </p:sp>
-      </p:grpSp>
-      <p:pic>
-        <p:nvPicPr>
-          <p:cNvPr id="25" name="Picture 24"/>
-          <p:cNvPicPr>
-            <a:picLocks noChangeAspect="1"/>
-          </p:cNvPicPr>
-          <p:nvPr/>
-        </p:nvPicPr>
-        <p:blipFill>
-          <a:blip r:embed="rId5" cstate="print">
-            <a:extLst>
-              <a:ext uri="{28A0092B-C50C-407E-A947-70E740481C1C}">
-                <a14:useLocalDpi xmlns:a14="http://schemas.microsoft.com/office/drawing/2010/main" val="0"/>
-              </a:ext>
-            </a:extLst>
-          </a:blip>
-          <a:stretch>
-            <a:fillRect/>
-          </a:stretch>
-        </p:blipFill>
-        <p:spPr>
-          <a:xfrm>
-            <a:off x="2251605" y="6395654"/>
-            <a:ext cx="1116380" cy="345217"/>
-          </a:xfrm>
-          <a:prstGeom prst="rect">
-            <a:avLst/>
-          </a:prstGeom>
-        </p:spPr>
-      </p:pic>
-      <p:pic>
-        <p:nvPicPr>
-          <p:cNvPr id="2" name="Picture 1"/>
-          <p:cNvPicPr>
-            <a:picLocks noChangeAspect="1"/>
-          </p:cNvPicPr>
-          <p:nvPr/>
-        </p:nvPicPr>
-        <p:blipFill>
-          <a:blip r:embed="rId7" cstate="print">
-            <a:extLst>
-              <a:ext uri="{28A0092B-C50C-407E-A947-70E740481C1C}">
-                <a14:useLocalDpi xmlns:a14="http://schemas.microsoft.com/office/drawing/2010/main" val="0"/>
-              </a:ext>
-            </a:extLst>
-          </a:blip>
-          <a:stretch>
-            <a:fillRect/>
-          </a:stretch>
-        </p:blipFill>
-        <p:spPr>
-          <a:xfrm>
-            <a:off x="8505825" y="4377401"/>
-            <a:ext cx="2091398" cy="1280449"/>
-          </a:xfrm>
-          <a:prstGeom prst="rect">
-            <a:avLst/>
-          </a:prstGeom>
-        </p:spPr>
-      </p:pic>
-      <p:sp>
-        <p:nvSpPr>
-          <p:cNvPr id="27" name="TextBox 26"/>
-          <p:cNvSpPr txBox="1"/>
-          <p:nvPr/>
-        </p:nvSpPr>
-        <p:spPr>
-          <a:xfrm>
-            <a:off x="11685510" y="5803960"/>
-            <a:ext cx="4535565" cy="2062103"/>
-          </a:xfrm>
-          <a:prstGeom prst="rect">
-            <a:avLst/>
-          </a:prstGeom>
-          <a:noFill/>
-        </p:spPr>
-        <p:txBody>
-          <a:bodyPr wrap="square" rtlCol="0">
-            <a:spAutoFit/>
-          </a:bodyPr>
-          <a:lstStyle/>
-          <a:p>
-            <a:r>
-              <a:rPr lang="en-US" sz="2800" b="1" dirty="0">
-                <a:solidFill>
-                  <a:schemeClr val="bg2">
-                    <a:lumMod val="25000"/>
-                  </a:schemeClr>
-                </a:solidFill>
-              </a:rPr>
-              <a:t>Boxfuse Image</a:t>
-            </a:r>
-          </a:p>
-          <a:p>
-            <a:pPr marL="360363" indent="-360363">
-              <a:buFont typeface="Wingdings" panose="05000000000000000000" pitchFamily="2" charset="2"/>
-              <a:buChar char="ü"/>
-            </a:pPr>
-            <a:r>
-              <a:rPr lang="en-US" sz="2000" b="1" dirty="0">
-                <a:solidFill>
-                  <a:schemeClr val="bg1">
-                    <a:lumMod val="50000"/>
-                  </a:schemeClr>
-                </a:solidFill>
-              </a:rPr>
-              <a:t>15 MB</a:t>
-            </a:r>
-          </a:p>
-          <a:p>
-            <a:pPr marL="360363" indent="-360363">
-              <a:buFont typeface="Wingdings" panose="05000000000000000000" pitchFamily="2" charset="2"/>
-              <a:buChar char="ü"/>
-            </a:pPr>
-            <a:r>
-              <a:rPr lang="en-US" sz="2000" b="1" dirty="0">
-                <a:solidFill>
-                  <a:schemeClr val="bg1">
-                    <a:lumMod val="50000"/>
-                  </a:schemeClr>
-                </a:solidFill>
-              </a:rPr>
-              <a:t>3 secs provisioning</a:t>
-            </a:r>
-          </a:p>
-          <a:p>
-            <a:pPr marL="360363" indent="-360363">
-              <a:buFont typeface="Wingdings" panose="05000000000000000000" pitchFamily="2" charset="2"/>
-              <a:buChar char="ü"/>
-            </a:pPr>
-            <a:r>
-              <a:rPr lang="en-US" sz="2000" b="1" dirty="0">
-                <a:solidFill>
-                  <a:schemeClr val="bg1">
-                    <a:lumMod val="50000"/>
-                  </a:schemeClr>
-                </a:solidFill>
-              </a:rPr>
-              <a:t>only App, Node.js &amp; Linux kernel</a:t>
-            </a:r>
-          </a:p>
-          <a:p>
-            <a:pPr marL="360363" indent="-360363">
-              <a:buFont typeface="Wingdings" panose="05000000000000000000" pitchFamily="2" charset="2"/>
-              <a:buChar char="ü"/>
-            </a:pPr>
-            <a:r>
-              <a:rPr lang="en-US" sz="2000" b="1" dirty="0">
-                <a:solidFill>
-                  <a:schemeClr val="bg1">
-                    <a:lumMod val="50000"/>
-                  </a:schemeClr>
-                </a:solidFill>
-              </a:rPr>
-              <a:t>secure</a:t>
-            </a:r>
-          </a:p>
-          <a:p>
-            <a:pPr marL="360363" indent="-360363">
-              <a:buFont typeface="Wingdings" panose="05000000000000000000" pitchFamily="2" charset="2"/>
-              <a:buChar char="ü"/>
-            </a:pPr>
-            <a:r>
-              <a:rPr lang="en-US" sz="2000" b="1" dirty="0">
-                <a:solidFill>
-                  <a:schemeClr val="bg1">
-                    <a:lumMod val="50000"/>
-                  </a:schemeClr>
-                </a:solidFill>
-              </a:rPr>
-              <a:t>boots directly on </a:t>
-            </a:r>
-            <a:r>
-              <a:rPr lang="en-US" sz="2000" b="1" dirty="0" err="1">
-                <a:solidFill>
-                  <a:schemeClr val="bg1">
-                    <a:lumMod val="50000"/>
-                  </a:schemeClr>
-                </a:solidFill>
-              </a:rPr>
-              <a:t>VirtualBox</a:t>
-            </a:r>
-            <a:r>
-              <a:rPr lang="en-US" sz="2000" b="1" dirty="0">
-                <a:solidFill>
-                  <a:schemeClr val="bg1">
-                    <a:lumMod val="50000"/>
-                  </a:schemeClr>
-                </a:solidFill>
-              </a:rPr>
-              <a:t> &amp; AWS</a:t>
-            </a:r>
-          </a:p>
-        </p:txBody>
-      </p:sp>
-      <p:grpSp>
-        <p:nvGrpSpPr>
-          <p:cNvPr id="28" name="Group 27"/>
-          <p:cNvGrpSpPr/>
-          <p:nvPr/>
-        </p:nvGrpSpPr>
-        <p:grpSpPr>
-          <a:xfrm>
-            <a:off x="12169414" y="4379497"/>
-            <a:ext cx="1309662" cy="1309662"/>
-            <a:chOff x="8287098" y="3699247"/>
-            <a:chExt cx="1309662" cy="1309662"/>
-          </a:xfrm>
-        </p:grpSpPr>
-        <p:sp>
-          <p:nvSpPr>
-            <p:cNvPr id="29" name="Rounded Rectangle 25"/>
-            <p:cNvSpPr/>
-            <p:nvPr/>
-          </p:nvSpPr>
-          <p:spPr>
-            <a:xfrm>
-              <a:off x="8287098" y="3699247"/>
-              <a:ext cx="1309662" cy="1309662"/>
-            </a:xfrm>
-            <a:prstGeom prst="ellipse">
-              <a:avLst/>
-            </a:prstGeom>
-            <a:solidFill>
-              <a:schemeClr val="accent1">
-                <a:lumMod val="75000"/>
-              </a:schemeClr>
-            </a:solidFill>
-            <a:ln w="114300">
-              <a:solidFill>
-                <a:schemeClr val="accent1">
-                  <a:lumMod val="50000"/>
-                </a:schemeClr>
-              </a:solidFill>
-            </a:ln>
-          </p:spPr>
-          <p:style>
-            <a:lnRef idx="2">
-              <a:schemeClr val="accent1">
-                <a:shade val="50000"/>
-              </a:schemeClr>
-            </a:lnRef>
-            <a:fillRef idx="1">
-              <a:schemeClr val="accent1"/>
-            </a:fillRef>
-            <a:effectRef idx="0">
-              <a:schemeClr val="accent1"/>
-            </a:effectRef>
-            <a:fontRef idx="minor">
-              <a:schemeClr val="lt1"/>
-            </a:fontRef>
-          </p:style>
-          <p:txBody>
-            <a:bodyPr rtlCol="0" anchor="ctr"/>
-            <a:lstStyle/>
-            <a:p>
-              <a:pPr algn="ctr"/>
-              <a:endParaRPr lang="de-DE" sz="1000"/>
-            </a:p>
-          </p:txBody>
-        </p:sp>
-        <p:pic>
-          <p:nvPicPr>
-            <p:cNvPr id="30" name="Picture 29"/>
-            <p:cNvPicPr>
-              <a:picLocks noChangeAspect="1"/>
-            </p:cNvPicPr>
-            <p:nvPr/>
-          </p:nvPicPr>
-          <p:blipFill>
-            <a:blip r:embed="rId8" cstate="print">
-              <a:extLst>
-                <a:ext uri="{28A0092B-C50C-407E-A947-70E740481C1C}">
-                  <a14:useLocalDpi xmlns:a14="http://schemas.microsoft.com/office/drawing/2010/main" val="0"/>
-                </a:ext>
-              </a:extLst>
-            </a:blip>
-            <a:stretch>
-              <a:fillRect/>
-            </a:stretch>
-          </p:blipFill>
-          <p:spPr>
-            <a:xfrm>
-              <a:off x="8340739" y="3731301"/>
-              <a:ext cx="1238267" cy="1238267"/>
-            </a:xfrm>
-            <a:prstGeom prst="rect">
-              <a:avLst/>
-            </a:prstGeom>
-          </p:spPr>
-        </p:pic>
-      </p:grpSp>
-      <p:grpSp>
-        <p:nvGrpSpPr>
-          <p:cNvPr id="31" name="Group 30"/>
-          <p:cNvGrpSpPr/>
-          <p:nvPr/>
-        </p:nvGrpSpPr>
-        <p:grpSpPr>
-          <a:xfrm>
-            <a:off x="13737033" y="4334849"/>
-            <a:ext cx="1151769" cy="673166"/>
-            <a:chOff x="2334271" y="318043"/>
-            <a:chExt cx="1457473" cy="673166"/>
-          </a:xfrm>
-        </p:grpSpPr>
-        <p:cxnSp>
-          <p:nvCxnSpPr>
-            <p:cNvPr id="32" name="Straight Arrow Connector 31"/>
-            <p:cNvCxnSpPr/>
-            <p:nvPr/>
-          </p:nvCxnSpPr>
-          <p:spPr>
-            <a:xfrm flipV="1">
-              <a:off x="2346123" y="980728"/>
-              <a:ext cx="1445621" cy="10481"/>
-            </a:xfrm>
-            <a:prstGeom prst="straightConnector1">
-              <a:avLst/>
-            </a:prstGeom>
-            <a:ln w="142875">
-              <a:solidFill>
-                <a:schemeClr val="tx1">
-                  <a:lumMod val="50000"/>
-                  <a:lumOff val="50000"/>
-                </a:schemeClr>
-              </a:solidFill>
-              <a:tailEnd type="triangle"/>
-            </a:ln>
-          </p:spPr>
-          <p:style>
-            <a:lnRef idx="1">
-              <a:schemeClr val="accent1"/>
-            </a:lnRef>
-            <a:fillRef idx="0">
-              <a:schemeClr val="accent1"/>
-            </a:fillRef>
-            <a:effectRef idx="0">
-              <a:schemeClr val="accent1"/>
-            </a:effectRef>
-            <a:fontRef idx="minor">
-              <a:schemeClr val="tx1"/>
-            </a:fontRef>
-          </p:style>
-        </p:cxnSp>
-        <p:sp>
-          <p:nvSpPr>
-            <p:cNvPr id="33" name="TextBox 32"/>
-            <p:cNvSpPr txBox="1"/>
-            <p:nvPr/>
-          </p:nvSpPr>
-          <p:spPr>
-            <a:xfrm>
-              <a:off x="2334271" y="318043"/>
-              <a:ext cx="1408522" cy="523220"/>
-            </a:xfrm>
-            <a:prstGeom prst="rect">
-              <a:avLst/>
-            </a:prstGeom>
-            <a:noFill/>
-          </p:spPr>
-          <p:txBody>
-            <a:bodyPr wrap="square" rtlCol="0">
-              <a:spAutoFit/>
-            </a:bodyPr>
-            <a:lstStyle/>
-            <a:p>
-              <a:pPr algn="ctr"/>
-              <a:endParaRPr lang="de-DE" sz="2800" b="1" dirty="0"/>
-            </a:p>
-          </p:txBody>
-        </p:sp>
-      </p:grpSp>
-    </p:spTree>
-    <p:extLst>
-      <p:ext uri="{BB962C8B-B14F-4D97-AF65-F5344CB8AC3E}">
-        <p14:creationId xmlns:p14="http://schemas.microsoft.com/office/powerpoint/2010/main" val="2730884054"/>
       </p:ext>
     </p:extLst>
   </p:cSld>
@@ -42276,6 +42601,950 @@
           <a:chExt cx="0" cy="0"/>
         </a:xfrm>
       </p:grpSpPr>
+      <p:sp>
+        <p:nvSpPr>
+          <p:cNvPr id="6" name="Rounded Rectangle 75"/>
+          <p:cNvSpPr/>
+          <p:nvPr/>
+        </p:nvSpPr>
+        <p:spPr>
+          <a:xfrm>
+            <a:off x="508638" y="1929147"/>
+            <a:ext cx="1441656" cy="1514439"/>
+          </a:xfrm>
+          <a:prstGeom prst="rect">
+            <a:avLst/>
+          </a:prstGeom>
+          <a:solidFill>
+            <a:schemeClr val="accent2">
+              <a:lumMod val="75000"/>
+            </a:schemeClr>
+          </a:solidFill>
+          <a:ln w="76200">
+            <a:solidFill>
+              <a:schemeClr val="accent2">
+                <a:lumMod val="50000"/>
+              </a:schemeClr>
+            </a:solidFill>
+          </a:ln>
+        </p:spPr>
+        <p:style>
+          <a:lnRef idx="2">
+            <a:schemeClr val="accent1">
+              <a:shade val="50000"/>
+            </a:schemeClr>
+          </a:lnRef>
+          <a:fillRef idx="1">
+            <a:schemeClr val="accent1"/>
+          </a:fillRef>
+          <a:effectRef idx="0">
+            <a:schemeClr val="accent1"/>
+          </a:effectRef>
+          <a:fontRef idx="minor">
+            <a:schemeClr val="lt1"/>
+          </a:fontRef>
+        </p:style>
+        <p:txBody>
+          <a:bodyPr rtlCol="0" anchor="ctr"/>
+          <a:lstStyle/>
+          <a:p>
+            <a:pPr algn="ctr"/>
+            <a:r>
+              <a:rPr lang="en-US" sz="2000" b="1" dirty="0"/>
+              <a:t>Instance</a:t>
+            </a:r>
+            <a:endParaRPr lang="de-DE" sz="2000" b="1" dirty="0"/>
+          </a:p>
+        </p:txBody>
+      </p:sp>
+      <p:grpSp>
+        <p:nvGrpSpPr>
+          <p:cNvPr id="22" name="Group 21"/>
+          <p:cNvGrpSpPr/>
+          <p:nvPr/>
+        </p:nvGrpSpPr>
+        <p:grpSpPr>
+          <a:xfrm>
+            <a:off x="4049898" y="296307"/>
+            <a:ext cx="2242751" cy="1789646"/>
+            <a:chOff x="1294361" y="4557307"/>
+            <a:chExt cx="2242751" cy="1789646"/>
+          </a:xfrm>
+        </p:grpSpPr>
+        <p:pic>
+          <p:nvPicPr>
+            <p:cNvPr id="4" name="Picture 2" descr="Console showing log4J logs"/>
+            <p:cNvPicPr>
+              <a:picLocks noChangeAspect="1" noChangeArrowheads="1"/>
+            </p:cNvPicPr>
+            <p:nvPr/>
+          </p:nvPicPr>
+          <p:blipFill>
+            <a:blip r:embed="rId2">
+              <a:extLst>
+                <a:ext uri="{28A0092B-C50C-407E-A947-70E740481C1C}">
+                  <a14:useLocalDpi xmlns:a14="http://schemas.microsoft.com/office/drawing/2010/main" val="0"/>
+                </a:ext>
+              </a:extLst>
+            </a:blip>
+            <a:srcRect/>
+            <a:stretch>
+              <a:fillRect/>
+            </a:stretch>
+          </p:blipFill>
+          <p:spPr bwMode="auto">
+            <a:xfrm>
+              <a:off x="1421028" y="4557307"/>
+              <a:ext cx="2004202" cy="1459059"/>
+            </a:xfrm>
+            <a:prstGeom prst="rect">
+              <a:avLst/>
+            </a:prstGeom>
+            <a:noFill/>
+            <a:extLst>
+              <a:ext uri="{909E8E84-426E-40DD-AFC4-6F175D3DCCD1}">
+                <a14:hiddenFill xmlns:a14="http://schemas.microsoft.com/office/drawing/2010/main">
+                  <a:solidFill>
+                    <a:srgbClr val="FFFFFF"/>
+                  </a:solidFill>
+                </a14:hiddenFill>
+              </a:ext>
+            </a:extLst>
+          </p:spPr>
+        </p:pic>
+        <p:sp>
+          <p:nvSpPr>
+            <p:cNvPr id="9" name="TextBox 8"/>
+            <p:cNvSpPr txBox="1"/>
+            <p:nvPr/>
+          </p:nvSpPr>
+          <p:spPr>
+            <a:xfrm>
+              <a:off x="1294361" y="5946843"/>
+              <a:ext cx="2242751" cy="400110"/>
+            </a:xfrm>
+            <a:prstGeom prst="rect">
+              <a:avLst/>
+            </a:prstGeom>
+            <a:noFill/>
+          </p:spPr>
+          <p:txBody>
+            <a:bodyPr wrap="square" rtlCol="0">
+              <a:spAutoFit/>
+            </a:bodyPr>
+            <a:lstStyle/>
+            <a:p>
+              <a:pPr algn="ctr"/>
+              <a:r>
+                <a:rPr lang="en-US" sz="2000" b="1" dirty="0"/>
+                <a:t>Instance Boot logs</a:t>
+              </a:r>
+              <a:endParaRPr lang="de-DE" sz="2000" b="1" dirty="0"/>
+            </a:p>
+          </p:txBody>
+        </p:sp>
+      </p:grpSp>
+      <p:cxnSp>
+        <p:nvCxnSpPr>
+          <p:cNvPr id="11" name="Straight Arrow Connector 10"/>
+          <p:cNvCxnSpPr/>
+          <p:nvPr/>
+        </p:nvCxnSpPr>
+        <p:spPr>
+          <a:xfrm>
+            <a:off x="2124844" y="3071845"/>
+            <a:ext cx="1823118" cy="699049"/>
+          </a:xfrm>
+          <a:prstGeom prst="straightConnector1">
+            <a:avLst/>
+          </a:prstGeom>
+          <a:ln w="142875">
+            <a:solidFill>
+              <a:schemeClr val="tx1">
+                <a:lumMod val="50000"/>
+                <a:lumOff val="50000"/>
+              </a:schemeClr>
+            </a:solidFill>
+            <a:tailEnd type="triangle"/>
+          </a:ln>
+        </p:spPr>
+        <p:style>
+          <a:lnRef idx="1">
+            <a:schemeClr val="accent1"/>
+          </a:lnRef>
+          <a:fillRef idx="0">
+            <a:schemeClr val="accent1"/>
+          </a:fillRef>
+          <a:effectRef idx="0">
+            <a:schemeClr val="accent1"/>
+          </a:effectRef>
+          <a:fontRef idx="minor">
+            <a:schemeClr val="tx1"/>
+          </a:fontRef>
+        </p:style>
+      </p:cxnSp>
+      <p:cxnSp>
+        <p:nvCxnSpPr>
+          <p:cNvPr id="15" name="Straight Arrow Connector 14"/>
+          <p:cNvCxnSpPr/>
+          <p:nvPr/>
+        </p:nvCxnSpPr>
+        <p:spPr>
+          <a:xfrm flipV="1">
+            <a:off x="2162412" y="1404576"/>
+            <a:ext cx="1822623" cy="908221"/>
+          </a:xfrm>
+          <a:prstGeom prst="straightConnector1">
+            <a:avLst/>
+          </a:prstGeom>
+          <a:ln w="142875">
+            <a:solidFill>
+              <a:schemeClr val="tx1">
+                <a:lumMod val="50000"/>
+                <a:lumOff val="50000"/>
+              </a:schemeClr>
+            </a:solidFill>
+            <a:tailEnd type="triangle"/>
+          </a:ln>
+        </p:spPr>
+        <p:style>
+          <a:lnRef idx="1">
+            <a:schemeClr val="accent1"/>
+          </a:lnRef>
+          <a:fillRef idx="0">
+            <a:schemeClr val="accent1"/>
+          </a:fillRef>
+          <a:effectRef idx="0">
+            <a:schemeClr val="accent1"/>
+          </a:effectRef>
+          <a:fontRef idx="minor">
+            <a:schemeClr val="tx1"/>
+          </a:fontRef>
+        </p:style>
+      </p:cxnSp>
+      <p:grpSp>
+        <p:nvGrpSpPr>
+          <p:cNvPr id="21" name="Group 20"/>
+          <p:cNvGrpSpPr/>
+          <p:nvPr/>
+        </p:nvGrpSpPr>
+        <p:grpSpPr>
+          <a:xfrm>
+            <a:off x="4072554" y="3154318"/>
+            <a:ext cx="2254085" cy="1814879"/>
+            <a:chOff x="5246466" y="1076300"/>
+            <a:chExt cx="2254085" cy="1814879"/>
+          </a:xfrm>
+        </p:grpSpPr>
+        <p:pic>
+          <p:nvPicPr>
+            <p:cNvPr id="19" name="Picture 18"/>
+            <p:cNvPicPr>
+              <a:picLocks noChangeAspect="1"/>
+            </p:cNvPicPr>
+            <p:nvPr/>
+          </p:nvPicPr>
+          <p:blipFill rotWithShape="1">
+            <a:blip r:embed="rId3"/>
+            <a:srcRect l="861" t="13474" r="845" b="1728"/>
+            <a:stretch/>
+          </p:blipFill>
+          <p:spPr>
+            <a:xfrm>
+              <a:off x="5251619" y="1076300"/>
+              <a:ext cx="2248932" cy="1454185"/>
+            </a:xfrm>
+            <a:prstGeom prst="rect">
+              <a:avLst/>
+            </a:prstGeom>
+          </p:spPr>
+        </p:pic>
+        <p:sp>
+          <p:nvSpPr>
+            <p:cNvPr id="20" name="TextBox 19"/>
+            <p:cNvSpPr txBox="1"/>
+            <p:nvPr/>
+          </p:nvSpPr>
+          <p:spPr>
+            <a:xfrm>
+              <a:off x="5246466" y="2491069"/>
+              <a:ext cx="2242751" cy="400110"/>
+            </a:xfrm>
+            <a:prstGeom prst="rect">
+              <a:avLst/>
+            </a:prstGeom>
+            <a:noFill/>
+          </p:spPr>
+          <p:txBody>
+            <a:bodyPr wrap="square" rtlCol="0">
+              <a:spAutoFit/>
+            </a:bodyPr>
+            <a:lstStyle/>
+            <a:p>
+              <a:pPr algn="ctr"/>
+              <a:r>
+                <a:rPr lang="en-US" sz="2000" b="1" dirty="0"/>
+                <a:t>Application logs</a:t>
+              </a:r>
+              <a:endParaRPr lang="de-DE" sz="2000" b="1" dirty="0"/>
+            </a:p>
+          </p:txBody>
+        </p:sp>
+      </p:grpSp>
+      <p:pic>
+        <p:nvPicPr>
+          <p:cNvPr id="13" name="Picture 14"/>
+          <p:cNvPicPr>
+            <a:picLocks noChangeAspect="1"/>
+          </p:cNvPicPr>
+          <p:nvPr/>
+        </p:nvPicPr>
+        <p:blipFill>
+          <a:blip r:embed="rId4">
+            <a:extLst>
+              <a:ext uri="{28A0092B-C50C-407E-A947-70E740481C1C}">
+                <a14:useLocalDpi xmlns:a14="http://schemas.microsoft.com/office/drawing/2010/main" val="0"/>
+              </a:ext>
+            </a:extLst>
+          </a:blip>
+          <a:stretch>
+            <a:fillRect/>
+          </a:stretch>
+        </p:blipFill>
+        <p:spPr>
+          <a:xfrm>
+            <a:off x="9514695" y="506314"/>
+            <a:ext cx="1538745" cy="615498"/>
+          </a:xfrm>
+          <a:prstGeom prst="rect">
+            <a:avLst/>
+          </a:prstGeom>
+        </p:spPr>
+      </p:pic>
+      <p:cxnSp>
+        <p:nvCxnSpPr>
+          <p:cNvPr id="14" name="Straight Arrow Connector 16"/>
+          <p:cNvCxnSpPr/>
+          <p:nvPr/>
+        </p:nvCxnSpPr>
+        <p:spPr>
+          <a:xfrm flipV="1">
+            <a:off x="8240815" y="788269"/>
+            <a:ext cx="1142403" cy="10481"/>
+          </a:xfrm>
+          <a:prstGeom prst="straightConnector1">
+            <a:avLst/>
+          </a:prstGeom>
+          <a:ln w="142875">
+            <a:solidFill>
+              <a:schemeClr val="tx1">
+                <a:lumMod val="50000"/>
+                <a:lumOff val="50000"/>
+              </a:schemeClr>
+            </a:solidFill>
+            <a:tailEnd type="triangle"/>
+          </a:ln>
+        </p:spPr>
+        <p:style>
+          <a:lnRef idx="1">
+            <a:schemeClr val="accent1"/>
+          </a:lnRef>
+          <a:fillRef idx="0">
+            <a:schemeClr val="accent1"/>
+          </a:fillRef>
+          <a:effectRef idx="0">
+            <a:schemeClr val="accent1"/>
+          </a:effectRef>
+          <a:fontRef idx="minor">
+            <a:schemeClr val="tx1"/>
+          </a:fontRef>
+        </p:style>
+      </p:cxnSp>
+      <p:pic>
+        <p:nvPicPr>
+          <p:cNvPr id="17" name="Picture 22"/>
+          <p:cNvPicPr>
+            <a:picLocks noChangeAspect="1"/>
+          </p:cNvPicPr>
+          <p:nvPr/>
+        </p:nvPicPr>
+        <p:blipFill>
+          <a:blip r:embed="rId5" cstate="print">
+            <a:extLst>
+              <a:ext uri="{28A0092B-C50C-407E-A947-70E740481C1C}">
+                <a14:useLocalDpi xmlns:a14="http://schemas.microsoft.com/office/drawing/2010/main" val="0"/>
+              </a:ext>
+            </a:extLst>
+          </a:blip>
+          <a:stretch>
+            <a:fillRect/>
+          </a:stretch>
+        </p:blipFill>
+        <p:spPr>
+          <a:xfrm>
+            <a:off x="8252417" y="268398"/>
+            <a:ext cx="1116380" cy="345217"/>
+          </a:xfrm>
+          <a:prstGeom prst="rect">
+            <a:avLst/>
+          </a:prstGeom>
+        </p:spPr>
+      </p:pic>
+      <p:pic>
+        <p:nvPicPr>
+          <p:cNvPr id="1026" name="Picture 2" descr="http://localhost:4000/assets/img/springboot.png"/>
+          <p:cNvPicPr>
+            <a:picLocks noChangeAspect="1" noChangeArrowheads="1"/>
+          </p:cNvPicPr>
+          <p:nvPr/>
+        </p:nvPicPr>
+        <p:blipFill>
+          <a:blip r:embed="rId6">
+            <a:extLst>
+              <a:ext uri="{28A0092B-C50C-407E-A947-70E740481C1C}">
+                <a14:useLocalDpi xmlns:a14="http://schemas.microsoft.com/office/drawing/2010/main" val="0"/>
+              </a:ext>
+            </a:extLst>
+          </a:blip>
+          <a:srcRect/>
+          <a:stretch>
+            <a:fillRect/>
+          </a:stretch>
+        </p:blipFill>
+        <p:spPr bwMode="auto">
+          <a:xfrm>
+            <a:off x="7412099" y="506315"/>
+            <a:ext cx="682818" cy="615499"/>
+          </a:xfrm>
+          <a:prstGeom prst="rect">
+            <a:avLst/>
+          </a:prstGeom>
+          <a:noFill/>
+          <a:extLst>
+            <a:ext uri="{909E8E84-426E-40DD-AFC4-6F175D3DCCD1}">
+              <a14:hiddenFill xmlns:a14="http://schemas.microsoft.com/office/drawing/2010/main">
+                <a:solidFill>
+                  <a:srgbClr val="FFFFFF"/>
+                </a:solidFill>
+              </a14:hiddenFill>
+            </a:ext>
+          </a:extLst>
+        </p:spPr>
+      </p:pic>
+      <p:pic>
+        <p:nvPicPr>
+          <p:cNvPr id="16" name="Picture 15"/>
+          <p:cNvPicPr>
+            <a:picLocks noChangeAspect="1"/>
+          </p:cNvPicPr>
+          <p:nvPr/>
+        </p:nvPicPr>
+        <p:blipFill>
+          <a:blip r:embed="rId4">
+            <a:extLst>
+              <a:ext uri="{28A0092B-C50C-407E-A947-70E740481C1C}">
+                <a14:useLocalDpi xmlns:a14="http://schemas.microsoft.com/office/drawing/2010/main" val="0"/>
+              </a:ext>
+            </a:extLst>
+          </a:blip>
+          <a:stretch>
+            <a:fillRect/>
+          </a:stretch>
+        </p:blipFill>
+        <p:spPr>
+          <a:xfrm>
+            <a:off x="15039844" y="4371975"/>
+            <a:ext cx="2712473" cy="1084989"/>
+          </a:xfrm>
+          <a:prstGeom prst="rect">
+            <a:avLst/>
+          </a:prstGeom>
+        </p:spPr>
+      </p:pic>
+      <p:grpSp>
+        <p:nvGrpSpPr>
+          <p:cNvPr id="18" name="Group 17"/>
+          <p:cNvGrpSpPr/>
+          <p:nvPr/>
+        </p:nvGrpSpPr>
+        <p:grpSpPr>
+          <a:xfrm>
+            <a:off x="10803333" y="4382474"/>
+            <a:ext cx="1151769" cy="673166"/>
+            <a:chOff x="2334271" y="318043"/>
+            <a:chExt cx="1457473" cy="673166"/>
+          </a:xfrm>
+        </p:grpSpPr>
+        <p:cxnSp>
+          <p:nvCxnSpPr>
+            <p:cNvPr id="23" name="Straight Arrow Connector 22"/>
+            <p:cNvCxnSpPr/>
+            <p:nvPr/>
+          </p:nvCxnSpPr>
+          <p:spPr>
+            <a:xfrm flipV="1">
+              <a:off x="2346123" y="980728"/>
+              <a:ext cx="1445621" cy="10481"/>
+            </a:xfrm>
+            <a:prstGeom prst="straightConnector1">
+              <a:avLst/>
+            </a:prstGeom>
+            <a:ln w="142875">
+              <a:solidFill>
+                <a:schemeClr val="tx1">
+                  <a:lumMod val="50000"/>
+                  <a:lumOff val="50000"/>
+                </a:schemeClr>
+              </a:solidFill>
+              <a:tailEnd type="triangle"/>
+            </a:ln>
+          </p:spPr>
+          <p:style>
+            <a:lnRef idx="1">
+              <a:schemeClr val="accent1"/>
+            </a:lnRef>
+            <a:fillRef idx="0">
+              <a:schemeClr val="accent1"/>
+            </a:fillRef>
+            <a:effectRef idx="0">
+              <a:schemeClr val="accent1"/>
+            </a:effectRef>
+            <a:fontRef idx="minor">
+              <a:schemeClr val="tx1"/>
+            </a:fontRef>
+          </p:style>
+        </p:cxnSp>
+        <p:sp>
+          <p:nvSpPr>
+            <p:cNvPr id="24" name="TextBox 23"/>
+            <p:cNvSpPr txBox="1"/>
+            <p:nvPr/>
+          </p:nvSpPr>
+          <p:spPr>
+            <a:xfrm>
+              <a:off x="2334271" y="318043"/>
+              <a:ext cx="1408522" cy="523220"/>
+            </a:xfrm>
+            <a:prstGeom prst="rect">
+              <a:avLst/>
+            </a:prstGeom>
+            <a:noFill/>
+          </p:spPr>
+          <p:txBody>
+            <a:bodyPr wrap="square" rtlCol="0">
+              <a:spAutoFit/>
+            </a:bodyPr>
+            <a:lstStyle/>
+            <a:p>
+              <a:pPr algn="ctr"/>
+              <a:endParaRPr lang="de-DE" sz="2800" b="1" dirty="0"/>
+            </a:p>
+          </p:txBody>
+        </p:sp>
+      </p:grpSp>
+      <p:pic>
+        <p:nvPicPr>
+          <p:cNvPr id="25" name="Picture 24"/>
+          <p:cNvPicPr>
+            <a:picLocks noChangeAspect="1"/>
+          </p:cNvPicPr>
+          <p:nvPr/>
+        </p:nvPicPr>
+        <p:blipFill>
+          <a:blip r:embed="rId5" cstate="print">
+            <a:extLst>
+              <a:ext uri="{28A0092B-C50C-407E-A947-70E740481C1C}">
+                <a14:useLocalDpi xmlns:a14="http://schemas.microsoft.com/office/drawing/2010/main" val="0"/>
+              </a:ext>
+            </a:extLst>
+          </a:blip>
+          <a:stretch>
+            <a:fillRect/>
+          </a:stretch>
+        </p:blipFill>
+        <p:spPr>
+          <a:xfrm>
+            <a:off x="2251605" y="6395654"/>
+            <a:ext cx="1116380" cy="345217"/>
+          </a:xfrm>
+          <a:prstGeom prst="rect">
+            <a:avLst/>
+          </a:prstGeom>
+        </p:spPr>
+      </p:pic>
+      <p:pic>
+        <p:nvPicPr>
+          <p:cNvPr id="2" name="Picture 1"/>
+          <p:cNvPicPr>
+            <a:picLocks noChangeAspect="1"/>
+          </p:cNvPicPr>
+          <p:nvPr/>
+        </p:nvPicPr>
+        <p:blipFill>
+          <a:blip r:embed="rId7" cstate="print">
+            <a:extLst>
+              <a:ext uri="{28A0092B-C50C-407E-A947-70E740481C1C}">
+                <a14:useLocalDpi xmlns:a14="http://schemas.microsoft.com/office/drawing/2010/main" val="0"/>
+              </a:ext>
+            </a:extLst>
+          </a:blip>
+          <a:stretch>
+            <a:fillRect/>
+          </a:stretch>
+        </p:blipFill>
+        <p:spPr>
+          <a:xfrm>
+            <a:off x="8505825" y="4377401"/>
+            <a:ext cx="2091398" cy="1280449"/>
+          </a:xfrm>
+          <a:prstGeom prst="rect">
+            <a:avLst/>
+          </a:prstGeom>
+        </p:spPr>
+      </p:pic>
+      <p:sp>
+        <p:nvSpPr>
+          <p:cNvPr id="27" name="TextBox 26"/>
+          <p:cNvSpPr txBox="1"/>
+          <p:nvPr/>
+        </p:nvSpPr>
+        <p:spPr>
+          <a:xfrm>
+            <a:off x="11685510" y="5803960"/>
+            <a:ext cx="4535565" cy="2062103"/>
+          </a:xfrm>
+          <a:prstGeom prst="rect">
+            <a:avLst/>
+          </a:prstGeom>
+          <a:noFill/>
+        </p:spPr>
+        <p:txBody>
+          <a:bodyPr wrap="square" rtlCol="0">
+            <a:spAutoFit/>
+          </a:bodyPr>
+          <a:lstStyle/>
+          <a:p>
+            <a:r>
+              <a:rPr lang="en-US" sz="2800" b="1" dirty="0">
+                <a:solidFill>
+                  <a:schemeClr val="bg2">
+                    <a:lumMod val="25000"/>
+                  </a:schemeClr>
+                </a:solidFill>
+              </a:rPr>
+              <a:t>Boxfuse Image</a:t>
+            </a:r>
+          </a:p>
+          <a:p>
+            <a:pPr marL="360363" indent="-360363">
+              <a:buFont typeface="Wingdings" panose="05000000000000000000" pitchFamily="2" charset="2"/>
+              <a:buChar char="ü"/>
+            </a:pPr>
+            <a:r>
+              <a:rPr lang="en-US" sz="2000" b="1" dirty="0">
+                <a:solidFill>
+                  <a:schemeClr val="bg1">
+                    <a:lumMod val="50000"/>
+                  </a:schemeClr>
+                </a:solidFill>
+              </a:rPr>
+              <a:t>15 MB</a:t>
+            </a:r>
+          </a:p>
+          <a:p>
+            <a:pPr marL="360363" indent="-360363">
+              <a:buFont typeface="Wingdings" panose="05000000000000000000" pitchFamily="2" charset="2"/>
+              <a:buChar char="ü"/>
+            </a:pPr>
+            <a:r>
+              <a:rPr lang="en-US" sz="2000" b="1" dirty="0">
+                <a:solidFill>
+                  <a:schemeClr val="bg1">
+                    <a:lumMod val="50000"/>
+                  </a:schemeClr>
+                </a:solidFill>
+              </a:rPr>
+              <a:t>3 secs provisioning</a:t>
+            </a:r>
+          </a:p>
+          <a:p>
+            <a:pPr marL="360363" indent="-360363">
+              <a:buFont typeface="Wingdings" panose="05000000000000000000" pitchFamily="2" charset="2"/>
+              <a:buChar char="ü"/>
+            </a:pPr>
+            <a:r>
+              <a:rPr lang="en-US" sz="2000" b="1" dirty="0">
+                <a:solidFill>
+                  <a:schemeClr val="bg1">
+                    <a:lumMod val="50000"/>
+                  </a:schemeClr>
+                </a:solidFill>
+              </a:rPr>
+              <a:t>only App, Node.js &amp; Linux kernel</a:t>
+            </a:r>
+          </a:p>
+          <a:p>
+            <a:pPr marL="360363" indent="-360363">
+              <a:buFont typeface="Wingdings" panose="05000000000000000000" pitchFamily="2" charset="2"/>
+              <a:buChar char="ü"/>
+            </a:pPr>
+            <a:r>
+              <a:rPr lang="en-US" sz="2000" b="1" dirty="0">
+                <a:solidFill>
+                  <a:schemeClr val="bg1">
+                    <a:lumMod val="50000"/>
+                  </a:schemeClr>
+                </a:solidFill>
+              </a:rPr>
+              <a:t>secure</a:t>
+            </a:r>
+          </a:p>
+          <a:p>
+            <a:pPr marL="360363" indent="-360363">
+              <a:buFont typeface="Wingdings" panose="05000000000000000000" pitchFamily="2" charset="2"/>
+              <a:buChar char="ü"/>
+            </a:pPr>
+            <a:r>
+              <a:rPr lang="en-US" sz="2000" b="1" dirty="0">
+                <a:solidFill>
+                  <a:schemeClr val="bg1">
+                    <a:lumMod val="50000"/>
+                  </a:schemeClr>
+                </a:solidFill>
+              </a:rPr>
+              <a:t>boots directly on </a:t>
+            </a:r>
+            <a:r>
+              <a:rPr lang="en-US" sz="2000" b="1" dirty="0" err="1">
+                <a:solidFill>
+                  <a:schemeClr val="bg1">
+                    <a:lumMod val="50000"/>
+                  </a:schemeClr>
+                </a:solidFill>
+              </a:rPr>
+              <a:t>VirtualBox</a:t>
+            </a:r>
+            <a:r>
+              <a:rPr lang="en-US" sz="2000" b="1" dirty="0">
+                <a:solidFill>
+                  <a:schemeClr val="bg1">
+                    <a:lumMod val="50000"/>
+                  </a:schemeClr>
+                </a:solidFill>
+              </a:rPr>
+              <a:t> &amp; AWS</a:t>
+            </a:r>
+          </a:p>
+        </p:txBody>
+      </p:sp>
+      <p:grpSp>
+        <p:nvGrpSpPr>
+          <p:cNvPr id="28" name="Group 27"/>
+          <p:cNvGrpSpPr/>
+          <p:nvPr/>
+        </p:nvGrpSpPr>
+        <p:grpSpPr>
+          <a:xfrm>
+            <a:off x="12169414" y="4379497"/>
+            <a:ext cx="1309662" cy="1309662"/>
+            <a:chOff x="8287098" y="3699247"/>
+            <a:chExt cx="1309662" cy="1309662"/>
+          </a:xfrm>
+        </p:grpSpPr>
+        <p:sp>
+          <p:nvSpPr>
+            <p:cNvPr id="29" name="Rounded Rectangle 25"/>
+            <p:cNvSpPr/>
+            <p:nvPr/>
+          </p:nvSpPr>
+          <p:spPr>
+            <a:xfrm>
+              <a:off x="8287098" y="3699247"/>
+              <a:ext cx="1309662" cy="1309662"/>
+            </a:xfrm>
+            <a:prstGeom prst="ellipse">
+              <a:avLst/>
+            </a:prstGeom>
+            <a:solidFill>
+              <a:schemeClr val="accent1">
+                <a:lumMod val="75000"/>
+              </a:schemeClr>
+            </a:solidFill>
+            <a:ln w="114300">
+              <a:solidFill>
+                <a:schemeClr val="accent1">
+                  <a:lumMod val="50000"/>
+                </a:schemeClr>
+              </a:solidFill>
+            </a:ln>
+          </p:spPr>
+          <p:style>
+            <a:lnRef idx="2">
+              <a:schemeClr val="accent1">
+                <a:shade val="50000"/>
+              </a:schemeClr>
+            </a:lnRef>
+            <a:fillRef idx="1">
+              <a:schemeClr val="accent1"/>
+            </a:fillRef>
+            <a:effectRef idx="0">
+              <a:schemeClr val="accent1"/>
+            </a:effectRef>
+            <a:fontRef idx="minor">
+              <a:schemeClr val="lt1"/>
+            </a:fontRef>
+          </p:style>
+          <p:txBody>
+            <a:bodyPr rtlCol="0" anchor="ctr"/>
+            <a:lstStyle/>
+            <a:p>
+              <a:pPr algn="ctr"/>
+              <a:endParaRPr lang="de-DE" sz="1000"/>
+            </a:p>
+          </p:txBody>
+        </p:sp>
+        <p:pic>
+          <p:nvPicPr>
+            <p:cNvPr id="30" name="Picture 29"/>
+            <p:cNvPicPr>
+              <a:picLocks noChangeAspect="1"/>
+            </p:cNvPicPr>
+            <p:nvPr/>
+          </p:nvPicPr>
+          <p:blipFill>
+            <a:blip r:embed="rId8" cstate="print">
+              <a:extLst>
+                <a:ext uri="{28A0092B-C50C-407E-A947-70E740481C1C}">
+                  <a14:useLocalDpi xmlns:a14="http://schemas.microsoft.com/office/drawing/2010/main" val="0"/>
+                </a:ext>
+              </a:extLst>
+            </a:blip>
+            <a:stretch>
+              <a:fillRect/>
+            </a:stretch>
+          </p:blipFill>
+          <p:spPr>
+            <a:xfrm>
+              <a:off x="8340739" y="3731301"/>
+              <a:ext cx="1238267" cy="1238267"/>
+            </a:xfrm>
+            <a:prstGeom prst="rect">
+              <a:avLst/>
+            </a:prstGeom>
+          </p:spPr>
+        </p:pic>
+      </p:grpSp>
+      <p:grpSp>
+        <p:nvGrpSpPr>
+          <p:cNvPr id="31" name="Group 30"/>
+          <p:cNvGrpSpPr/>
+          <p:nvPr/>
+        </p:nvGrpSpPr>
+        <p:grpSpPr>
+          <a:xfrm>
+            <a:off x="13737033" y="4334849"/>
+            <a:ext cx="1151769" cy="673166"/>
+            <a:chOff x="2334271" y="318043"/>
+            <a:chExt cx="1457473" cy="673166"/>
+          </a:xfrm>
+        </p:grpSpPr>
+        <p:cxnSp>
+          <p:nvCxnSpPr>
+            <p:cNvPr id="32" name="Straight Arrow Connector 31"/>
+            <p:cNvCxnSpPr/>
+            <p:nvPr/>
+          </p:nvCxnSpPr>
+          <p:spPr>
+            <a:xfrm flipV="1">
+              <a:off x="2346123" y="980728"/>
+              <a:ext cx="1445621" cy="10481"/>
+            </a:xfrm>
+            <a:prstGeom prst="straightConnector1">
+              <a:avLst/>
+            </a:prstGeom>
+            <a:ln w="142875">
+              <a:solidFill>
+                <a:schemeClr val="tx1">
+                  <a:lumMod val="50000"/>
+                  <a:lumOff val="50000"/>
+                </a:schemeClr>
+              </a:solidFill>
+              <a:tailEnd type="triangle"/>
+            </a:ln>
+          </p:spPr>
+          <p:style>
+            <a:lnRef idx="1">
+              <a:schemeClr val="accent1"/>
+            </a:lnRef>
+            <a:fillRef idx="0">
+              <a:schemeClr val="accent1"/>
+            </a:fillRef>
+            <a:effectRef idx="0">
+              <a:schemeClr val="accent1"/>
+            </a:effectRef>
+            <a:fontRef idx="minor">
+              <a:schemeClr val="tx1"/>
+            </a:fontRef>
+          </p:style>
+        </p:cxnSp>
+        <p:sp>
+          <p:nvSpPr>
+            <p:cNvPr id="33" name="TextBox 32"/>
+            <p:cNvSpPr txBox="1"/>
+            <p:nvPr/>
+          </p:nvSpPr>
+          <p:spPr>
+            <a:xfrm>
+              <a:off x="2334271" y="318043"/>
+              <a:ext cx="1408522" cy="523220"/>
+            </a:xfrm>
+            <a:prstGeom prst="rect">
+              <a:avLst/>
+            </a:prstGeom>
+            <a:noFill/>
+          </p:spPr>
+          <p:txBody>
+            <a:bodyPr wrap="square" rtlCol="0">
+              <a:spAutoFit/>
+            </a:bodyPr>
+            <a:lstStyle/>
+            <a:p>
+              <a:pPr algn="ctr"/>
+              <a:endParaRPr lang="de-DE" sz="2800" b="1" dirty="0"/>
+            </a:p>
+          </p:txBody>
+        </p:sp>
+      </p:grpSp>
+    </p:spTree>
+    <p:extLst>
+      <p:ext uri="{BB962C8B-B14F-4D97-AF65-F5344CB8AC3E}">
+        <p14:creationId xmlns:p14="http://schemas.microsoft.com/office/powerpoint/2010/main" val="2730884054"/>
+      </p:ext>
+    </p:extLst>
+  </p:cSld>
+  <p:clrMapOvr>
+    <a:masterClrMapping/>
+  </p:clrMapOvr>
+</p:sld>
+</file>
+
+<file path=ppt/slides/slide41.xml><?xml version="1.0" encoding="utf-8"?>
+<p:sld xmlns:a="http://schemas.openxmlformats.org/drawingml/2006/main" xmlns:r="http://schemas.openxmlformats.org/officeDocument/2006/relationships" xmlns:p="http://schemas.openxmlformats.org/presentationml/2006/main">
+  <p:cSld>
+    <p:spTree>
+      <p:nvGrpSpPr>
+        <p:cNvPr id="1" name=""/>
+        <p:cNvGrpSpPr/>
+        <p:nvPr/>
+      </p:nvGrpSpPr>
+      <p:grpSpPr>
+        <a:xfrm>
+          <a:off x="0" y="0"/>
+          <a:ext cx="0" cy="0"/>
+          <a:chOff x="0" y="0"/>
+          <a:chExt cx="0" cy="0"/>
+        </a:xfrm>
+      </p:grpSpPr>
       <p:pic>
         <p:nvPicPr>
           <p:cNvPr id="16" name="Picture 15"/>
@@ -42754,7 +44023,7 @@
 </p:sld>
 </file>
 
-<file path=ppt/slides/slide41.xml><?xml version="1.0" encoding="utf-8"?>
+<file path=ppt/slides/slide42.xml><?xml version="1.0" encoding="utf-8"?>
 <p:sld xmlns:a="http://schemas.openxmlformats.org/drawingml/2006/main" xmlns:r="http://schemas.openxmlformats.org/officeDocument/2006/relationships" xmlns:p="http://schemas.openxmlformats.org/presentationml/2006/main">
   <p:cSld>
     <p:spTree>
@@ -43504,7 +44773,7 @@
 </p:sld>
 </file>
 
-<file path=ppt/slides/slide42.xml><?xml version="1.0" encoding="utf-8"?>
+<file path=ppt/slides/slide43.xml><?xml version="1.0" encoding="utf-8"?>
 <p:sld xmlns:a="http://schemas.openxmlformats.org/drawingml/2006/main" xmlns:r="http://schemas.openxmlformats.org/officeDocument/2006/relationships" xmlns:p="http://schemas.openxmlformats.org/presentationml/2006/main">
   <p:cSld>
     <p:spTree>
@@ -45726,7 +46995,7 @@
 </p:sld>
 </file>
 
-<file path=ppt/slides/slide43.xml><?xml version="1.0" encoding="utf-8"?>
+<file path=ppt/slides/slide44.xml><?xml version="1.0" encoding="utf-8"?>
 <p:sld xmlns:a="http://schemas.openxmlformats.org/drawingml/2006/main" xmlns:r="http://schemas.openxmlformats.org/officeDocument/2006/relationships" xmlns:p="http://schemas.openxmlformats.org/presentationml/2006/main">
   <p:cSld>
     <p:spTree>
@@ -47969,7 +49238,7 @@
 </p:sld>
 </file>
 
-<file path=ppt/slides/slide44.xml><?xml version="1.0" encoding="utf-8"?>
+<file path=ppt/slides/slide45.xml><?xml version="1.0" encoding="utf-8"?>
 <p:sld xmlns:a="http://schemas.openxmlformats.org/drawingml/2006/main" xmlns:r="http://schemas.openxmlformats.org/officeDocument/2006/relationships" xmlns:p="http://schemas.openxmlformats.org/presentationml/2006/main">
   <p:cSld>
     <p:spTree>
@@ -50695,7 +51964,7 @@
 </p:sld>
 </file>
 
-<file path=ppt/slides/slide45.xml><?xml version="1.0" encoding="utf-8"?>
+<file path=ppt/slides/slide46.xml><?xml version="1.0" encoding="utf-8"?>
 <p:sld xmlns:a="http://schemas.openxmlformats.org/drawingml/2006/main" xmlns:r="http://schemas.openxmlformats.org/officeDocument/2006/relationships" xmlns:p="http://schemas.openxmlformats.org/presentationml/2006/main">
   <p:cSld>
     <p:spTree>
@@ -50812,7 +52081,7 @@
 </p:sld>
 </file>
 
-<file path=ppt/slides/slide46.xml><?xml version="1.0" encoding="utf-8"?>
+<file path=ppt/slides/slide47.xml><?xml version="1.0" encoding="utf-8"?>
 <p:sld xmlns:a="http://schemas.openxmlformats.org/drawingml/2006/main" xmlns:r="http://schemas.openxmlformats.org/officeDocument/2006/relationships" xmlns:p="http://schemas.openxmlformats.org/presentationml/2006/main">
   <p:cSld>
     <p:spTree>
@@ -53941,7 +55210,7 @@
 </p:sld>
 </file>
 
-<file path=ppt/slides/slide47.xml><?xml version="1.0" encoding="utf-8"?>
+<file path=ppt/slides/slide48.xml><?xml version="1.0" encoding="utf-8"?>
 <p:sld xmlns:a="http://schemas.openxmlformats.org/drawingml/2006/main" xmlns:r="http://schemas.openxmlformats.org/officeDocument/2006/relationships" xmlns:p="http://schemas.openxmlformats.org/presentationml/2006/main">
   <p:cSld>
     <p:spTree>

</xml_diff>